<commit_message>
Added title and names
</commit_message>
<xml_diff>
--- a/learn-to-git.pptx
+++ b/learn-to-git.pptx
@@ -104,6 +104,11 @@
       </a:defRPr>
     </a:lvl9pPr>
   </p:defaultTextStyle>
+  <p:extLst>
+    <p:ext uri="{EFAFB233-063F-42B5-8137-9DF3F51BA10A}">
+      <p15:sldGuideLst xmlns:p15="http://schemas.microsoft.com/office/powerpoint/2012/main"/>
+    </p:ext>
+  </p:extLst>
 </p:presentation>
 </file>
 
@@ -3342,7 +3347,11 @@
           <a:bodyPr/>
           <a:lstStyle/>
           <a:p>
-            <a:endParaRPr lang="en-US"/>
+            <a:r>
+              <a:rPr lang="en-US" dirty="0" smtClean="0"/>
+              <a:t>Learn to GIT</a:t>
+            </a:r>
+            <a:endParaRPr lang="en-US" dirty="0"/>
           </a:p>
         </p:txBody>
       </p:sp>
@@ -3367,7 +3376,21 @@
           <a:bodyPr/>
           <a:lstStyle/>
           <a:p>
-            <a:endParaRPr lang="en-US"/>
+            <a:r>
+              <a:rPr lang="en-US" dirty="0" smtClean="0"/>
+              <a:t>Joseph Rauch</a:t>
+            </a:r>
+          </a:p>
+          <a:p>
+            <a:r>
+              <a:rPr lang="en-US" dirty="0" smtClean="0"/>
+              <a:t>Lishi </a:t>
+            </a:r>
+            <a:r>
+              <a:rPr lang="en-US" dirty="0" err="1" smtClean="0"/>
+              <a:t>Mohapatra</a:t>
+            </a:r>
+            <a:endParaRPr lang="en-US" dirty="0"/>
           </a:p>
         </p:txBody>
       </p:sp>

</xml_diff>

<commit_message>
added a outline slide
</commit_message>
<xml_diff>
--- a/learn-to-git.pptx
+++ b/learn-to-git.pptx
@@ -6,6 +6,8 @@
   </p:sldMasterIdLst>
   <p:sldIdLst>
     <p:sldId id="256" r:id="rId2"/>
+    <p:sldId id="257" r:id="rId3"/>
+    <p:sldId id="258" r:id="rId4"/>
   </p:sldIdLst>
   <p:sldSz cx="12192000" cy="6858000"/>
   <p:notesSz cx="6858000" cy="9144000"/>
@@ -259,7 +261,7 @@
           <a:p>
             <a:fld id="{13F6F24F-D2EE-420E-885E-A1D66B2D733C}" type="datetimeFigureOut">
               <a:rPr lang="en-US" smtClean="0"/>
-              <a:t>10/23/2018</a:t>
+              <a:t>11/1/2018</a:t>
             </a:fld>
             <a:endParaRPr lang="en-US"/>
           </a:p>
@@ -457,7 +459,7 @@
           <a:p>
             <a:fld id="{13F6F24F-D2EE-420E-885E-A1D66B2D733C}" type="datetimeFigureOut">
               <a:rPr lang="en-US" smtClean="0"/>
-              <a:t>10/23/2018</a:t>
+              <a:t>11/1/2018</a:t>
             </a:fld>
             <a:endParaRPr lang="en-US"/>
           </a:p>
@@ -665,7 +667,7 @@
           <a:p>
             <a:fld id="{13F6F24F-D2EE-420E-885E-A1D66B2D733C}" type="datetimeFigureOut">
               <a:rPr lang="en-US" smtClean="0"/>
-              <a:t>10/23/2018</a:t>
+              <a:t>11/1/2018</a:t>
             </a:fld>
             <a:endParaRPr lang="en-US"/>
           </a:p>
@@ -863,7 +865,7 @@
           <a:p>
             <a:fld id="{13F6F24F-D2EE-420E-885E-A1D66B2D733C}" type="datetimeFigureOut">
               <a:rPr lang="en-US" smtClean="0"/>
-              <a:t>10/23/2018</a:t>
+              <a:t>11/1/2018</a:t>
             </a:fld>
             <a:endParaRPr lang="en-US"/>
           </a:p>
@@ -1138,7 +1140,7 @@
           <a:p>
             <a:fld id="{13F6F24F-D2EE-420E-885E-A1D66B2D733C}" type="datetimeFigureOut">
               <a:rPr lang="en-US" smtClean="0"/>
-              <a:t>10/23/2018</a:t>
+              <a:t>11/1/2018</a:t>
             </a:fld>
             <a:endParaRPr lang="en-US"/>
           </a:p>
@@ -1403,7 +1405,7 @@
           <a:p>
             <a:fld id="{13F6F24F-D2EE-420E-885E-A1D66B2D733C}" type="datetimeFigureOut">
               <a:rPr lang="en-US" smtClean="0"/>
-              <a:t>10/23/2018</a:t>
+              <a:t>11/1/2018</a:t>
             </a:fld>
             <a:endParaRPr lang="en-US"/>
           </a:p>
@@ -1815,7 +1817,7 @@
           <a:p>
             <a:fld id="{13F6F24F-D2EE-420E-885E-A1D66B2D733C}" type="datetimeFigureOut">
               <a:rPr lang="en-US" smtClean="0"/>
-              <a:t>10/23/2018</a:t>
+              <a:t>11/1/2018</a:t>
             </a:fld>
             <a:endParaRPr lang="en-US"/>
           </a:p>
@@ -1956,7 +1958,7 @@
           <a:p>
             <a:fld id="{13F6F24F-D2EE-420E-885E-A1D66B2D733C}" type="datetimeFigureOut">
               <a:rPr lang="en-US" smtClean="0"/>
-              <a:t>10/23/2018</a:t>
+              <a:t>11/1/2018</a:t>
             </a:fld>
             <a:endParaRPr lang="en-US"/>
           </a:p>
@@ -2069,7 +2071,7 @@
           <a:p>
             <a:fld id="{13F6F24F-D2EE-420E-885E-A1D66B2D733C}" type="datetimeFigureOut">
               <a:rPr lang="en-US" smtClean="0"/>
-              <a:t>10/23/2018</a:t>
+              <a:t>11/1/2018</a:t>
             </a:fld>
             <a:endParaRPr lang="en-US"/>
           </a:p>
@@ -2380,7 +2382,7 @@
           <a:p>
             <a:fld id="{13F6F24F-D2EE-420E-885E-A1D66B2D733C}" type="datetimeFigureOut">
               <a:rPr lang="en-US" smtClean="0"/>
-              <a:t>10/23/2018</a:t>
+              <a:t>11/1/2018</a:t>
             </a:fld>
             <a:endParaRPr lang="en-US"/>
           </a:p>
@@ -2668,7 +2670,7 @@
           <a:p>
             <a:fld id="{13F6F24F-D2EE-420E-885E-A1D66B2D733C}" type="datetimeFigureOut">
               <a:rPr lang="en-US" smtClean="0"/>
-              <a:t>10/23/2018</a:t>
+              <a:t>11/1/2018</a:t>
             </a:fld>
             <a:endParaRPr lang="en-US"/>
           </a:p>
@@ -2909,7 +2911,7 @@
           <a:p>
             <a:fld id="{13F6F24F-D2EE-420E-885E-A1D66B2D733C}" type="datetimeFigureOut">
               <a:rPr lang="en-US" smtClean="0"/>
-              <a:t>10/23/2018</a:t>
+              <a:t>11/1/2018</a:t>
             </a:fld>
             <a:endParaRPr lang="en-US"/>
           </a:p>
@@ -3407,6 +3409,216 @@
 </p:sld>
 </file>
 
+<file path=ppt/slides/slide2.xml><?xml version="1.0" encoding="utf-8"?>
+<p:sld xmlns:a="http://schemas.openxmlformats.org/drawingml/2006/main" xmlns:r="http://schemas.openxmlformats.org/officeDocument/2006/relationships" xmlns:p="http://schemas.openxmlformats.org/presentationml/2006/main">
+  <p:cSld>
+    <p:spTree>
+      <p:nvGrpSpPr>
+        <p:cNvPr id="1" name=""/>
+        <p:cNvGrpSpPr/>
+        <p:nvPr/>
+      </p:nvGrpSpPr>
+      <p:grpSpPr>
+        <a:xfrm>
+          <a:off x="0" y="0"/>
+          <a:ext cx="0" cy="0"/>
+          <a:chOff x="0" y="0"/>
+          <a:chExt cx="0" cy="0"/>
+        </a:xfrm>
+      </p:grpSpPr>
+      <p:sp>
+        <p:nvSpPr>
+          <p:cNvPr id="2" name="Title 1"/>
+          <p:cNvSpPr>
+            <a:spLocks noGrp="1"/>
+          </p:cNvSpPr>
+          <p:nvPr>
+            <p:ph type="title"/>
+          </p:nvPr>
+        </p:nvSpPr>
+        <p:spPr/>
+        <p:txBody>
+          <a:bodyPr/>
+          <a:lstStyle/>
+          <a:p>
+            <a:endParaRPr lang="en-US"/>
+          </a:p>
+        </p:txBody>
+      </p:sp>
+      <p:sp>
+        <p:nvSpPr>
+          <p:cNvPr id="3" name="Content Placeholder 2"/>
+          <p:cNvSpPr>
+            <a:spLocks noGrp="1"/>
+          </p:cNvSpPr>
+          <p:nvPr>
+            <p:ph idx="1"/>
+          </p:nvPr>
+        </p:nvSpPr>
+        <p:spPr/>
+        <p:txBody>
+          <a:bodyPr/>
+          <a:lstStyle/>
+          <a:p>
+            <a:r>
+              <a:rPr lang="en-US" dirty="0" smtClean="0"/>
+              <a:t>Define GIT</a:t>
+            </a:r>
+          </a:p>
+          <a:p>
+            <a:r>
+              <a:rPr lang="en-US" dirty="0" smtClean="0"/>
+              <a:t>Work flow (analogy to keeping a note book)</a:t>
+            </a:r>
+          </a:p>
+          <a:p>
+            <a:r>
+              <a:rPr lang="en-US" dirty="0" smtClean="0"/>
+              <a:t>Doing solo work </a:t>
+            </a:r>
+          </a:p>
+          <a:p>
+            <a:pPr lvl="1"/>
+            <a:r>
+              <a:rPr lang="en-US" dirty="0" smtClean="0"/>
+              <a:t>Maintaining your local repository (add, </a:t>
+            </a:r>
+            <a:r>
+              <a:rPr lang="en-US" dirty="0" err="1" smtClean="0"/>
+              <a:t>gitignore</a:t>
+            </a:r>
+            <a:r>
+              <a:rPr lang="en-US" dirty="0" smtClean="0"/>
+              <a:t>, revert, branch, checkout, remove, copy, merge, log, commit)</a:t>
+            </a:r>
+          </a:p>
+          <a:p>
+            <a:pPr lvl="1"/>
+            <a:r>
+              <a:rPr lang="en-US" dirty="0" smtClean="0"/>
+              <a:t>Collaboration: Pushing to a remote repository in </a:t>
+            </a:r>
+            <a:r>
+              <a:rPr lang="en-US" dirty="0" err="1" smtClean="0"/>
+              <a:t>Github</a:t>
+            </a:r>
+            <a:r>
+              <a:rPr lang="en-US" dirty="0" smtClean="0"/>
+              <a:t>/cluster (push, merge, branch)</a:t>
+            </a:r>
+          </a:p>
+          <a:p>
+            <a:r>
+              <a:rPr lang="en-US" dirty="0" smtClean="0"/>
+              <a:t>Demo </a:t>
+            </a:r>
+            <a:r>
+              <a:rPr lang="en-US" smtClean="0"/>
+              <a:t>for the code</a:t>
+            </a:r>
+            <a:endParaRPr lang="en-US" dirty="0" smtClean="0"/>
+          </a:p>
+          <a:p>
+            <a:pPr lvl="1"/>
+            <a:endParaRPr lang="en-US" dirty="0"/>
+          </a:p>
+          <a:p>
+            <a:pPr lvl="1"/>
+            <a:endParaRPr lang="en-US" dirty="0" smtClean="0"/>
+          </a:p>
+          <a:p>
+            <a:pPr lvl="1"/>
+            <a:endParaRPr lang="en-US" dirty="0"/>
+          </a:p>
+          <a:p>
+            <a:pPr marL="0" indent="0">
+              <a:buNone/>
+            </a:pPr>
+            <a:endParaRPr lang="en-US" dirty="0"/>
+          </a:p>
+        </p:txBody>
+      </p:sp>
+    </p:spTree>
+    <p:extLst>
+      <p:ext uri="{BB962C8B-B14F-4D97-AF65-F5344CB8AC3E}">
+        <p14:creationId xmlns:p14="http://schemas.microsoft.com/office/powerpoint/2010/main" val="941523380"/>
+      </p:ext>
+    </p:extLst>
+  </p:cSld>
+  <p:clrMapOvr>
+    <a:masterClrMapping/>
+  </p:clrMapOvr>
+</p:sld>
+</file>
+
+<file path=ppt/slides/slide3.xml><?xml version="1.0" encoding="utf-8"?>
+<p:sld xmlns:a="http://schemas.openxmlformats.org/drawingml/2006/main" xmlns:r="http://schemas.openxmlformats.org/officeDocument/2006/relationships" xmlns:p="http://schemas.openxmlformats.org/presentationml/2006/main">
+  <p:cSld>
+    <p:spTree>
+      <p:nvGrpSpPr>
+        <p:cNvPr id="1" name=""/>
+        <p:cNvGrpSpPr/>
+        <p:nvPr/>
+      </p:nvGrpSpPr>
+      <p:grpSpPr>
+        <a:xfrm>
+          <a:off x="0" y="0"/>
+          <a:ext cx="0" cy="0"/>
+          <a:chOff x="0" y="0"/>
+          <a:chExt cx="0" cy="0"/>
+        </a:xfrm>
+      </p:grpSpPr>
+      <p:sp>
+        <p:nvSpPr>
+          <p:cNvPr id="2" name="Title 1"/>
+          <p:cNvSpPr>
+            <a:spLocks noGrp="1"/>
+          </p:cNvSpPr>
+          <p:nvPr>
+            <p:ph type="title"/>
+          </p:nvPr>
+        </p:nvSpPr>
+        <p:spPr/>
+        <p:txBody>
+          <a:bodyPr/>
+          <a:lstStyle/>
+          <a:p>
+            <a:endParaRPr lang="en-US"/>
+          </a:p>
+        </p:txBody>
+      </p:sp>
+      <p:sp>
+        <p:nvSpPr>
+          <p:cNvPr id="3" name="Content Placeholder 2"/>
+          <p:cNvSpPr>
+            <a:spLocks noGrp="1"/>
+          </p:cNvSpPr>
+          <p:nvPr>
+            <p:ph idx="1"/>
+          </p:nvPr>
+        </p:nvSpPr>
+        <p:spPr/>
+        <p:txBody>
+          <a:bodyPr/>
+          <a:lstStyle/>
+          <a:p>
+            <a:endParaRPr lang="en-US"/>
+          </a:p>
+        </p:txBody>
+      </p:sp>
+    </p:spTree>
+    <p:extLst>
+      <p:ext uri="{BB962C8B-B14F-4D97-AF65-F5344CB8AC3E}">
+        <p14:creationId xmlns:p14="http://schemas.microsoft.com/office/powerpoint/2010/main" val="1127983516"/>
+      </p:ext>
+    </p:extLst>
+  </p:cSld>
+  <p:clrMapOvr>
+    <a:masterClrMapping/>
+  </p:clrMapOvr>
+</p:sld>
+</file>
+
 <file path=ppt/theme/theme1.xml><?xml version="1.0" encoding="utf-8"?>
 <a:theme xmlns:a="http://schemas.openxmlformats.org/drawingml/2006/main" name="Office Theme">
   <a:themeElements>

</xml_diff>

<commit_message>
Added a why use git slide.
</commit_message>
<xml_diff>
--- a/learn-to-git.pptx
+++ b/learn-to-git.pptx
@@ -7,7 +7,9 @@
   <p:sldIdLst>
     <p:sldId id="256" r:id="rId2"/>
     <p:sldId id="257" r:id="rId3"/>
-    <p:sldId id="258" r:id="rId4"/>
+    <p:sldId id="260" r:id="rId4"/>
+    <p:sldId id="259" r:id="rId5"/>
+    <p:sldId id="258" r:id="rId6"/>
   </p:sldIdLst>
   <p:sldSz cx="12192000" cy="6858000"/>
   <p:notesSz cx="6858000" cy="9144000"/>
@@ -261,7 +263,7 @@
           <a:p>
             <a:fld id="{13F6F24F-D2EE-420E-885E-A1D66B2D733C}" type="datetimeFigureOut">
               <a:rPr lang="en-US" smtClean="0"/>
-              <a:t>11/1/2018</a:t>
+              <a:t>11/6/2018</a:t>
             </a:fld>
             <a:endParaRPr lang="en-US"/>
           </a:p>
@@ -459,7 +461,7 @@
           <a:p>
             <a:fld id="{13F6F24F-D2EE-420E-885E-A1D66B2D733C}" type="datetimeFigureOut">
               <a:rPr lang="en-US" smtClean="0"/>
-              <a:t>11/1/2018</a:t>
+              <a:t>11/6/2018</a:t>
             </a:fld>
             <a:endParaRPr lang="en-US"/>
           </a:p>
@@ -667,7 +669,7 @@
           <a:p>
             <a:fld id="{13F6F24F-D2EE-420E-885E-A1D66B2D733C}" type="datetimeFigureOut">
               <a:rPr lang="en-US" smtClean="0"/>
-              <a:t>11/1/2018</a:t>
+              <a:t>11/6/2018</a:t>
             </a:fld>
             <a:endParaRPr lang="en-US"/>
           </a:p>
@@ -865,7 +867,7 @@
           <a:p>
             <a:fld id="{13F6F24F-D2EE-420E-885E-A1D66B2D733C}" type="datetimeFigureOut">
               <a:rPr lang="en-US" smtClean="0"/>
-              <a:t>11/1/2018</a:t>
+              <a:t>11/6/2018</a:t>
             </a:fld>
             <a:endParaRPr lang="en-US"/>
           </a:p>
@@ -1140,7 +1142,7 @@
           <a:p>
             <a:fld id="{13F6F24F-D2EE-420E-885E-A1D66B2D733C}" type="datetimeFigureOut">
               <a:rPr lang="en-US" smtClean="0"/>
-              <a:t>11/1/2018</a:t>
+              <a:t>11/6/2018</a:t>
             </a:fld>
             <a:endParaRPr lang="en-US"/>
           </a:p>
@@ -1405,7 +1407,7 @@
           <a:p>
             <a:fld id="{13F6F24F-D2EE-420E-885E-A1D66B2D733C}" type="datetimeFigureOut">
               <a:rPr lang="en-US" smtClean="0"/>
-              <a:t>11/1/2018</a:t>
+              <a:t>11/6/2018</a:t>
             </a:fld>
             <a:endParaRPr lang="en-US"/>
           </a:p>
@@ -1817,7 +1819,7 @@
           <a:p>
             <a:fld id="{13F6F24F-D2EE-420E-885E-A1D66B2D733C}" type="datetimeFigureOut">
               <a:rPr lang="en-US" smtClean="0"/>
-              <a:t>11/1/2018</a:t>
+              <a:t>11/6/2018</a:t>
             </a:fld>
             <a:endParaRPr lang="en-US"/>
           </a:p>
@@ -1958,7 +1960,7 @@
           <a:p>
             <a:fld id="{13F6F24F-D2EE-420E-885E-A1D66B2D733C}" type="datetimeFigureOut">
               <a:rPr lang="en-US" smtClean="0"/>
-              <a:t>11/1/2018</a:t>
+              <a:t>11/6/2018</a:t>
             </a:fld>
             <a:endParaRPr lang="en-US"/>
           </a:p>
@@ -2071,7 +2073,7 @@
           <a:p>
             <a:fld id="{13F6F24F-D2EE-420E-885E-A1D66B2D733C}" type="datetimeFigureOut">
               <a:rPr lang="en-US" smtClean="0"/>
-              <a:t>11/1/2018</a:t>
+              <a:t>11/6/2018</a:t>
             </a:fld>
             <a:endParaRPr lang="en-US"/>
           </a:p>
@@ -2382,7 +2384,7 @@
           <a:p>
             <a:fld id="{13F6F24F-D2EE-420E-885E-A1D66B2D733C}" type="datetimeFigureOut">
               <a:rPr lang="en-US" smtClean="0"/>
-              <a:t>11/1/2018</a:t>
+              <a:t>11/6/2018</a:t>
             </a:fld>
             <a:endParaRPr lang="en-US"/>
           </a:p>
@@ -2670,7 +2672,7 @@
           <a:p>
             <a:fld id="{13F6F24F-D2EE-420E-885E-A1D66B2D733C}" type="datetimeFigureOut">
               <a:rPr lang="en-US" smtClean="0"/>
-              <a:t>11/1/2018</a:t>
+              <a:t>11/6/2018</a:t>
             </a:fld>
             <a:endParaRPr lang="en-US"/>
           </a:p>
@@ -2911,7 +2913,7 @@
           <a:p>
             <a:fld id="{13F6F24F-D2EE-420E-885E-A1D66B2D733C}" type="datetimeFigureOut">
               <a:rPr lang="en-US" smtClean="0"/>
-              <a:t>11/1/2018</a:t>
+              <a:t>11/6/2018</a:t>
             </a:fld>
             <a:endParaRPr lang="en-US"/>
           </a:p>
@@ -3350,10 +3352,9 @@
           <a:lstStyle/>
           <a:p>
             <a:r>
-              <a:rPr lang="en-US" dirty="0" smtClean="0"/>
+              <a:rPr lang="en-US" dirty="0"/>
               <a:t>Learn to GIT</a:t>
             </a:r>
-            <a:endParaRPr lang="en-US" dirty="0"/>
           </a:p>
         </p:txBody>
       </p:sp>
@@ -3379,17 +3380,17 @@
           <a:lstStyle/>
           <a:p>
             <a:r>
-              <a:rPr lang="en-US" dirty="0" smtClean="0"/>
+              <a:rPr lang="en-US" dirty="0"/>
               <a:t>Joseph Rauch</a:t>
             </a:r>
           </a:p>
           <a:p>
             <a:r>
-              <a:rPr lang="en-US" dirty="0" smtClean="0"/>
+              <a:rPr lang="en-US" dirty="0"/>
               <a:t>Lishi </a:t>
             </a:r>
             <a:r>
-              <a:rPr lang="en-US" dirty="0" err="1" smtClean="0"/>
+              <a:rPr lang="en-US" dirty="0" err="1"/>
               <a:t>Mohapatra</a:t>
             </a:r>
             <a:endParaRPr lang="en-US" dirty="0"/>
@@ -3461,62 +3462,62 @@
           <a:lstStyle/>
           <a:p>
             <a:r>
-              <a:rPr lang="en-US" dirty="0" smtClean="0"/>
+              <a:rPr lang="en-US" dirty="0"/>
               <a:t>Define GIT</a:t>
             </a:r>
           </a:p>
           <a:p>
             <a:r>
-              <a:rPr lang="en-US" dirty="0" smtClean="0"/>
+              <a:rPr lang="en-US" dirty="0"/>
               <a:t>Work flow (analogy to keeping a note book)</a:t>
             </a:r>
           </a:p>
           <a:p>
             <a:r>
-              <a:rPr lang="en-US" dirty="0" smtClean="0"/>
+              <a:rPr lang="en-US" dirty="0"/>
               <a:t>Doing solo work </a:t>
             </a:r>
           </a:p>
           <a:p>
             <a:pPr lvl="1"/>
             <a:r>
-              <a:rPr lang="en-US" dirty="0" smtClean="0"/>
+              <a:rPr lang="en-US" dirty="0"/>
               <a:t>Maintaining your local repository (add, </a:t>
             </a:r>
             <a:r>
-              <a:rPr lang="en-US" dirty="0" err="1" smtClean="0"/>
+              <a:rPr lang="en-US" dirty="0" err="1"/>
               <a:t>gitignore</a:t>
             </a:r>
             <a:r>
-              <a:rPr lang="en-US" dirty="0" smtClean="0"/>
+              <a:rPr lang="en-US" dirty="0"/>
               <a:t>, revert, branch, checkout, remove, copy, merge, log, commit)</a:t>
             </a:r>
           </a:p>
           <a:p>
             <a:pPr lvl="1"/>
             <a:r>
-              <a:rPr lang="en-US" dirty="0" smtClean="0"/>
+              <a:rPr lang="en-US" dirty="0"/>
               <a:t>Collaboration: Pushing to a remote repository in </a:t>
             </a:r>
             <a:r>
-              <a:rPr lang="en-US" dirty="0" err="1" smtClean="0"/>
+              <a:rPr lang="en-US" dirty="0" err="1"/>
               <a:t>Github</a:t>
             </a:r>
             <a:r>
-              <a:rPr lang="en-US" dirty="0" smtClean="0"/>
+              <a:rPr lang="en-US" dirty="0"/>
               <a:t>/cluster (push, merge, branch)</a:t>
             </a:r>
           </a:p>
           <a:p>
             <a:r>
-              <a:rPr lang="en-US" dirty="0" smtClean="0"/>
+              <a:rPr lang="en-US" dirty="0"/>
               <a:t>Demo </a:t>
             </a:r>
             <a:r>
-              <a:rPr lang="en-US" smtClean="0"/>
+              <a:rPr lang="en-US"/>
               <a:t>for the code</a:t>
             </a:r>
-            <a:endParaRPr lang="en-US" dirty="0" smtClean="0"/>
+            <a:endParaRPr lang="en-US" dirty="0"/>
           </a:p>
           <a:p>
             <a:pPr lvl="1"/>
@@ -3524,7 +3525,7 @@
           </a:p>
           <a:p>
             <a:pPr lvl="1"/>
-            <a:endParaRPr lang="en-US" dirty="0" smtClean="0"/>
+            <a:endParaRPr lang="en-US" dirty="0"/>
           </a:p>
           <a:p>
             <a:pPr lvl="1"/>
@@ -3552,6 +3553,265 @@
 </file>
 
 <file path=ppt/slides/slide3.xml><?xml version="1.0" encoding="utf-8"?>
+<p:sld xmlns:a="http://schemas.openxmlformats.org/drawingml/2006/main" xmlns:r="http://schemas.openxmlformats.org/officeDocument/2006/relationships" xmlns:p="http://schemas.openxmlformats.org/presentationml/2006/main">
+  <p:cSld>
+    <p:spTree>
+      <p:nvGrpSpPr>
+        <p:cNvPr id="1" name=""/>
+        <p:cNvGrpSpPr/>
+        <p:nvPr/>
+      </p:nvGrpSpPr>
+      <p:grpSpPr>
+        <a:xfrm>
+          <a:off x="0" y="0"/>
+          <a:ext cx="0" cy="0"/>
+          <a:chOff x="0" y="0"/>
+          <a:chExt cx="0" cy="0"/>
+        </a:xfrm>
+      </p:grpSpPr>
+      <p:sp>
+        <p:nvSpPr>
+          <p:cNvPr id="2" name="TextBox 1">
+            <a:extLst>
+              <a:ext uri="{FF2B5EF4-FFF2-40B4-BE49-F238E27FC236}">
+                <a16:creationId xmlns:a16="http://schemas.microsoft.com/office/drawing/2014/main" id="{7C8BC062-2088-4621-9A35-C7E4ECEB2D25}"/>
+              </a:ext>
+            </a:extLst>
+          </p:cNvPr>
+          <p:cNvSpPr txBox="1"/>
+          <p:nvPr/>
+        </p:nvSpPr>
+        <p:spPr>
+          <a:xfrm>
+            <a:off x="368709" y="494071"/>
+            <a:ext cx="8330742" cy="707886"/>
+          </a:xfrm>
+          <a:prstGeom prst="rect">
+            <a:avLst/>
+          </a:prstGeom>
+          <a:noFill/>
+        </p:spPr>
+        <p:txBody>
+          <a:bodyPr wrap="none" rtlCol="0">
+            <a:spAutoFit/>
+          </a:bodyPr>
+          <a:lstStyle/>
+          <a:p>
+            <a:r>
+              <a:rPr lang="en-US" sz="4000" dirty="0"/>
+              <a:t>What is version control and why use it?</a:t>
+            </a:r>
+          </a:p>
+        </p:txBody>
+      </p:sp>
+      <p:sp>
+        <p:nvSpPr>
+          <p:cNvPr id="3" name="TextBox 2">
+            <a:extLst>
+              <a:ext uri="{FF2B5EF4-FFF2-40B4-BE49-F238E27FC236}">
+                <a16:creationId xmlns:a16="http://schemas.microsoft.com/office/drawing/2014/main" id="{7B22AFC8-19B2-44DE-B73A-5670980A0DBB}"/>
+              </a:ext>
+            </a:extLst>
+          </p:cNvPr>
+          <p:cNvSpPr txBox="1"/>
+          <p:nvPr/>
+        </p:nvSpPr>
+        <p:spPr>
+          <a:xfrm>
+            <a:off x="700548" y="1836174"/>
+            <a:ext cx="10914206" cy="3693319"/>
+          </a:xfrm>
+          <a:prstGeom prst="rect">
+            <a:avLst/>
+          </a:prstGeom>
+          <a:noFill/>
+        </p:spPr>
+        <p:txBody>
+          <a:bodyPr wrap="none" rtlCol="0">
+            <a:spAutoFit/>
+          </a:bodyPr>
+          <a:lstStyle/>
+          <a:p>
+            <a:pPr marL="285750" indent="-285750">
+              <a:buFont typeface="Arial" panose="020B0604020202020204" pitchFamily="34" charset="0"/>
+              <a:buChar char="•"/>
+            </a:pPr>
+            <a:r>
+              <a:rPr lang="en-US" dirty="0"/>
+              <a:t>A version control system records changes to a file or set of files so you can recall specific versions later.</a:t>
+            </a:r>
+          </a:p>
+          <a:p>
+            <a:pPr marL="742950" lvl="1" indent="-285750">
+              <a:buFont typeface="Arial" panose="020B0604020202020204" pitchFamily="34" charset="0"/>
+              <a:buChar char="•"/>
+            </a:pPr>
+            <a:r>
+              <a:rPr lang="en-US" dirty="0"/>
+              <a:t>While often used for code, can be used for any file type.  Meaning you can also track changes in your </a:t>
+            </a:r>
+            <a:br>
+              <a:rPr lang="en-US" dirty="0"/>
+            </a:br>
+            <a:r>
+              <a:rPr lang="en-US" dirty="0"/>
+              <a:t>posters, presentations, and figures, then recall past versions if need be.</a:t>
+            </a:r>
+          </a:p>
+          <a:p>
+            <a:pPr marL="742950" lvl="1" indent="-285750">
+              <a:buFont typeface="Arial" panose="020B0604020202020204" pitchFamily="34" charset="0"/>
+              <a:buChar char="•"/>
+            </a:pPr>
+            <a:endParaRPr lang="en-US" dirty="0"/>
+          </a:p>
+          <a:p>
+            <a:pPr marL="742950" lvl="1" indent="-285750">
+              <a:buFont typeface="Arial" panose="020B0604020202020204" pitchFamily="34" charset="0"/>
+              <a:buChar char="•"/>
+            </a:pPr>
+            <a:r>
+              <a:rPr lang="en-US" dirty="0"/>
+              <a:t>The log of file changes is similar to an experimentalist’s lab book.  It tracks how the project has progressed </a:t>
+            </a:r>
+            <a:br>
+              <a:rPr lang="en-US" dirty="0"/>
+            </a:br>
+            <a:r>
+              <a:rPr lang="en-US" dirty="0"/>
+              <a:t>(in terms of the code at least) and allows you to more easily track problems or go back to previous version </a:t>
+            </a:r>
+            <a:br>
+              <a:rPr lang="en-US" dirty="0"/>
+            </a:br>
+            <a:r>
+              <a:rPr lang="en-US" dirty="0"/>
+              <a:t>of working code. </a:t>
+            </a:r>
+          </a:p>
+          <a:p>
+            <a:pPr lvl="1"/>
+            <a:endParaRPr lang="en-US" dirty="0"/>
+          </a:p>
+          <a:p>
+            <a:pPr marL="285750" indent="-285750">
+              <a:buFont typeface="Arial" panose="020B0604020202020204" pitchFamily="34" charset="0"/>
+              <a:buChar char="•"/>
+            </a:pPr>
+            <a:r>
+              <a:rPr lang="en-US" dirty="0"/>
+              <a:t>A distributed version control system also allows you to more easily collaborate with others on a project.  </a:t>
+            </a:r>
+          </a:p>
+          <a:p>
+            <a:pPr marL="742950" lvl="1" indent="-285750">
+              <a:buFont typeface="Arial" panose="020B0604020202020204" pitchFamily="34" charset="0"/>
+              <a:buChar char="•"/>
+            </a:pPr>
+            <a:r>
+              <a:rPr lang="en-US" dirty="0"/>
+              <a:t>In addition, a distributed version control system can also serve as a backup in case something happens to </a:t>
+            </a:r>
+            <a:br>
+              <a:rPr lang="en-US" dirty="0"/>
+            </a:br>
+            <a:r>
+              <a:rPr lang="en-US" dirty="0"/>
+              <a:t>your computer and you lose your data.  </a:t>
+            </a:r>
+          </a:p>
+          <a:p>
+            <a:pPr lvl="1"/>
+            <a:r>
+              <a:rPr lang="en-US" dirty="0"/>
+              <a:t> </a:t>
+            </a:r>
+          </a:p>
+          <a:p>
+            <a:pPr lvl="2"/>
+            <a:endParaRPr lang="en-US" dirty="0"/>
+          </a:p>
+        </p:txBody>
+      </p:sp>
+    </p:spTree>
+    <p:extLst>
+      <p:ext uri="{BB962C8B-B14F-4D97-AF65-F5344CB8AC3E}">
+        <p14:creationId xmlns:p14="http://schemas.microsoft.com/office/powerpoint/2010/main" val="1392929655"/>
+      </p:ext>
+    </p:extLst>
+  </p:cSld>
+  <p:clrMapOvr>
+    <a:masterClrMapping/>
+  </p:clrMapOvr>
+</p:sld>
+</file>
+
+<file path=ppt/slides/slide4.xml><?xml version="1.0" encoding="utf-8"?>
+<p:sld xmlns:a="http://schemas.openxmlformats.org/drawingml/2006/main" xmlns:r="http://schemas.openxmlformats.org/officeDocument/2006/relationships" xmlns:p="http://schemas.openxmlformats.org/presentationml/2006/main">
+  <p:cSld>
+    <p:spTree>
+      <p:nvGrpSpPr>
+        <p:cNvPr id="1" name=""/>
+        <p:cNvGrpSpPr/>
+        <p:nvPr/>
+      </p:nvGrpSpPr>
+      <p:grpSpPr>
+        <a:xfrm>
+          <a:off x="0" y="0"/>
+          <a:ext cx="0" cy="0"/>
+          <a:chOff x="0" y="0"/>
+          <a:chExt cx="0" cy="0"/>
+        </a:xfrm>
+      </p:grpSpPr>
+      <p:sp>
+        <p:nvSpPr>
+          <p:cNvPr id="2" name="TextBox 1">
+            <a:extLst>
+              <a:ext uri="{FF2B5EF4-FFF2-40B4-BE49-F238E27FC236}">
+                <a16:creationId xmlns:a16="http://schemas.microsoft.com/office/drawing/2014/main" id="{55B00B43-FAAB-4D22-9E01-665E407310BC}"/>
+              </a:ext>
+            </a:extLst>
+          </p:cNvPr>
+          <p:cNvSpPr txBox="1"/>
+          <p:nvPr/>
+        </p:nvSpPr>
+        <p:spPr>
+          <a:xfrm>
+            <a:off x="693173" y="929148"/>
+            <a:ext cx="3525196" cy="707886"/>
+          </a:xfrm>
+          <a:prstGeom prst="rect">
+            <a:avLst/>
+          </a:prstGeom>
+          <a:noFill/>
+        </p:spPr>
+        <p:txBody>
+          <a:bodyPr wrap="none" rtlCol="0">
+            <a:spAutoFit/>
+          </a:bodyPr>
+          <a:lstStyle/>
+          <a:p>
+            <a:r>
+              <a:rPr lang="en-US" sz="4000" dirty="0"/>
+              <a:t>Start a project…</a:t>
+            </a:r>
+          </a:p>
+        </p:txBody>
+      </p:sp>
+    </p:spTree>
+    <p:extLst>
+      <p:ext uri="{BB962C8B-B14F-4D97-AF65-F5344CB8AC3E}">
+        <p14:creationId xmlns:p14="http://schemas.microsoft.com/office/powerpoint/2010/main" val="2713822562"/>
+      </p:ext>
+    </p:extLst>
+  </p:cSld>
+  <p:clrMapOvr>
+    <a:masterClrMapping/>
+  </p:clrMapOvr>
+</p:sld>
+</file>
+
+<file path=ppt/slides/slide5.xml><?xml version="1.0" encoding="utf-8"?>
 <p:sld xmlns:a="http://schemas.openxmlformats.org/drawingml/2006/main" xmlns:r="http://schemas.openxmlformats.org/officeDocument/2006/relationships" xmlns:p="http://schemas.openxmlformats.org/presentationml/2006/main">
   <p:cSld>
     <p:spTree>

</xml_diff>

<commit_message>
Added install and configure slide.
</commit_message>
<xml_diff>
--- a/learn-to-git.pptx
+++ b/learn-to-git.pptx
@@ -4,12 +4,16 @@
   <p:sldMasterIdLst>
     <p:sldMasterId id="2147483648" r:id="rId1"/>
   </p:sldMasterIdLst>
+  <p:notesMasterIdLst>
+    <p:notesMasterId r:id="rId8"/>
+  </p:notesMasterIdLst>
   <p:sldIdLst>
     <p:sldId id="256" r:id="rId2"/>
     <p:sldId id="257" r:id="rId3"/>
     <p:sldId id="260" r:id="rId4"/>
-    <p:sldId id="259" r:id="rId5"/>
-    <p:sldId id="258" r:id="rId6"/>
+    <p:sldId id="261" r:id="rId5"/>
+    <p:sldId id="259" r:id="rId6"/>
+    <p:sldId id="258" r:id="rId7"/>
   </p:sldIdLst>
   <p:sldSz cx="12192000" cy="6858000"/>
   <p:notesSz cx="6858000" cy="9144000"/>
@@ -114,6 +118,501 @@
     </p:ext>
   </p:extLst>
 </p:presentation>
+</file>
+
+<file path=ppt/notesMasters/notesMaster1.xml><?xml version="1.0" encoding="utf-8"?>
+<p:notesMaster xmlns:a="http://schemas.openxmlformats.org/drawingml/2006/main" xmlns:r="http://schemas.openxmlformats.org/officeDocument/2006/relationships" xmlns:p="http://schemas.openxmlformats.org/presentationml/2006/main">
+  <p:cSld>
+    <p:bg>
+      <p:bgRef idx="1001">
+        <a:schemeClr val="bg1"/>
+      </p:bgRef>
+    </p:bg>
+    <p:spTree>
+      <p:nvGrpSpPr>
+        <p:cNvPr id="1" name=""/>
+        <p:cNvGrpSpPr/>
+        <p:nvPr/>
+      </p:nvGrpSpPr>
+      <p:grpSpPr>
+        <a:xfrm>
+          <a:off x="0" y="0"/>
+          <a:ext cx="0" cy="0"/>
+          <a:chOff x="0" y="0"/>
+          <a:chExt cx="0" cy="0"/>
+        </a:xfrm>
+      </p:grpSpPr>
+      <p:sp>
+        <p:nvSpPr>
+          <p:cNvPr id="2" name="Header Placeholder 1"/>
+          <p:cNvSpPr>
+            <a:spLocks noGrp="1"/>
+          </p:cNvSpPr>
+          <p:nvPr>
+            <p:ph type="hdr" sz="quarter"/>
+          </p:nvPr>
+        </p:nvSpPr>
+        <p:spPr>
+          <a:xfrm>
+            <a:off x="0" y="0"/>
+            <a:ext cx="2971800" cy="458788"/>
+          </a:xfrm>
+          <a:prstGeom prst="rect">
+            <a:avLst/>
+          </a:prstGeom>
+        </p:spPr>
+        <p:txBody>
+          <a:bodyPr vert="horz" lIns="91440" tIns="45720" rIns="91440" bIns="45720" rtlCol="0"/>
+          <a:lstStyle>
+            <a:lvl1pPr algn="l">
+              <a:defRPr sz="1200"/>
+            </a:lvl1pPr>
+          </a:lstStyle>
+          <a:p>
+            <a:endParaRPr lang="en-US"/>
+          </a:p>
+        </p:txBody>
+      </p:sp>
+      <p:sp>
+        <p:nvSpPr>
+          <p:cNvPr id="3" name="Date Placeholder 2"/>
+          <p:cNvSpPr>
+            <a:spLocks noGrp="1"/>
+          </p:cNvSpPr>
+          <p:nvPr>
+            <p:ph type="dt" idx="1"/>
+          </p:nvPr>
+        </p:nvSpPr>
+        <p:spPr>
+          <a:xfrm>
+            <a:off x="3884613" y="0"/>
+            <a:ext cx="2971800" cy="458788"/>
+          </a:xfrm>
+          <a:prstGeom prst="rect">
+            <a:avLst/>
+          </a:prstGeom>
+        </p:spPr>
+        <p:txBody>
+          <a:bodyPr vert="horz" lIns="91440" tIns="45720" rIns="91440" bIns="45720" rtlCol="0"/>
+          <a:lstStyle>
+            <a:lvl1pPr algn="r">
+              <a:defRPr sz="1200"/>
+            </a:lvl1pPr>
+          </a:lstStyle>
+          <a:p>
+            <a:fld id="{5DE3B9EE-8657-4270-9540-C548D39E80E2}" type="datetimeFigureOut">
+              <a:rPr lang="en-US" smtClean="0"/>
+              <a:t>11/6/2018</a:t>
+            </a:fld>
+            <a:endParaRPr lang="en-US"/>
+          </a:p>
+        </p:txBody>
+      </p:sp>
+      <p:sp>
+        <p:nvSpPr>
+          <p:cNvPr id="4" name="Slide Image Placeholder 3"/>
+          <p:cNvSpPr>
+            <a:spLocks noGrp="1" noRot="1" noChangeAspect="1"/>
+          </p:cNvSpPr>
+          <p:nvPr>
+            <p:ph type="sldImg" idx="2"/>
+          </p:nvPr>
+        </p:nvSpPr>
+        <p:spPr>
+          <a:xfrm>
+            <a:off x="685800" y="1143000"/>
+            <a:ext cx="5486400" cy="3086100"/>
+          </a:xfrm>
+          <a:prstGeom prst="rect">
+            <a:avLst/>
+          </a:prstGeom>
+          <a:noFill/>
+          <a:ln w="12700">
+            <a:solidFill>
+              <a:prstClr val="black"/>
+            </a:solidFill>
+          </a:ln>
+        </p:spPr>
+        <p:txBody>
+          <a:bodyPr vert="horz" lIns="91440" tIns="45720" rIns="91440" bIns="45720" rtlCol="0" anchor="ctr"/>
+          <a:lstStyle/>
+          <a:p>
+            <a:endParaRPr lang="en-US"/>
+          </a:p>
+        </p:txBody>
+      </p:sp>
+      <p:sp>
+        <p:nvSpPr>
+          <p:cNvPr id="5" name="Notes Placeholder 4"/>
+          <p:cNvSpPr>
+            <a:spLocks noGrp="1"/>
+          </p:cNvSpPr>
+          <p:nvPr>
+            <p:ph type="body" sz="quarter" idx="3"/>
+          </p:nvPr>
+        </p:nvSpPr>
+        <p:spPr>
+          <a:xfrm>
+            <a:off x="685800" y="4400550"/>
+            <a:ext cx="5486400" cy="3600450"/>
+          </a:xfrm>
+          <a:prstGeom prst="rect">
+            <a:avLst/>
+          </a:prstGeom>
+        </p:spPr>
+        <p:txBody>
+          <a:bodyPr vert="horz" lIns="91440" tIns="45720" rIns="91440" bIns="45720" rtlCol="0"/>
+          <a:lstStyle/>
+          <a:p>
+            <a:pPr lvl="0"/>
+            <a:r>
+              <a:rPr lang="en-US"/>
+              <a:t>Edit Master text styles</a:t>
+            </a:r>
+          </a:p>
+          <a:p>
+            <a:pPr lvl="1"/>
+            <a:r>
+              <a:rPr lang="en-US"/>
+              <a:t>Second level</a:t>
+            </a:r>
+          </a:p>
+          <a:p>
+            <a:pPr lvl="2"/>
+            <a:r>
+              <a:rPr lang="en-US"/>
+              <a:t>Third level</a:t>
+            </a:r>
+          </a:p>
+          <a:p>
+            <a:pPr lvl="3"/>
+            <a:r>
+              <a:rPr lang="en-US"/>
+              <a:t>Fourth level</a:t>
+            </a:r>
+          </a:p>
+          <a:p>
+            <a:pPr lvl="4"/>
+            <a:r>
+              <a:rPr lang="en-US"/>
+              <a:t>Fifth level</a:t>
+            </a:r>
+          </a:p>
+        </p:txBody>
+      </p:sp>
+      <p:sp>
+        <p:nvSpPr>
+          <p:cNvPr id="6" name="Footer Placeholder 5"/>
+          <p:cNvSpPr>
+            <a:spLocks noGrp="1"/>
+          </p:cNvSpPr>
+          <p:nvPr>
+            <p:ph type="ftr" sz="quarter" idx="4"/>
+          </p:nvPr>
+        </p:nvSpPr>
+        <p:spPr>
+          <a:xfrm>
+            <a:off x="0" y="8685213"/>
+            <a:ext cx="2971800" cy="458787"/>
+          </a:xfrm>
+          <a:prstGeom prst="rect">
+            <a:avLst/>
+          </a:prstGeom>
+        </p:spPr>
+        <p:txBody>
+          <a:bodyPr vert="horz" lIns="91440" tIns="45720" rIns="91440" bIns="45720" rtlCol="0" anchor="b"/>
+          <a:lstStyle>
+            <a:lvl1pPr algn="l">
+              <a:defRPr sz="1200"/>
+            </a:lvl1pPr>
+          </a:lstStyle>
+          <a:p>
+            <a:endParaRPr lang="en-US"/>
+          </a:p>
+        </p:txBody>
+      </p:sp>
+      <p:sp>
+        <p:nvSpPr>
+          <p:cNvPr id="7" name="Slide Number Placeholder 6"/>
+          <p:cNvSpPr>
+            <a:spLocks noGrp="1"/>
+          </p:cNvSpPr>
+          <p:nvPr>
+            <p:ph type="sldNum" sz="quarter" idx="5"/>
+          </p:nvPr>
+        </p:nvSpPr>
+        <p:spPr>
+          <a:xfrm>
+            <a:off x="3884613" y="8685213"/>
+            <a:ext cx="2971800" cy="458787"/>
+          </a:xfrm>
+          <a:prstGeom prst="rect">
+            <a:avLst/>
+          </a:prstGeom>
+        </p:spPr>
+        <p:txBody>
+          <a:bodyPr vert="horz" lIns="91440" tIns="45720" rIns="91440" bIns="45720" rtlCol="0" anchor="b"/>
+          <a:lstStyle>
+            <a:lvl1pPr algn="r">
+              <a:defRPr sz="1200"/>
+            </a:lvl1pPr>
+          </a:lstStyle>
+          <a:p>
+            <a:fld id="{1EB1DABF-4E95-4EDF-8DA3-AD2A8632C0A3}" type="slidenum">
+              <a:rPr lang="en-US" smtClean="0"/>
+              <a:t>‹#›</a:t>
+            </a:fld>
+            <a:endParaRPr lang="en-US"/>
+          </a:p>
+        </p:txBody>
+      </p:sp>
+    </p:spTree>
+    <p:extLst>
+      <p:ext uri="{BB962C8B-B14F-4D97-AF65-F5344CB8AC3E}">
+        <p14:creationId xmlns:p14="http://schemas.microsoft.com/office/powerpoint/2010/main" val="1923990291"/>
+      </p:ext>
+    </p:extLst>
+  </p:cSld>
+  <p:clrMap bg1="lt1" tx1="dk1" bg2="lt2" tx2="dk2" accent1="accent1" accent2="accent2" accent3="accent3" accent4="accent4" accent5="accent5" accent6="accent6" hlink="hlink" folHlink="folHlink"/>
+  <p:notesStyle>
+    <a:lvl1pPr marL="0" algn="l" defTabSz="914400" rtl="0" eaLnBrk="1" latinLnBrk="0" hangingPunct="1">
+      <a:defRPr sz="1200" kern="1200">
+        <a:solidFill>
+          <a:schemeClr val="tx1"/>
+        </a:solidFill>
+        <a:latin typeface="+mn-lt"/>
+        <a:ea typeface="+mn-ea"/>
+        <a:cs typeface="+mn-cs"/>
+      </a:defRPr>
+    </a:lvl1pPr>
+    <a:lvl2pPr marL="457200" algn="l" defTabSz="914400" rtl="0" eaLnBrk="1" latinLnBrk="0" hangingPunct="1">
+      <a:defRPr sz="1200" kern="1200">
+        <a:solidFill>
+          <a:schemeClr val="tx1"/>
+        </a:solidFill>
+        <a:latin typeface="+mn-lt"/>
+        <a:ea typeface="+mn-ea"/>
+        <a:cs typeface="+mn-cs"/>
+      </a:defRPr>
+    </a:lvl2pPr>
+    <a:lvl3pPr marL="914400" algn="l" defTabSz="914400" rtl="0" eaLnBrk="1" latinLnBrk="0" hangingPunct="1">
+      <a:defRPr sz="1200" kern="1200">
+        <a:solidFill>
+          <a:schemeClr val="tx1"/>
+        </a:solidFill>
+        <a:latin typeface="+mn-lt"/>
+        <a:ea typeface="+mn-ea"/>
+        <a:cs typeface="+mn-cs"/>
+      </a:defRPr>
+    </a:lvl3pPr>
+    <a:lvl4pPr marL="1371600" algn="l" defTabSz="914400" rtl="0" eaLnBrk="1" latinLnBrk="0" hangingPunct="1">
+      <a:defRPr sz="1200" kern="1200">
+        <a:solidFill>
+          <a:schemeClr val="tx1"/>
+        </a:solidFill>
+        <a:latin typeface="+mn-lt"/>
+        <a:ea typeface="+mn-ea"/>
+        <a:cs typeface="+mn-cs"/>
+      </a:defRPr>
+    </a:lvl4pPr>
+    <a:lvl5pPr marL="1828800" algn="l" defTabSz="914400" rtl="0" eaLnBrk="1" latinLnBrk="0" hangingPunct="1">
+      <a:defRPr sz="1200" kern="1200">
+        <a:solidFill>
+          <a:schemeClr val="tx1"/>
+        </a:solidFill>
+        <a:latin typeface="+mn-lt"/>
+        <a:ea typeface="+mn-ea"/>
+        <a:cs typeface="+mn-cs"/>
+      </a:defRPr>
+    </a:lvl5pPr>
+    <a:lvl6pPr marL="2286000" algn="l" defTabSz="914400" rtl="0" eaLnBrk="1" latinLnBrk="0" hangingPunct="1">
+      <a:defRPr sz="1200" kern="1200">
+        <a:solidFill>
+          <a:schemeClr val="tx1"/>
+        </a:solidFill>
+        <a:latin typeface="+mn-lt"/>
+        <a:ea typeface="+mn-ea"/>
+        <a:cs typeface="+mn-cs"/>
+      </a:defRPr>
+    </a:lvl6pPr>
+    <a:lvl7pPr marL="2743200" algn="l" defTabSz="914400" rtl="0" eaLnBrk="1" latinLnBrk="0" hangingPunct="1">
+      <a:defRPr sz="1200" kern="1200">
+        <a:solidFill>
+          <a:schemeClr val="tx1"/>
+        </a:solidFill>
+        <a:latin typeface="+mn-lt"/>
+        <a:ea typeface="+mn-ea"/>
+        <a:cs typeface="+mn-cs"/>
+      </a:defRPr>
+    </a:lvl7pPr>
+    <a:lvl8pPr marL="3200400" algn="l" defTabSz="914400" rtl="0" eaLnBrk="1" latinLnBrk="0" hangingPunct="1">
+      <a:defRPr sz="1200" kern="1200">
+        <a:solidFill>
+          <a:schemeClr val="tx1"/>
+        </a:solidFill>
+        <a:latin typeface="+mn-lt"/>
+        <a:ea typeface="+mn-ea"/>
+        <a:cs typeface="+mn-cs"/>
+      </a:defRPr>
+    </a:lvl8pPr>
+    <a:lvl9pPr marL="3657600" algn="l" defTabSz="914400" rtl="0" eaLnBrk="1" latinLnBrk="0" hangingPunct="1">
+      <a:defRPr sz="1200" kern="1200">
+        <a:solidFill>
+          <a:schemeClr val="tx1"/>
+        </a:solidFill>
+        <a:latin typeface="+mn-lt"/>
+        <a:ea typeface="+mn-ea"/>
+        <a:cs typeface="+mn-cs"/>
+      </a:defRPr>
+    </a:lvl9pPr>
+  </p:notesStyle>
+</p:notesMaster>
+</file>
+
+<file path=ppt/notesSlides/notesSlide1.xml><?xml version="1.0" encoding="utf-8"?>
+<p:notes xmlns:a="http://schemas.openxmlformats.org/drawingml/2006/main" xmlns:r="http://schemas.openxmlformats.org/officeDocument/2006/relationships" xmlns:p="http://schemas.openxmlformats.org/presentationml/2006/main">
+  <p:cSld>
+    <p:spTree>
+      <p:nvGrpSpPr>
+        <p:cNvPr id="1" name=""/>
+        <p:cNvGrpSpPr/>
+        <p:nvPr/>
+      </p:nvGrpSpPr>
+      <p:grpSpPr>
+        <a:xfrm>
+          <a:off x="0" y="0"/>
+          <a:ext cx="0" cy="0"/>
+          <a:chOff x="0" y="0"/>
+          <a:chExt cx="0" cy="0"/>
+        </a:xfrm>
+      </p:grpSpPr>
+      <p:sp>
+        <p:nvSpPr>
+          <p:cNvPr id="2" name="Slide Image Placeholder 1"/>
+          <p:cNvSpPr>
+            <a:spLocks noGrp="1" noRot="1" noChangeAspect="1"/>
+          </p:cNvSpPr>
+          <p:nvPr>
+            <p:ph type="sldImg"/>
+          </p:nvPr>
+        </p:nvSpPr>
+        <p:spPr/>
+      </p:sp>
+      <p:sp>
+        <p:nvSpPr>
+          <p:cNvPr id="3" name="Notes Placeholder 2"/>
+          <p:cNvSpPr>
+            <a:spLocks noGrp="1"/>
+          </p:cNvSpPr>
+          <p:nvPr>
+            <p:ph type="body" idx="1"/>
+          </p:nvPr>
+        </p:nvSpPr>
+        <p:spPr/>
+        <p:txBody>
+          <a:bodyPr/>
+          <a:lstStyle/>
+          <a:p>
+            <a:pPr marL="171450" indent="-171450">
+              <a:buFontTx/>
+              <a:buChar char="-"/>
+            </a:pPr>
+            <a:r>
+              <a:rPr lang="en-US" dirty="0"/>
+              <a:t>Make a new directory.</a:t>
+            </a:r>
+          </a:p>
+          <a:p>
+            <a:pPr marL="171450" indent="-171450">
+              <a:buFontTx/>
+              <a:buChar char="-"/>
+            </a:pPr>
+            <a:r>
+              <a:rPr lang="en-US" dirty="0"/>
+              <a:t>Write a short </a:t>
+            </a:r>
+            <a:r>
+              <a:rPr lang="en-US" dirty="0" err="1"/>
+              <a:t>matlab</a:t>
+            </a:r>
+            <a:r>
+              <a:rPr lang="en-US" dirty="0"/>
+              <a:t> script.  Save it.</a:t>
+            </a:r>
+          </a:p>
+          <a:p>
+            <a:pPr marL="171450" indent="-171450">
+              <a:buFontTx/>
+              <a:buChar char="-"/>
+            </a:pPr>
+            <a:r>
+              <a:rPr lang="en-US" dirty="0"/>
+              <a:t>Initialize a git repository.</a:t>
+            </a:r>
+          </a:p>
+          <a:p>
+            <a:pPr marL="628650" lvl="1" indent="-171450">
+              <a:buFontTx/>
+              <a:buChar char="-"/>
+            </a:pPr>
+            <a:r>
+              <a:rPr lang="en-US" dirty="0"/>
+              <a:t>Mention not good practice to nest repos. </a:t>
+            </a:r>
+          </a:p>
+          <a:p>
+            <a:pPr marL="628650" lvl="1" indent="-171450">
+              <a:buFontTx/>
+              <a:buChar char="-"/>
+            </a:pPr>
+            <a:r>
+              <a:rPr lang="en-US" dirty="0"/>
+              <a:t>Mention configuring username and email.</a:t>
+            </a:r>
+          </a:p>
+          <a:p>
+            <a:pPr marL="171450" indent="-171450">
+              <a:buFontTx/>
+              <a:buChar char="-"/>
+            </a:pPr>
+            <a:endParaRPr lang="en-US" dirty="0"/>
+          </a:p>
+        </p:txBody>
+      </p:sp>
+      <p:sp>
+        <p:nvSpPr>
+          <p:cNvPr id="4" name="Slide Number Placeholder 3"/>
+          <p:cNvSpPr>
+            <a:spLocks noGrp="1"/>
+          </p:cNvSpPr>
+          <p:nvPr>
+            <p:ph type="sldNum" sz="quarter" idx="5"/>
+          </p:nvPr>
+        </p:nvSpPr>
+        <p:spPr/>
+        <p:txBody>
+          <a:bodyPr/>
+          <a:lstStyle/>
+          <a:p>
+            <a:fld id="{1EB1DABF-4E95-4EDF-8DA3-AD2A8632C0A3}" type="slidenum">
+              <a:rPr lang="en-US" smtClean="0"/>
+              <a:t>5</a:t>
+            </a:fld>
+            <a:endParaRPr lang="en-US"/>
+          </a:p>
+        </p:txBody>
+      </p:sp>
+    </p:spTree>
+    <p:extLst>
+      <p:ext uri="{BB962C8B-B14F-4D97-AF65-F5344CB8AC3E}">
+        <p14:creationId xmlns:p14="http://schemas.microsoft.com/office/powerpoint/2010/main" val="3850980937"/>
+      </p:ext>
+    </p:extLst>
+  </p:cSld>
+  <p:clrMapOvr>
+    <a:masterClrMapping/>
+  </p:clrMapOvr>
+</p:notes>
 </file>
 
 <file path=ppt/slideLayouts/slideLayout1.xml><?xml version="1.0" encoding="utf-8"?>
@@ -3768,6 +4267,290 @@
           <p:cNvPr id="2" name="TextBox 1">
             <a:extLst>
               <a:ext uri="{FF2B5EF4-FFF2-40B4-BE49-F238E27FC236}">
+                <a16:creationId xmlns:a16="http://schemas.microsoft.com/office/drawing/2014/main" id="{6C715F99-2F6E-40E6-851D-8942EC86540A}"/>
+              </a:ext>
+            </a:extLst>
+          </p:cNvPr>
+          <p:cNvSpPr txBox="1"/>
+          <p:nvPr/>
+        </p:nvSpPr>
+        <p:spPr>
+          <a:xfrm>
+            <a:off x="523630" y="367323"/>
+            <a:ext cx="2870466" cy="707886"/>
+          </a:xfrm>
+          <a:prstGeom prst="rect">
+            <a:avLst/>
+          </a:prstGeom>
+          <a:noFill/>
+        </p:spPr>
+        <p:txBody>
+          <a:bodyPr wrap="none" rtlCol="0">
+            <a:spAutoFit/>
+          </a:bodyPr>
+          <a:lstStyle/>
+          <a:p>
+            <a:r>
+              <a:rPr lang="en-US" sz="4000" dirty="0"/>
+              <a:t>Installing GIT</a:t>
+            </a:r>
+          </a:p>
+        </p:txBody>
+      </p:sp>
+      <p:sp>
+        <p:nvSpPr>
+          <p:cNvPr id="3" name="TextBox 2">
+            <a:extLst>
+              <a:ext uri="{FF2B5EF4-FFF2-40B4-BE49-F238E27FC236}">
+                <a16:creationId xmlns:a16="http://schemas.microsoft.com/office/drawing/2014/main" id="{A847734D-306F-4DE3-997D-84C2F6DE5497}"/>
+              </a:ext>
+            </a:extLst>
+          </p:cNvPr>
+          <p:cNvSpPr txBox="1"/>
+          <p:nvPr/>
+        </p:nvSpPr>
+        <p:spPr>
+          <a:xfrm>
+            <a:off x="1039447" y="1414585"/>
+            <a:ext cx="7565789" cy="369332"/>
+          </a:xfrm>
+          <a:prstGeom prst="rect">
+            <a:avLst/>
+          </a:prstGeom>
+          <a:noFill/>
+        </p:spPr>
+        <p:txBody>
+          <a:bodyPr wrap="none" rtlCol="0">
+            <a:spAutoFit/>
+          </a:bodyPr>
+          <a:lstStyle/>
+          <a:p>
+            <a:r>
+              <a:rPr lang="en-US" dirty="0"/>
+              <a:t>For mac and Windows, you can find installers at: </a:t>
+            </a:r>
+            <a:r>
+              <a:rPr lang="en-US" dirty="0">
+                <a:hlinkClick r:id="rId2"/>
+              </a:rPr>
+              <a:t>http://git-scm.com/download</a:t>
+            </a:r>
+            <a:endParaRPr lang="en-US" dirty="0"/>
+          </a:p>
+        </p:txBody>
+      </p:sp>
+      <p:sp>
+        <p:nvSpPr>
+          <p:cNvPr id="4" name="TextBox 3">
+            <a:extLst>
+              <a:ext uri="{FF2B5EF4-FFF2-40B4-BE49-F238E27FC236}">
+                <a16:creationId xmlns:a16="http://schemas.microsoft.com/office/drawing/2014/main" id="{FCA7CA19-68BA-424B-AFB9-4AB6FFB69D1C}"/>
+              </a:ext>
+            </a:extLst>
+          </p:cNvPr>
+          <p:cNvSpPr txBox="1"/>
+          <p:nvPr/>
+        </p:nvSpPr>
+        <p:spPr>
+          <a:xfrm>
+            <a:off x="444730" y="2407138"/>
+            <a:ext cx="3028265" cy="707886"/>
+          </a:xfrm>
+          <a:prstGeom prst="rect">
+            <a:avLst/>
+          </a:prstGeom>
+          <a:noFill/>
+        </p:spPr>
+        <p:txBody>
+          <a:bodyPr wrap="none" rtlCol="0">
+            <a:spAutoFit/>
+          </a:bodyPr>
+          <a:lstStyle/>
+          <a:p>
+            <a:r>
+              <a:rPr lang="en-US" sz="4000" dirty="0"/>
+              <a:t>Configure GIT</a:t>
+            </a:r>
+          </a:p>
+        </p:txBody>
+      </p:sp>
+      <p:sp>
+        <p:nvSpPr>
+          <p:cNvPr id="5" name="TextBox 4">
+            <a:extLst>
+              <a:ext uri="{FF2B5EF4-FFF2-40B4-BE49-F238E27FC236}">
+                <a16:creationId xmlns:a16="http://schemas.microsoft.com/office/drawing/2014/main" id="{5DD1F57D-A173-4BB6-A634-B36E92183EFF}"/>
+              </a:ext>
+            </a:extLst>
+          </p:cNvPr>
+          <p:cNvSpPr txBox="1"/>
+          <p:nvPr/>
+        </p:nvSpPr>
+        <p:spPr>
+          <a:xfrm>
+            <a:off x="773723" y="3429000"/>
+            <a:ext cx="9747027" cy="646331"/>
+          </a:xfrm>
+          <a:prstGeom prst="rect">
+            <a:avLst/>
+          </a:prstGeom>
+          <a:noFill/>
+        </p:spPr>
+        <p:txBody>
+          <a:bodyPr wrap="none" rtlCol="0">
+            <a:spAutoFit/>
+          </a:bodyPr>
+          <a:lstStyle/>
+          <a:p>
+            <a:r>
+              <a:rPr lang="en-US" dirty="0"/>
+              <a:t>The git config command in terminal allows you to configure git from the command line.  Alternatively, </a:t>
+            </a:r>
+            <a:br>
+              <a:rPr lang="en-US" dirty="0"/>
+            </a:br>
+            <a:r>
+              <a:rPr lang="en-US" dirty="0"/>
+              <a:t>you can open the .</a:t>
+            </a:r>
+            <a:r>
+              <a:rPr lang="en-US" dirty="0" err="1"/>
+              <a:t>gitconfig</a:t>
+            </a:r>
+            <a:r>
+              <a:rPr lang="en-US" dirty="0"/>
+              <a:t> file in your home directory and edit the configuration there.  </a:t>
+            </a:r>
+          </a:p>
+        </p:txBody>
+      </p:sp>
+      <p:sp>
+        <p:nvSpPr>
+          <p:cNvPr id="6" name="TextBox 5">
+            <a:extLst>
+              <a:ext uri="{FF2B5EF4-FFF2-40B4-BE49-F238E27FC236}">
+                <a16:creationId xmlns:a16="http://schemas.microsoft.com/office/drawing/2014/main" id="{C7970726-E5A2-4F76-A6CA-3072FFF47028}"/>
+              </a:ext>
+            </a:extLst>
+          </p:cNvPr>
+          <p:cNvSpPr txBox="1"/>
+          <p:nvPr/>
+        </p:nvSpPr>
+        <p:spPr>
+          <a:xfrm>
+            <a:off x="1771624" y="4389307"/>
+            <a:ext cx="7751224" cy="1200329"/>
+          </a:xfrm>
+          <a:prstGeom prst="rect">
+            <a:avLst/>
+          </a:prstGeom>
+          <a:noFill/>
+        </p:spPr>
+        <p:txBody>
+          <a:bodyPr wrap="none" rtlCol="0">
+            <a:spAutoFit/>
+          </a:bodyPr>
+          <a:lstStyle/>
+          <a:p>
+            <a:pPr marL="285750" indent="-285750">
+              <a:buFont typeface="Arial" panose="020B0604020202020204" pitchFamily="34" charset="0"/>
+              <a:buChar char="•"/>
+            </a:pPr>
+            <a:r>
+              <a:rPr lang="en-US" dirty="0"/>
+              <a:t>git config --global user.name “John Smith”</a:t>
+            </a:r>
+          </a:p>
+          <a:p>
+            <a:pPr marL="285750" indent="-285750">
+              <a:buFont typeface="Arial" panose="020B0604020202020204" pitchFamily="34" charset="0"/>
+              <a:buChar char="•"/>
+            </a:pPr>
+            <a:r>
+              <a:rPr lang="en-US" dirty="0"/>
+              <a:t>git config --global </a:t>
+            </a:r>
+            <a:r>
+              <a:rPr lang="en-US" dirty="0" err="1"/>
+              <a:t>user.email</a:t>
+            </a:r>
+            <a:r>
+              <a:rPr lang="en-US" dirty="0"/>
+              <a:t> </a:t>
+            </a:r>
+            <a:r>
+              <a:rPr lang="en-US" dirty="0">
+                <a:hlinkClick r:id="rId3"/>
+              </a:rPr>
+              <a:t>johnsmith@email.com</a:t>
+            </a:r>
+            <a:endParaRPr lang="en-US" dirty="0"/>
+          </a:p>
+          <a:p>
+            <a:pPr marL="285750" indent="-285750">
+              <a:buFont typeface="Arial" panose="020B0604020202020204" pitchFamily="34" charset="0"/>
+              <a:buChar char="•"/>
+            </a:pPr>
+            <a:r>
+              <a:rPr lang="en-US" dirty="0"/>
+              <a:t>git config --global </a:t>
+            </a:r>
+            <a:r>
+              <a:rPr lang="en-US" dirty="0" err="1"/>
+              <a:t>core.editor</a:t>
+            </a:r>
+            <a:r>
+              <a:rPr lang="en-US" dirty="0"/>
+              <a:t> vim ‘C:/Program Files (x86)/Vim/vim74/vim.exe’</a:t>
+            </a:r>
+          </a:p>
+          <a:p>
+            <a:pPr marL="285750" indent="-285750">
+              <a:buFont typeface="Arial" panose="020B0604020202020204" pitchFamily="34" charset="0"/>
+              <a:buChar char="•"/>
+            </a:pPr>
+            <a:r>
+              <a:rPr lang="en-US" dirty="0"/>
+              <a:t>git config --list </a:t>
+            </a:r>
+          </a:p>
+        </p:txBody>
+      </p:sp>
+    </p:spTree>
+    <p:extLst>
+      <p:ext uri="{BB962C8B-B14F-4D97-AF65-F5344CB8AC3E}">
+        <p14:creationId xmlns:p14="http://schemas.microsoft.com/office/powerpoint/2010/main" val="1958072024"/>
+      </p:ext>
+    </p:extLst>
+  </p:cSld>
+  <p:clrMapOvr>
+    <a:masterClrMapping/>
+  </p:clrMapOvr>
+</p:sld>
+</file>
+
+<file path=ppt/slides/slide5.xml><?xml version="1.0" encoding="utf-8"?>
+<p:sld xmlns:a="http://schemas.openxmlformats.org/drawingml/2006/main" xmlns:r="http://schemas.openxmlformats.org/officeDocument/2006/relationships" xmlns:p="http://schemas.openxmlformats.org/presentationml/2006/main">
+  <p:cSld>
+    <p:spTree>
+      <p:nvGrpSpPr>
+        <p:cNvPr id="1" name=""/>
+        <p:cNvGrpSpPr/>
+        <p:nvPr/>
+      </p:nvGrpSpPr>
+      <p:grpSpPr>
+        <a:xfrm>
+          <a:off x="0" y="0"/>
+          <a:ext cx="0" cy="0"/>
+          <a:chOff x="0" y="0"/>
+          <a:chExt cx="0" cy="0"/>
+        </a:xfrm>
+      </p:grpSpPr>
+      <p:sp>
+        <p:nvSpPr>
+          <p:cNvPr id="2" name="TextBox 1">
+            <a:extLst>
+              <a:ext uri="{FF2B5EF4-FFF2-40B4-BE49-F238E27FC236}">
                 <a16:creationId xmlns:a16="http://schemas.microsoft.com/office/drawing/2014/main" id="{55B00B43-FAAB-4D22-9E01-665E407310BC}"/>
               </a:ext>
             </a:extLst>
@@ -3811,7 +4594,7 @@
 </p:sld>
 </file>
 
-<file path=ppt/slides/slide5.xml><?xml version="1.0" encoding="utf-8"?>
+<file path=ppt/slides/slide6.xml><?xml version="1.0" encoding="utf-8"?>
 <p:sld xmlns:a="http://schemas.openxmlformats.org/drawingml/2006/main" xmlns:r="http://schemas.openxmlformats.org/officeDocument/2006/relationships" xmlns:p="http://schemas.openxmlformats.org/presentationml/2006/main">
   <p:cSld>
     <p:spTree>
@@ -4172,4 +4955,299 @@
     </a:ext>
   </a:extLst>
 </a:theme>
+</file>
+
+<file path=ppt/theme/theme2.xml><?xml version="1.0" encoding="utf-8"?>
+<a:theme xmlns:a="http://schemas.openxmlformats.org/drawingml/2006/main" name="Office Theme">
+  <a:themeElements>
+    <a:clrScheme name="Office">
+      <a:dk1>
+        <a:sysClr val="windowText" lastClr="000000"/>
+      </a:dk1>
+      <a:lt1>
+        <a:sysClr val="window" lastClr="FFFFFF"/>
+      </a:lt1>
+      <a:dk2>
+        <a:srgbClr val="44546A"/>
+      </a:dk2>
+      <a:lt2>
+        <a:srgbClr val="E7E6E6"/>
+      </a:lt2>
+      <a:accent1>
+        <a:srgbClr val="4472C4"/>
+      </a:accent1>
+      <a:accent2>
+        <a:srgbClr val="ED7D31"/>
+      </a:accent2>
+      <a:accent3>
+        <a:srgbClr val="A5A5A5"/>
+      </a:accent3>
+      <a:accent4>
+        <a:srgbClr val="FFC000"/>
+      </a:accent4>
+      <a:accent5>
+        <a:srgbClr val="5B9BD5"/>
+      </a:accent5>
+      <a:accent6>
+        <a:srgbClr val="70AD47"/>
+      </a:accent6>
+      <a:hlink>
+        <a:srgbClr val="0563C1"/>
+      </a:hlink>
+      <a:folHlink>
+        <a:srgbClr val="954F72"/>
+      </a:folHlink>
+    </a:clrScheme>
+    <a:fontScheme name="Office">
+      <a:majorFont>
+        <a:latin typeface="Calibri Light" panose="020F0302020204030204"/>
+        <a:ea typeface=""/>
+        <a:cs typeface=""/>
+        <a:font script="Jpan" typeface="游ゴシック Light"/>
+        <a:font script="Hang" typeface="맑은 고딕"/>
+        <a:font script="Hans" typeface="等线 Light"/>
+        <a:font script="Hant" typeface="新細明體"/>
+        <a:font script="Arab" typeface="Times New Roman"/>
+        <a:font script="Hebr" typeface="Times New Roman"/>
+        <a:font script="Thai" typeface="Angsana New"/>
+        <a:font script="Ethi" typeface="Nyala"/>
+        <a:font script="Beng" typeface="Vrinda"/>
+        <a:font script="Gujr" typeface="Shruti"/>
+        <a:font script="Khmr" typeface="MoolBoran"/>
+        <a:font script="Knda" typeface="Tunga"/>
+        <a:font script="Guru" typeface="Raavi"/>
+        <a:font script="Cans" typeface="Euphemia"/>
+        <a:font script="Cher" typeface="Plantagenet Cherokee"/>
+        <a:font script="Yiii" typeface="Microsoft Yi Baiti"/>
+        <a:font script="Tibt" typeface="Microsoft Himalaya"/>
+        <a:font script="Thaa" typeface="MV Boli"/>
+        <a:font script="Deva" typeface="Mangal"/>
+        <a:font script="Telu" typeface="Gautami"/>
+        <a:font script="Taml" typeface="Latha"/>
+        <a:font script="Syrc" typeface="Estrangelo Edessa"/>
+        <a:font script="Orya" typeface="Kalinga"/>
+        <a:font script="Mlym" typeface="Kartika"/>
+        <a:font script="Laoo" typeface="DokChampa"/>
+        <a:font script="Sinh" typeface="Iskoola Pota"/>
+        <a:font script="Mong" typeface="Mongolian Baiti"/>
+        <a:font script="Viet" typeface="Times New Roman"/>
+        <a:font script="Uigh" typeface="Microsoft Uighur"/>
+        <a:font script="Geor" typeface="Sylfaen"/>
+        <a:font script="Armn" typeface="Arial"/>
+        <a:font script="Bugi" typeface="Leelawadee UI"/>
+        <a:font script="Bopo" typeface="Microsoft JhengHei"/>
+        <a:font script="Java" typeface="Javanese Text"/>
+        <a:font script="Lisu" typeface="Segoe UI"/>
+        <a:font script="Mymr" typeface="Myanmar Text"/>
+        <a:font script="Nkoo" typeface="Ebrima"/>
+        <a:font script="Olck" typeface="Nirmala UI"/>
+        <a:font script="Osma" typeface="Ebrima"/>
+        <a:font script="Phag" typeface="Phagspa"/>
+        <a:font script="Syrn" typeface="Estrangelo Edessa"/>
+        <a:font script="Syrj" typeface="Estrangelo Edessa"/>
+        <a:font script="Syre" typeface="Estrangelo Edessa"/>
+        <a:font script="Sora" typeface="Nirmala UI"/>
+        <a:font script="Tale" typeface="Microsoft Tai Le"/>
+        <a:font script="Talu" typeface="Microsoft New Tai Lue"/>
+        <a:font script="Tfng" typeface="Ebrima"/>
+      </a:majorFont>
+      <a:minorFont>
+        <a:latin typeface="Calibri" panose="020F0502020204030204"/>
+        <a:ea typeface=""/>
+        <a:cs typeface=""/>
+        <a:font script="Jpan" typeface="游ゴシック"/>
+        <a:font script="Hang" typeface="맑은 고딕"/>
+        <a:font script="Hans" typeface="等线"/>
+        <a:font script="Hant" typeface="新細明體"/>
+        <a:font script="Arab" typeface="Arial"/>
+        <a:font script="Hebr" typeface="Arial"/>
+        <a:font script="Thai" typeface="Cordia New"/>
+        <a:font script="Ethi" typeface="Nyala"/>
+        <a:font script="Beng" typeface="Vrinda"/>
+        <a:font script="Gujr" typeface="Shruti"/>
+        <a:font script="Khmr" typeface="DaunPenh"/>
+        <a:font script="Knda" typeface="Tunga"/>
+        <a:font script="Guru" typeface="Raavi"/>
+        <a:font script="Cans" typeface="Euphemia"/>
+        <a:font script="Cher" typeface="Plantagenet Cherokee"/>
+        <a:font script="Yiii" typeface="Microsoft Yi Baiti"/>
+        <a:font script="Tibt" typeface="Microsoft Himalaya"/>
+        <a:font script="Thaa" typeface="MV Boli"/>
+        <a:font script="Deva" typeface="Mangal"/>
+        <a:font script="Telu" typeface="Gautami"/>
+        <a:font script="Taml" typeface="Latha"/>
+        <a:font script="Syrc" typeface="Estrangelo Edessa"/>
+        <a:font script="Orya" typeface="Kalinga"/>
+        <a:font script="Mlym" typeface="Kartika"/>
+        <a:font script="Laoo" typeface="DokChampa"/>
+        <a:font script="Sinh" typeface="Iskoola Pota"/>
+        <a:font script="Mong" typeface="Mongolian Baiti"/>
+        <a:font script="Viet" typeface="Arial"/>
+        <a:font script="Uigh" typeface="Microsoft Uighur"/>
+        <a:font script="Geor" typeface="Sylfaen"/>
+        <a:font script="Armn" typeface="Arial"/>
+        <a:font script="Bugi" typeface="Leelawadee UI"/>
+        <a:font script="Bopo" typeface="Microsoft JhengHei"/>
+        <a:font script="Java" typeface="Javanese Text"/>
+        <a:font script="Lisu" typeface="Segoe UI"/>
+        <a:font script="Mymr" typeface="Myanmar Text"/>
+        <a:font script="Nkoo" typeface="Ebrima"/>
+        <a:font script="Olck" typeface="Nirmala UI"/>
+        <a:font script="Osma" typeface="Ebrima"/>
+        <a:font script="Phag" typeface="Phagspa"/>
+        <a:font script="Syrn" typeface="Estrangelo Edessa"/>
+        <a:font script="Syrj" typeface="Estrangelo Edessa"/>
+        <a:font script="Syre" typeface="Estrangelo Edessa"/>
+        <a:font script="Sora" typeface="Nirmala UI"/>
+        <a:font script="Tale" typeface="Microsoft Tai Le"/>
+        <a:font script="Talu" typeface="Microsoft New Tai Lue"/>
+        <a:font script="Tfng" typeface="Ebrima"/>
+      </a:minorFont>
+    </a:fontScheme>
+    <a:fmtScheme name="Office">
+      <a:fillStyleLst>
+        <a:solidFill>
+          <a:schemeClr val="phClr"/>
+        </a:solidFill>
+        <a:gradFill rotWithShape="1">
+          <a:gsLst>
+            <a:gs pos="0">
+              <a:schemeClr val="phClr">
+                <a:lumMod val="110000"/>
+                <a:satMod val="105000"/>
+                <a:tint val="67000"/>
+              </a:schemeClr>
+            </a:gs>
+            <a:gs pos="50000">
+              <a:schemeClr val="phClr">
+                <a:lumMod val="105000"/>
+                <a:satMod val="103000"/>
+                <a:tint val="73000"/>
+              </a:schemeClr>
+            </a:gs>
+            <a:gs pos="100000">
+              <a:schemeClr val="phClr">
+                <a:lumMod val="105000"/>
+                <a:satMod val="109000"/>
+                <a:tint val="81000"/>
+              </a:schemeClr>
+            </a:gs>
+          </a:gsLst>
+          <a:lin ang="5400000" scaled="0"/>
+        </a:gradFill>
+        <a:gradFill rotWithShape="1">
+          <a:gsLst>
+            <a:gs pos="0">
+              <a:schemeClr val="phClr">
+                <a:satMod val="103000"/>
+                <a:lumMod val="102000"/>
+                <a:tint val="94000"/>
+              </a:schemeClr>
+            </a:gs>
+            <a:gs pos="50000">
+              <a:schemeClr val="phClr">
+                <a:satMod val="110000"/>
+                <a:lumMod val="100000"/>
+                <a:shade val="100000"/>
+              </a:schemeClr>
+            </a:gs>
+            <a:gs pos="100000">
+              <a:schemeClr val="phClr">
+                <a:lumMod val="99000"/>
+                <a:satMod val="120000"/>
+                <a:shade val="78000"/>
+              </a:schemeClr>
+            </a:gs>
+          </a:gsLst>
+          <a:lin ang="5400000" scaled="0"/>
+        </a:gradFill>
+      </a:fillStyleLst>
+      <a:lnStyleLst>
+        <a:ln w="6350" cap="flat" cmpd="sng" algn="ctr">
+          <a:solidFill>
+            <a:schemeClr val="phClr"/>
+          </a:solidFill>
+          <a:prstDash val="solid"/>
+          <a:miter lim="800000"/>
+        </a:ln>
+        <a:ln w="12700" cap="flat" cmpd="sng" algn="ctr">
+          <a:solidFill>
+            <a:schemeClr val="phClr"/>
+          </a:solidFill>
+          <a:prstDash val="solid"/>
+          <a:miter lim="800000"/>
+        </a:ln>
+        <a:ln w="19050" cap="flat" cmpd="sng" algn="ctr">
+          <a:solidFill>
+            <a:schemeClr val="phClr"/>
+          </a:solidFill>
+          <a:prstDash val="solid"/>
+          <a:miter lim="800000"/>
+        </a:ln>
+      </a:lnStyleLst>
+      <a:effectStyleLst>
+        <a:effectStyle>
+          <a:effectLst/>
+        </a:effectStyle>
+        <a:effectStyle>
+          <a:effectLst/>
+        </a:effectStyle>
+        <a:effectStyle>
+          <a:effectLst>
+            <a:outerShdw blurRad="57150" dist="19050" dir="5400000" algn="ctr" rotWithShape="0">
+              <a:srgbClr val="000000">
+                <a:alpha val="63000"/>
+              </a:srgbClr>
+            </a:outerShdw>
+          </a:effectLst>
+        </a:effectStyle>
+      </a:effectStyleLst>
+      <a:bgFillStyleLst>
+        <a:solidFill>
+          <a:schemeClr val="phClr"/>
+        </a:solidFill>
+        <a:solidFill>
+          <a:schemeClr val="phClr">
+            <a:tint val="95000"/>
+            <a:satMod val="170000"/>
+          </a:schemeClr>
+        </a:solidFill>
+        <a:gradFill rotWithShape="1">
+          <a:gsLst>
+            <a:gs pos="0">
+              <a:schemeClr val="phClr">
+                <a:tint val="93000"/>
+                <a:satMod val="150000"/>
+                <a:shade val="98000"/>
+                <a:lumMod val="102000"/>
+              </a:schemeClr>
+            </a:gs>
+            <a:gs pos="50000">
+              <a:schemeClr val="phClr">
+                <a:tint val="98000"/>
+                <a:satMod val="130000"/>
+                <a:shade val="90000"/>
+                <a:lumMod val="103000"/>
+              </a:schemeClr>
+            </a:gs>
+            <a:gs pos="100000">
+              <a:schemeClr val="phClr">
+                <a:shade val="63000"/>
+                <a:satMod val="120000"/>
+              </a:schemeClr>
+            </a:gs>
+          </a:gsLst>
+          <a:lin ang="5400000" scaled="0"/>
+        </a:gradFill>
+      </a:bgFillStyleLst>
+    </a:fmtScheme>
+  </a:themeElements>
+  <a:objectDefaults/>
+  <a:extraClrSchemeLst/>
+  <a:extLst>
+    <a:ext uri="{05A4C25C-085E-4340-85A3-A5531E510DB2}">
+      <thm15:themeFamily xmlns:thm15="http://schemas.microsoft.com/office/thememl/2012/main" name="Office Theme" id="{62F939B6-93AF-4DB8-9C6B-D6C7DFDC589F}" vid="{4A3C46E8-61CC-4603-A589-7422A47A8E4A}"/>
+    </a:ext>
+  </a:extLst>
+</a:theme>
 </file>
</xml_diff>

<commit_message>
Added a help with git slide.
</commit_message>
<xml_diff>
--- a/learn-to-git.pptx
+++ b/learn-to-git.pptx
@@ -5,15 +5,16 @@
     <p:sldMasterId id="2147483648" r:id="rId1"/>
   </p:sldMasterIdLst>
   <p:notesMasterIdLst>
-    <p:notesMasterId r:id="rId8"/>
+    <p:notesMasterId r:id="rId9"/>
   </p:notesMasterIdLst>
   <p:sldIdLst>
     <p:sldId id="256" r:id="rId2"/>
     <p:sldId id="257" r:id="rId3"/>
     <p:sldId id="260" r:id="rId4"/>
     <p:sldId id="261" r:id="rId5"/>
-    <p:sldId id="259" r:id="rId6"/>
-    <p:sldId id="258" r:id="rId7"/>
+    <p:sldId id="262" r:id="rId6"/>
+    <p:sldId id="259" r:id="rId7"/>
+    <p:sldId id="258" r:id="rId8"/>
   </p:sldIdLst>
   <p:sldSz cx="12192000" cy="6858000"/>
   <p:notesSz cx="6858000" cy="9144000"/>
@@ -596,7 +597,7 @@
           <a:p>
             <a:fld id="{1EB1DABF-4E95-4EDF-8DA3-AD2A8632C0A3}" type="slidenum">
               <a:rPr lang="en-US" smtClean="0"/>
-              <a:t>5</a:t>
+              <a:t>6</a:t>
             </a:fld>
             <a:endParaRPr lang="en-US"/>
           </a:p>
@@ -4551,6 +4552,215 @@
           <p:cNvPr id="2" name="TextBox 1">
             <a:extLst>
               <a:ext uri="{FF2B5EF4-FFF2-40B4-BE49-F238E27FC236}">
+                <a16:creationId xmlns:a16="http://schemas.microsoft.com/office/drawing/2014/main" id="{BB584E79-F3A6-47EB-AE03-C5BE7C88FFF8}"/>
+              </a:ext>
+            </a:extLst>
+          </p:cNvPr>
+          <p:cNvSpPr txBox="1"/>
+          <p:nvPr/>
+        </p:nvSpPr>
+        <p:spPr>
+          <a:xfrm>
+            <a:off x="468922" y="468924"/>
+            <a:ext cx="3004349" cy="707886"/>
+          </a:xfrm>
+          <a:prstGeom prst="rect">
+            <a:avLst/>
+          </a:prstGeom>
+          <a:noFill/>
+        </p:spPr>
+        <p:txBody>
+          <a:bodyPr wrap="none" rtlCol="0">
+            <a:spAutoFit/>
+          </a:bodyPr>
+          <a:lstStyle/>
+          <a:p>
+            <a:r>
+              <a:rPr lang="en-US" sz="4000" dirty="0"/>
+              <a:t>Help with GIT</a:t>
+            </a:r>
+          </a:p>
+        </p:txBody>
+      </p:sp>
+      <p:sp>
+        <p:nvSpPr>
+          <p:cNvPr id="3" name="TextBox 2">
+            <a:extLst>
+              <a:ext uri="{FF2B5EF4-FFF2-40B4-BE49-F238E27FC236}">
+                <a16:creationId xmlns:a16="http://schemas.microsoft.com/office/drawing/2014/main" id="{96CE06DF-98FB-4276-A02C-E3847281EAAD}"/>
+              </a:ext>
+            </a:extLst>
+          </p:cNvPr>
+          <p:cNvSpPr txBox="1"/>
+          <p:nvPr/>
+        </p:nvSpPr>
+        <p:spPr>
+          <a:xfrm>
+            <a:off x="1766277" y="2016369"/>
+            <a:ext cx="8385565" cy="3139321"/>
+          </a:xfrm>
+          <a:prstGeom prst="rect">
+            <a:avLst/>
+          </a:prstGeom>
+          <a:noFill/>
+        </p:spPr>
+        <p:txBody>
+          <a:bodyPr wrap="none" rtlCol="0">
+            <a:spAutoFit/>
+          </a:bodyPr>
+          <a:lstStyle/>
+          <a:p>
+            <a:pPr marL="285750" indent="-285750">
+              <a:buFont typeface="Arial" panose="020B0604020202020204" pitchFamily="34" charset="0"/>
+              <a:buChar char="•"/>
+            </a:pPr>
+            <a:r>
+              <a:rPr lang="en-US" dirty="0"/>
+              <a:t>The git documentation page: </a:t>
+            </a:r>
+            <a:r>
+              <a:rPr lang="en-US" dirty="0">
+                <a:hlinkClick r:id="rId2"/>
+              </a:rPr>
+              <a:t>https://git-scm.com/doc</a:t>
+            </a:r>
+            <a:endParaRPr lang="en-US" dirty="0"/>
+          </a:p>
+          <a:p>
+            <a:pPr marL="742950" lvl="1" indent="-285750">
+              <a:buFont typeface="Arial" panose="020B0604020202020204" pitchFamily="34" charset="0"/>
+              <a:buChar char="•"/>
+            </a:pPr>
+            <a:r>
+              <a:rPr lang="en-US" dirty="0"/>
+              <a:t>The reference manual is the official comprehensive document for all of git.</a:t>
+            </a:r>
+          </a:p>
+          <a:p>
+            <a:pPr marL="742950" lvl="1" indent="-285750">
+              <a:buFont typeface="Arial" panose="020B0604020202020204" pitchFamily="34" charset="0"/>
+              <a:buChar char="•"/>
+            </a:pPr>
+            <a:r>
+              <a:rPr lang="en-US" dirty="0"/>
+              <a:t>The Pro Book is a great place to get started and what this presentation was </a:t>
+            </a:r>
+            <a:br>
+              <a:rPr lang="en-US" dirty="0"/>
+            </a:br>
+            <a:r>
+              <a:rPr lang="en-US" dirty="0"/>
+              <a:t>modeled on.</a:t>
+            </a:r>
+          </a:p>
+          <a:p>
+            <a:pPr marL="742950" lvl="1" indent="-285750">
+              <a:buFont typeface="Arial" panose="020B0604020202020204" pitchFamily="34" charset="0"/>
+              <a:buChar char="•"/>
+            </a:pPr>
+            <a:r>
+              <a:rPr lang="en-US" dirty="0"/>
+              <a:t>There are also videos, cheat sheets, and external links.</a:t>
+            </a:r>
+          </a:p>
+          <a:p>
+            <a:pPr marL="742950" lvl="1" indent="-285750">
+              <a:buFont typeface="Arial" panose="020B0604020202020204" pitchFamily="34" charset="0"/>
+              <a:buChar char="•"/>
+            </a:pPr>
+            <a:endParaRPr lang="en-US" dirty="0"/>
+          </a:p>
+          <a:p>
+            <a:pPr marL="285750" indent="-285750">
+              <a:buFont typeface="Arial" panose="020B0604020202020204" pitchFamily="34" charset="0"/>
+              <a:buChar char="•"/>
+            </a:pPr>
+            <a:r>
+              <a:rPr lang="en-US" dirty="0"/>
+              <a:t>The help command used from the terminal.  This is nice because it works offline.</a:t>
+            </a:r>
+          </a:p>
+          <a:p>
+            <a:pPr marL="742950" lvl="1" indent="-285750">
+              <a:buFont typeface="Arial" panose="020B0604020202020204" pitchFamily="34" charset="0"/>
+              <a:buChar char="•"/>
+            </a:pPr>
+            <a:r>
+              <a:rPr lang="en-US" dirty="0"/>
+              <a:t>git help &lt;command&gt; 		gives the full documentations for the command.</a:t>
+            </a:r>
+          </a:p>
+          <a:p>
+            <a:pPr marL="742950" lvl="1" indent="-285750">
+              <a:buFont typeface="Arial" panose="020B0604020202020204" pitchFamily="34" charset="0"/>
+              <a:buChar char="•"/>
+            </a:pPr>
+            <a:r>
+              <a:rPr lang="en-US" dirty="0"/>
+              <a:t>git &lt;command&gt; -h 		gives a short reference for available options.</a:t>
+            </a:r>
+          </a:p>
+          <a:p>
+            <a:pPr marL="742950" lvl="1" indent="-285750">
+              <a:buFont typeface="Arial" panose="020B0604020202020204" pitchFamily="34" charset="0"/>
+              <a:buChar char="•"/>
+            </a:pPr>
+            <a:endParaRPr lang="en-US" dirty="0"/>
+          </a:p>
+          <a:p>
+            <a:pPr marL="285750" indent="-285750">
+              <a:buFont typeface="Arial" panose="020B0604020202020204" pitchFamily="34" charset="0"/>
+              <a:buChar char="•"/>
+            </a:pPr>
+            <a:r>
+              <a:rPr lang="en-US" dirty="0"/>
+              <a:t>Google </a:t>
+            </a:r>
+            <a:r>
+              <a:rPr lang="en-US" dirty="0">
+                <a:sym typeface="Wingdings" panose="05000000000000000000" pitchFamily="2" charset="2"/>
+              </a:rPr>
+              <a:t></a:t>
+            </a:r>
+            <a:endParaRPr lang="en-US" dirty="0"/>
+          </a:p>
+        </p:txBody>
+      </p:sp>
+    </p:spTree>
+    <p:extLst>
+      <p:ext uri="{BB962C8B-B14F-4D97-AF65-F5344CB8AC3E}">
+        <p14:creationId xmlns:p14="http://schemas.microsoft.com/office/powerpoint/2010/main" val="3139500805"/>
+      </p:ext>
+    </p:extLst>
+  </p:cSld>
+  <p:clrMapOvr>
+    <a:masterClrMapping/>
+  </p:clrMapOvr>
+</p:sld>
+</file>
+
+<file path=ppt/slides/slide6.xml><?xml version="1.0" encoding="utf-8"?>
+<p:sld xmlns:a="http://schemas.openxmlformats.org/drawingml/2006/main" xmlns:r="http://schemas.openxmlformats.org/officeDocument/2006/relationships" xmlns:p="http://schemas.openxmlformats.org/presentationml/2006/main">
+  <p:cSld>
+    <p:spTree>
+      <p:nvGrpSpPr>
+        <p:cNvPr id="1" name=""/>
+        <p:cNvGrpSpPr/>
+        <p:nvPr/>
+      </p:nvGrpSpPr>
+      <p:grpSpPr>
+        <a:xfrm>
+          <a:off x="0" y="0"/>
+          <a:ext cx="0" cy="0"/>
+          <a:chOff x="0" y="0"/>
+          <a:chExt cx="0" cy="0"/>
+        </a:xfrm>
+      </p:grpSpPr>
+      <p:sp>
+        <p:nvSpPr>
+          <p:cNvPr id="2" name="TextBox 1">
+            <a:extLst>
+              <a:ext uri="{FF2B5EF4-FFF2-40B4-BE49-F238E27FC236}">
                 <a16:creationId xmlns:a16="http://schemas.microsoft.com/office/drawing/2014/main" id="{55B00B43-FAAB-4D22-9E01-665E407310BC}"/>
               </a:ext>
             </a:extLst>
@@ -4594,7 +4804,7 @@
 </p:sld>
 </file>
 
-<file path=ppt/slides/slide6.xml><?xml version="1.0" encoding="utf-8"?>
+<file path=ppt/slides/slide7.xml><?xml version="1.0" encoding="utf-8"?>
 <p:sld xmlns:a="http://schemas.openxmlformats.org/drawingml/2006/main" xmlns:r="http://schemas.openxmlformats.org/officeDocument/2006/relationships" xmlns:p="http://schemas.openxmlformats.org/presentationml/2006/main">
   <p:cSld>
     <p:spTree>

</xml_diff>

<commit_message>
Added a start a project slide.
Talk about commands:
    - init
    - add
    - commit
    - status
    - rm
    - mv
as well as the .gitignore file.
</commit_message>
<xml_diff>
--- a/learn-to-git.pptx
+++ b/learn-to-git.pptx
@@ -572,11 +572,202 @@
             </a:r>
           </a:p>
           <a:p>
-            <a:pPr marL="171450" indent="-171450">
+            <a:pPr marL="171450" lvl="0" indent="-171450">
               <a:buFontTx/>
               <a:buChar char="-"/>
             </a:pPr>
-            <a:endParaRPr lang="en-US" dirty="0"/>
+            <a:r>
+              <a:rPr lang="en-US" dirty="0"/>
+              <a:t>Add the script to the repository. </a:t>
+            </a:r>
+          </a:p>
+          <a:p>
+            <a:pPr marL="628650" lvl="1" indent="-171450">
+              <a:buFontTx/>
+              <a:buChar char="-"/>
+            </a:pPr>
+            <a:r>
+              <a:rPr lang="en-US" dirty="0"/>
+              <a:t>Talk about tracked and untracked files.</a:t>
+            </a:r>
+          </a:p>
+          <a:p>
+            <a:pPr marL="628650" lvl="1" indent="-171450">
+              <a:buFontTx/>
+              <a:buChar char="-"/>
+            </a:pPr>
+            <a:r>
+              <a:rPr lang="en-US" dirty="0"/>
+              <a:t>Add a fake data file to the directory, but don’t track it.</a:t>
+            </a:r>
+          </a:p>
+          <a:p>
+            <a:pPr marL="171450" lvl="0" indent="-171450">
+              <a:buFontTx/>
+              <a:buChar char="-"/>
+            </a:pPr>
+            <a:r>
+              <a:rPr lang="en-US" dirty="0"/>
+              <a:t>Commit the addition/initial commit.</a:t>
+            </a:r>
+          </a:p>
+          <a:p>
+            <a:pPr marL="628650" lvl="1" indent="-171450">
+              <a:buFontTx/>
+              <a:buChar char="-"/>
+            </a:pPr>
+            <a:r>
+              <a:rPr lang="en-US" dirty="0"/>
+              <a:t>Talk about the –m option</a:t>
+            </a:r>
+          </a:p>
+          <a:p>
+            <a:pPr marL="171450" lvl="0" indent="-171450">
+              <a:buFontTx/>
+              <a:buChar char="-"/>
+            </a:pPr>
+            <a:r>
+              <a:rPr lang="en-US" dirty="0"/>
+              <a:t>Introduce git status</a:t>
+            </a:r>
+          </a:p>
+          <a:p>
+            <a:pPr marL="628650" lvl="1" indent="-171450">
+              <a:buFontTx/>
+              <a:buChar char="-"/>
+            </a:pPr>
+            <a:r>
+              <a:rPr lang="en-US" dirty="0"/>
+              <a:t>Run git status right after commit.</a:t>
+            </a:r>
+          </a:p>
+          <a:p>
+            <a:pPr marL="628650" lvl="1" indent="-171450">
+              <a:buFontTx/>
+              <a:buChar char="-"/>
+            </a:pPr>
+            <a:r>
+              <a:rPr lang="en-US" dirty="0"/>
+              <a:t>Make changes to the script.</a:t>
+            </a:r>
+          </a:p>
+          <a:p>
+            <a:pPr marL="628650" lvl="1" indent="-171450">
+              <a:buFontTx/>
+              <a:buChar char="-"/>
+            </a:pPr>
+            <a:r>
+              <a:rPr lang="en-US" dirty="0"/>
+              <a:t>Run git status again.</a:t>
+            </a:r>
+          </a:p>
+          <a:p>
+            <a:pPr marL="628650" lvl="1" indent="-171450">
+              <a:buFontTx/>
+              <a:buChar char="-"/>
+            </a:pPr>
+            <a:r>
+              <a:rPr lang="en-US" dirty="0"/>
+              <a:t>Add the script to staged area.</a:t>
+            </a:r>
+          </a:p>
+          <a:p>
+            <a:pPr marL="628650" lvl="1" indent="-171450">
+              <a:buFontTx/>
+              <a:buChar char="-"/>
+            </a:pPr>
+            <a:r>
+              <a:rPr lang="en-US" dirty="0"/>
+              <a:t>Run git status again.</a:t>
+            </a:r>
+          </a:p>
+          <a:p>
+            <a:pPr marL="628650" lvl="1" indent="-171450">
+              <a:buFontTx/>
+              <a:buChar char="-"/>
+            </a:pPr>
+            <a:r>
+              <a:rPr lang="en-US" dirty="0"/>
+              <a:t>Commit changes.</a:t>
+            </a:r>
+          </a:p>
+          <a:p>
+            <a:pPr marL="171450" lvl="0" indent="-171450">
+              <a:buFontTx/>
+              <a:buChar char="-"/>
+            </a:pPr>
+            <a:r>
+              <a:rPr lang="en-US" dirty="0"/>
+              <a:t>Talk about the lifecycle of the status of files.</a:t>
+            </a:r>
+          </a:p>
+          <a:p>
+            <a:pPr marL="171450" lvl="0" indent="-171450">
+              <a:buFontTx/>
+              <a:buChar char="-"/>
+            </a:pPr>
+            <a:r>
+              <a:rPr lang="en-US" dirty="0"/>
+              <a:t>Talk about good committing practices.</a:t>
+            </a:r>
+          </a:p>
+          <a:p>
+            <a:pPr marL="628650" lvl="1" indent="-171450">
+              <a:buFontTx/>
+              <a:buChar char="-"/>
+            </a:pPr>
+            <a:r>
+              <a:rPr lang="en-US" dirty="0"/>
+              <a:t>Committing completed code (break code into small chunks and commit each separately)</a:t>
+            </a:r>
+          </a:p>
+          <a:p>
+            <a:pPr marL="628650" lvl="1" indent="-171450">
+              <a:buFontTx/>
+              <a:buChar char="-"/>
+            </a:pPr>
+            <a:r>
+              <a:rPr lang="en-US" dirty="0"/>
+              <a:t>Commit in the imperative, telling what the code will do after the commit not what you’ve done.</a:t>
+            </a:r>
+          </a:p>
+          <a:p>
+            <a:pPr marL="628650" lvl="1" indent="-171450">
+              <a:buFontTx/>
+              <a:buChar char="-"/>
+            </a:pPr>
+            <a:r>
+              <a:rPr lang="en-US" dirty="0"/>
+              <a:t>Introduce a .</a:t>
+            </a:r>
+            <a:r>
+              <a:rPr lang="en-US" dirty="0" err="1"/>
+              <a:t>gitignore</a:t>
+            </a:r>
+            <a:r>
+              <a:rPr lang="en-US" dirty="0"/>
+              <a:t> file</a:t>
+            </a:r>
+          </a:p>
+          <a:p>
+            <a:pPr marL="1085850" lvl="2" indent="-171450">
+              <a:buFontTx/>
+              <a:buChar char="-"/>
+            </a:pPr>
+            <a:r>
+              <a:rPr lang="en-US" dirty="0"/>
+              <a:t>Blank lines and lines starting with # are ignored</a:t>
+            </a:r>
+          </a:p>
+          <a:p>
+            <a:pPr marL="1085850" lvl="2" indent="-171450">
+              <a:buFontTx/>
+              <a:buChar char="-"/>
+            </a:pPr>
+            <a:r>
+              <a:rPr lang="en-US" dirty="0"/>
+              <a:t>Standard glob patterns work (look at documentation for more information)</a:t>
+            </a:r>
           </a:p>
         </p:txBody>
       </p:sp>
@@ -4788,6 +4979,115 @@
               <a:rPr lang="en-US" sz="4000" dirty="0"/>
               <a:t>Start a project…</a:t>
             </a:r>
+          </a:p>
+        </p:txBody>
+      </p:sp>
+      <p:sp>
+        <p:nvSpPr>
+          <p:cNvPr id="3" name="TextBox 2">
+            <a:extLst>
+              <a:ext uri="{FF2B5EF4-FFF2-40B4-BE49-F238E27FC236}">
+                <a16:creationId xmlns:a16="http://schemas.microsoft.com/office/drawing/2014/main" id="{44BD550A-B530-4921-8428-01A27B6ED9C1}"/>
+              </a:ext>
+            </a:extLst>
+          </p:cNvPr>
+          <p:cNvSpPr txBox="1"/>
+          <p:nvPr/>
+        </p:nvSpPr>
+        <p:spPr>
+          <a:xfrm>
+            <a:off x="2188308" y="2586892"/>
+            <a:ext cx="3555140" cy="2031325"/>
+          </a:xfrm>
+          <a:prstGeom prst="rect">
+            <a:avLst/>
+          </a:prstGeom>
+          <a:noFill/>
+        </p:spPr>
+        <p:txBody>
+          <a:bodyPr wrap="none" rtlCol="0">
+            <a:spAutoFit/>
+          </a:bodyPr>
+          <a:lstStyle/>
+          <a:p>
+            <a:pPr marL="285750" indent="-285750">
+              <a:buFont typeface="Arial" panose="020B0604020202020204" pitchFamily="34" charset="0"/>
+              <a:buChar char="•"/>
+            </a:pPr>
+            <a:r>
+              <a:rPr lang="en-US" dirty="0"/>
+              <a:t>git </a:t>
+            </a:r>
+            <a:r>
+              <a:rPr lang="en-US" dirty="0" err="1"/>
+              <a:t>init</a:t>
+            </a:r>
+            <a:r>
+              <a:rPr lang="en-US" dirty="0"/>
+              <a:t> </a:t>
+            </a:r>
+          </a:p>
+          <a:p>
+            <a:pPr marL="285750" indent="-285750">
+              <a:buFont typeface="Arial" panose="020B0604020202020204" pitchFamily="34" charset="0"/>
+              <a:buChar char="•"/>
+            </a:pPr>
+            <a:r>
+              <a:rPr lang="en-US" dirty="0"/>
+              <a:t>git add &lt;file&gt;</a:t>
+            </a:r>
+          </a:p>
+          <a:p>
+            <a:pPr marL="285750" indent="-285750">
+              <a:buFont typeface="Arial" panose="020B0604020202020204" pitchFamily="34" charset="0"/>
+              <a:buChar char="•"/>
+            </a:pPr>
+            <a:r>
+              <a:rPr lang="en-US" dirty="0"/>
+              <a:t>git commit (-m “message” -v  -a )</a:t>
+            </a:r>
+          </a:p>
+          <a:p>
+            <a:pPr marL="285750" indent="-285750">
+              <a:buFont typeface="Arial" panose="020B0604020202020204" pitchFamily="34" charset="0"/>
+              <a:buChar char="•"/>
+            </a:pPr>
+            <a:r>
+              <a:rPr lang="en-US" dirty="0"/>
+              <a:t>git status</a:t>
+            </a:r>
+          </a:p>
+          <a:p>
+            <a:pPr marL="285750" indent="-285750">
+              <a:buFont typeface="Arial" panose="020B0604020202020204" pitchFamily="34" charset="0"/>
+              <a:buChar char="•"/>
+            </a:pPr>
+            <a:r>
+              <a:rPr lang="en-US" dirty="0"/>
+              <a:t>git rm (-f) </a:t>
+            </a:r>
+          </a:p>
+          <a:p>
+            <a:pPr marL="285750" indent="-285750">
+              <a:buFont typeface="Arial" panose="020B0604020202020204" pitchFamily="34" charset="0"/>
+              <a:buChar char="•"/>
+            </a:pPr>
+            <a:r>
+              <a:rPr lang="en-US" dirty="0"/>
+              <a:t>git </a:t>
+            </a:r>
+            <a:r>
+              <a:rPr lang="en-US"/>
+              <a:t>mv &lt;file from&gt; &lt;file to&gt;</a:t>
+            </a:r>
+            <a:endParaRPr lang="en-US" dirty="0"/>
+          </a:p>
+          <a:p>
+            <a:pPr marL="285750" indent="-285750">
+              <a:buFont typeface="Arial" panose="020B0604020202020204" pitchFamily="34" charset="0"/>
+              <a:buChar char="•"/>
+            </a:pPr>
+            <a:endParaRPr lang="en-US" dirty="0"/>
           </a:p>
         </p:txBody>
       </p:sp>

</xml_diff>

<commit_message>
added a slide for solo work flow
</commit_message>
<xml_diff>
--- a/learn-to-git.pptx
+++ b/learn-to-git.pptx
@@ -7,7 +7,8 @@
   <p:sldIdLst>
     <p:sldId id="256" r:id="rId2"/>
     <p:sldId id="257" r:id="rId3"/>
-    <p:sldId id="258" r:id="rId4"/>
+    <p:sldId id="259" r:id="rId4"/>
+    <p:sldId id="258" r:id="rId5"/>
   </p:sldIdLst>
   <p:sldSz cx="12192000" cy="6858000"/>
   <p:notesSz cx="6858000" cy="9144000"/>
@@ -3510,13 +3511,8 @@
           <a:p>
             <a:r>
               <a:rPr lang="en-US" dirty="0" smtClean="0"/>
-              <a:t>Demo </a:t>
-            </a:r>
-            <a:r>
-              <a:rPr lang="en-US" smtClean="0"/>
-              <a:t>for the code</a:t>
-            </a:r>
-            <a:endParaRPr lang="en-US" dirty="0" smtClean="0"/>
+              <a:t>Demo for the code</a:t>
+            </a:r>
           </a:p>
           <a:p>
             <a:pPr lvl="1"/>
@@ -3548,6 +3544,13 @@
   <p:clrMapOvr>
     <a:masterClrMapping/>
   </p:clrMapOvr>
+  <p:timing>
+    <p:tnLst>
+      <p:par>
+        <p:cTn id="1" dur="indefinite" restart="never" nodeType="tmRoot"/>
+      </p:par>
+    </p:tnLst>
+  </p:timing>
 </p:sld>
 </file>
 
@@ -3583,18 +3586,184 @@
           <a:bodyPr/>
           <a:lstStyle/>
           <a:p>
-            <a:endParaRPr lang="en-US"/>
-          </a:p>
-        </p:txBody>
-      </p:sp>
-      <p:sp>
-        <p:nvSpPr>
-          <p:cNvPr id="3" name="Content Placeholder 2"/>
-          <p:cNvSpPr>
-            <a:spLocks noGrp="1"/>
-          </p:cNvSpPr>
-          <p:nvPr>
-            <p:ph idx="1"/>
+            <a:r>
+              <a:rPr lang="en-US" dirty="0" smtClean="0"/>
+              <a:t>What’s a workflow?</a:t>
+            </a:r>
+            <a:endParaRPr lang="en-US" dirty="0"/>
+          </a:p>
+        </p:txBody>
+      </p:sp>
+      <p:sp>
+        <p:nvSpPr>
+          <p:cNvPr id="4" name="TextBox 3"/>
+          <p:cNvSpPr txBox="1"/>
+          <p:nvPr/>
+        </p:nvSpPr>
+        <p:spPr>
+          <a:xfrm>
+            <a:off x="1208314" y="1690688"/>
+            <a:ext cx="5182381" cy="1200329"/>
+          </a:xfrm>
+          <a:prstGeom prst="rect">
+            <a:avLst/>
+          </a:prstGeom>
+          <a:noFill/>
+        </p:spPr>
+        <p:txBody>
+          <a:bodyPr wrap="none" rtlCol="0">
+            <a:spAutoFit/>
+          </a:bodyPr>
+          <a:lstStyle/>
+          <a:p>
+            <a:pPr marL="285750" indent="-285750">
+              <a:buFontTx/>
+              <a:buChar char="-"/>
+            </a:pPr>
+            <a:r>
+              <a:rPr lang="en-US" sz="2400" dirty="0" smtClean="0"/>
+              <a:t>Sequence of work, from start to finish</a:t>
+            </a:r>
+          </a:p>
+          <a:p>
+            <a:pPr marL="285750" indent="-285750">
+              <a:buFontTx/>
+              <a:buChar char="-"/>
+            </a:pPr>
+            <a:endParaRPr lang="en-US" sz="2400" dirty="0"/>
+          </a:p>
+          <a:p>
+            <a:pPr marL="285750" indent="-285750">
+              <a:buFontTx/>
+              <a:buChar char="-"/>
+            </a:pPr>
+            <a:endParaRPr lang="en-US" sz="2400" dirty="0"/>
+          </a:p>
+        </p:txBody>
+      </p:sp>
+      <p:sp>
+        <p:nvSpPr>
+          <p:cNvPr id="5" name="TextBox 4"/>
+          <p:cNvSpPr txBox="1"/>
+          <p:nvPr/>
+        </p:nvSpPr>
+        <p:spPr>
+          <a:xfrm>
+            <a:off x="963386" y="2571531"/>
+            <a:ext cx="5039008" cy="707886"/>
+          </a:xfrm>
+          <a:prstGeom prst="rect">
+            <a:avLst/>
+          </a:prstGeom>
+          <a:noFill/>
+        </p:spPr>
+        <p:txBody>
+          <a:bodyPr wrap="none" rtlCol="0">
+            <a:spAutoFit/>
+          </a:bodyPr>
+          <a:lstStyle/>
+          <a:p>
+            <a:r>
+              <a:rPr lang="en-US" sz="4000" dirty="0" smtClean="0">
+                <a:latin typeface="+mj-lt"/>
+              </a:rPr>
+              <a:t>How do we take notes?</a:t>
+            </a:r>
+            <a:endParaRPr lang="en-US" sz="4000" dirty="0">
+              <a:latin typeface="+mj-lt"/>
+            </a:endParaRPr>
+          </a:p>
+        </p:txBody>
+      </p:sp>
+      <p:sp>
+        <p:nvSpPr>
+          <p:cNvPr id="6" name="TextBox 5"/>
+          <p:cNvSpPr txBox="1"/>
+          <p:nvPr/>
+        </p:nvSpPr>
+        <p:spPr>
+          <a:xfrm>
+            <a:off x="1208314" y="3526971"/>
+            <a:ext cx="6847900" cy="646331"/>
+          </a:xfrm>
+          <a:prstGeom prst="rect">
+            <a:avLst/>
+          </a:prstGeom>
+          <a:noFill/>
+        </p:spPr>
+        <p:txBody>
+          <a:bodyPr wrap="none" rtlCol="0">
+            <a:spAutoFit/>
+          </a:bodyPr>
+          <a:lstStyle/>
+          <a:p>
+            <a:pPr marL="285750" indent="-285750">
+              <a:buFontTx/>
+              <a:buChar char="-"/>
+            </a:pPr>
+            <a:r>
+              <a:rPr lang="en-US" dirty="0" smtClean="0"/>
+              <a:t>Take best notes, without any mistakes</a:t>
+            </a:r>
+          </a:p>
+          <a:p>
+            <a:pPr marL="285750" indent="-285750">
+              <a:buFontTx/>
+              <a:buChar char="-"/>
+            </a:pPr>
+            <a:r>
+              <a:rPr lang="en-US" dirty="0" smtClean="0"/>
+              <a:t>Take notes, with mistakes and only transfer the ‘correct’ information</a:t>
+            </a:r>
+            <a:endParaRPr lang="en-US" dirty="0"/>
+          </a:p>
+        </p:txBody>
+      </p:sp>
+    </p:spTree>
+    <p:extLst>
+      <p:ext uri="{BB962C8B-B14F-4D97-AF65-F5344CB8AC3E}">
+        <p14:creationId xmlns:p14="http://schemas.microsoft.com/office/powerpoint/2010/main" val="1789842367"/>
+      </p:ext>
+    </p:extLst>
+  </p:cSld>
+  <p:clrMapOvr>
+    <a:masterClrMapping/>
+  </p:clrMapOvr>
+  <p:timing>
+    <p:tnLst>
+      <p:par>
+        <p:cTn id="1" dur="indefinite" restart="never" nodeType="tmRoot"/>
+      </p:par>
+    </p:tnLst>
+  </p:timing>
+</p:sld>
+</file>
+
+<file path=ppt/slides/slide4.xml><?xml version="1.0" encoding="utf-8"?>
+<p:sld xmlns:a="http://schemas.openxmlformats.org/drawingml/2006/main" xmlns:r="http://schemas.openxmlformats.org/officeDocument/2006/relationships" xmlns:p="http://schemas.openxmlformats.org/presentationml/2006/main">
+  <p:cSld>
+    <p:spTree>
+      <p:nvGrpSpPr>
+        <p:cNvPr id="1" name=""/>
+        <p:cNvGrpSpPr/>
+        <p:nvPr/>
+      </p:nvGrpSpPr>
+      <p:grpSpPr>
+        <a:xfrm>
+          <a:off x="0" y="0"/>
+          <a:ext cx="0" cy="0"/>
+          <a:chOff x="0" y="0"/>
+          <a:chExt cx="0" cy="0"/>
+        </a:xfrm>
+      </p:grpSpPr>
+      <p:sp>
+        <p:nvSpPr>
+          <p:cNvPr id="2" name="Title 1"/>
+          <p:cNvSpPr>
+            <a:spLocks noGrp="1"/>
+          </p:cNvSpPr>
+          <p:nvPr>
+            <p:ph type="title"/>
           </p:nvPr>
         </p:nvSpPr>
         <p:spPr/>
@@ -3602,7 +3771,733 @@
           <a:bodyPr/>
           <a:lstStyle/>
           <a:p>
-            <a:endParaRPr lang="en-US"/>
+            <a:r>
+              <a:rPr lang="en-US" dirty="0" smtClean="0"/>
+              <a:t>Solo Workflow</a:t>
+            </a:r>
+            <a:endParaRPr lang="en-US" dirty="0"/>
+          </a:p>
+        </p:txBody>
+      </p:sp>
+      <p:sp>
+        <p:nvSpPr>
+          <p:cNvPr id="4" name="TextBox 3"/>
+          <p:cNvSpPr txBox="1"/>
+          <p:nvPr/>
+        </p:nvSpPr>
+        <p:spPr>
+          <a:xfrm>
+            <a:off x="1159329" y="1732190"/>
+            <a:ext cx="1592231" cy="646331"/>
+          </a:xfrm>
+          <a:prstGeom prst="rect">
+            <a:avLst/>
+          </a:prstGeom>
+          <a:noFill/>
+        </p:spPr>
+        <p:txBody>
+          <a:bodyPr wrap="none" rtlCol="0">
+            <a:spAutoFit/>
+          </a:bodyPr>
+          <a:lstStyle/>
+          <a:p>
+            <a:r>
+              <a:rPr lang="en-US" sz="3600" dirty="0" smtClean="0"/>
+              <a:t>Branch </a:t>
+            </a:r>
+            <a:endParaRPr lang="en-US" sz="3600" dirty="0"/>
+          </a:p>
+        </p:txBody>
+      </p:sp>
+      <p:sp>
+        <p:nvSpPr>
+          <p:cNvPr id="5" name="TextBox 4"/>
+          <p:cNvSpPr txBox="1"/>
+          <p:nvPr/>
+        </p:nvSpPr>
+        <p:spPr>
+          <a:xfrm>
+            <a:off x="4920343" y="1690688"/>
+            <a:ext cx="2653740" cy="646331"/>
+          </a:xfrm>
+          <a:prstGeom prst="rect">
+            <a:avLst/>
+          </a:prstGeom>
+          <a:noFill/>
+        </p:spPr>
+        <p:txBody>
+          <a:bodyPr wrap="none" rtlCol="0">
+            <a:spAutoFit/>
+          </a:bodyPr>
+          <a:lstStyle/>
+          <a:p>
+            <a:r>
+              <a:rPr lang="en-US" sz="3600" dirty="0" smtClean="0"/>
+              <a:t>Local master </a:t>
+            </a:r>
+            <a:endParaRPr lang="en-US" sz="3600" dirty="0"/>
+          </a:p>
+        </p:txBody>
+      </p:sp>
+      <p:sp>
+        <p:nvSpPr>
+          <p:cNvPr id="6" name="TextBox 5"/>
+          <p:cNvSpPr txBox="1"/>
+          <p:nvPr/>
+        </p:nvSpPr>
+        <p:spPr>
+          <a:xfrm>
+            <a:off x="9002486" y="1690688"/>
+            <a:ext cx="2941318" cy="646331"/>
+          </a:xfrm>
+          <a:prstGeom prst="rect">
+            <a:avLst/>
+          </a:prstGeom>
+          <a:noFill/>
+        </p:spPr>
+        <p:txBody>
+          <a:bodyPr wrap="none" rtlCol="0">
+            <a:spAutoFit/>
+          </a:bodyPr>
+          <a:lstStyle/>
+          <a:p>
+            <a:r>
+              <a:rPr lang="en-US" sz="3600" dirty="0" smtClean="0"/>
+              <a:t>Origin master </a:t>
+            </a:r>
+            <a:endParaRPr lang="en-US" sz="3600" dirty="0"/>
+          </a:p>
+        </p:txBody>
+      </p:sp>
+      <p:cxnSp>
+        <p:nvCxnSpPr>
+          <p:cNvPr id="8" name="Straight Connector 7"/>
+          <p:cNvCxnSpPr/>
+          <p:nvPr/>
+        </p:nvCxnSpPr>
+        <p:spPr>
+          <a:xfrm>
+            <a:off x="1955444" y="2514600"/>
+            <a:ext cx="0" cy="4163786"/>
+          </a:xfrm>
+          <a:prstGeom prst="line">
+            <a:avLst/>
+          </a:prstGeom>
+        </p:spPr>
+        <p:style>
+          <a:lnRef idx="1">
+            <a:schemeClr val="accent1"/>
+          </a:lnRef>
+          <a:fillRef idx="0">
+            <a:schemeClr val="accent1"/>
+          </a:fillRef>
+          <a:effectRef idx="0">
+            <a:schemeClr val="accent1"/>
+          </a:effectRef>
+          <a:fontRef idx="minor">
+            <a:schemeClr val="tx1"/>
+          </a:fontRef>
+        </p:style>
+      </p:cxnSp>
+      <p:cxnSp>
+        <p:nvCxnSpPr>
+          <p:cNvPr id="9" name="Straight Connector 8"/>
+          <p:cNvCxnSpPr/>
+          <p:nvPr/>
+        </p:nvCxnSpPr>
+        <p:spPr>
+          <a:xfrm>
+            <a:off x="6141003" y="2514600"/>
+            <a:ext cx="0" cy="4163786"/>
+          </a:xfrm>
+          <a:prstGeom prst="line">
+            <a:avLst/>
+          </a:prstGeom>
+        </p:spPr>
+        <p:style>
+          <a:lnRef idx="1">
+            <a:schemeClr val="accent1"/>
+          </a:lnRef>
+          <a:fillRef idx="0">
+            <a:schemeClr val="accent1"/>
+          </a:fillRef>
+          <a:effectRef idx="0">
+            <a:schemeClr val="accent1"/>
+          </a:effectRef>
+          <a:fontRef idx="minor">
+            <a:schemeClr val="tx1"/>
+          </a:fontRef>
+        </p:style>
+      </p:cxnSp>
+      <p:cxnSp>
+        <p:nvCxnSpPr>
+          <p:cNvPr id="10" name="Straight Connector 9"/>
+          <p:cNvCxnSpPr/>
+          <p:nvPr/>
+        </p:nvCxnSpPr>
+        <p:spPr>
+          <a:xfrm>
+            <a:off x="10474603" y="2378521"/>
+            <a:ext cx="0" cy="4163786"/>
+          </a:xfrm>
+          <a:prstGeom prst="line">
+            <a:avLst/>
+          </a:prstGeom>
+        </p:spPr>
+        <p:style>
+          <a:lnRef idx="1">
+            <a:schemeClr val="accent1"/>
+          </a:lnRef>
+          <a:fillRef idx="0">
+            <a:schemeClr val="accent1"/>
+          </a:fillRef>
+          <a:effectRef idx="0">
+            <a:schemeClr val="accent1"/>
+          </a:effectRef>
+          <a:fontRef idx="minor">
+            <a:schemeClr val="tx1"/>
+          </a:fontRef>
+        </p:style>
+      </p:cxnSp>
+      <p:grpSp>
+        <p:nvGrpSpPr>
+          <p:cNvPr id="28" name="Group 27"/>
+          <p:cNvGrpSpPr/>
+          <p:nvPr/>
+        </p:nvGrpSpPr>
+        <p:grpSpPr>
+          <a:xfrm>
+            <a:off x="1955444" y="2792179"/>
+            <a:ext cx="681813" cy="1045028"/>
+            <a:chOff x="1955444" y="3069771"/>
+            <a:chExt cx="681813" cy="1045028"/>
+          </a:xfrm>
+        </p:grpSpPr>
+        <p:cxnSp>
+          <p:nvCxnSpPr>
+            <p:cNvPr id="14" name="Straight Connector 13"/>
+            <p:cNvCxnSpPr/>
+            <p:nvPr/>
+          </p:nvCxnSpPr>
+          <p:spPr>
+            <a:xfrm>
+              <a:off x="1955444" y="3102429"/>
+              <a:ext cx="673456" cy="0"/>
+            </a:xfrm>
+            <a:prstGeom prst="line">
+              <a:avLst/>
+            </a:prstGeom>
+          </p:spPr>
+          <p:style>
+            <a:lnRef idx="1">
+              <a:schemeClr val="accent1"/>
+            </a:lnRef>
+            <a:fillRef idx="0">
+              <a:schemeClr val="accent1"/>
+            </a:fillRef>
+            <a:effectRef idx="0">
+              <a:schemeClr val="accent1"/>
+            </a:effectRef>
+            <a:fontRef idx="minor">
+              <a:schemeClr val="tx1"/>
+            </a:fontRef>
+          </p:style>
+        </p:cxnSp>
+        <p:cxnSp>
+          <p:nvCxnSpPr>
+            <p:cNvPr id="16" name="Straight Connector 15"/>
+            <p:cNvCxnSpPr/>
+            <p:nvPr/>
+          </p:nvCxnSpPr>
+          <p:spPr>
+            <a:xfrm>
+              <a:off x="2637257" y="3069771"/>
+              <a:ext cx="0" cy="1045028"/>
+            </a:xfrm>
+            <a:prstGeom prst="line">
+              <a:avLst/>
+            </a:prstGeom>
+          </p:spPr>
+          <p:style>
+            <a:lnRef idx="1">
+              <a:schemeClr val="accent1"/>
+            </a:lnRef>
+            <a:fillRef idx="0">
+              <a:schemeClr val="accent1"/>
+            </a:fillRef>
+            <a:effectRef idx="0">
+              <a:schemeClr val="accent1"/>
+            </a:effectRef>
+            <a:fontRef idx="minor">
+              <a:schemeClr val="tx1"/>
+            </a:fontRef>
+          </p:style>
+        </p:cxnSp>
+        <p:cxnSp>
+          <p:nvCxnSpPr>
+            <p:cNvPr id="18" name="Straight Arrow Connector 17"/>
+            <p:cNvCxnSpPr/>
+            <p:nvPr/>
+          </p:nvCxnSpPr>
+          <p:spPr>
+            <a:xfrm flipH="1">
+              <a:off x="1955444" y="4098471"/>
+              <a:ext cx="673456" cy="0"/>
+            </a:xfrm>
+            <a:prstGeom prst="straightConnector1">
+              <a:avLst/>
+            </a:prstGeom>
+            <a:ln>
+              <a:tailEnd type="triangle"/>
+            </a:ln>
+          </p:spPr>
+          <p:style>
+            <a:lnRef idx="1">
+              <a:schemeClr val="accent1"/>
+            </a:lnRef>
+            <a:fillRef idx="0">
+              <a:schemeClr val="accent1"/>
+            </a:fillRef>
+            <a:effectRef idx="0">
+              <a:schemeClr val="accent1"/>
+            </a:effectRef>
+            <a:fontRef idx="minor">
+              <a:schemeClr val="tx1"/>
+            </a:fontRef>
+          </p:style>
+        </p:cxnSp>
+      </p:grpSp>
+      <p:sp>
+        <p:nvSpPr>
+          <p:cNvPr id="19" name="TextBox 18"/>
+          <p:cNvSpPr txBox="1"/>
+          <p:nvPr/>
+        </p:nvSpPr>
+        <p:spPr>
+          <a:xfrm>
+            <a:off x="2704318" y="2952348"/>
+            <a:ext cx="1229504" cy="646331"/>
+          </a:xfrm>
+          <a:prstGeom prst="rect">
+            <a:avLst/>
+          </a:prstGeom>
+          <a:noFill/>
+        </p:spPr>
+        <p:txBody>
+          <a:bodyPr wrap="none" rtlCol="0">
+            <a:spAutoFit/>
+          </a:bodyPr>
+          <a:lstStyle/>
+          <a:p>
+            <a:r>
+              <a:rPr lang="en-US" dirty="0" err="1" smtClean="0"/>
+              <a:t>Git</a:t>
+            </a:r>
+            <a:r>
+              <a:rPr lang="en-US" dirty="0" smtClean="0"/>
+              <a:t> add</a:t>
+            </a:r>
+          </a:p>
+          <a:p>
+            <a:r>
+              <a:rPr lang="en-US" dirty="0" err="1" smtClean="0"/>
+              <a:t>Git</a:t>
+            </a:r>
+            <a:r>
+              <a:rPr lang="en-US" dirty="0" smtClean="0"/>
+              <a:t> commit</a:t>
+            </a:r>
+            <a:endParaRPr lang="en-US" dirty="0"/>
+          </a:p>
+        </p:txBody>
+      </p:sp>
+      <p:cxnSp>
+        <p:nvCxnSpPr>
+          <p:cNvPr id="21" name="Straight Arrow Connector 20"/>
+          <p:cNvCxnSpPr/>
+          <p:nvPr/>
+        </p:nvCxnSpPr>
+        <p:spPr>
+          <a:xfrm>
+            <a:off x="2008805" y="4155622"/>
+            <a:ext cx="4132198" cy="0"/>
+          </a:xfrm>
+          <a:prstGeom prst="straightConnector1">
+            <a:avLst/>
+          </a:prstGeom>
+          <a:ln>
+            <a:tailEnd type="triangle"/>
+          </a:ln>
+        </p:spPr>
+        <p:style>
+          <a:lnRef idx="1">
+            <a:schemeClr val="accent1"/>
+          </a:lnRef>
+          <a:fillRef idx="0">
+            <a:schemeClr val="accent1"/>
+          </a:fillRef>
+          <a:effectRef idx="0">
+            <a:schemeClr val="accent1"/>
+          </a:effectRef>
+          <a:fontRef idx="minor">
+            <a:schemeClr val="tx1"/>
+          </a:fontRef>
+        </p:style>
+      </p:cxnSp>
+      <p:cxnSp>
+        <p:nvCxnSpPr>
+          <p:cNvPr id="22" name="Straight Arrow Connector 21"/>
+          <p:cNvCxnSpPr/>
+          <p:nvPr/>
+        </p:nvCxnSpPr>
+        <p:spPr>
+          <a:xfrm>
+            <a:off x="6247213" y="6365422"/>
+            <a:ext cx="4132198" cy="0"/>
+          </a:xfrm>
+          <a:prstGeom prst="straightConnector1">
+            <a:avLst/>
+          </a:prstGeom>
+          <a:ln>
+            <a:tailEnd type="triangle"/>
+          </a:ln>
+        </p:spPr>
+        <p:style>
+          <a:lnRef idx="1">
+            <a:schemeClr val="accent1"/>
+          </a:lnRef>
+          <a:fillRef idx="0">
+            <a:schemeClr val="accent1"/>
+          </a:fillRef>
+          <a:effectRef idx="0">
+            <a:schemeClr val="accent1"/>
+          </a:effectRef>
+          <a:fontRef idx="minor">
+            <a:schemeClr val="tx1"/>
+          </a:fontRef>
+        </p:style>
+      </p:cxnSp>
+      <p:sp>
+        <p:nvSpPr>
+          <p:cNvPr id="23" name="TextBox 22"/>
+          <p:cNvSpPr txBox="1"/>
+          <p:nvPr/>
+        </p:nvSpPr>
+        <p:spPr>
+          <a:xfrm>
+            <a:off x="2452376" y="2366666"/>
+            <a:ext cx="1521827" cy="369332"/>
+          </a:xfrm>
+          <a:prstGeom prst="rect">
+            <a:avLst/>
+          </a:prstGeom>
+          <a:noFill/>
+        </p:spPr>
+        <p:txBody>
+          <a:bodyPr wrap="none" rtlCol="0">
+            <a:spAutoFit/>
+          </a:bodyPr>
+          <a:lstStyle/>
+          <a:p>
+            <a:r>
+              <a:rPr lang="en-US" dirty="0" smtClean="0"/>
+              <a:t>Make changes</a:t>
+            </a:r>
+            <a:endParaRPr lang="en-US" dirty="0"/>
+          </a:p>
+        </p:txBody>
+      </p:sp>
+      <p:sp>
+        <p:nvSpPr>
+          <p:cNvPr id="24" name="TextBox 23"/>
+          <p:cNvSpPr txBox="1"/>
+          <p:nvPr/>
+        </p:nvSpPr>
+        <p:spPr>
+          <a:xfrm>
+            <a:off x="7917417" y="5996090"/>
+            <a:ext cx="646331" cy="369332"/>
+          </a:xfrm>
+          <a:prstGeom prst="rect">
+            <a:avLst/>
+          </a:prstGeom>
+          <a:noFill/>
+        </p:spPr>
+        <p:txBody>
+          <a:bodyPr wrap="none" rtlCol="0">
+            <a:spAutoFit/>
+          </a:bodyPr>
+          <a:lstStyle/>
+          <a:p>
+            <a:r>
+              <a:rPr lang="en-US" b="1" dirty="0" smtClean="0"/>
+              <a:t>Push</a:t>
+            </a:r>
+            <a:endParaRPr lang="en-US" b="1" dirty="0"/>
+          </a:p>
+        </p:txBody>
+      </p:sp>
+      <p:cxnSp>
+        <p:nvCxnSpPr>
+          <p:cNvPr id="26" name="Straight Arrow Connector 25"/>
+          <p:cNvCxnSpPr/>
+          <p:nvPr/>
+        </p:nvCxnSpPr>
+        <p:spPr>
+          <a:xfrm flipH="1">
+            <a:off x="6201665" y="4442527"/>
+            <a:ext cx="4124897" cy="10511"/>
+          </a:xfrm>
+          <a:prstGeom prst="straightConnector1">
+            <a:avLst/>
+          </a:prstGeom>
+          <a:ln>
+            <a:tailEnd type="triangle"/>
+          </a:ln>
+        </p:spPr>
+        <p:style>
+          <a:lnRef idx="1">
+            <a:schemeClr val="accent1"/>
+          </a:lnRef>
+          <a:fillRef idx="0">
+            <a:schemeClr val="accent1"/>
+          </a:fillRef>
+          <a:effectRef idx="0">
+            <a:schemeClr val="accent1"/>
+          </a:effectRef>
+          <a:fontRef idx="minor">
+            <a:schemeClr val="tx1"/>
+          </a:fontRef>
+        </p:style>
+      </p:cxnSp>
+      <p:sp>
+        <p:nvSpPr>
+          <p:cNvPr id="27" name="TextBox 26"/>
+          <p:cNvSpPr txBox="1"/>
+          <p:nvPr/>
+        </p:nvSpPr>
+        <p:spPr>
+          <a:xfrm>
+            <a:off x="7970315" y="4004578"/>
+            <a:ext cx="543739" cy="369332"/>
+          </a:xfrm>
+          <a:prstGeom prst="rect">
+            <a:avLst/>
+          </a:prstGeom>
+          <a:noFill/>
+        </p:spPr>
+        <p:txBody>
+          <a:bodyPr wrap="none" rtlCol="0">
+            <a:spAutoFit/>
+          </a:bodyPr>
+          <a:lstStyle/>
+          <a:p>
+            <a:r>
+              <a:rPr lang="en-US" b="1" dirty="0" smtClean="0"/>
+              <a:t>Pull</a:t>
+            </a:r>
+            <a:endParaRPr lang="en-US" b="1" dirty="0"/>
+          </a:p>
+        </p:txBody>
+      </p:sp>
+      <p:grpSp>
+        <p:nvGrpSpPr>
+          <p:cNvPr id="29" name="Group 28"/>
+          <p:cNvGrpSpPr/>
+          <p:nvPr/>
+        </p:nvGrpSpPr>
+        <p:grpSpPr>
+          <a:xfrm>
+            <a:off x="6186007" y="4951062"/>
+            <a:ext cx="681813" cy="1045028"/>
+            <a:chOff x="1955444" y="3069771"/>
+            <a:chExt cx="681813" cy="1045028"/>
+          </a:xfrm>
+        </p:grpSpPr>
+        <p:cxnSp>
+          <p:nvCxnSpPr>
+            <p:cNvPr id="30" name="Straight Connector 29"/>
+            <p:cNvCxnSpPr/>
+            <p:nvPr/>
+          </p:nvCxnSpPr>
+          <p:spPr>
+            <a:xfrm>
+              <a:off x="1955444" y="3102429"/>
+              <a:ext cx="673456" cy="0"/>
+            </a:xfrm>
+            <a:prstGeom prst="line">
+              <a:avLst/>
+            </a:prstGeom>
+          </p:spPr>
+          <p:style>
+            <a:lnRef idx="1">
+              <a:schemeClr val="accent1"/>
+            </a:lnRef>
+            <a:fillRef idx="0">
+              <a:schemeClr val="accent1"/>
+            </a:fillRef>
+            <a:effectRef idx="0">
+              <a:schemeClr val="accent1"/>
+            </a:effectRef>
+            <a:fontRef idx="minor">
+              <a:schemeClr val="tx1"/>
+            </a:fontRef>
+          </p:style>
+        </p:cxnSp>
+        <p:cxnSp>
+          <p:nvCxnSpPr>
+            <p:cNvPr id="31" name="Straight Connector 30"/>
+            <p:cNvCxnSpPr/>
+            <p:nvPr/>
+          </p:nvCxnSpPr>
+          <p:spPr>
+            <a:xfrm>
+              <a:off x="2637257" y="3069771"/>
+              <a:ext cx="0" cy="1045028"/>
+            </a:xfrm>
+            <a:prstGeom prst="line">
+              <a:avLst/>
+            </a:prstGeom>
+          </p:spPr>
+          <p:style>
+            <a:lnRef idx="1">
+              <a:schemeClr val="accent1"/>
+            </a:lnRef>
+            <a:fillRef idx="0">
+              <a:schemeClr val="accent1"/>
+            </a:fillRef>
+            <a:effectRef idx="0">
+              <a:schemeClr val="accent1"/>
+            </a:effectRef>
+            <a:fontRef idx="minor">
+              <a:schemeClr val="tx1"/>
+            </a:fontRef>
+          </p:style>
+        </p:cxnSp>
+        <p:cxnSp>
+          <p:nvCxnSpPr>
+            <p:cNvPr id="32" name="Straight Arrow Connector 31"/>
+            <p:cNvCxnSpPr/>
+            <p:nvPr/>
+          </p:nvCxnSpPr>
+          <p:spPr>
+            <a:xfrm flipH="1">
+              <a:off x="1955444" y="4098471"/>
+              <a:ext cx="673456" cy="0"/>
+            </a:xfrm>
+            <a:prstGeom prst="straightConnector1">
+              <a:avLst/>
+            </a:prstGeom>
+            <a:ln>
+              <a:tailEnd type="triangle"/>
+            </a:ln>
+          </p:spPr>
+          <p:style>
+            <a:lnRef idx="1">
+              <a:schemeClr val="accent1"/>
+            </a:lnRef>
+            <a:fillRef idx="0">
+              <a:schemeClr val="accent1"/>
+            </a:fillRef>
+            <a:effectRef idx="0">
+              <a:schemeClr val="accent1"/>
+            </a:effectRef>
+            <a:fontRef idx="minor">
+              <a:schemeClr val="tx1"/>
+            </a:fontRef>
+          </p:style>
+        </p:cxnSp>
+      </p:grpSp>
+      <p:cxnSp>
+        <p:nvCxnSpPr>
+          <p:cNvPr id="33" name="Straight Arrow Connector 32"/>
+          <p:cNvCxnSpPr/>
+          <p:nvPr/>
+        </p:nvCxnSpPr>
+        <p:spPr>
+          <a:xfrm flipH="1">
+            <a:off x="1975618" y="6595941"/>
+            <a:ext cx="4124897" cy="10511"/>
+          </a:xfrm>
+          <a:prstGeom prst="straightConnector1">
+            <a:avLst/>
+          </a:prstGeom>
+          <a:ln>
+            <a:tailEnd type="triangle"/>
+          </a:ln>
+        </p:spPr>
+        <p:style>
+          <a:lnRef idx="1">
+            <a:schemeClr val="accent1"/>
+          </a:lnRef>
+          <a:fillRef idx="0">
+            <a:schemeClr val="accent1"/>
+          </a:fillRef>
+          <a:effectRef idx="0">
+            <a:schemeClr val="accent1"/>
+          </a:effectRef>
+          <a:fontRef idx="minor">
+            <a:schemeClr val="tx1"/>
+          </a:fontRef>
+        </p:style>
+      </p:cxnSp>
+      <p:sp>
+        <p:nvSpPr>
+          <p:cNvPr id="34" name="TextBox 33"/>
+          <p:cNvSpPr txBox="1"/>
+          <p:nvPr/>
+        </p:nvSpPr>
+        <p:spPr>
+          <a:xfrm>
+            <a:off x="3744268" y="6157992"/>
+            <a:ext cx="543739" cy="369332"/>
+          </a:xfrm>
+          <a:prstGeom prst="rect">
+            <a:avLst/>
+          </a:prstGeom>
+          <a:noFill/>
+        </p:spPr>
+        <p:txBody>
+          <a:bodyPr wrap="none" rtlCol="0">
+            <a:spAutoFit/>
+          </a:bodyPr>
+          <a:lstStyle/>
+          <a:p>
+            <a:r>
+              <a:rPr lang="en-US" b="1" dirty="0" smtClean="0"/>
+              <a:t>Pull</a:t>
+            </a:r>
+            <a:endParaRPr lang="en-US" b="1" dirty="0"/>
+          </a:p>
+        </p:txBody>
+      </p:sp>
+      <p:sp>
+        <p:nvSpPr>
+          <p:cNvPr id="35" name="TextBox 34"/>
+          <p:cNvSpPr txBox="1"/>
+          <p:nvPr/>
+        </p:nvSpPr>
+        <p:spPr>
+          <a:xfrm>
+            <a:off x="3444367" y="3775470"/>
+            <a:ext cx="914481" cy="369332"/>
+          </a:xfrm>
+          <a:prstGeom prst="rect">
+            <a:avLst/>
+          </a:prstGeom>
+          <a:noFill/>
+        </p:spPr>
+        <p:txBody>
+          <a:bodyPr wrap="none" rtlCol="0">
+            <a:spAutoFit/>
+          </a:bodyPr>
+          <a:lstStyle/>
+          <a:p>
+            <a:r>
+              <a:rPr lang="en-US" b="1" dirty="0" smtClean="0"/>
+              <a:t>commit</a:t>
+            </a:r>
+            <a:endParaRPr lang="en-US" b="1" dirty="0"/>
           </a:p>
         </p:txBody>
       </p:sp>
@@ -3616,6 +4511,13 @@
   <p:clrMapOvr>
     <a:masterClrMapping/>
   </p:clrMapOvr>
+  <p:timing>
+    <p:tnLst>
+      <p:par>
+        <p:cTn id="1" dur="indefinite" restart="never" nodeType="tmRoot"/>
+      </p:par>
+    </p:tnLst>
+  </p:timing>
 </p:sld>
 </file>
 

</xml_diff>

<commit_message>
Added view and undo your project slide.
</commit_message>
<xml_diff>
--- a/learn-to-git.pptx
+++ b/learn-to-git.pptx
@@ -14,7 +14,7 @@
     <p:sldId id="261" r:id="rId5"/>
     <p:sldId id="262" r:id="rId6"/>
     <p:sldId id="259" r:id="rId7"/>
-    <p:sldId id="258" r:id="rId8"/>
+    <p:sldId id="263" r:id="rId8"/>
   </p:sldIdLst>
   <p:sldSz cx="12192000" cy="6858000"/>
   <p:notesSz cx="6858000" cy="9144000"/>
@@ -798,6 +798,154 @@
     <p:extLst>
       <p:ext uri="{BB962C8B-B14F-4D97-AF65-F5344CB8AC3E}">
         <p14:creationId xmlns:p14="http://schemas.microsoft.com/office/powerpoint/2010/main" val="3850980937"/>
+      </p:ext>
+    </p:extLst>
+  </p:cSld>
+  <p:clrMapOvr>
+    <a:masterClrMapping/>
+  </p:clrMapOvr>
+</p:notes>
+</file>
+
+<file path=ppt/notesSlides/notesSlide2.xml><?xml version="1.0" encoding="utf-8"?>
+<p:notes xmlns:a="http://schemas.openxmlformats.org/drawingml/2006/main" xmlns:r="http://schemas.openxmlformats.org/officeDocument/2006/relationships" xmlns:p="http://schemas.openxmlformats.org/presentationml/2006/main">
+  <p:cSld>
+    <p:spTree>
+      <p:nvGrpSpPr>
+        <p:cNvPr id="1" name=""/>
+        <p:cNvGrpSpPr/>
+        <p:nvPr/>
+      </p:nvGrpSpPr>
+      <p:grpSpPr>
+        <a:xfrm>
+          <a:off x="0" y="0"/>
+          <a:ext cx="0" cy="0"/>
+          <a:chOff x="0" y="0"/>
+          <a:chExt cx="0" cy="0"/>
+        </a:xfrm>
+      </p:grpSpPr>
+      <p:sp>
+        <p:nvSpPr>
+          <p:cNvPr id="2" name="Slide Image Placeholder 1"/>
+          <p:cNvSpPr>
+            <a:spLocks noGrp="1" noRot="1" noChangeAspect="1"/>
+          </p:cNvSpPr>
+          <p:nvPr>
+            <p:ph type="sldImg"/>
+          </p:nvPr>
+        </p:nvSpPr>
+        <p:spPr/>
+      </p:sp>
+      <p:sp>
+        <p:nvSpPr>
+          <p:cNvPr id="3" name="Notes Placeholder 2"/>
+          <p:cNvSpPr>
+            <a:spLocks noGrp="1"/>
+          </p:cNvSpPr>
+          <p:nvPr>
+            <p:ph type="body" idx="1"/>
+          </p:nvPr>
+        </p:nvSpPr>
+        <p:spPr/>
+        <p:txBody>
+          <a:bodyPr/>
+          <a:lstStyle/>
+          <a:p>
+            <a:pPr marL="171450" indent="-171450">
+              <a:buFontTx/>
+              <a:buChar char="-"/>
+            </a:pPr>
+            <a:r>
+              <a:rPr lang="en-US" dirty="0"/>
+              <a:t>We should talk about the git log options, as this is why good commit messages is so important!  </a:t>
+            </a:r>
+            <a:br>
+              <a:rPr lang="en-US" dirty="0"/>
+            </a:br>
+            <a:r>
+              <a:rPr lang="en-US" dirty="0"/>
+              <a:t>    However, it can be hard to demonstrate this with a new repository that is so small. </a:t>
+            </a:r>
+          </a:p>
+          <a:p>
+            <a:pPr marL="171450" indent="-171450">
+              <a:buFontTx/>
+              <a:buChar char="-"/>
+            </a:pPr>
+            <a:r>
+              <a:rPr lang="en-US" dirty="0"/>
+              <a:t>A good example for amend here is committing and forgetting to add a file or something.</a:t>
+            </a:r>
+          </a:p>
+          <a:p>
+            <a:pPr marL="171450" indent="-171450">
+              <a:buFontTx/>
+              <a:buChar char="-"/>
+            </a:pPr>
+            <a:r>
+              <a:rPr lang="en-US" dirty="0"/>
+              <a:t>Reset removes a staged file from the staging area.  </a:t>
+            </a:r>
+          </a:p>
+          <a:p>
+            <a:pPr marL="628650" lvl="1" indent="-171450">
+              <a:buFontTx/>
+              <a:buChar char="-"/>
+            </a:pPr>
+            <a:r>
+              <a:rPr lang="en-US" dirty="0"/>
+              <a:t>We can modify two files, but then realize we want to commit them separately.</a:t>
+            </a:r>
+          </a:p>
+          <a:p>
+            <a:pPr marL="171450" lvl="0" indent="-171450">
+              <a:buFontTx/>
+              <a:buChar char="-"/>
+            </a:pPr>
+            <a:r>
+              <a:rPr lang="en-US" dirty="0"/>
+              <a:t>Checkout -- undoes the uncommitted modifications.</a:t>
+            </a:r>
+          </a:p>
+          <a:p>
+            <a:pPr marL="628650" lvl="1" indent="-171450">
+              <a:buFontTx/>
+              <a:buChar char="-"/>
+            </a:pPr>
+            <a:r>
+              <a:rPr lang="en-US" dirty="0"/>
+              <a:t>Important to note that these changes are gone forever since they were never committed. </a:t>
+            </a:r>
+          </a:p>
+        </p:txBody>
+      </p:sp>
+      <p:sp>
+        <p:nvSpPr>
+          <p:cNvPr id="4" name="Slide Number Placeholder 3"/>
+          <p:cNvSpPr>
+            <a:spLocks noGrp="1"/>
+          </p:cNvSpPr>
+          <p:nvPr>
+            <p:ph type="sldNum" sz="quarter" idx="5"/>
+          </p:nvPr>
+        </p:nvSpPr>
+        <p:spPr/>
+        <p:txBody>
+          <a:bodyPr/>
+          <a:lstStyle/>
+          <a:p>
+            <a:fld id="{1EB1DABF-4E95-4EDF-8DA3-AD2A8632C0A3}" type="slidenum">
+              <a:rPr lang="en-US" smtClean="0"/>
+              <a:t>7</a:t>
+            </a:fld>
+            <a:endParaRPr lang="en-US"/>
+          </a:p>
+        </p:txBody>
+      </p:sp>
+    </p:spTree>
+    <p:extLst>
+      <p:ext uri="{BB962C8B-B14F-4D97-AF65-F5344CB8AC3E}">
+        <p14:creationId xmlns:p14="http://schemas.microsoft.com/office/powerpoint/2010/main" val="2020255622"/>
       </p:ext>
     </p:extLst>
   </p:cSld>
@@ -4996,7 +5144,7 @@
         </p:nvSpPr>
         <p:spPr>
           <a:xfrm>
-            <a:off x="2188308" y="2586892"/>
+            <a:off x="539262" y="2540000"/>
             <a:ext cx="3555140" cy="2031325"/>
           </a:xfrm>
           <a:prstGeom prst="rect">
@@ -5074,13 +5222,8 @@
             </a:pPr>
             <a:r>
               <a:rPr lang="en-US" dirty="0"/>
-              <a:t>git </a:t>
-            </a:r>
-            <a:r>
-              <a:rPr lang="en-US"/>
-              <a:t>mv &lt;file from&gt; &lt;file to&gt;</a:t>
-            </a:r>
-            <a:endParaRPr lang="en-US" dirty="0"/>
+              <a:t>git mv &lt;file from&gt; &lt;file to&gt;</a:t>
+            </a:r>
           </a:p>
           <a:p>
             <a:pPr marL="285750" indent="-285750">
@@ -5091,6 +5234,42 @@
           </a:p>
         </p:txBody>
       </p:sp>
+      <p:pic>
+        <p:nvPicPr>
+          <p:cNvPr id="9" name="Picture 8">
+            <a:extLst>
+              <a:ext uri="{FF2B5EF4-FFF2-40B4-BE49-F238E27FC236}">
+                <a16:creationId xmlns:a16="http://schemas.microsoft.com/office/drawing/2014/main" id="{446D10BE-0B40-4016-84CA-885D6BF83C91}"/>
+              </a:ext>
+            </a:extLst>
+          </p:cNvPr>
+          <p:cNvPicPr>
+            <a:picLocks noChangeAspect="1"/>
+          </p:cNvPicPr>
+          <p:nvPr/>
+        </p:nvPicPr>
+        <p:blipFill>
+          <a:blip r:embed="rId3">
+            <a:extLst>
+              <a:ext uri="{28A0092B-C50C-407E-A947-70E740481C1C}">
+                <a14:useLocalDpi xmlns:a14="http://schemas.microsoft.com/office/drawing/2010/main" val="0"/>
+              </a:ext>
+            </a:extLst>
+          </a:blip>
+          <a:stretch>
+            <a:fillRect/>
+          </a:stretch>
+        </p:blipFill>
+        <p:spPr>
+          <a:xfrm>
+            <a:off x="4218369" y="1866204"/>
+            <a:ext cx="7652416" cy="3471703"/>
+          </a:xfrm>
+          <a:prstGeom prst="rect">
+            <a:avLst/>
+          </a:prstGeom>
+        </p:spPr>
+      </p:pic>
     </p:spTree>
     <p:extLst>
       <p:ext uri="{BB962C8B-B14F-4D97-AF65-F5344CB8AC3E}">
@@ -5123,46 +5302,141 @@
       </p:grpSpPr>
       <p:sp>
         <p:nvSpPr>
-          <p:cNvPr id="2" name="Title 1"/>
-          <p:cNvSpPr>
-            <a:spLocks noGrp="1"/>
-          </p:cNvSpPr>
-          <p:nvPr>
-            <p:ph type="title"/>
-          </p:nvPr>
-        </p:nvSpPr>
-        <p:spPr/>
-        <p:txBody>
-          <a:bodyPr/>
-          <a:lstStyle/>
-          <a:p>
-            <a:endParaRPr lang="en-US"/>
-          </a:p>
-        </p:txBody>
-      </p:sp>
-      <p:sp>
-        <p:nvSpPr>
-          <p:cNvPr id="3" name="Content Placeholder 2"/>
-          <p:cNvSpPr>
-            <a:spLocks noGrp="1"/>
-          </p:cNvSpPr>
-          <p:nvPr>
-            <p:ph idx="1"/>
-          </p:nvPr>
-        </p:nvSpPr>
-        <p:spPr/>
-        <p:txBody>
-          <a:bodyPr/>
-          <a:lstStyle/>
-          <a:p>
-            <a:endParaRPr lang="en-US"/>
+          <p:cNvPr id="2" name="TextBox 1">
+            <a:extLst>
+              <a:ext uri="{FF2B5EF4-FFF2-40B4-BE49-F238E27FC236}">
+                <a16:creationId xmlns:a16="http://schemas.microsoft.com/office/drawing/2014/main" id="{853BC810-96FC-4778-AC48-82A38DB08855}"/>
+              </a:ext>
+            </a:extLst>
+          </p:cNvPr>
+          <p:cNvSpPr txBox="1"/>
+          <p:nvPr/>
+        </p:nvSpPr>
+        <p:spPr>
+          <a:xfrm>
+            <a:off x="539261" y="476738"/>
+            <a:ext cx="6315383" cy="707886"/>
+          </a:xfrm>
+          <a:prstGeom prst="rect">
+            <a:avLst/>
+          </a:prstGeom>
+          <a:noFill/>
+        </p:spPr>
+        <p:txBody>
+          <a:bodyPr wrap="none" rtlCol="0">
+            <a:spAutoFit/>
+          </a:bodyPr>
+          <a:lstStyle/>
+          <a:p>
+            <a:r>
+              <a:rPr lang="en-US" sz="4000" dirty="0"/>
+              <a:t>View and undo your project…</a:t>
+            </a:r>
+          </a:p>
+        </p:txBody>
+      </p:sp>
+      <p:sp>
+        <p:nvSpPr>
+          <p:cNvPr id="3" name="TextBox 2">
+            <a:extLst>
+              <a:ext uri="{FF2B5EF4-FFF2-40B4-BE49-F238E27FC236}">
+                <a16:creationId xmlns:a16="http://schemas.microsoft.com/office/drawing/2014/main" id="{93E51470-F363-4361-9879-3DA6F22EA45E}"/>
+              </a:ext>
+            </a:extLst>
+          </p:cNvPr>
+          <p:cNvSpPr txBox="1"/>
+          <p:nvPr/>
+        </p:nvSpPr>
+        <p:spPr>
+          <a:xfrm>
+            <a:off x="3102708" y="2274277"/>
+            <a:ext cx="5080045" cy="2031325"/>
+          </a:xfrm>
+          <a:prstGeom prst="rect">
+            <a:avLst/>
+          </a:prstGeom>
+          <a:noFill/>
+        </p:spPr>
+        <p:txBody>
+          <a:bodyPr wrap="none" rtlCol="0">
+            <a:spAutoFit/>
+          </a:bodyPr>
+          <a:lstStyle/>
+          <a:p>
+            <a:pPr marL="285750" indent="-285750">
+              <a:buFont typeface="Arial" panose="020B0604020202020204" pitchFamily="34" charset="0"/>
+              <a:buChar char="•"/>
+            </a:pPr>
+            <a:r>
+              <a:rPr lang="en-US" dirty="0"/>
+              <a:t>git log (-p -&lt;n&gt; --since=&lt;“date”&gt; --until=&lt;“date”&gt; </a:t>
+            </a:r>
+            <a:br>
+              <a:rPr lang="en-US" dirty="0"/>
+            </a:br>
+            <a:r>
+              <a:rPr lang="en-US" dirty="0"/>
+              <a:t>	-pretty=</a:t>
+            </a:r>
+            <a:r>
+              <a:rPr lang="en-US" dirty="0" err="1"/>
+              <a:t>oneline</a:t>
+            </a:r>
+            <a:r>
+              <a:rPr lang="en-US" dirty="0"/>
+              <a:t>, short, full, fuller --graph  </a:t>
+            </a:r>
+            <a:br>
+              <a:rPr lang="en-US" dirty="0"/>
+            </a:br>
+            <a:r>
+              <a:rPr lang="en-US" dirty="0"/>
+              <a:t>	--author=&lt;“name”&gt; --grep=&lt;“pattern”&gt;)</a:t>
+            </a:r>
+          </a:p>
+          <a:p>
+            <a:pPr marL="285750" indent="-285750">
+              <a:buFont typeface="Arial" panose="020B0604020202020204" pitchFamily="34" charset="0"/>
+              <a:buChar char="•"/>
+            </a:pPr>
+            <a:r>
+              <a:rPr lang="en-US" dirty="0"/>
+              <a:t>git commit --amend </a:t>
+            </a:r>
+          </a:p>
+          <a:p>
+            <a:pPr marL="285750" indent="-285750">
+              <a:buFont typeface="Arial" panose="020B0604020202020204" pitchFamily="34" charset="0"/>
+              <a:buChar char="•"/>
+            </a:pPr>
+            <a:r>
+              <a:rPr lang="en-US" dirty="0"/>
+              <a:t>git reset HEAD &lt;file&gt;</a:t>
+            </a:r>
+          </a:p>
+          <a:p>
+            <a:pPr marL="285750" indent="-285750">
+              <a:buFont typeface="Arial" panose="020B0604020202020204" pitchFamily="34" charset="0"/>
+              <a:buChar char="•"/>
+            </a:pPr>
+            <a:r>
+              <a:rPr lang="en-US" dirty="0"/>
+              <a:t>git checkout -- &lt;file&gt;</a:t>
+            </a:r>
+          </a:p>
+          <a:p>
+            <a:pPr marL="285750" indent="-285750">
+              <a:buFont typeface="Arial" panose="020B0604020202020204" pitchFamily="34" charset="0"/>
+              <a:buChar char="•"/>
+            </a:pPr>
+            <a:endParaRPr lang="en-US" dirty="0"/>
           </a:p>
         </p:txBody>
       </p:sp>
     </p:spTree>
     <p:extLst>
       <p:ext uri="{BB962C8B-B14F-4D97-AF65-F5344CB8AC3E}">
-        <p14:creationId xmlns:p14="http://schemas.microsoft.com/office/powerpoint/2010/main" val="1127983516"/>
+        <p14:creationId xmlns:p14="http://schemas.microsoft.com/office/powerpoint/2010/main" val="794676230"/>
       </p:ext>
     </p:extLst>
   </p:cSld>

</xml_diff>

<commit_message>
slight change on slide 3
</commit_message>
<xml_diff>
--- a/learn-to-git.pptx
+++ b/learn-to-git.pptx
@@ -4375,7 +4375,7 @@
         <p:spPr>
           <a:xfrm>
             <a:off x="1208314" y="3526971"/>
-            <a:ext cx="6847900" cy="646331"/>
+            <a:ext cx="6862328" cy="923330"/>
           </a:xfrm>
           <a:prstGeom prst="rect">
             <a:avLst/>
@@ -4404,7 +4404,21 @@
             </a:pPr>
             <a:r>
               <a:rPr lang="en-US" dirty="0" smtClean="0"/>
-              <a:t>Take notes, with mistakes and only transfer the ‘correct’ information</a:t>
+              <a:t>Take notes, with mistakes and only transfer the ‘correct’ </a:t>
+            </a:r>
+            <a:r>
+              <a:rPr lang="en-US" dirty="0" smtClean="0"/>
+              <a:t>information</a:t>
+            </a:r>
+          </a:p>
+          <a:p>
+            <a:pPr marL="285750" indent="-285750">
+              <a:buFontTx/>
+              <a:buChar char="-"/>
+            </a:pPr>
+            <a:r>
+              <a:rPr lang="en-US" smtClean="0"/>
+              <a:t>Blah </a:t>
             </a:r>
             <a:endParaRPr lang="en-US" dirty="0"/>
           </a:p>

</xml_diff>

<commit_message>
Added figures and extra slides for basic solo work.
</commit_message>
<xml_diff>
--- a/learn-to-git.pptx
+++ b/learn-to-git.pptx
@@ -5,7 +5,7 @@
     <p:sldMasterId id="2147483648" r:id="rId1"/>
   </p:sldMasterIdLst>
   <p:notesMasterIdLst>
-    <p:notesMasterId r:id="rId11"/>
+    <p:notesMasterId r:id="rId18"/>
   </p:notesMasterIdLst>
   <p:sldIdLst>
     <p:sldId id="256" r:id="rId2"/>
@@ -14,9 +14,16 @@
     <p:sldId id="260" r:id="rId5"/>
     <p:sldId id="261" r:id="rId6"/>
     <p:sldId id="262" r:id="rId7"/>
-    <p:sldId id="259" r:id="rId8"/>
-    <p:sldId id="263" r:id="rId9"/>
-    <p:sldId id="264" r:id="rId10"/>
+    <p:sldId id="267" r:id="rId8"/>
+    <p:sldId id="268" r:id="rId9"/>
+    <p:sldId id="269" r:id="rId10"/>
+    <p:sldId id="259" r:id="rId11"/>
+    <p:sldId id="271" r:id="rId12"/>
+    <p:sldId id="272" r:id="rId13"/>
+    <p:sldId id="270" r:id="rId14"/>
+    <p:sldId id="273" r:id="rId15"/>
+    <p:sldId id="263" r:id="rId16"/>
+    <p:sldId id="264" r:id="rId17"/>
   </p:sldIdLst>
   <p:sldSz cx="12192000" cy="6858000"/>
   <p:notesSz cx="6858000" cy="9144000"/>
@@ -799,7 +806,184 @@
     </p:spTree>
     <p:extLst>
       <p:ext uri="{BB962C8B-B14F-4D97-AF65-F5344CB8AC3E}">
-        <p14:creationId xmlns:p14="http://schemas.microsoft.com/office/powerpoint/2010/main" val="3850980937"/>
+        <p14:creationId xmlns:p14="http://schemas.microsoft.com/office/powerpoint/2010/main" val="3852306005"/>
+      </p:ext>
+    </p:extLst>
+  </p:cSld>
+  <p:clrMapOvr>
+    <a:masterClrMapping/>
+  </p:clrMapOvr>
+</p:notes>
+</file>
+
+<file path=ppt/notesSlides/notesSlide10.xml><?xml version="1.0" encoding="utf-8"?>
+<p:notes xmlns:a="http://schemas.openxmlformats.org/drawingml/2006/main" xmlns:r="http://schemas.openxmlformats.org/officeDocument/2006/relationships" xmlns:p="http://schemas.openxmlformats.org/presentationml/2006/main">
+  <p:cSld>
+    <p:spTree>
+      <p:nvGrpSpPr>
+        <p:cNvPr id="1" name=""/>
+        <p:cNvGrpSpPr/>
+        <p:nvPr/>
+      </p:nvGrpSpPr>
+      <p:grpSpPr>
+        <a:xfrm>
+          <a:off x="0" y="0"/>
+          <a:ext cx="0" cy="0"/>
+          <a:chOff x="0" y="0"/>
+          <a:chExt cx="0" cy="0"/>
+        </a:xfrm>
+      </p:grpSpPr>
+      <p:sp>
+        <p:nvSpPr>
+          <p:cNvPr id="2" name="Slide Image Placeholder 1"/>
+          <p:cNvSpPr>
+            <a:spLocks noGrp="1" noRot="1" noChangeAspect="1"/>
+          </p:cNvSpPr>
+          <p:nvPr>
+            <p:ph type="sldImg"/>
+          </p:nvPr>
+        </p:nvSpPr>
+        <p:spPr/>
+      </p:sp>
+      <p:sp>
+        <p:nvSpPr>
+          <p:cNvPr id="3" name="Notes Placeholder 2"/>
+          <p:cNvSpPr>
+            <a:spLocks noGrp="1"/>
+          </p:cNvSpPr>
+          <p:nvPr>
+            <p:ph type="body" idx="1"/>
+          </p:nvPr>
+        </p:nvSpPr>
+        <p:spPr/>
+        <p:txBody>
+          <a:bodyPr/>
+          <a:lstStyle/>
+          <a:p>
+            <a:pPr marL="171450" indent="-171450">
+              <a:buFontTx/>
+              <a:buChar char="-"/>
+            </a:pPr>
+            <a:r>
+              <a:rPr lang="en-US" dirty="0"/>
+              <a:t>Talk about good branching practices.  </a:t>
+            </a:r>
+          </a:p>
+          <a:p>
+            <a:pPr marL="628650" lvl="1" indent="-171450">
+              <a:buFontTx/>
+              <a:buChar char="-"/>
+            </a:pPr>
+            <a:r>
+              <a:rPr lang="en-US" dirty="0"/>
+              <a:t>Branch often for testing and additions. </a:t>
+            </a:r>
+          </a:p>
+          <a:p>
+            <a:pPr marL="171450" indent="-171450">
+              <a:buFontTx/>
+              <a:buChar char="-"/>
+            </a:pPr>
+            <a:r>
+              <a:rPr lang="en-US" dirty="0"/>
+              <a:t>Git won’t let you switch branches without a clean working directory. </a:t>
+            </a:r>
+          </a:p>
+          <a:p>
+            <a:pPr marL="628650" lvl="1" indent="-171450">
+              <a:buFontTx/>
+              <a:buChar char="-"/>
+            </a:pPr>
+            <a:r>
+              <a:rPr lang="en-US" dirty="0"/>
+              <a:t>One option is to use git stash</a:t>
+            </a:r>
+          </a:p>
+          <a:p>
+            <a:pPr marL="628650" lvl="1" indent="-171450">
+              <a:buFontTx/>
+              <a:buChar char="-"/>
+            </a:pPr>
+            <a:r>
+              <a:rPr lang="en-US" dirty="0"/>
+              <a:t>Another option is to use commit amending</a:t>
+            </a:r>
+          </a:p>
+          <a:p>
+            <a:pPr marL="171450" lvl="0" indent="-171450">
+              <a:buFontTx/>
+              <a:buChar char="-"/>
+            </a:pPr>
+            <a:r>
+              <a:rPr lang="en-US" dirty="0"/>
+              <a:t>In the case of a merge conflict, you can use git status.</a:t>
+            </a:r>
+          </a:p>
+          <a:p>
+            <a:pPr marL="628650" lvl="1" indent="-171450">
+              <a:buFontTx/>
+              <a:buChar char="-"/>
+            </a:pPr>
+            <a:r>
+              <a:rPr lang="en-US" dirty="0"/>
+              <a:t>Show how to handle merge conflicts in a text based code file.</a:t>
+            </a:r>
+          </a:p>
+          <a:p>
+            <a:pPr marL="628650" lvl="1" indent="-171450">
+              <a:buFontTx/>
+              <a:buChar char="-"/>
+            </a:pPr>
+            <a:r>
+              <a:rPr lang="en-US" dirty="0"/>
+              <a:t>Show how </a:t>
+            </a:r>
+            <a:r>
+              <a:rPr lang="en-US" dirty="0" err="1"/>
+              <a:t>Lishi</a:t>
+            </a:r>
+            <a:r>
+              <a:rPr lang="en-US" dirty="0"/>
+              <a:t> and I handled merge </a:t>
+            </a:r>
+            <a:r>
+              <a:rPr lang="en-US" dirty="0" err="1"/>
+              <a:t>coflicts</a:t>
+            </a:r>
+            <a:r>
+              <a:rPr lang="en-US" dirty="0"/>
+              <a:t> with the presentation.</a:t>
+            </a:r>
+          </a:p>
+        </p:txBody>
+      </p:sp>
+      <p:sp>
+        <p:nvSpPr>
+          <p:cNvPr id="4" name="Slide Number Placeholder 3"/>
+          <p:cNvSpPr>
+            <a:spLocks noGrp="1"/>
+          </p:cNvSpPr>
+          <p:nvPr>
+            <p:ph type="sldNum" sz="quarter" idx="5"/>
+          </p:nvPr>
+        </p:nvSpPr>
+        <p:spPr/>
+        <p:txBody>
+          <a:bodyPr/>
+          <a:lstStyle/>
+          <a:p>
+            <a:fld id="{1EB1DABF-4E95-4EDF-8DA3-AD2A8632C0A3}" type="slidenum">
+              <a:rPr lang="en-US" smtClean="0"/>
+              <a:t>16</a:t>
+            </a:fld>
+            <a:endParaRPr lang="en-US"/>
+          </a:p>
+        </p:txBody>
+      </p:sp>
+    </p:spTree>
+    <p:extLst>
+      <p:ext uri="{BB962C8B-B14F-4D97-AF65-F5344CB8AC3E}">
+        <p14:creationId xmlns:p14="http://schemas.microsoft.com/office/powerpoint/2010/main" val="1524038481"/>
       </p:ext>
     </p:extLst>
   </p:cSld>
@@ -859,14 +1043,7 @@
             </a:pPr>
             <a:r>
               <a:rPr lang="en-US" dirty="0"/>
-              <a:t>We should talk about the git log options, as this is why good commit messages is so important!  </a:t>
-            </a:r>
-            <a:br>
-              <a:rPr lang="en-US" dirty="0"/>
-            </a:br>
-            <a:r>
-              <a:rPr lang="en-US" dirty="0"/>
-              <a:t>    However, it can be hard to demonstrate this with a new repository that is so small. </a:t>
+              <a:t>Make a new directory.</a:t>
             </a:r>
           </a:p>
           <a:p>
@@ -876,7 +1053,15 @@
             </a:pPr>
             <a:r>
               <a:rPr lang="en-US" dirty="0"/>
-              <a:t>A good example for amend here is committing and forgetting to add a file or something.</a:t>
+              <a:t>Write a short </a:t>
+            </a:r>
+            <a:r>
+              <a:rPr lang="en-US" dirty="0" err="1"/>
+              <a:t>matlab</a:t>
+            </a:r>
+            <a:r>
+              <a:rPr lang="en-US" dirty="0"/>
+              <a:t> script.  Save it.</a:t>
             </a:r>
           </a:p>
           <a:p>
@@ -886,17 +1071,27 @@
             </a:pPr>
             <a:r>
               <a:rPr lang="en-US" dirty="0"/>
-              <a:t>Reset removes a staged file from the staging area.  </a:t>
-            </a:r>
-          </a:p>
-          <a:p>
-            <a:pPr marL="628650" lvl="1" indent="-171450">
-              <a:buFontTx/>
-              <a:buChar char="-"/>
-            </a:pPr>
-            <a:r>
-              <a:rPr lang="en-US" dirty="0"/>
-              <a:t>We can modify two files, but then realize we want to commit them separately.</a:t>
+              <a:t>Initialize a git repository.</a:t>
+            </a:r>
+          </a:p>
+          <a:p>
+            <a:pPr marL="628650" lvl="1" indent="-171450">
+              <a:buFontTx/>
+              <a:buChar char="-"/>
+            </a:pPr>
+            <a:r>
+              <a:rPr lang="en-US" dirty="0"/>
+              <a:t>Mention not good practice to nest repos. </a:t>
+            </a:r>
+          </a:p>
+          <a:p>
+            <a:pPr marL="628650" lvl="1" indent="-171450">
+              <a:buFontTx/>
+              <a:buChar char="-"/>
+            </a:pPr>
+            <a:r>
+              <a:rPr lang="en-US" dirty="0"/>
+              <a:t>Mention configuring username and email.</a:t>
             </a:r>
           </a:p>
           <a:p>
@@ -906,17 +1101,195 @@
             </a:pPr>
             <a:r>
               <a:rPr lang="en-US" dirty="0"/>
-              <a:t>Checkout -- undoes the uncommitted modifications.</a:t>
-            </a:r>
-          </a:p>
-          <a:p>
-            <a:pPr marL="628650" lvl="1" indent="-171450">
-              <a:buFontTx/>
-              <a:buChar char="-"/>
-            </a:pPr>
-            <a:r>
-              <a:rPr lang="en-US" dirty="0"/>
-              <a:t>Important to note that these changes are gone forever since they were never committed. </a:t>
+              <a:t>Add the script to the repository. </a:t>
+            </a:r>
+          </a:p>
+          <a:p>
+            <a:pPr marL="628650" lvl="1" indent="-171450">
+              <a:buFontTx/>
+              <a:buChar char="-"/>
+            </a:pPr>
+            <a:r>
+              <a:rPr lang="en-US" dirty="0"/>
+              <a:t>Talk about tracked and untracked files.</a:t>
+            </a:r>
+          </a:p>
+          <a:p>
+            <a:pPr marL="628650" lvl="1" indent="-171450">
+              <a:buFontTx/>
+              <a:buChar char="-"/>
+            </a:pPr>
+            <a:r>
+              <a:rPr lang="en-US" dirty="0"/>
+              <a:t>Add a fake data file to the directory, but don’t track it.</a:t>
+            </a:r>
+          </a:p>
+          <a:p>
+            <a:pPr marL="171450" lvl="0" indent="-171450">
+              <a:buFontTx/>
+              <a:buChar char="-"/>
+            </a:pPr>
+            <a:r>
+              <a:rPr lang="en-US" dirty="0"/>
+              <a:t>Commit the addition/initial commit.</a:t>
+            </a:r>
+          </a:p>
+          <a:p>
+            <a:pPr marL="628650" lvl="1" indent="-171450">
+              <a:buFontTx/>
+              <a:buChar char="-"/>
+            </a:pPr>
+            <a:r>
+              <a:rPr lang="en-US" dirty="0"/>
+              <a:t>Talk about the –m option</a:t>
+            </a:r>
+          </a:p>
+          <a:p>
+            <a:pPr marL="171450" lvl="0" indent="-171450">
+              <a:buFontTx/>
+              <a:buChar char="-"/>
+            </a:pPr>
+            <a:r>
+              <a:rPr lang="en-US" dirty="0"/>
+              <a:t>Introduce git status</a:t>
+            </a:r>
+          </a:p>
+          <a:p>
+            <a:pPr marL="628650" lvl="1" indent="-171450">
+              <a:buFontTx/>
+              <a:buChar char="-"/>
+            </a:pPr>
+            <a:r>
+              <a:rPr lang="en-US" dirty="0"/>
+              <a:t>Run git status right after commit.</a:t>
+            </a:r>
+          </a:p>
+          <a:p>
+            <a:pPr marL="628650" lvl="1" indent="-171450">
+              <a:buFontTx/>
+              <a:buChar char="-"/>
+            </a:pPr>
+            <a:r>
+              <a:rPr lang="en-US" dirty="0"/>
+              <a:t>Make changes to the script.</a:t>
+            </a:r>
+          </a:p>
+          <a:p>
+            <a:pPr marL="628650" lvl="1" indent="-171450">
+              <a:buFontTx/>
+              <a:buChar char="-"/>
+            </a:pPr>
+            <a:r>
+              <a:rPr lang="en-US" dirty="0"/>
+              <a:t>Run git status again.</a:t>
+            </a:r>
+          </a:p>
+          <a:p>
+            <a:pPr marL="628650" lvl="1" indent="-171450">
+              <a:buFontTx/>
+              <a:buChar char="-"/>
+            </a:pPr>
+            <a:r>
+              <a:rPr lang="en-US" dirty="0"/>
+              <a:t>Add the script to staged area.</a:t>
+            </a:r>
+          </a:p>
+          <a:p>
+            <a:pPr marL="628650" lvl="1" indent="-171450">
+              <a:buFontTx/>
+              <a:buChar char="-"/>
+            </a:pPr>
+            <a:r>
+              <a:rPr lang="en-US" dirty="0"/>
+              <a:t>Run git status again.</a:t>
+            </a:r>
+          </a:p>
+          <a:p>
+            <a:pPr marL="628650" lvl="1" indent="-171450">
+              <a:buFontTx/>
+              <a:buChar char="-"/>
+            </a:pPr>
+            <a:r>
+              <a:rPr lang="en-US" dirty="0"/>
+              <a:t>Commit changes.</a:t>
+            </a:r>
+          </a:p>
+          <a:p>
+            <a:pPr marL="171450" lvl="0" indent="-171450">
+              <a:buFontTx/>
+              <a:buChar char="-"/>
+            </a:pPr>
+            <a:r>
+              <a:rPr lang="en-US" dirty="0"/>
+              <a:t>Talk about the lifecycle of the status of files.</a:t>
+            </a:r>
+          </a:p>
+          <a:p>
+            <a:pPr marL="171450" lvl="0" indent="-171450">
+              <a:buFontTx/>
+              <a:buChar char="-"/>
+            </a:pPr>
+            <a:r>
+              <a:rPr lang="en-US" dirty="0"/>
+              <a:t>Talk about good committing practices.</a:t>
+            </a:r>
+          </a:p>
+          <a:p>
+            <a:pPr marL="628650" lvl="1" indent="-171450">
+              <a:buFontTx/>
+              <a:buChar char="-"/>
+            </a:pPr>
+            <a:r>
+              <a:rPr lang="en-US" dirty="0"/>
+              <a:t>Committing completed code (break code into small chunks and commit each separately)</a:t>
+            </a:r>
+          </a:p>
+          <a:p>
+            <a:pPr marL="628650" lvl="1" indent="-171450">
+              <a:buFontTx/>
+              <a:buChar char="-"/>
+            </a:pPr>
+            <a:r>
+              <a:rPr lang="en-US" dirty="0"/>
+              <a:t>Commit in the imperative, telling what the code will do after the commit not what you’ve done.</a:t>
+            </a:r>
+          </a:p>
+          <a:p>
+            <a:pPr marL="628650" lvl="1" indent="-171450">
+              <a:buFontTx/>
+              <a:buChar char="-"/>
+            </a:pPr>
+            <a:r>
+              <a:rPr lang="en-US" dirty="0"/>
+              <a:t>Introduce a .</a:t>
+            </a:r>
+            <a:r>
+              <a:rPr lang="en-US" dirty="0" err="1"/>
+              <a:t>gitignore</a:t>
+            </a:r>
+            <a:r>
+              <a:rPr lang="en-US" dirty="0"/>
+              <a:t> file</a:t>
+            </a:r>
+          </a:p>
+          <a:p>
+            <a:pPr marL="1085850" lvl="2" indent="-171450">
+              <a:buFontTx/>
+              <a:buChar char="-"/>
+            </a:pPr>
+            <a:r>
+              <a:rPr lang="en-US" dirty="0"/>
+              <a:t>Blank lines and lines starting with # are ignored</a:t>
+            </a:r>
+          </a:p>
+          <a:p>
+            <a:pPr marL="1085850" lvl="2" indent="-171450">
+              <a:buFontTx/>
+              <a:buChar char="-"/>
+            </a:pPr>
+            <a:r>
+              <a:rPr lang="en-US" dirty="0"/>
+              <a:t>Standard glob patterns work (look at documentation for more information)</a:t>
             </a:r>
           </a:p>
         </p:txBody>
@@ -947,7 +1320,7 @@
     </p:spTree>
     <p:extLst>
       <p:ext uri="{BB962C8B-B14F-4D97-AF65-F5344CB8AC3E}">
-        <p14:creationId xmlns:p14="http://schemas.microsoft.com/office/powerpoint/2010/main" val="2020255622"/>
+        <p14:creationId xmlns:p14="http://schemas.microsoft.com/office/powerpoint/2010/main" val="4226676489"/>
       </p:ext>
     </p:extLst>
   </p:cSld>
@@ -1007,17 +1380,7 @@
             </a:pPr>
             <a:r>
               <a:rPr lang="en-US" dirty="0"/>
-              <a:t>Talk about good branching practices.  </a:t>
-            </a:r>
-          </a:p>
-          <a:p>
-            <a:pPr marL="628650" lvl="1" indent="-171450">
-              <a:buFontTx/>
-              <a:buChar char="-"/>
-            </a:pPr>
-            <a:r>
-              <a:rPr lang="en-US" dirty="0"/>
-              <a:t>Branch often for testing and additions. </a:t>
+              <a:t>Make a new directory.</a:t>
             </a:r>
           </a:p>
           <a:p>
@@ -1027,27 +1390,45 @@
             </a:pPr>
             <a:r>
               <a:rPr lang="en-US" dirty="0"/>
-              <a:t>Git won’t let you switch branches without a clean working directory. </a:t>
-            </a:r>
-          </a:p>
-          <a:p>
-            <a:pPr marL="628650" lvl="1" indent="-171450">
-              <a:buFontTx/>
-              <a:buChar char="-"/>
-            </a:pPr>
-            <a:r>
-              <a:rPr lang="en-US" dirty="0"/>
-              <a:t>One option is to use git stash</a:t>
-            </a:r>
-          </a:p>
-          <a:p>
-            <a:pPr marL="628650" lvl="1" indent="-171450">
-              <a:buFontTx/>
-              <a:buChar char="-"/>
-            </a:pPr>
-            <a:r>
-              <a:rPr lang="en-US" dirty="0"/>
-              <a:t>Another option is to use commit amending</a:t>
+              <a:t>Write a short </a:t>
+            </a:r>
+            <a:r>
+              <a:rPr lang="en-US" dirty="0" err="1"/>
+              <a:t>matlab</a:t>
+            </a:r>
+            <a:r>
+              <a:rPr lang="en-US" dirty="0"/>
+              <a:t> script.  Save it.</a:t>
+            </a:r>
+          </a:p>
+          <a:p>
+            <a:pPr marL="171450" indent="-171450">
+              <a:buFontTx/>
+              <a:buChar char="-"/>
+            </a:pPr>
+            <a:r>
+              <a:rPr lang="en-US" dirty="0"/>
+              <a:t>Initialize a git repository.</a:t>
+            </a:r>
+          </a:p>
+          <a:p>
+            <a:pPr marL="628650" lvl="1" indent="-171450">
+              <a:buFontTx/>
+              <a:buChar char="-"/>
+            </a:pPr>
+            <a:r>
+              <a:rPr lang="en-US" dirty="0"/>
+              <a:t>Mention not good practice to nest repos. </a:t>
+            </a:r>
+          </a:p>
+          <a:p>
+            <a:pPr marL="628650" lvl="1" indent="-171450">
+              <a:buFontTx/>
+              <a:buChar char="-"/>
+            </a:pPr>
+            <a:r>
+              <a:rPr lang="en-US" dirty="0"/>
+              <a:t>Mention configuring username and email.</a:t>
             </a:r>
           </a:p>
           <a:p>
@@ -1057,43 +1438,195 @@
             </a:pPr>
             <a:r>
               <a:rPr lang="en-US" dirty="0"/>
-              <a:t>In the case of a merge conflict, you can use git status.</a:t>
-            </a:r>
-          </a:p>
-          <a:p>
-            <a:pPr marL="628650" lvl="1" indent="-171450">
-              <a:buFontTx/>
-              <a:buChar char="-"/>
-            </a:pPr>
-            <a:r>
-              <a:rPr lang="en-US" dirty="0"/>
-              <a:t>Show how to handle merge conflicts in a text based code file.</a:t>
-            </a:r>
-          </a:p>
-          <a:p>
-            <a:pPr marL="628650" lvl="1" indent="-171450">
-              <a:buFontTx/>
-              <a:buChar char="-"/>
-            </a:pPr>
-            <a:r>
-              <a:rPr lang="en-US" dirty="0"/>
-              <a:t>Show how </a:t>
+              <a:t>Add the script to the repository. </a:t>
+            </a:r>
+          </a:p>
+          <a:p>
+            <a:pPr marL="628650" lvl="1" indent="-171450">
+              <a:buFontTx/>
+              <a:buChar char="-"/>
+            </a:pPr>
+            <a:r>
+              <a:rPr lang="en-US" dirty="0"/>
+              <a:t>Talk about tracked and untracked files.</a:t>
+            </a:r>
+          </a:p>
+          <a:p>
+            <a:pPr marL="628650" lvl="1" indent="-171450">
+              <a:buFontTx/>
+              <a:buChar char="-"/>
+            </a:pPr>
+            <a:r>
+              <a:rPr lang="en-US" dirty="0"/>
+              <a:t>Add a fake data file to the directory, but don’t track it.</a:t>
+            </a:r>
+          </a:p>
+          <a:p>
+            <a:pPr marL="171450" lvl="0" indent="-171450">
+              <a:buFontTx/>
+              <a:buChar char="-"/>
+            </a:pPr>
+            <a:r>
+              <a:rPr lang="en-US" dirty="0"/>
+              <a:t>Commit the addition/initial commit.</a:t>
+            </a:r>
+          </a:p>
+          <a:p>
+            <a:pPr marL="628650" lvl="1" indent="-171450">
+              <a:buFontTx/>
+              <a:buChar char="-"/>
+            </a:pPr>
+            <a:r>
+              <a:rPr lang="en-US" dirty="0"/>
+              <a:t>Talk about the –m option</a:t>
+            </a:r>
+          </a:p>
+          <a:p>
+            <a:pPr marL="171450" lvl="0" indent="-171450">
+              <a:buFontTx/>
+              <a:buChar char="-"/>
+            </a:pPr>
+            <a:r>
+              <a:rPr lang="en-US" dirty="0"/>
+              <a:t>Introduce git status</a:t>
+            </a:r>
+          </a:p>
+          <a:p>
+            <a:pPr marL="628650" lvl="1" indent="-171450">
+              <a:buFontTx/>
+              <a:buChar char="-"/>
+            </a:pPr>
+            <a:r>
+              <a:rPr lang="en-US" dirty="0"/>
+              <a:t>Run git status right after commit.</a:t>
+            </a:r>
+          </a:p>
+          <a:p>
+            <a:pPr marL="628650" lvl="1" indent="-171450">
+              <a:buFontTx/>
+              <a:buChar char="-"/>
+            </a:pPr>
+            <a:r>
+              <a:rPr lang="en-US" dirty="0"/>
+              <a:t>Make changes to the script.</a:t>
+            </a:r>
+          </a:p>
+          <a:p>
+            <a:pPr marL="628650" lvl="1" indent="-171450">
+              <a:buFontTx/>
+              <a:buChar char="-"/>
+            </a:pPr>
+            <a:r>
+              <a:rPr lang="en-US" dirty="0"/>
+              <a:t>Run git status again.</a:t>
+            </a:r>
+          </a:p>
+          <a:p>
+            <a:pPr marL="628650" lvl="1" indent="-171450">
+              <a:buFontTx/>
+              <a:buChar char="-"/>
+            </a:pPr>
+            <a:r>
+              <a:rPr lang="en-US" dirty="0"/>
+              <a:t>Add the script to staged area.</a:t>
+            </a:r>
+          </a:p>
+          <a:p>
+            <a:pPr marL="628650" lvl="1" indent="-171450">
+              <a:buFontTx/>
+              <a:buChar char="-"/>
+            </a:pPr>
+            <a:r>
+              <a:rPr lang="en-US" dirty="0"/>
+              <a:t>Run git status again.</a:t>
+            </a:r>
+          </a:p>
+          <a:p>
+            <a:pPr marL="628650" lvl="1" indent="-171450">
+              <a:buFontTx/>
+              <a:buChar char="-"/>
+            </a:pPr>
+            <a:r>
+              <a:rPr lang="en-US" dirty="0"/>
+              <a:t>Commit changes.</a:t>
+            </a:r>
+          </a:p>
+          <a:p>
+            <a:pPr marL="171450" lvl="0" indent="-171450">
+              <a:buFontTx/>
+              <a:buChar char="-"/>
+            </a:pPr>
+            <a:r>
+              <a:rPr lang="en-US" dirty="0"/>
+              <a:t>Talk about the lifecycle of the status of files.</a:t>
+            </a:r>
+          </a:p>
+          <a:p>
+            <a:pPr marL="171450" lvl="0" indent="-171450">
+              <a:buFontTx/>
+              <a:buChar char="-"/>
+            </a:pPr>
+            <a:r>
+              <a:rPr lang="en-US" dirty="0"/>
+              <a:t>Talk about good committing practices.</a:t>
+            </a:r>
+          </a:p>
+          <a:p>
+            <a:pPr marL="628650" lvl="1" indent="-171450">
+              <a:buFontTx/>
+              <a:buChar char="-"/>
+            </a:pPr>
+            <a:r>
+              <a:rPr lang="en-US" dirty="0"/>
+              <a:t>Committing completed code (break code into small chunks and commit each separately)</a:t>
+            </a:r>
+          </a:p>
+          <a:p>
+            <a:pPr marL="628650" lvl="1" indent="-171450">
+              <a:buFontTx/>
+              <a:buChar char="-"/>
+            </a:pPr>
+            <a:r>
+              <a:rPr lang="en-US" dirty="0"/>
+              <a:t>Commit in the imperative, telling what the code will do after the commit not what you’ve done.</a:t>
+            </a:r>
+          </a:p>
+          <a:p>
+            <a:pPr marL="628650" lvl="1" indent="-171450">
+              <a:buFontTx/>
+              <a:buChar char="-"/>
+            </a:pPr>
+            <a:r>
+              <a:rPr lang="en-US" dirty="0"/>
+              <a:t>Introduce a .</a:t>
             </a:r>
             <a:r>
               <a:rPr lang="en-US" dirty="0" err="1"/>
-              <a:t>Lishi</a:t>
-            </a:r>
-            <a:r>
-              <a:rPr lang="en-US" dirty="0"/>
-              <a:t> and I handled merge </a:t>
-            </a:r>
-            <a:r>
-              <a:rPr lang="en-US" dirty="0" err="1"/>
-              <a:t>coflicts</a:t>
-            </a:r>
-            <a:r>
-              <a:rPr lang="en-US" dirty="0"/>
-              <a:t> with the presentation.</a:t>
+              <a:t>gitignore</a:t>
+            </a:r>
+            <a:r>
+              <a:rPr lang="en-US" dirty="0"/>
+              <a:t> file</a:t>
+            </a:r>
+          </a:p>
+          <a:p>
+            <a:pPr marL="1085850" lvl="2" indent="-171450">
+              <a:buFontTx/>
+              <a:buChar char="-"/>
+            </a:pPr>
+            <a:r>
+              <a:rPr lang="en-US" dirty="0"/>
+              <a:t>Blank lines and lines starting with # are ignored</a:t>
+            </a:r>
+          </a:p>
+          <a:p>
+            <a:pPr marL="1085850" lvl="2" indent="-171450">
+              <a:buFontTx/>
+              <a:buChar char="-"/>
+            </a:pPr>
+            <a:r>
+              <a:rPr lang="en-US" dirty="0"/>
+              <a:t>Standard glob patterns work (look at documentation for more information)</a:t>
             </a:r>
           </a:p>
         </p:txBody>
@@ -1124,7 +1657,1840 @@
     </p:spTree>
     <p:extLst>
       <p:ext uri="{BB962C8B-B14F-4D97-AF65-F5344CB8AC3E}">
-        <p14:creationId xmlns:p14="http://schemas.microsoft.com/office/powerpoint/2010/main" val="1524038481"/>
+        <p14:creationId xmlns:p14="http://schemas.microsoft.com/office/powerpoint/2010/main" val="3121463273"/>
+      </p:ext>
+    </p:extLst>
+  </p:cSld>
+  <p:clrMapOvr>
+    <a:masterClrMapping/>
+  </p:clrMapOvr>
+</p:notes>
+</file>
+
+<file path=ppt/notesSlides/notesSlide4.xml><?xml version="1.0" encoding="utf-8"?>
+<p:notes xmlns:a="http://schemas.openxmlformats.org/drawingml/2006/main" xmlns:r="http://schemas.openxmlformats.org/officeDocument/2006/relationships" xmlns:p="http://schemas.openxmlformats.org/presentationml/2006/main">
+  <p:cSld>
+    <p:spTree>
+      <p:nvGrpSpPr>
+        <p:cNvPr id="1" name=""/>
+        <p:cNvGrpSpPr/>
+        <p:nvPr/>
+      </p:nvGrpSpPr>
+      <p:grpSpPr>
+        <a:xfrm>
+          <a:off x="0" y="0"/>
+          <a:ext cx="0" cy="0"/>
+          <a:chOff x="0" y="0"/>
+          <a:chExt cx="0" cy="0"/>
+        </a:xfrm>
+      </p:grpSpPr>
+      <p:sp>
+        <p:nvSpPr>
+          <p:cNvPr id="2" name="Slide Image Placeholder 1"/>
+          <p:cNvSpPr>
+            <a:spLocks noGrp="1" noRot="1" noChangeAspect="1"/>
+          </p:cNvSpPr>
+          <p:nvPr>
+            <p:ph type="sldImg"/>
+          </p:nvPr>
+        </p:nvSpPr>
+        <p:spPr/>
+      </p:sp>
+      <p:sp>
+        <p:nvSpPr>
+          <p:cNvPr id="3" name="Notes Placeholder 2"/>
+          <p:cNvSpPr>
+            <a:spLocks noGrp="1"/>
+          </p:cNvSpPr>
+          <p:nvPr>
+            <p:ph type="body" idx="1"/>
+          </p:nvPr>
+        </p:nvSpPr>
+        <p:spPr/>
+        <p:txBody>
+          <a:bodyPr/>
+          <a:lstStyle/>
+          <a:p>
+            <a:pPr marL="171450" indent="-171450">
+              <a:buFontTx/>
+              <a:buChar char="-"/>
+            </a:pPr>
+            <a:r>
+              <a:rPr lang="en-US" dirty="0"/>
+              <a:t>Make a new directory.</a:t>
+            </a:r>
+          </a:p>
+          <a:p>
+            <a:pPr marL="171450" indent="-171450">
+              <a:buFontTx/>
+              <a:buChar char="-"/>
+            </a:pPr>
+            <a:r>
+              <a:rPr lang="en-US" dirty="0"/>
+              <a:t>Write a short </a:t>
+            </a:r>
+            <a:r>
+              <a:rPr lang="en-US" dirty="0" err="1"/>
+              <a:t>matlab</a:t>
+            </a:r>
+            <a:r>
+              <a:rPr lang="en-US" dirty="0"/>
+              <a:t> script.  Save it.</a:t>
+            </a:r>
+          </a:p>
+          <a:p>
+            <a:pPr marL="171450" indent="-171450">
+              <a:buFontTx/>
+              <a:buChar char="-"/>
+            </a:pPr>
+            <a:r>
+              <a:rPr lang="en-US" dirty="0"/>
+              <a:t>Initialize a git repository.</a:t>
+            </a:r>
+          </a:p>
+          <a:p>
+            <a:pPr marL="628650" lvl="1" indent="-171450">
+              <a:buFontTx/>
+              <a:buChar char="-"/>
+            </a:pPr>
+            <a:r>
+              <a:rPr lang="en-US" dirty="0"/>
+              <a:t>Mention not good practice to nest repos. </a:t>
+            </a:r>
+          </a:p>
+          <a:p>
+            <a:pPr marL="628650" lvl="1" indent="-171450">
+              <a:buFontTx/>
+              <a:buChar char="-"/>
+            </a:pPr>
+            <a:r>
+              <a:rPr lang="en-US" dirty="0"/>
+              <a:t>Mention configuring username and email.</a:t>
+            </a:r>
+          </a:p>
+          <a:p>
+            <a:pPr marL="171450" lvl="0" indent="-171450">
+              <a:buFontTx/>
+              <a:buChar char="-"/>
+            </a:pPr>
+            <a:r>
+              <a:rPr lang="en-US" dirty="0"/>
+              <a:t>Add the script to the repository. </a:t>
+            </a:r>
+          </a:p>
+          <a:p>
+            <a:pPr marL="628650" lvl="1" indent="-171450">
+              <a:buFontTx/>
+              <a:buChar char="-"/>
+            </a:pPr>
+            <a:r>
+              <a:rPr lang="en-US" dirty="0"/>
+              <a:t>Talk about tracked and untracked files.</a:t>
+            </a:r>
+          </a:p>
+          <a:p>
+            <a:pPr marL="628650" lvl="1" indent="-171450">
+              <a:buFontTx/>
+              <a:buChar char="-"/>
+            </a:pPr>
+            <a:r>
+              <a:rPr lang="en-US" dirty="0"/>
+              <a:t>Add a fake data file to the directory, but don’t track it.</a:t>
+            </a:r>
+          </a:p>
+          <a:p>
+            <a:pPr marL="171450" lvl="0" indent="-171450">
+              <a:buFontTx/>
+              <a:buChar char="-"/>
+            </a:pPr>
+            <a:r>
+              <a:rPr lang="en-US" dirty="0"/>
+              <a:t>Commit the addition/initial commit.</a:t>
+            </a:r>
+          </a:p>
+          <a:p>
+            <a:pPr marL="628650" lvl="1" indent="-171450">
+              <a:buFontTx/>
+              <a:buChar char="-"/>
+            </a:pPr>
+            <a:r>
+              <a:rPr lang="en-US" dirty="0"/>
+              <a:t>Talk about the –m option</a:t>
+            </a:r>
+          </a:p>
+          <a:p>
+            <a:pPr marL="171450" lvl="0" indent="-171450">
+              <a:buFontTx/>
+              <a:buChar char="-"/>
+            </a:pPr>
+            <a:r>
+              <a:rPr lang="en-US" dirty="0"/>
+              <a:t>Introduce git status</a:t>
+            </a:r>
+          </a:p>
+          <a:p>
+            <a:pPr marL="628650" lvl="1" indent="-171450">
+              <a:buFontTx/>
+              <a:buChar char="-"/>
+            </a:pPr>
+            <a:r>
+              <a:rPr lang="en-US" dirty="0"/>
+              <a:t>Run git status right after commit.</a:t>
+            </a:r>
+          </a:p>
+          <a:p>
+            <a:pPr marL="628650" lvl="1" indent="-171450">
+              <a:buFontTx/>
+              <a:buChar char="-"/>
+            </a:pPr>
+            <a:r>
+              <a:rPr lang="en-US" dirty="0"/>
+              <a:t>Make changes to the script.</a:t>
+            </a:r>
+          </a:p>
+          <a:p>
+            <a:pPr marL="628650" lvl="1" indent="-171450">
+              <a:buFontTx/>
+              <a:buChar char="-"/>
+            </a:pPr>
+            <a:r>
+              <a:rPr lang="en-US" dirty="0"/>
+              <a:t>Run git status again.</a:t>
+            </a:r>
+          </a:p>
+          <a:p>
+            <a:pPr marL="628650" lvl="1" indent="-171450">
+              <a:buFontTx/>
+              <a:buChar char="-"/>
+            </a:pPr>
+            <a:r>
+              <a:rPr lang="en-US" dirty="0"/>
+              <a:t>Add the script to staged area.</a:t>
+            </a:r>
+          </a:p>
+          <a:p>
+            <a:pPr marL="628650" lvl="1" indent="-171450">
+              <a:buFontTx/>
+              <a:buChar char="-"/>
+            </a:pPr>
+            <a:r>
+              <a:rPr lang="en-US" dirty="0"/>
+              <a:t>Run git status again.</a:t>
+            </a:r>
+          </a:p>
+          <a:p>
+            <a:pPr marL="628650" lvl="1" indent="-171450">
+              <a:buFontTx/>
+              <a:buChar char="-"/>
+            </a:pPr>
+            <a:r>
+              <a:rPr lang="en-US" dirty="0"/>
+              <a:t>Commit changes.</a:t>
+            </a:r>
+          </a:p>
+          <a:p>
+            <a:pPr marL="171450" lvl="0" indent="-171450">
+              <a:buFontTx/>
+              <a:buChar char="-"/>
+            </a:pPr>
+            <a:r>
+              <a:rPr lang="en-US" dirty="0"/>
+              <a:t>Talk about the lifecycle of the status of files.</a:t>
+            </a:r>
+          </a:p>
+          <a:p>
+            <a:pPr marL="171450" lvl="0" indent="-171450">
+              <a:buFontTx/>
+              <a:buChar char="-"/>
+            </a:pPr>
+            <a:r>
+              <a:rPr lang="en-US" dirty="0"/>
+              <a:t>Talk about good committing practices.</a:t>
+            </a:r>
+          </a:p>
+          <a:p>
+            <a:pPr marL="628650" lvl="1" indent="-171450">
+              <a:buFontTx/>
+              <a:buChar char="-"/>
+            </a:pPr>
+            <a:r>
+              <a:rPr lang="en-US" dirty="0"/>
+              <a:t>Committing completed code (break code into small chunks and commit each separately)</a:t>
+            </a:r>
+          </a:p>
+          <a:p>
+            <a:pPr marL="628650" lvl="1" indent="-171450">
+              <a:buFontTx/>
+              <a:buChar char="-"/>
+            </a:pPr>
+            <a:r>
+              <a:rPr lang="en-US" dirty="0"/>
+              <a:t>Commit in the imperative, telling what the code will do after the commit not what you’ve done.</a:t>
+            </a:r>
+          </a:p>
+          <a:p>
+            <a:pPr marL="628650" lvl="1" indent="-171450">
+              <a:buFontTx/>
+              <a:buChar char="-"/>
+            </a:pPr>
+            <a:r>
+              <a:rPr lang="en-US" dirty="0"/>
+              <a:t>Introduce a .</a:t>
+            </a:r>
+            <a:r>
+              <a:rPr lang="en-US" dirty="0" err="1"/>
+              <a:t>gitignore</a:t>
+            </a:r>
+            <a:r>
+              <a:rPr lang="en-US" dirty="0"/>
+              <a:t> file</a:t>
+            </a:r>
+          </a:p>
+          <a:p>
+            <a:pPr marL="1085850" lvl="2" indent="-171450">
+              <a:buFontTx/>
+              <a:buChar char="-"/>
+            </a:pPr>
+            <a:r>
+              <a:rPr lang="en-US" dirty="0"/>
+              <a:t>Blank lines and lines starting with # are ignored</a:t>
+            </a:r>
+          </a:p>
+          <a:p>
+            <a:pPr marL="1085850" lvl="2" indent="-171450">
+              <a:buFontTx/>
+              <a:buChar char="-"/>
+            </a:pPr>
+            <a:r>
+              <a:rPr lang="en-US" dirty="0"/>
+              <a:t>Standard glob patterns work (look at documentation for more information)</a:t>
+            </a:r>
+          </a:p>
+        </p:txBody>
+      </p:sp>
+      <p:sp>
+        <p:nvSpPr>
+          <p:cNvPr id="4" name="Slide Number Placeholder 3"/>
+          <p:cNvSpPr>
+            <a:spLocks noGrp="1"/>
+          </p:cNvSpPr>
+          <p:nvPr>
+            <p:ph type="sldNum" sz="quarter" idx="5"/>
+          </p:nvPr>
+        </p:nvSpPr>
+        <p:spPr/>
+        <p:txBody>
+          <a:bodyPr/>
+          <a:lstStyle/>
+          <a:p>
+            <a:fld id="{1EB1DABF-4E95-4EDF-8DA3-AD2A8632C0A3}" type="slidenum">
+              <a:rPr lang="en-US" smtClean="0"/>
+              <a:t>10</a:t>
+            </a:fld>
+            <a:endParaRPr lang="en-US"/>
+          </a:p>
+        </p:txBody>
+      </p:sp>
+    </p:spTree>
+    <p:extLst>
+      <p:ext uri="{BB962C8B-B14F-4D97-AF65-F5344CB8AC3E}">
+        <p14:creationId xmlns:p14="http://schemas.microsoft.com/office/powerpoint/2010/main" val="3850980937"/>
+      </p:ext>
+    </p:extLst>
+  </p:cSld>
+  <p:clrMapOvr>
+    <a:masterClrMapping/>
+  </p:clrMapOvr>
+</p:notes>
+</file>
+
+<file path=ppt/notesSlides/notesSlide5.xml><?xml version="1.0" encoding="utf-8"?>
+<p:notes xmlns:a="http://schemas.openxmlformats.org/drawingml/2006/main" xmlns:r="http://schemas.openxmlformats.org/officeDocument/2006/relationships" xmlns:p="http://schemas.openxmlformats.org/presentationml/2006/main">
+  <p:cSld>
+    <p:spTree>
+      <p:nvGrpSpPr>
+        <p:cNvPr id="1" name=""/>
+        <p:cNvGrpSpPr/>
+        <p:nvPr/>
+      </p:nvGrpSpPr>
+      <p:grpSpPr>
+        <a:xfrm>
+          <a:off x="0" y="0"/>
+          <a:ext cx="0" cy="0"/>
+          <a:chOff x="0" y="0"/>
+          <a:chExt cx="0" cy="0"/>
+        </a:xfrm>
+      </p:grpSpPr>
+      <p:sp>
+        <p:nvSpPr>
+          <p:cNvPr id="2" name="Slide Image Placeholder 1"/>
+          <p:cNvSpPr>
+            <a:spLocks noGrp="1" noRot="1" noChangeAspect="1"/>
+          </p:cNvSpPr>
+          <p:nvPr>
+            <p:ph type="sldImg"/>
+          </p:nvPr>
+        </p:nvSpPr>
+        <p:spPr/>
+      </p:sp>
+      <p:sp>
+        <p:nvSpPr>
+          <p:cNvPr id="3" name="Notes Placeholder 2"/>
+          <p:cNvSpPr>
+            <a:spLocks noGrp="1"/>
+          </p:cNvSpPr>
+          <p:nvPr>
+            <p:ph type="body" idx="1"/>
+          </p:nvPr>
+        </p:nvSpPr>
+        <p:spPr/>
+        <p:txBody>
+          <a:bodyPr/>
+          <a:lstStyle/>
+          <a:p>
+            <a:pPr marL="171450" indent="-171450">
+              <a:buFontTx/>
+              <a:buChar char="-"/>
+            </a:pPr>
+            <a:r>
+              <a:rPr lang="en-US" dirty="0"/>
+              <a:t>Make a new directory.</a:t>
+            </a:r>
+          </a:p>
+          <a:p>
+            <a:pPr marL="171450" indent="-171450">
+              <a:buFontTx/>
+              <a:buChar char="-"/>
+            </a:pPr>
+            <a:r>
+              <a:rPr lang="en-US" dirty="0"/>
+              <a:t>Write a short </a:t>
+            </a:r>
+            <a:r>
+              <a:rPr lang="en-US" dirty="0" err="1"/>
+              <a:t>matlab</a:t>
+            </a:r>
+            <a:r>
+              <a:rPr lang="en-US" dirty="0"/>
+              <a:t> script.  Save it.</a:t>
+            </a:r>
+          </a:p>
+          <a:p>
+            <a:pPr marL="171450" indent="-171450">
+              <a:buFontTx/>
+              <a:buChar char="-"/>
+            </a:pPr>
+            <a:r>
+              <a:rPr lang="en-US" dirty="0"/>
+              <a:t>Initialize a git repository.</a:t>
+            </a:r>
+          </a:p>
+          <a:p>
+            <a:pPr marL="628650" lvl="1" indent="-171450">
+              <a:buFontTx/>
+              <a:buChar char="-"/>
+            </a:pPr>
+            <a:r>
+              <a:rPr lang="en-US" dirty="0"/>
+              <a:t>Mention not good practice to nest repos. </a:t>
+            </a:r>
+          </a:p>
+          <a:p>
+            <a:pPr marL="628650" lvl="1" indent="-171450">
+              <a:buFontTx/>
+              <a:buChar char="-"/>
+            </a:pPr>
+            <a:r>
+              <a:rPr lang="en-US" dirty="0"/>
+              <a:t>Mention configuring username and email.</a:t>
+            </a:r>
+          </a:p>
+          <a:p>
+            <a:pPr marL="171450" lvl="0" indent="-171450">
+              <a:buFontTx/>
+              <a:buChar char="-"/>
+            </a:pPr>
+            <a:r>
+              <a:rPr lang="en-US" dirty="0"/>
+              <a:t>Add the script to the repository. </a:t>
+            </a:r>
+          </a:p>
+          <a:p>
+            <a:pPr marL="628650" lvl="1" indent="-171450">
+              <a:buFontTx/>
+              <a:buChar char="-"/>
+            </a:pPr>
+            <a:r>
+              <a:rPr lang="en-US" dirty="0"/>
+              <a:t>Talk about tracked and untracked files.</a:t>
+            </a:r>
+          </a:p>
+          <a:p>
+            <a:pPr marL="628650" lvl="1" indent="-171450">
+              <a:buFontTx/>
+              <a:buChar char="-"/>
+            </a:pPr>
+            <a:r>
+              <a:rPr lang="en-US" dirty="0"/>
+              <a:t>Add a fake data file to the directory, but don’t track it.</a:t>
+            </a:r>
+          </a:p>
+          <a:p>
+            <a:pPr marL="171450" lvl="0" indent="-171450">
+              <a:buFontTx/>
+              <a:buChar char="-"/>
+            </a:pPr>
+            <a:r>
+              <a:rPr lang="en-US" dirty="0"/>
+              <a:t>Commit the addition/initial commit.</a:t>
+            </a:r>
+          </a:p>
+          <a:p>
+            <a:pPr marL="628650" lvl="1" indent="-171450">
+              <a:buFontTx/>
+              <a:buChar char="-"/>
+            </a:pPr>
+            <a:r>
+              <a:rPr lang="en-US" dirty="0"/>
+              <a:t>Talk about the –m option</a:t>
+            </a:r>
+          </a:p>
+          <a:p>
+            <a:pPr marL="171450" lvl="0" indent="-171450">
+              <a:buFontTx/>
+              <a:buChar char="-"/>
+            </a:pPr>
+            <a:r>
+              <a:rPr lang="en-US" dirty="0"/>
+              <a:t>Introduce git status</a:t>
+            </a:r>
+          </a:p>
+          <a:p>
+            <a:pPr marL="628650" lvl="1" indent="-171450">
+              <a:buFontTx/>
+              <a:buChar char="-"/>
+            </a:pPr>
+            <a:r>
+              <a:rPr lang="en-US" dirty="0"/>
+              <a:t>Run git status right after commit.</a:t>
+            </a:r>
+          </a:p>
+          <a:p>
+            <a:pPr marL="628650" lvl="1" indent="-171450">
+              <a:buFontTx/>
+              <a:buChar char="-"/>
+            </a:pPr>
+            <a:r>
+              <a:rPr lang="en-US" dirty="0"/>
+              <a:t>Make changes to the script.</a:t>
+            </a:r>
+          </a:p>
+          <a:p>
+            <a:pPr marL="628650" lvl="1" indent="-171450">
+              <a:buFontTx/>
+              <a:buChar char="-"/>
+            </a:pPr>
+            <a:r>
+              <a:rPr lang="en-US" dirty="0"/>
+              <a:t>Run git status again.</a:t>
+            </a:r>
+          </a:p>
+          <a:p>
+            <a:pPr marL="628650" lvl="1" indent="-171450">
+              <a:buFontTx/>
+              <a:buChar char="-"/>
+            </a:pPr>
+            <a:r>
+              <a:rPr lang="en-US" dirty="0"/>
+              <a:t>Add the script to staged area.</a:t>
+            </a:r>
+          </a:p>
+          <a:p>
+            <a:pPr marL="628650" lvl="1" indent="-171450">
+              <a:buFontTx/>
+              <a:buChar char="-"/>
+            </a:pPr>
+            <a:r>
+              <a:rPr lang="en-US" dirty="0"/>
+              <a:t>Run git status again.</a:t>
+            </a:r>
+          </a:p>
+          <a:p>
+            <a:pPr marL="628650" lvl="1" indent="-171450">
+              <a:buFontTx/>
+              <a:buChar char="-"/>
+            </a:pPr>
+            <a:r>
+              <a:rPr lang="en-US" dirty="0"/>
+              <a:t>Commit changes.</a:t>
+            </a:r>
+          </a:p>
+          <a:p>
+            <a:pPr marL="171450" lvl="0" indent="-171450">
+              <a:buFontTx/>
+              <a:buChar char="-"/>
+            </a:pPr>
+            <a:r>
+              <a:rPr lang="en-US" dirty="0"/>
+              <a:t>Talk about the lifecycle of the status of files.</a:t>
+            </a:r>
+          </a:p>
+          <a:p>
+            <a:pPr marL="171450" lvl="0" indent="-171450">
+              <a:buFontTx/>
+              <a:buChar char="-"/>
+            </a:pPr>
+            <a:r>
+              <a:rPr lang="en-US" dirty="0"/>
+              <a:t>Talk about good committing practices.</a:t>
+            </a:r>
+          </a:p>
+          <a:p>
+            <a:pPr marL="628650" lvl="1" indent="-171450">
+              <a:buFontTx/>
+              <a:buChar char="-"/>
+            </a:pPr>
+            <a:r>
+              <a:rPr lang="en-US" dirty="0"/>
+              <a:t>Committing completed code (break code into small chunks and commit each separately)</a:t>
+            </a:r>
+          </a:p>
+          <a:p>
+            <a:pPr marL="628650" lvl="1" indent="-171450">
+              <a:buFontTx/>
+              <a:buChar char="-"/>
+            </a:pPr>
+            <a:r>
+              <a:rPr lang="en-US" dirty="0"/>
+              <a:t>Commit in the imperative, telling what the code will do after the commit not what you’ve done.</a:t>
+            </a:r>
+          </a:p>
+          <a:p>
+            <a:pPr marL="628650" lvl="1" indent="-171450">
+              <a:buFontTx/>
+              <a:buChar char="-"/>
+            </a:pPr>
+            <a:r>
+              <a:rPr lang="en-US" dirty="0"/>
+              <a:t>Introduce a .</a:t>
+            </a:r>
+            <a:r>
+              <a:rPr lang="en-US" dirty="0" err="1"/>
+              <a:t>gitignore</a:t>
+            </a:r>
+            <a:r>
+              <a:rPr lang="en-US" dirty="0"/>
+              <a:t> file</a:t>
+            </a:r>
+          </a:p>
+          <a:p>
+            <a:pPr marL="1085850" lvl="2" indent="-171450">
+              <a:buFontTx/>
+              <a:buChar char="-"/>
+            </a:pPr>
+            <a:r>
+              <a:rPr lang="en-US" dirty="0"/>
+              <a:t>Blank lines and lines starting with # are ignored</a:t>
+            </a:r>
+          </a:p>
+          <a:p>
+            <a:pPr marL="1085850" lvl="2" indent="-171450">
+              <a:buFontTx/>
+              <a:buChar char="-"/>
+            </a:pPr>
+            <a:r>
+              <a:rPr lang="en-US" dirty="0"/>
+              <a:t>Standard glob patterns work (look at documentation for more information)</a:t>
+            </a:r>
+          </a:p>
+        </p:txBody>
+      </p:sp>
+      <p:sp>
+        <p:nvSpPr>
+          <p:cNvPr id="4" name="Slide Number Placeholder 3"/>
+          <p:cNvSpPr>
+            <a:spLocks noGrp="1"/>
+          </p:cNvSpPr>
+          <p:nvPr>
+            <p:ph type="sldNum" sz="quarter" idx="5"/>
+          </p:nvPr>
+        </p:nvSpPr>
+        <p:spPr/>
+        <p:txBody>
+          <a:bodyPr/>
+          <a:lstStyle/>
+          <a:p>
+            <a:fld id="{1EB1DABF-4E95-4EDF-8DA3-AD2A8632C0A3}" type="slidenum">
+              <a:rPr lang="en-US" smtClean="0"/>
+              <a:t>11</a:t>
+            </a:fld>
+            <a:endParaRPr lang="en-US"/>
+          </a:p>
+        </p:txBody>
+      </p:sp>
+    </p:spTree>
+    <p:extLst>
+      <p:ext uri="{BB962C8B-B14F-4D97-AF65-F5344CB8AC3E}">
+        <p14:creationId xmlns:p14="http://schemas.microsoft.com/office/powerpoint/2010/main" val="891587811"/>
+      </p:ext>
+    </p:extLst>
+  </p:cSld>
+  <p:clrMapOvr>
+    <a:masterClrMapping/>
+  </p:clrMapOvr>
+</p:notes>
+</file>
+
+<file path=ppt/notesSlides/notesSlide6.xml><?xml version="1.0" encoding="utf-8"?>
+<p:notes xmlns:a="http://schemas.openxmlformats.org/drawingml/2006/main" xmlns:r="http://schemas.openxmlformats.org/officeDocument/2006/relationships" xmlns:p="http://schemas.openxmlformats.org/presentationml/2006/main">
+  <p:cSld>
+    <p:spTree>
+      <p:nvGrpSpPr>
+        <p:cNvPr id="1" name=""/>
+        <p:cNvGrpSpPr/>
+        <p:nvPr/>
+      </p:nvGrpSpPr>
+      <p:grpSpPr>
+        <a:xfrm>
+          <a:off x="0" y="0"/>
+          <a:ext cx="0" cy="0"/>
+          <a:chOff x="0" y="0"/>
+          <a:chExt cx="0" cy="0"/>
+        </a:xfrm>
+      </p:grpSpPr>
+      <p:sp>
+        <p:nvSpPr>
+          <p:cNvPr id="2" name="Slide Image Placeholder 1"/>
+          <p:cNvSpPr>
+            <a:spLocks noGrp="1" noRot="1" noChangeAspect="1"/>
+          </p:cNvSpPr>
+          <p:nvPr>
+            <p:ph type="sldImg"/>
+          </p:nvPr>
+        </p:nvSpPr>
+        <p:spPr/>
+      </p:sp>
+      <p:sp>
+        <p:nvSpPr>
+          <p:cNvPr id="3" name="Notes Placeholder 2"/>
+          <p:cNvSpPr>
+            <a:spLocks noGrp="1"/>
+          </p:cNvSpPr>
+          <p:nvPr>
+            <p:ph type="body" idx="1"/>
+          </p:nvPr>
+        </p:nvSpPr>
+        <p:spPr/>
+        <p:txBody>
+          <a:bodyPr/>
+          <a:lstStyle/>
+          <a:p>
+            <a:pPr marL="171450" indent="-171450">
+              <a:buFontTx/>
+              <a:buChar char="-"/>
+            </a:pPr>
+            <a:r>
+              <a:rPr lang="en-US" dirty="0"/>
+              <a:t>Make a new directory.</a:t>
+            </a:r>
+          </a:p>
+          <a:p>
+            <a:pPr marL="171450" indent="-171450">
+              <a:buFontTx/>
+              <a:buChar char="-"/>
+            </a:pPr>
+            <a:r>
+              <a:rPr lang="en-US" dirty="0"/>
+              <a:t>Write a short </a:t>
+            </a:r>
+            <a:r>
+              <a:rPr lang="en-US" dirty="0" err="1"/>
+              <a:t>matlab</a:t>
+            </a:r>
+            <a:r>
+              <a:rPr lang="en-US" dirty="0"/>
+              <a:t> script.  Save it.</a:t>
+            </a:r>
+          </a:p>
+          <a:p>
+            <a:pPr marL="171450" indent="-171450">
+              <a:buFontTx/>
+              <a:buChar char="-"/>
+            </a:pPr>
+            <a:r>
+              <a:rPr lang="en-US" dirty="0"/>
+              <a:t>Initialize a git repository.</a:t>
+            </a:r>
+          </a:p>
+          <a:p>
+            <a:pPr marL="628650" lvl="1" indent="-171450">
+              <a:buFontTx/>
+              <a:buChar char="-"/>
+            </a:pPr>
+            <a:r>
+              <a:rPr lang="en-US" dirty="0"/>
+              <a:t>Mention not good practice to nest repos. </a:t>
+            </a:r>
+          </a:p>
+          <a:p>
+            <a:pPr marL="628650" lvl="1" indent="-171450">
+              <a:buFontTx/>
+              <a:buChar char="-"/>
+            </a:pPr>
+            <a:r>
+              <a:rPr lang="en-US" dirty="0"/>
+              <a:t>Mention configuring username and email.</a:t>
+            </a:r>
+          </a:p>
+          <a:p>
+            <a:pPr marL="171450" lvl="0" indent="-171450">
+              <a:buFontTx/>
+              <a:buChar char="-"/>
+            </a:pPr>
+            <a:r>
+              <a:rPr lang="en-US" dirty="0"/>
+              <a:t>Add the script to the repository. </a:t>
+            </a:r>
+          </a:p>
+          <a:p>
+            <a:pPr marL="628650" lvl="1" indent="-171450">
+              <a:buFontTx/>
+              <a:buChar char="-"/>
+            </a:pPr>
+            <a:r>
+              <a:rPr lang="en-US" dirty="0"/>
+              <a:t>Talk about tracked and untracked files.</a:t>
+            </a:r>
+          </a:p>
+          <a:p>
+            <a:pPr marL="628650" lvl="1" indent="-171450">
+              <a:buFontTx/>
+              <a:buChar char="-"/>
+            </a:pPr>
+            <a:r>
+              <a:rPr lang="en-US" dirty="0"/>
+              <a:t>Add a fake data file to the directory, but don’t track it.</a:t>
+            </a:r>
+          </a:p>
+          <a:p>
+            <a:pPr marL="171450" lvl="0" indent="-171450">
+              <a:buFontTx/>
+              <a:buChar char="-"/>
+            </a:pPr>
+            <a:r>
+              <a:rPr lang="en-US" dirty="0"/>
+              <a:t>Commit the addition/initial commit.</a:t>
+            </a:r>
+          </a:p>
+          <a:p>
+            <a:pPr marL="628650" lvl="1" indent="-171450">
+              <a:buFontTx/>
+              <a:buChar char="-"/>
+            </a:pPr>
+            <a:r>
+              <a:rPr lang="en-US" dirty="0"/>
+              <a:t>Talk about the –m option</a:t>
+            </a:r>
+          </a:p>
+          <a:p>
+            <a:pPr marL="171450" lvl="0" indent="-171450">
+              <a:buFontTx/>
+              <a:buChar char="-"/>
+            </a:pPr>
+            <a:r>
+              <a:rPr lang="en-US" dirty="0"/>
+              <a:t>Introduce git status</a:t>
+            </a:r>
+          </a:p>
+          <a:p>
+            <a:pPr marL="628650" lvl="1" indent="-171450">
+              <a:buFontTx/>
+              <a:buChar char="-"/>
+            </a:pPr>
+            <a:r>
+              <a:rPr lang="en-US" dirty="0"/>
+              <a:t>Run git status right after commit.</a:t>
+            </a:r>
+          </a:p>
+          <a:p>
+            <a:pPr marL="628650" lvl="1" indent="-171450">
+              <a:buFontTx/>
+              <a:buChar char="-"/>
+            </a:pPr>
+            <a:r>
+              <a:rPr lang="en-US" dirty="0"/>
+              <a:t>Make changes to the script.</a:t>
+            </a:r>
+          </a:p>
+          <a:p>
+            <a:pPr marL="628650" lvl="1" indent="-171450">
+              <a:buFontTx/>
+              <a:buChar char="-"/>
+            </a:pPr>
+            <a:r>
+              <a:rPr lang="en-US" dirty="0"/>
+              <a:t>Run git status again.</a:t>
+            </a:r>
+          </a:p>
+          <a:p>
+            <a:pPr marL="628650" lvl="1" indent="-171450">
+              <a:buFontTx/>
+              <a:buChar char="-"/>
+            </a:pPr>
+            <a:r>
+              <a:rPr lang="en-US" dirty="0"/>
+              <a:t>Add the script to staged area.</a:t>
+            </a:r>
+          </a:p>
+          <a:p>
+            <a:pPr marL="628650" lvl="1" indent="-171450">
+              <a:buFontTx/>
+              <a:buChar char="-"/>
+            </a:pPr>
+            <a:r>
+              <a:rPr lang="en-US" dirty="0"/>
+              <a:t>Run git status again.</a:t>
+            </a:r>
+          </a:p>
+          <a:p>
+            <a:pPr marL="628650" lvl="1" indent="-171450">
+              <a:buFontTx/>
+              <a:buChar char="-"/>
+            </a:pPr>
+            <a:r>
+              <a:rPr lang="en-US" dirty="0"/>
+              <a:t>Commit changes.</a:t>
+            </a:r>
+          </a:p>
+          <a:p>
+            <a:pPr marL="171450" lvl="0" indent="-171450">
+              <a:buFontTx/>
+              <a:buChar char="-"/>
+            </a:pPr>
+            <a:r>
+              <a:rPr lang="en-US" dirty="0"/>
+              <a:t>Talk about the lifecycle of the status of files.</a:t>
+            </a:r>
+          </a:p>
+          <a:p>
+            <a:pPr marL="171450" lvl="0" indent="-171450">
+              <a:buFontTx/>
+              <a:buChar char="-"/>
+            </a:pPr>
+            <a:r>
+              <a:rPr lang="en-US" dirty="0"/>
+              <a:t>Talk about good committing practices.</a:t>
+            </a:r>
+          </a:p>
+          <a:p>
+            <a:pPr marL="628650" lvl="1" indent="-171450">
+              <a:buFontTx/>
+              <a:buChar char="-"/>
+            </a:pPr>
+            <a:r>
+              <a:rPr lang="en-US" dirty="0"/>
+              <a:t>Committing completed code (break code into small chunks and commit each separately)</a:t>
+            </a:r>
+          </a:p>
+          <a:p>
+            <a:pPr marL="628650" lvl="1" indent="-171450">
+              <a:buFontTx/>
+              <a:buChar char="-"/>
+            </a:pPr>
+            <a:r>
+              <a:rPr lang="en-US" dirty="0"/>
+              <a:t>Commit in the imperative, telling what the code will do after the commit not what you’ve done.</a:t>
+            </a:r>
+          </a:p>
+          <a:p>
+            <a:pPr marL="628650" lvl="1" indent="-171450">
+              <a:buFontTx/>
+              <a:buChar char="-"/>
+            </a:pPr>
+            <a:r>
+              <a:rPr lang="en-US" dirty="0"/>
+              <a:t>Introduce a .</a:t>
+            </a:r>
+            <a:r>
+              <a:rPr lang="en-US" dirty="0" err="1"/>
+              <a:t>gitignore</a:t>
+            </a:r>
+            <a:r>
+              <a:rPr lang="en-US" dirty="0"/>
+              <a:t> file</a:t>
+            </a:r>
+          </a:p>
+          <a:p>
+            <a:pPr marL="1085850" lvl="2" indent="-171450">
+              <a:buFontTx/>
+              <a:buChar char="-"/>
+            </a:pPr>
+            <a:r>
+              <a:rPr lang="en-US" dirty="0"/>
+              <a:t>Blank lines and lines starting with # are ignored</a:t>
+            </a:r>
+          </a:p>
+          <a:p>
+            <a:pPr marL="1085850" lvl="2" indent="-171450">
+              <a:buFontTx/>
+              <a:buChar char="-"/>
+            </a:pPr>
+            <a:r>
+              <a:rPr lang="en-US" dirty="0"/>
+              <a:t>Standard glob patterns work (look at documentation for more information)</a:t>
+            </a:r>
+          </a:p>
+        </p:txBody>
+      </p:sp>
+      <p:sp>
+        <p:nvSpPr>
+          <p:cNvPr id="4" name="Slide Number Placeholder 3"/>
+          <p:cNvSpPr>
+            <a:spLocks noGrp="1"/>
+          </p:cNvSpPr>
+          <p:nvPr>
+            <p:ph type="sldNum" sz="quarter" idx="5"/>
+          </p:nvPr>
+        </p:nvSpPr>
+        <p:spPr/>
+        <p:txBody>
+          <a:bodyPr/>
+          <a:lstStyle/>
+          <a:p>
+            <a:fld id="{1EB1DABF-4E95-4EDF-8DA3-AD2A8632C0A3}" type="slidenum">
+              <a:rPr lang="en-US" smtClean="0"/>
+              <a:t>12</a:t>
+            </a:fld>
+            <a:endParaRPr lang="en-US"/>
+          </a:p>
+        </p:txBody>
+      </p:sp>
+    </p:spTree>
+    <p:extLst>
+      <p:ext uri="{BB962C8B-B14F-4D97-AF65-F5344CB8AC3E}">
+        <p14:creationId xmlns:p14="http://schemas.microsoft.com/office/powerpoint/2010/main" val="660587385"/>
+      </p:ext>
+    </p:extLst>
+  </p:cSld>
+  <p:clrMapOvr>
+    <a:masterClrMapping/>
+  </p:clrMapOvr>
+</p:notes>
+</file>
+
+<file path=ppt/notesSlides/notesSlide7.xml><?xml version="1.0" encoding="utf-8"?>
+<p:notes xmlns:a="http://schemas.openxmlformats.org/drawingml/2006/main" xmlns:r="http://schemas.openxmlformats.org/officeDocument/2006/relationships" xmlns:p="http://schemas.openxmlformats.org/presentationml/2006/main">
+  <p:cSld>
+    <p:spTree>
+      <p:nvGrpSpPr>
+        <p:cNvPr id="1" name=""/>
+        <p:cNvGrpSpPr/>
+        <p:nvPr/>
+      </p:nvGrpSpPr>
+      <p:grpSpPr>
+        <a:xfrm>
+          <a:off x="0" y="0"/>
+          <a:ext cx="0" cy="0"/>
+          <a:chOff x="0" y="0"/>
+          <a:chExt cx="0" cy="0"/>
+        </a:xfrm>
+      </p:grpSpPr>
+      <p:sp>
+        <p:nvSpPr>
+          <p:cNvPr id="2" name="Slide Image Placeholder 1"/>
+          <p:cNvSpPr>
+            <a:spLocks noGrp="1" noRot="1" noChangeAspect="1"/>
+          </p:cNvSpPr>
+          <p:nvPr>
+            <p:ph type="sldImg"/>
+          </p:nvPr>
+        </p:nvSpPr>
+        <p:spPr/>
+      </p:sp>
+      <p:sp>
+        <p:nvSpPr>
+          <p:cNvPr id="3" name="Notes Placeholder 2"/>
+          <p:cNvSpPr>
+            <a:spLocks noGrp="1"/>
+          </p:cNvSpPr>
+          <p:nvPr>
+            <p:ph type="body" idx="1"/>
+          </p:nvPr>
+        </p:nvSpPr>
+        <p:spPr/>
+        <p:txBody>
+          <a:bodyPr/>
+          <a:lstStyle/>
+          <a:p>
+            <a:pPr marL="171450" indent="-171450">
+              <a:buFontTx/>
+              <a:buChar char="-"/>
+            </a:pPr>
+            <a:r>
+              <a:rPr lang="en-US" dirty="0"/>
+              <a:t>Make a new directory.</a:t>
+            </a:r>
+          </a:p>
+          <a:p>
+            <a:pPr marL="171450" indent="-171450">
+              <a:buFontTx/>
+              <a:buChar char="-"/>
+            </a:pPr>
+            <a:r>
+              <a:rPr lang="en-US" dirty="0"/>
+              <a:t>Write a short </a:t>
+            </a:r>
+            <a:r>
+              <a:rPr lang="en-US" dirty="0" err="1"/>
+              <a:t>matlab</a:t>
+            </a:r>
+            <a:r>
+              <a:rPr lang="en-US" dirty="0"/>
+              <a:t> script.  Save it.</a:t>
+            </a:r>
+          </a:p>
+          <a:p>
+            <a:pPr marL="171450" indent="-171450">
+              <a:buFontTx/>
+              <a:buChar char="-"/>
+            </a:pPr>
+            <a:r>
+              <a:rPr lang="en-US" dirty="0"/>
+              <a:t>Initialize a git repository.</a:t>
+            </a:r>
+          </a:p>
+          <a:p>
+            <a:pPr marL="628650" lvl="1" indent="-171450">
+              <a:buFontTx/>
+              <a:buChar char="-"/>
+            </a:pPr>
+            <a:r>
+              <a:rPr lang="en-US" dirty="0"/>
+              <a:t>Mention not good practice to nest repos. </a:t>
+            </a:r>
+          </a:p>
+          <a:p>
+            <a:pPr marL="628650" lvl="1" indent="-171450">
+              <a:buFontTx/>
+              <a:buChar char="-"/>
+            </a:pPr>
+            <a:r>
+              <a:rPr lang="en-US" dirty="0"/>
+              <a:t>Mention configuring username and email.</a:t>
+            </a:r>
+          </a:p>
+          <a:p>
+            <a:pPr marL="171450" lvl="0" indent="-171450">
+              <a:buFontTx/>
+              <a:buChar char="-"/>
+            </a:pPr>
+            <a:r>
+              <a:rPr lang="en-US" dirty="0"/>
+              <a:t>Add the script to the repository. </a:t>
+            </a:r>
+          </a:p>
+          <a:p>
+            <a:pPr marL="628650" lvl="1" indent="-171450">
+              <a:buFontTx/>
+              <a:buChar char="-"/>
+            </a:pPr>
+            <a:r>
+              <a:rPr lang="en-US" dirty="0"/>
+              <a:t>Talk about tracked and untracked files.</a:t>
+            </a:r>
+          </a:p>
+          <a:p>
+            <a:pPr marL="628650" lvl="1" indent="-171450">
+              <a:buFontTx/>
+              <a:buChar char="-"/>
+            </a:pPr>
+            <a:r>
+              <a:rPr lang="en-US" dirty="0"/>
+              <a:t>Add a fake data file to the directory, but don’t track it.</a:t>
+            </a:r>
+          </a:p>
+          <a:p>
+            <a:pPr marL="171450" lvl="0" indent="-171450">
+              <a:buFontTx/>
+              <a:buChar char="-"/>
+            </a:pPr>
+            <a:r>
+              <a:rPr lang="en-US" dirty="0"/>
+              <a:t>Commit the addition/initial commit.</a:t>
+            </a:r>
+          </a:p>
+          <a:p>
+            <a:pPr marL="628650" lvl="1" indent="-171450">
+              <a:buFontTx/>
+              <a:buChar char="-"/>
+            </a:pPr>
+            <a:r>
+              <a:rPr lang="en-US" dirty="0"/>
+              <a:t>Talk about the –m option</a:t>
+            </a:r>
+          </a:p>
+          <a:p>
+            <a:pPr marL="171450" lvl="0" indent="-171450">
+              <a:buFontTx/>
+              <a:buChar char="-"/>
+            </a:pPr>
+            <a:r>
+              <a:rPr lang="en-US" dirty="0"/>
+              <a:t>Introduce git status</a:t>
+            </a:r>
+          </a:p>
+          <a:p>
+            <a:pPr marL="628650" lvl="1" indent="-171450">
+              <a:buFontTx/>
+              <a:buChar char="-"/>
+            </a:pPr>
+            <a:r>
+              <a:rPr lang="en-US" dirty="0"/>
+              <a:t>Run git status right after commit.</a:t>
+            </a:r>
+          </a:p>
+          <a:p>
+            <a:pPr marL="628650" lvl="1" indent="-171450">
+              <a:buFontTx/>
+              <a:buChar char="-"/>
+            </a:pPr>
+            <a:r>
+              <a:rPr lang="en-US" dirty="0"/>
+              <a:t>Make changes to the script.</a:t>
+            </a:r>
+          </a:p>
+          <a:p>
+            <a:pPr marL="628650" lvl="1" indent="-171450">
+              <a:buFontTx/>
+              <a:buChar char="-"/>
+            </a:pPr>
+            <a:r>
+              <a:rPr lang="en-US" dirty="0"/>
+              <a:t>Run git status again.</a:t>
+            </a:r>
+          </a:p>
+          <a:p>
+            <a:pPr marL="628650" lvl="1" indent="-171450">
+              <a:buFontTx/>
+              <a:buChar char="-"/>
+            </a:pPr>
+            <a:r>
+              <a:rPr lang="en-US" dirty="0"/>
+              <a:t>Add the script to staged area.</a:t>
+            </a:r>
+          </a:p>
+          <a:p>
+            <a:pPr marL="628650" lvl="1" indent="-171450">
+              <a:buFontTx/>
+              <a:buChar char="-"/>
+            </a:pPr>
+            <a:r>
+              <a:rPr lang="en-US" dirty="0"/>
+              <a:t>Run git status again.</a:t>
+            </a:r>
+          </a:p>
+          <a:p>
+            <a:pPr marL="628650" lvl="1" indent="-171450">
+              <a:buFontTx/>
+              <a:buChar char="-"/>
+            </a:pPr>
+            <a:r>
+              <a:rPr lang="en-US" dirty="0"/>
+              <a:t>Commit changes.</a:t>
+            </a:r>
+          </a:p>
+          <a:p>
+            <a:pPr marL="171450" lvl="0" indent="-171450">
+              <a:buFontTx/>
+              <a:buChar char="-"/>
+            </a:pPr>
+            <a:r>
+              <a:rPr lang="en-US" dirty="0"/>
+              <a:t>Talk about the lifecycle of the status of files.</a:t>
+            </a:r>
+          </a:p>
+          <a:p>
+            <a:pPr marL="171450" lvl="0" indent="-171450">
+              <a:buFontTx/>
+              <a:buChar char="-"/>
+            </a:pPr>
+            <a:r>
+              <a:rPr lang="en-US" dirty="0"/>
+              <a:t>Talk about good committing practices.</a:t>
+            </a:r>
+          </a:p>
+          <a:p>
+            <a:pPr marL="628650" lvl="1" indent="-171450">
+              <a:buFontTx/>
+              <a:buChar char="-"/>
+            </a:pPr>
+            <a:r>
+              <a:rPr lang="en-US" dirty="0"/>
+              <a:t>Committing completed code (break code into small chunks and commit each separately)</a:t>
+            </a:r>
+          </a:p>
+          <a:p>
+            <a:pPr marL="628650" lvl="1" indent="-171450">
+              <a:buFontTx/>
+              <a:buChar char="-"/>
+            </a:pPr>
+            <a:r>
+              <a:rPr lang="en-US" dirty="0"/>
+              <a:t>Commit in the imperative, telling what the code will do after the commit not what you’ve done.</a:t>
+            </a:r>
+          </a:p>
+          <a:p>
+            <a:pPr marL="628650" lvl="1" indent="-171450">
+              <a:buFontTx/>
+              <a:buChar char="-"/>
+            </a:pPr>
+            <a:r>
+              <a:rPr lang="en-US" dirty="0"/>
+              <a:t>Introduce a .</a:t>
+            </a:r>
+            <a:r>
+              <a:rPr lang="en-US" dirty="0" err="1"/>
+              <a:t>gitignore</a:t>
+            </a:r>
+            <a:r>
+              <a:rPr lang="en-US" dirty="0"/>
+              <a:t> file</a:t>
+            </a:r>
+          </a:p>
+          <a:p>
+            <a:pPr marL="1085850" lvl="2" indent="-171450">
+              <a:buFontTx/>
+              <a:buChar char="-"/>
+            </a:pPr>
+            <a:r>
+              <a:rPr lang="en-US" dirty="0"/>
+              <a:t>Blank lines and lines starting with # are ignored</a:t>
+            </a:r>
+          </a:p>
+          <a:p>
+            <a:pPr marL="1085850" lvl="2" indent="-171450">
+              <a:buFontTx/>
+              <a:buChar char="-"/>
+            </a:pPr>
+            <a:r>
+              <a:rPr lang="en-US" dirty="0"/>
+              <a:t>Standard glob patterns work (look at documentation for more information)</a:t>
+            </a:r>
+          </a:p>
+        </p:txBody>
+      </p:sp>
+      <p:sp>
+        <p:nvSpPr>
+          <p:cNvPr id="4" name="Slide Number Placeholder 3"/>
+          <p:cNvSpPr>
+            <a:spLocks noGrp="1"/>
+          </p:cNvSpPr>
+          <p:nvPr>
+            <p:ph type="sldNum" sz="quarter" idx="5"/>
+          </p:nvPr>
+        </p:nvSpPr>
+        <p:spPr/>
+        <p:txBody>
+          <a:bodyPr/>
+          <a:lstStyle/>
+          <a:p>
+            <a:fld id="{1EB1DABF-4E95-4EDF-8DA3-AD2A8632C0A3}" type="slidenum">
+              <a:rPr lang="en-US" smtClean="0"/>
+              <a:t>13</a:t>
+            </a:fld>
+            <a:endParaRPr lang="en-US"/>
+          </a:p>
+        </p:txBody>
+      </p:sp>
+    </p:spTree>
+    <p:extLst>
+      <p:ext uri="{BB962C8B-B14F-4D97-AF65-F5344CB8AC3E}">
+        <p14:creationId xmlns:p14="http://schemas.microsoft.com/office/powerpoint/2010/main" val="2671887521"/>
+      </p:ext>
+    </p:extLst>
+  </p:cSld>
+  <p:clrMapOvr>
+    <a:masterClrMapping/>
+  </p:clrMapOvr>
+</p:notes>
+</file>
+
+<file path=ppt/notesSlides/notesSlide8.xml><?xml version="1.0" encoding="utf-8"?>
+<p:notes xmlns:a="http://schemas.openxmlformats.org/drawingml/2006/main" xmlns:r="http://schemas.openxmlformats.org/officeDocument/2006/relationships" xmlns:p="http://schemas.openxmlformats.org/presentationml/2006/main">
+  <p:cSld>
+    <p:spTree>
+      <p:nvGrpSpPr>
+        <p:cNvPr id="1" name=""/>
+        <p:cNvGrpSpPr/>
+        <p:nvPr/>
+      </p:nvGrpSpPr>
+      <p:grpSpPr>
+        <a:xfrm>
+          <a:off x="0" y="0"/>
+          <a:ext cx="0" cy="0"/>
+          <a:chOff x="0" y="0"/>
+          <a:chExt cx="0" cy="0"/>
+        </a:xfrm>
+      </p:grpSpPr>
+      <p:sp>
+        <p:nvSpPr>
+          <p:cNvPr id="2" name="Slide Image Placeholder 1"/>
+          <p:cNvSpPr>
+            <a:spLocks noGrp="1" noRot="1" noChangeAspect="1"/>
+          </p:cNvSpPr>
+          <p:nvPr>
+            <p:ph type="sldImg"/>
+          </p:nvPr>
+        </p:nvSpPr>
+        <p:spPr/>
+      </p:sp>
+      <p:sp>
+        <p:nvSpPr>
+          <p:cNvPr id="3" name="Notes Placeholder 2"/>
+          <p:cNvSpPr>
+            <a:spLocks noGrp="1"/>
+          </p:cNvSpPr>
+          <p:nvPr>
+            <p:ph type="body" idx="1"/>
+          </p:nvPr>
+        </p:nvSpPr>
+        <p:spPr/>
+        <p:txBody>
+          <a:bodyPr/>
+          <a:lstStyle/>
+          <a:p>
+            <a:pPr marL="171450" indent="-171450">
+              <a:buFontTx/>
+              <a:buChar char="-"/>
+            </a:pPr>
+            <a:r>
+              <a:rPr lang="en-US" dirty="0"/>
+              <a:t>Make a new directory.</a:t>
+            </a:r>
+          </a:p>
+          <a:p>
+            <a:pPr marL="171450" indent="-171450">
+              <a:buFontTx/>
+              <a:buChar char="-"/>
+            </a:pPr>
+            <a:r>
+              <a:rPr lang="en-US" dirty="0"/>
+              <a:t>Write a short </a:t>
+            </a:r>
+            <a:r>
+              <a:rPr lang="en-US" dirty="0" err="1"/>
+              <a:t>matlab</a:t>
+            </a:r>
+            <a:r>
+              <a:rPr lang="en-US" dirty="0"/>
+              <a:t> script.  Save it.</a:t>
+            </a:r>
+          </a:p>
+          <a:p>
+            <a:pPr marL="171450" indent="-171450">
+              <a:buFontTx/>
+              <a:buChar char="-"/>
+            </a:pPr>
+            <a:r>
+              <a:rPr lang="en-US" dirty="0"/>
+              <a:t>Initialize a git repository.</a:t>
+            </a:r>
+          </a:p>
+          <a:p>
+            <a:pPr marL="628650" lvl="1" indent="-171450">
+              <a:buFontTx/>
+              <a:buChar char="-"/>
+            </a:pPr>
+            <a:r>
+              <a:rPr lang="en-US" dirty="0"/>
+              <a:t>Mention not good practice to nest repos. </a:t>
+            </a:r>
+          </a:p>
+          <a:p>
+            <a:pPr marL="628650" lvl="1" indent="-171450">
+              <a:buFontTx/>
+              <a:buChar char="-"/>
+            </a:pPr>
+            <a:r>
+              <a:rPr lang="en-US" dirty="0"/>
+              <a:t>Mention configuring username and email.</a:t>
+            </a:r>
+          </a:p>
+          <a:p>
+            <a:pPr marL="171450" lvl="0" indent="-171450">
+              <a:buFontTx/>
+              <a:buChar char="-"/>
+            </a:pPr>
+            <a:r>
+              <a:rPr lang="en-US" dirty="0"/>
+              <a:t>Add the script to the repository. </a:t>
+            </a:r>
+          </a:p>
+          <a:p>
+            <a:pPr marL="628650" lvl="1" indent="-171450">
+              <a:buFontTx/>
+              <a:buChar char="-"/>
+            </a:pPr>
+            <a:r>
+              <a:rPr lang="en-US" dirty="0"/>
+              <a:t>Talk about tracked and untracked files.</a:t>
+            </a:r>
+          </a:p>
+          <a:p>
+            <a:pPr marL="628650" lvl="1" indent="-171450">
+              <a:buFontTx/>
+              <a:buChar char="-"/>
+            </a:pPr>
+            <a:r>
+              <a:rPr lang="en-US" dirty="0"/>
+              <a:t>Add a fake data file to the directory, but don’t track it.</a:t>
+            </a:r>
+          </a:p>
+          <a:p>
+            <a:pPr marL="171450" lvl="0" indent="-171450">
+              <a:buFontTx/>
+              <a:buChar char="-"/>
+            </a:pPr>
+            <a:r>
+              <a:rPr lang="en-US" dirty="0"/>
+              <a:t>Commit the addition/initial commit.</a:t>
+            </a:r>
+          </a:p>
+          <a:p>
+            <a:pPr marL="628650" lvl="1" indent="-171450">
+              <a:buFontTx/>
+              <a:buChar char="-"/>
+            </a:pPr>
+            <a:r>
+              <a:rPr lang="en-US" dirty="0"/>
+              <a:t>Talk about the –m option</a:t>
+            </a:r>
+          </a:p>
+          <a:p>
+            <a:pPr marL="171450" lvl="0" indent="-171450">
+              <a:buFontTx/>
+              <a:buChar char="-"/>
+            </a:pPr>
+            <a:r>
+              <a:rPr lang="en-US" dirty="0"/>
+              <a:t>Introduce git status</a:t>
+            </a:r>
+          </a:p>
+          <a:p>
+            <a:pPr marL="628650" lvl="1" indent="-171450">
+              <a:buFontTx/>
+              <a:buChar char="-"/>
+            </a:pPr>
+            <a:r>
+              <a:rPr lang="en-US" dirty="0"/>
+              <a:t>Run git status right after commit.</a:t>
+            </a:r>
+          </a:p>
+          <a:p>
+            <a:pPr marL="628650" lvl="1" indent="-171450">
+              <a:buFontTx/>
+              <a:buChar char="-"/>
+            </a:pPr>
+            <a:r>
+              <a:rPr lang="en-US" dirty="0"/>
+              <a:t>Make changes to the script.</a:t>
+            </a:r>
+          </a:p>
+          <a:p>
+            <a:pPr marL="628650" lvl="1" indent="-171450">
+              <a:buFontTx/>
+              <a:buChar char="-"/>
+            </a:pPr>
+            <a:r>
+              <a:rPr lang="en-US" dirty="0"/>
+              <a:t>Run git status again.</a:t>
+            </a:r>
+          </a:p>
+          <a:p>
+            <a:pPr marL="628650" lvl="1" indent="-171450">
+              <a:buFontTx/>
+              <a:buChar char="-"/>
+            </a:pPr>
+            <a:r>
+              <a:rPr lang="en-US" dirty="0"/>
+              <a:t>Add the script to staged area.</a:t>
+            </a:r>
+          </a:p>
+          <a:p>
+            <a:pPr marL="628650" lvl="1" indent="-171450">
+              <a:buFontTx/>
+              <a:buChar char="-"/>
+            </a:pPr>
+            <a:r>
+              <a:rPr lang="en-US" dirty="0"/>
+              <a:t>Run git status again.</a:t>
+            </a:r>
+          </a:p>
+          <a:p>
+            <a:pPr marL="628650" lvl="1" indent="-171450">
+              <a:buFontTx/>
+              <a:buChar char="-"/>
+            </a:pPr>
+            <a:r>
+              <a:rPr lang="en-US" dirty="0"/>
+              <a:t>Commit changes.</a:t>
+            </a:r>
+          </a:p>
+          <a:p>
+            <a:pPr marL="171450" lvl="0" indent="-171450">
+              <a:buFontTx/>
+              <a:buChar char="-"/>
+            </a:pPr>
+            <a:r>
+              <a:rPr lang="en-US" dirty="0"/>
+              <a:t>Talk about the lifecycle of the status of files.</a:t>
+            </a:r>
+          </a:p>
+          <a:p>
+            <a:pPr marL="171450" lvl="0" indent="-171450">
+              <a:buFontTx/>
+              <a:buChar char="-"/>
+            </a:pPr>
+            <a:r>
+              <a:rPr lang="en-US" dirty="0"/>
+              <a:t>Talk about good committing practices.</a:t>
+            </a:r>
+          </a:p>
+          <a:p>
+            <a:pPr marL="628650" lvl="1" indent="-171450">
+              <a:buFontTx/>
+              <a:buChar char="-"/>
+            </a:pPr>
+            <a:r>
+              <a:rPr lang="en-US" dirty="0"/>
+              <a:t>Committing completed code (break code into small chunks and commit each separately)</a:t>
+            </a:r>
+          </a:p>
+          <a:p>
+            <a:pPr marL="628650" lvl="1" indent="-171450">
+              <a:buFontTx/>
+              <a:buChar char="-"/>
+            </a:pPr>
+            <a:r>
+              <a:rPr lang="en-US" dirty="0"/>
+              <a:t>Commit in the imperative, telling what the code will do after the commit not what you’ve done.</a:t>
+            </a:r>
+          </a:p>
+          <a:p>
+            <a:pPr marL="628650" lvl="1" indent="-171450">
+              <a:buFontTx/>
+              <a:buChar char="-"/>
+            </a:pPr>
+            <a:r>
+              <a:rPr lang="en-US" dirty="0"/>
+              <a:t>Introduce a .</a:t>
+            </a:r>
+            <a:r>
+              <a:rPr lang="en-US" dirty="0" err="1"/>
+              <a:t>gitignore</a:t>
+            </a:r>
+            <a:r>
+              <a:rPr lang="en-US" dirty="0"/>
+              <a:t> file</a:t>
+            </a:r>
+          </a:p>
+          <a:p>
+            <a:pPr marL="1085850" lvl="2" indent="-171450">
+              <a:buFontTx/>
+              <a:buChar char="-"/>
+            </a:pPr>
+            <a:r>
+              <a:rPr lang="en-US" dirty="0"/>
+              <a:t>Blank lines and lines starting with # are ignored</a:t>
+            </a:r>
+          </a:p>
+          <a:p>
+            <a:pPr marL="1085850" lvl="2" indent="-171450">
+              <a:buFontTx/>
+              <a:buChar char="-"/>
+            </a:pPr>
+            <a:r>
+              <a:rPr lang="en-US" dirty="0"/>
+              <a:t>Standard glob patterns work (look at documentation for more information)</a:t>
+            </a:r>
+          </a:p>
+        </p:txBody>
+      </p:sp>
+      <p:sp>
+        <p:nvSpPr>
+          <p:cNvPr id="4" name="Slide Number Placeholder 3"/>
+          <p:cNvSpPr>
+            <a:spLocks noGrp="1"/>
+          </p:cNvSpPr>
+          <p:nvPr>
+            <p:ph type="sldNum" sz="quarter" idx="5"/>
+          </p:nvPr>
+        </p:nvSpPr>
+        <p:spPr/>
+        <p:txBody>
+          <a:bodyPr/>
+          <a:lstStyle/>
+          <a:p>
+            <a:fld id="{1EB1DABF-4E95-4EDF-8DA3-AD2A8632C0A3}" type="slidenum">
+              <a:rPr lang="en-US" smtClean="0"/>
+              <a:t>14</a:t>
+            </a:fld>
+            <a:endParaRPr lang="en-US"/>
+          </a:p>
+        </p:txBody>
+      </p:sp>
+    </p:spTree>
+    <p:extLst>
+      <p:ext uri="{BB962C8B-B14F-4D97-AF65-F5344CB8AC3E}">
+        <p14:creationId xmlns:p14="http://schemas.microsoft.com/office/powerpoint/2010/main" val="247569809"/>
+      </p:ext>
+    </p:extLst>
+  </p:cSld>
+  <p:clrMapOvr>
+    <a:masterClrMapping/>
+  </p:clrMapOvr>
+</p:notes>
+</file>
+
+<file path=ppt/notesSlides/notesSlide9.xml><?xml version="1.0" encoding="utf-8"?>
+<p:notes xmlns:a="http://schemas.openxmlformats.org/drawingml/2006/main" xmlns:r="http://schemas.openxmlformats.org/officeDocument/2006/relationships" xmlns:p="http://schemas.openxmlformats.org/presentationml/2006/main">
+  <p:cSld>
+    <p:spTree>
+      <p:nvGrpSpPr>
+        <p:cNvPr id="1" name=""/>
+        <p:cNvGrpSpPr/>
+        <p:nvPr/>
+      </p:nvGrpSpPr>
+      <p:grpSpPr>
+        <a:xfrm>
+          <a:off x="0" y="0"/>
+          <a:ext cx="0" cy="0"/>
+          <a:chOff x="0" y="0"/>
+          <a:chExt cx="0" cy="0"/>
+        </a:xfrm>
+      </p:grpSpPr>
+      <p:sp>
+        <p:nvSpPr>
+          <p:cNvPr id="2" name="Slide Image Placeholder 1"/>
+          <p:cNvSpPr>
+            <a:spLocks noGrp="1" noRot="1" noChangeAspect="1"/>
+          </p:cNvSpPr>
+          <p:nvPr>
+            <p:ph type="sldImg"/>
+          </p:nvPr>
+        </p:nvSpPr>
+        <p:spPr/>
+      </p:sp>
+      <p:sp>
+        <p:nvSpPr>
+          <p:cNvPr id="3" name="Notes Placeholder 2"/>
+          <p:cNvSpPr>
+            <a:spLocks noGrp="1"/>
+          </p:cNvSpPr>
+          <p:nvPr>
+            <p:ph type="body" idx="1"/>
+          </p:nvPr>
+        </p:nvSpPr>
+        <p:spPr/>
+        <p:txBody>
+          <a:bodyPr/>
+          <a:lstStyle/>
+          <a:p>
+            <a:pPr marL="171450" indent="-171450">
+              <a:buFontTx/>
+              <a:buChar char="-"/>
+            </a:pPr>
+            <a:r>
+              <a:rPr lang="en-US" dirty="0"/>
+              <a:t>We should talk about the git log options, as this is why good commit messages is so important!  </a:t>
+            </a:r>
+            <a:br>
+              <a:rPr lang="en-US" dirty="0"/>
+            </a:br>
+            <a:r>
+              <a:rPr lang="en-US" dirty="0"/>
+              <a:t>    However, it can be hard to demonstrate this with a new repository that is so small. </a:t>
+            </a:r>
+          </a:p>
+          <a:p>
+            <a:pPr marL="171450" indent="-171450">
+              <a:buFontTx/>
+              <a:buChar char="-"/>
+            </a:pPr>
+            <a:r>
+              <a:rPr lang="en-US" dirty="0"/>
+              <a:t>A good example for amend here is committing and forgetting to add a file or something.</a:t>
+            </a:r>
+          </a:p>
+          <a:p>
+            <a:pPr marL="171450" indent="-171450">
+              <a:buFontTx/>
+              <a:buChar char="-"/>
+            </a:pPr>
+            <a:r>
+              <a:rPr lang="en-US" dirty="0"/>
+              <a:t>Reset removes a staged file from the staging area.  </a:t>
+            </a:r>
+          </a:p>
+          <a:p>
+            <a:pPr marL="628650" lvl="1" indent="-171450">
+              <a:buFontTx/>
+              <a:buChar char="-"/>
+            </a:pPr>
+            <a:r>
+              <a:rPr lang="en-US" dirty="0"/>
+              <a:t>We can modify two files, but then realize we want to commit them separately.</a:t>
+            </a:r>
+          </a:p>
+          <a:p>
+            <a:pPr marL="171450" lvl="0" indent="-171450">
+              <a:buFontTx/>
+              <a:buChar char="-"/>
+            </a:pPr>
+            <a:r>
+              <a:rPr lang="en-US" dirty="0"/>
+              <a:t>Checkout -- undoes the uncommitted modifications.</a:t>
+            </a:r>
+          </a:p>
+          <a:p>
+            <a:pPr marL="628650" lvl="1" indent="-171450">
+              <a:buFontTx/>
+              <a:buChar char="-"/>
+            </a:pPr>
+            <a:r>
+              <a:rPr lang="en-US" dirty="0"/>
+              <a:t>Important to note that these changes are gone forever since they were never committed. </a:t>
+            </a:r>
+          </a:p>
+        </p:txBody>
+      </p:sp>
+      <p:sp>
+        <p:nvSpPr>
+          <p:cNvPr id="4" name="Slide Number Placeholder 3"/>
+          <p:cNvSpPr>
+            <a:spLocks noGrp="1"/>
+          </p:cNvSpPr>
+          <p:nvPr>
+            <p:ph type="sldNum" sz="quarter" idx="5"/>
+          </p:nvPr>
+        </p:nvSpPr>
+        <p:spPr/>
+        <p:txBody>
+          <a:bodyPr/>
+          <a:lstStyle/>
+          <a:p>
+            <a:fld id="{1EB1DABF-4E95-4EDF-8DA3-AD2A8632C0A3}" type="slidenum">
+              <a:rPr lang="en-US" smtClean="0"/>
+              <a:t>15</a:t>
+            </a:fld>
+            <a:endParaRPr lang="en-US"/>
+          </a:p>
+        </p:txBody>
+      </p:sp>
+    </p:spTree>
+    <p:extLst>
+      <p:ext uri="{BB962C8B-B14F-4D97-AF65-F5344CB8AC3E}">
+        <p14:creationId xmlns:p14="http://schemas.microsoft.com/office/powerpoint/2010/main" val="2020255622"/>
       </p:ext>
     </p:extLst>
   </p:cSld>
@@ -4428,6 +6794,1408 @@
 </p:sld>
 </file>
 
+<file path=ppt/slides/slide10.xml><?xml version="1.0" encoding="utf-8"?>
+<p:sld xmlns:a="http://schemas.openxmlformats.org/drawingml/2006/main" xmlns:r="http://schemas.openxmlformats.org/officeDocument/2006/relationships" xmlns:p="http://schemas.openxmlformats.org/presentationml/2006/main">
+  <p:cSld>
+    <p:spTree>
+      <p:nvGrpSpPr>
+        <p:cNvPr id="1" name=""/>
+        <p:cNvGrpSpPr/>
+        <p:nvPr/>
+      </p:nvGrpSpPr>
+      <p:grpSpPr>
+        <a:xfrm>
+          <a:off x="0" y="0"/>
+          <a:ext cx="0" cy="0"/>
+          <a:chOff x="0" y="0"/>
+          <a:chExt cx="0" cy="0"/>
+        </a:xfrm>
+      </p:grpSpPr>
+      <p:sp>
+        <p:nvSpPr>
+          <p:cNvPr id="2" name="TextBox 1">
+            <a:extLst>
+              <a:ext uri="{FF2B5EF4-FFF2-40B4-BE49-F238E27FC236}">
+                <a16:creationId xmlns:a16="http://schemas.microsoft.com/office/drawing/2014/main" id="{55B00B43-FAAB-4D22-9E01-665E407310BC}"/>
+              </a:ext>
+            </a:extLst>
+          </p:cNvPr>
+          <p:cNvSpPr txBox="1"/>
+          <p:nvPr/>
+        </p:nvSpPr>
+        <p:spPr>
+          <a:xfrm>
+            <a:off x="693173" y="929148"/>
+            <a:ext cx="3525196" cy="707886"/>
+          </a:xfrm>
+          <a:prstGeom prst="rect">
+            <a:avLst/>
+          </a:prstGeom>
+          <a:noFill/>
+        </p:spPr>
+        <p:txBody>
+          <a:bodyPr wrap="none" rtlCol="0">
+            <a:spAutoFit/>
+          </a:bodyPr>
+          <a:lstStyle/>
+          <a:p>
+            <a:r>
+              <a:rPr lang="en-US" sz="4000" dirty="0"/>
+              <a:t>Start a project…</a:t>
+            </a:r>
+          </a:p>
+        </p:txBody>
+      </p:sp>
+      <p:sp>
+        <p:nvSpPr>
+          <p:cNvPr id="3" name="TextBox 2">
+            <a:extLst>
+              <a:ext uri="{FF2B5EF4-FFF2-40B4-BE49-F238E27FC236}">
+                <a16:creationId xmlns:a16="http://schemas.microsoft.com/office/drawing/2014/main" id="{44BD550A-B530-4921-8428-01A27B6ED9C1}"/>
+              </a:ext>
+            </a:extLst>
+          </p:cNvPr>
+          <p:cNvSpPr txBox="1"/>
+          <p:nvPr/>
+        </p:nvSpPr>
+        <p:spPr>
+          <a:xfrm>
+            <a:off x="539262" y="2540000"/>
+            <a:ext cx="3555140" cy="2031325"/>
+          </a:xfrm>
+          <a:prstGeom prst="rect">
+            <a:avLst/>
+          </a:prstGeom>
+          <a:noFill/>
+        </p:spPr>
+        <p:txBody>
+          <a:bodyPr wrap="none" rtlCol="0">
+            <a:spAutoFit/>
+          </a:bodyPr>
+          <a:lstStyle/>
+          <a:p>
+            <a:pPr marL="285750" indent="-285750">
+              <a:buFont typeface="Arial" panose="020B0604020202020204" pitchFamily="34" charset="0"/>
+              <a:buChar char="•"/>
+            </a:pPr>
+            <a:r>
+              <a:rPr lang="en-US" dirty="0"/>
+              <a:t>git </a:t>
+            </a:r>
+            <a:r>
+              <a:rPr lang="en-US" dirty="0" err="1"/>
+              <a:t>init</a:t>
+            </a:r>
+            <a:r>
+              <a:rPr lang="en-US" dirty="0"/>
+              <a:t> </a:t>
+            </a:r>
+          </a:p>
+          <a:p>
+            <a:pPr marL="285750" indent="-285750">
+              <a:buFont typeface="Arial" panose="020B0604020202020204" pitchFamily="34" charset="0"/>
+              <a:buChar char="•"/>
+            </a:pPr>
+            <a:r>
+              <a:rPr lang="en-US" dirty="0"/>
+              <a:t>git add &lt;file&gt;</a:t>
+            </a:r>
+          </a:p>
+          <a:p>
+            <a:pPr marL="285750" indent="-285750">
+              <a:buFont typeface="Arial" panose="020B0604020202020204" pitchFamily="34" charset="0"/>
+              <a:buChar char="•"/>
+            </a:pPr>
+            <a:r>
+              <a:rPr lang="en-US" dirty="0"/>
+              <a:t>git commit (-m “message” -v  -a )</a:t>
+            </a:r>
+          </a:p>
+          <a:p>
+            <a:pPr marL="285750" indent="-285750">
+              <a:buFont typeface="Arial" panose="020B0604020202020204" pitchFamily="34" charset="0"/>
+              <a:buChar char="•"/>
+            </a:pPr>
+            <a:r>
+              <a:rPr lang="en-US" dirty="0"/>
+              <a:t>git status</a:t>
+            </a:r>
+          </a:p>
+          <a:p>
+            <a:pPr marL="285750" indent="-285750">
+              <a:buFont typeface="Arial" panose="020B0604020202020204" pitchFamily="34" charset="0"/>
+              <a:buChar char="•"/>
+            </a:pPr>
+            <a:r>
+              <a:rPr lang="en-US" dirty="0"/>
+              <a:t>git rm (-f) </a:t>
+            </a:r>
+          </a:p>
+          <a:p>
+            <a:pPr marL="285750" indent="-285750">
+              <a:buFont typeface="Arial" panose="020B0604020202020204" pitchFamily="34" charset="0"/>
+              <a:buChar char="•"/>
+            </a:pPr>
+            <a:r>
+              <a:rPr lang="en-US" dirty="0"/>
+              <a:t>git mv &lt;file from&gt; &lt;file to&gt;</a:t>
+            </a:r>
+          </a:p>
+          <a:p>
+            <a:pPr marL="285750" indent="-285750">
+              <a:buFont typeface="Arial" panose="020B0604020202020204" pitchFamily="34" charset="0"/>
+              <a:buChar char="•"/>
+            </a:pPr>
+            <a:endParaRPr lang="en-US" dirty="0"/>
+          </a:p>
+        </p:txBody>
+      </p:sp>
+      <p:pic>
+        <p:nvPicPr>
+          <p:cNvPr id="5" name="Picture 4">
+            <a:extLst>
+              <a:ext uri="{FF2B5EF4-FFF2-40B4-BE49-F238E27FC236}">
+                <a16:creationId xmlns:a16="http://schemas.microsoft.com/office/drawing/2014/main" id="{DE8F9182-C2C9-4342-A482-E0E8A6E2FCE1}"/>
+              </a:ext>
+            </a:extLst>
+          </p:cNvPr>
+          <p:cNvPicPr>
+            <a:picLocks noChangeAspect="1"/>
+          </p:cNvPicPr>
+          <p:nvPr/>
+        </p:nvPicPr>
+        <p:blipFill>
+          <a:blip r:embed="rId3">
+            <a:extLst>
+              <a:ext uri="{28A0092B-C50C-407E-A947-70E740481C1C}">
+                <a14:useLocalDpi xmlns:a14="http://schemas.microsoft.com/office/drawing/2010/main" val="0"/>
+              </a:ext>
+            </a:extLst>
+          </a:blip>
+          <a:stretch>
+            <a:fillRect/>
+          </a:stretch>
+        </p:blipFill>
+        <p:spPr>
+          <a:xfrm>
+            <a:off x="5359430" y="1207277"/>
+            <a:ext cx="5634079" cy="4443445"/>
+          </a:xfrm>
+          <a:prstGeom prst="rect">
+            <a:avLst/>
+          </a:prstGeom>
+        </p:spPr>
+      </p:pic>
+      <p:sp>
+        <p:nvSpPr>
+          <p:cNvPr id="6" name="TextBox 5">
+            <a:extLst>
+              <a:ext uri="{FF2B5EF4-FFF2-40B4-BE49-F238E27FC236}">
+                <a16:creationId xmlns:a16="http://schemas.microsoft.com/office/drawing/2014/main" id="{67E7404B-F048-4955-8A8A-446FBBA72125}"/>
+              </a:ext>
+            </a:extLst>
+          </p:cNvPr>
+          <p:cNvSpPr txBox="1"/>
+          <p:nvPr/>
+        </p:nvSpPr>
+        <p:spPr>
+          <a:xfrm>
+            <a:off x="9328557" y="5650722"/>
+            <a:ext cx="1591782" cy="646331"/>
+          </a:xfrm>
+          <a:prstGeom prst="rect">
+            <a:avLst/>
+          </a:prstGeom>
+          <a:noFill/>
+        </p:spPr>
+        <p:txBody>
+          <a:bodyPr wrap="none" rtlCol="0">
+            <a:spAutoFit/>
+          </a:bodyPr>
+          <a:lstStyle/>
+          <a:p>
+            <a:r>
+              <a:rPr lang="en-US" sz="3600" dirty="0">
+                <a:solidFill>
+                  <a:srgbClr val="FF0000"/>
+                </a:solidFill>
+              </a:rPr>
+              <a:t>Edit file</a:t>
+            </a:r>
+          </a:p>
+        </p:txBody>
+      </p:sp>
+    </p:spTree>
+    <p:extLst>
+      <p:ext uri="{BB962C8B-B14F-4D97-AF65-F5344CB8AC3E}">
+        <p14:creationId xmlns:p14="http://schemas.microsoft.com/office/powerpoint/2010/main" val="2713822562"/>
+      </p:ext>
+    </p:extLst>
+  </p:cSld>
+  <p:clrMapOvr>
+    <a:masterClrMapping/>
+  </p:clrMapOvr>
+</p:sld>
+</file>
+
+<file path=ppt/slides/slide11.xml><?xml version="1.0" encoding="utf-8"?>
+<p:sld xmlns:a="http://schemas.openxmlformats.org/drawingml/2006/main" xmlns:r="http://schemas.openxmlformats.org/officeDocument/2006/relationships" xmlns:p="http://schemas.openxmlformats.org/presentationml/2006/main">
+  <p:cSld>
+    <p:spTree>
+      <p:nvGrpSpPr>
+        <p:cNvPr id="1" name=""/>
+        <p:cNvGrpSpPr/>
+        <p:nvPr/>
+      </p:nvGrpSpPr>
+      <p:grpSpPr>
+        <a:xfrm>
+          <a:off x="0" y="0"/>
+          <a:ext cx="0" cy="0"/>
+          <a:chOff x="0" y="0"/>
+          <a:chExt cx="0" cy="0"/>
+        </a:xfrm>
+      </p:grpSpPr>
+      <p:sp>
+        <p:nvSpPr>
+          <p:cNvPr id="2" name="TextBox 1">
+            <a:extLst>
+              <a:ext uri="{FF2B5EF4-FFF2-40B4-BE49-F238E27FC236}">
+                <a16:creationId xmlns:a16="http://schemas.microsoft.com/office/drawing/2014/main" id="{55B00B43-FAAB-4D22-9E01-665E407310BC}"/>
+              </a:ext>
+            </a:extLst>
+          </p:cNvPr>
+          <p:cNvSpPr txBox="1"/>
+          <p:nvPr/>
+        </p:nvSpPr>
+        <p:spPr>
+          <a:xfrm>
+            <a:off x="693173" y="929148"/>
+            <a:ext cx="3525196" cy="707886"/>
+          </a:xfrm>
+          <a:prstGeom prst="rect">
+            <a:avLst/>
+          </a:prstGeom>
+          <a:noFill/>
+        </p:spPr>
+        <p:txBody>
+          <a:bodyPr wrap="none" rtlCol="0">
+            <a:spAutoFit/>
+          </a:bodyPr>
+          <a:lstStyle/>
+          <a:p>
+            <a:r>
+              <a:rPr lang="en-US" sz="4000" dirty="0"/>
+              <a:t>Start a project…</a:t>
+            </a:r>
+          </a:p>
+        </p:txBody>
+      </p:sp>
+      <p:sp>
+        <p:nvSpPr>
+          <p:cNvPr id="3" name="TextBox 2">
+            <a:extLst>
+              <a:ext uri="{FF2B5EF4-FFF2-40B4-BE49-F238E27FC236}">
+                <a16:creationId xmlns:a16="http://schemas.microsoft.com/office/drawing/2014/main" id="{44BD550A-B530-4921-8428-01A27B6ED9C1}"/>
+              </a:ext>
+            </a:extLst>
+          </p:cNvPr>
+          <p:cNvSpPr txBox="1"/>
+          <p:nvPr/>
+        </p:nvSpPr>
+        <p:spPr>
+          <a:xfrm>
+            <a:off x="539262" y="2540000"/>
+            <a:ext cx="3555140" cy="2308324"/>
+          </a:xfrm>
+          <a:prstGeom prst="rect">
+            <a:avLst/>
+          </a:prstGeom>
+          <a:noFill/>
+        </p:spPr>
+        <p:txBody>
+          <a:bodyPr wrap="none" rtlCol="0">
+            <a:spAutoFit/>
+          </a:bodyPr>
+          <a:lstStyle/>
+          <a:p>
+            <a:pPr marL="285750" indent="-285750">
+              <a:buFont typeface="Arial" panose="020B0604020202020204" pitchFamily="34" charset="0"/>
+              <a:buChar char="•"/>
+            </a:pPr>
+            <a:r>
+              <a:rPr lang="en-US" dirty="0"/>
+              <a:t>git </a:t>
+            </a:r>
+            <a:r>
+              <a:rPr lang="en-US" dirty="0" err="1"/>
+              <a:t>init</a:t>
+            </a:r>
+            <a:r>
+              <a:rPr lang="en-US" dirty="0"/>
+              <a:t> </a:t>
+            </a:r>
+          </a:p>
+          <a:p>
+            <a:pPr marL="285750" indent="-285750">
+              <a:buFont typeface="Arial" panose="020B0604020202020204" pitchFamily="34" charset="0"/>
+              <a:buChar char="•"/>
+            </a:pPr>
+            <a:r>
+              <a:rPr lang="en-US" sz="3600" dirty="0">
+                <a:solidFill>
+                  <a:srgbClr val="FF0000"/>
+                </a:solidFill>
+              </a:rPr>
+              <a:t>git add &lt;file&gt;</a:t>
+            </a:r>
+          </a:p>
+          <a:p>
+            <a:pPr marL="285750" indent="-285750">
+              <a:buFont typeface="Arial" panose="020B0604020202020204" pitchFamily="34" charset="0"/>
+              <a:buChar char="•"/>
+            </a:pPr>
+            <a:r>
+              <a:rPr lang="en-US" dirty="0"/>
+              <a:t>git commit (-m “message” -v  -a )</a:t>
+            </a:r>
+          </a:p>
+          <a:p>
+            <a:pPr marL="285750" indent="-285750">
+              <a:buFont typeface="Arial" panose="020B0604020202020204" pitchFamily="34" charset="0"/>
+              <a:buChar char="•"/>
+            </a:pPr>
+            <a:r>
+              <a:rPr lang="en-US" dirty="0"/>
+              <a:t>git status</a:t>
+            </a:r>
+          </a:p>
+          <a:p>
+            <a:pPr marL="285750" indent="-285750">
+              <a:buFont typeface="Arial" panose="020B0604020202020204" pitchFamily="34" charset="0"/>
+              <a:buChar char="•"/>
+            </a:pPr>
+            <a:r>
+              <a:rPr lang="en-US" dirty="0"/>
+              <a:t>git rm (-f) </a:t>
+            </a:r>
+          </a:p>
+          <a:p>
+            <a:pPr marL="285750" indent="-285750">
+              <a:buFont typeface="Arial" panose="020B0604020202020204" pitchFamily="34" charset="0"/>
+              <a:buChar char="•"/>
+            </a:pPr>
+            <a:r>
+              <a:rPr lang="en-US" dirty="0"/>
+              <a:t>git mv &lt;file from&gt; &lt;file to&gt;</a:t>
+            </a:r>
+          </a:p>
+          <a:p>
+            <a:pPr marL="285750" indent="-285750">
+              <a:buFont typeface="Arial" panose="020B0604020202020204" pitchFamily="34" charset="0"/>
+              <a:buChar char="•"/>
+            </a:pPr>
+            <a:endParaRPr lang="en-US" dirty="0"/>
+          </a:p>
+        </p:txBody>
+      </p:sp>
+      <p:pic>
+        <p:nvPicPr>
+          <p:cNvPr id="7" name="Picture 6">
+            <a:extLst>
+              <a:ext uri="{FF2B5EF4-FFF2-40B4-BE49-F238E27FC236}">
+                <a16:creationId xmlns:a16="http://schemas.microsoft.com/office/drawing/2014/main" id="{6EC5991A-8D20-4B52-AA2A-7F411400BEC2}"/>
+              </a:ext>
+            </a:extLst>
+          </p:cNvPr>
+          <p:cNvPicPr>
+            <a:picLocks noChangeAspect="1"/>
+          </p:cNvPicPr>
+          <p:nvPr/>
+        </p:nvPicPr>
+        <p:blipFill>
+          <a:blip r:embed="rId3">
+            <a:extLst>
+              <a:ext uri="{28A0092B-C50C-407E-A947-70E740481C1C}">
+                <a14:useLocalDpi xmlns:a14="http://schemas.microsoft.com/office/drawing/2010/main" val="0"/>
+              </a:ext>
+            </a:extLst>
+          </a:blip>
+          <a:stretch>
+            <a:fillRect/>
+          </a:stretch>
+        </p:blipFill>
+        <p:spPr>
+          <a:xfrm>
+            <a:off x="5493764" y="1209659"/>
+            <a:ext cx="5667416" cy="4438682"/>
+          </a:xfrm>
+          <a:prstGeom prst="rect">
+            <a:avLst/>
+          </a:prstGeom>
+        </p:spPr>
+      </p:pic>
+    </p:spTree>
+    <p:extLst>
+      <p:ext uri="{BB962C8B-B14F-4D97-AF65-F5344CB8AC3E}">
+        <p14:creationId xmlns:p14="http://schemas.microsoft.com/office/powerpoint/2010/main" val="3789031983"/>
+      </p:ext>
+    </p:extLst>
+  </p:cSld>
+  <p:clrMapOvr>
+    <a:masterClrMapping/>
+  </p:clrMapOvr>
+</p:sld>
+</file>
+
+<file path=ppt/slides/slide12.xml><?xml version="1.0" encoding="utf-8"?>
+<p:sld xmlns:a="http://schemas.openxmlformats.org/drawingml/2006/main" xmlns:r="http://schemas.openxmlformats.org/officeDocument/2006/relationships" xmlns:p="http://schemas.openxmlformats.org/presentationml/2006/main">
+  <p:cSld>
+    <p:spTree>
+      <p:nvGrpSpPr>
+        <p:cNvPr id="1" name=""/>
+        <p:cNvGrpSpPr/>
+        <p:nvPr/>
+      </p:nvGrpSpPr>
+      <p:grpSpPr>
+        <a:xfrm>
+          <a:off x="0" y="0"/>
+          <a:ext cx="0" cy="0"/>
+          <a:chOff x="0" y="0"/>
+          <a:chExt cx="0" cy="0"/>
+        </a:xfrm>
+      </p:grpSpPr>
+      <p:sp>
+        <p:nvSpPr>
+          <p:cNvPr id="2" name="TextBox 1">
+            <a:extLst>
+              <a:ext uri="{FF2B5EF4-FFF2-40B4-BE49-F238E27FC236}">
+                <a16:creationId xmlns:a16="http://schemas.microsoft.com/office/drawing/2014/main" id="{55B00B43-FAAB-4D22-9E01-665E407310BC}"/>
+              </a:ext>
+            </a:extLst>
+          </p:cNvPr>
+          <p:cNvSpPr txBox="1"/>
+          <p:nvPr/>
+        </p:nvSpPr>
+        <p:spPr>
+          <a:xfrm>
+            <a:off x="693173" y="929148"/>
+            <a:ext cx="3525196" cy="707886"/>
+          </a:xfrm>
+          <a:prstGeom prst="rect">
+            <a:avLst/>
+          </a:prstGeom>
+          <a:noFill/>
+        </p:spPr>
+        <p:txBody>
+          <a:bodyPr wrap="none" rtlCol="0">
+            <a:spAutoFit/>
+          </a:bodyPr>
+          <a:lstStyle/>
+          <a:p>
+            <a:r>
+              <a:rPr lang="en-US" sz="4000" dirty="0"/>
+              <a:t>Start a project…</a:t>
+            </a:r>
+          </a:p>
+        </p:txBody>
+      </p:sp>
+      <p:sp>
+        <p:nvSpPr>
+          <p:cNvPr id="3" name="TextBox 2">
+            <a:extLst>
+              <a:ext uri="{FF2B5EF4-FFF2-40B4-BE49-F238E27FC236}">
+                <a16:creationId xmlns:a16="http://schemas.microsoft.com/office/drawing/2014/main" id="{44BD550A-B530-4921-8428-01A27B6ED9C1}"/>
+              </a:ext>
+            </a:extLst>
+          </p:cNvPr>
+          <p:cNvSpPr txBox="1"/>
+          <p:nvPr/>
+        </p:nvSpPr>
+        <p:spPr>
+          <a:xfrm>
+            <a:off x="539262" y="2540000"/>
+            <a:ext cx="5028300" cy="2862322"/>
+          </a:xfrm>
+          <a:prstGeom prst="rect">
+            <a:avLst/>
+          </a:prstGeom>
+          <a:noFill/>
+        </p:spPr>
+        <p:txBody>
+          <a:bodyPr wrap="none" rtlCol="0">
+            <a:spAutoFit/>
+          </a:bodyPr>
+          <a:lstStyle/>
+          <a:p>
+            <a:pPr marL="285750" indent="-285750">
+              <a:buFont typeface="Arial" panose="020B0604020202020204" pitchFamily="34" charset="0"/>
+              <a:buChar char="•"/>
+            </a:pPr>
+            <a:r>
+              <a:rPr lang="en-US" dirty="0"/>
+              <a:t>git </a:t>
+            </a:r>
+            <a:r>
+              <a:rPr lang="en-US" dirty="0" err="1"/>
+              <a:t>init</a:t>
+            </a:r>
+            <a:r>
+              <a:rPr lang="en-US" dirty="0"/>
+              <a:t> </a:t>
+            </a:r>
+          </a:p>
+          <a:p>
+            <a:pPr marL="285750" indent="-285750">
+              <a:buFont typeface="Arial" panose="020B0604020202020204" pitchFamily="34" charset="0"/>
+              <a:buChar char="•"/>
+            </a:pPr>
+            <a:r>
+              <a:rPr lang="en-US" dirty="0"/>
+              <a:t>git add &lt;file&gt;</a:t>
+            </a:r>
+          </a:p>
+          <a:p>
+            <a:pPr marL="285750" indent="-285750">
+              <a:buFont typeface="Arial" panose="020B0604020202020204" pitchFamily="34" charset="0"/>
+              <a:buChar char="•"/>
+            </a:pPr>
+            <a:r>
+              <a:rPr lang="en-US" sz="3600" dirty="0">
+                <a:solidFill>
+                  <a:srgbClr val="FF0000"/>
+                </a:solidFill>
+              </a:rPr>
+              <a:t>git commit </a:t>
+            </a:r>
+            <a:br>
+              <a:rPr lang="en-US" sz="3600" dirty="0">
+                <a:solidFill>
+                  <a:srgbClr val="FF0000"/>
+                </a:solidFill>
+              </a:rPr>
+            </a:br>
+            <a:r>
+              <a:rPr lang="en-US" sz="3600" dirty="0">
+                <a:solidFill>
+                  <a:srgbClr val="FF0000"/>
+                </a:solidFill>
+              </a:rPr>
+              <a:t>     (-m “message” -v  -a )</a:t>
+            </a:r>
+          </a:p>
+          <a:p>
+            <a:pPr marL="285750" indent="-285750">
+              <a:buFont typeface="Arial" panose="020B0604020202020204" pitchFamily="34" charset="0"/>
+              <a:buChar char="•"/>
+            </a:pPr>
+            <a:r>
+              <a:rPr lang="en-US" dirty="0"/>
+              <a:t>git status</a:t>
+            </a:r>
+          </a:p>
+          <a:p>
+            <a:pPr marL="285750" indent="-285750">
+              <a:buFont typeface="Arial" panose="020B0604020202020204" pitchFamily="34" charset="0"/>
+              <a:buChar char="•"/>
+            </a:pPr>
+            <a:r>
+              <a:rPr lang="en-US" dirty="0"/>
+              <a:t>git rm (-f) </a:t>
+            </a:r>
+          </a:p>
+          <a:p>
+            <a:pPr marL="285750" indent="-285750">
+              <a:buFont typeface="Arial" panose="020B0604020202020204" pitchFamily="34" charset="0"/>
+              <a:buChar char="•"/>
+            </a:pPr>
+            <a:r>
+              <a:rPr lang="en-US" dirty="0"/>
+              <a:t>git mv &lt;file from&gt; &lt;file to&gt;</a:t>
+            </a:r>
+          </a:p>
+          <a:p>
+            <a:pPr marL="285750" indent="-285750">
+              <a:buFont typeface="Arial" panose="020B0604020202020204" pitchFamily="34" charset="0"/>
+              <a:buChar char="•"/>
+            </a:pPr>
+            <a:endParaRPr lang="en-US" dirty="0"/>
+          </a:p>
+        </p:txBody>
+      </p:sp>
+      <p:pic>
+        <p:nvPicPr>
+          <p:cNvPr id="6" name="Picture 5">
+            <a:extLst>
+              <a:ext uri="{FF2B5EF4-FFF2-40B4-BE49-F238E27FC236}">
+                <a16:creationId xmlns:a16="http://schemas.microsoft.com/office/drawing/2014/main" id="{7B944D41-3838-416C-81B0-FE8567ED4E46}"/>
+              </a:ext>
+            </a:extLst>
+          </p:cNvPr>
+          <p:cNvPicPr>
+            <a:picLocks noChangeAspect="1"/>
+          </p:cNvPicPr>
+          <p:nvPr/>
+        </p:nvPicPr>
+        <p:blipFill>
+          <a:blip r:embed="rId3">
+            <a:extLst>
+              <a:ext uri="{28A0092B-C50C-407E-A947-70E740481C1C}">
+                <a14:useLocalDpi xmlns:a14="http://schemas.microsoft.com/office/drawing/2010/main" val="0"/>
+              </a:ext>
+            </a:extLst>
+          </a:blip>
+          <a:stretch>
+            <a:fillRect/>
+          </a:stretch>
+        </p:blipFill>
+        <p:spPr>
+          <a:xfrm>
+            <a:off x="5755210" y="1146173"/>
+            <a:ext cx="5743617" cy="4448208"/>
+          </a:xfrm>
+          <a:prstGeom prst="rect">
+            <a:avLst/>
+          </a:prstGeom>
+        </p:spPr>
+      </p:pic>
+    </p:spTree>
+    <p:extLst>
+      <p:ext uri="{BB962C8B-B14F-4D97-AF65-F5344CB8AC3E}">
+        <p14:creationId xmlns:p14="http://schemas.microsoft.com/office/powerpoint/2010/main" val="3292544045"/>
+      </p:ext>
+    </p:extLst>
+  </p:cSld>
+  <p:clrMapOvr>
+    <a:masterClrMapping/>
+  </p:clrMapOvr>
+</p:sld>
+</file>
+
+<file path=ppt/slides/slide13.xml><?xml version="1.0" encoding="utf-8"?>
+<p:sld xmlns:a="http://schemas.openxmlformats.org/drawingml/2006/main" xmlns:r="http://schemas.openxmlformats.org/officeDocument/2006/relationships" xmlns:p="http://schemas.openxmlformats.org/presentationml/2006/main">
+  <p:cSld>
+    <p:spTree>
+      <p:nvGrpSpPr>
+        <p:cNvPr id="1" name=""/>
+        <p:cNvGrpSpPr/>
+        <p:nvPr/>
+      </p:nvGrpSpPr>
+      <p:grpSpPr>
+        <a:xfrm>
+          <a:off x="0" y="0"/>
+          <a:ext cx="0" cy="0"/>
+          <a:chOff x="0" y="0"/>
+          <a:chExt cx="0" cy="0"/>
+        </a:xfrm>
+      </p:grpSpPr>
+      <p:sp>
+        <p:nvSpPr>
+          <p:cNvPr id="2" name="TextBox 1">
+            <a:extLst>
+              <a:ext uri="{FF2B5EF4-FFF2-40B4-BE49-F238E27FC236}">
+                <a16:creationId xmlns:a16="http://schemas.microsoft.com/office/drawing/2014/main" id="{55B00B43-FAAB-4D22-9E01-665E407310BC}"/>
+              </a:ext>
+            </a:extLst>
+          </p:cNvPr>
+          <p:cNvSpPr txBox="1"/>
+          <p:nvPr/>
+        </p:nvSpPr>
+        <p:spPr>
+          <a:xfrm>
+            <a:off x="693173" y="929148"/>
+            <a:ext cx="3525196" cy="707886"/>
+          </a:xfrm>
+          <a:prstGeom prst="rect">
+            <a:avLst/>
+          </a:prstGeom>
+          <a:noFill/>
+        </p:spPr>
+        <p:txBody>
+          <a:bodyPr wrap="none" rtlCol="0">
+            <a:spAutoFit/>
+          </a:bodyPr>
+          <a:lstStyle/>
+          <a:p>
+            <a:r>
+              <a:rPr lang="en-US" sz="4000" dirty="0"/>
+              <a:t>Start a project…</a:t>
+            </a:r>
+          </a:p>
+        </p:txBody>
+      </p:sp>
+      <p:sp>
+        <p:nvSpPr>
+          <p:cNvPr id="3" name="TextBox 2">
+            <a:extLst>
+              <a:ext uri="{FF2B5EF4-FFF2-40B4-BE49-F238E27FC236}">
+                <a16:creationId xmlns:a16="http://schemas.microsoft.com/office/drawing/2014/main" id="{44BD550A-B530-4921-8428-01A27B6ED9C1}"/>
+              </a:ext>
+            </a:extLst>
+          </p:cNvPr>
+          <p:cNvSpPr txBox="1"/>
+          <p:nvPr/>
+        </p:nvSpPr>
+        <p:spPr>
+          <a:xfrm>
+            <a:off x="539262" y="2540000"/>
+            <a:ext cx="3555140" cy="2031325"/>
+          </a:xfrm>
+          <a:prstGeom prst="rect">
+            <a:avLst/>
+          </a:prstGeom>
+          <a:noFill/>
+        </p:spPr>
+        <p:txBody>
+          <a:bodyPr wrap="none" rtlCol="0">
+            <a:spAutoFit/>
+          </a:bodyPr>
+          <a:lstStyle/>
+          <a:p>
+            <a:pPr marL="285750" indent="-285750">
+              <a:buFont typeface="Arial" panose="020B0604020202020204" pitchFamily="34" charset="0"/>
+              <a:buChar char="•"/>
+            </a:pPr>
+            <a:r>
+              <a:rPr lang="en-US" dirty="0"/>
+              <a:t>git </a:t>
+            </a:r>
+            <a:r>
+              <a:rPr lang="en-US" dirty="0" err="1"/>
+              <a:t>init</a:t>
+            </a:r>
+            <a:r>
+              <a:rPr lang="en-US" dirty="0"/>
+              <a:t> </a:t>
+            </a:r>
+          </a:p>
+          <a:p>
+            <a:pPr marL="285750" indent="-285750">
+              <a:buFont typeface="Arial" panose="020B0604020202020204" pitchFamily="34" charset="0"/>
+              <a:buChar char="•"/>
+            </a:pPr>
+            <a:r>
+              <a:rPr lang="en-US" dirty="0"/>
+              <a:t>git add &lt;file&gt;</a:t>
+            </a:r>
+          </a:p>
+          <a:p>
+            <a:pPr marL="285750" indent="-285750">
+              <a:buFont typeface="Arial" panose="020B0604020202020204" pitchFamily="34" charset="0"/>
+              <a:buChar char="•"/>
+            </a:pPr>
+            <a:r>
+              <a:rPr lang="en-US" dirty="0"/>
+              <a:t>git commit (-m “message” -v  -a )</a:t>
+            </a:r>
+          </a:p>
+          <a:p>
+            <a:pPr marL="285750" indent="-285750">
+              <a:buFont typeface="Arial" panose="020B0604020202020204" pitchFamily="34" charset="0"/>
+              <a:buChar char="•"/>
+            </a:pPr>
+            <a:r>
+              <a:rPr lang="en-US" dirty="0"/>
+              <a:t>git status</a:t>
+            </a:r>
+          </a:p>
+          <a:p>
+            <a:pPr marL="285750" indent="-285750">
+              <a:buFont typeface="Arial" panose="020B0604020202020204" pitchFamily="34" charset="0"/>
+              <a:buChar char="•"/>
+            </a:pPr>
+            <a:r>
+              <a:rPr lang="en-US" dirty="0"/>
+              <a:t>git rm (-f) </a:t>
+            </a:r>
+          </a:p>
+          <a:p>
+            <a:pPr marL="285750" indent="-285750">
+              <a:buFont typeface="Arial" panose="020B0604020202020204" pitchFamily="34" charset="0"/>
+              <a:buChar char="•"/>
+            </a:pPr>
+            <a:r>
+              <a:rPr lang="en-US" dirty="0"/>
+              <a:t>git mv &lt;file from&gt; &lt;file to&gt;</a:t>
+            </a:r>
+          </a:p>
+          <a:p>
+            <a:pPr marL="285750" indent="-285750">
+              <a:buFont typeface="Arial" panose="020B0604020202020204" pitchFamily="34" charset="0"/>
+              <a:buChar char="•"/>
+            </a:pPr>
+            <a:endParaRPr lang="en-US" dirty="0"/>
+          </a:p>
+        </p:txBody>
+      </p:sp>
+      <p:pic>
+        <p:nvPicPr>
+          <p:cNvPr id="5" name="Picture 4">
+            <a:extLst>
+              <a:ext uri="{FF2B5EF4-FFF2-40B4-BE49-F238E27FC236}">
+                <a16:creationId xmlns:a16="http://schemas.microsoft.com/office/drawing/2014/main" id="{F7297BD4-7251-4BE0-9549-9A11764221AE}"/>
+              </a:ext>
+            </a:extLst>
+          </p:cNvPr>
+          <p:cNvPicPr>
+            <a:picLocks noChangeAspect="1"/>
+          </p:cNvPicPr>
+          <p:nvPr/>
+        </p:nvPicPr>
+        <p:blipFill>
+          <a:blip r:embed="rId3">
+            <a:extLst>
+              <a:ext uri="{28A0092B-C50C-407E-A947-70E740481C1C}">
+                <a14:useLocalDpi xmlns:a14="http://schemas.microsoft.com/office/drawing/2010/main" val="0"/>
+              </a:ext>
+            </a:extLst>
+          </a:blip>
+          <a:stretch>
+            <a:fillRect/>
+          </a:stretch>
+        </p:blipFill>
+        <p:spPr>
+          <a:xfrm>
+            <a:off x="5357485" y="1281551"/>
+            <a:ext cx="5772192" cy="4548221"/>
+          </a:xfrm>
+          <a:prstGeom prst="rect">
+            <a:avLst/>
+          </a:prstGeom>
+        </p:spPr>
+      </p:pic>
+    </p:spTree>
+    <p:extLst>
+      <p:ext uri="{BB962C8B-B14F-4D97-AF65-F5344CB8AC3E}">
+        <p14:creationId xmlns:p14="http://schemas.microsoft.com/office/powerpoint/2010/main" val="185190426"/>
+      </p:ext>
+    </p:extLst>
+  </p:cSld>
+  <p:clrMapOvr>
+    <a:masterClrMapping/>
+  </p:clrMapOvr>
+</p:sld>
+</file>
+
+<file path=ppt/slides/slide14.xml><?xml version="1.0" encoding="utf-8"?>
+<p:sld xmlns:a="http://schemas.openxmlformats.org/drawingml/2006/main" xmlns:r="http://schemas.openxmlformats.org/officeDocument/2006/relationships" xmlns:p="http://schemas.openxmlformats.org/presentationml/2006/main">
+  <p:cSld>
+    <p:spTree>
+      <p:nvGrpSpPr>
+        <p:cNvPr id="1" name=""/>
+        <p:cNvGrpSpPr/>
+        <p:nvPr/>
+      </p:nvGrpSpPr>
+      <p:grpSpPr>
+        <a:xfrm>
+          <a:off x="0" y="0"/>
+          <a:ext cx="0" cy="0"/>
+          <a:chOff x="0" y="0"/>
+          <a:chExt cx="0" cy="0"/>
+        </a:xfrm>
+      </p:grpSpPr>
+      <p:sp>
+        <p:nvSpPr>
+          <p:cNvPr id="2" name="TextBox 1">
+            <a:extLst>
+              <a:ext uri="{FF2B5EF4-FFF2-40B4-BE49-F238E27FC236}">
+                <a16:creationId xmlns:a16="http://schemas.microsoft.com/office/drawing/2014/main" id="{55B00B43-FAAB-4D22-9E01-665E407310BC}"/>
+              </a:ext>
+            </a:extLst>
+          </p:cNvPr>
+          <p:cNvSpPr txBox="1"/>
+          <p:nvPr/>
+        </p:nvSpPr>
+        <p:spPr>
+          <a:xfrm>
+            <a:off x="693173" y="929148"/>
+            <a:ext cx="3525196" cy="707886"/>
+          </a:xfrm>
+          <a:prstGeom prst="rect">
+            <a:avLst/>
+          </a:prstGeom>
+          <a:noFill/>
+        </p:spPr>
+        <p:txBody>
+          <a:bodyPr wrap="none" rtlCol="0">
+            <a:spAutoFit/>
+          </a:bodyPr>
+          <a:lstStyle/>
+          <a:p>
+            <a:r>
+              <a:rPr lang="en-US" sz="4000" dirty="0"/>
+              <a:t>Start a project…</a:t>
+            </a:r>
+          </a:p>
+        </p:txBody>
+      </p:sp>
+      <p:sp>
+        <p:nvSpPr>
+          <p:cNvPr id="3" name="TextBox 2">
+            <a:extLst>
+              <a:ext uri="{FF2B5EF4-FFF2-40B4-BE49-F238E27FC236}">
+                <a16:creationId xmlns:a16="http://schemas.microsoft.com/office/drawing/2014/main" id="{44BD550A-B530-4921-8428-01A27B6ED9C1}"/>
+              </a:ext>
+            </a:extLst>
+          </p:cNvPr>
+          <p:cNvSpPr txBox="1"/>
+          <p:nvPr/>
+        </p:nvSpPr>
+        <p:spPr>
+          <a:xfrm>
+            <a:off x="539262" y="2540000"/>
+            <a:ext cx="3555140" cy="2031325"/>
+          </a:xfrm>
+          <a:prstGeom prst="rect">
+            <a:avLst/>
+          </a:prstGeom>
+          <a:noFill/>
+        </p:spPr>
+        <p:txBody>
+          <a:bodyPr wrap="none" rtlCol="0">
+            <a:spAutoFit/>
+          </a:bodyPr>
+          <a:lstStyle/>
+          <a:p>
+            <a:pPr marL="285750" indent="-285750">
+              <a:buFont typeface="Arial" panose="020B0604020202020204" pitchFamily="34" charset="0"/>
+              <a:buChar char="•"/>
+            </a:pPr>
+            <a:r>
+              <a:rPr lang="en-US" dirty="0"/>
+              <a:t>git </a:t>
+            </a:r>
+            <a:r>
+              <a:rPr lang="en-US" dirty="0" err="1"/>
+              <a:t>init</a:t>
+            </a:r>
+            <a:r>
+              <a:rPr lang="en-US" dirty="0"/>
+              <a:t> </a:t>
+            </a:r>
+          </a:p>
+          <a:p>
+            <a:pPr marL="285750" indent="-285750">
+              <a:buFont typeface="Arial" panose="020B0604020202020204" pitchFamily="34" charset="0"/>
+              <a:buChar char="•"/>
+            </a:pPr>
+            <a:r>
+              <a:rPr lang="en-US" dirty="0"/>
+              <a:t>git add &lt;file&gt;</a:t>
+            </a:r>
+          </a:p>
+          <a:p>
+            <a:pPr marL="285750" indent="-285750">
+              <a:buFont typeface="Arial" panose="020B0604020202020204" pitchFamily="34" charset="0"/>
+              <a:buChar char="•"/>
+            </a:pPr>
+            <a:r>
+              <a:rPr lang="en-US" dirty="0"/>
+              <a:t>git commit (-m “message” -v  -a )</a:t>
+            </a:r>
+          </a:p>
+          <a:p>
+            <a:pPr marL="285750" indent="-285750">
+              <a:buFont typeface="Arial" panose="020B0604020202020204" pitchFamily="34" charset="0"/>
+              <a:buChar char="•"/>
+            </a:pPr>
+            <a:r>
+              <a:rPr lang="en-US" dirty="0"/>
+              <a:t>git status</a:t>
+            </a:r>
+          </a:p>
+          <a:p>
+            <a:pPr marL="285750" indent="-285750">
+              <a:buFont typeface="Arial" panose="020B0604020202020204" pitchFamily="34" charset="0"/>
+              <a:buChar char="•"/>
+            </a:pPr>
+            <a:r>
+              <a:rPr lang="en-US" dirty="0"/>
+              <a:t>git rm (-f) </a:t>
+            </a:r>
+          </a:p>
+          <a:p>
+            <a:pPr marL="285750" indent="-285750">
+              <a:buFont typeface="Arial" panose="020B0604020202020204" pitchFamily="34" charset="0"/>
+              <a:buChar char="•"/>
+            </a:pPr>
+            <a:r>
+              <a:rPr lang="en-US" dirty="0"/>
+              <a:t>git mv &lt;file from&gt; &lt;file to&gt;</a:t>
+            </a:r>
+          </a:p>
+          <a:p>
+            <a:pPr marL="285750" indent="-285750">
+              <a:buFont typeface="Arial" panose="020B0604020202020204" pitchFamily="34" charset="0"/>
+              <a:buChar char="•"/>
+            </a:pPr>
+            <a:endParaRPr lang="en-US" dirty="0"/>
+          </a:p>
+        </p:txBody>
+      </p:sp>
+      <p:pic>
+        <p:nvPicPr>
+          <p:cNvPr id="9" name="Picture 8">
+            <a:extLst>
+              <a:ext uri="{FF2B5EF4-FFF2-40B4-BE49-F238E27FC236}">
+                <a16:creationId xmlns:a16="http://schemas.microsoft.com/office/drawing/2014/main" id="{446D10BE-0B40-4016-84CA-885D6BF83C91}"/>
+              </a:ext>
+            </a:extLst>
+          </p:cNvPr>
+          <p:cNvPicPr>
+            <a:picLocks noChangeAspect="1"/>
+          </p:cNvPicPr>
+          <p:nvPr/>
+        </p:nvPicPr>
+        <p:blipFill>
+          <a:blip r:embed="rId3">
+            <a:extLst>
+              <a:ext uri="{28A0092B-C50C-407E-A947-70E740481C1C}">
+                <a14:useLocalDpi xmlns:a14="http://schemas.microsoft.com/office/drawing/2010/main" val="0"/>
+              </a:ext>
+            </a:extLst>
+          </a:blip>
+          <a:stretch>
+            <a:fillRect/>
+          </a:stretch>
+        </p:blipFill>
+        <p:spPr>
+          <a:xfrm>
+            <a:off x="4218369" y="1866204"/>
+            <a:ext cx="7652416" cy="3471703"/>
+          </a:xfrm>
+          <a:prstGeom prst="rect">
+            <a:avLst/>
+          </a:prstGeom>
+        </p:spPr>
+      </p:pic>
+    </p:spTree>
+    <p:extLst>
+      <p:ext uri="{BB962C8B-B14F-4D97-AF65-F5344CB8AC3E}">
+        <p14:creationId xmlns:p14="http://schemas.microsoft.com/office/powerpoint/2010/main" val="1724446679"/>
+      </p:ext>
+    </p:extLst>
+  </p:cSld>
+  <p:clrMapOvr>
+    <a:masterClrMapping/>
+  </p:clrMapOvr>
+</p:sld>
+</file>
+
+<file path=ppt/slides/slide15.xml><?xml version="1.0" encoding="utf-8"?>
+<p:sld xmlns:a="http://schemas.openxmlformats.org/drawingml/2006/main" xmlns:r="http://schemas.openxmlformats.org/officeDocument/2006/relationships" xmlns:p="http://schemas.openxmlformats.org/presentationml/2006/main">
+  <p:cSld>
+    <p:spTree>
+      <p:nvGrpSpPr>
+        <p:cNvPr id="1" name=""/>
+        <p:cNvGrpSpPr/>
+        <p:nvPr/>
+      </p:nvGrpSpPr>
+      <p:grpSpPr>
+        <a:xfrm>
+          <a:off x="0" y="0"/>
+          <a:ext cx="0" cy="0"/>
+          <a:chOff x="0" y="0"/>
+          <a:chExt cx="0" cy="0"/>
+        </a:xfrm>
+      </p:grpSpPr>
+      <p:sp>
+        <p:nvSpPr>
+          <p:cNvPr id="2" name="TextBox 1">
+            <a:extLst>
+              <a:ext uri="{FF2B5EF4-FFF2-40B4-BE49-F238E27FC236}">
+                <a16:creationId xmlns:a16="http://schemas.microsoft.com/office/drawing/2014/main" id="{853BC810-96FC-4778-AC48-82A38DB08855}"/>
+              </a:ext>
+            </a:extLst>
+          </p:cNvPr>
+          <p:cNvSpPr txBox="1"/>
+          <p:nvPr/>
+        </p:nvSpPr>
+        <p:spPr>
+          <a:xfrm>
+            <a:off x="539261" y="476738"/>
+            <a:ext cx="6315383" cy="707886"/>
+          </a:xfrm>
+          <a:prstGeom prst="rect">
+            <a:avLst/>
+          </a:prstGeom>
+          <a:noFill/>
+        </p:spPr>
+        <p:txBody>
+          <a:bodyPr wrap="none" rtlCol="0">
+            <a:spAutoFit/>
+          </a:bodyPr>
+          <a:lstStyle/>
+          <a:p>
+            <a:r>
+              <a:rPr lang="en-US" sz="4000" dirty="0"/>
+              <a:t>View and undo your project…</a:t>
+            </a:r>
+          </a:p>
+        </p:txBody>
+      </p:sp>
+      <p:sp>
+        <p:nvSpPr>
+          <p:cNvPr id="3" name="TextBox 2">
+            <a:extLst>
+              <a:ext uri="{FF2B5EF4-FFF2-40B4-BE49-F238E27FC236}">
+                <a16:creationId xmlns:a16="http://schemas.microsoft.com/office/drawing/2014/main" id="{93E51470-F363-4361-9879-3DA6F22EA45E}"/>
+              </a:ext>
+            </a:extLst>
+          </p:cNvPr>
+          <p:cNvSpPr txBox="1"/>
+          <p:nvPr/>
+        </p:nvSpPr>
+        <p:spPr>
+          <a:xfrm>
+            <a:off x="3102708" y="2274277"/>
+            <a:ext cx="5080045" cy="2031325"/>
+          </a:xfrm>
+          <a:prstGeom prst="rect">
+            <a:avLst/>
+          </a:prstGeom>
+          <a:noFill/>
+        </p:spPr>
+        <p:txBody>
+          <a:bodyPr wrap="none" rtlCol="0">
+            <a:spAutoFit/>
+          </a:bodyPr>
+          <a:lstStyle/>
+          <a:p>
+            <a:pPr marL="285750" indent="-285750">
+              <a:buFont typeface="Arial" panose="020B0604020202020204" pitchFamily="34" charset="0"/>
+              <a:buChar char="•"/>
+            </a:pPr>
+            <a:r>
+              <a:rPr lang="en-US" dirty="0"/>
+              <a:t>git log (-p -&lt;n&gt; --since=&lt;“date”&gt; --until=&lt;“date”&gt; </a:t>
+            </a:r>
+            <a:br>
+              <a:rPr lang="en-US" dirty="0"/>
+            </a:br>
+            <a:r>
+              <a:rPr lang="en-US" dirty="0"/>
+              <a:t>	-pretty=</a:t>
+            </a:r>
+            <a:r>
+              <a:rPr lang="en-US" dirty="0" err="1"/>
+              <a:t>oneline</a:t>
+            </a:r>
+            <a:r>
+              <a:rPr lang="en-US" dirty="0"/>
+              <a:t>, short, full, fuller --graph  </a:t>
+            </a:r>
+            <a:br>
+              <a:rPr lang="en-US" dirty="0"/>
+            </a:br>
+            <a:r>
+              <a:rPr lang="en-US" dirty="0"/>
+              <a:t>	--author=&lt;“name”&gt; --grep=&lt;“pattern”&gt;)</a:t>
+            </a:r>
+          </a:p>
+          <a:p>
+            <a:pPr marL="285750" indent="-285750">
+              <a:buFont typeface="Arial" panose="020B0604020202020204" pitchFamily="34" charset="0"/>
+              <a:buChar char="•"/>
+            </a:pPr>
+            <a:r>
+              <a:rPr lang="en-US" dirty="0"/>
+              <a:t>git commit --amend </a:t>
+            </a:r>
+          </a:p>
+          <a:p>
+            <a:pPr marL="285750" indent="-285750">
+              <a:buFont typeface="Arial" panose="020B0604020202020204" pitchFamily="34" charset="0"/>
+              <a:buChar char="•"/>
+            </a:pPr>
+            <a:r>
+              <a:rPr lang="en-US" dirty="0"/>
+              <a:t>git reset HEAD &lt;file&gt;</a:t>
+            </a:r>
+          </a:p>
+          <a:p>
+            <a:pPr marL="285750" indent="-285750">
+              <a:buFont typeface="Arial" panose="020B0604020202020204" pitchFamily="34" charset="0"/>
+              <a:buChar char="•"/>
+            </a:pPr>
+            <a:r>
+              <a:rPr lang="en-US" dirty="0"/>
+              <a:t>git checkout -- &lt;file&gt;</a:t>
+            </a:r>
+          </a:p>
+          <a:p>
+            <a:pPr marL="285750" indent="-285750">
+              <a:buFont typeface="Arial" panose="020B0604020202020204" pitchFamily="34" charset="0"/>
+              <a:buChar char="•"/>
+            </a:pPr>
+            <a:endParaRPr lang="en-US" dirty="0"/>
+          </a:p>
+        </p:txBody>
+      </p:sp>
+    </p:spTree>
+    <p:extLst>
+      <p:ext uri="{BB962C8B-B14F-4D97-AF65-F5344CB8AC3E}">
+        <p14:creationId xmlns:p14="http://schemas.microsoft.com/office/powerpoint/2010/main" val="794676230"/>
+      </p:ext>
+    </p:extLst>
+  </p:cSld>
+  <p:clrMapOvr>
+    <a:masterClrMapping/>
+  </p:clrMapOvr>
+</p:sld>
+</file>
+
+<file path=ppt/slides/slide16.xml><?xml version="1.0" encoding="utf-8"?>
+<p:sld xmlns:a="http://schemas.openxmlformats.org/drawingml/2006/main" xmlns:r="http://schemas.openxmlformats.org/officeDocument/2006/relationships" xmlns:p="http://schemas.openxmlformats.org/presentationml/2006/main">
+  <p:cSld>
+    <p:spTree>
+      <p:nvGrpSpPr>
+        <p:cNvPr id="1" name=""/>
+        <p:cNvGrpSpPr/>
+        <p:nvPr/>
+      </p:nvGrpSpPr>
+      <p:grpSpPr>
+        <a:xfrm>
+          <a:off x="0" y="0"/>
+          <a:ext cx="0" cy="0"/>
+          <a:chOff x="0" y="0"/>
+          <a:chExt cx="0" cy="0"/>
+        </a:xfrm>
+      </p:grpSpPr>
+      <p:sp>
+        <p:nvSpPr>
+          <p:cNvPr id="2" name="TextBox 1">
+            <a:extLst>
+              <a:ext uri="{FF2B5EF4-FFF2-40B4-BE49-F238E27FC236}">
+                <a16:creationId xmlns:a16="http://schemas.microsoft.com/office/drawing/2014/main" id="{211E321F-9F54-498F-BD6F-D26DA9D4DE07}"/>
+              </a:ext>
+            </a:extLst>
+          </p:cNvPr>
+          <p:cNvSpPr txBox="1"/>
+          <p:nvPr/>
+        </p:nvSpPr>
+        <p:spPr>
+          <a:xfrm>
+            <a:off x="586153" y="406400"/>
+            <a:ext cx="2650790" cy="707886"/>
+          </a:xfrm>
+          <a:prstGeom prst="rect">
+            <a:avLst/>
+          </a:prstGeom>
+          <a:noFill/>
+        </p:spPr>
+        <p:txBody>
+          <a:bodyPr wrap="none" rtlCol="0">
+            <a:spAutoFit/>
+          </a:bodyPr>
+          <a:lstStyle/>
+          <a:p>
+            <a:r>
+              <a:rPr lang="en-US" sz="4000" dirty="0"/>
+              <a:t>Branching…</a:t>
+            </a:r>
+          </a:p>
+        </p:txBody>
+      </p:sp>
+      <p:sp>
+        <p:nvSpPr>
+          <p:cNvPr id="3" name="TextBox 2">
+            <a:extLst>
+              <a:ext uri="{FF2B5EF4-FFF2-40B4-BE49-F238E27FC236}">
+                <a16:creationId xmlns:a16="http://schemas.microsoft.com/office/drawing/2014/main" id="{CAF814E6-FC94-4AA4-8BDA-EB411A456B88}"/>
+              </a:ext>
+            </a:extLst>
+          </p:cNvPr>
+          <p:cNvSpPr txBox="1"/>
+          <p:nvPr/>
+        </p:nvSpPr>
+        <p:spPr>
+          <a:xfrm>
+            <a:off x="667149" y="2287244"/>
+            <a:ext cx="3572132" cy="1477328"/>
+          </a:xfrm>
+          <a:prstGeom prst="rect">
+            <a:avLst/>
+          </a:prstGeom>
+          <a:noFill/>
+        </p:spPr>
+        <p:txBody>
+          <a:bodyPr wrap="none" rtlCol="0">
+            <a:spAutoFit/>
+          </a:bodyPr>
+          <a:lstStyle/>
+          <a:p>
+            <a:pPr marL="285750" indent="-285750">
+              <a:buFont typeface="Arial" panose="020B0604020202020204" pitchFamily="34" charset="0"/>
+              <a:buChar char="•"/>
+            </a:pPr>
+            <a:r>
+              <a:rPr lang="en-US" dirty="0"/>
+              <a:t>git branch (-d -v) &lt;name&gt;</a:t>
+            </a:r>
+          </a:p>
+          <a:p>
+            <a:pPr marL="285750" indent="-285750">
+              <a:buFont typeface="Arial" panose="020B0604020202020204" pitchFamily="34" charset="0"/>
+              <a:buChar char="•"/>
+            </a:pPr>
+            <a:r>
+              <a:rPr lang="en-US" dirty="0"/>
+              <a:t>git checkout </a:t>
+            </a:r>
+            <a:r>
+              <a:rPr lang="en-US"/>
+              <a:t>(-b) </a:t>
+            </a:r>
+            <a:r>
+              <a:rPr lang="en-US" dirty="0"/>
+              <a:t>&lt;branch name&gt;</a:t>
+            </a:r>
+          </a:p>
+          <a:p>
+            <a:pPr marL="285750" indent="-285750">
+              <a:buFont typeface="Arial" panose="020B0604020202020204" pitchFamily="34" charset="0"/>
+              <a:buChar char="•"/>
+            </a:pPr>
+            <a:r>
+              <a:rPr lang="en-US" dirty="0"/>
+              <a:t>git stash </a:t>
+            </a:r>
+          </a:p>
+          <a:p>
+            <a:pPr marL="285750" indent="-285750">
+              <a:buFont typeface="Arial" panose="020B0604020202020204" pitchFamily="34" charset="0"/>
+              <a:buChar char="•"/>
+            </a:pPr>
+            <a:r>
+              <a:rPr lang="en-US" dirty="0"/>
+              <a:t>git merge &lt;branch name&gt;</a:t>
+            </a:r>
+          </a:p>
+          <a:p>
+            <a:pPr marL="285750" indent="-285750">
+              <a:buFont typeface="Arial" panose="020B0604020202020204" pitchFamily="34" charset="0"/>
+              <a:buChar char="•"/>
+            </a:pPr>
+            <a:r>
+              <a:rPr lang="en-US" dirty="0"/>
+              <a:t>git rebase &lt;new base&gt;</a:t>
+            </a:r>
+          </a:p>
+        </p:txBody>
+      </p:sp>
+    </p:spTree>
+    <p:extLst>
+      <p:ext uri="{BB962C8B-B14F-4D97-AF65-F5344CB8AC3E}">
+        <p14:creationId xmlns:p14="http://schemas.microsoft.com/office/powerpoint/2010/main" val="2830206149"/>
+      </p:ext>
+    </p:extLst>
+  </p:cSld>
+  <p:clrMapOvr>
+    <a:masterClrMapping/>
+  </p:clrMapOvr>
+</p:sld>
+</file>
+
 <file path=ppt/slides/slide2.xml><?xml version="1.0" encoding="utf-8"?>
 <p:sld xmlns:a="http://schemas.openxmlformats.org/drawingml/2006/main" xmlns:r="http://schemas.openxmlformats.org/officeDocument/2006/relationships" xmlns:p="http://schemas.openxmlformats.org/presentationml/2006/main">
   <p:cSld>
@@ -6148,7 +9916,7 @@
         <p:spPr>
           <a:xfrm>
             <a:off x="539262" y="2540000"/>
-            <a:ext cx="3555140" cy="2031325"/>
+            <a:ext cx="3555140" cy="2308324"/>
           </a:xfrm>
           <a:prstGeom prst="rect">
             <a:avLst/>
@@ -6166,15 +9934,27 @@
               <a:buChar char="•"/>
             </a:pPr>
             <a:r>
-              <a:rPr lang="en-US" dirty="0"/>
+              <a:rPr lang="en-US" sz="3600" dirty="0">
+                <a:solidFill>
+                  <a:srgbClr val="FF0000"/>
+                </a:solidFill>
+              </a:rPr>
               <a:t>git </a:t>
             </a:r>
             <a:r>
-              <a:rPr lang="en-US" dirty="0" err="1"/>
+              <a:rPr lang="en-US" sz="3600" dirty="0" err="1">
+                <a:solidFill>
+                  <a:srgbClr val="FF0000"/>
+                </a:solidFill>
+              </a:rPr>
               <a:t>init</a:t>
             </a:r>
             <a:r>
-              <a:rPr lang="en-US" dirty="0"/>
+              <a:rPr lang="en-US" sz="3600" dirty="0">
+                <a:solidFill>
+                  <a:srgbClr val="FF0000"/>
+                </a:solidFill>
+              </a:rPr>
               <a:t> </a:t>
             </a:r>
           </a:p>
@@ -6239,10 +10019,10 @@
       </p:sp>
       <p:pic>
         <p:nvPicPr>
-          <p:cNvPr id="9" name="Picture 8">
+          <p:cNvPr id="5" name="Picture 4">
             <a:extLst>
               <a:ext uri="{FF2B5EF4-FFF2-40B4-BE49-F238E27FC236}">
-                <a16:creationId xmlns:a16="http://schemas.microsoft.com/office/drawing/2014/main" id="{446D10BE-0B40-4016-84CA-885D6BF83C91}"/>
+                <a16:creationId xmlns:a16="http://schemas.microsoft.com/office/drawing/2014/main" id="{112ED2F0-754D-47F1-A3A6-975440657C94}"/>
               </a:ext>
             </a:extLst>
           </p:cNvPr>
@@ -6265,8 +10045,8 @@
         </p:blipFill>
         <p:spPr>
           <a:xfrm>
-            <a:off x="4218369" y="1866204"/>
-            <a:ext cx="7652416" cy="3471703"/>
+            <a:off x="5092299" y="1212040"/>
+            <a:ext cx="5762667" cy="4433920"/>
           </a:xfrm>
           <a:prstGeom prst="rect">
             <a:avLst/>
@@ -6276,7 +10056,7 @@
     </p:spTree>
     <p:extLst>
       <p:ext uri="{BB962C8B-B14F-4D97-AF65-F5344CB8AC3E}">
-        <p14:creationId xmlns:p14="http://schemas.microsoft.com/office/powerpoint/2010/main" val="2713822562"/>
+        <p14:creationId xmlns:p14="http://schemas.microsoft.com/office/powerpoint/2010/main" val="1712338094"/>
       </p:ext>
     </p:extLst>
   </p:cSld>
@@ -6308,7 +10088,7 @@
           <p:cNvPr id="2" name="TextBox 1">
             <a:extLst>
               <a:ext uri="{FF2B5EF4-FFF2-40B4-BE49-F238E27FC236}">
-                <a16:creationId xmlns:a16="http://schemas.microsoft.com/office/drawing/2014/main" id="{853BC810-96FC-4778-AC48-82A38DB08855}"/>
+                <a16:creationId xmlns:a16="http://schemas.microsoft.com/office/drawing/2014/main" id="{55B00B43-FAAB-4D22-9E01-665E407310BC}"/>
               </a:ext>
             </a:extLst>
           </p:cNvPr>
@@ -6317,8 +10097,8 @@
         </p:nvSpPr>
         <p:spPr>
           <a:xfrm>
-            <a:off x="539261" y="476738"/>
-            <a:ext cx="6315383" cy="707886"/>
+            <a:off x="693173" y="929148"/>
+            <a:ext cx="3525196" cy="707886"/>
           </a:xfrm>
           <a:prstGeom prst="rect">
             <a:avLst/>
@@ -6333,7 +10113,7 @@
           <a:p>
             <a:r>
               <a:rPr lang="en-US" sz="4000" dirty="0"/>
-              <a:t>View and undo your project…</a:t>
+              <a:t>Start a project…</a:t>
             </a:r>
           </a:p>
         </p:txBody>
@@ -6343,7 +10123,7 @@
           <p:cNvPr id="3" name="TextBox 2">
             <a:extLst>
               <a:ext uri="{FF2B5EF4-FFF2-40B4-BE49-F238E27FC236}">
-                <a16:creationId xmlns:a16="http://schemas.microsoft.com/office/drawing/2014/main" id="{93E51470-F363-4361-9879-3DA6F22EA45E}"/>
+                <a16:creationId xmlns:a16="http://schemas.microsoft.com/office/drawing/2014/main" id="{44BD550A-B530-4921-8428-01A27B6ED9C1}"/>
               </a:ext>
             </a:extLst>
           </p:cNvPr>
@@ -6352,8 +10132,8 @@
         </p:nvSpPr>
         <p:spPr>
           <a:xfrm>
-            <a:off x="3102708" y="2274277"/>
-            <a:ext cx="5080045" cy="2031325"/>
+            <a:off x="539262" y="2540000"/>
+            <a:ext cx="3555140" cy="2308324"/>
           </a:xfrm>
           <a:prstGeom prst="rect">
             <a:avLst/>
@@ -6372,29 +10152,15 @@
             </a:pPr>
             <a:r>
               <a:rPr lang="en-US" dirty="0"/>
-              <a:t>git log (-p -&lt;n&gt; --since=&lt;“date”&gt; --until=&lt;“date”&gt; </a:t>
-            </a:r>
-            <a:br>
-              <a:rPr lang="en-US" dirty="0"/>
-            </a:br>
-            <a:r>
-              <a:rPr lang="en-US" dirty="0"/>
-              <a:t>	-pretty=</a:t>
+              <a:t>git </a:t>
             </a:r>
             <a:r>
               <a:rPr lang="en-US" dirty="0" err="1"/>
-              <a:t>oneline</a:t>
-            </a:r>
-            <a:r>
-              <a:rPr lang="en-US" dirty="0"/>
-              <a:t>, short, full, fuller --graph  </a:t>
-            </a:r>
-            <a:br>
-              <a:rPr lang="en-US" dirty="0"/>
-            </a:br>
-            <a:r>
-              <a:rPr lang="en-US" dirty="0"/>
-              <a:t>	--author=&lt;“name”&gt; --grep=&lt;“pattern”&gt;)</a:t>
+              <a:t>init</a:t>
+            </a:r>
+            <a:r>
+              <a:rPr lang="en-US" dirty="0"/>
+              <a:t> </a:t>
             </a:r>
           </a:p>
           <a:p>
@@ -6403,8 +10169,12 @@
               <a:buChar char="•"/>
             </a:pPr>
             <a:r>
-              <a:rPr lang="en-US" dirty="0"/>
-              <a:t>git commit --amend </a:t>
+              <a:rPr lang="en-US" sz="3600" dirty="0">
+                <a:solidFill>
+                  <a:srgbClr val="FF0000"/>
+                </a:solidFill>
+              </a:rPr>
+              <a:t>git add &lt;file&gt;</a:t>
             </a:r>
           </a:p>
           <a:p>
@@ -6414,7 +10184,7 @@
             </a:pPr>
             <a:r>
               <a:rPr lang="en-US" dirty="0"/>
-              <a:t>git reset HEAD &lt;file&gt;</a:t>
+              <a:t>git commit (-m “message” -v  -a )</a:t>
             </a:r>
           </a:p>
           <a:p>
@@ -6424,7 +10194,7 @@
             </a:pPr>
             <a:r>
               <a:rPr lang="en-US" dirty="0"/>
-              <a:t>git checkout -- &lt;file&gt;</a:t>
+              <a:t>git status</a:t>
             </a:r>
           </a:p>
           <a:p>
@@ -6432,14 +10202,70 @@
               <a:buFont typeface="Arial" panose="020B0604020202020204" pitchFamily="34" charset="0"/>
               <a:buChar char="•"/>
             </a:pPr>
+            <a:r>
+              <a:rPr lang="en-US" dirty="0"/>
+              <a:t>git rm (-f) </a:t>
+            </a:r>
+          </a:p>
+          <a:p>
+            <a:pPr marL="285750" indent="-285750">
+              <a:buFont typeface="Arial" panose="020B0604020202020204" pitchFamily="34" charset="0"/>
+              <a:buChar char="•"/>
+            </a:pPr>
+            <a:r>
+              <a:rPr lang="en-US" dirty="0"/>
+              <a:t>git mv &lt;file from&gt; &lt;file to&gt;</a:t>
+            </a:r>
+          </a:p>
+          <a:p>
+            <a:pPr marL="285750" indent="-285750">
+              <a:buFont typeface="Arial" panose="020B0604020202020204" pitchFamily="34" charset="0"/>
+              <a:buChar char="•"/>
+            </a:pPr>
             <a:endParaRPr lang="en-US" dirty="0"/>
           </a:p>
         </p:txBody>
       </p:sp>
+      <p:pic>
+        <p:nvPicPr>
+          <p:cNvPr id="5" name="Picture 4">
+            <a:extLst>
+              <a:ext uri="{FF2B5EF4-FFF2-40B4-BE49-F238E27FC236}">
+                <a16:creationId xmlns:a16="http://schemas.microsoft.com/office/drawing/2014/main" id="{B5E49BF3-BC9E-45CB-ABBA-B17DC5E044DE}"/>
+              </a:ext>
+            </a:extLst>
+          </p:cNvPr>
+          <p:cNvPicPr>
+            <a:picLocks noChangeAspect="1"/>
+          </p:cNvPicPr>
+          <p:nvPr/>
+        </p:nvPicPr>
+        <p:blipFill>
+          <a:blip r:embed="rId3">
+            <a:extLst>
+              <a:ext uri="{28A0092B-C50C-407E-A947-70E740481C1C}">
+                <a14:useLocalDpi xmlns:a14="http://schemas.microsoft.com/office/drawing/2010/main" val="0"/>
+              </a:ext>
+            </a:extLst>
+          </a:blip>
+          <a:stretch>
+            <a:fillRect/>
+          </a:stretch>
+        </p:blipFill>
+        <p:spPr>
+          <a:xfrm>
+            <a:off x="5223410" y="1476425"/>
+            <a:ext cx="5748380" cy="4291044"/>
+          </a:xfrm>
+          <a:prstGeom prst="rect">
+            <a:avLst/>
+          </a:prstGeom>
+        </p:spPr>
+      </p:pic>
     </p:spTree>
     <p:extLst>
       <p:ext uri="{BB962C8B-B14F-4D97-AF65-F5344CB8AC3E}">
-        <p14:creationId xmlns:p14="http://schemas.microsoft.com/office/powerpoint/2010/main" val="794676230"/>
+        <p14:creationId xmlns:p14="http://schemas.microsoft.com/office/powerpoint/2010/main" val="3045418433"/>
       </p:ext>
     </p:extLst>
   </p:cSld>
@@ -6471,7 +10297,7 @@
           <p:cNvPr id="2" name="TextBox 1">
             <a:extLst>
               <a:ext uri="{FF2B5EF4-FFF2-40B4-BE49-F238E27FC236}">
-                <a16:creationId xmlns:a16="http://schemas.microsoft.com/office/drawing/2014/main" id="{211E321F-9F54-498F-BD6F-D26DA9D4DE07}"/>
+                <a16:creationId xmlns:a16="http://schemas.microsoft.com/office/drawing/2014/main" id="{55B00B43-FAAB-4D22-9E01-665E407310BC}"/>
               </a:ext>
             </a:extLst>
           </p:cNvPr>
@@ -6480,8 +10306,8 @@
         </p:nvSpPr>
         <p:spPr>
           <a:xfrm>
-            <a:off x="586153" y="406400"/>
-            <a:ext cx="2650790" cy="707886"/>
+            <a:off x="693173" y="929148"/>
+            <a:ext cx="3525196" cy="707886"/>
           </a:xfrm>
           <a:prstGeom prst="rect">
             <a:avLst/>
@@ -6496,7 +10322,7 @@
           <a:p>
             <a:r>
               <a:rPr lang="en-US" sz="4000" dirty="0"/>
-              <a:t>Branching…</a:t>
+              <a:t>Start a project…</a:t>
             </a:r>
           </a:p>
         </p:txBody>
@@ -6506,7 +10332,7 @@
           <p:cNvPr id="3" name="TextBox 2">
             <a:extLst>
               <a:ext uri="{FF2B5EF4-FFF2-40B4-BE49-F238E27FC236}">
-                <a16:creationId xmlns:a16="http://schemas.microsoft.com/office/drawing/2014/main" id="{CAF814E6-FC94-4AA4-8BDA-EB411A456B88}"/>
+                <a16:creationId xmlns:a16="http://schemas.microsoft.com/office/drawing/2014/main" id="{44BD550A-B530-4921-8428-01A27B6ED9C1}"/>
               </a:ext>
             </a:extLst>
           </p:cNvPr>
@@ -6515,8 +10341,8 @@
         </p:nvSpPr>
         <p:spPr>
           <a:xfrm>
-            <a:off x="667149" y="2287244"/>
-            <a:ext cx="3572132" cy="1477328"/>
+            <a:off x="539262" y="2540000"/>
+            <a:ext cx="5028300" cy="2862322"/>
           </a:xfrm>
           <a:prstGeom prst="rect">
             <a:avLst/>
@@ -6535,7 +10361,15 @@
             </a:pPr>
             <a:r>
               <a:rPr lang="en-US" dirty="0"/>
-              <a:t>git branch (-d -v) &lt;name&gt;</a:t>
+              <a:t>git </a:t>
+            </a:r>
+            <a:r>
+              <a:rPr lang="en-US" dirty="0" err="1"/>
+              <a:t>init</a:t>
+            </a:r>
+            <a:r>
+              <a:rPr lang="en-US" dirty="0"/>
+              <a:t> </a:t>
             </a:r>
           </a:p>
           <a:p>
@@ -6545,15 +10379,7 @@
             </a:pPr>
             <a:r>
               <a:rPr lang="en-US" dirty="0"/>
-              <a:t>git checkout </a:t>
-            </a:r>
-            <a:r>
-              <a:rPr lang="en-US"/>
-              <a:t>(-b) </a:t>
-            </a:r>
-            <a:r>
-              <a:rPr lang="en-US" dirty="0"/>
-              <a:t>&lt;branch name&gt;</a:t>
+              <a:t>git add &lt;file&gt;</a:t>
             </a:r>
           </a:p>
           <a:p>
@@ -6562,8 +10388,27 @@
               <a:buChar char="•"/>
             </a:pPr>
             <a:r>
-              <a:rPr lang="en-US" dirty="0"/>
-              <a:t>git stash </a:t>
+              <a:rPr lang="en-US" sz="3600" dirty="0">
+                <a:solidFill>
+                  <a:srgbClr val="FF0000"/>
+                </a:solidFill>
+              </a:rPr>
+              <a:t>git commit </a:t>
+            </a:r>
+            <a:br>
+              <a:rPr lang="en-US" sz="3600" dirty="0">
+                <a:solidFill>
+                  <a:srgbClr val="FF0000"/>
+                </a:solidFill>
+              </a:rPr>
+            </a:br>
+            <a:r>
+              <a:rPr lang="en-US" sz="3600" dirty="0">
+                <a:solidFill>
+                  <a:srgbClr val="FF0000"/>
+                </a:solidFill>
+              </a:rPr>
+              <a:t>     (-m “message” -v  -a )</a:t>
             </a:r>
           </a:p>
           <a:p>
@@ -6573,7 +10418,7 @@
             </a:pPr>
             <a:r>
               <a:rPr lang="en-US" dirty="0"/>
-              <a:t>git merge &lt;branch name&gt;</a:t>
+              <a:t>git status</a:t>
             </a:r>
           </a:p>
           <a:p>
@@ -6583,15 +10428,68 @@
             </a:pPr>
             <a:r>
               <a:rPr lang="en-US" dirty="0"/>
-              <a:t>git rebase &lt;new base&gt;</a:t>
-            </a:r>
-          </a:p>
-        </p:txBody>
-      </p:sp>
+              <a:t>git rm (-f) </a:t>
+            </a:r>
+          </a:p>
+          <a:p>
+            <a:pPr marL="285750" indent="-285750">
+              <a:buFont typeface="Arial" panose="020B0604020202020204" pitchFamily="34" charset="0"/>
+              <a:buChar char="•"/>
+            </a:pPr>
+            <a:r>
+              <a:rPr lang="en-US" dirty="0"/>
+              <a:t>git mv &lt;file from&gt; &lt;file to&gt;</a:t>
+            </a:r>
+          </a:p>
+          <a:p>
+            <a:pPr marL="285750" indent="-285750">
+              <a:buFont typeface="Arial" panose="020B0604020202020204" pitchFamily="34" charset="0"/>
+              <a:buChar char="•"/>
+            </a:pPr>
+            <a:endParaRPr lang="en-US" dirty="0"/>
+          </a:p>
+        </p:txBody>
+      </p:sp>
+      <p:pic>
+        <p:nvPicPr>
+          <p:cNvPr id="5" name="Picture 4">
+            <a:extLst>
+              <a:ext uri="{FF2B5EF4-FFF2-40B4-BE49-F238E27FC236}">
+                <a16:creationId xmlns:a16="http://schemas.microsoft.com/office/drawing/2014/main" id="{9C246DE7-CB84-40C4-AD16-B8FA7268B4A1}"/>
+              </a:ext>
+            </a:extLst>
+          </p:cNvPr>
+          <p:cNvPicPr>
+            <a:picLocks noChangeAspect="1"/>
+          </p:cNvPicPr>
+          <p:nvPr/>
+        </p:nvPicPr>
+        <p:blipFill>
+          <a:blip r:embed="rId3">
+            <a:extLst>
+              <a:ext uri="{28A0092B-C50C-407E-A947-70E740481C1C}">
+                <a14:useLocalDpi xmlns:a14="http://schemas.microsoft.com/office/drawing/2010/main" val="0"/>
+              </a:ext>
+            </a:extLst>
+          </a:blip>
+          <a:stretch>
+            <a:fillRect/>
+          </a:stretch>
+        </p:blipFill>
+        <p:spPr>
+          <a:xfrm>
+            <a:off x="5511568" y="1077925"/>
+            <a:ext cx="5615029" cy="4467258"/>
+          </a:xfrm>
+          <a:prstGeom prst="rect">
+            <a:avLst/>
+          </a:prstGeom>
+        </p:spPr>
+      </p:pic>
     </p:spTree>
     <p:extLst>
       <p:ext uri="{BB962C8B-B14F-4D97-AF65-F5344CB8AC3E}">
-        <p14:creationId xmlns:p14="http://schemas.microsoft.com/office/powerpoint/2010/main" val="2830206149"/>
+        <p14:creationId xmlns:p14="http://schemas.microsoft.com/office/powerpoint/2010/main" val="3318592949"/>
       </p:ext>
     </p:extLst>
   </p:cSld>

</xml_diff>

<commit_message>
Added slides and figures explaining branching more.
</commit_message>
<xml_diff>
--- a/learn-to-git.pptx
+++ b/learn-to-git.pptx
@@ -5,7 +5,7 @@
     <p:sldMasterId id="2147483648" r:id="rId1"/>
   </p:sldMasterIdLst>
   <p:notesMasterIdLst>
-    <p:notesMasterId r:id="rId18"/>
+    <p:notesMasterId r:id="rId27"/>
   </p:notesMasterIdLst>
   <p:sldIdLst>
     <p:sldId id="256" r:id="rId2"/>
@@ -24,6 +24,15 @@
     <p:sldId id="273" r:id="rId15"/>
     <p:sldId id="263" r:id="rId16"/>
     <p:sldId id="264" r:id="rId17"/>
+    <p:sldId id="274" r:id="rId18"/>
+    <p:sldId id="276" r:id="rId19"/>
+    <p:sldId id="275" r:id="rId20"/>
+    <p:sldId id="277" r:id="rId21"/>
+    <p:sldId id="280" r:id="rId22"/>
+    <p:sldId id="278" r:id="rId23"/>
+    <p:sldId id="281" r:id="rId24"/>
+    <p:sldId id="279" r:id="rId25"/>
+    <p:sldId id="282" r:id="rId26"/>
   </p:sldIdLst>
   <p:sldSz cx="12192000" cy="6858000"/>
   <p:notesSz cx="6858000" cy="9144000"/>
@@ -984,6 +993,1599 @@
     <p:extLst>
       <p:ext uri="{BB962C8B-B14F-4D97-AF65-F5344CB8AC3E}">
         <p14:creationId xmlns:p14="http://schemas.microsoft.com/office/powerpoint/2010/main" val="1524038481"/>
+      </p:ext>
+    </p:extLst>
+  </p:cSld>
+  <p:clrMapOvr>
+    <a:masterClrMapping/>
+  </p:clrMapOvr>
+</p:notes>
+</file>
+
+<file path=ppt/notesSlides/notesSlide11.xml><?xml version="1.0" encoding="utf-8"?>
+<p:notes xmlns:a="http://schemas.openxmlformats.org/drawingml/2006/main" xmlns:r="http://schemas.openxmlformats.org/officeDocument/2006/relationships" xmlns:p="http://schemas.openxmlformats.org/presentationml/2006/main">
+  <p:cSld>
+    <p:spTree>
+      <p:nvGrpSpPr>
+        <p:cNvPr id="1" name=""/>
+        <p:cNvGrpSpPr/>
+        <p:nvPr/>
+      </p:nvGrpSpPr>
+      <p:grpSpPr>
+        <a:xfrm>
+          <a:off x="0" y="0"/>
+          <a:ext cx="0" cy="0"/>
+          <a:chOff x="0" y="0"/>
+          <a:chExt cx="0" cy="0"/>
+        </a:xfrm>
+      </p:grpSpPr>
+      <p:sp>
+        <p:nvSpPr>
+          <p:cNvPr id="2" name="Slide Image Placeholder 1"/>
+          <p:cNvSpPr>
+            <a:spLocks noGrp="1" noRot="1" noChangeAspect="1"/>
+          </p:cNvSpPr>
+          <p:nvPr>
+            <p:ph type="sldImg"/>
+          </p:nvPr>
+        </p:nvSpPr>
+        <p:spPr/>
+      </p:sp>
+      <p:sp>
+        <p:nvSpPr>
+          <p:cNvPr id="3" name="Notes Placeholder 2"/>
+          <p:cNvSpPr>
+            <a:spLocks noGrp="1"/>
+          </p:cNvSpPr>
+          <p:nvPr>
+            <p:ph type="body" idx="1"/>
+          </p:nvPr>
+        </p:nvSpPr>
+        <p:spPr/>
+        <p:txBody>
+          <a:bodyPr/>
+          <a:lstStyle/>
+          <a:p>
+            <a:pPr marL="171450" indent="-171450">
+              <a:buFontTx/>
+              <a:buChar char="-"/>
+            </a:pPr>
+            <a:r>
+              <a:rPr lang="en-US" dirty="0"/>
+              <a:t>Talk about good branching practices.  </a:t>
+            </a:r>
+          </a:p>
+          <a:p>
+            <a:pPr marL="628650" lvl="1" indent="-171450">
+              <a:buFontTx/>
+              <a:buChar char="-"/>
+            </a:pPr>
+            <a:r>
+              <a:rPr lang="en-US" dirty="0"/>
+              <a:t>Branch often for testing and additions. </a:t>
+            </a:r>
+          </a:p>
+          <a:p>
+            <a:pPr marL="171450" indent="-171450">
+              <a:buFontTx/>
+              <a:buChar char="-"/>
+            </a:pPr>
+            <a:r>
+              <a:rPr lang="en-US" dirty="0"/>
+              <a:t>Git won’t let you switch branches without a clean working directory. </a:t>
+            </a:r>
+          </a:p>
+          <a:p>
+            <a:pPr marL="628650" lvl="1" indent="-171450">
+              <a:buFontTx/>
+              <a:buChar char="-"/>
+            </a:pPr>
+            <a:r>
+              <a:rPr lang="en-US" dirty="0"/>
+              <a:t>One option is to use git stash</a:t>
+            </a:r>
+          </a:p>
+          <a:p>
+            <a:pPr marL="628650" lvl="1" indent="-171450">
+              <a:buFontTx/>
+              <a:buChar char="-"/>
+            </a:pPr>
+            <a:r>
+              <a:rPr lang="en-US" dirty="0"/>
+              <a:t>Another option is to use commit amending</a:t>
+            </a:r>
+          </a:p>
+          <a:p>
+            <a:pPr marL="171450" lvl="0" indent="-171450">
+              <a:buFontTx/>
+              <a:buChar char="-"/>
+            </a:pPr>
+            <a:r>
+              <a:rPr lang="en-US" dirty="0"/>
+              <a:t>In the case of a merge conflict, you can use git status.</a:t>
+            </a:r>
+          </a:p>
+          <a:p>
+            <a:pPr marL="628650" lvl="1" indent="-171450">
+              <a:buFontTx/>
+              <a:buChar char="-"/>
+            </a:pPr>
+            <a:r>
+              <a:rPr lang="en-US" dirty="0"/>
+              <a:t>Show how to handle merge conflicts in a text based code file.</a:t>
+            </a:r>
+          </a:p>
+          <a:p>
+            <a:pPr marL="628650" lvl="1" indent="-171450">
+              <a:buFontTx/>
+              <a:buChar char="-"/>
+            </a:pPr>
+            <a:r>
+              <a:rPr lang="en-US" dirty="0"/>
+              <a:t>Show how </a:t>
+            </a:r>
+            <a:r>
+              <a:rPr lang="en-US" dirty="0" err="1"/>
+              <a:t>Lishi</a:t>
+            </a:r>
+            <a:r>
+              <a:rPr lang="en-US" dirty="0"/>
+              <a:t> and I handled merge </a:t>
+            </a:r>
+            <a:r>
+              <a:rPr lang="en-US" dirty="0" err="1"/>
+              <a:t>coflicts</a:t>
+            </a:r>
+            <a:r>
+              <a:rPr lang="en-US" dirty="0"/>
+              <a:t> with the presentation.</a:t>
+            </a:r>
+          </a:p>
+        </p:txBody>
+      </p:sp>
+      <p:sp>
+        <p:nvSpPr>
+          <p:cNvPr id="4" name="Slide Number Placeholder 3"/>
+          <p:cNvSpPr>
+            <a:spLocks noGrp="1"/>
+          </p:cNvSpPr>
+          <p:nvPr>
+            <p:ph type="sldNum" sz="quarter" idx="5"/>
+          </p:nvPr>
+        </p:nvSpPr>
+        <p:spPr/>
+        <p:txBody>
+          <a:bodyPr/>
+          <a:lstStyle/>
+          <a:p>
+            <a:fld id="{1EB1DABF-4E95-4EDF-8DA3-AD2A8632C0A3}" type="slidenum">
+              <a:rPr lang="en-US" smtClean="0"/>
+              <a:t>17</a:t>
+            </a:fld>
+            <a:endParaRPr lang="en-US"/>
+          </a:p>
+        </p:txBody>
+      </p:sp>
+    </p:spTree>
+    <p:extLst>
+      <p:ext uri="{BB962C8B-B14F-4D97-AF65-F5344CB8AC3E}">
+        <p14:creationId xmlns:p14="http://schemas.microsoft.com/office/powerpoint/2010/main" val="1822363587"/>
+      </p:ext>
+    </p:extLst>
+  </p:cSld>
+  <p:clrMapOvr>
+    <a:masterClrMapping/>
+  </p:clrMapOvr>
+</p:notes>
+</file>
+
+<file path=ppt/notesSlides/notesSlide12.xml><?xml version="1.0" encoding="utf-8"?>
+<p:notes xmlns:a="http://schemas.openxmlformats.org/drawingml/2006/main" xmlns:r="http://schemas.openxmlformats.org/officeDocument/2006/relationships" xmlns:p="http://schemas.openxmlformats.org/presentationml/2006/main">
+  <p:cSld>
+    <p:spTree>
+      <p:nvGrpSpPr>
+        <p:cNvPr id="1" name=""/>
+        <p:cNvGrpSpPr/>
+        <p:nvPr/>
+      </p:nvGrpSpPr>
+      <p:grpSpPr>
+        <a:xfrm>
+          <a:off x="0" y="0"/>
+          <a:ext cx="0" cy="0"/>
+          <a:chOff x="0" y="0"/>
+          <a:chExt cx="0" cy="0"/>
+        </a:xfrm>
+      </p:grpSpPr>
+      <p:sp>
+        <p:nvSpPr>
+          <p:cNvPr id="2" name="Slide Image Placeholder 1"/>
+          <p:cNvSpPr>
+            <a:spLocks noGrp="1" noRot="1" noChangeAspect="1"/>
+          </p:cNvSpPr>
+          <p:nvPr>
+            <p:ph type="sldImg"/>
+          </p:nvPr>
+        </p:nvSpPr>
+        <p:spPr/>
+      </p:sp>
+      <p:sp>
+        <p:nvSpPr>
+          <p:cNvPr id="3" name="Notes Placeholder 2"/>
+          <p:cNvSpPr>
+            <a:spLocks noGrp="1"/>
+          </p:cNvSpPr>
+          <p:nvPr>
+            <p:ph type="body" idx="1"/>
+          </p:nvPr>
+        </p:nvSpPr>
+        <p:spPr/>
+        <p:txBody>
+          <a:bodyPr/>
+          <a:lstStyle/>
+          <a:p>
+            <a:pPr marL="171450" indent="-171450">
+              <a:buFontTx/>
+              <a:buChar char="-"/>
+            </a:pPr>
+            <a:r>
+              <a:rPr lang="en-US" dirty="0"/>
+              <a:t>Talk about good branching practices.  </a:t>
+            </a:r>
+          </a:p>
+          <a:p>
+            <a:pPr marL="628650" lvl="1" indent="-171450">
+              <a:buFontTx/>
+              <a:buChar char="-"/>
+            </a:pPr>
+            <a:r>
+              <a:rPr lang="en-US" dirty="0"/>
+              <a:t>Branch often for testing and additions. </a:t>
+            </a:r>
+          </a:p>
+          <a:p>
+            <a:pPr marL="171450" indent="-171450">
+              <a:buFontTx/>
+              <a:buChar char="-"/>
+            </a:pPr>
+            <a:r>
+              <a:rPr lang="en-US" dirty="0"/>
+              <a:t>Git won’t let you switch branches without a clean working directory. </a:t>
+            </a:r>
+          </a:p>
+          <a:p>
+            <a:pPr marL="628650" lvl="1" indent="-171450">
+              <a:buFontTx/>
+              <a:buChar char="-"/>
+            </a:pPr>
+            <a:r>
+              <a:rPr lang="en-US" dirty="0"/>
+              <a:t>One option is to use git stash</a:t>
+            </a:r>
+          </a:p>
+          <a:p>
+            <a:pPr marL="628650" lvl="1" indent="-171450">
+              <a:buFontTx/>
+              <a:buChar char="-"/>
+            </a:pPr>
+            <a:r>
+              <a:rPr lang="en-US" dirty="0"/>
+              <a:t>Another option is to use commit amending</a:t>
+            </a:r>
+          </a:p>
+          <a:p>
+            <a:pPr marL="171450" lvl="0" indent="-171450">
+              <a:buFontTx/>
+              <a:buChar char="-"/>
+            </a:pPr>
+            <a:r>
+              <a:rPr lang="en-US" dirty="0"/>
+              <a:t>In the case of a merge conflict, you can use git status.</a:t>
+            </a:r>
+          </a:p>
+          <a:p>
+            <a:pPr marL="628650" lvl="1" indent="-171450">
+              <a:buFontTx/>
+              <a:buChar char="-"/>
+            </a:pPr>
+            <a:r>
+              <a:rPr lang="en-US" dirty="0"/>
+              <a:t>Show how to handle merge conflicts in a text based code file.</a:t>
+            </a:r>
+          </a:p>
+          <a:p>
+            <a:pPr marL="628650" lvl="1" indent="-171450">
+              <a:buFontTx/>
+              <a:buChar char="-"/>
+            </a:pPr>
+            <a:r>
+              <a:rPr lang="en-US" dirty="0"/>
+              <a:t>Show how </a:t>
+            </a:r>
+            <a:r>
+              <a:rPr lang="en-US" dirty="0" err="1"/>
+              <a:t>Lishi</a:t>
+            </a:r>
+            <a:r>
+              <a:rPr lang="en-US" dirty="0"/>
+              <a:t> and I handled merge </a:t>
+            </a:r>
+            <a:r>
+              <a:rPr lang="en-US" dirty="0" err="1"/>
+              <a:t>coflicts</a:t>
+            </a:r>
+            <a:r>
+              <a:rPr lang="en-US" dirty="0"/>
+              <a:t> with the presentation.</a:t>
+            </a:r>
+          </a:p>
+        </p:txBody>
+      </p:sp>
+      <p:sp>
+        <p:nvSpPr>
+          <p:cNvPr id="4" name="Slide Number Placeholder 3"/>
+          <p:cNvSpPr>
+            <a:spLocks noGrp="1"/>
+          </p:cNvSpPr>
+          <p:nvPr>
+            <p:ph type="sldNum" sz="quarter" idx="5"/>
+          </p:nvPr>
+        </p:nvSpPr>
+        <p:spPr/>
+        <p:txBody>
+          <a:bodyPr/>
+          <a:lstStyle/>
+          <a:p>
+            <a:fld id="{1EB1DABF-4E95-4EDF-8DA3-AD2A8632C0A3}" type="slidenum">
+              <a:rPr lang="en-US" smtClean="0"/>
+              <a:t>18</a:t>
+            </a:fld>
+            <a:endParaRPr lang="en-US"/>
+          </a:p>
+        </p:txBody>
+      </p:sp>
+    </p:spTree>
+    <p:extLst>
+      <p:ext uri="{BB962C8B-B14F-4D97-AF65-F5344CB8AC3E}">
+        <p14:creationId xmlns:p14="http://schemas.microsoft.com/office/powerpoint/2010/main" val="1072276535"/>
+      </p:ext>
+    </p:extLst>
+  </p:cSld>
+  <p:clrMapOvr>
+    <a:masterClrMapping/>
+  </p:clrMapOvr>
+</p:notes>
+</file>
+
+<file path=ppt/notesSlides/notesSlide13.xml><?xml version="1.0" encoding="utf-8"?>
+<p:notes xmlns:a="http://schemas.openxmlformats.org/drawingml/2006/main" xmlns:r="http://schemas.openxmlformats.org/officeDocument/2006/relationships" xmlns:p="http://schemas.openxmlformats.org/presentationml/2006/main">
+  <p:cSld>
+    <p:spTree>
+      <p:nvGrpSpPr>
+        <p:cNvPr id="1" name=""/>
+        <p:cNvGrpSpPr/>
+        <p:nvPr/>
+      </p:nvGrpSpPr>
+      <p:grpSpPr>
+        <a:xfrm>
+          <a:off x="0" y="0"/>
+          <a:ext cx="0" cy="0"/>
+          <a:chOff x="0" y="0"/>
+          <a:chExt cx="0" cy="0"/>
+        </a:xfrm>
+      </p:grpSpPr>
+      <p:sp>
+        <p:nvSpPr>
+          <p:cNvPr id="2" name="Slide Image Placeholder 1"/>
+          <p:cNvSpPr>
+            <a:spLocks noGrp="1" noRot="1" noChangeAspect="1"/>
+          </p:cNvSpPr>
+          <p:nvPr>
+            <p:ph type="sldImg"/>
+          </p:nvPr>
+        </p:nvSpPr>
+        <p:spPr/>
+      </p:sp>
+      <p:sp>
+        <p:nvSpPr>
+          <p:cNvPr id="3" name="Notes Placeholder 2"/>
+          <p:cNvSpPr>
+            <a:spLocks noGrp="1"/>
+          </p:cNvSpPr>
+          <p:nvPr>
+            <p:ph type="body" idx="1"/>
+          </p:nvPr>
+        </p:nvSpPr>
+        <p:spPr/>
+        <p:txBody>
+          <a:bodyPr/>
+          <a:lstStyle/>
+          <a:p>
+            <a:pPr marL="171450" indent="-171450">
+              <a:buFontTx/>
+              <a:buChar char="-"/>
+            </a:pPr>
+            <a:r>
+              <a:rPr lang="en-US" dirty="0"/>
+              <a:t>Talk about good branching practices.  </a:t>
+            </a:r>
+          </a:p>
+          <a:p>
+            <a:pPr marL="628650" lvl="1" indent="-171450">
+              <a:buFontTx/>
+              <a:buChar char="-"/>
+            </a:pPr>
+            <a:r>
+              <a:rPr lang="en-US" dirty="0"/>
+              <a:t>Branch often for testing and additions. </a:t>
+            </a:r>
+          </a:p>
+          <a:p>
+            <a:pPr marL="171450" indent="-171450">
+              <a:buFontTx/>
+              <a:buChar char="-"/>
+            </a:pPr>
+            <a:r>
+              <a:rPr lang="en-US" dirty="0"/>
+              <a:t>Git won’t let you switch branches without a clean working directory. </a:t>
+            </a:r>
+          </a:p>
+          <a:p>
+            <a:pPr marL="628650" lvl="1" indent="-171450">
+              <a:buFontTx/>
+              <a:buChar char="-"/>
+            </a:pPr>
+            <a:r>
+              <a:rPr lang="en-US" dirty="0"/>
+              <a:t>One option is to use git stash</a:t>
+            </a:r>
+          </a:p>
+          <a:p>
+            <a:pPr marL="628650" lvl="1" indent="-171450">
+              <a:buFontTx/>
+              <a:buChar char="-"/>
+            </a:pPr>
+            <a:r>
+              <a:rPr lang="en-US" dirty="0"/>
+              <a:t>Another option is to use commit amending</a:t>
+            </a:r>
+          </a:p>
+          <a:p>
+            <a:pPr marL="171450" lvl="0" indent="-171450">
+              <a:buFontTx/>
+              <a:buChar char="-"/>
+            </a:pPr>
+            <a:r>
+              <a:rPr lang="en-US" dirty="0"/>
+              <a:t>In the case of a merge conflict, you can use git status.</a:t>
+            </a:r>
+          </a:p>
+          <a:p>
+            <a:pPr marL="628650" lvl="1" indent="-171450">
+              <a:buFontTx/>
+              <a:buChar char="-"/>
+            </a:pPr>
+            <a:r>
+              <a:rPr lang="en-US" dirty="0"/>
+              <a:t>Show how to handle merge conflicts in a text based code file.</a:t>
+            </a:r>
+          </a:p>
+          <a:p>
+            <a:pPr marL="628650" lvl="1" indent="-171450">
+              <a:buFontTx/>
+              <a:buChar char="-"/>
+            </a:pPr>
+            <a:r>
+              <a:rPr lang="en-US" dirty="0"/>
+              <a:t>Show how </a:t>
+            </a:r>
+            <a:r>
+              <a:rPr lang="en-US" dirty="0" err="1"/>
+              <a:t>Lishi</a:t>
+            </a:r>
+            <a:r>
+              <a:rPr lang="en-US" dirty="0"/>
+              <a:t> and I handled merge </a:t>
+            </a:r>
+            <a:r>
+              <a:rPr lang="en-US" dirty="0" err="1"/>
+              <a:t>coflicts</a:t>
+            </a:r>
+            <a:r>
+              <a:rPr lang="en-US" dirty="0"/>
+              <a:t> with the presentation.</a:t>
+            </a:r>
+          </a:p>
+        </p:txBody>
+      </p:sp>
+      <p:sp>
+        <p:nvSpPr>
+          <p:cNvPr id="4" name="Slide Number Placeholder 3"/>
+          <p:cNvSpPr>
+            <a:spLocks noGrp="1"/>
+          </p:cNvSpPr>
+          <p:nvPr>
+            <p:ph type="sldNum" sz="quarter" idx="5"/>
+          </p:nvPr>
+        </p:nvSpPr>
+        <p:spPr/>
+        <p:txBody>
+          <a:bodyPr/>
+          <a:lstStyle/>
+          <a:p>
+            <a:fld id="{1EB1DABF-4E95-4EDF-8DA3-AD2A8632C0A3}" type="slidenum">
+              <a:rPr lang="en-US" smtClean="0"/>
+              <a:t>19</a:t>
+            </a:fld>
+            <a:endParaRPr lang="en-US"/>
+          </a:p>
+        </p:txBody>
+      </p:sp>
+    </p:spTree>
+    <p:extLst>
+      <p:ext uri="{BB962C8B-B14F-4D97-AF65-F5344CB8AC3E}">
+        <p14:creationId xmlns:p14="http://schemas.microsoft.com/office/powerpoint/2010/main" val="4069710015"/>
+      </p:ext>
+    </p:extLst>
+  </p:cSld>
+  <p:clrMapOvr>
+    <a:masterClrMapping/>
+  </p:clrMapOvr>
+</p:notes>
+</file>
+
+<file path=ppt/notesSlides/notesSlide14.xml><?xml version="1.0" encoding="utf-8"?>
+<p:notes xmlns:a="http://schemas.openxmlformats.org/drawingml/2006/main" xmlns:r="http://schemas.openxmlformats.org/officeDocument/2006/relationships" xmlns:p="http://schemas.openxmlformats.org/presentationml/2006/main">
+  <p:cSld>
+    <p:spTree>
+      <p:nvGrpSpPr>
+        <p:cNvPr id="1" name=""/>
+        <p:cNvGrpSpPr/>
+        <p:nvPr/>
+      </p:nvGrpSpPr>
+      <p:grpSpPr>
+        <a:xfrm>
+          <a:off x="0" y="0"/>
+          <a:ext cx="0" cy="0"/>
+          <a:chOff x="0" y="0"/>
+          <a:chExt cx="0" cy="0"/>
+        </a:xfrm>
+      </p:grpSpPr>
+      <p:sp>
+        <p:nvSpPr>
+          <p:cNvPr id="2" name="Slide Image Placeholder 1"/>
+          <p:cNvSpPr>
+            <a:spLocks noGrp="1" noRot="1" noChangeAspect="1"/>
+          </p:cNvSpPr>
+          <p:nvPr>
+            <p:ph type="sldImg"/>
+          </p:nvPr>
+        </p:nvSpPr>
+        <p:spPr/>
+      </p:sp>
+      <p:sp>
+        <p:nvSpPr>
+          <p:cNvPr id="3" name="Notes Placeholder 2"/>
+          <p:cNvSpPr>
+            <a:spLocks noGrp="1"/>
+          </p:cNvSpPr>
+          <p:nvPr>
+            <p:ph type="body" idx="1"/>
+          </p:nvPr>
+        </p:nvSpPr>
+        <p:spPr/>
+        <p:txBody>
+          <a:bodyPr/>
+          <a:lstStyle/>
+          <a:p>
+            <a:pPr marL="171450" indent="-171450">
+              <a:buFontTx/>
+              <a:buChar char="-"/>
+            </a:pPr>
+            <a:r>
+              <a:rPr lang="en-US" dirty="0"/>
+              <a:t>Talk about good branching practices.  </a:t>
+            </a:r>
+          </a:p>
+          <a:p>
+            <a:pPr marL="628650" lvl="1" indent="-171450">
+              <a:buFontTx/>
+              <a:buChar char="-"/>
+            </a:pPr>
+            <a:r>
+              <a:rPr lang="en-US" dirty="0"/>
+              <a:t>Branch often for testing and additions. </a:t>
+            </a:r>
+          </a:p>
+          <a:p>
+            <a:pPr marL="171450" indent="-171450">
+              <a:buFontTx/>
+              <a:buChar char="-"/>
+            </a:pPr>
+            <a:r>
+              <a:rPr lang="en-US" dirty="0"/>
+              <a:t>Git won’t let you switch branches without a clean working directory. </a:t>
+            </a:r>
+          </a:p>
+          <a:p>
+            <a:pPr marL="628650" lvl="1" indent="-171450">
+              <a:buFontTx/>
+              <a:buChar char="-"/>
+            </a:pPr>
+            <a:r>
+              <a:rPr lang="en-US" dirty="0"/>
+              <a:t>One option is to use git stash</a:t>
+            </a:r>
+          </a:p>
+          <a:p>
+            <a:pPr marL="628650" lvl="1" indent="-171450">
+              <a:buFontTx/>
+              <a:buChar char="-"/>
+            </a:pPr>
+            <a:r>
+              <a:rPr lang="en-US" dirty="0"/>
+              <a:t>Another option is to use commit amending</a:t>
+            </a:r>
+          </a:p>
+          <a:p>
+            <a:pPr marL="171450" lvl="0" indent="-171450">
+              <a:buFontTx/>
+              <a:buChar char="-"/>
+            </a:pPr>
+            <a:r>
+              <a:rPr lang="en-US" dirty="0"/>
+              <a:t>In the case of a merge conflict, you can use git status.</a:t>
+            </a:r>
+          </a:p>
+          <a:p>
+            <a:pPr marL="628650" lvl="1" indent="-171450">
+              <a:buFontTx/>
+              <a:buChar char="-"/>
+            </a:pPr>
+            <a:r>
+              <a:rPr lang="en-US" dirty="0"/>
+              <a:t>Show how to handle merge conflicts in a text based code file.</a:t>
+            </a:r>
+          </a:p>
+          <a:p>
+            <a:pPr marL="628650" lvl="1" indent="-171450">
+              <a:buFontTx/>
+              <a:buChar char="-"/>
+            </a:pPr>
+            <a:r>
+              <a:rPr lang="en-US" dirty="0"/>
+              <a:t>Show how </a:t>
+            </a:r>
+            <a:r>
+              <a:rPr lang="en-US" dirty="0" err="1"/>
+              <a:t>Lishi</a:t>
+            </a:r>
+            <a:r>
+              <a:rPr lang="en-US" dirty="0"/>
+              <a:t> and I handled merge </a:t>
+            </a:r>
+            <a:r>
+              <a:rPr lang="en-US" dirty="0" err="1"/>
+              <a:t>coflicts</a:t>
+            </a:r>
+            <a:r>
+              <a:rPr lang="en-US" dirty="0"/>
+              <a:t> with the presentation.</a:t>
+            </a:r>
+          </a:p>
+        </p:txBody>
+      </p:sp>
+      <p:sp>
+        <p:nvSpPr>
+          <p:cNvPr id="4" name="Slide Number Placeholder 3"/>
+          <p:cNvSpPr>
+            <a:spLocks noGrp="1"/>
+          </p:cNvSpPr>
+          <p:nvPr>
+            <p:ph type="sldNum" sz="quarter" idx="5"/>
+          </p:nvPr>
+        </p:nvSpPr>
+        <p:spPr/>
+        <p:txBody>
+          <a:bodyPr/>
+          <a:lstStyle/>
+          <a:p>
+            <a:fld id="{1EB1DABF-4E95-4EDF-8DA3-AD2A8632C0A3}" type="slidenum">
+              <a:rPr lang="en-US" smtClean="0"/>
+              <a:t>20</a:t>
+            </a:fld>
+            <a:endParaRPr lang="en-US"/>
+          </a:p>
+        </p:txBody>
+      </p:sp>
+    </p:spTree>
+    <p:extLst>
+      <p:ext uri="{BB962C8B-B14F-4D97-AF65-F5344CB8AC3E}">
+        <p14:creationId xmlns:p14="http://schemas.microsoft.com/office/powerpoint/2010/main" val="16974685"/>
+      </p:ext>
+    </p:extLst>
+  </p:cSld>
+  <p:clrMapOvr>
+    <a:masterClrMapping/>
+  </p:clrMapOvr>
+</p:notes>
+</file>
+
+<file path=ppt/notesSlides/notesSlide15.xml><?xml version="1.0" encoding="utf-8"?>
+<p:notes xmlns:a="http://schemas.openxmlformats.org/drawingml/2006/main" xmlns:r="http://schemas.openxmlformats.org/officeDocument/2006/relationships" xmlns:p="http://schemas.openxmlformats.org/presentationml/2006/main">
+  <p:cSld>
+    <p:spTree>
+      <p:nvGrpSpPr>
+        <p:cNvPr id="1" name=""/>
+        <p:cNvGrpSpPr/>
+        <p:nvPr/>
+      </p:nvGrpSpPr>
+      <p:grpSpPr>
+        <a:xfrm>
+          <a:off x="0" y="0"/>
+          <a:ext cx="0" cy="0"/>
+          <a:chOff x="0" y="0"/>
+          <a:chExt cx="0" cy="0"/>
+        </a:xfrm>
+      </p:grpSpPr>
+      <p:sp>
+        <p:nvSpPr>
+          <p:cNvPr id="2" name="Slide Image Placeholder 1"/>
+          <p:cNvSpPr>
+            <a:spLocks noGrp="1" noRot="1" noChangeAspect="1"/>
+          </p:cNvSpPr>
+          <p:nvPr>
+            <p:ph type="sldImg"/>
+          </p:nvPr>
+        </p:nvSpPr>
+        <p:spPr/>
+      </p:sp>
+      <p:sp>
+        <p:nvSpPr>
+          <p:cNvPr id="3" name="Notes Placeholder 2"/>
+          <p:cNvSpPr>
+            <a:spLocks noGrp="1"/>
+          </p:cNvSpPr>
+          <p:nvPr>
+            <p:ph type="body" idx="1"/>
+          </p:nvPr>
+        </p:nvSpPr>
+        <p:spPr/>
+        <p:txBody>
+          <a:bodyPr/>
+          <a:lstStyle/>
+          <a:p>
+            <a:pPr marL="171450" indent="-171450">
+              <a:buFontTx/>
+              <a:buChar char="-"/>
+            </a:pPr>
+            <a:r>
+              <a:rPr lang="en-US" dirty="0"/>
+              <a:t>Talk about good branching practices.  </a:t>
+            </a:r>
+          </a:p>
+          <a:p>
+            <a:pPr marL="628650" lvl="1" indent="-171450">
+              <a:buFontTx/>
+              <a:buChar char="-"/>
+            </a:pPr>
+            <a:r>
+              <a:rPr lang="en-US" dirty="0"/>
+              <a:t>Branch often for testing and additions. </a:t>
+            </a:r>
+          </a:p>
+          <a:p>
+            <a:pPr marL="171450" indent="-171450">
+              <a:buFontTx/>
+              <a:buChar char="-"/>
+            </a:pPr>
+            <a:r>
+              <a:rPr lang="en-US" dirty="0"/>
+              <a:t>Git won’t let you switch branches without a clean working directory. </a:t>
+            </a:r>
+          </a:p>
+          <a:p>
+            <a:pPr marL="628650" lvl="1" indent="-171450">
+              <a:buFontTx/>
+              <a:buChar char="-"/>
+            </a:pPr>
+            <a:r>
+              <a:rPr lang="en-US" dirty="0"/>
+              <a:t>One option is to use git stash</a:t>
+            </a:r>
+          </a:p>
+          <a:p>
+            <a:pPr marL="628650" lvl="1" indent="-171450">
+              <a:buFontTx/>
+              <a:buChar char="-"/>
+            </a:pPr>
+            <a:r>
+              <a:rPr lang="en-US" dirty="0"/>
+              <a:t>Another option is to use commit amending</a:t>
+            </a:r>
+          </a:p>
+          <a:p>
+            <a:pPr marL="171450" lvl="0" indent="-171450">
+              <a:buFontTx/>
+              <a:buChar char="-"/>
+            </a:pPr>
+            <a:r>
+              <a:rPr lang="en-US" dirty="0"/>
+              <a:t>In the case of a merge conflict, you can use git status.</a:t>
+            </a:r>
+          </a:p>
+          <a:p>
+            <a:pPr marL="628650" lvl="1" indent="-171450">
+              <a:buFontTx/>
+              <a:buChar char="-"/>
+            </a:pPr>
+            <a:r>
+              <a:rPr lang="en-US" dirty="0"/>
+              <a:t>Show how to handle merge conflicts in a text based code file.</a:t>
+            </a:r>
+          </a:p>
+          <a:p>
+            <a:pPr marL="628650" lvl="1" indent="-171450">
+              <a:buFontTx/>
+              <a:buChar char="-"/>
+            </a:pPr>
+            <a:r>
+              <a:rPr lang="en-US" dirty="0"/>
+              <a:t>Show how </a:t>
+            </a:r>
+            <a:r>
+              <a:rPr lang="en-US" dirty="0" err="1"/>
+              <a:t>Lishi</a:t>
+            </a:r>
+            <a:r>
+              <a:rPr lang="en-US" dirty="0"/>
+              <a:t> and I handled merge </a:t>
+            </a:r>
+            <a:r>
+              <a:rPr lang="en-US" dirty="0" err="1"/>
+              <a:t>coflicts</a:t>
+            </a:r>
+            <a:r>
+              <a:rPr lang="en-US" dirty="0"/>
+              <a:t> with the presentation.</a:t>
+            </a:r>
+          </a:p>
+        </p:txBody>
+      </p:sp>
+      <p:sp>
+        <p:nvSpPr>
+          <p:cNvPr id="4" name="Slide Number Placeholder 3"/>
+          <p:cNvSpPr>
+            <a:spLocks noGrp="1"/>
+          </p:cNvSpPr>
+          <p:nvPr>
+            <p:ph type="sldNum" sz="quarter" idx="5"/>
+          </p:nvPr>
+        </p:nvSpPr>
+        <p:spPr/>
+        <p:txBody>
+          <a:bodyPr/>
+          <a:lstStyle/>
+          <a:p>
+            <a:fld id="{1EB1DABF-4E95-4EDF-8DA3-AD2A8632C0A3}" type="slidenum">
+              <a:rPr lang="en-US" smtClean="0"/>
+              <a:t>21</a:t>
+            </a:fld>
+            <a:endParaRPr lang="en-US"/>
+          </a:p>
+        </p:txBody>
+      </p:sp>
+    </p:spTree>
+    <p:extLst>
+      <p:ext uri="{BB962C8B-B14F-4D97-AF65-F5344CB8AC3E}">
+        <p14:creationId xmlns:p14="http://schemas.microsoft.com/office/powerpoint/2010/main" val="4061407928"/>
+      </p:ext>
+    </p:extLst>
+  </p:cSld>
+  <p:clrMapOvr>
+    <a:masterClrMapping/>
+  </p:clrMapOvr>
+</p:notes>
+</file>
+
+<file path=ppt/notesSlides/notesSlide16.xml><?xml version="1.0" encoding="utf-8"?>
+<p:notes xmlns:a="http://schemas.openxmlformats.org/drawingml/2006/main" xmlns:r="http://schemas.openxmlformats.org/officeDocument/2006/relationships" xmlns:p="http://schemas.openxmlformats.org/presentationml/2006/main">
+  <p:cSld>
+    <p:spTree>
+      <p:nvGrpSpPr>
+        <p:cNvPr id="1" name=""/>
+        <p:cNvGrpSpPr/>
+        <p:nvPr/>
+      </p:nvGrpSpPr>
+      <p:grpSpPr>
+        <a:xfrm>
+          <a:off x="0" y="0"/>
+          <a:ext cx="0" cy="0"/>
+          <a:chOff x="0" y="0"/>
+          <a:chExt cx="0" cy="0"/>
+        </a:xfrm>
+      </p:grpSpPr>
+      <p:sp>
+        <p:nvSpPr>
+          <p:cNvPr id="2" name="Slide Image Placeholder 1"/>
+          <p:cNvSpPr>
+            <a:spLocks noGrp="1" noRot="1" noChangeAspect="1"/>
+          </p:cNvSpPr>
+          <p:nvPr>
+            <p:ph type="sldImg"/>
+          </p:nvPr>
+        </p:nvSpPr>
+        <p:spPr/>
+      </p:sp>
+      <p:sp>
+        <p:nvSpPr>
+          <p:cNvPr id="3" name="Notes Placeholder 2"/>
+          <p:cNvSpPr>
+            <a:spLocks noGrp="1"/>
+          </p:cNvSpPr>
+          <p:nvPr>
+            <p:ph type="body" idx="1"/>
+          </p:nvPr>
+        </p:nvSpPr>
+        <p:spPr/>
+        <p:txBody>
+          <a:bodyPr/>
+          <a:lstStyle/>
+          <a:p>
+            <a:pPr marL="171450" indent="-171450">
+              <a:buFontTx/>
+              <a:buChar char="-"/>
+            </a:pPr>
+            <a:r>
+              <a:rPr lang="en-US" dirty="0"/>
+              <a:t>Talk about good branching practices.  </a:t>
+            </a:r>
+          </a:p>
+          <a:p>
+            <a:pPr marL="628650" lvl="1" indent="-171450">
+              <a:buFontTx/>
+              <a:buChar char="-"/>
+            </a:pPr>
+            <a:r>
+              <a:rPr lang="en-US" dirty="0"/>
+              <a:t>Branch often for testing and additions. </a:t>
+            </a:r>
+          </a:p>
+          <a:p>
+            <a:pPr marL="171450" indent="-171450">
+              <a:buFontTx/>
+              <a:buChar char="-"/>
+            </a:pPr>
+            <a:r>
+              <a:rPr lang="en-US" dirty="0"/>
+              <a:t>Git won’t let you switch branches without a clean working directory. </a:t>
+            </a:r>
+          </a:p>
+          <a:p>
+            <a:pPr marL="628650" lvl="1" indent="-171450">
+              <a:buFontTx/>
+              <a:buChar char="-"/>
+            </a:pPr>
+            <a:r>
+              <a:rPr lang="en-US" dirty="0"/>
+              <a:t>One option is to use git stash</a:t>
+            </a:r>
+          </a:p>
+          <a:p>
+            <a:pPr marL="628650" lvl="1" indent="-171450">
+              <a:buFontTx/>
+              <a:buChar char="-"/>
+            </a:pPr>
+            <a:r>
+              <a:rPr lang="en-US" dirty="0"/>
+              <a:t>Another option is to use commit amending</a:t>
+            </a:r>
+          </a:p>
+          <a:p>
+            <a:pPr marL="171450" lvl="0" indent="-171450">
+              <a:buFontTx/>
+              <a:buChar char="-"/>
+            </a:pPr>
+            <a:r>
+              <a:rPr lang="en-US" dirty="0"/>
+              <a:t>In the case of a merge conflict, you can use git status.</a:t>
+            </a:r>
+          </a:p>
+          <a:p>
+            <a:pPr marL="628650" lvl="1" indent="-171450">
+              <a:buFontTx/>
+              <a:buChar char="-"/>
+            </a:pPr>
+            <a:r>
+              <a:rPr lang="en-US" dirty="0"/>
+              <a:t>Show how to handle merge conflicts in a text based code file.</a:t>
+            </a:r>
+          </a:p>
+          <a:p>
+            <a:pPr marL="628650" lvl="1" indent="-171450">
+              <a:buFontTx/>
+              <a:buChar char="-"/>
+            </a:pPr>
+            <a:r>
+              <a:rPr lang="en-US" dirty="0"/>
+              <a:t>Show how </a:t>
+            </a:r>
+            <a:r>
+              <a:rPr lang="en-US" dirty="0" err="1"/>
+              <a:t>Lishi</a:t>
+            </a:r>
+            <a:r>
+              <a:rPr lang="en-US" dirty="0"/>
+              <a:t> and I handled merge </a:t>
+            </a:r>
+            <a:r>
+              <a:rPr lang="en-US" dirty="0" err="1"/>
+              <a:t>coflicts</a:t>
+            </a:r>
+            <a:r>
+              <a:rPr lang="en-US" dirty="0"/>
+              <a:t> with the presentation.</a:t>
+            </a:r>
+          </a:p>
+        </p:txBody>
+      </p:sp>
+      <p:sp>
+        <p:nvSpPr>
+          <p:cNvPr id="4" name="Slide Number Placeholder 3"/>
+          <p:cNvSpPr>
+            <a:spLocks noGrp="1"/>
+          </p:cNvSpPr>
+          <p:nvPr>
+            <p:ph type="sldNum" sz="quarter" idx="5"/>
+          </p:nvPr>
+        </p:nvSpPr>
+        <p:spPr/>
+        <p:txBody>
+          <a:bodyPr/>
+          <a:lstStyle/>
+          <a:p>
+            <a:fld id="{1EB1DABF-4E95-4EDF-8DA3-AD2A8632C0A3}" type="slidenum">
+              <a:rPr lang="en-US" smtClean="0"/>
+              <a:t>22</a:t>
+            </a:fld>
+            <a:endParaRPr lang="en-US"/>
+          </a:p>
+        </p:txBody>
+      </p:sp>
+    </p:spTree>
+    <p:extLst>
+      <p:ext uri="{BB962C8B-B14F-4D97-AF65-F5344CB8AC3E}">
+        <p14:creationId xmlns:p14="http://schemas.microsoft.com/office/powerpoint/2010/main" val="1026353405"/>
+      </p:ext>
+    </p:extLst>
+  </p:cSld>
+  <p:clrMapOvr>
+    <a:masterClrMapping/>
+  </p:clrMapOvr>
+</p:notes>
+</file>
+
+<file path=ppt/notesSlides/notesSlide17.xml><?xml version="1.0" encoding="utf-8"?>
+<p:notes xmlns:a="http://schemas.openxmlformats.org/drawingml/2006/main" xmlns:r="http://schemas.openxmlformats.org/officeDocument/2006/relationships" xmlns:p="http://schemas.openxmlformats.org/presentationml/2006/main">
+  <p:cSld>
+    <p:spTree>
+      <p:nvGrpSpPr>
+        <p:cNvPr id="1" name=""/>
+        <p:cNvGrpSpPr/>
+        <p:nvPr/>
+      </p:nvGrpSpPr>
+      <p:grpSpPr>
+        <a:xfrm>
+          <a:off x="0" y="0"/>
+          <a:ext cx="0" cy="0"/>
+          <a:chOff x="0" y="0"/>
+          <a:chExt cx="0" cy="0"/>
+        </a:xfrm>
+      </p:grpSpPr>
+      <p:sp>
+        <p:nvSpPr>
+          <p:cNvPr id="2" name="Slide Image Placeholder 1"/>
+          <p:cNvSpPr>
+            <a:spLocks noGrp="1" noRot="1" noChangeAspect="1"/>
+          </p:cNvSpPr>
+          <p:nvPr>
+            <p:ph type="sldImg"/>
+          </p:nvPr>
+        </p:nvSpPr>
+        <p:spPr/>
+      </p:sp>
+      <p:sp>
+        <p:nvSpPr>
+          <p:cNvPr id="3" name="Notes Placeholder 2"/>
+          <p:cNvSpPr>
+            <a:spLocks noGrp="1"/>
+          </p:cNvSpPr>
+          <p:nvPr>
+            <p:ph type="body" idx="1"/>
+          </p:nvPr>
+        </p:nvSpPr>
+        <p:spPr/>
+        <p:txBody>
+          <a:bodyPr/>
+          <a:lstStyle/>
+          <a:p>
+            <a:pPr marL="171450" indent="-171450">
+              <a:buFontTx/>
+              <a:buChar char="-"/>
+            </a:pPr>
+            <a:r>
+              <a:rPr lang="en-US" dirty="0"/>
+              <a:t>Talk about good branching practices.  </a:t>
+            </a:r>
+          </a:p>
+          <a:p>
+            <a:pPr marL="628650" lvl="1" indent="-171450">
+              <a:buFontTx/>
+              <a:buChar char="-"/>
+            </a:pPr>
+            <a:r>
+              <a:rPr lang="en-US" dirty="0"/>
+              <a:t>Branch often for testing and additions. </a:t>
+            </a:r>
+          </a:p>
+          <a:p>
+            <a:pPr marL="171450" indent="-171450">
+              <a:buFontTx/>
+              <a:buChar char="-"/>
+            </a:pPr>
+            <a:r>
+              <a:rPr lang="en-US" dirty="0"/>
+              <a:t>Git won’t let you switch branches without a clean working directory. </a:t>
+            </a:r>
+          </a:p>
+          <a:p>
+            <a:pPr marL="628650" lvl="1" indent="-171450">
+              <a:buFontTx/>
+              <a:buChar char="-"/>
+            </a:pPr>
+            <a:r>
+              <a:rPr lang="en-US" dirty="0"/>
+              <a:t>One option is to use git stash</a:t>
+            </a:r>
+          </a:p>
+          <a:p>
+            <a:pPr marL="628650" lvl="1" indent="-171450">
+              <a:buFontTx/>
+              <a:buChar char="-"/>
+            </a:pPr>
+            <a:r>
+              <a:rPr lang="en-US" dirty="0"/>
+              <a:t>Another option is to use commit amending</a:t>
+            </a:r>
+          </a:p>
+          <a:p>
+            <a:pPr marL="171450" lvl="0" indent="-171450">
+              <a:buFontTx/>
+              <a:buChar char="-"/>
+            </a:pPr>
+            <a:r>
+              <a:rPr lang="en-US" dirty="0"/>
+              <a:t>In the case of a merge conflict, you can use git status.</a:t>
+            </a:r>
+          </a:p>
+          <a:p>
+            <a:pPr marL="628650" lvl="1" indent="-171450">
+              <a:buFontTx/>
+              <a:buChar char="-"/>
+            </a:pPr>
+            <a:r>
+              <a:rPr lang="en-US" dirty="0"/>
+              <a:t>Show how to handle merge conflicts in a text based code file.</a:t>
+            </a:r>
+          </a:p>
+          <a:p>
+            <a:pPr marL="628650" lvl="1" indent="-171450">
+              <a:buFontTx/>
+              <a:buChar char="-"/>
+            </a:pPr>
+            <a:r>
+              <a:rPr lang="en-US" dirty="0"/>
+              <a:t>Show how </a:t>
+            </a:r>
+            <a:r>
+              <a:rPr lang="en-US" dirty="0" err="1"/>
+              <a:t>Lishi</a:t>
+            </a:r>
+            <a:r>
+              <a:rPr lang="en-US" dirty="0"/>
+              <a:t> and I handled merge </a:t>
+            </a:r>
+            <a:r>
+              <a:rPr lang="en-US" dirty="0" err="1"/>
+              <a:t>coflicts</a:t>
+            </a:r>
+            <a:r>
+              <a:rPr lang="en-US" dirty="0"/>
+              <a:t> with the presentation.</a:t>
+            </a:r>
+          </a:p>
+        </p:txBody>
+      </p:sp>
+      <p:sp>
+        <p:nvSpPr>
+          <p:cNvPr id="4" name="Slide Number Placeholder 3"/>
+          <p:cNvSpPr>
+            <a:spLocks noGrp="1"/>
+          </p:cNvSpPr>
+          <p:nvPr>
+            <p:ph type="sldNum" sz="quarter" idx="5"/>
+          </p:nvPr>
+        </p:nvSpPr>
+        <p:spPr/>
+        <p:txBody>
+          <a:bodyPr/>
+          <a:lstStyle/>
+          <a:p>
+            <a:fld id="{1EB1DABF-4E95-4EDF-8DA3-AD2A8632C0A3}" type="slidenum">
+              <a:rPr lang="en-US" smtClean="0"/>
+              <a:t>23</a:t>
+            </a:fld>
+            <a:endParaRPr lang="en-US"/>
+          </a:p>
+        </p:txBody>
+      </p:sp>
+    </p:spTree>
+    <p:extLst>
+      <p:ext uri="{BB962C8B-B14F-4D97-AF65-F5344CB8AC3E}">
+        <p14:creationId xmlns:p14="http://schemas.microsoft.com/office/powerpoint/2010/main" val="2889247344"/>
+      </p:ext>
+    </p:extLst>
+  </p:cSld>
+  <p:clrMapOvr>
+    <a:masterClrMapping/>
+  </p:clrMapOvr>
+</p:notes>
+</file>
+
+<file path=ppt/notesSlides/notesSlide18.xml><?xml version="1.0" encoding="utf-8"?>
+<p:notes xmlns:a="http://schemas.openxmlformats.org/drawingml/2006/main" xmlns:r="http://schemas.openxmlformats.org/officeDocument/2006/relationships" xmlns:p="http://schemas.openxmlformats.org/presentationml/2006/main">
+  <p:cSld>
+    <p:spTree>
+      <p:nvGrpSpPr>
+        <p:cNvPr id="1" name=""/>
+        <p:cNvGrpSpPr/>
+        <p:nvPr/>
+      </p:nvGrpSpPr>
+      <p:grpSpPr>
+        <a:xfrm>
+          <a:off x="0" y="0"/>
+          <a:ext cx="0" cy="0"/>
+          <a:chOff x="0" y="0"/>
+          <a:chExt cx="0" cy="0"/>
+        </a:xfrm>
+      </p:grpSpPr>
+      <p:sp>
+        <p:nvSpPr>
+          <p:cNvPr id="2" name="Slide Image Placeholder 1"/>
+          <p:cNvSpPr>
+            <a:spLocks noGrp="1" noRot="1" noChangeAspect="1"/>
+          </p:cNvSpPr>
+          <p:nvPr>
+            <p:ph type="sldImg"/>
+          </p:nvPr>
+        </p:nvSpPr>
+        <p:spPr/>
+      </p:sp>
+      <p:sp>
+        <p:nvSpPr>
+          <p:cNvPr id="3" name="Notes Placeholder 2"/>
+          <p:cNvSpPr>
+            <a:spLocks noGrp="1"/>
+          </p:cNvSpPr>
+          <p:nvPr>
+            <p:ph type="body" idx="1"/>
+          </p:nvPr>
+        </p:nvSpPr>
+        <p:spPr/>
+        <p:txBody>
+          <a:bodyPr/>
+          <a:lstStyle/>
+          <a:p>
+            <a:pPr marL="171450" indent="-171450">
+              <a:buFontTx/>
+              <a:buChar char="-"/>
+            </a:pPr>
+            <a:r>
+              <a:rPr lang="en-US" dirty="0"/>
+              <a:t>Talk about good branching practices.  </a:t>
+            </a:r>
+          </a:p>
+          <a:p>
+            <a:pPr marL="628650" lvl="1" indent="-171450">
+              <a:buFontTx/>
+              <a:buChar char="-"/>
+            </a:pPr>
+            <a:r>
+              <a:rPr lang="en-US" dirty="0"/>
+              <a:t>Branch often for testing and additions. </a:t>
+            </a:r>
+          </a:p>
+          <a:p>
+            <a:pPr marL="171450" indent="-171450">
+              <a:buFontTx/>
+              <a:buChar char="-"/>
+            </a:pPr>
+            <a:r>
+              <a:rPr lang="en-US" dirty="0"/>
+              <a:t>Git won’t let you switch branches without a clean working directory. </a:t>
+            </a:r>
+          </a:p>
+          <a:p>
+            <a:pPr marL="628650" lvl="1" indent="-171450">
+              <a:buFontTx/>
+              <a:buChar char="-"/>
+            </a:pPr>
+            <a:r>
+              <a:rPr lang="en-US" dirty="0"/>
+              <a:t>One option is to use git stash</a:t>
+            </a:r>
+          </a:p>
+          <a:p>
+            <a:pPr marL="628650" lvl="1" indent="-171450">
+              <a:buFontTx/>
+              <a:buChar char="-"/>
+            </a:pPr>
+            <a:r>
+              <a:rPr lang="en-US" dirty="0"/>
+              <a:t>Another option is to use commit amending</a:t>
+            </a:r>
+          </a:p>
+          <a:p>
+            <a:pPr marL="171450" lvl="0" indent="-171450">
+              <a:buFontTx/>
+              <a:buChar char="-"/>
+            </a:pPr>
+            <a:r>
+              <a:rPr lang="en-US" dirty="0"/>
+              <a:t>In the case of a merge conflict, you can use git status.</a:t>
+            </a:r>
+          </a:p>
+          <a:p>
+            <a:pPr marL="628650" lvl="1" indent="-171450">
+              <a:buFontTx/>
+              <a:buChar char="-"/>
+            </a:pPr>
+            <a:r>
+              <a:rPr lang="en-US" dirty="0"/>
+              <a:t>Show how to handle merge conflicts in a text based code file.</a:t>
+            </a:r>
+          </a:p>
+          <a:p>
+            <a:pPr marL="628650" lvl="1" indent="-171450">
+              <a:buFontTx/>
+              <a:buChar char="-"/>
+            </a:pPr>
+            <a:r>
+              <a:rPr lang="en-US" dirty="0"/>
+              <a:t>Show how </a:t>
+            </a:r>
+            <a:r>
+              <a:rPr lang="en-US" dirty="0" err="1"/>
+              <a:t>Lishi</a:t>
+            </a:r>
+            <a:r>
+              <a:rPr lang="en-US" dirty="0"/>
+              <a:t> and I handled merge </a:t>
+            </a:r>
+            <a:r>
+              <a:rPr lang="en-US" dirty="0" err="1"/>
+              <a:t>coflicts</a:t>
+            </a:r>
+            <a:r>
+              <a:rPr lang="en-US" dirty="0"/>
+              <a:t> with the presentation.</a:t>
+            </a:r>
+          </a:p>
+        </p:txBody>
+      </p:sp>
+      <p:sp>
+        <p:nvSpPr>
+          <p:cNvPr id="4" name="Slide Number Placeholder 3"/>
+          <p:cNvSpPr>
+            <a:spLocks noGrp="1"/>
+          </p:cNvSpPr>
+          <p:nvPr>
+            <p:ph type="sldNum" sz="quarter" idx="5"/>
+          </p:nvPr>
+        </p:nvSpPr>
+        <p:spPr/>
+        <p:txBody>
+          <a:bodyPr/>
+          <a:lstStyle/>
+          <a:p>
+            <a:fld id="{1EB1DABF-4E95-4EDF-8DA3-AD2A8632C0A3}" type="slidenum">
+              <a:rPr lang="en-US" smtClean="0"/>
+              <a:t>24</a:t>
+            </a:fld>
+            <a:endParaRPr lang="en-US"/>
+          </a:p>
+        </p:txBody>
+      </p:sp>
+    </p:spTree>
+    <p:extLst>
+      <p:ext uri="{BB962C8B-B14F-4D97-AF65-F5344CB8AC3E}">
+        <p14:creationId xmlns:p14="http://schemas.microsoft.com/office/powerpoint/2010/main" val="3086177368"/>
+      </p:ext>
+    </p:extLst>
+  </p:cSld>
+  <p:clrMapOvr>
+    <a:masterClrMapping/>
+  </p:clrMapOvr>
+</p:notes>
+</file>
+
+<file path=ppt/notesSlides/notesSlide19.xml><?xml version="1.0" encoding="utf-8"?>
+<p:notes xmlns:a="http://schemas.openxmlformats.org/drawingml/2006/main" xmlns:r="http://schemas.openxmlformats.org/officeDocument/2006/relationships" xmlns:p="http://schemas.openxmlformats.org/presentationml/2006/main">
+  <p:cSld>
+    <p:spTree>
+      <p:nvGrpSpPr>
+        <p:cNvPr id="1" name=""/>
+        <p:cNvGrpSpPr/>
+        <p:nvPr/>
+      </p:nvGrpSpPr>
+      <p:grpSpPr>
+        <a:xfrm>
+          <a:off x="0" y="0"/>
+          <a:ext cx="0" cy="0"/>
+          <a:chOff x="0" y="0"/>
+          <a:chExt cx="0" cy="0"/>
+        </a:xfrm>
+      </p:grpSpPr>
+      <p:sp>
+        <p:nvSpPr>
+          <p:cNvPr id="2" name="Slide Image Placeholder 1"/>
+          <p:cNvSpPr>
+            <a:spLocks noGrp="1" noRot="1" noChangeAspect="1"/>
+          </p:cNvSpPr>
+          <p:nvPr>
+            <p:ph type="sldImg"/>
+          </p:nvPr>
+        </p:nvSpPr>
+        <p:spPr/>
+      </p:sp>
+      <p:sp>
+        <p:nvSpPr>
+          <p:cNvPr id="3" name="Notes Placeholder 2"/>
+          <p:cNvSpPr>
+            <a:spLocks noGrp="1"/>
+          </p:cNvSpPr>
+          <p:nvPr>
+            <p:ph type="body" idx="1"/>
+          </p:nvPr>
+        </p:nvSpPr>
+        <p:spPr/>
+        <p:txBody>
+          <a:bodyPr/>
+          <a:lstStyle/>
+          <a:p>
+            <a:pPr marL="171450" indent="-171450">
+              <a:buFontTx/>
+              <a:buChar char="-"/>
+            </a:pPr>
+            <a:r>
+              <a:rPr lang="en-US" dirty="0"/>
+              <a:t>Talk about good branching practices.  </a:t>
+            </a:r>
+          </a:p>
+          <a:p>
+            <a:pPr marL="628650" lvl="1" indent="-171450">
+              <a:buFontTx/>
+              <a:buChar char="-"/>
+            </a:pPr>
+            <a:r>
+              <a:rPr lang="en-US" dirty="0"/>
+              <a:t>Branch often for testing and additions. </a:t>
+            </a:r>
+          </a:p>
+          <a:p>
+            <a:pPr marL="171450" indent="-171450">
+              <a:buFontTx/>
+              <a:buChar char="-"/>
+            </a:pPr>
+            <a:r>
+              <a:rPr lang="en-US" dirty="0"/>
+              <a:t>Git won’t let you switch branches without a clean working directory. </a:t>
+            </a:r>
+          </a:p>
+          <a:p>
+            <a:pPr marL="628650" lvl="1" indent="-171450">
+              <a:buFontTx/>
+              <a:buChar char="-"/>
+            </a:pPr>
+            <a:r>
+              <a:rPr lang="en-US" dirty="0"/>
+              <a:t>One option is to use git stash</a:t>
+            </a:r>
+          </a:p>
+          <a:p>
+            <a:pPr marL="628650" lvl="1" indent="-171450">
+              <a:buFontTx/>
+              <a:buChar char="-"/>
+            </a:pPr>
+            <a:r>
+              <a:rPr lang="en-US" dirty="0"/>
+              <a:t>Another option is to use commit amending</a:t>
+            </a:r>
+          </a:p>
+          <a:p>
+            <a:pPr marL="171450" lvl="0" indent="-171450">
+              <a:buFontTx/>
+              <a:buChar char="-"/>
+            </a:pPr>
+            <a:r>
+              <a:rPr lang="en-US" dirty="0"/>
+              <a:t>In the case of a merge conflict, you can use git status.</a:t>
+            </a:r>
+          </a:p>
+          <a:p>
+            <a:pPr marL="628650" lvl="1" indent="-171450">
+              <a:buFontTx/>
+              <a:buChar char="-"/>
+            </a:pPr>
+            <a:r>
+              <a:rPr lang="en-US" dirty="0"/>
+              <a:t>Show how to handle merge conflicts in a text based code file.</a:t>
+            </a:r>
+          </a:p>
+          <a:p>
+            <a:pPr marL="628650" lvl="1" indent="-171450">
+              <a:buFontTx/>
+              <a:buChar char="-"/>
+            </a:pPr>
+            <a:r>
+              <a:rPr lang="en-US" dirty="0"/>
+              <a:t>Show how </a:t>
+            </a:r>
+            <a:r>
+              <a:rPr lang="en-US" dirty="0" err="1"/>
+              <a:t>Lishi</a:t>
+            </a:r>
+            <a:r>
+              <a:rPr lang="en-US" dirty="0"/>
+              <a:t> and I handled merge </a:t>
+            </a:r>
+            <a:r>
+              <a:rPr lang="en-US" dirty="0" err="1"/>
+              <a:t>coflicts</a:t>
+            </a:r>
+            <a:r>
+              <a:rPr lang="en-US" dirty="0"/>
+              <a:t> with the presentation.</a:t>
+            </a:r>
+          </a:p>
+        </p:txBody>
+      </p:sp>
+      <p:sp>
+        <p:nvSpPr>
+          <p:cNvPr id="4" name="Slide Number Placeholder 3"/>
+          <p:cNvSpPr>
+            <a:spLocks noGrp="1"/>
+          </p:cNvSpPr>
+          <p:nvPr>
+            <p:ph type="sldNum" sz="quarter" idx="5"/>
+          </p:nvPr>
+        </p:nvSpPr>
+        <p:spPr/>
+        <p:txBody>
+          <a:bodyPr/>
+          <a:lstStyle/>
+          <a:p>
+            <a:fld id="{1EB1DABF-4E95-4EDF-8DA3-AD2A8632C0A3}" type="slidenum">
+              <a:rPr lang="en-US" smtClean="0"/>
+              <a:t>25</a:t>
+            </a:fld>
+            <a:endParaRPr lang="en-US"/>
+          </a:p>
+        </p:txBody>
+      </p:sp>
+    </p:spTree>
+    <p:extLst>
+      <p:ext uri="{BB962C8B-B14F-4D97-AF65-F5344CB8AC3E}">
+        <p14:creationId xmlns:p14="http://schemas.microsoft.com/office/powerpoint/2010/main" val="1825859643"/>
       </p:ext>
     </p:extLst>
   </p:cSld>
@@ -8111,7 +9713,7 @@
         <p:spPr>
           <a:xfrm>
             <a:off x="667149" y="2287244"/>
-            <a:ext cx="3572132" cy="1477328"/>
+            <a:ext cx="3629520" cy="2308324"/>
           </a:xfrm>
           <a:prstGeom prst="rect">
             <a:avLst/>
@@ -8129,8 +9731,27 @@
               <a:buChar char="•"/>
             </a:pPr>
             <a:r>
-              <a:rPr lang="en-US" dirty="0"/>
-              <a:t>git branch (-d -v) &lt;name&gt;</a:t>
+              <a:rPr lang="en-US" sz="3600" dirty="0">
+                <a:solidFill>
+                  <a:srgbClr val="FF0000"/>
+                </a:solidFill>
+              </a:rPr>
+              <a:t>git branch </a:t>
+            </a:r>
+            <a:br>
+              <a:rPr lang="en-US" sz="3600" dirty="0">
+                <a:solidFill>
+                  <a:srgbClr val="FF0000"/>
+                </a:solidFill>
+              </a:rPr>
+            </a:br>
+            <a:r>
+              <a:rPr lang="en-US" sz="3600" dirty="0">
+                <a:solidFill>
+                  <a:srgbClr val="FF0000"/>
+                </a:solidFill>
+              </a:rPr>
+              <a:t>    (-d -v) &lt;name&gt;</a:t>
             </a:r>
           </a:p>
           <a:p>
@@ -8140,15 +9761,7 @@
             </a:pPr>
             <a:r>
               <a:rPr lang="en-US" dirty="0"/>
-              <a:t>git checkout </a:t>
-            </a:r>
-            <a:r>
-              <a:rPr lang="en-US"/>
-              <a:t>(-b) </a:t>
-            </a:r>
-            <a:r>
-              <a:rPr lang="en-US" dirty="0"/>
-              <a:t>&lt;branch name&gt;</a:t>
+              <a:t>git checkout (-b) &lt;branch name&gt;</a:t>
             </a:r>
           </a:p>
           <a:p>
@@ -8183,10 +9796,624 @@
           </a:p>
         </p:txBody>
       </p:sp>
+      <p:pic>
+        <p:nvPicPr>
+          <p:cNvPr id="7" name="Picture 6">
+            <a:extLst>
+              <a:ext uri="{FF2B5EF4-FFF2-40B4-BE49-F238E27FC236}">
+                <a16:creationId xmlns:a16="http://schemas.microsoft.com/office/drawing/2014/main" id="{680A76B7-126E-4F8D-B854-920EC765DB6F}"/>
+              </a:ext>
+            </a:extLst>
+          </p:cNvPr>
+          <p:cNvPicPr>
+            <a:picLocks noChangeAspect="1"/>
+          </p:cNvPicPr>
+          <p:nvPr/>
+        </p:nvPicPr>
+        <p:blipFill>
+          <a:blip r:embed="rId3">
+            <a:extLst>
+              <a:ext uri="{28A0092B-C50C-407E-A947-70E740481C1C}">
+                <a14:useLocalDpi xmlns:a14="http://schemas.microsoft.com/office/drawing/2010/main" val="0"/>
+              </a:ext>
+            </a:extLst>
+          </a:blip>
+          <a:stretch>
+            <a:fillRect/>
+          </a:stretch>
+        </p:blipFill>
+        <p:spPr>
+          <a:xfrm>
+            <a:off x="5291728" y="1444749"/>
+            <a:ext cx="5819818" cy="3767165"/>
+          </a:xfrm>
+          <a:prstGeom prst="rect">
+            <a:avLst/>
+          </a:prstGeom>
+        </p:spPr>
+      </p:pic>
     </p:spTree>
     <p:extLst>
       <p:ext uri="{BB962C8B-B14F-4D97-AF65-F5344CB8AC3E}">
         <p14:creationId xmlns:p14="http://schemas.microsoft.com/office/powerpoint/2010/main" val="2830206149"/>
+      </p:ext>
+    </p:extLst>
+  </p:cSld>
+  <p:clrMapOvr>
+    <a:masterClrMapping/>
+  </p:clrMapOvr>
+</p:sld>
+</file>
+
+<file path=ppt/slides/slide17.xml><?xml version="1.0" encoding="utf-8"?>
+<p:sld xmlns:a="http://schemas.openxmlformats.org/drawingml/2006/main" xmlns:r="http://schemas.openxmlformats.org/officeDocument/2006/relationships" xmlns:p="http://schemas.openxmlformats.org/presentationml/2006/main">
+  <p:cSld>
+    <p:spTree>
+      <p:nvGrpSpPr>
+        <p:cNvPr id="1" name=""/>
+        <p:cNvGrpSpPr/>
+        <p:nvPr/>
+      </p:nvGrpSpPr>
+      <p:grpSpPr>
+        <a:xfrm>
+          <a:off x="0" y="0"/>
+          <a:ext cx="0" cy="0"/>
+          <a:chOff x="0" y="0"/>
+          <a:chExt cx="0" cy="0"/>
+        </a:xfrm>
+      </p:grpSpPr>
+      <p:sp>
+        <p:nvSpPr>
+          <p:cNvPr id="2" name="TextBox 1">
+            <a:extLst>
+              <a:ext uri="{FF2B5EF4-FFF2-40B4-BE49-F238E27FC236}">
+                <a16:creationId xmlns:a16="http://schemas.microsoft.com/office/drawing/2014/main" id="{211E321F-9F54-498F-BD6F-D26DA9D4DE07}"/>
+              </a:ext>
+            </a:extLst>
+          </p:cNvPr>
+          <p:cNvSpPr txBox="1"/>
+          <p:nvPr/>
+        </p:nvSpPr>
+        <p:spPr>
+          <a:xfrm>
+            <a:off x="586153" y="406400"/>
+            <a:ext cx="2650790" cy="707886"/>
+          </a:xfrm>
+          <a:prstGeom prst="rect">
+            <a:avLst/>
+          </a:prstGeom>
+          <a:noFill/>
+        </p:spPr>
+        <p:txBody>
+          <a:bodyPr wrap="none" rtlCol="0">
+            <a:spAutoFit/>
+          </a:bodyPr>
+          <a:lstStyle/>
+          <a:p>
+            <a:r>
+              <a:rPr lang="en-US" sz="4000" dirty="0"/>
+              <a:t>Branching…</a:t>
+            </a:r>
+          </a:p>
+        </p:txBody>
+      </p:sp>
+      <p:sp>
+        <p:nvSpPr>
+          <p:cNvPr id="3" name="TextBox 2">
+            <a:extLst>
+              <a:ext uri="{FF2B5EF4-FFF2-40B4-BE49-F238E27FC236}">
+                <a16:creationId xmlns:a16="http://schemas.microsoft.com/office/drawing/2014/main" id="{CAF814E6-FC94-4AA4-8BDA-EB411A456B88}"/>
+              </a:ext>
+            </a:extLst>
+          </p:cNvPr>
+          <p:cNvSpPr txBox="1"/>
+          <p:nvPr/>
+        </p:nvSpPr>
+        <p:spPr>
+          <a:xfrm>
+            <a:off x="667149" y="2287244"/>
+            <a:ext cx="4573816" cy="2308324"/>
+          </a:xfrm>
+          <a:prstGeom prst="rect">
+            <a:avLst/>
+          </a:prstGeom>
+          <a:noFill/>
+        </p:spPr>
+        <p:txBody>
+          <a:bodyPr wrap="none" rtlCol="0">
+            <a:spAutoFit/>
+          </a:bodyPr>
+          <a:lstStyle/>
+          <a:p>
+            <a:pPr marL="285750" indent="-285750">
+              <a:buFont typeface="Arial" panose="020B0604020202020204" pitchFamily="34" charset="0"/>
+              <a:buChar char="•"/>
+            </a:pPr>
+            <a:r>
+              <a:rPr lang="en-US" dirty="0"/>
+              <a:t>git branch (-d -v) &lt;name&gt;</a:t>
+            </a:r>
+          </a:p>
+          <a:p>
+            <a:pPr marL="285750" indent="-285750">
+              <a:buFont typeface="Arial" panose="020B0604020202020204" pitchFamily="34" charset="0"/>
+              <a:buChar char="•"/>
+            </a:pPr>
+            <a:r>
+              <a:rPr lang="en-US" sz="3600" dirty="0">
+                <a:solidFill>
+                  <a:srgbClr val="FF0000"/>
+                </a:solidFill>
+              </a:rPr>
+              <a:t>git checkout </a:t>
+            </a:r>
+            <a:br>
+              <a:rPr lang="en-US" sz="3600" dirty="0">
+                <a:solidFill>
+                  <a:srgbClr val="FF0000"/>
+                </a:solidFill>
+              </a:rPr>
+            </a:br>
+            <a:r>
+              <a:rPr lang="en-US" sz="3600" dirty="0">
+                <a:solidFill>
+                  <a:srgbClr val="FF0000"/>
+                </a:solidFill>
+              </a:rPr>
+              <a:t>    (-b) &lt;branch name&gt;</a:t>
+            </a:r>
+          </a:p>
+          <a:p>
+            <a:pPr marL="285750" indent="-285750">
+              <a:buFont typeface="Arial" panose="020B0604020202020204" pitchFamily="34" charset="0"/>
+              <a:buChar char="•"/>
+            </a:pPr>
+            <a:r>
+              <a:rPr lang="en-US" dirty="0"/>
+              <a:t>git stash </a:t>
+            </a:r>
+          </a:p>
+          <a:p>
+            <a:pPr marL="285750" indent="-285750">
+              <a:buFont typeface="Arial" panose="020B0604020202020204" pitchFamily="34" charset="0"/>
+              <a:buChar char="•"/>
+            </a:pPr>
+            <a:r>
+              <a:rPr lang="en-US" dirty="0"/>
+              <a:t>git merge &lt;branch name&gt;</a:t>
+            </a:r>
+          </a:p>
+          <a:p>
+            <a:pPr marL="285750" indent="-285750">
+              <a:buFont typeface="Arial" panose="020B0604020202020204" pitchFamily="34" charset="0"/>
+              <a:buChar char="•"/>
+            </a:pPr>
+            <a:r>
+              <a:rPr lang="en-US" dirty="0"/>
+              <a:t>git rebase &lt;new base&gt;</a:t>
+            </a:r>
+          </a:p>
+        </p:txBody>
+      </p:sp>
+      <p:pic>
+        <p:nvPicPr>
+          <p:cNvPr id="6" name="Picture 5">
+            <a:extLst>
+              <a:ext uri="{FF2B5EF4-FFF2-40B4-BE49-F238E27FC236}">
+                <a16:creationId xmlns:a16="http://schemas.microsoft.com/office/drawing/2014/main" id="{123F3B57-59AF-40AA-A50F-74FADFF13811}"/>
+              </a:ext>
+            </a:extLst>
+          </p:cNvPr>
+          <p:cNvPicPr>
+            <a:picLocks noChangeAspect="1"/>
+          </p:cNvPicPr>
+          <p:nvPr/>
+        </p:nvPicPr>
+        <p:blipFill>
+          <a:blip r:embed="rId3">
+            <a:extLst>
+              <a:ext uri="{28A0092B-C50C-407E-A947-70E740481C1C}">
+                <a14:useLocalDpi xmlns:a14="http://schemas.microsoft.com/office/drawing/2010/main" val="0"/>
+              </a:ext>
+            </a:extLst>
+          </a:blip>
+          <a:stretch>
+            <a:fillRect/>
+          </a:stretch>
+        </p:blipFill>
+        <p:spPr>
+          <a:xfrm>
+            <a:off x="5411883" y="1671142"/>
+            <a:ext cx="5915068" cy="3733827"/>
+          </a:xfrm>
+          <a:prstGeom prst="rect">
+            <a:avLst/>
+          </a:prstGeom>
+        </p:spPr>
+      </p:pic>
+    </p:spTree>
+    <p:extLst>
+      <p:ext uri="{BB962C8B-B14F-4D97-AF65-F5344CB8AC3E}">
+        <p14:creationId xmlns:p14="http://schemas.microsoft.com/office/powerpoint/2010/main" val="2292594125"/>
+      </p:ext>
+    </p:extLst>
+  </p:cSld>
+  <p:clrMapOvr>
+    <a:masterClrMapping/>
+  </p:clrMapOvr>
+</p:sld>
+</file>
+
+<file path=ppt/slides/slide18.xml><?xml version="1.0" encoding="utf-8"?>
+<p:sld xmlns:a="http://schemas.openxmlformats.org/drawingml/2006/main" xmlns:r="http://schemas.openxmlformats.org/officeDocument/2006/relationships" xmlns:p="http://schemas.openxmlformats.org/presentationml/2006/main">
+  <p:cSld>
+    <p:spTree>
+      <p:nvGrpSpPr>
+        <p:cNvPr id="1" name=""/>
+        <p:cNvGrpSpPr/>
+        <p:nvPr/>
+      </p:nvGrpSpPr>
+      <p:grpSpPr>
+        <a:xfrm>
+          <a:off x="0" y="0"/>
+          <a:ext cx="0" cy="0"/>
+          <a:chOff x="0" y="0"/>
+          <a:chExt cx="0" cy="0"/>
+        </a:xfrm>
+      </p:grpSpPr>
+      <p:sp>
+        <p:nvSpPr>
+          <p:cNvPr id="2" name="TextBox 1">
+            <a:extLst>
+              <a:ext uri="{FF2B5EF4-FFF2-40B4-BE49-F238E27FC236}">
+                <a16:creationId xmlns:a16="http://schemas.microsoft.com/office/drawing/2014/main" id="{211E321F-9F54-498F-BD6F-D26DA9D4DE07}"/>
+              </a:ext>
+            </a:extLst>
+          </p:cNvPr>
+          <p:cNvSpPr txBox="1"/>
+          <p:nvPr/>
+        </p:nvSpPr>
+        <p:spPr>
+          <a:xfrm>
+            <a:off x="586153" y="406400"/>
+            <a:ext cx="2650790" cy="707886"/>
+          </a:xfrm>
+          <a:prstGeom prst="rect">
+            <a:avLst/>
+          </a:prstGeom>
+          <a:noFill/>
+        </p:spPr>
+        <p:txBody>
+          <a:bodyPr wrap="none" rtlCol="0">
+            <a:spAutoFit/>
+          </a:bodyPr>
+          <a:lstStyle/>
+          <a:p>
+            <a:r>
+              <a:rPr lang="en-US" sz="4000" dirty="0"/>
+              <a:t>Branching…</a:t>
+            </a:r>
+          </a:p>
+        </p:txBody>
+      </p:sp>
+      <p:sp>
+        <p:nvSpPr>
+          <p:cNvPr id="3" name="TextBox 2">
+            <a:extLst>
+              <a:ext uri="{FF2B5EF4-FFF2-40B4-BE49-F238E27FC236}">
+                <a16:creationId xmlns:a16="http://schemas.microsoft.com/office/drawing/2014/main" id="{CAF814E6-FC94-4AA4-8BDA-EB411A456B88}"/>
+              </a:ext>
+            </a:extLst>
+          </p:cNvPr>
+          <p:cNvSpPr txBox="1"/>
+          <p:nvPr/>
+        </p:nvSpPr>
+        <p:spPr>
+          <a:xfrm>
+            <a:off x="667149" y="2287244"/>
+            <a:ext cx="3519233" cy="1477328"/>
+          </a:xfrm>
+          <a:prstGeom prst="rect">
+            <a:avLst/>
+          </a:prstGeom>
+          <a:noFill/>
+        </p:spPr>
+        <p:txBody>
+          <a:bodyPr wrap="none" rtlCol="0">
+            <a:spAutoFit/>
+          </a:bodyPr>
+          <a:lstStyle/>
+          <a:p>
+            <a:pPr marL="285750" indent="-285750">
+              <a:buFont typeface="Arial" panose="020B0604020202020204" pitchFamily="34" charset="0"/>
+              <a:buChar char="•"/>
+            </a:pPr>
+            <a:r>
+              <a:rPr lang="en-US" dirty="0"/>
+              <a:t>git branch (-d -v) &lt;name&gt;</a:t>
+            </a:r>
+          </a:p>
+          <a:p>
+            <a:pPr marL="285750" indent="-285750">
+              <a:buFont typeface="Arial" panose="020B0604020202020204" pitchFamily="34" charset="0"/>
+              <a:buChar char="•"/>
+            </a:pPr>
+            <a:r>
+              <a:rPr lang="en-US" dirty="0"/>
+              <a:t>git checkout (-b) &lt;branch name&gt;</a:t>
+            </a:r>
+          </a:p>
+          <a:p>
+            <a:pPr marL="285750" indent="-285750">
+              <a:buFont typeface="Arial" panose="020B0604020202020204" pitchFamily="34" charset="0"/>
+              <a:buChar char="•"/>
+            </a:pPr>
+            <a:r>
+              <a:rPr lang="en-US" dirty="0"/>
+              <a:t>git stash </a:t>
+            </a:r>
+          </a:p>
+          <a:p>
+            <a:pPr marL="285750" indent="-285750">
+              <a:buFont typeface="Arial" panose="020B0604020202020204" pitchFamily="34" charset="0"/>
+              <a:buChar char="•"/>
+            </a:pPr>
+            <a:r>
+              <a:rPr lang="en-US" dirty="0"/>
+              <a:t>git merge &lt;branch name&gt;</a:t>
+            </a:r>
+          </a:p>
+          <a:p>
+            <a:pPr marL="285750" indent="-285750">
+              <a:buFont typeface="Arial" panose="020B0604020202020204" pitchFamily="34" charset="0"/>
+              <a:buChar char="•"/>
+            </a:pPr>
+            <a:r>
+              <a:rPr lang="en-US" dirty="0"/>
+              <a:t>git rebase &lt;new base&gt;</a:t>
+            </a:r>
+          </a:p>
+        </p:txBody>
+      </p:sp>
+      <p:pic>
+        <p:nvPicPr>
+          <p:cNvPr id="5" name="Picture 4">
+            <a:extLst>
+              <a:ext uri="{FF2B5EF4-FFF2-40B4-BE49-F238E27FC236}">
+                <a16:creationId xmlns:a16="http://schemas.microsoft.com/office/drawing/2014/main" id="{D416487B-6673-4B89-93D3-646B49893F7C}"/>
+              </a:ext>
+            </a:extLst>
+          </p:cNvPr>
+          <p:cNvPicPr>
+            <a:picLocks noChangeAspect="1"/>
+          </p:cNvPicPr>
+          <p:nvPr/>
+        </p:nvPicPr>
+        <p:blipFill>
+          <a:blip r:embed="rId3">
+            <a:extLst>
+              <a:ext uri="{28A0092B-C50C-407E-A947-70E740481C1C}">
+                <a14:useLocalDpi xmlns:a14="http://schemas.microsoft.com/office/drawing/2010/main" val="0"/>
+              </a:ext>
+            </a:extLst>
+          </a:blip>
+          <a:stretch>
+            <a:fillRect/>
+          </a:stretch>
+        </p:blipFill>
+        <p:spPr>
+          <a:xfrm>
+            <a:off x="5409610" y="1947197"/>
+            <a:ext cx="5953169" cy="2762270"/>
+          </a:xfrm>
+          <a:prstGeom prst="rect">
+            <a:avLst/>
+          </a:prstGeom>
+        </p:spPr>
+      </p:pic>
+    </p:spTree>
+    <p:extLst>
+      <p:ext uri="{BB962C8B-B14F-4D97-AF65-F5344CB8AC3E}">
+        <p14:creationId xmlns:p14="http://schemas.microsoft.com/office/powerpoint/2010/main" val="1971593979"/>
+      </p:ext>
+    </p:extLst>
+  </p:cSld>
+  <p:clrMapOvr>
+    <a:masterClrMapping/>
+  </p:clrMapOvr>
+</p:sld>
+</file>
+
+<file path=ppt/slides/slide19.xml><?xml version="1.0" encoding="utf-8"?>
+<p:sld xmlns:a="http://schemas.openxmlformats.org/drawingml/2006/main" xmlns:r="http://schemas.openxmlformats.org/officeDocument/2006/relationships" xmlns:p="http://schemas.openxmlformats.org/presentationml/2006/main">
+  <p:cSld>
+    <p:spTree>
+      <p:nvGrpSpPr>
+        <p:cNvPr id="1" name=""/>
+        <p:cNvGrpSpPr/>
+        <p:nvPr/>
+      </p:nvGrpSpPr>
+      <p:grpSpPr>
+        <a:xfrm>
+          <a:off x="0" y="0"/>
+          <a:ext cx="0" cy="0"/>
+          <a:chOff x="0" y="0"/>
+          <a:chExt cx="0" cy="0"/>
+        </a:xfrm>
+      </p:grpSpPr>
+      <p:sp>
+        <p:nvSpPr>
+          <p:cNvPr id="2" name="TextBox 1">
+            <a:extLst>
+              <a:ext uri="{FF2B5EF4-FFF2-40B4-BE49-F238E27FC236}">
+                <a16:creationId xmlns:a16="http://schemas.microsoft.com/office/drawing/2014/main" id="{211E321F-9F54-498F-BD6F-D26DA9D4DE07}"/>
+              </a:ext>
+            </a:extLst>
+          </p:cNvPr>
+          <p:cNvSpPr txBox="1"/>
+          <p:nvPr/>
+        </p:nvSpPr>
+        <p:spPr>
+          <a:xfrm>
+            <a:off x="586153" y="406400"/>
+            <a:ext cx="2650790" cy="707886"/>
+          </a:xfrm>
+          <a:prstGeom prst="rect">
+            <a:avLst/>
+          </a:prstGeom>
+          <a:noFill/>
+        </p:spPr>
+        <p:txBody>
+          <a:bodyPr wrap="none" rtlCol="0">
+            <a:spAutoFit/>
+          </a:bodyPr>
+          <a:lstStyle/>
+          <a:p>
+            <a:r>
+              <a:rPr lang="en-US" sz="4000" dirty="0"/>
+              <a:t>Branching…</a:t>
+            </a:r>
+          </a:p>
+        </p:txBody>
+      </p:sp>
+      <p:sp>
+        <p:nvSpPr>
+          <p:cNvPr id="3" name="TextBox 2">
+            <a:extLst>
+              <a:ext uri="{FF2B5EF4-FFF2-40B4-BE49-F238E27FC236}">
+                <a16:creationId xmlns:a16="http://schemas.microsoft.com/office/drawing/2014/main" id="{CAF814E6-FC94-4AA4-8BDA-EB411A456B88}"/>
+              </a:ext>
+            </a:extLst>
+          </p:cNvPr>
+          <p:cNvSpPr txBox="1"/>
+          <p:nvPr/>
+        </p:nvSpPr>
+        <p:spPr>
+          <a:xfrm>
+            <a:off x="667149" y="2287244"/>
+            <a:ext cx="4573816" cy="2308324"/>
+          </a:xfrm>
+          <a:prstGeom prst="rect">
+            <a:avLst/>
+          </a:prstGeom>
+          <a:noFill/>
+        </p:spPr>
+        <p:txBody>
+          <a:bodyPr wrap="none" rtlCol="0">
+            <a:spAutoFit/>
+          </a:bodyPr>
+          <a:lstStyle/>
+          <a:p>
+            <a:pPr marL="285750" indent="-285750">
+              <a:buFont typeface="Arial" panose="020B0604020202020204" pitchFamily="34" charset="0"/>
+              <a:buChar char="•"/>
+            </a:pPr>
+            <a:r>
+              <a:rPr lang="en-US" dirty="0"/>
+              <a:t>git branch (-d -v) &lt;name&gt;</a:t>
+            </a:r>
+          </a:p>
+          <a:p>
+            <a:pPr marL="285750" indent="-285750">
+              <a:buFont typeface="Arial" panose="020B0604020202020204" pitchFamily="34" charset="0"/>
+              <a:buChar char="•"/>
+            </a:pPr>
+            <a:r>
+              <a:rPr lang="en-US" sz="3600" dirty="0">
+                <a:solidFill>
+                  <a:srgbClr val="FF0000"/>
+                </a:solidFill>
+              </a:rPr>
+              <a:t>git checkout </a:t>
+            </a:r>
+            <a:br>
+              <a:rPr lang="en-US" sz="3600" dirty="0">
+                <a:solidFill>
+                  <a:srgbClr val="FF0000"/>
+                </a:solidFill>
+              </a:rPr>
+            </a:br>
+            <a:r>
+              <a:rPr lang="en-US" sz="3600" dirty="0">
+                <a:solidFill>
+                  <a:srgbClr val="FF0000"/>
+                </a:solidFill>
+              </a:rPr>
+              <a:t>    (-b) &lt;branch name&gt;</a:t>
+            </a:r>
+          </a:p>
+          <a:p>
+            <a:pPr marL="285750" indent="-285750">
+              <a:buFont typeface="Arial" panose="020B0604020202020204" pitchFamily="34" charset="0"/>
+              <a:buChar char="•"/>
+            </a:pPr>
+            <a:r>
+              <a:rPr lang="en-US" dirty="0"/>
+              <a:t>git stash </a:t>
+            </a:r>
+          </a:p>
+          <a:p>
+            <a:pPr marL="285750" indent="-285750">
+              <a:buFont typeface="Arial" panose="020B0604020202020204" pitchFamily="34" charset="0"/>
+              <a:buChar char="•"/>
+            </a:pPr>
+            <a:r>
+              <a:rPr lang="en-US" dirty="0"/>
+              <a:t>git merge &lt;branch name&gt;</a:t>
+            </a:r>
+          </a:p>
+          <a:p>
+            <a:pPr marL="285750" indent="-285750">
+              <a:buFont typeface="Arial" panose="020B0604020202020204" pitchFamily="34" charset="0"/>
+              <a:buChar char="•"/>
+            </a:pPr>
+            <a:r>
+              <a:rPr lang="en-US" dirty="0"/>
+              <a:t>git rebase &lt;new base&gt;</a:t>
+            </a:r>
+          </a:p>
+        </p:txBody>
+      </p:sp>
+      <p:pic>
+        <p:nvPicPr>
+          <p:cNvPr id="5" name="Picture 4">
+            <a:extLst>
+              <a:ext uri="{FF2B5EF4-FFF2-40B4-BE49-F238E27FC236}">
+                <a16:creationId xmlns:a16="http://schemas.microsoft.com/office/drawing/2014/main" id="{7A3D1547-5F24-412A-965F-930331308C3E}"/>
+              </a:ext>
+            </a:extLst>
+          </p:cNvPr>
+          <p:cNvPicPr>
+            <a:picLocks noChangeAspect="1"/>
+          </p:cNvPicPr>
+          <p:nvPr/>
+        </p:nvPicPr>
+        <p:blipFill>
+          <a:blip r:embed="rId3">
+            <a:extLst>
+              <a:ext uri="{28A0092B-C50C-407E-A947-70E740481C1C}">
+                <a14:useLocalDpi xmlns:a14="http://schemas.microsoft.com/office/drawing/2010/main" val="0"/>
+              </a:ext>
+            </a:extLst>
+          </a:blip>
+          <a:stretch>
+            <a:fillRect/>
+          </a:stretch>
+        </p:blipFill>
+        <p:spPr>
+          <a:xfrm>
+            <a:off x="5576445" y="1619000"/>
+            <a:ext cx="5948406" cy="2814658"/>
+          </a:xfrm>
+          <a:prstGeom prst="rect">
+            <a:avLst/>
+          </a:prstGeom>
+        </p:spPr>
+      </p:pic>
+    </p:spTree>
+    <p:extLst>
+      <p:ext uri="{BB962C8B-B14F-4D97-AF65-F5344CB8AC3E}">
+        <p14:creationId xmlns:p14="http://schemas.microsoft.com/office/powerpoint/2010/main" val="1402074850"/>
       </p:ext>
     </p:extLst>
   </p:cSld>
@@ -8371,6 +10598,1110 @@
     <p:extLst>
       <p:ext uri="{BB962C8B-B14F-4D97-AF65-F5344CB8AC3E}">
         <p14:creationId xmlns:p14="http://schemas.microsoft.com/office/powerpoint/2010/main" val="74346873"/>
+      </p:ext>
+    </p:extLst>
+  </p:cSld>
+  <p:clrMapOvr>
+    <a:masterClrMapping/>
+  </p:clrMapOvr>
+</p:sld>
+</file>
+
+<file path=ppt/slides/slide20.xml><?xml version="1.0" encoding="utf-8"?>
+<p:sld xmlns:a="http://schemas.openxmlformats.org/drawingml/2006/main" xmlns:r="http://schemas.openxmlformats.org/officeDocument/2006/relationships" xmlns:p="http://schemas.openxmlformats.org/presentationml/2006/main">
+  <p:cSld>
+    <p:spTree>
+      <p:nvGrpSpPr>
+        <p:cNvPr id="1" name=""/>
+        <p:cNvGrpSpPr/>
+        <p:nvPr/>
+      </p:nvGrpSpPr>
+      <p:grpSpPr>
+        <a:xfrm>
+          <a:off x="0" y="0"/>
+          <a:ext cx="0" cy="0"/>
+          <a:chOff x="0" y="0"/>
+          <a:chExt cx="0" cy="0"/>
+        </a:xfrm>
+      </p:grpSpPr>
+      <p:sp>
+        <p:nvSpPr>
+          <p:cNvPr id="2" name="TextBox 1">
+            <a:extLst>
+              <a:ext uri="{FF2B5EF4-FFF2-40B4-BE49-F238E27FC236}">
+                <a16:creationId xmlns:a16="http://schemas.microsoft.com/office/drawing/2014/main" id="{211E321F-9F54-498F-BD6F-D26DA9D4DE07}"/>
+              </a:ext>
+            </a:extLst>
+          </p:cNvPr>
+          <p:cNvSpPr txBox="1"/>
+          <p:nvPr/>
+        </p:nvSpPr>
+        <p:spPr>
+          <a:xfrm>
+            <a:off x="586153" y="406400"/>
+            <a:ext cx="2650790" cy="707886"/>
+          </a:xfrm>
+          <a:prstGeom prst="rect">
+            <a:avLst/>
+          </a:prstGeom>
+          <a:noFill/>
+        </p:spPr>
+        <p:txBody>
+          <a:bodyPr wrap="none" rtlCol="0">
+            <a:spAutoFit/>
+          </a:bodyPr>
+          <a:lstStyle/>
+          <a:p>
+            <a:r>
+              <a:rPr lang="en-US" sz="4000" dirty="0"/>
+              <a:t>Branching…</a:t>
+            </a:r>
+          </a:p>
+        </p:txBody>
+      </p:sp>
+      <p:sp>
+        <p:nvSpPr>
+          <p:cNvPr id="3" name="TextBox 2">
+            <a:extLst>
+              <a:ext uri="{FF2B5EF4-FFF2-40B4-BE49-F238E27FC236}">
+                <a16:creationId xmlns:a16="http://schemas.microsoft.com/office/drawing/2014/main" id="{CAF814E6-FC94-4AA4-8BDA-EB411A456B88}"/>
+              </a:ext>
+            </a:extLst>
+          </p:cNvPr>
+          <p:cNvSpPr txBox="1"/>
+          <p:nvPr/>
+        </p:nvSpPr>
+        <p:spPr>
+          <a:xfrm>
+            <a:off x="667149" y="2287244"/>
+            <a:ext cx="3519233" cy="1754326"/>
+          </a:xfrm>
+          <a:prstGeom prst="rect">
+            <a:avLst/>
+          </a:prstGeom>
+          <a:noFill/>
+        </p:spPr>
+        <p:txBody>
+          <a:bodyPr wrap="none" rtlCol="0">
+            <a:spAutoFit/>
+          </a:bodyPr>
+          <a:lstStyle/>
+          <a:p>
+            <a:pPr marL="285750" indent="-285750">
+              <a:buFont typeface="Arial" panose="020B0604020202020204" pitchFamily="34" charset="0"/>
+              <a:buChar char="•"/>
+            </a:pPr>
+            <a:r>
+              <a:rPr lang="en-US" dirty="0"/>
+              <a:t>git branch (-d -v) &lt;name&gt;</a:t>
+            </a:r>
+          </a:p>
+          <a:p>
+            <a:pPr marL="285750" indent="-285750">
+              <a:buFont typeface="Arial" panose="020B0604020202020204" pitchFamily="34" charset="0"/>
+              <a:buChar char="•"/>
+            </a:pPr>
+            <a:r>
+              <a:rPr lang="en-US" dirty="0"/>
+              <a:t>git checkout (-b) &lt;branch name&gt;</a:t>
+            </a:r>
+          </a:p>
+          <a:p>
+            <a:pPr marL="285750" indent="-285750">
+              <a:buFont typeface="Arial" panose="020B0604020202020204" pitchFamily="34" charset="0"/>
+              <a:buChar char="•"/>
+            </a:pPr>
+            <a:r>
+              <a:rPr lang="en-US" sz="3600" dirty="0">
+                <a:solidFill>
+                  <a:srgbClr val="FF0000"/>
+                </a:solidFill>
+              </a:rPr>
+              <a:t>git stash </a:t>
+            </a:r>
+          </a:p>
+          <a:p>
+            <a:pPr marL="285750" indent="-285750">
+              <a:buFont typeface="Arial" panose="020B0604020202020204" pitchFamily="34" charset="0"/>
+              <a:buChar char="•"/>
+            </a:pPr>
+            <a:r>
+              <a:rPr lang="en-US" dirty="0"/>
+              <a:t>git merge &lt;branch name&gt;</a:t>
+            </a:r>
+          </a:p>
+          <a:p>
+            <a:pPr marL="285750" indent="-285750">
+              <a:buFont typeface="Arial" panose="020B0604020202020204" pitchFamily="34" charset="0"/>
+              <a:buChar char="•"/>
+            </a:pPr>
+            <a:r>
+              <a:rPr lang="en-US" dirty="0"/>
+              <a:t>git rebase &lt;new base&gt;</a:t>
+            </a:r>
+          </a:p>
+        </p:txBody>
+      </p:sp>
+      <p:pic>
+        <p:nvPicPr>
+          <p:cNvPr id="6" name="Picture 5">
+            <a:extLst>
+              <a:ext uri="{FF2B5EF4-FFF2-40B4-BE49-F238E27FC236}">
+                <a16:creationId xmlns:a16="http://schemas.microsoft.com/office/drawing/2014/main" id="{B3F16543-A268-4872-A1CC-FA95B3285603}"/>
+              </a:ext>
+            </a:extLst>
+          </p:cNvPr>
+          <p:cNvPicPr>
+            <a:picLocks noChangeAspect="1"/>
+          </p:cNvPicPr>
+          <p:nvPr/>
+        </p:nvPicPr>
+        <p:blipFill>
+          <a:blip r:embed="rId3">
+            <a:extLst>
+              <a:ext uri="{28A0092B-C50C-407E-A947-70E740481C1C}">
+                <a14:useLocalDpi xmlns:a14="http://schemas.microsoft.com/office/drawing/2010/main" val="0"/>
+              </a:ext>
+            </a:extLst>
+          </a:blip>
+          <a:stretch>
+            <a:fillRect/>
+          </a:stretch>
+        </p:blipFill>
+        <p:spPr>
+          <a:xfrm>
+            <a:off x="5238421" y="1957376"/>
+            <a:ext cx="6010319" cy="2943247"/>
+          </a:xfrm>
+          <a:prstGeom prst="rect">
+            <a:avLst/>
+          </a:prstGeom>
+        </p:spPr>
+      </p:pic>
+    </p:spTree>
+    <p:extLst>
+      <p:ext uri="{BB962C8B-B14F-4D97-AF65-F5344CB8AC3E}">
+        <p14:creationId xmlns:p14="http://schemas.microsoft.com/office/powerpoint/2010/main" val="1260767284"/>
+      </p:ext>
+    </p:extLst>
+  </p:cSld>
+  <p:clrMapOvr>
+    <a:masterClrMapping/>
+  </p:clrMapOvr>
+</p:sld>
+</file>
+
+<file path=ppt/slides/slide21.xml><?xml version="1.0" encoding="utf-8"?>
+<p:sld xmlns:a="http://schemas.openxmlformats.org/drawingml/2006/main" xmlns:r="http://schemas.openxmlformats.org/officeDocument/2006/relationships" xmlns:p="http://schemas.openxmlformats.org/presentationml/2006/main">
+  <p:cSld>
+    <p:spTree>
+      <p:nvGrpSpPr>
+        <p:cNvPr id="1" name=""/>
+        <p:cNvGrpSpPr/>
+        <p:nvPr/>
+      </p:nvGrpSpPr>
+      <p:grpSpPr>
+        <a:xfrm>
+          <a:off x="0" y="0"/>
+          <a:ext cx="0" cy="0"/>
+          <a:chOff x="0" y="0"/>
+          <a:chExt cx="0" cy="0"/>
+        </a:xfrm>
+      </p:grpSpPr>
+      <p:sp>
+        <p:nvSpPr>
+          <p:cNvPr id="2" name="TextBox 1">
+            <a:extLst>
+              <a:ext uri="{FF2B5EF4-FFF2-40B4-BE49-F238E27FC236}">
+                <a16:creationId xmlns:a16="http://schemas.microsoft.com/office/drawing/2014/main" id="{211E321F-9F54-498F-BD6F-D26DA9D4DE07}"/>
+              </a:ext>
+            </a:extLst>
+          </p:cNvPr>
+          <p:cNvSpPr txBox="1"/>
+          <p:nvPr/>
+        </p:nvSpPr>
+        <p:spPr>
+          <a:xfrm>
+            <a:off x="586153" y="406400"/>
+            <a:ext cx="2650790" cy="707886"/>
+          </a:xfrm>
+          <a:prstGeom prst="rect">
+            <a:avLst/>
+          </a:prstGeom>
+          <a:noFill/>
+        </p:spPr>
+        <p:txBody>
+          <a:bodyPr wrap="none" rtlCol="0">
+            <a:spAutoFit/>
+          </a:bodyPr>
+          <a:lstStyle/>
+          <a:p>
+            <a:r>
+              <a:rPr lang="en-US" sz="4000" dirty="0"/>
+              <a:t>Branching…</a:t>
+            </a:r>
+          </a:p>
+        </p:txBody>
+      </p:sp>
+      <p:sp>
+        <p:nvSpPr>
+          <p:cNvPr id="3" name="TextBox 2">
+            <a:extLst>
+              <a:ext uri="{FF2B5EF4-FFF2-40B4-BE49-F238E27FC236}">
+                <a16:creationId xmlns:a16="http://schemas.microsoft.com/office/drawing/2014/main" id="{CAF814E6-FC94-4AA4-8BDA-EB411A456B88}"/>
+              </a:ext>
+            </a:extLst>
+          </p:cNvPr>
+          <p:cNvSpPr txBox="1"/>
+          <p:nvPr/>
+        </p:nvSpPr>
+        <p:spPr>
+          <a:xfrm>
+            <a:off x="667149" y="2287244"/>
+            <a:ext cx="3519233" cy="1754326"/>
+          </a:xfrm>
+          <a:prstGeom prst="rect">
+            <a:avLst/>
+          </a:prstGeom>
+          <a:noFill/>
+        </p:spPr>
+        <p:txBody>
+          <a:bodyPr wrap="none" rtlCol="0">
+            <a:spAutoFit/>
+          </a:bodyPr>
+          <a:lstStyle/>
+          <a:p>
+            <a:pPr marL="285750" indent="-285750">
+              <a:buFont typeface="Arial" panose="020B0604020202020204" pitchFamily="34" charset="0"/>
+              <a:buChar char="•"/>
+            </a:pPr>
+            <a:r>
+              <a:rPr lang="en-US" dirty="0"/>
+              <a:t>git branch (-d -v) &lt;name&gt;</a:t>
+            </a:r>
+          </a:p>
+          <a:p>
+            <a:pPr marL="285750" indent="-285750">
+              <a:buFont typeface="Arial" panose="020B0604020202020204" pitchFamily="34" charset="0"/>
+              <a:buChar char="•"/>
+            </a:pPr>
+            <a:r>
+              <a:rPr lang="en-US" dirty="0"/>
+              <a:t>git checkout (-b) &lt;branch name&gt;</a:t>
+            </a:r>
+          </a:p>
+          <a:p>
+            <a:pPr marL="285750" indent="-285750">
+              <a:buFont typeface="Arial" panose="020B0604020202020204" pitchFamily="34" charset="0"/>
+              <a:buChar char="•"/>
+            </a:pPr>
+            <a:r>
+              <a:rPr lang="en-US" sz="3600" dirty="0">
+                <a:solidFill>
+                  <a:srgbClr val="FF0000"/>
+                </a:solidFill>
+              </a:rPr>
+              <a:t>git stash </a:t>
+            </a:r>
+          </a:p>
+          <a:p>
+            <a:pPr marL="285750" indent="-285750">
+              <a:buFont typeface="Arial" panose="020B0604020202020204" pitchFamily="34" charset="0"/>
+              <a:buChar char="•"/>
+            </a:pPr>
+            <a:r>
+              <a:rPr lang="en-US" dirty="0"/>
+              <a:t>git merge &lt;branch name&gt;</a:t>
+            </a:r>
+          </a:p>
+          <a:p>
+            <a:pPr marL="285750" indent="-285750">
+              <a:buFont typeface="Arial" panose="020B0604020202020204" pitchFamily="34" charset="0"/>
+              <a:buChar char="•"/>
+            </a:pPr>
+            <a:r>
+              <a:rPr lang="en-US" dirty="0"/>
+              <a:t>git rebase &lt;new base&gt;</a:t>
+            </a:r>
+          </a:p>
+        </p:txBody>
+      </p:sp>
+      <p:pic>
+        <p:nvPicPr>
+          <p:cNvPr id="5" name="Picture 4">
+            <a:extLst>
+              <a:ext uri="{FF2B5EF4-FFF2-40B4-BE49-F238E27FC236}">
+                <a16:creationId xmlns:a16="http://schemas.microsoft.com/office/drawing/2014/main" id="{C5FE871C-1934-4752-8D9C-7372F29B66DE}"/>
+              </a:ext>
+            </a:extLst>
+          </p:cNvPr>
+          <p:cNvPicPr>
+            <a:picLocks noChangeAspect="1"/>
+          </p:cNvPicPr>
+          <p:nvPr/>
+        </p:nvPicPr>
+        <p:blipFill>
+          <a:blip r:embed="rId3">
+            <a:extLst>
+              <a:ext uri="{28A0092B-C50C-407E-A947-70E740481C1C}">
+                <a14:useLocalDpi xmlns:a14="http://schemas.microsoft.com/office/drawing/2010/main" val="0"/>
+              </a:ext>
+            </a:extLst>
+          </a:blip>
+          <a:stretch>
+            <a:fillRect/>
+          </a:stretch>
+        </p:blipFill>
+        <p:spPr>
+          <a:xfrm>
+            <a:off x="5173146" y="2055663"/>
+            <a:ext cx="5838868" cy="2948009"/>
+          </a:xfrm>
+          <a:prstGeom prst="rect">
+            <a:avLst/>
+          </a:prstGeom>
+        </p:spPr>
+      </p:pic>
+    </p:spTree>
+    <p:extLst>
+      <p:ext uri="{BB962C8B-B14F-4D97-AF65-F5344CB8AC3E}">
+        <p14:creationId xmlns:p14="http://schemas.microsoft.com/office/powerpoint/2010/main" val="2409735082"/>
+      </p:ext>
+    </p:extLst>
+  </p:cSld>
+  <p:clrMapOvr>
+    <a:masterClrMapping/>
+  </p:clrMapOvr>
+</p:sld>
+</file>
+
+<file path=ppt/slides/slide22.xml><?xml version="1.0" encoding="utf-8"?>
+<p:sld xmlns:a="http://schemas.openxmlformats.org/drawingml/2006/main" xmlns:r="http://schemas.openxmlformats.org/officeDocument/2006/relationships" xmlns:p="http://schemas.openxmlformats.org/presentationml/2006/main">
+  <p:cSld>
+    <p:spTree>
+      <p:nvGrpSpPr>
+        <p:cNvPr id="1" name=""/>
+        <p:cNvGrpSpPr/>
+        <p:nvPr/>
+      </p:nvGrpSpPr>
+      <p:grpSpPr>
+        <a:xfrm>
+          <a:off x="0" y="0"/>
+          <a:ext cx="0" cy="0"/>
+          <a:chOff x="0" y="0"/>
+          <a:chExt cx="0" cy="0"/>
+        </a:xfrm>
+      </p:grpSpPr>
+      <p:sp>
+        <p:nvSpPr>
+          <p:cNvPr id="2" name="TextBox 1">
+            <a:extLst>
+              <a:ext uri="{FF2B5EF4-FFF2-40B4-BE49-F238E27FC236}">
+                <a16:creationId xmlns:a16="http://schemas.microsoft.com/office/drawing/2014/main" id="{211E321F-9F54-498F-BD6F-D26DA9D4DE07}"/>
+              </a:ext>
+            </a:extLst>
+          </p:cNvPr>
+          <p:cNvSpPr txBox="1"/>
+          <p:nvPr/>
+        </p:nvSpPr>
+        <p:spPr>
+          <a:xfrm>
+            <a:off x="586153" y="406400"/>
+            <a:ext cx="2650790" cy="707886"/>
+          </a:xfrm>
+          <a:prstGeom prst="rect">
+            <a:avLst/>
+          </a:prstGeom>
+          <a:noFill/>
+        </p:spPr>
+        <p:txBody>
+          <a:bodyPr wrap="none" rtlCol="0">
+            <a:spAutoFit/>
+          </a:bodyPr>
+          <a:lstStyle/>
+          <a:p>
+            <a:r>
+              <a:rPr lang="en-US" sz="4000" dirty="0"/>
+              <a:t>Branching…</a:t>
+            </a:r>
+          </a:p>
+        </p:txBody>
+      </p:sp>
+      <p:sp>
+        <p:nvSpPr>
+          <p:cNvPr id="3" name="TextBox 2">
+            <a:extLst>
+              <a:ext uri="{FF2B5EF4-FFF2-40B4-BE49-F238E27FC236}">
+                <a16:creationId xmlns:a16="http://schemas.microsoft.com/office/drawing/2014/main" id="{CAF814E6-FC94-4AA4-8BDA-EB411A456B88}"/>
+              </a:ext>
+            </a:extLst>
+          </p:cNvPr>
+          <p:cNvSpPr txBox="1"/>
+          <p:nvPr/>
+        </p:nvSpPr>
+        <p:spPr>
+          <a:xfrm>
+            <a:off x="667149" y="2287244"/>
+            <a:ext cx="5272213" cy="1754326"/>
+          </a:xfrm>
+          <a:prstGeom prst="rect">
+            <a:avLst/>
+          </a:prstGeom>
+          <a:noFill/>
+        </p:spPr>
+        <p:txBody>
+          <a:bodyPr wrap="none" rtlCol="0">
+            <a:spAutoFit/>
+          </a:bodyPr>
+          <a:lstStyle/>
+          <a:p>
+            <a:pPr marL="285750" indent="-285750">
+              <a:buFont typeface="Arial" panose="020B0604020202020204" pitchFamily="34" charset="0"/>
+              <a:buChar char="•"/>
+            </a:pPr>
+            <a:r>
+              <a:rPr lang="en-US" dirty="0"/>
+              <a:t>git branch (-d -v) &lt;name&gt;</a:t>
+            </a:r>
+          </a:p>
+          <a:p>
+            <a:pPr marL="285750" indent="-285750">
+              <a:buFont typeface="Arial" panose="020B0604020202020204" pitchFamily="34" charset="0"/>
+              <a:buChar char="•"/>
+            </a:pPr>
+            <a:r>
+              <a:rPr lang="en-US" dirty="0"/>
+              <a:t>git checkout (-b) &lt;branch name&gt;</a:t>
+            </a:r>
+          </a:p>
+          <a:p>
+            <a:pPr marL="285750" indent="-285750">
+              <a:buFont typeface="Arial" panose="020B0604020202020204" pitchFamily="34" charset="0"/>
+              <a:buChar char="•"/>
+            </a:pPr>
+            <a:r>
+              <a:rPr lang="en-US" dirty="0"/>
+              <a:t>git stash </a:t>
+            </a:r>
+          </a:p>
+          <a:p>
+            <a:pPr marL="285750" indent="-285750">
+              <a:buFont typeface="Arial" panose="020B0604020202020204" pitchFamily="34" charset="0"/>
+              <a:buChar char="•"/>
+            </a:pPr>
+            <a:r>
+              <a:rPr lang="en-US" sz="3600" dirty="0">
+                <a:solidFill>
+                  <a:srgbClr val="FF0000"/>
+                </a:solidFill>
+              </a:rPr>
+              <a:t>git merge &lt;branch name&gt;</a:t>
+            </a:r>
+          </a:p>
+          <a:p>
+            <a:pPr marL="285750" indent="-285750">
+              <a:buFont typeface="Arial" panose="020B0604020202020204" pitchFamily="34" charset="0"/>
+              <a:buChar char="•"/>
+            </a:pPr>
+            <a:r>
+              <a:rPr lang="en-US" dirty="0"/>
+              <a:t>git rebase &lt;new base&gt;</a:t>
+            </a:r>
+          </a:p>
+        </p:txBody>
+      </p:sp>
+      <p:pic>
+        <p:nvPicPr>
+          <p:cNvPr id="5" name="Picture 4">
+            <a:extLst>
+              <a:ext uri="{FF2B5EF4-FFF2-40B4-BE49-F238E27FC236}">
+                <a16:creationId xmlns:a16="http://schemas.microsoft.com/office/drawing/2014/main" id="{DCD6C50A-3717-4E5F-B429-3169467C0DDD}"/>
+              </a:ext>
+            </a:extLst>
+          </p:cNvPr>
+          <p:cNvPicPr>
+            <a:picLocks noChangeAspect="1"/>
+          </p:cNvPicPr>
+          <p:nvPr/>
+        </p:nvPicPr>
+        <p:blipFill>
+          <a:blip r:embed="rId3">
+            <a:extLst>
+              <a:ext uri="{28A0092B-C50C-407E-A947-70E740481C1C}">
+                <a14:useLocalDpi xmlns:a14="http://schemas.microsoft.com/office/drawing/2010/main" val="0"/>
+              </a:ext>
+            </a:extLst>
+          </a:blip>
+          <a:stretch>
+            <a:fillRect/>
+          </a:stretch>
+        </p:blipFill>
+        <p:spPr>
+          <a:xfrm>
+            <a:off x="5838257" y="1659128"/>
+            <a:ext cx="5834105" cy="3724302"/>
+          </a:xfrm>
+          <a:prstGeom prst="rect">
+            <a:avLst/>
+          </a:prstGeom>
+        </p:spPr>
+      </p:pic>
+    </p:spTree>
+    <p:extLst>
+      <p:ext uri="{BB962C8B-B14F-4D97-AF65-F5344CB8AC3E}">
+        <p14:creationId xmlns:p14="http://schemas.microsoft.com/office/powerpoint/2010/main" val="2320644596"/>
+      </p:ext>
+    </p:extLst>
+  </p:cSld>
+  <p:clrMapOvr>
+    <a:masterClrMapping/>
+  </p:clrMapOvr>
+</p:sld>
+</file>
+
+<file path=ppt/slides/slide23.xml><?xml version="1.0" encoding="utf-8"?>
+<p:sld xmlns:a="http://schemas.openxmlformats.org/drawingml/2006/main" xmlns:r="http://schemas.openxmlformats.org/officeDocument/2006/relationships" xmlns:p="http://schemas.openxmlformats.org/presentationml/2006/main">
+  <p:cSld>
+    <p:spTree>
+      <p:nvGrpSpPr>
+        <p:cNvPr id="1" name=""/>
+        <p:cNvGrpSpPr/>
+        <p:nvPr/>
+      </p:nvGrpSpPr>
+      <p:grpSpPr>
+        <a:xfrm>
+          <a:off x="0" y="0"/>
+          <a:ext cx="0" cy="0"/>
+          <a:chOff x="0" y="0"/>
+          <a:chExt cx="0" cy="0"/>
+        </a:xfrm>
+      </p:grpSpPr>
+      <p:pic>
+        <p:nvPicPr>
+          <p:cNvPr id="6" name="Picture 5">
+            <a:extLst>
+              <a:ext uri="{FF2B5EF4-FFF2-40B4-BE49-F238E27FC236}">
+                <a16:creationId xmlns:a16="http://schemas.microsoft.com/office/drawing/2014/main" id="{E9453D0D-EA72-4614-A260-3AB2D8BE9A69}"/>
+              </a:ext>
+            </a:extLst>
+          </p:cNvPr>
+          <p:cNvPicPr>
+            <a:picLocks noChangeAspect="1"/>
+          </p:cNvPicPr>
+          <p:nvPr/>
+        </p:nvPicPr>
+        <p:blipFill>
+          <a:blip r:embed="rId3">
+            <a:extLst>
+              <a:ext uri="{28A0092B-C50C-407E-A947-70E740481C1C}">
+                <a14:useLocalDpi xmlns:a14="http://schemas.microsoft.com/office/drawing/2010/main" val="0"/>
+              </a:ext>
+            </a:extLst>
+          </a:blip>
+          <a:stretch>
+            <a:fillRect/>
+          </a:stretch>
+        </p:blipFill>
+        <p:spPr>
+          <a:xfrm>
+            <a:off x="5836422" y="2223270"/>
+            <a:ext cx="6005556" cy="2528906"/>
+          </a:xfrm>
+          <a:prstGeom prst="rect">
+            <a:avLst/>
+          </a:prstGeom>
+        </p:spPr>
+      </p:pic>
+      <p:sp>
+        <p:nvSpPr>
+          <p:cNvPr id="2" name="TextBox 1">
+            <a:extLst>
+              <a:ext uri="{FF2B5EF4-FFF2-40B4-BE49-F238E27FC236}">
+                <a16:creationId xmlns:a16="http://schemas.microsoft.com/office/drawing/2014/main" id="{211E321F-9F54-498F-BD6F-D26DA9D4DE07}"/>
+              </a:ext>
+            </a:extLst>
+          </p:cNvPr>
+          <p:cNvSpPr txBox="1"/>
+          <p:nvPr/>
+        </p:nvSpPr>
+        <p:spPr>
+          <a:xfrm>
+            <a:off x="586153" y="406400"/>
+            <a:ext cx="2650790" cy="707886"/>
+          </a:xfrm>
+          <a:prstGeom prst="rect">
+            <a:avLst/>
+          </a:prstGeom>
+          <a:noFill/>
+        </p:spPr>
+        <p:txBody>
+          <a:bodyPr wrap="none" rtlCol="0">
+            <a:spAutoFit/>
+          </a:bodyPr>
+          <a:lstStyle/>
+          <a:p>
+            <a:r>
+              <a:rPr lang="en-US" sz="4000" dirty="0"/>
+              <a:t>Branching…</a:t>
+            </a:r>
+          </a:p>
+        </p:txBody>
+      </p:sp>
+      <p:sp>
+        <p:nvSpPr>
+          <p:cNvPr id="3" name="TextBox 2">
+            <a:extLst>
+              <a:ext uri="{FF2B5EF4-FFF2-40B4-BE49-F238E27FC236}">
+                <a16:creationId xmlns:a16="http://schemas.microsoft.com/office/drawing/2014/main" id="{CAF814E6-FC94-4AA4-8BDA-EB411A456B88}"/>
+              </a:ext>
+            </a:extLst>
+          </p:cNvPr>
+          <p:cNvSpPr txBox="1"/>
+          <p:nvPr/>
+        </p:nvSpPr>
+        <p:spPr>
+          <a:xfrm>
+            <a:off x="667149" y="2287244"/>
+            <a:ext cx="5272213" cy="1754326"/>
+          </a:xfrm>
+          <a:prstGeom prst="rect">
+            <a:avLst/>
+          </a:prstGeom>
+          <a:noFill/>
+        </p:spPr>
+        <p:txBody>
+          <a:bodyPr wrap="none" rtlCol="0">
+            <a:spAutoFit/>
+          </a:bodyPr>
+          <a:lstStyle/>
+          <a:p>
+            <a:pPr marL="285750" indent="-285750">
+              <a:buFont typeface="Arial" panose="020B0604020202020204" pitchFamily="34" charset="0"/>
+              <a:buChar char="•"/>
+            </a:pPr>
+            <a:r>
+              <a:rPr lang="en-US" dirty="0"/>
+              <a:t>git branch (-d -v) &lt;name&gt;</a:t>
+            </a:r>
+          </a:p>
+          <a:p>
+            <a:pPr marL="285750" indent="-285750">
+              <a:buFont typeface="Arial" panose="020B0604020202020204" pitchFamily="34" charset="0"/>
+              <a:buChar char="•"/>
+            </a:pPr>
+            <a:r>
+              <a:rPr lang="en-US" dirty="0"/>
+              <a:t>git checkout (-b) &lt;branch name&gt;</a:t>
+            </a:r>
+          </a:p>
+          <a:p>
+            <a:pPr marL="285750" indent="-285750">
+              <a:buFont typeface="Arial" panose="020B0604020202020204" pitchFamily="34" charset="0"/>
+              <a:buChar char="•"/>
+            </a:pPr>
+            <a:r>
+              <a:rPr lang="en-US" dirty="0"/>
+              <a:t>git stash </a:t>
+            </a:r>
+          </a:p>
+          <a:p>
+            <a:pPr marL="285750" indent="-285750">
+              <a:buFont typeface="Arial" panose="020B0604020202020204" pitchFamily="34" charset="0"/>
+              <a:buChar char="•"/>
+            </a:pPr>
+            <a:r>
+              <a:rPr lang="en-US" sz="3600" dirty="0">
+                <a:solidFill>
+                  <a:srgbClr val="FF0000"/>
+                </a:solidFill>
+              </a:rPr>
+              <a:t>git merge &lt;branch name&gt;</a:t>
+            </a:r>
+          </a:p>
+          <a:p>
+            <a:pPr marL="285750" indent="-285750">
+              <a:buFont typeface="Arial" panose="020B0604020202020204" pitchFamily="34" charset="0"/>
+              <a:buChar char="•"/>
+            </a:pPr>
+            <a:r>
+              <a:rPr lang="en-US" dirty="0"/>
+              <a:t>git rebase &lt;new base&gt;</a:t>
+            </a:r>
+          </a:p>
+        </p:txBody>
+      </p:sp>
+    </p:spTree>
+    <p:extLst>
+      <p:ext uri="{BB962C8B-B14F-4D97-AF65-F5344CB8AC3E}">
+        <p14:creationId xmlns:p14="http://schemas.microsoft.com/office/powerpoint/2010/main" val="1798754958"/>
+      </p:ext>
+    </p:extLst>
+  </p:cSld>
+  <p:clrMapOvr>
+    <a:masterClrMapping/>
+  </p:clrMapOvr>
+</p:sld>
+</file>
+
+<file path=ppt/slides/slide24.xml><?xml version="1.0" encoding="utf-8"?>
+<p:sld xmlns:a="http://schemas.openxmlformats.org/drawingml/2006/main" xmlns:r="http://schemas.openxmlformats.org/officeDocument/2006/relationships" xmlns:p="http://schemas.openxmlformats.org/presentationml/2006/main">
+  <p:cSld>
+    <p:spTree>
+      <p:nvGrpSpPr>
+        <p:cNvPr id="1" name=""/>
+        <p:cNvGrpSpPr/>
+        <p:nvPr/>
+      </p:nvGrpSpPr>
+      <p:grpSpPr>
+        <a:xfrm>
+          <a:off x="0" y="0"/>
+          <a:ext cx="0" cy="0"/>
+          <a:chOff x="0" y="0"/>
+          <a:chExt cx="0" cy="0"/>
+        </a:xfrm>
+      </p:grpSpPr>
+      <p:pic>
+        <p:nvPicPr>
+          <p:cNvPr id="6" name="Picture 5">
+            <a:extLst>
+              <a:ext uri="{FF2B5EF4-FFF2-40B4-BE49-F238E27FC236}">
+                <a16:creationId xmlns:a16="http://schemas.microsoft.com/office/drawing/2014/main" id="{11354057-BADD-48FE-8F38-509E14140C66}"/>
+              </a:ext>
+            </a:extLst>
+          </p:cNvPr>
+          <p:cNvPicPr>
+            <a:picLocks noChangeAspect="1"/>
+          </p:cNvPicPr>
+          <p:nvPr/>
+        </p:nvPicPr>
+        <p:blipFill>
+          <a:blip r:embed="rId3">
+            <a:extLst>
+              <a:ext uri="{28A0092B-C50C-407E-A947-70E740481C1C}">
+                <a14:useLocalDpi xmlns:a14="http://schemas.microsoft.com/office/drawing/2010/main" val="0"/>
+              </a:ext>
+            </a:extLst>
+          </a:blip>
+          <a:stretch>
+            <a:fillRect/>
+          </a:stretch>
+        </p:blipFill>
+        <p:spPr>
+          <a:xfrm>
+            <a:off x="5723520" y="1904716"/>
+            <a:ext cx="5929356" cy="2519381"/>
+          </a:xfrm>
+          <a:prstGeom prst="rect">
+            <a:avLst/>
+          </a:prstGeom>
+        </p:spPr>
+      </p:pic>
+      <p:sp>
+        <p:nvSpPr>
+          <p:cNvPr id="2" name="TextBox 1">
+            <a:extLst>
+              <a:ext uri="{FF2B5EF4-FFF2-40B4-BE49-F238E27FC236}">
+                <a16:creationId xmlns:a16="http://schemas.microsoft.com/office/drawing/2014/main" id="{211E321F-9F54-498F-BD6F-D26DA9D4DE07}"/>
+              </a:ext>
+            </a:extLst>
+          </p:cNvPr>
+          <p:cNvSpPr txBox="1"/>
+          <p:nvPr/>
+        </p:nvSpPr>
+        <p:spPr>
+          <a:xfrm>
+            <a:off x="586153" y="406400"/>
+            <a:ext cx="2650790" cy="707886"/>
+          </a:xfrm>
+          <a:prstGeom prst="rect">
+            <a:avLst/>
+          </a:prstGeom>
+          <a:noFill/>
+        </p:spPr>
+        <p:txBody>
+          <a:bodyPr wrap="none" rtlCol="0">
+            <a:spAutoFit/>
+          </a:bodyPr>
+          <a:lstStyle/>
+          <a:p>
+            <a:r>
+              <a:rPr lang="en-US" sz="4000" dirty="0"/>
+              <a:t>Branching…</a:t>
+            </a:r>
+          </a:p>
+        </p:txBody>
+      </p:sp>
+      <p:sp>
+        <p:nvSpPr>
+          <p:cNvPr id="3" name="TextBox 2">
+            <a:extLst>
+              <a:ext uri="{FF2B5EF4-FFF2-40B4-BE49-F238E27FC236}">
+                <a16:creationId xmlns:a16="http://schemas.microsoft.com/office/drawing/2014/main" id="{CAF814E6-FC94-4AA4-8BDA-EB411A456B88}"/>
+              </a:ext>
+            </a:extLst>
+          </p:cNvPr>
+          <p:cNvSpPr txBox="1"/>
+          <p:nvPr/>
+        </p:nvSpPr>
+        <p:spPr>
+          <a:xfrm>
+            <a:off x="667149" y="2287244"/>
+            <a:ext cx="5272213" cy="1754326"/>
+          </a:xfrm>
+          <a:prstGeom prst="rect">
+            <a:avLst/>
+          </a:prstGeom>
+          <a:noFill/>
+        </p:spPr>
+        <p:txBody>
+          <a:bodyPr wrap="none" rtlCol="0">
+            <a:spAutoFit/>
+          </a:bodyPr>
+          <a:lstStyle/>
+          <a:p>
+            <a:pPr marL="285750" indent="-285750">
+              <a:buFont typeface="Arial" panose="020B0604020202020204" pitchFamily="34" charset="0"/>
+              <a:buChar char="•"/>
+            </a:pPr>
+            <a:r>
+              <a:rPr lang="en-US" dirty="0"/>
+              <a:t>git branch (-d -v) &lt;name&gt;</a:t>
+            </a:r>
+          </a:p>
+          <a:p>
+            <a:pPr marL="285750" indent="-285750">
+              <a:buFont typeface="Arial" panose="020B0604020202020204" pitchFamily="34" charset="0"/>
+              <a:buChar char="•"/>
+            </a:pPr>
+            <a:r>
+              <a:rPr lang="en-US" dirty="0"/>
+              <a:t>git checkout (-b) &lt;branch name&gt;</a:t>
+            </a:r>
+          </a:p>
+          <a:p>
+            <a:pPr marL="285750" indent="-285750">
+              <a:buFont typeface="Arial" panose="020B0604020202020204" pitchFamily="34" charset="0"/>
+              <a:buChar char="•"/>
+            </a:pPr>
+            <a:r>
+              <a:rPr lang="en-US" dirty="0"/>
+              <a:t>git stash </a:t>
+            </a:r>
+          </a:p>
+          <a:p>
+            <a:pPr marL="285750" indent="-285750">
+              <a:buFont typeface="Arial" panose="020B0604020202020204" pitchFamily="34" charset="0"/>
+              <a:buChar char="•"/>
+            </a:pPr>
+            <a:r>
+              <a:rPr lang="en-US" sz="3600" dirty="0">
+                <a:solidFill>
+                  <a:srgbClr val="FF0000"/>
+                </a:solidFill>
+              </a:rPr>
+              <a:t>git merge &lt;branch name&gt;</a:t>
+            </a:r>
+          </a:p>
+          <a:p>
+            <a:pPr marL="285750" indent="-285750">
+              <a:buFont typeface="Arial" panose="020B0604020202020204" pitchFamily="34" charset="0"/>
+              <a:buChar char="•"/>
+            </a:pPr>
+            <a:r>
+              <a:rPr lang="en-US" dirty="0"/>
+              <a:t>git rebase &lt;new base&gt;</a:t>
+            </a:r>
+          </a:p>
+        </p:txBody>
+      </p:sp>
+    </p:spTree>
+    <p:extLst>
+      <p:ext uri="{BB962C8B-B14F-4D97-AF65-F5344CB8AC3E}">
+        <p14:creationId xmlns:p14="http://schemas.microsoft.com/office/powerpoint/2010/main" val="1971368743"/>
+      </p:ext>
+    </p:extLst>
+  </p:cSld>
+  <p:clrMapOvr>
+    <a:masterClrMapping/>
+  </p:clrMapOvr>
+</p:sld>
+</file>
+
+<file path=ppt/slides/slide25.xml><?xml version="1.0" encoding="utf-8"?>
+<p:sld xmlns:a="http://schemas.openxmlformats.org/drawingml/2006/main" xmlns:r="http://schemas.openxmlformats.org/officeDocument/2006/relationships" xmlns:p="http://schemas.openxmlformats.org/presentationml/2006/main">
+  <p:cSld>
+    <p:spTree>
+      <p:nvGrpSpPr>
+        <p:cNvPr id="1" name=""/>
+        <p:cNvGrpSpPr/>
+        <p:nvPr/>
+      </p:nvGrpSpPr>
+      <p:grpSpPr>
+        <a:xfrm>
+          <a:off x="0" y="0"/>
+          <a:ext cx="0" cy="0"/>
+          <a:chOff x="0" y="0"/>
+          <a:chExt cx="0" cy="0"/>
+        </a:xfrm>
+      </p:grpSpPr>
+      <p:pic>
+        <p:nvPicPr>
+          <p:cNvPr id="5" name="Picture 4">
+            <a:extLst>
+              <a:ext uri="{FF2B5EF4-FFF2-40B4-BE49-F238E27FC236}">
+                <a16:creationId xmlns:a16="http://schemas.microsoft.com/office/drawing/2014/main" id="{44C00943-EF97-482B-95F4-97E8D6B72156}"/>
+              </a:ext>
+            </a:extLst>
+          </p:cNvPr>
+          <p:cNvPicPr>
+            <a:picLocks noChangeAspect="1"/>
+          </p:cNvPicPr>
+          <p:nvPr/>
+        </p:nvPicPr>
+        <p:blipFill>
+          <a:blip r:embed="rId3">
+            <a:extLst>
+              <a:ext uri="{28A0092B-C50C-407E-A947-70E740481C1C}">
+                <a14:useLocalDpi xmlns:a14="http://schemas.microsoft.com/office/drawing/2010/main" val="0"/>
+              </a:ext>
+            </a:extLst>
+          </a:blip>
+          <a:stretch>
+            <a:fillRect/>
+          </a:stretch>
+        </p:blipFill>
+        <p:spPr>
+          <a:xfrm>
+            <a:off x="5856389" y="2287244"/>
+            <a:ext cx="5881731" cy="2062178"/>
+          </a:xfrm>
+          <a:prstGeom prst="rect">
+            <a:avLst/>
+          </a:prstGeom>
+        </p:spPr>
+      </p:pic>
+      <p:sp>
+        <p:nvSpPr>
+          <p:cNvPr id="2" name="TextBox 1">
+            <a:extLst>
+              <a:ext uri="{FF2B5EF4-FFF2-40B4-BE49-F238E27FC236}">
+                <a16:creationId xmlns:a16="http://schemas.microsoft.com/office/drawing/2014/main" id="{211E321F-9F54-498F-BD6F-D26DA9D4DE07}"/>
+              </a:ext>
+            </a:extLst>
+          </p:cNvPr>
+          <p:cNvSpPr txBox="1"/>
+          <p:nvPr/>
+        </p:nvSpPr>
+        <p:spPr>
+          <a:xfrm>
+            <a:off x="586153" y="406400"/>
+            <a:ext cx="2650790" cy="707886"/>
+          </a:xfrm>
+          <a:prstGeom prst="rect">
+            <a:avLst/>
+          </a:prstGeom>
+          <a:noFill/>
+        </p:spPr>
+        <p:txBody>
+          <a:bodyPr wrap="none" rtlCol="0">
+            <a:spAutoFit/>
+          </a:bodyPr>
+          <a:lstStyle/>
+          <a:p>
+            <a:r>
+              <a:rPr lang="en-US" sz="4000" dirty="0"/>
+              <a:t>Branching…</a:t>
+            </a:r>
+          </a:p>
+        </p:txBody>
+      </p:sp>
+      <p:sp>
+        <p:nvSpPr>
+          <p:cNvPr id="3" name="TextBox 2">
+            <a:extLst>
+              <a:ext uri="{FF2B5EF4-FFF2-40B4-BE49-F238E27FC236}">
+                <a16:creationId xmlns:a16="http://schemas.microsoft.com/office/drawing/2014/main" id="{CAF814E6-FC94-4AA4-8BDA-EB411A456B88}"/>
+              </a:ext>
+            </a:extLst>
+          </p:cNvPr>
+          <p:cNvSpPr txBox="1"/>
+          <p:nvPr/>
+        </p:nvSpPr>
+        <p:spPr>
+          <a:xfrm>
+            <a:off x="667149" y="2287244"/>
+            <a:ext cx="5272213" cy="1754326"/>
+          </a:xfrm>
+          <a:prstGeom prst="rect">
+            <a:avLst/>
+          </a:prstGeom>
+          <a:noFill/>
+        </p:spPr>
+        <p:txBody>
+          <a:bodyPr wrap="none" rtlCol="0">
+            <a:spAutoFit/>
+          </a:bodyPr>
+          <a:lstStyle/>
+          <a:p>
+            <a:pPr marL="285750" indent="-285750">
+              <a:buFont typeface="Arial" panose="020B0604020202020204" pitchFamily="34" charset="0"/>
+              <a:buChar char="•"/>
+            </a:pPr>
+            <a:r>
+              <a:rPr lang="en-US" dirty="0"/>
+              <a:t>git branch (-d -v) &lt;name&gt;</a:t>
+            </a:r>
+          </a:p>
+          <a:p>
+            <a:pPr marL="285750" indent="-285750">
+              <a:buFont typeface="Arial" panose="020B0604020202020204" pitchFamily="34" charset="0"/>
+              <a:buChar char="•"/>
+            </a:pPr>
+            <a:r>
+              <a:rPr lang="en-US" dirty="0"/>
+              <a:t>git checkout (-b) &lt;branch name&gt;</a:t>
+            </a:r>
+          </a:p>
+          <a:p>
+            <a:pPr marL="285750" indent="-285750">
+              <a:buFont typeface="Arial" panose="020B0604020202020204" pitchFamily="34" charset="0"/>
+              <a:buChar char="•"/>
+            </a:pPr>
+            <a:r>
+              <a:rPr lang="en-US" dirty="0"/>
+              <a:t>git stash </a:t>
+            </a:r>
+          </a:p>
+          <a:p>
+            <a:pPr marL="285750" indent="-285750">
+              <a:buFont typeface="Arial" panose="020B0604020202020204" pitchFamily="34" charset="0"/>
+              <a:buChar char="•"/>
+            </a:pPr>
+            <a:r>
+              <a:rPr lang="en-US" sz="3600" dirty="0">
+                <a:solidFill>
+                  <a:srgbClr val="FF0000"/>
+                </a:solidFill>
+              </a:rPr>
+              <a:t>git merge &lt;branch name&gt;</a:t>
+            </a:r>
+          </a:p>
+          <a:p>
+            <a:pPr marL="285750" indent="-285750">
+              <a:buFont typeface="Arial" panose="020B0604020202020204" pitchFamily="34" charset="0"/>
+              <a:buChar char="•"/>
+            </a:pPr>
+            <a:r>
+              <a:rPr lang="en-US" dirty="0"/>
+              <a:t>git rebase &lt;new base&gt;</a:t>
+            </a:r>
+          </a:p>
+        </p:txBody>
+      </p:sp>
+    </p:spTree>
+    <p:extLst>
+      <p:ext uri="{BB962C8B-B14F-4D97-AF65-F5344CB8AC3E}">
+        <p14:creationId xmlns:p14="http://schemas.microsoft.com/office/powerpoint/2010/main" val="847351172"/>
       </p:ext>
     </p:extLst>
   </p:cSld>

</xml_diff>

<commit_message>
Added slides for working with collaborators on github.
</commit_message>
<xml_diff>
--- a/learn-to-git.pptx
+++ b/learn-to-git.pptx
@@ -5,7 +5,7 @@
     <p:sldMasterId id="2147483648" r:id="rId1"/>
   </p:sldMasterIdLst>
   <p:notesMasterIdLst>
-    <p:notesMasterId r:id="rId27"/>
+    <p:notesMasterId r:id="rId30"/>
   </p:notesMasterIdLst>
   <p:sldIdLst>
     <p:sldId id="256" r:id="rId2"/>
@@ -33,6 +33,9 @@
     <p:sldId id="281" r:id="rId24"/>
     <p:sldId id="279" r:id="rId25"/>
     <p:sldId id="282" r:id="rId26"/>
+    <p:sldId id="283" r:id="rId27"/>
+    <p:sldId id="284" r:id="rId28"/>
+    <p:sldId id="285" r:id="rId29"/>
   </p:sldIdLst>
   <p:sldSz cx="12192000" cy="6858000"/>
   <p:notesSz cx="6858000" cy="9144000"/>
@@ -4885,6 +4888,46 @@
             </a:pPr>
             <a:r>
               <a:rPr lang="en-US" dirty="0"/>
+              <a:t>Commit in small digestible chunks.  Commit often.</a:t>
+            </a:r>
+          </a:p>
+          <a:p>
+            <a:pPr marL="628650" lvl="1" indent="-171450">
+              <a:buFontTx/>
+              <a:buChar char="-"/>
+            </a:pPr>
+            <a:r>
+              <a:rPr lang="en-US" dirty="0"/>
+              <a:t>Start with a single line with a simple description, no more than 50 characters (I normally do 80). Then </a:t>
+            </a:r>
+            <a:br>
+              <a:rPr lang="en-US" dirty="0"/>
+            </a:br>
+            <a:r>
+              <a:rPr lang="en-US" dirty="0"/>
+              <a:t>include a more detailed description below a separating line.</a:t>
+            </a:r>
+          </a:p>
+          <a:p>
+            <a:pPr marL="171450" marR="0" lvl="0" indent="-171450" algn="l" defTabSz="914400" rtl="0" eaLnBrk="1" fontAlgn="auto" latinLnBrk="0" hangingPunct="1">
+              <a:lnSpc>
+                <a:spcPct val="100000"/>
+              </a:lnSpc>
+              <a:spcBef>
+                <a:spcPts val="0"/>
+              </a:spcBef>
+              <a:spcAft>
+                <a:spcPts val="0"/>
+              </a:spcAft>
+              <a:buClrTx/>
+              <a:buSzTx/>
+              <a:buFontTx/>
+              <a:buChar char="-"/>
+              <a:tabLst/>
+              <a:defRPr/>
+            </a:pPr>
+            <a:r>
+              <a:rPr lang="en-US" dirty="0"/>
               <a:t>Introduce a .</a:t>
             </a:r>
             <a:r>
@@ -4897,7 +4940,7 @@
             </a:r>
           </a:p>
           <a:p>
-            <a:pPr marL="1085850" lvl="2" indent="-171450">
+            <a:pPr marL="628650" lvl="1" indent="-171450">
               <a:buFontTx/>
               <a:buChar char="-"/>
             </a:pPr>
@@ -4907,7 +4950,7 @@
             </a:r>
           </a:p>
           <a:p>
-            <a:pPr marL="1085850" lvl="2" indent="-171450">
+            <a:pPr marL="628650" lvl="1" indent="-171450">
               <a:buFontTx/>
               <a:buChar char="-"/>
             </a:pPr>
@@ -4915,6 +4958,13 @@
               <a:rPr lang="en-US" dirty="0"/>
               <a:t>Standard glob patterns work (look at documentation for more information)</a:t>
             </a:r>
+          </a:p>
+          <a:p>
+            <a:pPr marL="171450" lvl="0" indent="-171450">
+              <a:buFontTx/>
+              <a:buChar char="-"/>
+            </a:pPr>
+            <a:endParaRPr lang="en-US" dirty="0"/>
           </a:p>
         </p:txBody>
       </p:sp>
@@ -11702,6 +11752,273 @@
     <p:extLst>
       <p:ext uri="{BB962C8B-B14F-4D97-AF65-F5344CB8AC3E}">
         <p14:creationId xmlns:p14="http://schemas.microsoft.com/office/powerpoint/2010/main" val="847351172"/>
+      </p:ext>
+    </p:extLst>
+  </p:cSld>
+  <p:clrMapOvr>
+    <a:masterClrMapping/>
+  </p:clrMapOvr>
+</p:sld>
+</file>
+
+<file path=ppt/slides/slide26.xml><?xml version="1.0" encoding="utf-8"?>
+<p:sld xmlns:a="http://schemas.openxmlformats.org/drawingml/2006/main" xmlns:r="http://schemas.openxmlformats.org/officeDocument/2006/relationships" xmlns:p="http://schemas.openxmlformats.org/presentationml/2006/main">
+  <p:cSld>
+    <p:spTree>
+      <p:nvGrpSpPr>
+        <p:cNvPr id="1" name=""/>
+        <p:cNvGrpSpPr/>
+        <p:nvPr/>
+      </p:nvGrpSpPr>
+      <p:grpSpPr>
+        <a:xfrm>
+          <a:off x="0" y="0"/>
+          <a:ext cx="0" cy="0"/>
+          <a:chOff x="0" y="0"/>
+          <a:chExt cx="0" cy="0"/>
+        </a:xfrm>
+      </p:grpSpPr>
+      <p:sp>
+        <p:nvSpPr>
+          <p:cNvPr id="2" name="TextBox 1">
+            <a:extLst>
+              <a:ext uri="{FF2B5EF4-FFF2-40B4-BE49-F238E27FC236}">
+                <a16:creationId xmlns:a16="http://schemas.microsoft.com/office/drawing/2014/main" id="{A7DDDB86-B195-4824-AC6A-B3B842079334}"/>
+              </a:ext>
+            </a:extLst>
+          </p:cNvPr>
+          <p:cNvSpPr txBox="1"/>
+          <p:nvPr/>
+        </p:nvSpPr>
+        <p:spPr>
+          <a:xfrm>
+            <a:off x="604007" y="553673"/>
+            <a:ext cx="4717445" cy="707886"/>
+          </a:xfrm>
+          <a:prstGeom prst="rect">
+            <a:avLst/>
+          </a:prstGeom>
+          <a:noFill/>
+        </p:spPr>
+        <p:txBody>
+          <a:bodyPr wrap="none" rtlCol="0">
+            <a:spAutoFit/>
+          </a:bodyPr>
+          <a:lstStyle/>
+          <a:p>
+            <a:r>
+              <a:rPr lang="en-US" sz="4000" dirty="0"/>
+              <a:t>Set up </a:t>
+            </a:r>
+            <a:r>
+              <a:rPr lang="en-US" sz="4000" dirty="0" err="1"/>
+              <a:t>github</a:t>
+            </a:r>
+            <a:r>
+              <a:rPr lang="en-US" sz="4000" dirty="0"/>
+              <a:t> account</a:t>
+            </a:r>
+          </a:p>
+        </p:txBody>
+      </p:sp>
+    </p:spTree>
+    <p:extLst>
+      <p:ext uri="{BB962C8B-B14F-4D97-AF65-F5344CB8AC3E}">
+        <p14:creationId xmlns:p14="http://schemas.microsoft.com/office/powerpoint/2010/main" val="4149905578"/>
+      </p:ext>
+    </p:extLst>
+  </p:cSld>
+  <p:clrMapOvr>
+    <a:masterClrMapping/>
+  </p:clrMapOvr>
+</p:sld>
+</file>
+
+<file path=ppt/slides/slide27.xml><?xml version="1.0" encoding="utf-8"?>
+<p:sld xmlns:a="http://schemas.openxmlformats.org/drawingml/2006/main" xmlns:r="http://schemas.openxmlformats.org/officeDocument/2006/relationships" xmlns:p="http://schemas.openxmlformats.org/presentationml/2006/main">
+  <p:cSld>
+    <p:spTree>
+      <p:nvGrpSpPr>
+        <p:cNvPr id="1" name=""/>
+        <p:cNvGrpSpPr/>
+        <p:nvPr/>
+      </p:nvGrpSpPr>
+      <p:grpSpPr>
+        <a:xfrm>
+          <a:off x="0" y="0"/>
+          <a:ext cx="0" cy="0"/>
+          <a:chOff x="0" y="0"/>
+          <a:chExt cx="0" cy="0"/>
+        </a:xfrm>
+      </p:grpSpPr>
+      <p:sp>
+        <p:nvSpPr>
+          <p:cNvPr id="2" name="TextBox 1">
+            <a:extLst>
+              <a:ext uri="{FF2B5EF4-FFF2-40B4-BE49-F238E27FC236}">
+                <a16:creationId xmlns:a16="http://schemas.microsoft.com/office/drawing/2014/main" id="{7016066B-1B69-47E2-AA6C-7A8783C812E4}"/>
+              </a:ext>
+            </a:extLst>
+          </p:cNvPr>
+          <p:cNvSpPr txBox="1"/>
+          <p:nvPr/>
+        </p:nvSpPr>
+        <p:spPr>
+          <a:xfrm>
+            <a:off x="419449" y="427839"/>
+            <a:ext cx="6481774" cy="707886"/>
+          </a:xfrm>
+          <a:prstGeom prst="rect">
+            <a:avLst/>
+          </a:prstGeom>
+          <a:noFill/>
+        </p:spPr>
+        <p:txBody>
+          <a:bodyPr wrap="none" rtlCol="0">
+            <a:spAutoFit/>
+          </a:bodyPr>
+          <a:lstStyle/>
+          <a:p>
+            <a:r>
+              <a:rPr lang="en-US" sz="4000" dirty="0"/>
+              <a:t>Create/add a project to </a:t>
+            </a:r>
+            <a:r>
+              <a:rPr lang="en-US" sz="4000" dirty="0" err="1"/>
+              <a:t>github</a:t>
+            </a:r>
+            <a:endParaRPr lang="en-US" sz="4000" dirty="0"/>
+          </a:p>
+        </p:txBody>
+      </p:sp>
+    </p:spTree>
+    <p:extLst>
+      <p:ext uri="{BB962C8B-B14F-4D97-AF65-F5344CB8AC3E}">
+        <p14:creationId xmlns:p14="http://schemas.microsoft.com/office/powerpoint/2010/main" val="956517483"/>
+      </p:ext>
+    </p:extLst>
+  </p:cSld>
+  <p:clrMapOvr>
+    <a:masterClrMapping/>
+  </p:clrMapOvr>
+</p:sld>
+</file>
+
+<file path=ppt/slides/slide28.xml><?xml version="1.0" encoding="utf-8"?>
+<p:sld xmlns:a="http://schemas.openxmlformats.org/drawingml/2006/main" xmlns:r="http://schemas.openxmlformats.org/officeDocument/2006/relationships" xmlns:p="http://schemas.openxmlformats.org/presentationml/2006/main">
+  <p:cSld>
+    <p:spTree>
+      <p:nvGrpSpPr>
+        <p:cNvPr id="1" name=""/>
+        <p:cNvGrpSpPr/>
+        <p:nvPr/>
+      </p:nvGrpSpPr>
+      <p:grpSpPr>
+        <a:xfrm>
+          <a:off x="0" y="0"/>
+          <a:ext cx="0" cy="0"/>
+          <a:chOff x="0" y="0"/>
+          <a:chExt cx="0" cy="0"/>
+        </a:xfrm>
+      </p:grpSpPr>
+      <p:sp>
+        <p:nvSpPr>
+          <p:cNvPr id="2" name="TextBox 1">
+            <a:extLst>
+              <a:ext uri="{FF2B5EF4-FFF2-40B4-BE49-F238E27FC236}">
+                <a16:creationId xmlns:a16="http://schemas.microsoft.com/office/drawing/2014/main" id="{300CE20C-A6AB-4F8D-9ED6-7059F3406342}"/>
+              </a:ext>
+            </a:extLst>
+          </p:cNvPr>
+          <p:cNvSpPr txBox="1"/>
+          <p:nvPr/>
+        </p:nvSpPr>
+        <p:spPr>
+          <a:xfrm>
+            <a:off x="285226" y="419450"/>
+            <a:ext cx="6047040" cy="707886"/>
+          </a:xfrm>
+          <a:prstGeom prst="rect">
+            <a:avLst/>
+          </a:prstGeom>
+          <a:noFill/>
+        </p:spPr>
+        <p:txBody>
+          <a:bodyPr wrap="none" rtlCol="0">
+            <a:spAutoFit/>
+          </a:bodyPr>
+          <a:lstStyle/>
+          <a:p>
+            <a:r>
+              <a:rPr lang="en-US" sz="4000" dirty="0"/>
+              <a:t>Workflow with contributors </a:t>
+            </a:r>
+          </a:p>
+        </p:txBody>
+      </p:sp>
+      <p:sp>
+        <p:nvSpPr>
+          <p:cNvPr id="3" name="TextBox 2">
+            <a:extLst>
+              <a:ext uri="{FF2B5EF4-FFF2-40B4-BE49-F238E27FC236}">
+                <a16:creationId xmlns:a16="http://schemas.microsoft.com/office/drawing/2014/main" id="{162A7009-58D9-4C21-AEBF-EBC1D882B395}"/>
+              </a:ext>
+            </a:extLst>
+          </p:cNvPr>
+          <p:cNvSpPr txBox="1"/>
+          <p:nvPr/>
+        </p:nvSpPr>
+        <p:spPr>
+          <a:xfrm>
+            <a:off x="1518407" y="2290194"/>
+            <a:ext cx="1659429" cy="923330"/>
+          </a:xfrm>
+          <a:prstGeom prst="rect">
+            <a:avLst/>
+          </a:prstGeom>
+          <a:noFill/>
+        </p:spPr>
+        <p:txBody>
+          <a:bodyPr wrap="none" rtlCol="0">
+            <a:spAutoFit/>
+          </a:bodyPr>
+          <a:lstStyle/>
+          <a:p>
+            <a:pPr marL="285750" indent="-285750">
+              <a:buFont typeface="Arial" panose="020B0604020202020204" pitchFamily="34" charset="0"/>
+              <a:buChar char="•"/>
+            </a:pPr>
+            <a:r>
+              <a:rPr lang="en-US" dirty="0"/>
+              <a:t>git push/pull</a:t>
+            </a:r>
+          </a:p>
+          <a:p>
+            <a:pPr marL="285750" indent="-285750">
+              <a:buFont typeface="Arial" panose="020B0604020202020204" pitchFamily="34" charset="0"/>
+              <a:buChar char="•"/>
+            </a:pPr>
+            <a:r>
+              <a:rPr lang="en-US" dirty="0"/>
+              <a:t>git branch</a:t>
+            </a:r>
+          </a:p>
+          <a:p>
+            <a:pPr marL="285750" indent="-285750">
+              <a:buFont typeface="Arial" panose="020B0604020202020204" pitchFamily="34" charset="0"/>
+              <a:buChar char="•"/>
+            </a:pPr>
+            <a:r>
+              <a:rPr lang="en-US" dirty="0"/>
+              <a:t>git remote</a:t>
+            </a:r>
+          </a:p>
+        </p:txBody>
+      </p:sp>
+    </p:spTree>
+    <p:extLst>
+      <p:ext uri="{BB962C8B-B14F-4D97-AF65-F5344CB8AC3E}">
+        <p14:creationId xmlns:p14="http://schemas.microsoft.com/office/powerpoint/2010/main" val="958838245"/>
       </p:ext>
     </p:extLst>
   </p:cSld>

</xml_diff>

<commit_message>
Added a few figures in the beginning slides
</commit_message>
<xml_diff>
--- a/learn-to-git.pptx
+++ b/learn-to-git.pptx
@@ -5,19 +5,24 @@
     <p:sldMasterId id="2147483648" r:id="rId1"/>
   </p:sldMasterIdLst>
   <p:notesMasterIdLst>
-    <p:notesMasterId r:id="rId12"/>
+    <p:notesMasterId r:id="rId17"/>
   </p:notesMasterIdLst>
   <p:sldIdLst>
     <p:sldId id="256" r:id="rId2"/>
-    <p:sldId id="257" r:id="rId3"/>
-    <p:sldId id="264" r:id="rId4"/>
-    <p:sldId id="263" r:id="rId5"/>
-    <p:sldId id="260" r:id="rId6"/>
-    <p:sldId id="261" r:id="rId7"/>
-    <p:sldId id="262" r:id="rId8"/>
-    <p:sldId id="266" r:id="rId9"/>
-    <p:sldId id="265" r:id="rId10"/>
-    <p:sldId id="258" r:id="rId11"/>
+    <p:sldId id="270" r:id="rId3"/>
+    <p:sldId id="260" r:id="rId4"/>
+    <p:sldId id="269" r:id="rId5"/>
+    <p:sldId id="261" r:id="rId6"/>
+    <p:sldId id="262" r:id="rId7"/>
+    <p:sldId id="271" r:id="rId8"/>
+    <p:sldId id="272" r:id="rId9"/>
+    <p:sldId id="266" r:id="rId10"/>
+    <p:sldId id="264" r:id="rId11"/>
+    <p:sldId id="263" r:id="rId12"/>
+    <p:sldId id="265" r:id="rId13"/>
+    <p:sldId id="258" r:id="rId14"/>
+    <p:sldId id="268" r:id="rId15"/>
+    <p:sldId id="267" r:id="rId16"/>
   </p:sldIdLst>
   <p:sldSz cx="12192000" cy="6858000"/>
   <p:notesSz cx="6858000" cy="9144000"/>
@@ -206,7 +211,7 @@
           <a:p>
             <a:fld id="{5DE3B9EE-8657-4270-9540-C548D39E80E2}" type="datetimeFigureOut">
               <a:rPr lang="en-US" smtClean="0"/>
-              <a:t>11/6/2018</a:t>
+              <a:t>11/7/2018</a:t>
             </a:fld>
             <a:endParaRPr lang="en-US"/>
           </a:p>
@@ -791,7 +796,7 @@
           <a:p>
             <a:fld id="{1EB1DABF-4E95-4EDF-8DA3-AD2A8632C0A3}" type="slidenum">
               <a:rPr lang="en-US" smtClean="0"/>
-              <a:t>8</a:t>
+              <a:t>9</a:t>
             </a:fld>
             <a:endParaRPr lang="en-US"/>
           </a:p>
@@ -939,7 +944,7 @@
           <a:p>
             <a:fld id="{1EB1DABF-4E95-4EDF-8DA3-AD2A8632C0A3}" type="slidenum">
               <a:rPr lang="en-US" smtClean="0"/>
-              <a:t>9</a:t>
+              <a:t>12</a:t>
             </a:fld>
             <a:endParaRPr lang="en-US"/>
           </a:p>
@@ -1105,7 +1110,7 @@
           <a:p>
             <a:fld id="{13F6F24F-D2EE-420E-885E-A1D66B2D733C}" type="datetimeFigureOut">
               <a:rPr lang="en-US" smtClean="0"/>
-              <a:t>11/6/2018</a:t>
+              <a:t>11/7/2018</a:t>
             </a:fld>
             <a:endParaRPr lang="en-US"/>
           </a:p>
@@ -1303,7 +1308,7 @@
           <a:p>
             <a:fld id="{13F6F24F-D2EE-420E-885E-A1D66B2D733C}" type="datetimeFigureOut">
               <a:rPr lang="en-US" smtClean="0"/>
-              <a:t>11/6/2018</a:t>
+              <a:t>11/7/2018</a:t>
             </a:fld>
             <a:endParaRPr lang="en-US"/>
           </a:p>
@@ -1511,7 +1516,7 @@
           <a:p>
             <a:fld id="{13F6F24F-D2EE-420E-885E-A1D66B2D733C}" type="datetimeFigureOut">
               <a:rPr lang="en-US" smtClean="0"/>
-              <a:t>11/6/2018</a:t>
+              <a:t>11/7/2018</a:t>
             </a:fld>
             <a:endParaRPr lang="en-US"/>
           </a:p>
@@ -1709,7 +1714,7 @@
           <a:p>
             <a:fld id="{13F6F24F-D2EE-420E-885E-A1D66B2D733C}" type="datetimeFigureOut">
               <a:rPr lang="en-US" smtClean="0"/>
-              <a:t>11/6/2018</a:t>
+              <a:t>11/7/2018</a:t>
             </a:fld>
             <a:endParaRPr lang="en-US"/>
           </a:p>
@@ -1984,7 +1989,7 @@
           <a:p>
             <a:fld id="{13F6F24F-D2EE-420E-885E-A1D66B2D733C}" type="datetimeFigureOut">
               <a:rPr lang="en-US" smtClean="0"/>
-              <a:t>11/6/2018</a:t>
+              <a:t>11/7/2018</a:t>
             </a:fld>
             <a:endParaRPr lang="en-US"/>
           </a:p>
@@ -2249,7 +2254,7 @@
           <a:p>
             <a:fld id="{13F6F24F-D2EE-420E-885E-A1D66B2D733C}" type="datetimeFigureOut">
               <a:rPr lang="en-US" smtClean="0"/>
-              <a:t>11/6/2018</a:t>
+              <a:t>11/7/2018</a:t>
             </a:fld>
             <a:endParaRPr lang="en-US"/>
           </a:p>
@@ -2661,7 +2666,7 @@
           <a:p>
             <a:fld id="{13F6F24F-D2EE-420E-885E-A1D66B2D733C}" type="datetimeFigureOut">
               <a:rPr lang="en-US" smtClean="0"/>
-              <a:t>11/6/2018</a:t>
+              <a:t>11/7/2018</a:t>
             </a:fld>
             <a:endParaRPr lang="en-US"/>
           </a:p>
@@ -2802,7 +2807,7 @@
           <a:p>
             <a:fld id="{13F6F24F-D2EE-420E-885E-A1D66B2D733C}" type="datetimeFigureOut">
               <a:rPr lang="en-US" smtClean="0"/>
-              <a:t>11/6/2018</a:t>
+              <a:t>11/7/2018</a:t>
             </a:fld>
             <a:endParaRPr lang="en-US"/>
           </a:p>
@@ -2915,7 +2920,7 @@
           <a:p>
             <a:fld id="{13F6F24F-D2EE-420E-885E-A1D66B2D733C}" type="datetimeFigureOut">
               <a:rPr lang="en-US" smtClean="0"/>
-              <a:t>11/6/2018</a:t>
+              <a:t>11/7/2018</a:t>
             </a:fld>
             <a:endParaRPr lang="en-US"/>
           </a:p>
@@ -3226,7 +3231,7 @@
           <a:p>
             <a:fld id="{13F6F24F-D2EE-420E-885E-A1D66B2D733C}" type="datetimeFigureOut">
               <a:rPr lang="en-US" smtClean="0"/>
-              <a:t>11/6/2018</a:t>
+              <a:t>11/7/2018</a:t>
             </a:fld>
             <a:endParaRPr lang="en-US"/>
           </a:p>
@@ -3514,7 +3519,7 @@
           <a:p>
             <a:fld id="{13F6F24F-D2EE-420E-885E-A1D66B2D733C}" type="datetimeFigureOut">
               <a:rPr lang="en-US" smtClean="0"/>
-              <a:t>11/6/2018</a:t>
+              <a:t>11/7/2018</a:t>
             </a:fld>
             <a:endParaRPr lang="en-US"/>
           </a:p>
@@ -3755,7 +3760,7 @@
           <a:p>
             <a:fld id="{13F6F24F-D2EE-420E-885E-A1D66B2D733C}" type="datetimeFigureOut">
               <a:rPr lang="en-US" smtClean="0"/>
-              <a:t>11/6/2018</a:t>
+              <a:t>11/7/2018</a:t>
             </a:fld>
             <a:endParaRPr lang="en-US"/>
           </a:p>
@@ -4284,216 +4289,6 @@
           <a:bodyPr/>
           <a:lstStyle/>
           <a:p>
-            <a:endParaRPr lang="en-US"/>
-          </a:p>
-        </p:txBody>
-      </p:sp>
-      <p:sp>
-        <p:nvSpPr>
-          <p:cNvPr id="3" name="Content Placeholder 2"/>
-          <p:cNvSpPr>
-            <a:spLocks noGrp="1"/>
-          </p:cNvSpPr>
-          <p:nvPr>
-            <p:ph idx="1"/>
-          </p:nvPr>
-        </p:nvSpPr>
-        <p:spPr/>
-        <p:txBody>
-          <a:bodyPr/>
-          <a:lstStyle/>
-          <a:p>
-            <a:endParaRPr lang="en-US"/>
-          </a:p>
-        </p:txBody>
-      </p:sp>
-    </p:spTree>
-    <p:extLst>
-      <p:ext uri="{BB962C8B-B14F-4D97-AF65-F5344CB8AC3E}">
-        <p14:creationId xmlns:p14="http://schemas.microsoft.com/office/powerpoint/2010/main" val="1127983516"/>
-      </p:ext>
-    </p:extLst>
-  </p:cSld>
-  <p:clrMapOvr>
-    <a:masterClrMapping/>
-  </p:clrMapOvr>
-</p:sld>
-</file>
-
-<file path=ppt/slides/slide2.xml><?xml version="1.0" encoding="utf-8"?>
-<p:sld xmlns:a="http://schemas.openxmlformats.org/drawingml/2006/main" xmlns:r="http://schemas.openxmlformats.org/officeDocument/2006/relationships" xmlns:p="http://schemas.openxmlformats.org/presentationml/2006/main">
-  <p:cSld>
-    <p:spTree>
-      <p:nvGrpSpPr>
-        <p:cNvPr id="1" name=""/>
-        <p:cNvGrpSpPr/>
-        <p:nvPr/>
-      </p:nvGrpSpPr>
-      <p:grpSpPr>
-        <a:xfrm>
-          <a:off x="0" y="0"/>
-          <a:ext cx="0" cy="0"/>
-          <a:chOff x="0" y="0"/>
-          <a:chExt cx="0" cy="0"/>
-        </a:xfrm>
-      </p:grpSpPr>
-      <p:sp>
-        <p:nvSpPr>
-          <p:cNvPr id="2" name="Title 1"/>
-          <p:cNvSpPr>
-            <a:spLocks noGrp="1"/>
-          </p:cNvSpPr>
-          <p:nvPr>
-            <p:ph type="title"/>
-          </p:nvPr>
-        </p:nvSpPr>
-        <p:spPr/>
-        <p:txBody>
-          <a:bodyPr/>
-          <a:lstStyle/>
-          <a:p>
-            <a:endParaRPr lang="en-US"/>
-          </a:p>
-        </p:txBody>
-      </p:sp>
-      <p:sp>
-        <p:nvSpPr>
-          <p:cNvPr id="3" name="Content Placeholder 2"/>
-          <p:cNvSpPr>
-            <a:spLocks noGrp="1"/>
-          </p:cNvSpPr>
-          <p:nvPr>
-            <p:ph idx="1"/>
-          </p:nvPr>
-        </p:nvSpPr>
-        <p:spPr/>
-        <p:txBody>
-          <a:bodyPr/>
-          <a:lstStyle/>
-          <a:p>
-            <a:r>
-              <a:rPr lang="en-US" dirty="0"/>
-              <a:t>Define GIT</a:t>
-            </a:r>
-          </a:p>
-          <a:p>
-            <a:r>
-              <a:rPr lang="en-US" dirty="0"/>
-              <a:t>Work flow (analogy to keeping a note book)</a:t>
-            </a:r>
-          </a:p>
-          <a:p>
-            <a:r>
-              <a:rPr lang="en-US" dirty="0"/>
-              <a:t>Doing solo work </a:t>
-            </a:r>
-          </a:p>
-          <a:p>
-            <a:pPr lvl="1"/>
-            <a:r>
-              <a:rPr lang="en-US" dirty="0"/>
-              <a:t>Maintaining your local repository (add, </a:t>
-            </a:r>
-            <a:r>
-              <a:rPr lang="en-US" dirty="0" err="1"/>
-              <a:t>gitignore</a:t>
-            </a:r>
-            <a:r>
-              <a:rPr lang="en-US" dirty="0"/>
-              <a:t>, revert, branch, checkout, remove, copy, merge, log, commit)</a:t>
-            </a:r>
-          </a:p>
-          <a:p>
-            <a:pPr lvl="1"/>
-            <a:r>
-              <a:rPr lang="en-US" dirty="0"/>
-              <a:t>Collaboration: Pushing to a remote repository in </a:t>
-            </a:r>
-            <a:r>
-              <a:rPr lang="en-US" dirty="0" err="1"/>
-              <a:t>Github</a:t>
-            </a:r>
-            <a:r>
-              <a:rPr lang="en-US" dirty="0"/>
-              <a:t>/cluster (push, merge, branch)</a:t>
-            </a:r>
-          </a:p>
-          <a:p>
-            <a:r>
-              <a:rPr lang="en-US" dirty="0"/>
-              <a:t>Demo </a:t>
-            </a:r>
-            <a:r>
-              <a:rPr lang="en-US"/>
-              <a:t>for the code</a:t>
-            </a:r>
-            <a:endParaRPr lang="en-US" dirty="0"/>
-          </a:p>
-          <a:p>
-            <a:pPr lvl="1"/>
-            <a:endParaRPr lang="en-US" dirty="0"/>
-          </a:p>
-          <a:p>
-            <a:pPr lvl="1"/>
-            <a:endParaRPr lang="en-US" dirty="0"/>
-          </a:p>
-          <a:p>
-            <a:pPr lvl="1"/>
-            <a:endParaRPr lang="en-US" dirty="0"/>
-          </a:p>
-          <a:p>
-            <a:pPr marL="0" indent="0">
-              <a:buNone/>
-            </a:pPr>
-            <a:endParaRPr lang="en-US" dirty="0"/>
-          </a:p>
-        </p:txBody>
-      </p:sp>
-    </p:spTree>
-    <p:extLst>
-      <p:ext uri="{BB962C8B-B14F-4D97-AF65-F5344CB8AC3E}">
-        <p14:creationId xmlns:p14="http://schemas.microsoft.com/office/powerpoint/2010/main" val="941523380"/>
-      </p:ext>
-    </p:extLst>
-  </p:cSld>
-  <p:clrMapOvr>
-    <a:masterClrMapping/>
-  </p:clrMapOvr>
-</p:sld>
-</file>
-
-<file path=ppt/slides/slide3.xml><?xml version="1.0" encoding="utf-8"?>
-<p:sld xmlns:a="http://schemas.openxmlformats.org/drawingml/2006/main" xmlns:r="http://schemas.openxmlformats.org/officeDocument/2006/relationships" xmlns:p="http://schemas.openxmlformats.org/presentationml/2006/main">
-  <p:cSld>
-    <p:spTree>
-      <p:nvGrpSpPr>
-        <p:cNvPr id="1" name=""/>
-        <p:cNvGrpSpPr/>
-        <p:nvPr/>
-      </p:nvGrpSpPr>
-      <p:grpSpPr>
-        <a:xfrm>
-          <a:off x="0" y="0"/>
-          <a:ext cx="0" cy="0"/>
-          <a:chOff x="0" y="0"/>
-          <a:chExt cx="0" cy="0"/>
-        </a:xfrm>
-      </p:grpSpPr>
-      <p:sp>
-        <p:nvSpPr>
-          <p:cNvPr id="2" name="Title 1"/>
-          <p:cNvSpPr>
-            <a:spLocks noGrp="1"/>
-          </p:cNvSpPr>
-          <p:nvPr>
-            <p:ph type="title"/>
-          </p:nvPr>
-        </p:nvSpPr>
-        <p:spPr/>
-        <p:txBody>
-          <a:bodyPr/>
-          <a:lstStyle/>
-          <a:p>
             <a:r>
               <a:rPr lang="en-US" dirty="0" smtClean="0"/>
               <a:t>What’s a workflow?</a:t>
@@ -4657,7 +4452,7 @@
 </p:sld>
 </file>
 
-<file path=ppt/slides/slide4.xml><?xml version="1.0" encoding="utf-8"?>
+<file path=ppt/slides/slide11.xml><?xml version="1.0" encoding="utf-8"?>
 <p:sld xmlns:a="http://schemas.openxmlformats.org/drawingml/2006/main" xmlns:r="http://schemas.openxmlformats.org/officeDocument/2006/relationships" xmlns:p="http://schemas.openxmlformats.org/presentationml/2006/main">
   <p:cSld>
     <p:spTree>
@@ -4692,6 +4487,729 @@
             <a:r>
               <a:rPr lang="en-US" dirty="0" smtClean="0"/>
               <a:t>Solo Workflow</a:t>
+            </a:r>
+            <a:endParaRPr lang="en-US" dirty="0"/>
+          </a:p>
+        </p:txBody>
+      </p:sp>
+      <p:sp>
+        <p:nvSpPr>
+          <p:cNvPr id="4" name="TextBox 3"/>
+          <p:cNvSpPr txBox="1"/>
+          <p:nvPr/>
+        </p:nvSpPr>
+        <p:spPr>
+          <a:xfrm>
+            <a:off x="1159329" y="1732190"/>
+            <a:ext cx="1592231" cy="646331"/>
+          </a:xfrm>
+          <a:prstGeom prst="rect">
+            <a:avLst/>
+          </a:prstGeom>
+          <a:noFill/>
+        </p:spPr>
+        <p:txBody>
+          <a:bodyPr wrap="none" rtlCol="0">
+            <a:spAutoFit/>
+          </a:bodyPr>
+          <a:lstStyle/>
+          <a:p>
+            <a:r>
+              <a:rPr lang="en-US" sz="3600" dirty="0" smtClean="0"/>
+              <a:t>Branch </a:t>
+            </a:r>
+            <a:endParaRPr lang="en-US" sz="3600" dirty="0"/>
+          </a:p>
+        </p:txBody>
+      </p:sp>
+      <p:sp>
+        <p:nvSpPr>
+          <p:cNvPr id="5" name="TextBox 4"/>
+          <p:cNvSpPr txBox="1"/>
+          <p:nvPr/>
+        </p:nvSpPr>
+        <p:spPr>
+          <a:xfrm>
+            <a:off x="4920343" y="1690688"/>
+            <a:ext cx="2653740" cy="646331"/>
+          </a:xfrm>
+          <a:prstGeom prst="rect">
+            <a:avLst/>
+          </a:prstGeom>
+          <a:noFill/>
+        </p:spPr>
+        <p:txBody>
+          <a:bodyPr wrap="none" rtlCol="0">
+            <a:spAutoFit/>
+          </a:bodyPr>
+          <a:lstStyle/>
+          <a:p>
+            <a:r>
+              <a:rPr lang="en-US" sz="3600" dirty="0" smtClean="0"/>
+              <a:t>Local master </a:t>
+            </a:r>
+            <a:endParaRPr lang="en-US" sz="3600" dirty="0"/>
+          </a:p>
+        </p:txBody>
+      </p:sp>
+      <p:cxnSp>
+        <p:nvCxnSpPr>
+          <p:cNvPr id="8" name="Straight Connector 7"/>
+          <p:cNvCxnSpPr/>
+          <p:nvPr/>
+        </p:nvCxnSpPr>
+        <p:spPr>
+          <a:xfrm>
+            <a:off x="1955444" y="2514600"/>
+            <a:ext cx="0" cy="4163786"/>
+          </a:xfrm>
+          <a:prstGeom prst="line">
+            <a:avLst/>
+          </a:prstGeom>
+        </p:spPr>
+        <p:style>
+          <a:lnRef idx="1">
+            <a:schemeClr val="accent1"/>
+          </a:lnRef>
+          <a:fillRef idx="0">
+            <a:schemeClr val="accent1"/>
+          </a:fillRef>
+          <a:effectRef idx="0">
+            <a:schemeClr val="accent1"/>
+          </a:effectRef>
+          <a:fontRef idx="minor">
+            <a:schemeClr val="tx1"/>
+          </a:fontRef>
+        </p:style>
+      </p:cxnSp>
+      <p:cxnSp>
+        <p:nvCxnSpPr>
+          <p:cNvPr id="9" name="Straight Connector 8"/>
+          <p:cNvCxnSpPr/>
+          <p:nvPr/>
+        </p:nvCxnSpPr>
+        <p:spPr>
+          <a:xfrm>
+            <a:off x="6141003" y="2514600"/>
+            <a:ext cx="0" cy="4163786"/>
+          </a:xfrm>
+          <a:prstGeom prst="line">
+            <a:avLst/>
+          </a:prstGeom>
+        </p:spPr>
+        <p:style>
+          <a:lnRef idx="1">
+            <a:schemeClr val="accent1"/>
+          </a:lnRef>
+          <a:fillRef idx="0">
+            <a:schemeClr val="accent1"/>
+          </a:fillRef>
+          <a:effectRef idx="0">
+            <a:schemeClr val="accent1"/>
+          </a:effectRef>
+          <a:fontRef idx="minor">
+            <a:schemeClr val="tx1"/>
+          </a:fontRef>
+        </p:style>
+      </p:cxnSp>
+      <p:grpSp>
+        <p:nvGrpSpPr>
+          <p:cNvPr id="28" name="Group 27"/>
+          <p:cNvGrpSpPr/>
+          <p:nvPr/>
+        </p:nvGrpSpPr>
+        <p:grpSpPr>
+          <a:xfrm>
+            <a:off x="1955444" y="2792179"/>
+            <a:ext cx="681813" cy="1045028"/>
+            <a:chOff x="1955444" y="3069771"/>
+            <a:chExt cx="681813" cy="1045028"/>
+          </a:xfrm>
+        </p:grpSpPr>
+        <p:cxnSp>
+          <p:nvCxnSpPr>
+            <p:cNvPr id="14" name="Straight Connector 13"/>
+            <p:cNvCxnSpPr/>
+            <p:nvPr/>
+          </p:nvCxnSpPr>
+          <p:spPr>
+            <a:xfrm>
+              <a:off x="1955444" y="3102429"/>
+              <a:ext cx="673456" cy="0"/>
+            </a:xfrm>
+            <a:prstGeom prst="line">
+              <a:avLst/>
+            </a:prstGeom>
+          </p:spPr>
+          <p:style>
+            <a:lnRef idx="1">
+              <a:schemeClr val="accent1"/>
+            </a:lnRef>
+            <a:fillRef idx="0">
+              <a:schemeClr val="accent1"/>
+            </a:fillRef>
+            <a:effectRef idx="0">
+              <a:schemeClr val="accent1"/>
+            </a:effectRef>
+            <a:fontRef idx="minor">
+              <a:schemeClr val="tx1"/>
+            </a:fontRef>
+          </p:style>
+        </p:cxnSp>
+        <p:cxnSp>
+          <p:nvCxnSpPr>
+            <p:cNvPr id="16" name="Straight Connector 15"/>
+            <p:cNvCxnSpPr/>
+            <p:nvPr/>
+          </p:nvCxnSpPr>
+          <p:spPr>
+            <a:xfrm>
+              <a:off x="2637257" y="3069771"/>
+              <a:ext cx="0" cy="1045028"/>
+            </a:xfrm>
+            <a:prstGeom prst="line">
+              <a:avLst/>
+            </a:prstGeom>
+          </p:spPr>
+          <p:style>
+            <a:lnRef idx="1">
+              <a:schemeClr val="accent1"/>
+            </a:lnRef>
+            <a:fillRef idx="0">
+              <a:schemeClr val="accent1"/>
+            </a:fillRef>
+            <a:effectRef idx="0">
+              <a:schemeClr val="accent1"/>
+            </a:effectRef>
+            <a:fontRef idx="minor">
+              <a:schemeClr val="tx1"/>
+            </a:fontRef>
+          </p:style>
+        </p:cxnSp>
+        <p:cxnSp>
+          <p:nvCxnSpPr>
+            <p:cNvPr id="18" name="Straight Arrow Connector 17"/>
+            <p:cNvCxnSpPr/>
+            <p:nvPr/>
+          </p:nvCxnSpPr>
+          <p:spPr>
+            <a:xfrm flipH="1">
+              <a:off x="1955444" y="4098471"/>
+              <a:ext cx="673456" cy="0"/>
+            </a:xfrm>
+            <a:prstGeom prst="straightConnector1">
+              <a:avLst/>
+            </a:prstGeom>
+            <a:ln>
+              <a:tailEnd type="triangle"/>
+            </a:ln>
+          </p:spPr>
+          <p:style>
+            <a:lnRef idx="1">
+              <a:schemeClr val="accent1"/>
+            </a:lnRef>
+            <a:fillRef idx="0">
+              <a:schemeClr val="accent1"/>
+            </a:fillRef>
+            <a:effectRef idx="0">
+              <a:schemeClr val="accent1"/>
+            </a:effectRef>
+            <a:fontRef idx="minor">
+              <a:schemeClr val="tx1"/>
+            </a:fontRef>
+          </p:style>
+        </p:cxnSp>
+      </p:grpSp>
+      <p:sp>
+        <p:nvSpPr>
+          <p:cNvPr id="19" name="TextBox 18"/>
+          <p:cNvSpPr txBox="1"/>
+          <p:nvPr/>
+        </p:nvSpPr>
+        <p:spPr>
+          <a:xfrm>
+            <a:off x="2704318" y="2952348"/>
+            <a:ext cx="1229504" cy="646331"/>
+          </a:xfrm>
+          <a:prstGeom prst="rect">
+            <a:avLst/>
+          </a:prstGeom>
+          <a:noFill/>
+        </p:spPr>
+        <p:txBody>
+          <a:bodyPr wrap="none" rtlCol="0">
+            <a:spAutoFit/>
+          </a:bodyPr>
+          <a:lstStyle/>
+          <a:p>
+            <a:r>
+              <a:rPr lang="en-US" dirty="0" err="1" smtClean="0"/>
+              <a:t>Git</a:t>
+            </a:r>
+            <a:r>
+              <a:rPr lang="en-US" dirty="0" smtClean="0"/>
+              <a:t> add</a:t>
+            </a:r>
+          </a:p>
+          <a:p>
+            <a:r>
+              <a:rPr lang="en-US" dirty="0" err="1" smtClean="0"/>
+              <a:t>Git</a:t>
+            </a:r>
+            <a:r>
+              <a:rPr lang="en-US" dirty="0" smtClean="0"/>
+              <a:t> commit</a:t>
+            </a:r>
+            <a:endParaRPr lang="en-US" dirty="0"/>
+          </a:p>
+        </p:txBody>
+      </p:sp>
+      <p:cxnSp>
+        <p:nvCxnSpPr>
+          <p:cNvPr id="21" name="Straight Arrow Connector 20"/>
+          <p:cNvCxnSpPr/>
+          <p:nvPr/>
+        </p:nvCxnSpPr>
+        <p:spPr>
+          <a:xfrm>
+            <a:off x="2008805" y="4155622"/>
+            <a:ext cx="4132198" cy="0"/>
+          </a:xfrm>
+          <a:prstGeom prst="straightConnector1">
+            <a:avLst/>
+          </a:prstGeom>
+          <a:ln>
+            <a:tailEnd type="triangle"/>
+          </a:ln>
+        </p:spPr>
+        <p:style>
+          <a:lnRef idx="1">
+            <a:schemeClr val="accent1"/>
+          </a:lnRef>
+          <a:fillRef idx="0">
+            <a:schemeClr val="accent1"/>
+          </a:fillRef>
+          <a:effectRef idx="0">
+            <a:schemeClr val="accent1"/>
+          </a:effectRef>
+          <a:fontRef idx="minor">
+            <a:schemeClr val="tx1"/>
+          </a:fontRef>
+        </p:style>
+      </p:cxnSp>
+      <p:sp>
+        <p:nvSpPr>
+          <p:cNvPr id="23" name="TextBox 22"/>
+          <p:cNvSpPr txBox="1"/>
+          <p:nvPr/>
+        </p:nvSpPr>
+        <p:spPr>
+          <a:xfrm>
+            <a:off x="2452376" y="2366666"/>
+            <a:ext cx="1521827" cy="369332"/>
+          </a:xfrm>
+          <a:prstGeom prst="rect">
+            <a:avLst/>
+          </a:prstGeom>
+          <a:noFill/>
+        </p:spPr>
+        <p:txBody>
+          <a:bodyPr wrap="none" rtlCol="0">
+            <a:spAutoFit/>
+          </a:bodyPr>
+          <a:lstStyle/>
+          <a:p>
+            <a:r>
+              <a:rPr lang="en-US" dirty="0" smtClean="0"/>
+              <a:t>Make changes</a:t>
+            </a:r>
+            <a:endParaRPr lang="en-US" dirty="0"/>
+          </a:p>
+        </p:txBody>
+      </p:sp>
+      <p:cxnSp>
+        <p:nvCxnSpPr>
+          <p:cNvPr id="33" name="Straight Arrow Connector 32"/>
+          <p:cNvCxnSpPr/>
+          <p:nvPr/>
+        </p:nvCxnSpPr>
+        <p:spPr>
+          <a:xfrm flipH="1">
+            <a:off x="1975618" y="6595941"/>
+            <a:ext cx="4124897" cy="10511"/>
+          </a:xfrm>
+          <a:prstGeom prst="straightConnector1">
+            <a:avLst/>
+          </a:prstGeom>
+          <a:ln>
+            <a:tailEnd type="triangle"/>
+          </a:ln>
+        </p:spPr>
+        <p:style>
+          <a:lnRef idx="1">
+            <a:schemeClr val="accent1"/>
+          </a:lnRef>
+          <a:fillRef idx="0">
+            <a:schemeClr val="accent1"/>
+          </a:fillRef>
+          <a:effectRef idx="0">
+            <a:schemeClr val="accent1"/>
+          </a:effectRef>
+          <a:fontRef idx="minor">
+            <a:schemeClr val="tx1"/>
+          </a:fontRef>
+        </p:style>
+      </p:cxnSp>
+      <p:sp>
+        <p:nvSpPr>
+          <p:cNvPr id="34" name="TextBox 33"/>
+          <p:cNvSpPr txBox="1"/>
+          <p:nvPr/>
+        </p:nvSpPr>
+        <p:spPr>
+          <a:xfrm>
+            <a:off x="3744268" y="6157992"/>
+            <a:ext cx="543739" cy="369332"/>
+          </a:xfrm>
+          <a:prstGeom prst="rect">
+            <a:avLst/>
+          </a:prstGeom>
+          <a:noFill/>
+        </p:spPr>
+        <p:txBody>
+          <a:bodyPr wrap="none" rtlCol="0">
+            <a:spAutoFit/>
+          </a:bodyPr>
+          <a:lstStyle/>
+          <a:p>
+            <a:r>
+              <a:rPr lang="en-US" b="1" dirty="0" smtClean="0"/>
+              <a:t>Pull</a:t>
+            </a:r>
+            <a:endParaRPr lang="en-US" b="1" dirty="0"/>
+          </a:p>
+        </p:txBody>
+      </p:sp>
+      <p:sp>
+        <p:nvSpPr>
+          <p:cNvPr id="35" name="TextBox 34"/>
+          <p:cNvSpPr txBox="1"/>
+          <p:nvPr/>
+        </p:nvSpPr>
+        <p:spPr>
+          <a:xfrm>
+            <a:off x="3444367" y="3775470"/>
+            <a:ext cx="914481" cy="369332"/>
+          </a:xfrm>
+          <a:prstGeom prst="rect">
+            <a:avLst/>
+          </a:prstGeom>
+          <a:noFill/>
+        </p:spPr>
+        <p:txBody>
+          <a:bodyPr wrap="none" rtlCol="0">
+            <a:spAutoFit/>
+          </a:bodyPr>
+          <a:lstStyle/>
+          <a:p>
+            <a:r>
+              <a:rPr lang="en-US" b="1" dirty="0" smtClean="0"/>
+              <a:t>commit</a:t>
+            </a:r>
+            <a:endParaRPr lang="en-US" b="1" dirty="0"/>
+          </a:p>
+        </p:txBody>
+      </p:sp>
+    </p:spTree>
+    <p:extLst>
+      <p:ext uri="{BB962C8B-B14F-4D97-AF65-F5344CB8AC3E}">
+        <p14:creationId xmlns:p14="http://schemas.microsoft.com/office/powerpoint/2010/main" val="1860419054"/>
+      </p:ext>
+    </p:extLst>
+  </p:cSld>
+  <p:clrMapOvr>
+    <a:masterClrMapping/>
+  </p:clrMapOvr>
+  <p:timing>
+    <p:tnLst>
+      <p:par>
+        <p:cTn id="1" dur="indefinite" restart="never" nodeType="tmRoot"/>
+      </p:par>
+    </p:tnLst>
+  </p:timing>
+</p:sld>
+</file>
+
+<file path=ppt/slides/slide12.xml><?xml version="1.0" encoding="utf-8"?>
+<p:sld xmlns:a="http://schemas.openxmlformats.org/drawingml/2006/main" xmlns:r="http://schemas.openxmlformats.org/officeDocument/2006/relationships" xmlns:p="http://schemas.openxmlformats.org/presentationml/2006/main">
+  <p:cSld>
+    <p:spTree>
+      <p:nvGrpSpPr>
+        <p:cNvPr id="1" name=""/>
+        <p:cNvGrpSpPr/>
+        <p:nvPr/>
+      </p:nvGrpSpPr>
+      <p:grpSpPr>
+        <a:xfrm>
+          <a:off x="0" y="0"/>
+          <a:ext cx="0" cy="0"/>
+          <a:chOff x="0" y="0"/>
+          <a:chExt cx="0" cy="0"/>
+        </a:xfrm>
+      </p:grpSpPr>
+      <p:sp>
+        <p:nvSpPr>
+          <p:cNvPr id="2" name="TextBox 1">
+            <a:extLst>
+              <a:ext uri="{FF2B5EF4-FFF2-40B4-BE49-F238E27FC236}">
+                <a16:creationId xmlns:a16="http://schemas.microsoft.com/office/drawing/2014/main" id="{853BC810-96FC-4778-AC48-82A38DB08855}"/>
+              </a:ext>
+            </a:extLst>
+          </p:cNvPr>
+          <p:cNvSpPr txBox="1"/>
+          <p:nvPr/>
+        </p:nvSpPr>
+        <p:spPr>
+          <a:xfrm>
+            <a:off x="539261" y="476738"/>
+            <a:ext cx="6315383" cy="707886"/>
+          </a:xfrm>
+          <a:prstGeom prst="rect">
+            <a:avLst/>
+          </a:prstGeom>
+          <a:noFill/>
+        </p:spPr>
+        <p:txBody>
+          <a:bodyPr wrap="none" rtlCol="0">
+            <a:spAutoFit/>
+          </a:bodyPr>
+          <a:lstStyle/>
+          <a:p>
+            <a:r>
+              <a:rPr lang="en-US" sz="4000" dirty="0"/>
+              <a:t>View and undo your project…</a:t>
+            </a:r>
+          </a:p>
+        </p:txBody>
+      </p:sp>
+      <p:sp>
+        <p:nvSpPr>
+          <p:cNvPr id="3" name="TextBox 2">
+            <a:extLst>
+              <a:ext uri="{FF2B5EF4-FFF2-40B4-BE49-F238E27FC236}">
+                <a16:creationId xmlns:a16="http://schemas.microsoft.com/office/drawing/2014/main" id="{93E51470-F363-4361-9879-3DA6F22EA45E}"/>
+              </a:ext>
+            </a:extLst>
+          </p:cNvPr>
+          <p:cNvSpPr txBox="1"/>
+          <p:nvPr/>
+        </p:nvSpPr>
+        <p:spPr>
+          <a:xfrm>
+            <a:off x="3102708" y="2274277"/>
+            <a:ext cx="5080045" cy="2031325"/>
+          </a:xfrm>
+          <a:prstGeom prst="rect">
+            <a:avLst/>
+          </a:prstGeom>
+          <a:noFill/>
+        </p:spPr>
+        <p:txBody>
+          <a:bodyPr wrap="none" rtlCol="0">
+            <a:spAutoFit/>
+          </a:bodyPr>
+          <a:lstStyle/>
+          <a:p>
+            <a:pPr marL="285750" indent="-285750">
+              <a:buFont typeface="Arial" panose="020B0604020202020204" pitchFamily="34" charset="0"/>
+              <a:buChar char="•"/>
+            </a:pPr>
+            <a:r>
+              <a:rPr lang="en-US" dirty="0"/>
+              <a:t>git log (-p -&lt;n&gt; --since=&lt;“date”&gt; --until=&lt;“date”&gt; </a:t>
+            </a:r>
+            <a:br>
+              <a:rPr lang="en-US" dirty="0"/>
+            </a:br>
+            <a:r>
+              <a:rPr lang="en-US" dirty="0"/>
+              <a:t>	-pretty=</a:t>
+            </a:r>
+            <a:r>
+              <a:rPr lang="en-US" dirty="0" err="1"/>
+              <a:t>oneline</a:t>
+            </a:r>
+            <a:r>
+              <a:rPr lang="en-US" dirty="0"/>
+              <a:t>, short, full, fuller --graph  </a:t>
+            </a:r>
+            <a:br>
+              <a:rPr lang="en-US" dirty="0"/>
+            </a:br>
+            <a:r>
+              <a:rPr lang="en-US" dirty="0"/>
+              <a:t>	--author=&lt;“name”&gt; --grep=&lt;“pattern”&gt;)</a:t>
+            </a:r>
+          </a:p>
+          <a:p>
+            <a:pPr marL="285750" indent="-285750">
+              <a:buFont typeface="Arial" panose="020B0604020202020204" pitchFamily="34" charset="0"/>
+              <a:buChar char="•"/>
+            </a:pPr>
+            <a:r>
+              <a:rPr lang="en-US" dirty="0"/>
+              <a:t>git commit --amend </a:t>
+            </a:r>
+          </a:p>
+          <a:p>
+            <a:pPr marL="285750" indent="-285750">
+              <a:buFont typeface="Arial" panose="020B0604020202020204" pitchFamily="34" charset="0"/>
+              <a:buChar char="•"/>
+            </a:pPr>
+            <a:r>
+              <a:rPr lang="en-US" dirty="0"/>
+              <a:t>git reset HEAD &lt;file&gt;</a:t>
+            </a:r>
+          </a:p>
+          <a:p>
+            <a:pPr marL="285750" indent="-285750">
+              <a:buFont typeface="Arial" panose="020B0604020202020204" pitchFamily="34" charset="0"/>
+              <a:buChar char="•"/>
+            </a:pPr>
+            <a:r>
+              <a:rPr lang="en-US" dirty="0"/>
+              <a:t>git checkout -- &lt;file&gt;</a:t>
+            </a:r>
+          </a:p>
+          <a:p>
+            <a:pPr marL="285750" indent="-285750">
+              <a:buFont typeface="Arial" panose="020B0604020202020204" pitchFamily="34" charset="0"/>
+              <a:buChar char="•"/>
+            </a:pPr>
+            <a:endParaRPr lang="en-US" dirty="0"/>
+          </a:p>
+        </p:txBody>
+      </p:sp>
+    </p:spTree>
+    <p:extLst>
+      <p:ext uri="{BB962C8B-B14F-4D97-AF65-F5344CB8AC3E}">
+        <p14:creationId xmlns:p14="http://schemas.microsoft.com/office/powerpoint/2010/main" val="2729963516"/>
+      </p:ext>
+    </p:extLst>
+  </p:cSld>
+  <p:clrMapOvr>
+    <a:masterClrMapping/>
+  </p:clrMapOvr>
+</p:sld>
+</file>
+
+<file path=ppt/slides/slide13.xml><?xml version="1.0" encoding="utf-8"?>
+<p:sld xmlns:a="http://schemas.openxmlformats.org/drawingml/2006/main" xmlns:r="http://schemas.openxmlformats.org/officeDocument/2006/relationships" xmlns:p="http://schemas.openxmlformats.org/presentationml/2006/main">
+  <p:cSld>
+    <p:spTree>
+      <p:nvGrpSpPr>
+        <p:cNvPr id="1" name=""/>
+        <p:cNvGrpSpPr/>
+        <p:nvPr/>
+      </p:nvGrpSpPr>
+      <p:grpSpPr>
+        <a:xfrm>
+          <a:off x="0" y="0"/>
+          <a:ext cx="0" cy="0"/>
+          <a:chOff x="0" y="0"/>
+          <a:chExt cx="0" cy="0"/>
+        </a:xfrm>
+      </p:grpSpPr>
+      <p:sp>
+        <p:nvSpPr>
+          <p:cNvPr id="2" name="Title 1"/>
+          <p:cNvSpPr>
+            <a:spLocks noGrp="1"/>
+          </p:cNvSpPr>
+          <p:nvPr>
+            <p:ph type="title"/>
+          </p:nvPr>
+        </p:nvSpPr>
+        <p:spPr/>
+        <p:txBody>
+          <a:bodyPr/>
+          <a:lstStyle/>
+          <a:p>
+            <a:r>
+              <a:rPr lang="en-US" dirty="0" smtClean="0"/>
+              <a:t>Branching</a:t>
+            </a:r>
+            <a:endParaRPr lang="en-US" dirty="0"/>
+          </a:p>
+        </p:txBody>
+      </p:sp>
+      <p:sp>
+        <p:nvSpPr>
+          <p:cNvPr id="3" name="Content Placeholder 2"/>
+          <p:cNvSpPr>
+            <a:spLocks noGrp="1"/>
+          </p:cNvSpPr>
+          <p:nvPr>
+            <p:ph idx="1"/>
+          </p:nvPr>
+        </p:nvSpPr>
+        <p:spPr/>
+        <p:txBody>
+          <a:bodyPr/>
+          <a:lstStyle/>
+          <a:p>
+            <a:endParaRPr lang="en-US"/>
+          </a:p>
+        </p:txBody>
+      </p:sp>
+    </p:spTree>
+    <p:extLst>
+      <p:ext uri="{BB962C8B-B14F-4D97-AF65-F5344CB8AC3E}">
+        <p14:creationId xmlns:p14="http://schemas.microsoft.com/office/powerpoint/2010/main" val="1127983516"/>
+      </p:ext>
+    </p:extLst>
+  </p:cSld>
+  <p:clrMapOvr>
+    <a:masterClrMapping/>
+  </p:clrMapOvr>
+</p:sld>
+</file>
+
+<file path=ppt/slides/slide14.xml><?xml version="1.0" encoding="utf-8"?>
+<p:sld xmlns:a="http://schemas.openxmlformats.org/drawingml/2006/main" xmlns:r="http://schemas.openxmlformats.org/officeDocument/2006/relationships" xmlns:p="http://schemas.openxmlformats.org/presentationml/2006/main">
+  <p:cSld>
+    <p:spTree>
+      <p:nvGrpSpPr>
+        <p:cNvPr id="1" name=""/>
+        <p:cNvGrpSpPr/>
+        <p:nvPr/>
+      </p:nvGrpSpPr>
+      <p:grpSpPr>
+        <a:xfrm>
+          <a:off x="0" y="0"/>
+          <a:ext cx="0" cy="0"/>
+          <a:chOff x="0" y="0"/>
+          <a:chExt cx="0" cy="0"/>
+        </a:xfrm>
+      </p:grpSpPr>
+      <p:sp>
+        <p:nvSpPr>
+          <p:cNvPr id="2" name="Title 1"/>
+          <p:cNvSpPr>
+            <a:spLocks noGrp="1"/>
+          </p:cNvSpPr>
+          <p:nvPr>
+            <p:ph type="title"/>
+          </p:nvPr>
+        </p:nvSpPr>
+        <p:spPr/>
+        <p:txBody>
+          <a:bodyPr/>
+          <a:lstStyle/>
+          <a:p>
+            <a:r>
+              <a:rPr lang="en-US" dirty="0" smtClean="0"/>
+              <a:t>Collaborative Workflow</a:t>
             </a:r>
             <a:endParaRPr lang="en-US" dirty="0"/>
           </a:p>
@@ -5422,7 +5940,7 @@
     </p:spTree>
     <p:extLst>
       <p:ext uri="{BB962C8B-B14F-4D97-AF65-F5344CB8AC3E}">
-        <p14:creationId xmlns:p14="http://schemas.microsoft.com/office/powerpoint/2010/main" val="1860419054"/>
+        <p14:creationId xmlns:p14="http://schemas.microsoft.com/office/powerpoint/2010/main" val="4223650655"/>
       </p:ext>
     </p:extLst>
   </p:cSld>
@@ -5436,6 +5954,801 @@
       </p:par>
     </p:tnLst>
   </p:timing>
+</p:sld>
+</file>
+
+<file path=ppt/slides/slide15.xml><?xml version="1.0" encoding="utf-8"?>
+<p:sld xmlns:a="http://schemas.openxmlformats.org/drawingml/2006/main" xmlns:r="http://schemas.openxmlformats.org/officeDocument/2006/relationships" xmlns:p="http://schemas.openxmlformats.org/presentationml/2006/main">
+  <p:cSld>
+    <p:spTree>
+      <p:nvGrpSpPr>
+        <p:cNvPr id="1" name=""/>
+        <p:cNvGrpSpPr/>
+        <p:nvPr/>
+      </p:nvGrpSpPr>
+      <p:grpSpPr>
+        <a:xfrm>
+          <a:off x="0" y="0"/>
+          <a:ext cx="0" cy="0"/>
+          <a:chOff x="0" y="0"/>
+          <a:chExt cx="0" cy="0"/>
+        </a:xfrm>
+      </p:grpSpPr>
+      <p:sp>
+        <p:nvSpPr>
+          <p:cNvPr id="2" name="Title 1"/>
+          <p:cNvSpPr>
+            <a:spLocks noGrp="1"/>
+          </p:cNvSpPr>
+          <p:nvPr>
+            <p:ph type="title"/>
+          </p:nvPr>
+        </p:nvSpPr>
+        <p:spPr/>
+        <p:txBody>
+          <a:bodyPr/>
+          <a:lstStyle/>
+          <a:p>
+            <a:r>
+              <a:rPr lang="en-US" dirty="0" smtClean="0"/>
+              <a:t>Creating a back-up of your work</a:t>
+            </a:r>
+            <a:endParaRPr lang="en-US" dirty="0"/>
+          </a:p>
+        </p:txBody>
+      </p:sp>
+      <p:sp>
+        <p:nvSpPr>
+          <p:cNvPr id="3" name="Content Placeholder 2"/>
+          <p:cNvSpPr>
+            <a:spLocks noGrp="1"/>
+          </p:cNvSpPr>
+          <p:nvPr>
+            <p:ph idx="1"/>
+          </p:nvPr>
+        </p:nvSpPr>
+        <p:spPr/>
+        <p:txBody>
+          <a:bodyPr/>
+          <a:lstStyle/>
+          <a:p>
+            <a:r>
+              <a:rPr lang="en-US" dirty="0" err="1" smtClean="0"/>
+              <a:t>Github</a:t>
+            </a:r>
+            <a:r>
+              <a:rPr lang="en-US" dirty="0" smtClean="0"/>
+              <a:t> </a:t>
+            </a:r>
+            <a:r>
+              <a:rPr lang="en-US" dirty="0"/>
+              <a:t>with yourself : Do stuff, add, commit, </a:t>
+            </a:r>
+            <a:r>
+              <a:rPr lang="en-US" dirty="0" smtClean="0"/>
+              <a:t>push</a:t>
+            </a:r>
+          </a:p>
+          <a:p>
+            <a:r>
+              <a:rPr lang="en-US" dirty="0" err="1" smtClean="0"/>
+              <a:t>Github</a:t>
+            </a:r>
+            <a:r>
+              <a:rPr lang="en-US" dirty="0" smtClean="0"/>
+              <a:t> with a collaborator: Pull, Merge, do stuff, add, commit, pull, merge, push</a:t>
+            </a:r>
+          </a:p>
+          <a:p>
+            <a:r>
+              <a:rPr lang="en-US" dirty="0" smtClean="0"/>
+              <a:t>Cluster: Make a clone from </a:t>
+            </a:r>
+            <a:r>
+              <a:rPr lang="en-US" dirty="0" err="1" smtClean="0"/>
+              <a:t>Github</a:t>
+            </a:r>
+            <a:r>
+              <a:rPr lang="en-US" dirty="0" smtClean="0"/>
+              <a:t>, treat that as a collaborator.</a:t>
+            </a:r>
+          </a:p>
+          <a:p>
+            <a:endParaRPr lang="en-US" dirty="0" smtClean="0"/>
+          </a:p>
+          <a:p>
+            <a:pPr marL="0" indent="0">
+              <a:buNone/>
+            </a:pPr>
+            <a:endParaRPr lang="en-US" dirty="0"/>
+          </a:p>
+        </p:txBody>
+      </p:sp>
+    </p:spTree>
+    <p:extLst>
+      <p:ext uri="{BB962C8B-B14F-4D97-AF65-F5344CB8AC3E}">
+        <p14:creationId xmlns:p14="http://schemas.microsoft.com/office/powerpoint/2010/main" val="931588928"/>
+      </p:ext>
+    </p:extLst>
+  </p:cSld>
+  <p:clrMapOvr>
+    <a:masterClrMapping/>
+  </p:clrMapOvr>
+</p:sld>
+</file>
+
+<file path=ppt/slides/slide2.xml><?xml version="1.0" encoding="utf-8"?>
+<p:sld xmlns:a="http://schemas.openxmlformats.org/drawingml/2006/main" xmlns:r="http://schemas.openxmlformats.org/officeDocument/2006/relationships" xmlns:p="http://schemas.openxmlformats.org/presentationml/2006/main">
+  <p:cSld>
+    <p:spTree>
+      <p:nvGrpSpPr>
+        <p:cNvPr id="1" name=""/>
+        <p:cNvGrpSpPr/>
+        <p:nvPr/>
+      </p:nvGrpSpPr>
+      <p:grpSpPr>
+        <a:xfrm>
+          <a:off x="0" y="0"/>
+          <a:ext cx="0" cy="0"/>
+          <a:chOff x="0" y="0"/>
+          <a:chExt cx="0" cy="0"/>
+        </a:xfrm>
+      </p:grpSpPr>
+      <p:sp>
+        <p:nvSpPr>
+          <p:cNvPr id="2" name="TextBox 1">
+            <a:extLst>
+              <a:ext uri="{FF2B5EF4-FFF2-40B4-BE49-F238E27FC236}">
+                <a16:creationId xmlns:a16="http://schemas.microsoft.com/office/drawing/2014/main" id="{7C8BC062-2088-4621-9A35-C7E4ECEB2D25}"/>
+              </a:ext>
+            </a:extLst>
+          </p:cNvPr>
+          <p:cNvSpPr txBox="1"/>
+          <p:nvPr/>
+        </p:nvSpPr>
+        <p:spPr>
+          <a:xfrm>
+            <a:off x="368709" y="494071"/>
+            <a:ext cx="8330742" cy="707886"/>
+          </a:xfrm>
+          <a:prstGeom prst="rect">
+            <a:avLst/>
+          </a:prstGeom>
+          <a:noFill/>
+        </p:spPr>
+        <p:txBody>
+          <a:bodyPr wrap="none" rtlCol="0">
+            <a:spAutoFit/>
+          </a:bodyPr>
+          <a:lstStyle/>
+          <a:p>
+            <a:r>
+              <a:rPr lang="en-US" sz="4000" dirty="0"/>
+              <a:t>What is version control and why use it?</a:t>
+            </a:r>
+          </a:p>
+        </p:txBody>
+      </p:sp>
+      <p:sp>
+        <p:nvSpPr>
+          <p:cNvPr id="3" name="TextBox 2">
+            <a:extLst>
+              <a:ext uri="{FF2B5EF4-FFF2-40B4-BE49-F238E27FC236}">
+                <a16:creationId xmlns:a16="http://schemas.microsoft.com/office/drawing/2014/main" id="{7B22AFC8-19B2-44DE-B73A-5670980A0DBB}"/>
+              </a:ext>
+            </a:extLst>
+          </p:cNvPr>
+          <p:cNvSpPr txBox="1"/>
+          <p:nvPr/>
+        </p:nvSpPr>
+        <p:spPr>
+          <a:xfrm>
+            <a:off x="700548" y="1836174"/>
+            <a:ext cx="10914206" cy="4247317"/>
+          </a:xfrm>
+          <a:prstGeom prst="rect">
+            <a:avLst/>
+          </a:prstGeom>
+          <a:noFill/>
+        </p:spPr>
+        <p:txBody>
+          <a:bodyPr wrap="none" rtlCol="0">
+            <a:spAutoFit/>
+          </a:bodyPr>
+          <a:lstStyle/>
+          <a:p>
+            <a:pPr marL="285750" indent="-285750">
+              <a:buFont typeface="Arial" panose="020B0604020202020204" pitchFamily="34" charset="0"/>
+              <a:buChar char="•"/>
+            </a:pPr>
+            <a:r>
+              <a:rPr lang="en-US" dirty="0"/>
+              <a:t>A </a:t>
+            </a:r>
+            <a:r>
+              <a:rPr lang="en-US" b="1" dirty="0"/>
+              <a:t>version control system </a:t>
+            </a:r>
+            <a:r>
+              <a:rPr lang="en-US" dirty="0"/>
+              <a:t>records changes to a file or set of files so you can recall specific versions later.</a:t>
+            </a:r>
+          </a:p>
+          <a:p>
+            <a:pPr marL="742950" lvl="1" indent="-285750">
+              <a:buFont typeface="Arial" panose="020B0604020202020204" pitchFamily="34" charset="0"/>
+              <a:buChar char="•"/>
+            </a:pPr>
+            <a:r>
+              <a:rPr lang="en-US" dirty="0"/>
+              <a:t>While often used for code, can be used for any file type.  Meaning you can also track changes in your </a:t>
+            </a:r>
+            <a:br>
+              <a:rPr lang="en-US" dirty="0"/>
+            </a:br>
+            <a:r>
+              <a:rPr lang="en-US" dirty="0"/>
+              <a:t>posters, presentations, and figures, then recall past versions if need be.</a:t>
+            </a:r>
+          </a:p>
+          <a:p>
+            <a:pPr marL="742950" lvl="1" indent="-285750">
+              <a:buFont typeface="Arial" panose="020B0604020202020204" pitchFamily="34" charset="0"/>
+              <a:buChar char="•"/>
+            </a:pPr>
+            <a:endParaRPr lang="en-US" dirty="0"/>
+          </a:p>
+          <a:p>
+            <a:pPr marL="742950" lvl="1" indent="-285750">
+              <a:buFont typeface="Arial" panose="020B0604020202020204" pitchFamily="34" charset="0"/>
+              <a:buChar char="•"/>
+            </a:pPr>
+            <a:r>
+              <a:rPr lang="en-US" dirty="0"/>
+              <a:t>The log of file changes is similar to an experimentalist’s lab book.  It tracks how the project has progressed </a:t>
+            </a:r>
+            <a:br>
+              <a:rPr lang="en-US" dirty="0"/>
+            </a:br>
+            <a:r>
+              <a:rPr lang="en-US" dirty="0"/>
+              <a:t>(in terms of the code at least) and allows you to more easily track problems or go back to previous version </a:t>
+            </a:r>
+            <a:br>
+              <a:rPr lang="en-US" dirty="0"/>
+            </a:br>
+            <a:r>
+              <a:rPr lang="en-US" dirty="0"/>
+              <a:t>of working code. </a:t>
+            </a:r>
+            <a:endParaRPr lang="en-US" dirty="0" smtClean="0"/>
+          </a:p>
+          <a:p>
+            <a:pPr marL="742950" lvl="1" indent="-285750">
+              <a:buFont typeface="Arial" panose="020B0604020202020204" pitchFamily="34" charset="0"/>
+              <a:buChar char="•"/>
+            </a:pPr>
+            <a:endParaRPr lang="en-US" dirty="0"/>
+          </a:p>
+          <a:p>
+            <a:pPr marL="742950" lvl="1" indent="-285750">
+              <a:buFont typeface="Arial" panose="020B0604020202020204" pitchFamily="34" charset="0"/>
+              <a:buChar char="•"/>
+            </a:pPr>
+            <a:endParaRPr lang="en-US" dirty="0" smtClean="0"/>
+          </a:p>
+          <a:p>
+            <a:pPr marL="742950" lvl="1" indent="-285750">
+              <a:buFont typeface="Arial" panose="020B0604020202020204" pitchFamily="34" charset="0"/>
+              <a:buChar char="•"/>
+            </a:pPr>
+            <a:endParaRPr lang="en-US" dirty="0"/>
+          </a:p>
+          <a:p>
+            <a:pPr lvl="1"/>
+            <a:endParaRPr lang="en-US" dirty="0"/>
+          </a:p>
+          <a:p>
+            <a:pPr marL="285750" indent="-285750">
+              <a:buFont typeface="Arial" panose="020B0604020202020204" pitchFamily="34" charset="0"/>
+              <a:buChar char="•"/>
+            </a:pPr>
+            <a:endParaRPr lang="en-US" dirty="0" smtClean="0"/>
+          </a:p>
+          <a:p>
+            <a:pPr marL="285750" indent="-285750">
+              <a:buFont typeface="Arial" panose="020B0604020202020204" pitchFamily="34" charset="0"/>
+              <a:buChar char="•"/>
+            </a:pPr>
+            <a:endParaRPr lang="en-US" dirty="0"/>
+          </a:p>
+          <a:p>
+            <a:pPr lvl="1"/>
+            <a:r>
+              <a:rPr lang="en-US" dirty="0" smtClean="0"/>
+              <a:t> </a:t>
+            </a:r>
+            <a:endParaRPr lang="en-US" dirty="0"/>
+          </a:p>
+          <a:p>
+            <a:pPr lvl="2"/>
+            <a:endParaRPr lang="en-US" dirty="0"/>
+          </a:p>
+        </p:txBody>
+      </p:sp>
+      <p:pic>
+        <p:nvPicPr>
+          <p:cNvPr id="5" name="Picture 4"/>
+          <p:cNvPicPr>
+            <a:picLocks noChangeAspect="1"/>
+          </p:cNvPicPr>
+          <p:nvPr/>
+        </p:nvPicPr>
+        <p:blipFill>
+          <a:blip r:embed="rId2"/>
+          <a:stretch>
+            <a:fillRect/>
+          </a:stretch>
+        </p:blipFill>
+        <p:spPr>
+          <a:xfrm>
+            <a:off x="4221847" y="3629829"/>
+            <a:ext cx="7264800" cy="2987518"/>
+          </a:xfrm>
+          <a:prstGeom prst="rect">
+            <a:avLst/>
+          </a:prstGeom>
+        </p:spPr>
+      </p:pic>
+    </p:spTree>
+    <p:extLst>
+      <p:ext uri="{BB962C8B-B14F-4D97-AF65-F5344CB8AC3E}">
+        <p14:creationId xmlns:p14="http://schemas.microsoft.com/office/powerpoint/2010/main" val="2210943336"/>
+      </p:ext>
+    </p:extLst>
+  </p:cSld>
+  <p:clrMapOvr>
+    <a:masterClrMapping/>
+  </p:clrMapOvr>
+</p:sld>
+</file>
+
+<file path=ppt/slides/slide3.xml><?xml version="1.0" encoding="utf-8"?>
+<p:sld xmlns:a="http://schemas.openxmlformats.org/drawingml/2006/main" xmlns:r="http://schemas.openxmlformats.org/officeDocument/2006/relationships" xmlns:p="http://schemas.openxmlformats.org/presentationml/2006/main">
+  <p:cSld>
+    <p:spTree>
+      <p:nvGrpSpPr>
+        <p:cNvPr id="1" name=""/>
+        <p:cNvGrpSpPr/>
+        <p:nvPr/>
+      </p:nvGrpSpPr>
+      <p:grpSpPr>
+        <a:xfrm>
+          <a:off x="0" y="0"/>
+          <a:ext cx="0" cy="0"/>
+          <a:chOff x="0" y="0"/>
+          <a:chExt cx="0" cy="0"/>
+        </a:xfrm>
+      </p:grpSpPr>
+      <p:sp>
+        <p:nvSpPr>
+          <p:cNvPr id="2" name="TextBox 1">
+            <a:extLst>
+              <a:ext uri="{FF2B5EF4-FFF2-40B4-BE49-F238E27FC236}">
+                <a16:creationId xmlns:a16="http://schemas.microsoft.com/office/drawing/2014/main" id="{7C8BC062-2088-4621-9A35-C7E4ECEB2D25}"/>
+              </a:ext>
+            </a:extLst>
+          </p:cNvPr>
+          <p:cNvSpPr txBox="1"/>
+          <p:nvPr/>
+        </p:nvSpPr>
+        <p:spPr>
+          <a:xfrm>
+            <a:off x="368709" y="494071"/>
+            <a:ext cx="8330742" cy="707886"/>
+          </a:xfrm>
+          <a:prstGeom prst="rect">
+            <a:avLst/>
+          </a:prstGeom>
+          <a:noFill/>
+        </p:spPr>
+        <p:txBody>
+          <a:bodyPr wrap="none" rtlCol="0">
+            <a:spAutoFit/>
+          </a:bodyPr>
+          <a:lstStyle/>
+          <a:p>
+            <a:r>
+              <a:rPr lang="en-US" sz="4000" dirty="0"/>
+              <a:t>What is version control and why use it?</a:t>
+            </a:r>
+          </a:p>
+        </p:txBody>
+      </p:sp>
+      <p:sp>
+        <p:nvSpPr>
+          <p:cNvPr id="3" name="TextBox 2">
+            <a:extLst>
+              <a:ext uri="{FF2B5EF4-FFF2-40B4-BE49-F238E27FC236}">
+                <a16:creationId xmlns:a16="http://schemas.microsoft.com/office/drawing/2014/main" id="{7B22AFC8-19B2-44DE-B73A-5670980A0DBB}"/>
+              </a:ext>
+            </a:extLst>
+          </p:cNvPr>
+          <p:cNvSpPr txBox="1"/>
+          <p:nvPr/>
+        </p:nvSpPr>
+        <p:spPr>
+          <a:xfrm>
+            <a:off x="700548" y="1836174"/>
+            <a:ext cx="10914206" cy="4801314"/>
+          </a:xfrm>
+          <a:prstGeom prst="rect">
+            <a:avLst/>
+          </a:prstGeom>
+          <a:noFill/>
+        </p:spPr>
+        <p:txBody>
+          <a:bodyPr wrap="none" rtlCol="0">
+            <a:spAutoFit/>
+          </a:bodyPr>
+          <a:lstStyle/>
+          <a:p>
+            <a:pPr marL="285750" indent="-285750">
+              <a:buFont typeface="Arial" panose="020B0604020202020204" pitchFamily="34" charset="0"/>
+              <a:buChar char="•"/>
+            </a:pPr>
+            <a:r>
+              <a:rPr lang="en-US" dirty="0"/>
+              <a:t>A </a:t>
+            </a:r>
+            <a:r>
+              <a:rPr lang="en-US" b="1" dirty="0"/>
+              <a:t>version control system </a:t>
+            </a:r>
+            <a:r>
+              <a:rPr lang="en-US" dirty="0"/>
+              <a:t>records changes to a file or set of files so you can recall specific versions later.</a:t>
+            </a:r>
+          </a:p>
+          <a:p>
+            <a:pPr marL="742950" lvl="1" indent="-285750">
+              <a:buFont typeface="Arial" panose="020B0604020202020204" pitchFamily="34" charset="0"/>
+              <a:buChar char="•"/>
+            </a:pPr>
+            <a:r>
+              <a:rPr lang="en-US" dirty="0"/>
+              <a:t>While often used for code, can be used for any file type.  Meaning you can also track changes in your </a:t>
+            </a:r>
+            <a:br>
+              <a:rPr lang="en-US" dirty="0"/>
+            </a:br>
+            <a:r>
+              <a:rPr lang="en-US" dirty="0"/>
+              <a:t>posters, presentations, and figures, then recall past versions if need be.</a:t>
+            </a:r>
+          </a:p>
+          <a:p>
+            <a:pPr marL="742950" lvl="1" indent="-285750">
+              <a:buFont typeface="Arial" panose="020B0604020202020204" pitchFamily="34" charset="0"/>
+              <a:buChar char="•"/>
+            </a:pPr>
+            <a:endParaRPr lang="en-US" dirty="0"/>
+          </a:p>
+          <a:p>
+            <a:pPr marL="742950" lvl="1" indent="-285750">
+              <a:buFont typeface="Arial" panose="020B0604020202020204" pitchFamily="34" charset="0"/>
+              <a:buChar char="•"/>
+            </a:pPr>
+            <a:r>
+              <a:rPr lang="en-US" dirty="0"/>
+              <a:t>The log of file changes is similar to an experimentalist’s lab book.  It tracks how the project has progressed </a:t>
+            </a:r>
+            <a:br>
+              <a:rPr lang="en-US" dirty="0"/>
+            </a:br>
+            <a:r>
+              <a:rPr lang="en-US" dirty="0"/>
+              <a:t>(in terms of the code at least) and allows you to more easily track problems or go back to previous version </a:t>
+            </a:r>
+            <a:br>
+              <a:rPr lang="en-US" dirty="0"/>
+            </a:br>
+            <a:r>
+              <a:rPr lang="en-US" dirty="0"/>
+              <a:t>of working code. </a:t>
+            </a:r>
+            <a:endParaRPr lang="en-US" dirty="0" smtClean="0"/>
+          </a:p>
+          <a:p>
+            <a:pPr marL="742950" lvl="1" indent="-285750">
+              <a:buFont typeface="Arial" panose="020B0604020202020204" pitchFamily="34" charset="0"/>
+              <a:buChar char="•"/>
+            </a:pPr>
+            <a:endParaRPr lang="en-US" dirty="0"/>
+          </a:p>
+          <a:p>
+            <a:pPr marL="742950" lvl="1" indent="-285750">
+              <a:buFont typeface="Arial" panose="020B0604020202020204" pitchFamily="34" charset="0"/>
+              <a:buChar char="•"/>
+            </a:pPr>
+            <a:endParaRPr lang="en-US" dirty="0" smtClean="0"/>
+          </a:p>
+          <a:p>
+            <a:pPr marL="742950" lvl="1" indent="-285750">
+              <a:buFont typeface="Arial" panose="020B0604020202020204" pitchFamily="34" charset="0"/>
+              <a:buChar char="•"/>
+            </a:pPr>
+            <a:endParaRPr lang="en-US" dirty="0"/>
+          </a:p>
+          <a:p>
+            <a:pPr lvl="1"/>
+            <a:endParaRPr lang="en-US" dirty="0"/>
+          </a:p>
+          <a:p>
+            <a:pPr marL="285750" indent="-285750">
+              <a:buFont typeface="Arial" panose="020B0604020202020204" pitchFamily="34" charset="0"/>
+              <a:buChar char="•"/>
+            </a:pPr>
+            <a:endParaRPr lang="en-US" dirty="0"/>
+          </a:p>
+          <a:p>
+            <a:pPr marL="285750" indent="-285750">
+              <a:buFont typeface="Arial" panose="020B0604020202020204" pitchFamily="34" charset="0"/>
+              <a:buChar char="•"/>
+            </a:pPr>
+            <a:r>
+              <a:rPr lang="en-US" dirty="0" smtClean="0"/>
+              <a:t>A </a:t>
+            </a:r>
+            <a:r>
+              <a:rPr lang="en-US" b="1" dirty="0"/>
+              <a:t>distributed version control system </a:t>
+            </a:r>
+            <a:r>
+              <a:rPr lang="en-US" dirty="0"/>
+              <a:t>also allows you to more easily collaborate with others on a project.  </a:t>
+            </a:r>
+          </a:p>
+          <a:p>
+            <a:pPr marL="742950" lvl="1" indent="-285750">
+              <a:buFont typeface="Arial" panose="020B0604020202020204" pitchFamily="34" charset="0"/>
+              <a:buChar char="•"/>
+            </a:pPr>
+            <a:r>
+              <a:rPr lang="en-US" dirty="0"/>
+              <a:t>In addition, a distributed version control system can also serve as a backup in case something happens to </a:t>
+            </a:r>
+            <a:br>
+              <a:rPr lang="en-US" dirty="0"/>
+            </a:br>
+            <a:r>
+              <a:rPr lang="en-US" dirty="0"/>
+              <a:t>your computer and you lose your data.  </a:t>
+            </a:r>
+          </a:p>
+          <a:p>
+            <a:pPr lvl="1"/>
+            <a:r>
+              <a:rPr lang="en-US" dirty="0"/>
+              <a:t> </a:t>
+            </a:r>
+          </a:p>
+          <a:p>
+            <a:pPr lvl="2"/>
+            <a:endParaRPr lang="en-US" dirty="0"/>
+          </a:p>
+        </p:txBody>
+      </p:sp>
+      <p:pic>
+        <p:nvPicPr>
+          <p:cNvPr id="5" name="Picture 4"/>
+          <p:cNvPicPr>
+            <a:picLocks noChangeAspect="1"/>
+          </p:cNvPicPr>
+          <p:nvPr/>
+        </p:nvPicPr>
+        <p:blipFill>
+          <a:blip r:embed="rId2"/>
+          <a:stretch>
+            <a:fillRect/>
+          </a:stretch>
+        </p:blipFill>
+        <p:spPr>
+          <a:xfrm>
+            <a:off x="6318975" y="3551769"/>
+            <a:ext cx="3728275" cy="1533186"/>
+          </a:xfrm>
+          <a:prstGeom prst="rect">
+            <a:avLst/>
+          </a:prstGeom>
+        </p:spPr>
+      </p:pic>
+    </p:spTree>
+    <p:extLst>
+      <p:ext uri="{BB962C8B-B14F-4D97-AF65-F5344CB8AC3E}">
+        <p14:creationId xmlns:p14="http://schemas.microsoft.com/office/powerpoint/2010/main" val="1392929655"/>
+      </p:ext>
+    </p:extLst>
+  </p:cSld>
+  <p:clrMapOvr>
+    <a:masterClrMapping/>
+  </p:clrMapOvr>
+</p:sld>
+</file>
+
+<file path=ppt/slides/slide4.xml><?xml version="1.0" encoding="utf-8"?>
+<p:sld xmlns:a="http://schemas.openxmlformats.org/drawingml/2006/main" xmlns:r="http://schemas.openxmlformats.org/officeDocument/2006/relationships" xmlns:p="http://schemas.openxmlformats.org/presentationml/2006/main">
+  <p:cSld>
+    <p:spTree>
+      <p:nvGrpSpPr>
+        <p:cNvPr id="1" name=""/>
+        <p:cNvGrpSpPr/>
+        <p:nvPr/>
+      </p:nvGrpSpPr>
+      <p:grpSpPr>
+        <a:xfrm>
+          <a:off x="0" y="0"/>
+          <a:ext cx="0" cy="0"/>
+          <a:chOff x="0" y="0"/>
+          <a:chExt cx="0" cy="0"/>
+        </a:xfrm>
+      </p:grpSpPr>
+      <p:pic>
+        <p:nvPicPr>
+          <p:cNvPr id="2" name="Picture 1"/>
+          <p:cNvPicPr>
+            <a:picLocks noChangeAspect="1"/>
+          </p:cNvPicPr>
+          <p:nvPr/>
+        </p:nvPicPr>
+        <p:blipFill>
+          <a:blip r:embed="rId2"/>
+          <a:stretch>
+            <a:fillRect/>
+          </a:stretch>
+        </p:blipFill>
+        <p:spPr>
+          <a:xfrm>
+            <a:off x="6650870" y="868859"/>
+            <a:ext cx="4422289" cy="5041723"/>
+          </a:xfrm>
+          <a:prstGeom prst="rect">
+            <a:avLst/>
+          </a:prstGeom>
+        </p:spPr>
+      </p:pic>
+      <p:pic>
+        <p:nvPicPr>
+          <p:cNvPr id="3" name="Picture 2"/>
+          <p:cNvPicPr>
+            <a:picLocks noChangeAspect="1"/>
+          </p:cNvPicPr>
+          <p:nvPr/>
+        </p:nvPicPr>
+        <p:blipFill>
+          <a:blip r:embed="rId3"/>
+          <a:stretch>
+            <a:fillRect/>
+          </a:stretch>
+        </p:blipFill>
+        <p:spPr>
+          <a:xfrm>
+            <a:off x="504708" y="1426072"/>
+            <a:ext cx="4714875" cy="4105275"/>
+          </a:xfrm>
+          <a:prstGeom prst="rect">
+            <a:avLst/>
+          </a:prstGeom>
+        </p:spPr>
+      </p:pic>
+      <p:sp>
+        <p:nvSpPr>
+          <p:cNvPr id="4" name="TextBox 3"/>
+          <p:cNvSpPr txBox="1"/>
+          <p:nvPr/>
+        </p:nvSpPr>
+        <p:spPr>
+          <a:xfrm>
+            <a:off x="1650380" y="6010506"/>
+            <a:ext cx="2167709" cy="646331"/>
+          </a:xfrm>
+          <a:prstGeom prst="rect">
+            <a:avLst/>
+          </a:prstGeom>
+          <a:noFill/>
+        </p:spPr>
+        <p:txBody>
+          <a:bodyPr wrap="none" rtlCol="0">
+            <a:spAutoFit/>
+          </a:bodyPr>
+          <a:lstStyle/>
+          <a:p>
+            <a:r>
+              <a:rPr lang="en-US" dirty="0" smtClean="0"/>
+              <a:t>Local version control </a:t>
+            </a:r>
+          </a:p>
+          <a:p>
+            <a:endParaRPr lang="en-US" dirty="0"/>
+          </a:p>
+        </p:txBody>
+      </p:sp>
+      <p:sp>
+        <p:nvSpPr>
+          <p:cNvPr id="5" name="TextBox 4"/>
+          <p:cNvSpPr txBox="1"/>
+          <p:nvPr/>
+        </p:nvSpPr>
+        <p:spPr>
+          <a:xfrm>
+            <a:off x="7520044" y="6032808"/>
+            <a:ext cx="2683940" cy="369332"/>
+          </a:xfrm>
+          <a:prstGeom prst="rect">
+            <a:avLst/>
+          </a:prstGeom>
+          <a:noFill/>
+        </p:spPr>
+        <p:txBody>
+          <a:bodyPr wrap="none" rtlCol="0">
+            <a:spAutoFit/>
+          </a:bodyPr>
+          <a:lstStyle/>
+          <a:p>
+            <a:r>
+              <a:rPr lang="en-US" dirty="0" smtClean="0"/>
+              <a:t>Distributed version control</a:t>
+            </a:r>
+            <a:endParaRPr lang="en-US" dirty="0"/>
+          </a:p>
+        </p:txBody>
+      </p:sp>
+      <p:sp>
+        <p:nvSpPr>
+          <p:cNvPr id="6" name="TextBox 5">
+            <a:extLst>
+              <a:ext uri="{FF2B5EF4-FFF2-40B4-BE49-F238E27FC236}">
+                <a16:creationId xmlns:a16="http://schemas.microsoft.com/office/drawing/2014/main" id="{7C8BC062-2088-4621-9A35-C7E4ECEB2D25}"/>
+              </a:ext>
+            </a:extLst>
+          </p:cNvPr>
+          <p:cNvSpPr txBox="1"/>
+          <p:nvPr/>
+        </p:nvSpPr>
+        <p:spPr>
+          <a:xfrm>
+            <a:off x="368709" y="494071"/>
+            <a:ext cx="5842433" cy="707886"/>
+          </a:xfrm>
+          <a:prstGeom prst="rect">
+            <a:avLst/>
+          </a:prstGeom>
+          <a:noFill/>
+        </p:spPr>
+        <p:txBody>
+          <a:bodyPr wrap="none" rtlCol="0">
+            <a:spAutoFit/>
+          </a:bodyPr>
+          <a:lstStyle/>
+          <a:p>
+            <a:r>
+              <a:rPr lang="en-US" sz="4000" dirty="0" smtClean="0"/>
+              <a:t>Solo work vs collaborations</a:t>
+            </a:r>
+            <a:endParaRPr lang="en-US" sz="4000" dirty="0"/>
+          </a:p>
+        </p:txBody>
+      </p:sp>
+    </p:spTree>
+    <p:extLst>
+      <p:ext uri="{BB962C8B-B14F-4D97-AF65-F5344CB8AC3E}">
+        <p14:creationId xmlns:p14="http://schemas.microsoft.com/office/powerpoint/2010/main" val="3507638327"/>
+      </p:ext>
+    </p:extLst>
+  </p:cSld>
+  <p:clrMapOvr>
+    <a:masterClrMapping/>
+  </p:clrMapOvr>
 </p:sld>
 </file>
 
@@ -5461,7 +6774,7 @@
           <p:cNvPr id="2" name="TextBox 1">
             <a:extLst>
               <a:ext uri="{FF2B5EF4-FFF2-40B4-BE49-F238E27FC236}">
-                <a16:creationId xmlns:a16="http://schemas.microsoft.com/office/drawing/2014/main" id="{7C8BC062-2088-4621-9A35-C7E4ECEB2D25}"/>
+                <a16:creationId xmlns:a16="http://schemas.microsoft.com/office/drawing/2014/main" id="{6C715F99-2F6E-40E6-851D-8942EC86540A}"/>
               </a:ext>
             </a:extLst>
           </p:cNvPr>
@@ -5470,8 +6783,8 @@
         </p:nvSpPr>
         <p:spPr>
           <a:xfrm>
-            <a:off x="368709" y="494071"/>
-            <a:ext cx="8330742" cy="707886"/>
+            <a:off x="523630" y="367323"/>
+            <a:ext cx="2870466" cy="707886"/>
           </a:xfrm>
           <a:prstGeom prst="rect">
             <a:avLst/>
@@ -5486,7 +6799,7 @@
           <a:p>
             <a:r>
               <a:rPr lang="en-US" sz="4000" dirty="0"/>
-              <a:t>What is version control and why use it?</a:t>
+              <a:t>Installing GIT</a:t>
             </a:r>
           </a:p>
         </p:txBody>
@@ -5496,7 +6809,7 @@
           <p:cNvPr id="3" name="TextBox 2">
             <a:extLst>
               <a:ext uri="{FF2B5EF4-FFF2-40B4-BE49-F238E27FC236}">
-                <a16:creationId xmlns:a16="http://schemas.microsoft.com/office/drawing/2014/main" id="{7B22AFC8-19B2-44DE-B73A-5670980A0DBB}"/>
+                <a16:creationId xmlns:a16="http://schemas.microsoft.com/office/drawing/2014/main" id="{A847734D-306F-4DE3-997D-84C2F6DE5497}"/>
               </a:ext>
             </a:extLst>
           </p:cNvPr>
@@ -5505,8 +6818,8 @@
         </p:nvSpPr>
         <p:spPr>
           <a:xfrm>
-            <a:off x="700548" y="1836174"/>
-            <a:ext cx="10914206" cy="3693319"/>
+            <a:off x="1039447" y="1414585"/>
+            <a:ext cx="7565789" cy="369332"/>
           </a:xfrm>
           <a:prstGeom prst="rect">
             <a:avLst/>
@@ -5519,66 +6832,141 @@
           </a:bodyPr>
           <a:lstStyle/>
           <a:p>
+            <a:r>
+              <a:rPr lang="en-US" dirty="0"/>
+              <a:t>For mac and Windows, you can find installers at: </a:t>
+            </a:r>
+            <a:r>
+              <a:rPr lang="en-US" dirty="0">
+                <a:hlinkClick r:id="rId2"/>
+              </a:rPr>
+              <a:t>http://git-scm.com/download</a:t>
+            </a:r>
+            <a:endParaRPr lang="en-US" dirty="0"/>
+          </a:p>
+        </p:txBody>
+      </p:sp>
+      <p:sp>
+        <p:nvSpPr>
+          <p:cNvPr id="4" name="TextBox 3">
+            <a:extLst>
+              <a:ext uri="{FF2B5EF4-FFF2-40B4-BE49-F238E27FC236}">
+                <a16:creationId xmlns:a16="http://schemas.microsoft.com/office/drawing/2014/main" id="{FCA7CA19-68BA-424B-AFB9-4AB6FFB69D1C}"/>
+              </a:ext>
+            </a:extLst>
+          </p:cNvPr>
+          <p:cNvSpPr txBox="1"/>
+          <p:nvPr/>
+        </p:nvSpPr>
+        <p:spPr>
+          <a:xfrm>
+            <a:off x="444730" y="2407138"/>
+            <a:ext cx="3028265" cy="707886"/>
+          </a:xfrm>
+          <a:prstGeom prst="rect">
+            <a:avLst/>
+          </a:prstGeom>
+          <a:noFill/>
+        </p:spPr>
+        <p:txBody>
+          <a:bodyPr wrap="none" rtlCol="0">
+            <a:spAutoFit/>
+          </a:bodyPr>
+          <a:lstStyle/>
+          <a:p>
+            <a:r>
+              <a:rPr lang="en-US" sz="4000" dirty="0"/>
+              <a:t>Configure GIT</a:t>
+            </a:r>
+          </a:p>
+        </p:txBody>
+      </p:sp>
+      <p:sp>
+        <p:nvSpPr>
+          <p:cNvPr id="5" name="TextBox 4">
+            <a:extLst>
+              <a:ext uri="{FF2B5EF4-FFF2-40B4-BE49-F238E27FC236}">
+                <a16:creationId xmlns:a16="http://schemas.microsoft.com/office/drawing/2014/main" id="{5DD1F57D-A173-4BB6-A634-B36E92183EFF}"/>
+              </a:ext>
+            </a:extLst>
+          </p:cNvPr>
+          <p:cNvSpPr txBox="1"/>
+          <p:nvPr/>
+        </p:nvSpPr>
+        <p:spPr>
+          <a:xfrm>
+            <a:off x="773723" y="3429000"/>
+            <a:ext cx="9747027" cy="646331"/>
+          </a:xfrm>
+          <a:prstGeom prst="rect">
+            <a:avLst/>
+          </a:prstGeom>
+          <a:noFill/>
+        </p:spPr>
+        <p:txBody>
+          <a:bodyPr wrap="none" rtlCol="0">
+            <a:spAutoFit/>
+          </a:bodyPr>
+          <a:lstStyle/>
+          <a:p>
+            <a:r>
+              <a:rPr lang="en-US" dirty="0"/>
+              <a:t>The git config command in terminal allows you to configure git from the command line.  Alternatively, </a:t>
+            </a:r>
+            <a:br>
+              <a:rPr lang="en-US" dirty="0"/>
+            </a:br>
+            <a:r>
+              <a:rPr lang="en-US" dirty="0"/>
+              <a:t>you can open the .</a:t>
+            </a:r>
+            <a:r>
+              <a:rPr lang="en-US" dirty="0" err="1"/>
+              <a:t>gitconfig</a:t>
+            </a:r>
+            <a:r>
+              <a:rPr lang="en-US" dirty="0"/>
+              <a:t> file in your home directory and edit the configuration there.  </a:t>
+            </a:r>
+          </a:p>
+        </p:txBody>
+      </p:sp>
+      <p:sp>
+        <p:nvSpPr>
+          <p:cNvPr id="6" name="TextBox 5">
+            <a:extLst>
+              <a:ext uri="{FF2B5EF4-FFF2-40B4-BE49-F238E27FC236}">
+                <a16:creationId xmlns:a16="http://schemas.microsoft.com/office/drawing/2014/main" id="{C7970726-E5A2-4F76-A6CA-3072FFF47028}"/>
+              </a:ext>
+            </a:extLst>
+          </p:cNvPr>
+          <p:cNvSpPr txBox="1"/>
+          <p:nvPr/>
+        </p:nvSpPr>
+        <p:spPr>
+          <a:xfrm>
+            <a:off x="1771624" y="4389307"/>
+            <a:ext cx="7751224" cy="1200329"/>
+          </a:xfrm>
+          <a:prstGeom prst="rect">
+            <a:avLst/>
+          </a:prstGeom>
+          <a:noFill/>
+        </p:spPr>
+        <p:txBody>
+          <a:bodyPr wrap="none" rtlCol="0">
+            <a:spAutoFit/>
+          </a:bodyPr>
+          <a:lstStyle/>
+          <a:p>
             <a:pPr marL="285750" indent="-285750">
               <a:buFont typeface="Arial" panose="020B0604020202020204" pitchFamily="34" charset="0"/>
               <a:buChar char="•"/>
             </a:pPr>
             <a:r>
               <a:rPr lang="en-US" dirty="0"/>
-              <a:t>A version control system records changes to a file or set of files so you can recall specific versions later.</a:t>
-            </a:r>
-          </a:p>
-          <a:p>
-            <a:pPr marL="742950" lvl="1" indent="-285750">
-              <a:buFont typeface="Arial" panose="020B0604020202020204" pitchFamily="34" charset="0"/>
-              <a:buChar char="•"/>
-            </a:pPr>
-            <a:r>
-              <a:rPr lang="en-US" dirty="0"/>
-              <a:t>While often used for code, can be used for any file type.  Meaning you can also track changes in your </a:t>
-            </a:r>
-            <a:br>
-              <a:rPr lang="en-US" dirty="0"/>
-            </a:br>
-            <a:r>
-              <a:rPr lang="en-US" dirty="0"/>
-              <a:t>posters, presentations, and figures, then recall past versions if need be.</a:t>
-            </a:r>
-          </a:p>
-          <a:p>
-            <a:pPr marL="742950" lvl="1" indent="-285750">
-              <a:buFont typeface="Arial" panose="020B0604020202020204" pitchFamily="34" charset="0"/>
-              <a:buChar char="•"/>
-            </a:pPr>
-            <a:endParaRPr lang="en-US" dirty="0"/>
-          </a:p>
-          <a:p>
-            <a:pPr marL="742950" lvl="1" indent="-285750">
-              <a:buFont typeface="Arial" panose="020B0604020202020204" pitchFamily="34" charset="0"/>
-              <a:buChar char="•"/>
-            </a:pPr>
-            <a:r>
-              <a:rPr lang="en-US" dirty="0"/>
-              <a:t>The log of file changes is similar to an experimentalist’s lab book.  It tracks how the project has progressed </a:t>
-            </a:r>
-            <a:br>
-              <a:rPr lang="en-US" dirty="0"/>
-            </a:br>
-            <a:r>
-              <a:rPr lang="en-US" dirty="0"/>
-              <a:t>(in terms of the code at least) and allows you to more easily track problems or go back to previous version </a:t>
-            </a:r>
-            <a:br>
-              <a:rPr lang="en-US" dirty="0"/>
-            </a:br>
-            <a:r>
-              <a:rPr lang="en-US" dirty="0"/>
-              <a:t>of working code. </a:t>
-            </a:r>
-          </a:p>
-          <a:p>
-            <a:pPr lvl="1"/>
-            <a:endParaRPr lang="en-US" dirty="0"/>
+              <a:t>git config --global user.name “John Smith”</a:t>
+            </a:r>
           </a:p>
           <a:p>
             <a:pPr marL="285750" indent="-285750">
@@ -5587,43 +6975,58 @@
             </a:pPr>
             <a:r>
               <a:rPr lang="en-US" dirty="0"/>
-              <a:t>A distributed version control system also allows you to more easily collaborate with others on a project.  </a:t>
-            </a:r>
-          </a:p>
-          <a:p>
-            <a:pPr marL="742950" lvl="1" indent="-285750">
+              <a:t>git config --global </a:t>
+            </a:r>
+            <a:r>
+              <a:rPr lang="en-US" dirty="0" err="1"/>
+              <a:t>user.email</a:t>
+            </a:r>
+            <a:r>
+              <a:rPr lang="en-US" dirty="0"/>
+              <a:t> </a:t>
+            </a:r>
+            <a:r>
+              <a:rPr lang="en-US" dirty="0">
+                <a:hlinkClick r:id="rId3"/>
+              </a:rPr>
+              <a:t>johnsmith@email.com</a:t>
+            </a:r>
+            <a:endParaRPr lang="en-US" dirty="0"/>
+          </a:p>
+          <a:p>
+            <a:pPr marL="285750" indent="-285750">
               <a:buFont typeface="Arial" panose="020B0604020202020204" pitchFamily="34" charset="0"/>
               <a:buChar char="•"/>
             </a:pPr>
             <a:r>
               <a:rPr lang="en-US" dirty="0"/>
-              <a:t>In addition, a distributed version control system can also serve as a backup in case something happens to </a:t>
-            </a:r>
-            <a:br>
-              <a:rPr lang="en-US" dirty="0"/>
-            </a:br>
-            <a:r>
-              <a:rPr lang="en-US" dirty="0"/>
-              <a:t>your computer and you lose your data.  </a:t>
-            </a:r>
-          </a:p>
-          <a:p>
-            <a:pPr lvl="1"/>
-            <a:r>
-              <a:rPr lang="en-US" dirty="0"/>
-              <a:t> </a:t>
-            </a:r>
-          </a:p>
-          <a:p>
-            <a:pPr lvl="2"/>
-            <a:endParaRPr lang="en-US" dirty="0"/>
+              <a:t>git config --global </a:t>
+            </a:r>
+            <a:r>
+              <a:rPr lang="en-US" dirty="0" err="1"/>
+              <a:t>core.editor</a:t>
+            </a:r>
+            <a:r>
+              <a:rPr lang="en-US" dirty="0"/>
+              <a:t> vim ‘C:/Program Files (x86)/Vim/vim74/vim.exe’</a:t>
+            </a:r>
+          </a:p>
+          <a:p>
+            <a:pPr marL="285750" indent="-285750">
+              <a:buFont typeface="Arial" panose="020B0604020202020204" pitchFamily="34" charset="0"/>
+              <a:buChar char="•"/>
+            </a:pPr>
+            <a:r>
+              <a:rPr lang="en-US" dirty="0"/>
+              <a:t>git config --list </a:t>
+            </a:r>
           </a:p>
         </p:txBody>
       </p:sp>
     </p:spTree>
     <p:extLst>
       <p:ext uri="{BB962C8B-B14F-4D97-AF65-F5344CB8AC3E}">
-        <p14:creationId xmlns:p14="http://schemas.microsoft.com/office/powerpoint/2010/main" val="1392929655"/>
+        <p14:creationId xmlns:p14="http://schemas.microsoft.com/office/powerpoint/2010/main" val="1958072024"/>
       </p:ext>
     </p:extLst>
   </p:cSld>
@@ -5655,7 +7058,7 @@
           <p:cNvPr id="2" name="TextBox 1">
             <a:extLst>
               <a:ext uri="{FF2B5EF4-FFF2-40B4-BE49-F238E27FC236}">
-                <a16:creationId xmlns:a16="http://schemas.microsoft.com/office/drawing/2014/main" id="{6C715F99-2F6E-40E6-851D-8942EC86540A}"/>
+                <a16:creationId xmlns:a16="http://schemas.microsoft.com/office/drawing/2014/main" id="{BB584E79-F3A6-47EB-AE03-C5BE7C88FFF8}"/>
               </a:ext>
             </a:extLst>
           </p:cNvPr>
@@ -5664,8 +7067,8 @@
         </p:nvSpPr>
         <p:spPr>
           <a:xfrm>
-            <a:off x="523630" y="367323"/>
-            <a:ext cx="2870466" cy="707886"/>
+            <a:off x="468922" y="468924"/>
+            <a:ext cx="3004349" cy="707886"/>
           </a:xfrm>
           <a:prstGeom prst="rect">
             <a:avLst/>
@@ -5680,7 +7083,7 @@
           <a:p>
             <a:r>
               <a:rPr lang="en-US" sz="4000" dirty="0"/>
-              <a:t>Installing GIT</a:t>
+              <a:t>Help with GIT</a:t>
             </a:r>
           </a:p>
         </p:txBody>
@@ -5690,7 +7093,7 @@
           <p:cNvPr id="3" name="TextBox 2">
             <a:extLst>
               <a:ext uri="{FF2B5EF4-FFF2-40B4-BE49-F238E27FC236}">
-                <a16:creationId xmlns:a16="http://schemas.microsoft.com/office/drawing/2014/main" id="{A847734D-306F-4DE3-997D-84C2F6DE5497}"/>
+                <a16:creationId xmlns:a16="http://schemas.microsoft.com/office/drawing/2014/main" id="{96CE06DF-98FB-4276-A02C-E3847281EAAD}"/>
               </a:ext>
             </a:extLst>
           </p:cNvPr>
@@ -5699,8 +7102,8 @@
         </p:nvSpPr>
         <p:spPr>
           <a:xfrm>
-            <a:off x="1039447" y="1414585"/>
-            <a:ext cx="7565789" cy="369332"/>
+            <a:off x="1766277" y="2016369"/>
+            <a:ext cx="8385565" cy="3139321"/>
           </a:xfrm>
           <a:prstGeom prst="rect">
             <a:avLst/>
@@ -5713,141 +7116,65 @@
           </a:bodyPr>
           <a:lstStyle/>
           <a:p>
-            <a:r>
-              <a:rPr lang="en-US" dirty="0"/>
-              <a:t>For mac and Windows, you can find installers at: </a:t>
-            </a:r>
-            <a:r>
-              <a:rPr lang="en-US" dirty="0">
-                <a:hlinkClick r:id="rId2"/>
-              </a:rPr>
-              <a:t>http://git-scm.com/download</a:t>
-            </a:r>
-            <a:endParaRPr lang="en-US" dirty="0"/>
-          </a:p>
-        </p:txBody>
-      </p:sp>
-      <p:sp>
-        <p:nvSpPr>
-          <p:cNvPr id="4" name="TextBox 3">
-            <a:extLst>
-              <a:ext uri="{FF2B5EF4-FFF2-40B4-BE49-F238E27FC236}">
-                <a16:creationId xmlns:a16="http://schemas.microsoft.com/office/drawing/2014/main" id="{FCA7CA19-68BA-424B-AFB9-4AB6FFB69D1C}"/>
-              </a:ext>
-            </a:extLst>
-          </p:cNvPr>
-          <p:cNvSpPr txBox="1"/>
-          <p:nvPr/>
-        </p:nvSpPr>
-        <p:spPr>
-          <a:xfrm>
-            <a:off x="444730" y="2407138"/>
-            <a:ext cx="3028265" cy="707886"/>
-          </a:xfrm>
-          <a:prstGeom prst="rect">
-            <a:avLst/>
-          </a:prstGeom>
-          <a:noFill/>
-        </p:spPr>
-        <p:txBody>
-          <a:bodyPr wrap="none" rtlCol="0">
-            <a:spAutoFit/>
-          </a:bodyPr>
-          <a:lstStyle/>
-          <a:p>
-            <a:r>
-              <a:rPr lang="en-US" sz="4000" dirty="0"/>
-              <a:t>Configure GIT</a:t>
-            </a:r>
-          </a:p>
-        </p:txBody>
-      </p:sp>
-      <p:sp>
-        <p:nvSpPr>
-          <p:cNvPr id="5" name="TextBox 4">
-            <a:extLst>
-              <a:ext uri="{FF2B5EF4-FFF2-40B4-BE49-F238E27FC236}">
-                <a16:creationId xmlns:a16="http://schemas.microsoft.com/office/drawing/2014/main" id="{5DD1F57D-A173-4BB6-A634-B36E92183EFF}"/>
-              </a:ext>
-            </a:extLst>
-          </p:cNvPr>
-          <p:cNvSpPr txBox="1"/>
-          <p:nvPr/>
-        </p:nvSpPr>
-        <p:spPr>
-          <a:xfrm>
-            <a:off x="773723" y="3429000"/>
-            <a:ext cx="9747027" cy="646331"/>
-          </a:xfrm>
-          <a:prstGeom prst="rect">
-            <a:avLst/>
-          </a:prstGeom>
-          <a:noFill/>
-        </p:spPr>
-        <p:txBody>
-          <a:bodyPr wrap="none" rtlCol="0">
-            <a:spAutoFit/>
-          </a:bodyPr>
-          <a:lstStyle/>
-          <a:p>
-            <a:r>
-              <a:rPr lang="en-US" dirty="0"/>
-              <a:t>The git config command in terminal allows you to configure git from the command line.  Alternatively, </a:t>
-            </a:r>
-            <a:br>
-              <a:rPr lang="en-US" dirty="0"/>
-            </a:br>
-            <a:r>
-              <a:rPr lang="en-US" dirty="0"/>
-              <a:t>you can open the .</a:t>
-            </a:r>
-            <a:r>
-              <a:rPr lang="en-US" dirty="0" err="1"/>
-              <a:t>gitconfig</a:t>
-            </a:r>
-            <a:r>
-              <a:rPr lang="en-US" dirty="0"/>
-              <a:t> file in your home directory and edit the configuration there.  </a:t>
-            </a:r>
-          </a:p>
-        </p:txBody>
-      </p:sp>
-      <p:sp>
-        <p:nvSpPr>
-          <p:cNvPr id="6" name="TextBox 5">
-            <a:extLst>
-              <a:ext uri="{FF2B5EF4-FFF2-40B4-BE49-F238E27FC236}">
-                <a16:creationId xmlns:a16="http://schemas.microsoft.com/office/drawing/2014/main" id="{C7970726-E5A2-4F76-A6CA-3072FFF47028}"/>
-              </a:ext>
-            </a:extLst>
-          </p:cNvPr>
-          <p:cNvSpPr txBox="1"/>
-          <p:nvPr/>
-        </p:nvSpPr>
-        <p:spPr>
-          <a:xfrm>
-            <a:off x="1771624" y="4389307"/>
-            <a:ext cx="7751224" cy="1200329"/>
-          </a:xfrm>
-          <a:prstGeom prst="rect">
-            <a:avLst/>
-          </a:prstGeom>
-          <a:noFill/>
-        </p:spPr>
-        <p:txBody>
-          <a:bodyPr wrap="none" rtlCol="0">
-            <a:spAutoFit/>
-          </a:bodyPr>
-          <a:lstStyle/>
-          <a:p>
             <a:pPr marL="285750" indent="-285750">
               <a:buFont typeface="Arial" panose="020B0604020202020204" pitchFamily="34" charset="0"/>
               <a:buChar char="•"/>
             </a:pPr>
             <a:r>
               <a:rPr lang="en-US" dirty="0"/>
-              <a:t>git config --global user.name “John Smith”</a:t>
-            </a:r>
+              <a:t>The git documentation page: </a:t>
+            </a:r>
+            <a:r>
+              <a:rPr lang="en-US" dirty="0">
+                <a:hlinkClick r:id="rId2"/>
+              </a:rPr>
+              <a:t>https://git-scm.com/doc</a:t>
+            </a:r>
+            <a:endParaRPr lang="en-US" dirty="0"/>
+          </a:p>
+          <a:p>
+            <a:pPr marL="742950" lvl="1" indent="-285750">
+              <a:buFont typeface="Arial" panose="020B0604020202020204" pitchFamily="34" charset="0"/>
+              <a:buChar char="•"/>
+            </a:pPr>
+            <a:r>
+              <a:rPr lang="en-US" dirty="0"/>
+              <a:t>The reference manual is the official comprehensive document for all of git.</a:t>
+            </a:r>
+          </a:p>
+          <a:p>
+            <a:pPr marL="742950" lvl="1" indent="-285750">
+              <a:buFont typeface="Arial" panose="020B0604020202020204" pitchFamily="34" charset="0"/>
+              <a:buChar char="•"/>
+            </a:pPr>
+            <a:r>
+              <a:rPr lang="en-US" dirty="0"/>
+              <a:t>The Pro Book is a great place to get started and what this presentation was </a:t>
+            </a:r>
+            <a:br>
+              <a:rPr lang="en-US" dirty="0"/>
+            </a:br>
+            <a:r>
+              <a:rPr lang="en-US" dirty="0"/>
+              <a:t>modeled on.</a:t>
+            </a:r>
+          </a:p>
+          <a:p>
+            <a:pPr marL="742950" lvl="1" indent="-285750">
+              <a:buFont typeface="Arial" panose="020B0604020202020204" pitchFamily="34" charset="0"/>
+              <a:buChar char="•"/>
+            </a:pPr>
+            <a:r>
+              <a:rPr lang="en-US" dirty="0"/>
+              <a:t>There are also videos, cheat sheets, and external links.</a:t>
+            </a:r>
+          </a:p>
+          <a:p>
+            <a:pPr marL="742950" lvl="1" indent="-285750">
+              <a:buFont typeface="Arial" panose="020B0604020202020204" pitchFamily="34" charset="0"/>
+              <a:buChar char="•"/>
+            </a:pPr>
+            <a:endParaRPr lang="en-US" dirty="0"/>
           </a:p>
           <a:p>
             <a:pPr marL="285750" indent="-285750">
@@ -5856,22 +7183,34 @@
             </a:pPr>
             <a:r>
               <a:rPr lang="en-US" dirty="0"/>
-              <a:t>git config --global </a:t>
-            </a:r>
-            <a:r>
-              <a:rPr lang="en-US" dirty="0" err="1"/>
-              <a:t>user.email</a:t>
-            </a:r>
-            <a:r>
-              <a:rPr lang="en-US" dirty="0"/>
-              <a:t> </a:t>
-            </a:r>
-            <a:r>
-              <a:rPr lang="en-US" dirty="0">
-                <a:hlinkClick r:id="rId3"/>
-              </a:rPr>
-              <a:t>johnsmith@email.com</a:t>
-            </a:r>
+              <a:t>The help command used from the terminal.  This is nice because it works offline.</a:t>
+            </a:r>
+          </a:p>
+          <a:p>
+            <a:pPr marL="742950" lvl="1" indent="-285750">
+              <a:buFont typeface="Arial" panose="020B0604020202020204" pitchFamily="34" charset="0"/>
+              <a:buChar char="•"/>
+            </a:pPr>
+            <a:r>
+              <a:rPr lang="en-US" dirty="0"/>
+              <a:t>git help &lt;command&gt; 		gives the full documentations for the command.</a:t>
+            </a:r>
+          </a:p>
+          <a:p>
+            <a:pPr marL="742950" lvl="1" indent="-285750">
+              <a:buFont typeface="Arial" panose="020B0604020202020204" pitchFamily="34" charset="0"/>
+              <a:buChar char="•"/>
+            </a:pPr>
+            <a:r>
+              <a:rPr lang="en-US" dirty="0"/>
+              <a:t>git &lt;command&gt; -h 		gives a short reference for available options.</a:t>
+            </a:r>
+          </a:p>
+          <a:p>
+            <a:pPr marL="742950" lvl="1" indent="-285750">
+              <a:buFont typeface="Arial" panose="020B0604020202020204" pitchFamily="34" charset="0"/>
+              <a:buChar char="•"/>
+            </a:pPr>
             <a:endParaRPr lang="en-US" dirty="0"/>
           </a:p>
           <a:p>
@@ -5881,33 +7220,46 @@
             </a:pPr>
             <a:r>
               <a:rPr lang="en-US" dirty="0"/>
-              <a:t>git config --global </a:t>
-            </a:r>
-            <a:r>
-              <a:rPr lang="en-US" dirty="0" err="1"/>
-              <a:t>core.editor</a:t>
-            </a:r>
-            <a:r>
-              <a:rPr lang="en-US" dirty="0"/>
-              <a:t> vim ‘C:/Program Files (x86)/Vim/vim74/vim.exe’</a:t>
-            </a:r>
-          </a:p>
-          <a:p>
-            <a:pPr marL="285750" indent="-285750">
-              <a:buFont typeface="Arial" panose="020B0604020202020204" pitchFamily="34" charset="0"/>
-              <a:buChar char="•"/>
-            </a:pPr>
-            <a:r>
-              <a:rPr lang="en-US" dirty="0"/>
-              <a:t>git config --list </a:t>
-            </a:r>
-          </a:p>
-        </p:txBody>
-      </p:sp>
+              <a:t>Google </a:t>
+            </a:r>
+            <a:r>
+              <a:rPr lang="en-US" dirty="0">
+                <a:sym typeface="Wingdings" panose="05000000000000000000" pitchFamily="2" charset="2"/>
+              </a:rPr>
+              <a:t></a:t>
+            </a:r>
+            <a:endParaRPr lang="en-US" dirty="0"/>
+          </a:p>
+        </p:txBody>
+      </p:sp>
+      <p:pic>
+        <p:nvPicPr>
+          <p:cNvPr id="4" name="Picture 3"/>
+          <p:cNvPicPr>
+            <a:picLocks noChangeAspect="1"/>
+          </p:cNvPicPr>
+          <p:nvPr/>
+        </p:nvPicPr>
+        <p:blipFill>
+          <a:blip r:embed="rId3"/>
+          <a:stretch>
+            <a:fillRect/>
+          </a:stretch>
+        </p:blipFill>
+        <p:spPr>
+          <a:xfrm>
+            <a:off x="9623618" y="2016369"/>
+            <a:ext cx="1285875" cy="1371600"/>
+          </a:xfrm>
+          <a:prstGeom prst="rect">
+            <a:avLst/>
+          </a:prstGeom>
+        </p:spPr>
+      </p:pic>
     </p:spTree>
     <p:extLst>
       <p:ext uri="{BB962C8B-B14F-4D97-AF65-F5344CB8AC3E}">
-        <p14:creationId xmlns:p14="http://schemas.microsoft.com/office/powerpoint/2010/main" val="1958072024"/>
+        <p14:creationId xmlns:p14="http://schemas.microsoft.com/office/powerpoint/2010/main" val="3139500805"/>
       </p:ext>
     </p:extLst>
   </p:cSld>
@@ -5934,22 +7286,40 @@
           <a:chExt cx="0" cy="0"/>
         </a:xfrm>
       </p:grpSpPr>
-      <p:sp>
-        <p:nvSpPr>
-          <p:cNvPr id="2" name="TextBox 1">
-            <a:extLst>
-              <a:ext uri="{FF2B5EF4-FFF2-40B4-BE49-F238E27FC236}">
-                <a16:creationId xmlns:a16="http://schemas.microsoft.com/office/drawing/2014/main" id="{BB584E79-F3A6-47EB-AE03-C5BE7C88FFF8}"/>
-              </a:ext>
-            </a:extLst>
-          </p:cNvPr>
+      <p:pic>
+        <p:nvPicPr>
+          <p:cNvPr id="2" name="Picture 1"/>
+          <p:cNvPicPr>
+            <a:picLocks noChangeAspect="1"/>
+          </p:cNvPicPr>
+          <p:nvPr/>
+        </p:nvPicPr>
+        <p:blipFill>
+          <a:blip r:embed="rId2"/>
+          <a:stretch>
+            <a:fillRect/>
+          </a:stretch>
+        </p:blipFill>
+        <p:spPr>
+          <a:xfrm>
+            <a:off x="1608474" y="886084"/>
+            <a:ext cx="8851369" cy="5099158"/>
+          </a:xfrm>
+          <a:prstGeom prst="rect">
+            <a:avLst/>
+          </a:prstGeom>
+        </p:spPr>
+      </p:pic>
+      <p:sp>
+        <p:nvSpPr>
+          <p:cNvPr id="3" name="TextBox 2"/>
           <p:cNvSpPr txBox="1"/>
           <p:nvPr/>
         </p:nvSpPr>
         <p:spPr>
           <a:xfrm>
-            <a:off x="468922" y="468924"/>
-            <a:ext cx="3004349" cy="707886"/>
+            <a:off x="4773107" y="6356195"/>
+            <a:ext cx="1261051" cy="369332"/>
           </a:xfrm>
           <a:prstGeom prst="rect">
             <a:avLst/>
@@ -5963,160 +7333,65 @@
           <a:lstStyle/>
           <a:p>
             <a:r>
-              <a:rPr lang="en-US" sz="4000" dirty="0"/>
-              <a:t>Help with GIT</a:t>
-            </a:r>
-          </a:p>
-        </p:txBody>
-      </p:sp>
-      <p:sp>
-        <p:nvSpPr>
-          <p:cNvPr id="3" name="TextBox 2">
-            <a:extLst>
-              <a:ext uri="{FF2B5EF4-FFF2-40B4-BE49-F238E27FC236}">
-                <a16:creationId xmlns:a16="http://schemas.microsoft.com/office/drawing/2014/main" id="{96CE06DF-98FB-4276-A02C-E3847281EAAD}"/>
-              </a:ext>
-            </a:extLst>
-          </p:cNvPr>
-          <p:cNvSpPr txBox="1"/>
+              <a:rPr lang="en-US" dirty="0" smtClean="0"/>
+              <a:t>Local work!</a:t>
+            </a:r>
+            <a:endParaRPr lang="en-US" dirty="0"/>
+          </a:p>
+        </p:txBody>
+      </p:sp>
+      <p:pic>
+        <p:nvPicPr>
+          <p:cNvPr id="4" name="Picture 3"/>
+          <p:cNvPicPr>
+            <a:picLocks noChangeAspect="1"/>
+          </p:cNvPicPr>
           <p:nvPr/>
-        </p:nvSpPr>
-        <p:spPr>
-          <a:xfrm>
-            <a:off x="1766277" y="2016369"/>
-            <a:ext cx="8385565" cy="3139321"/>
+        </p:nvPicPr>
+        <p:blipFill>
+          <a:blip r:embed="rId3"/>
+          <a:stretch>
+            <a:fillRect/>
+          </a:stretch>
+        </p:blipFill>
+        <p:spPr>
+          <a:xfrm>
+            <a:off x="7191375" y="143134"/>
+            <a:ext cx="5000625" cy="742950"/>
           </a:xfrm>
           <a:prstGeom prst="rect">
             <a:avLst/>
           </a:prstGeom>
-          <a:noFill/>
-        </p:spPr>
-        <p:txBody>
-          <a:bodyPr wrap="none" rtlCol="0">
-            <a:spAutoFit/>
-          </a:bodyPr>
-          <a:lstStyle/>
-          <a:p>
-            <a:pPr marL="285750" indent="-285750">
-              <a:buFont typeface="Arial" panose="020B0604020202020204" pitchFamily="34" charset="0"/>
-              <a:buChar char="•"/>
-            </a:pPr>
-            <a:r>
-              <a:rPr lang="en-US" dirty="0"/>
-              <a:t>The git documentation page: </a:t>
-            </a:r>
-            <a:r>
-              <a:rPr lang="en-US" dirty="0">
-                <a:hlinkClick r:id="rId2"/>
-              </a:rPr>
-              <a:t>https://git-scm.com/doc</a:t>
-            </a:r>
-            <a:endParaRPr lang="en-US" dirty="0"/>
-          </a:p>
-          <a:p>
-            <a:pPr marL="742950" lvl="1" indent="-285750">
-              <a:buFont typeface="Arial" panose="020B0604020202020204" pitchFamily="34" charset="0"/>
-              <a:buChar char="•"/>
-            </a:pPr>
-            <a:r>
-              <a:rPr lang="en-US" dirty="0"/>
-              <a:t>The reference manual is the official comprehensive document for all of git.</a:t>
-            </a:r>
-          </a:p>
-          <a:p>
-            <a:pPr marL="742950" lvl="1" indent="-285750">
-              <a:buFont typeface="Arial" panose="020B0604020202020204" pitchFamily="34" charset="0"/>
-              <a:buChar char="•"/>
-            </a:pPr>
-            <a:r>
-              <a:rPr lang="en-US" dirty="0"/>
-              <a:t>The Pro Book is a great place to get started and what this presentation was </a:t>
-            </a:r>
-            <a:br>
-              <a:rPr lang="en-US" dirty="0"/>
-            </a:br>
-            <a:r>
-              <a:rPr lang="en-US" dirty="0"/>
-              <a:t>modeled on.</a:t>
-            </a:r>
-          </a:p>
-          <a:p>
-            <a:pPr marL="742950" lvl="1" indent="-285750">
-              <a:buFont typeface="Arial" panose="020B0604020202020204" pitchFamily="34" charset="0"/>
-              <a:buChar char="•"/>
-            </a:pPr>
-            <a:r>
-              <a:rPr lang="en-US" dirty="0"/>
-              <a:t>There are also videos, cheat sheets, and external links.</a:t>
-            </a:r>
-          </a:p>
-          <a:p>
-            <a:pPr marL="742950" lvl="1" indent="-285750">
-              <a:buFont typeface="Arial" panose="020B0604020202020204" pitchFamily="34" charset="0"/>
-              <a:buChar char="•"/>
-            </a:pPr>
-            <a:endParaRPr lang="en-US" dirty="0"/>
-          </a:p>
-          <a:p>
-            <a:pPr marL="285750" indent="-285750">
-              <a:buFont typeface="Arial" panose="020B0604020202020204" pitchFamily="34" charset="0"/>
-              <a:buChar char="•"/>
-            </a:pPr>
-            <a:r>
-              <a:rPr lang="en-US" dirty="0"/>
-              <a:t>The help command used from the terminal.  This is nice because it works offline.</a:t>
-            </a:r>
-          </a:p>
-          <a:p>
-            <a:pPr marL="742950" lvl="1" indent="-285750">
-              <a:buFont typeface="Arial" panose="020B0604020202020204" pitchFamily="34" charset="0"/>
-              <a:buChar char="•"/>
-            </a:pPr>
-            <a:r>
-              <a:rPr lang="en-US" dirty="0"/>
-              <a:t>git help &lt;command&gt; 		gives the full documentations for the command.</a:t>
-            </a:r>
-          </a:p>
-          <a:p>
-            <a:pPr marL="742950" lvl="1" indent="-285750">
-              <a:buFont typeface="Arial" panose="020B0604020202020204" pitchFamily="34" charset="0"/>
-              <a:buChar char="•"/>
-            </a:pPr>
-            <a:r>
-              <a:rPr lang="en-US" dirty="0"/>
-              <a:t>git &lt;command&gt; -h 		gives a short reference for available options.</a:t>
-            </a:r>
-          </a:p>
-          <a:p>
-            <a:pPr marL="742950" lvl="1" indent="-285750">
-              <a:buFont typeface="Arial" panose="020B0604020202020204" pitchFamily="34" charset="0"/>
-              <a:buChar char="•"/>
-            </a:pPr>
-            <a:endParaRPr lang="en-US" dirty="0"/>
-          </a:p>
-          <a:p>
-            <a:pPr marL="285750" indent="-285750">
-              <a:buFont typeface="Arial" panose="020B0604020202020204" pitchFamily="34" charset="0"/>
-              <a:buChar char="•"/>
-            </a:pPr>
-            <a:r>
-              <a:rPr lang="en-US" dirty="0"/>
-              <a:t>Google </a:t>
-            </a:r>
-            <a:r>
-              <a:rPr lang="en-US" dirty="0">
-                <a:sym typeface="Wingdings" panose="05000000000000000000" pitchFamily="2" charset="2"/>
-              </a:rPr>
-              <a:t></a:t>
-            </a:r>
-            <a:endParaRPr lang="en-US" dirty="0"/>
-          </a:p>
-        </p:txBody>
-      </p:sp>
+        </p:spPr>
+      </p:pic>
+      <p:pic>
+        <p:nvPicPr>
+          <p:cNvPr id="5" name="Picture 4"/>
+          <p:cNvPicPr>
+            <a:picLocks noChangeAspect="1"/>
+          </p:cNvPicPr>
+          <p:nvPr/>
+        </p:nvPicPr>
+        <p:blipFill>
+          <a:blip r:embed="rId4"/>
+          <a:stretch>
+            <a:fillRect/>
+          </a:stretch>
+        </p:blipFill>
+        <p:spPr>
+          <a:xfrm>
+            <a:off x="6707574" y="5667375"/>
+            <a:ext cx="5448300" cy="1190625"/>
+          </a:xfrm>
+          <a:prstGeom prst="rect">
+            <a:avLst/>
+          </a:prstGeom>
+        </p:spPr>
+      </p:pic>
     </p:spTree>
     <p:extLst>
       <p:ext uri="{BB962C8B-B14F-4D97-AF65-F5344CB8AC3E}">
-        <p14:creationId xmlns:p14="http://schemas.microsoft.com/office/powerpoint/2010/main" val="3139500805"/>
+        <p14:creationId xmlns:p14="http://schemas.microsoft.com/office/powerpoint/2010/main" val="868356993"/>
       </p:ext>
     </p:extLst>
   </p:cSld>
@@ -6143,6 +7418,36 @@
           <a:chExt cx="0" cy="0"/>
         </a:xfrm>
       </p:grpSpPr>
+    </p:spTree>
+    <p:extLst>
+      <p:ext uri="{BB962C8B-B14F-4D97-AF65-F5344CB8AC3E}">
+        <p14:creationId xmlns:p14="http://schemas.microsoft.com/office/powerpoint/2010/main" val="549009280"/>
+      </p:ext>
+    </p:extLst>
+  </p:cSld>
+  <p:clrMapOvr>
+    <a:masterClrMapping/>
+  </p:clrMapOvr>
+</p:sld>
+</file>
+
+<file path=ppt/slides/slide9.xml><?xml version="1.0" encoding="utf-8"?>
+<p:sld xmlns:a="http://schemas.openxmlformats.org/drawingml/2006/main" xmlns:r="http://schemas.openxmlformats.org/officeDocument/2006/relationships" xmlns:p="http://schemas.openxmlformats.org/presentationml/2006/main">
+  <p:cSld>
+    <p:spTree>
+      <p:nvGrpSpPr>
+        <p:cNvPr id="1" name=""/>
+        <p:cNvGrpSpPr/>
+        <p:nvPr/>
+      </p:nvGrpSpPr>
+      <p:grpSpPr>
+        <a:xfrm>
+          <a:off x="0" y="0"/>
+          <a:ext cx="0" cy="0"/>
+          <a:chOff x="0" y="0"/>
+          <a:chExt cx="0" cy="0"/>
+        </a:xfrm>
+      </p:grpSpPr>
       <p:sp>
         <p:nvSpPr>
           <p:cNvPr id="2" name="TextBox 1">
@@ -6322,169 +7627,6 @@
     <p:extLst>
       <p:ext uri="{BB962C8B-B14F-4D97-AF65-F5344CB8AC3E}">
         <p14:creationId xmlns:p14="http://schemas.microsoft.com/office/powerpoint/2010/main" val="1550939214"/>
-      </p:ext>
-    </p:extLst>
-  </p:cSld>
-  <p:clrMapOvr>
-    <a:masterClrMapping/>
-  </p:clrMapOvr>
-</p:sld>
-</file>
-
-<file path=ppt/slides/slide9.xml><?xml version="1.0" encoding="utf-8"?>
-<p:sld xmlns:a="http://schemas.openxmlformats.org/drawingml/2006/main" xmlns:r="http://schemas.openxmlformats.org/officeDocument/2006/relationships" xmlns:p="http://schemas.openxmlformats.org/presentationml/2006/main">
-  <p:cSld>
-    <p:spTree>
-      <p:nvGrpSpPr>
-        <p:cNvPr id="1" name=""/>
-        <p:cNvGrpSpPr/>
-        <p:nvPr/>
-      </p:nvGrpSpPr>
-      <p:grpSpPr>
-        <a:xfrm>
-          <a:off x="0" y="0"/>
-          <a:ext cx="0" cy="0"/>
-          <a:chOff x="0" y="0"/>
-          <a:chExt cx="0" cy="0"/>
-        </a:xfrm>
-      </p:grpSpPr>
-      <p:sp>
-        <p:nvSpPr>
-          <p:cNvPr id="2" name="TextBox 1">
-            <a:extLst>
-              <a:ext uri="{FF2B5EF4-FFF2-40B4-BE49-F238E27FC236}">
-                <a16:creationId xmlns:a16="http://schemas.microsoft.com/office/drawing/2014/main" id="{853BC810-96FC-4778-AC48-82A38DB08855}"/>
-              </a:ext>
-            </a:extLst>
-          </p:cNvPr>
-          <p:cNvSpPr txBox="1"/>
-          <p:nvPr/>
-        </p:nvSpPr>
-        <p:spPr>
-          <a:xfrm>
-            <a:off x="539261" y="476738"/>
-            <a:ext cx="6315383" cy="707886"/>
-          </a:xfrm>
-          <a:prstGeom prst="rect">
-            <a:avLst/>
-          </a:prstGeom>
-          <a:noFill/>
-        </p:spPr>
-        <p:txBody>
-          <a:bodyPr wrap="none" rtlCol="0">
-            <a:spAutoFit/>
-          </a:bodyPr>
-          <a:lstStyle/>
-          <a:p>
-            <a:r>
-              <a:rPr lang="en-US" sz="4000" dirty="0"/>
-              <a:t>View and undo your project…</a:t>
-            </a:r>
-          </a:p>
-        </p:txBody>
-      </p:sp>
-      <p:sp>
-        <p:nvSpPr>
-          <p:cNvPr id="3" name="TextBox 2">
-            <a:extLst>
-              <a:ext uri="{FF2B5EF4-FFF2-40B4-BE49-F238E27FC236}">
-                <a16:creationId xmlns:a16="http://schemas.microsoft.com/office/drawing/2014/main" id="{93E51470-F363-4361-9879-3DA6F22EA45E}"/>
-              </a:ext>
-            </a:extLst>
-          </p:cNvPr>
-          <p:cNvSpPr txBox="1"/>
-          <p:nvPr/>
-        </p:nvSpPr>
-        <p:spPr>
-          <a:xfrm>
-            <a:off x="3102708" y="2274277"/>
-            <a:ext cx="5080045" cy="2031325"/>
-          </a:xfrm>
-          <a:prstGeom prst="rect">
-            <a:avLst/>
-          </a:prstGeom>
-          <a:noFill/>
-        </p:spPr>
-        <p:txBody>
-          <a:bodyPr wrap="none" rtlCol="0">
-            <a:spAutoFit/>
-          </a:bodyPr>
-          <a:lstStyle/>
-          <a:p>
-            <a:pPr marL="285750" indent="-285750">
-              <a:buFont typeface="Arial" panose="020B0604020202020204" pitchFamily="34" charset="0"/>
-              <a:buChar char="•"/>
-            </a:pPr>
-            <a:r>
-              <a:rPr lang="en-US" dirty="0"/>
-              <a:t>git log (-p -&lt;n&gt; --since=&lt;“date”&gt; --until=&lt;“date”&gt; </a:t>
-            </a:r>
-            <a:br>
-              <a:rPr lang="en-US" dirty="0"/>
-            </a:br>
-            <a:r>
-              <a:rPr lang="en-US" dirty="0"/>
-              <a:t>	-pretty=</a:t>
-            </a:r>
-            <a:r>
-              <a:rPr lang="en-US" dirty="0" err="1"/>
-              <a:t>oneline</a:t>
-            </a:r>
-            <a:r>
-              <a:rPr lang="en-US" dirty="0"/>
-              <a:t>, short, full, fuller --graph  </a:t>
-            </a:r>
-            <a:br>
-              <a:rPr lang="en-US" dirty="0"/>
-            </a:br>
-            <a:r>
-              <a:rPr lang="en-US" dirty="0"/>
-              <a:t>	--author=&lt;“name”&gt; --grep=&lt;“pattern”&gt;)</a:t>
-            </a:r>
-          </a:p>
-          <a:p>
-            <a:pPr marL="285750" indent="-285750">
-              <a:buFont typeface="Arial" panose="020B0604020202020204" pitchFamily="34" charset="0"/>
-              <a:buChar char="•"/>
-            </a:pPr>
-            <a:r>
-              <a:rPr lang="en-US" dirty="0"/>
-              <a:t>git commit --amend </a:t>
-            </a:r>
-          </a:p>
-          <a:p>
-            <a:pPr marL="285750" indent="-285750">
-              <a:buFont typeface="Arial" panose="020B0604020202020204" pitchFamily="34" charset="0"/>
-              <a:buChar char="•"/>
-            </a:pPr>
-            <a:r>
-              <a:rPr lang="en-US" dirty="0"/>
-              <a:t>git reset HEAD &lt;file&gt;</a:t>
-            </a:r>
-          </a:p>
-          <a:p>
-            <a:pPr marL="285750" indent="-285750">
-              <a:buFont typeface="Arial" panose="020B0604020202020204" pitchFamily="34" charset="0"/>
-              <a:buChar char="•"/>
-            </a:pPr>
-            <a:r>
-              <a:rPr lang="en-US" dirty="0"/>
-              <a:t>git checkout -- &lt;file&gt;</a:t>
-            </a:r>
-          </a:p>
-          <a:p>
-            <a:pPr marL="285750" indent="-285750">
-              <a:buFont typeface="Arial" panose="020B0604020202020204" pitchFamily="34" charset="0"/>
-              <a:buChar char="•"/>
-            </a:pPr>
-            <a:endParaRPr lang="en-US" dirty="0"/>
-          </a:p>
-        </p:txBody>
-      </p:sp>
-    </p:spTree>
-    <p:extLst>
-      <p:ext uri="{BB962C8B-B14F-4D97-AF65-F5344CB8AC3E}">
-        <p14:creationId xmlns:p14="http://schemas.microsoft.com/office/powerpoint/2010/main" val="2729963516"/>
       </p:ext>
     </p:extLst>
   </p:cSld>

</xml_diff>

<commit_message>
moved slides around after discussing with Joe
</commit_message>
<xml_diff>
--- a/learn-to-git.pptx
+++ b/learn-to-git.pptx
@@ -14,29 +14,29 @@
     <p:sldId id="288" r:id="rId5"/>
     <p:sldId id="261" r:id="rId6"/>
     <p:sldId id="289" r:id="rId7"/>
-    <p:sldId id="290" r:id="rId8"/>
-    <p:sldId id="267" r:id="rId9"/>
-    <p:sldId id="268" r:id="rId10"/>
-    <p:sldId id="269" r:id="rId11"/>
-    <p:sldId id="259" r:id="rId12"/>
-    <p:sldId id="271" r:id="rId13"/>
-    <p:sldId id="272" r:id="rId14"/>
-    <p:sldId id="270" r:id="rId15"/>
-    <p:sldId id="273" r:id="rId16"/>
-    <p:sldId id="263" r:id="rId17"/>
-    <p:sldId id="264" r:id="rId18"/>
-    <p:sldId id="274" r:id="rId19"/>
-    <p:sldId id="276" r:id="rId20"/>
-    <p:sldId id="275" r:id="rId21"/>
-    <p:sldId id="277" r:id="rId22"/>
-    <p:sldId id="280" r:id="rId23"/>
-    <p:sldId id="278" r:id="rId24"/>
-    <p:sldId id="281" r:id="rId25"/>
-    <p:sldId id="279" r:id="rId26"/>
-    <p:sldId id="282" r:id="rId27"/>
-    <p:sldId id="283" r:id="rId28"/>
-    <p:sldId id="284" r:id="rId29"/>
-    <p:sldId id="285" r:id="rId30"/>
+    <p:sldId id="267" r:id="rId8"/>
+    <p:sldId id="268" r:id="rId9"/>
+    <p:sldId id="269" r:id="rId10"/>
+    <p:sldId id="259" r:id="rId11"/>
+    <p:sldId id="271" r:id="rId12"/>
+    <p:sldId id="272" r:id="rId13"/>
+    <p:sldId id="270" r:id="rId14"/>
+    <p:sldId id="273" r:id="rId15"/>
+    <p:sldId id="263" r:id="rId16"/>
+    <p:sldId id="264" r:id="rId17"/>
+    <p:sldId id="274" r:id="rId18"/>
+    <p:sldId id="276" r:id="rId19"/>
+    <p:sldId id="275" r:id="rId20"/>
+    <p:sldId id="277" r:id="rId21"/>
+    <p:sldId id="280" r:id="rId22"/>
+    <p:sldId id="278" r:id="rId23"/>
+    <p:sldId id="281" r:id="rId24"/>
+    <p:sldId id="279" r:id="rId25"/>
+    <p:sldId id="282" r:id="rId26"/>
+    <p:sldId id="283" r:id="rId27"/>
+    <p:sldId id="284" r:id="rId28"/>
+    <p:sldId id="285" r:id="rId29"/>
+    <p:sldId id="290" r:id="rId30"/>
   </p:sldIdLst>
   <p:sldSz cx="12192000" cy="6858000"/>
   <p:notesSz cx="6858000" cy="9144000"/>
@@ -542,8 +542,21 @@
             </a:pPr>
             <a:r>
               <a:rPr lang="en-US" dirty="0"/>
-              <a:t>Make a new directory.</a:t>
-            </a:r>
+              <a:t>Make a new directory</a:t>
+            </a:r>
+            <a:r>
+              <a:rPr lang="en-US" dirty="0" smtClean="0"/>
+              <a:t>.  </a:t>
+            </a:r>
+            <a:r>
+              <a:rPr lang="en-US" dirty="0" err="1" smtClean="0"/>
+              <a:t>Mkdir</a:t>
+            </a:r>
+            <a:r>
+              <a:rPr lang="en-US" baseline="0" dirty="0" smtClean="0"/>
+              <a:t> </a:t>
+            </a:r>
+            <a:endParaRPr lang="en-US" dirty="0"/>
           </a:p>
           <a:p>
             <a:pPr marL="171450" indent="-171450">
@@ -556,11 +569,19 @@
             </a:r>
             <a:r>
               <a:rPr lang="en-US" dirty="0" err="1"/>
-              <a:t>matlab</a:t>
-            </a:r>
-            <a:r>
-              <a:rPr lang="en-US" dirty="0"/>
-              <a:t> script.  Save it.</a:t>
+              <a:t>m</a:t>
+            </a:r>
+            <a:r>
+              <a:rPr lang="en-US" dirty="0" err="1" smtClean="0"/>
+              <a:t>atlab</a:t>
+            </a:r>
+            <a:r>
+              <a:rPr lang="en-US" dirty="0" smtClean="0"/>
+              <a:t> </a:t>
+            </a:r>
+            <a:r>
+              <a:rPr lang="en-US" dirty="0"/>
+              <a:t>script.  Save it.</a:t>
             </a:r>
           </a:p>
           <a:p>
@@ -590,206 +611,33 @@
             </a:pPr>
             <a:r>
               <a:rPr lang="en-US" dirty="0"/>
-              <a:t>Mention configuring username and email.</a:t>
-            </a:r>
-          </a:p>
-          <a:p>
-            <a:pPr marL="171450" lvl="0" indent="-171450">
+              <a:t>Mention configuring username and email</a:t>
+            </a:r>
+            <a:r>
+              <a:rPr lang="en-US" dirty="0" smtClean="0"/>
+              <a:t>.</a:t>
+            </a:r>
+          </a:p>
+          <a:p>
+            <a:pPr marL="457200" lvl="1" indent="0">
               <a:buFontTx/>
-              <a:buChar char="-"/>
-            </a:pPr>
-            <a:r>
-              <a:rPr lang="en-US" dirty="0"/>
-              <a:t>Add the script to the repository. </a:t>
-            </a:r>
-          </a:p>
-          <a:p>
-            <a:pPr marL="628650" lvl="1" indent="-171450">
+              <a:buNone/>
+            </a:pPr>
+            <a:endParaRPr lang="en-US" dirty="0" smtClean="0"/>
+          </a:p>
+          <a:p>
+            <a:pPr marL="457200" lvl="1" indent="0">
               <a:buFontTx/>
-              <a:buChar char="-"/>
-            </a:pPr>
-            <a:r>
-              <a:rPr lang="en-US" dirty="0"/>
-              <a:t>Talk about tracked and untracked files.</a:t>
-            </a:r>
-          </a:p>
-          <a:p>
-            <a:pPr marL="628650" lvl="1" indent="-171450">
+              <a:buNone/>
+            </a:pPr>
+            <a:endParaRPr lang="en-US" dirty="0"/>
+          </a:p>
+          <a:p>
+            <a:pPr marL="0" lvl="0" indent="0">
               <a:buFontTx/>
-              <a:buChar char="-"/>
-            </a:pPr>
-            <a:r>
-              <a:rPr lang="en-US" dirty="0"/>
-              <a:t>Add a fake data file to the directory, but don’t track it.</a:t>
-            </a:r>
-          </a:p>
-          <a:p>
-            <a:pPr marL="171450" lvl="0" indent="-171450">
-              <a:buFontTx/>
-              <a:buChar char="-"/>
-            </a:pPr>
-            <a:r>
-              <a:rPr lang="en-US" dirty="0"/>
-              <a:t>Commit the addition/initial commit.</a:t>
-            </a:r>
-          </a:p>
-          <a:p>
-            <a:pPr marL="628650" lvl="1" indent="-171450">
-              <a:buFontTx/>
-              <a:buChar char="-"/>
-            </a:pPr>
-            <a:r>
-              <a:rPr lang="en-US" dirty="0"/>
-              <a:t>Talk about the –m option</a:t>
-            </a:r>
-          </a:p>
-          <a:p>
-            <a:pPr marL="171450" lvl="0" indent="-171450">
-              <a:buFontTx/>
-              <a:buChar char="-"/>
-            </a:pPr>
-            <a:r>
-              <a:rPr lang="en-US" dirty="0"/>
-              <a:t>Introduce git status</a:t>
-            </a:r>
-          </a:p>
-          <a:p>
-            <a:pPr marL="628650" lvl="1" indent="-171450">
-              <a:buFontTx/>
-              <a:buChar char="-"/>
-            </a:pPr>
-            <a:r>
-              <a:rPr lang="en-US" dirty="0"/>
-              <a:t>Run git status right after commit.</a:t>
-            </a:r>
-          </a:p>
-          <a:p>
-            <a:pPr marL="628650" lvl="1" indent="-171450">
-              <a:buFontTx/>
-              <a:buChar char="-"/>
-            </a:pPr>
-            <a:r>
-              <a:rPr lang="en-US" dirty="0"/>
-              <a:t>Make changes to the script.</a:t>
-            </a:r>
-          </a:p>
-          <a:p>
-            <a:pPr marL="628650" lvl="1" indent="-171450">
-              <a:buFontTx/>
-              <a:buChar char="-"/>
-            </a:pPr>
-            <a:r>
-              <a:rPr lang="en-US" dirty="0"/>
-              <a:t>Run git status again.</a:t>
-            </a:r>
-          </a:p>
-          <a:p>
-            <a:pPr marL="628650" lvl="1" indent="-171450">
-              <a:buFontTx/>
-              <a:buChar char="-"/>
-            </a:pPr>
-            <a:r>
-              <a:rPr lang="en-US" dirty="0"/>
-              <a:t>Add the script to staged area.</a:t>
-            </a:r>
-          </a:p>
-          <a:p>
-            <a:pPr marL="628650" lvl="1" indent="-171450">
-              <a:buFontTx/>
-              <a:buChar char="-"/>
-            </a:pPr>
-            <a:r>
-              <a:rPr lang="en-US" dirty="0"/>
-              <a:t>Run git status again.</a:t>
-            </a:r>
-          </a:p>
-          <a:p>
-            <a:pPr marL="628650" lvl="1" indent="-171450">
-              <a:buFontTx/>
-              <a:buChar char="-"/>
-            </a:pPr>
-            <a:r>
-              <a:rPr lang="en-US" dirty="0"/>
-              <a:t>Commit changes.</a:t>
-            </a:r>
-          </a:p>
-          <a:p>
-            <a:pPr marL="171450" lvl="0" indent="-171450">
-              <a:buFontTx/>
-              <a:buChar char="-"/>
-            </a:pPr>
-            <a:r>
-              <a:rPr lang="en-US" dirty="0"/>
-              <a:t>Talk about the lifecycle of the status of files.</a:t>
-            </a:r>
-          </a:p>
-          <a:p>
-            <a:pPr marL="171450" lvl="0" indent="-171450">
-              <a:buFontTx/>
-              <a:buChar char="-"/>
-            </a:pPr>
-            <a:r>
-              <a:rPr lang="en-US" dirty="0"/>
-              <a:t>Talk about good committing practices.</a:t>
-            </a:r>
-          </a:p>
-          <a:p>
-            <a:pPr marL="628650" lvl="1" indent="-171450">
-              <a:buFontTx/>
-              <a:buChar char="-"/>
-            </a:pPr>
-            <a:r>
-              <a:rPr lang="en-US" dirty="0"/>
-              <a:t>Committing completed code (break code into small chunks and commit each separately)</a:t>
-            </a:r>
-          </a:p>
-          <a:p>
-            <a:pPr marL="628650" lvl="1" indent="-171450">
-              <a:buFontTx/>
-              <a:buChar char="-"/>
-            </a:pPr>
-            <a:r>
-              <a:rPr lang="en-US" dirty="0"/>
-              <a:t>Commit in the imperative, telling what the code will do after the commit not what you’ve done.</a:t>
-            </a:r>
-          </a:p>
-          <a:p>
-            <a:pPr marL="628650" lvl="1" indent="-171450">
-              <a:buFontTx/>
-              <a:buChar char="-"/>
-            </a:pPr>
-            <a:r>
-              <a:rPr lang="en-US" dirty="0"/>
-              <a:t>Introduce a .</a:t>
-            </a:r>
-            <a:r>
-              <a:rPr lang="en-US" dirty="0" err="1"/>
-              <a:t>gitignore</a:t>
-            </a:r>
-            <a:r>
-              <a:rPr lang="en-US" dirty="0"/>
-              <a:t> file</a:t>
-            </a:r>
-          </a:p>
-          <a:p>
-            <a:pPr marL="1085850" lvl="2" indent="-171450">
-              <a:buFontTx/>
-              <a:buChar char="-"/>
-            </a:pPr>
-            <a:r>
-              <a:rPr lang="en-US" dirty="0"/>
-              <a:t>Blank lines and lines starting with # are ignored</a:t>
-            </a:r>
-          </a:p>
-          <a:p>
-            <a:pPr marL="1085850" lvl="2" indent="-171450">
-              <a:buFontTx/>
-              <a:buChar char="-"/>
-            </a:pPr>
-            <a:r>
-              <a:rPr lang="en-US" dirty="0"/>
-              <a:t>Standard glob patterns work (look at documentation for more information)</a:t>
-            </a:r>
+              <a:buNone/>
+            </a:pPr>
+            <a:endParaRPr lang="en-US" dirty="0"/>
           </a:p>
         </p:txBody>
       </p:sp>
@@ -810,7 +658,7 @@
           <a:p>
             <a:fld id="{1EB1DABF-4E95-4EDF-8DA3-AD2A8632C0A3}" type="slidenum">
               <a:rPr lang="en-US" smtClean="0"/>
-              <a:t>8</a:t>
+              <a:t>7</a:t>
             </a:fld>
             <a:endParaRPr lang="en-US"/>
           </a:p>
@@ -987,7 +835,7 @@
           <a:p>
             <a:fld id="{1EB1DABF-4E95-4EDF-8DA3-AD2A8632C0A3}" type="slidenum">
               <a:rPr lang="en-US" smtClean="0"/>
-              <a:t>17</a:t>
+              <a:t>16</a:t>
             </a:fld>
             <a:endParaRPr lang="en-US"/>
           </a:p>
@@ -1164,7 +1012,7 @@
           <a:p>
             <a:fld id="{1EB1DABF-4E95-4EDF-8DA3-AD2A8632C0A3}" type="slidenum">
               <a:rPr lang="en-US" smtClean="0"/>
-              <a:t>18</a:t>
+              <a:t>17</a:t>
             </a:fld>
             <a:endParaRPr lang="en-US"/>
           </a:p>
@@ -1303,23 +1151,15 @@
             </a:pPr>
             <a:r>
               <a:rPr lang="en-US" dirty="0"/>
-              <a:t>Show how </a:t>
-            </a:r>
-            <a:r>
-              <a:rPr lang="en-US" dirty="0" err="1"/>
-              <a:t>Lishi</a:t>
-            </a:r>
-            <a:r>
-              <a:rPr lang="en-US" dirty="0"/>
-              <a:t> and I handled merge </a:t>
-            </a:r>
-            <a:r>
-              <a:rPr lang="en-US" dirty="0" err="1"/>
-              <a:t>coflicts</a:t>
-            </a:r>
-            <a:r>
-              <a:rPr lang="en-US" dirty="0"/>
-              <a:t> with the presentation.</a:t>
+              <a:t>Show how Lishi and I handled merge </a:t>
+            </a:r>
+            <a:r>
+              <a:rPr lang="en-US" dirty="0" smtClean="0"/>
+              <a:t>conflicts </a:t>
+            </a:r>
+            <a:r>
+              <a:rPr lang="en-US" dirty="0"/>
+              <a:t>with the presentation.</a:t>
             </a:r>
           </a:p>
         </p:txBody>
@@ -1341,7 +1181,7 @@
           <a:p>
             <a:fld id="{1EB1DABF-4E95-4EDF-8DA3-AD2A8632C0A3}" type="slidenum">
               <a:rPr lang="en-US" smtClean="0"/>
-              <a:t>19</a:t>
+              <a:t>18</a:t>
             </a:fld>
             <a:endParaRPr lang="en-US"/>
           </a:p>
@@ -1518,7 +1358,7 @@
           <a:p>
             <a:fld id="{1EB1DABF-4E95-4EDF-8DA3-AD2A8632C0A3}" type="slidenum">
               <a:rPr lang="en-US" smtClean="0"/>
-              <a:t>20</a:t>
+              <a:t>19</a:t>
             </a:fld>
             <a:endParaRPr lang="en-US"/>
           </a:p>
@@ -1695,7 +1535,7 @@
           <a:p>
             <a:fld id="{1EB1DABF-4E95-4EDF-8DA3-AD2A8632C0A3}" type="slidenum">
               <a:rPr lang="en-US" smtClean="0"/>
-              <a:t>21</a:t>
+              <a:t>20</a:t>
             </a:fld>
             <a:endParaRPr lang="en-US"/>
           </a:p>
@@ -1872,7 +1712,7 @@
           <a:p>
             <a:fld id="{1EB1DABF-4E95-4EDF-8DA3-AD2A8632C0A3}" type="slidenum">
               <a:rPr lang="en-US" smtClean="0"/>
-              <a:t>22</a:t>
+              <a:t>21</a:t>
             </a:fld>
             <a:endParaRPr lang="en-US"/>
           </a:p>
@@ -2049,7 +1889,7 @@
           <a:p>
             <a:fld id="{1EB1DABF-4E95-4EDF-8DA3-AD2A8632C0A3}" type="slidenum">
               <a:rPr lang="en-US" smtClean="0"/>
-              <a:t>23</a:t>
+              <a:t>22</a:t>
             </a:fld>
             <a:endParaRPr lang="en-US"/>
           </a:p>
@@ -2226,7 +2066,7 @@
           <a:p>
             <a:fld id="{1EB1DABF-4E95-4EDF-8DA3-AD2A8632C0A3}" type="slidenum">
               <a:rPr lang="en-US" smtClean="0"/>
-              <a:t>24</a:t>
+              <a:t>23</a:t>
             </a:fld>
             <a:endParaRPr lang="en-US"/>
           </a:p>
@@ -2403,7 +2243,7 @@
           <a:p>
             <a:fld id="{1EB1DABF-4E95-4EDF-8DA3-AD2A8632C0A3}" type="slidenum">
               <a:rPr lang="en-US" smtClean="0"/>
-              <a:t>25</a:t>
+              <a:t>24</a:t>
             </a:fld>
             <a:endParaRPr lang="en-US"/>
           </a:p>
@@ -2580,7 +2420,7 @@
           <a:p>
             <a:fld id="{1EB1DABF-4E95-4EDF-8DA3-AD2A8632C0A3}" type="slidenum">
               <a:rPr lang="en-US" smtClean="0"/>
-              <a:t>26</a:t>
+              <a:t>25</a:t>
             </a:fld>
             <a:endParaRPr lang="en-US"/>
           </a:p>
@@ -2643,41 +2483,17 @@
           <a:bodyPr/>
           <a:lstStyle/>
           <a:p>
-            <a:pPr marL="171450" indent="-171450">
+            <a:pPr marL="171450" lvl="0" indent="-171450">
               <a:buFontTx/>
               <a:buChar char="-"/>
             </a:pPr>
             <a:r>
-              <a:rPr lang="en-US" dirty="0"/>
-              <a:t>Make a new directory.</a:t>
-            </a:r>
-          </a:p>
-          <a:p>
-            <a:pPr marL="171450" indent="-171450">
-              <a:buFontTx/>
-              <a:buChar char="-"/>
-            </a:pPr>
-            <a:r>
-              <a:rPr lang="en-US" dirty="0"/>
-              <a:t>Write a short </a:t>
-            </a:r>
-            <a:r>
-              <a:rPr lang="en-US" dirty="0" err="1"/>
-              <a:t>matlab</a:t>
-            </a:r>
-            <a:r>
-              <a:rPr lang="en-US" dirty="0"/>
-              <a:t> script.  Save it.</a:t>
-            </a:r>
-          </a:p>
-          <a:p>
-            <a:pPr marL="171450" indent="-171450">
-              <a:buFontTx/>
-              <a:buChar char="-"/>
-            </a:pPr>
-            <a:r>
-              <a:rPr lang="en-US" dirty="0"/>
-              <a:t>Initialize a git repository.</a:t>
+              <a:rPr lang="en-US" dirty="0" smtClean="0"/>
+              <a:t>Add </a:t>
+            </a:r>
+            <a:r>
+              <a:rPr lang="en-US" dirty="0"/>
+              <a:t>the script to the repository. </a:t>
             </a:r>
           </a:p>
           <a:p>
@@ -2687,7 +2503,7 @@
             </a:pPr>
             <a:r>
               <a:rPr lang="en-US" dirty="0"/>
-              <a:t>Mention not good practice to nest repos. </a:t>
+              <a:t>Talk about tracked and untracked files.</a:t>
             </a:r>
           </a:p>
           <a:p>
@@ -2697,206 +2513,13 @@
             </a:pPr>
             <a:r>
               <a:rPr lang="en-US" dirty="0"/>
-              <a:t>Mention configuring username and email.</a:t>
-            </a:r>
-          </a:p>
-          <a:p>
-            <a:pPr marL="171450" lvl="0" indent="-171450">
-              <a:buFontTx/>
-              <a:buChar char="-"/>
-            </a:pPr>
-            <a:r>
-              <a:rPr lang="en-US" dirty="0"/>
-              <a:t>Add the script to the repository. </a:t>
-            </a:r>
-          </a:p>
-          <a:p>
-            <a:pPr marL="628650" lvl="1" indent="-171450">
-              <a:buFontTx/>
-              <a:buChar char="-"/>
-            </a:pPr>
-            <a:r>
-              <a:rPr lang="en-US" dirty="0"/>
-              <a:t>Talk about tracked and untracked files.</a:t>
-            </a:r>
-          </a:p>
-          <a:p>
-            <a:pPr marL="628650" lvl="1" indent="-171450">
-              <a:buFontTx/>
-              <a:buChar char="-"/>
-            </a:pPr>
-            <a:r>
-              <a:rPr lang="en-US" dirty="0"/>
-              <a:t>Add a fake data file to the directory, but don’t track it.</a:t>
-            </a:r>
-          </a:p>
-          <a:p>
-            <a:pPr marL="171450" lvl="0" indent="-171450">
-              <a:buFontTx/>
-              <a:buChar char="-"/>
-            </a:pPr>
-            <a:r>
-              <a:rPr lang="en-US" dirty="0"/>
-              <a:t>Commit the addition/initial commit.</a:t>
-            </a:r>
-          </a:p>
-          <a:p>
-            <a:pPr marL="628650" lvl="1" indent="-171450">
-              <a:buFontTx/>
-              <a:buChar char="-"/>
-            </a:pPr>
-            <a:r>
-              <a:rPr lang="en-US" dirty="0"/>
-              <a:t>Talk about the –m option</a:t>
-            </a:r>
-          </a:p>
-          <a:p>
-            <a:pPr marL="171450" lvl="0" indent="-171450">
-              <a:buFontTx/>
-              <a:buChar char="-"/>
-            </a:pPr>
-            <a:r>
-              <a:rPr lang="en-US" dirty="0"/>
-              <a:t>Introduce git status</a:t>
-            </a:r>
-          </a:p>
-          <a:p>
-            <a:pPr marL="628650" lvl="1" indent="-171450">
-              <a:buFontTx/>
-              <a:buChar char="-"/>
-            </a:pPr>
-            <a:r>
-              <a:rPr lang="en-US" dirty="0"/>
-              <a:t>Run git status right after commit.</a:t>
-            </a:r>
-          </a:p>
-          <a:p>
-            <a:pPr marL="628650" lvl="1" indent="-171450">
-              <a:buFontTx/>
-              <a:buChar char="-"/>
-            </a:pPr>
-            <a:r>
-              <a:rPr lang="en-US" dirty="0"/>
-              <a:t>Make changes to the script.</a:t>
-            </a:r>
-          </a:p>
-          <a:p>
-            <a:pPr marL="628650" lvl="1" indent="-171450">
-              <a:buFontTx/>
-              <a:buChar char="-"/>
-            </a:pPr>
-            <a:r>
-              <a:rPr lang="en-US" dirty="0"/>
-              <a:t>Run git status again.</a:t>
-            </a:r>
-          </a:p>
-          <a:p>
-            <a:pPr marL="628650" lvl="1" indent="-171450">
-              <a:buFontTx/>
-              <a:buChar char="-"/>
-            </a:pPr>
-            <a:r>
-              <a:rPr lang="en-US" dirty="0"/>
-              <a:t>Add the script to staged area.</a:t>
-            </a:r>
-          </a:p>
-          <a:p>
-            <a:pPr marL="628650" lvl="1" indent="-171450">
-              <a:buFontTx/>
-              <a:buChar char="-"/>
-            </a:pPr>
-            <a:r>
-              <a:rPr lang="en-US" dirty="0"/>
-              <a:t>Run git status again.</a:t>
-            </a:r>
-          </a:p>
-          <a:p>
-            <a:pPr marL="628650" lvl="1" indent="-171450">
-              <a:buFontTx/>
-              <a:buChar char="-"/>
-            </a:pPr>
-            <a:r>
-              <a:rPr lang="en-US" dirty="0"/>
-              <a:t>Commit changes.</a:t>
-            </a:r>
-          </a:p>
-          <a:p>
-            <a:pPr marL="171450" lvl="0" indent="-171450">
-              <a:buFontTx/>
-              <a:buChar char="-"/>
-            </a:pPr>
-            <a:r>
-              <a:rPr lang="en-US" dirty="0"/>
-              <a:t>Talk about the lifecycle of the status of files.</a:t>
-            </a:r>
-          </a:p>
-          <a:p>
-            <a:pPr marL="171450" lvl="0" indent="-171450">
-              <a:buFontTx/>
-              <a:buChar char="-"/>
-            </a:pPr>
-            <a:r>
-              <a:rPr lang="en-US" dirty="0"/>
-              <a:t>Talk about good committing practices.</a:t>
-            </a:r>
-          </a:p>
-          <a:p>
-            <a:pPr marL="628650" lvl="1" indent="-171450">
-              <a:buFontTx/>
-              <a:buChar char="-"/>
-            </a:pPr>
-            <a:r>
-              <a:rPr lang="en-US" dirty="0"/>
-              <a:t>Committing completed code (break code into small chunks and commit each separately)</a:t>
-            </a:r>
-          </a:p>
-          <a:p>
-            <a:pPr marL="628650" lvl="1" indent="-171450">
-              <a:buFontTx/>
-              <a:buChar char="-"/>
-            </a:pPr>
-            <a:r>
-              <a:rPr lang="en-US" dirty="0"/>
-              <a:t>Commit in the imperative, telling what the code will do after the commit not what you’ve done.</a:t>
-            </a:r>
-          </a:p>
-          <a:p>
-            <a:pPr marL="628650" lvl="1" indent="-171450">
-              <a:buFontTx/>
-              <a:buChar char="-"/>
-            </a:pPr>
-            <a:r>
-              <a:rPr lang="en-US" dirty="0"/>
-              <a:t>Introduce a .</a:t>
-            </a:r>
-            <a:r>
-              <a:rPr lang="en-US" dirty="0" err="1"/>
-              <a:t>gitignore</a:t>
-            </a:r>
-            <a:r>
-              <a:rPr lang="en-US" dirty="0"/>
-              <a:t> file</a:t>
-            </a:r>
-          </a:p>
-          <a:p>
-            <a:pPr marL="1085850" lvl="2" indent="-171450">
-              <a:buFontTx/>
-              <a:buChar char="-"/>
-            </a:pPr>
-            <a:r>
-              <a:rPr lang="en-US" dirty="0"/>
-              <a:t>Blank lines and lines starting with # are ignored</a:t>
-            </a:r>
-          </a:p>
-          <a:p>
-            <a:pPr marL="1085850" lvl="2" indent="-171450">
-              <a:buFontTx/>
-              <a:buChar char="-"/>
-            </a:pPr>
-            <a:r>
-              <a:rPr lang="en-US" dirty="0"/>
-              <a:t>Standard glob patterns work (look at documentation for more information)</a:t>
-            </a:r>
+              <a:t>Add a fake data file to the directory, but don’t track it</a:t>
+            </a:r>
+            <a:r>
+              <a:rPr lang="en-US" dirty="0" smtClean="0"/>
+              <a:t>.</a:t>
+            </a:r>
+            <a:endParaRPr lang="en-US" dirty="0"/>
           </a:p>
         </p:txBody>
       </p:sp>
@@ -2917,7 +2540,7 @@
           <a:p>
             <a:fld id="{1EB1DABF-4E95-4EDF-8DA3-AD2A8632C0A3}" type="slidenum">
               <a:rPr lang="en-US" smtClean="0"/>
-              <a:t>9</a:t>
+              <a:t>8</a:t>
             </a:fld>
             <a:endParaRPr lang="en-US"/>
           </a:p>
@@ -2984,37 +2607,16 @@
               <a:buFontTx/>
               <a:buChar char="-"/>
             </a:pPr>
-            <a:r>
-              <a:rPr lang="en-US" dirty="0"/>
-              <a:t>Make a new directory.</a:t>
-            </a:r>
-          </a:p>
-          <a:p>
-            <a:pPr marL="171450" indent="-171450">
+            <a:endParaRPr lang="en-US" dirty="0"/>
+          </a:p>
+          <a:p>
+            <a:pPr marL="171450" lvl="0" indent="-171450">
               <a:buFontTx/>
               <a:buChar char="-"/>
             </a:pPr>
             <a:r>
               <a:rPr lang="en-US" dirty="0"/>
-              <a:t>Write a short </a:t>
-            </a:r>
-            <a:r>
-              <a:rPr lang="en-US" dirty="0" err="1"/>
-              <a:t>matlab</a:t>
-            </a:r>
-            <a:r>
-              <a:rPr lang="en-US" dirty="0"/>
-              <a:t> script.  Save it.</a:t>
-            </a:r>
-          </a:p>
-          <a:p>
-            <a:pPr marL="171450" indent="-171450">
-              <a:buFontTx/>
-              <a:buChar char="-"/>
-            </a:pPr>
-            <a:r>
-              <a:rPr lang="en-US" dirty="0"/>
-              <a:t>Initialize a git repository.</a:t>
+              <a:t>Commit the addition/initial commit.</a:t>
             </a:r>
           </a:p>
           <a:p>
@@ -3024,7 +2626,21 @@
             </a:pPr>
             <a:r>
               <a:rPr lang="en-US" dirty="0"/>
-              <a:t>Mention not good practice to nest repos. </a:t>
+              <a:t>Talk about the –m </a:t>
+            </a:r>
+            <a:r>
+              <a:rPr lang="en-US" dirty="0" smtClean="0"/>
+              <a:t>option</a:t>
+            </a:r>
+          </a:p>
+          <a:p>
+            <a:pPr marL="171450" lvl="0" indent="-171450">
+              <a:buFontTx/>
+              <a:buChar char="-"/>
+            </a:pPr>
+            <a:r>
+              <a:rPr lang="en-US" dirty="0" smtClean="0"/>
+              <a:t>Talk about good committing practices.</a:t>
             </a:r>
           </a:p>
           <a:p>
@@ -3033,18 +2649,8 @@
               <a:buChar char="-"/>
             </a:pPr>
             <a:r>
-              <a:rPr lang="en-US" dirty="0"/>
-              <a:t>Mention configuring username and email.</a:t>
-            </a:r>
-          </a:p>
-          <a:p>
-            <a:pPr marL="171450" lvl="0" indent="-171450">
-              <a:buFontTx/>
-              <a:buChar char="-"/>
-            </a:pPr>
-            <a:r>
-              <a:rPr lang="en-US" dirty="0"/>
-              <a:t>Add the script to the repository. </a:t>
+              <a:rPr lang="en-US" dirty="0" smtClean="0"/>
+              <a:t>Committing completed code (break code into small chunks and commit each separately)</a:t>
             </a:r>
           </a:p>
           <a:p>
@@ -3053,186 +2659,8 @@
               <a:buChar char="-"/>
             </a:pPr>
             <a:r>
-              <a:rPr lang="en-US" dirty="0"/>
-              <a:t>Talk about tracked and untracked files.</a:t>
-            </a:r>
-          </a:p>
-          <a:p>
-            <a:pPr marL="628650" lvl="1" indent="-171450">
-              <a:buFontTx/>
-              <a:buChar char="-"/>
-            </a:pPr>
-            <a:r>
-              <a:rPr lang="en-US" dirty="0"/>
-              <a:t>Add a fake data file to the directory, but don’t track it.</a:t>
-            </a:r>
-          </a:p>
-          <a:p>
-            <a:pPr marL="171450" lvl="0" indent="-171450">
-              <a:buFontTx/>
-              <a:buChar char="-"/>
-            </a:pPr>
-            <a:r>
-              <a:rPr lang="en-US" dirty="0"/>
-              <a:t>Commit the addition/initial commit.</a:t>
-            </a:r>
-          </a:p>
-          <a:p>
-            <a:pPr marL="628650" lvl="1" indent="-171450">
-              <a:buFontTx/>
-              <a:buChar char="-"/>
-            </a:pPr>
-            <a:r>
-              <a:rPr lang="en-US" dirty="0"/>
-              <a:t>Talk about the –m option</a:t>
-            </a:r>
-          </a:p>
-          <a:p>
-            <a:pPr marL="171450" lvl="0" indent="-171450">
-              <a:buFontTx/>
-              <a:buChar char="-"/>
-            </a:pPr>
-            <a:r>
-              <a:rPr lang="en-US" dirty="0"/>
-              <a:t>Introduce git status</a:t>
-            </a:r>
-          </a:p>
-          <a:p>
-            <a:pPr marL="628650" lvl="1" indent="-171450">
-              <a:buFontTx/>
-              <a:buChar char="-"/>
-            </a:pPr>
-            <a:r>
-              <a:rPr lang="en-US" dirty="0"/>
-              <a:t>Run git status right after commit.</a:t>
-            </a:r>
-          </a:p>
-          <a:p>
-            <a:pPr marL="628650" lvl="1" indent="-171450">
-              <a:buFontTx/>
-              <a:buChar char="-"/>
-            </a:pPr>
-            <a:r>
-              <a:rPr lang="en-US" dirty="0"/>
-              <a:t>Make changes to the script.</a:t>
-            </a:r>
-          </a:p>
-          <a:p>
-            <a:pPr marL="628650" lvl="1" indent="-171450">
-              <a:buFontTx/>
-              <a:buChar char="-"/>
-            </a:pPr>
-            <a:r>
-              <a:rPr lang="en-US" dirty="0"/>
-              <a:t>Run git status again.</a:t>
-            </a:r>
-          </a:p>
-          <a:p>
-            <a:pPr marL="628650" lvl="1" indent="-171450">
-              <a:buFontTx/>
-              <a:buChar char="-"/>
-            </a:pPr>
-            <a:r>
-              <a:rPr lang="en-US" dirty="0"/>
-              <a:t>Add the script to staged area.</a:t>
-            </a:r>
-          </a:p>
-          <a:p>
-            <a:pPr marL="628650" lvl="1" indent="-171450">
-              <a:buFontTx/>
-              <a:buChar char="-"/>
-            </a:pPr>
-            <a:r>
-              <a:rPr lang="en-US" dirty="0"/>
-              <a:t>Run git status again.</a:t>
-            </a:r>
-          </a:p>
-          <a:p>
-            <a:pPr marL="628650" lvl="1" indent="-171450">
-              <a:buFontTx/>
-              <a:buChar char="-"/>
-            </a:pPr>
-            <a:r>
-              <a:rPr lang="en-US" dirty="0"/>
-              <a:t>Commit changes.</a:t>
-            </a:r>
-          </a:p>
-          <a:p>
-            <a:pPr marL="171450" lvl="0" indent="-171450">
-              <a:buFontTx/>
-              <a:buChar char="-"/>
-            </a:pPr>
-            <a:r>
-              <a:rPr lang="en-US" dirty="0"/>
-              <a:t>Talk about the lifecycle of the status of files.</a:t>
-            </a:r>
-          </a:p>
-          <a:p>
-            <a:pPr marL="171450" lvl="0" indent="-171450">
-              <a:buFontTx/>
-              <a:buChar char="-"/>
-            </a:pPr>
-            <a:r>
-              <a:rPr lang="en-US" dirty="0"/>
-              <a:t>Talk about good committing practices.</a:t>
-            </a:r>
-          </a:p>
-          <a:p>
-            <a:pPr marL="628650" lvl="1" indent="-171450">
-              <a:buFontTx/>
-              <a:buChar char="-"/>
-            </a:pPr>
-            <a:r>
-              <a:rPr lang="en-US" dirty="0"/>
-              <a:t>Committing completed code (break code into small chunks and commit each separately)</a:t>
-            </a:r>
-          </a:p>
-          <a:p>
-            <a:pPr marL="628650" lvl="1" indent="-171450">
-              <a:buFontTx/>
-              <a:buChar char="-"/>
-            </a:pPr>
-            <a:r>
-              <a:rPr lang="en-US" dirty="0"/>
+              <a:rPr lang="en-US" dirty="0" smtClean="0"/>
               <a:t>Commit in the imperative, telling what the code will do after the commit not what you’ve done.</a:t>
-            </a:r>
-          </a:p>
-          <a:p>
-            <a:pPr marL="628650" lvl="1" indent="-171450">
-              <a:buFontTx/>
-              <a:buChar char="-"/>
-            </a:pPr>
-            <a:r>
-              <a:rPr lang="en-US" dirty="0"/>
-              <a:t>Introduce a .</a:t>
-            </a:r>
-            <a:r>
-              <a:rPr lang="en-US" dirty="0" err="1"/>
-              <a:t>gitignore</a:t>
-            </a:r>
-            <a:r>
-              <a:rPr lang="en-US" dirty="0"/>
-              <a:t> file</a:t>
-            </a:r>
-          </a:p>
-          <a:p>
-            <a:pPr marL="1085850" lvl="2" indent="-171450">
-              <a:buFontTx/>
-              <a:buChar char="-"/>
-            </a:pPr>
-            <a:r>
-              <a:rPr lang="en-US" dirty="0"/>
-              <a:t>Blank lines and lines starting with # are ignored</a:t>
-            </a:r>
-          </a:p>
-          <a:p>
-            <a:pPr marL="1085850" lvl="2" indent="-171450">
-              <a:buFontTx/>
-              <a:buChar char="-"/>
-            </a:pPr>
-            <a:r>
-              <a:rPr lang="en-US" dirty="0"/>
-              <a:t>Standard glob patterns work (look at documentation for more information)</a:t>
             </a:r>
           </a:p>
         </p:txBody>
@@ -3254,7 +2682,7 @@
           <a:p>
             <a:fld id="{1EB1DABF-4E95-4EDF-8DA3-AD2A8632C0A3}" type="slidenum">
               <a:rPr lang="en-US" smtClean="0"/>
-              <a:t>10</a:t>
+              <a:t>9</a:t>
             </a:fld>
             <a:endParaRPr lang="en-US"/>
           </a:p>
@@ -3317,41 +2745,17 @@
           <a:bodyPr/>
           <a:lstStyle/>
           <a:p>
-            <a:pPr marL="171450" indent="-171450">
+            <a:pPr marL="171450" lvl="0" indent="-171450">
               <a:buFontTx/>
               <a:buChar char="-"/>
             </a:pPr>
             <a:r>
-              <a:rPr lang="en-US" dirty="0"/>
-              <a:t>Make a new directory.</a:t>
-            </a:r>
-          </a:p>
-          <a:p>
-            <a:pPr marL="171450" indent="-171450">
-              <a:buFontTx/>
-              <a:buChar char="-"/>
-            </a:pPr>
-            <a:r>
-              <a:rPr lang="en-US" dirty="0"/>
-              <a:t>Write a short </a:t>
-            </a:r>
-            <a:r>
-              <a:rPr lang="en-US" dirty="0" err="1"/>
-              <a:t>matlab</a:t>
-            </a:r>
-            <a:r>
-              <a:rPr lang="en-US" dirty="0"/>
-              <a:t> script.  Save it.</a:t>
-            </a:r>
-          </a:p>
-          <a:p>
-            <a:pPr marL="171450" indent="-171450">
-              <a:buFontTx/>
-              <a:buChar char="-"/>
-            </a:pPr>
-            <a:r>
-              <a:rPr lang="en-US" dirty="0"/>
-              <a:t>Initialize a git repository.</a:t>
+              <a:rPr lang="en-US" dirty="0" smtClean="0"/>
+              <a:t>Introduce </a:t>
+            </a:r>
+            <a:r>
+              <a:rPr lang="en-US" dirty="0"/>
+              <a:t>git status</a:t>
             </a:r>
           </a:p>
           <a:p>
@@ -3361,7 +2765,7 @@
             </a:pPr>
             <a:r>
               <a:rPr lang="en-US" dirty="0"/>
-              <a:t>Mention not good practice to nest repos. </a:t>
+              <a:t>Run git status right after commit.</a:t>
             </a:r>
           </a:p>
           <a:p>
@@ -3371,7 +2775,47 @@
             </a:pPr>
             <a:r>
               <a:rPr lang="en-US" dirty="0"/>
-              <a:t>Mention configuring username and email.</a:t>
+              <a:t>Make changes to the script.</a:t>
+            </a:r>
+          </a:p>
+          <a:p>
+            <a:pPr marL="628650" lvl="1" indent="-171450">
+              <a:buFontTx/>
+              <a:buChar char="-"/>
+            </a:pPr>
+            <a:r>
+              <a:rPr lang="en-US" dirty="0"/>
+              <a:t>Run git status again.</a:t>
+            </a:r>
+          </a:p>
+          <a:p>
+            <a:pPr marL="628650" lvl="1" indent="-171450">
+              <a:buFontTx/>
+              <a:buChar char="-"/>
+            </a:pPr>
+            <a:r>
+              <a:rPr lang="en-US" dirty="0"/>
+              <a:t>Add the script to staged area.</a:t>
+            </a:r>
+          </a:p>
+          <a:p>
+            <a:pPr marL="628650" lvl="1" indent="-171450">
+              <a:buFontTx/>
+              <a:buChar char="-"/>
+            </a:pPr>
+            <a:r>
+              <a:rPr lang="en-US" dirty="0"/>
+              <a:t>Run git status again.</a:t>
+            </a:r>
+          </a:p>
+          <a:p>
+            <a:pPr marL="628650" lvl="1" indent="-171450">
+              <a:buFontTx/>
+              <a:buChar char="-"/>
+            </a:pPr>
+            <a:r>
+              <a:rPr lang="en-US" dirty="0"/>
+              <a:t>Commit changes.</a:t>
             </a:r>
           </a:p>
           <a:p>
@@ -3381,196 +2825,13 @@
             </a:pPr>
             <a:r>
               <a:rPr lang="en-US" dirty="0"/>
-              <a:t>Add the script to the repository. </a:t>
-            </a:r>
-          </a:p>
-          <a:p>
-            <a:pPr marL="628650" lvl="1" indent="-171450">
-              <a:buFontTx/>
-              <a:buChar char="-"/>
-            </a:pPr>
-            <a:r>
-              <a:rPr lang="en-US" dirty="0"/>
-              <a:t>Talk about tracked and untracked files.</a:t>
-            </a:r>
-          </a:p>
-          <a:p>
-            <a:pPr marL="628650" lvl="1" indent="-171450">
-              <a:buFontTx/>
-              <a:buChar char="-"/>
-            </a:pPr>
-            <a:r>
-              <a:rPr lang="en-US" dirty="0"/>
-              <a:t>Add a fake data file to the directory, but don’t track it.</a:t>
-            </a:r>
-          </a:p>
-          <a:p>
-            <a:pPr marL="171450" lvl="0" indent="-171450">
-              <a:buFontTx/>
-              <a:buChar char="-"/>
-            </a:pPr>
-            <a:r>
-              <a:rPr lang="en-US" dirty="0"/>
-              <a:t>Commit the addition/initial commit.</a:t>
-            </a:r>
-          </a:p>
-          <a:p>
-            <a:pPr marL="628650" lvl="1" indent="-171450">
-              <a:buFontTx/>
-              <a:buChar char="-"/>
-            </a:pPr>
-            <a:r>
-              <a:rPr lang="en-US" dirty="0"/>
-              <a:t>Talk about the –m option</a:t>
-            </a:r>
-          </a:p>
-          <a:p>
-            <a:pPr marL="171450" lvl="0" indent="-171450">
-              <a:buFontTx/>
-              <a:buChar char="-"/>
-            </a:pPr>
-            <a:r>
-              <a:rPr lang="en-US" dirty="0"/>
-              <a:t>Introduce git status</a:t>
-            </a:r>
-          </a:p>
-          <a:p>
-            <a:pPr marL="628650" lvl="1" indent="-171450">
-              <a:buFontTx/>
-              <a:buChar char="-"/>
-            </a:pPr>
-            <a:r>
-              <a:rPr lang="en-US" dirty="0"/>
-              <a:t>Run git status right after commit.</a:t>
-            </a:r>
-          </a:p>
-          <a:p>
-            <a:pPr marL="628650" lvl="1" indent="-171450">
-              <a:buFontTx/>
-              <a:buChar char="-"/>
-            </a:pPr>
-            <a:r>
-              <a:rPr lang="en-US" dirty="0"/>
-              <a:t>Make changes to the script.</a:t>
-            </a:r>
-          </a:p>
-          <a:p>
-            <a:pPr marL="628650" lvl="1" indent="-171450">
-              <a:buFontTx/>
-              <a:buChar char="-"/>
-            </a:pPr>
-            <a:r>
-              <a:rPr lang="en-US" dirty="0"/>
-              <a:t>Run git status again.</a:t>
-            </a:r>
-          </a:p>
-          <a:p>
-            <a:pPr marL="628650" lvl="1" indent="-171450">
-              <a:buFontTx/>
-              <a:buChar char="-"/>
-            </a:pPr>
-            <a:r>
-              <a:rPr lang="en-US" dirty="0"/>
-              <a:t>Add the script to staged area.</a:t>
-            </a:r>
-          </a:p>
-          <a:p>
-            <a:pPr marL="628650" lvl="1" indent="-171450">
-              <a:buFontTx/>
-              <a:buChar char="-"/>
-            </a:pPr>
-            <a:r>
-              <a:rPr lang="en-US" dirty="0"/>
-              <a:t>Run git status again.</a:t>
-            </a:r>
-          </a:p>
-          <a:p>
-            <a:pPr marL="628650" lvl="1" indent="-171450">
-              <a:buFontTx/>
-              <a:buChar char="-"/>
-            </a:pPr>
-            <a:r>
-              <a:rPr lang="en-US" dirty="0"/>
-              <a:t>Commit changes.</a:t>
-            </a:r>
-          </a:p>
-          <a:p>
-            <a:pPr marL="171450" lvl="0" indent="-171450">
-              <a:buFontTx/>
-              <a:buChar char="-"/>
-            </a:pPr>
-            <a:r>
-              <a:rPr lang="en-US" dirty="0"/>
-              <a:t>Talk about the lifecycle of the status of files.</a:t>
-            </a:r>
-          </a:p>
-          <a:p>
-            <a:pPr marL="171450" lvl="0" indent="-171450">
-              <a:buFontTx/>
-              <a:buChar char="-"/>
-            </a:pPr>
-            <a:r>
-              <a:rPr lang="en-US" dirty="0"/>
-              <a:t>Talk about good committing practices.</a:t>
-            </a:r>
-          </a:p>
-          <a:p>
-            <a:pPr marL="628650" lvl="1" indent="-171450">
-              <a:buFontTx/>
-              <a:buChar char="-"/>
-            </a:pPr>
-            <a:r>
-              <a:rPr lang="en-US" dirty="0"/>
-              <a:t>Committing completed code (break code into small chunks and commit each separately)</a:t>
-            </a:r>
-          </a:p>
-          <a:p>
-            <a:pPr marL="628650" lvl="1" indent="-171450">
-              <a:buFontTx/>
-              <a:buChar char="-"/>
-            </a:pPr>
-            <a:r>
-              <a:rPr lang="en-US" dirty="0"/>
-              <a:t>Commit in the imperative, telling what the code will do after the commit not what you’ve done.</a:t>
-            </a:r>
-          </a:p>
-          <a:p>
-            <a:pPr marL="628650" lvl="1" indent="-171450">
-              <a:buFontTx/>
-              <a:buChar char="-"/>
-            </a:pPr>
-            <a:r>
-              <a:rPr lang="en-US" dirty="0"/>
-              <a:t>Introduce a .</a:t>
-            </a:r>
-            <a:r>
-              <a:rPr lang="en-US" dirty="0" err="1"/>
-              <a:t>gitignore</a:t>
-            </a:r>
-            <a:r>
-              <a:rPr lang="en-US" dirty="0"/>
-              <a:t> file</a:t>
-            </a:r>
-          </a:p>
-          <a:p>
-            <a:pPr marL="1085850" lvl="2" indent="-171450">
-              <a:buFontTx/>
-              <a:buChar char="-"/>
-            </a:pPr>
-            <a:r>
-              <a:rPr lang="en-US" dirty="0"/>
-              <a:t>Blank lines and lines starting with # are ignored</a:t>
-            </a:r>
-          </a:p>
-          <a:p>
-            <a:pPr marL="1085850" lvl="2" indent="-171450">
-              <a:buFontTx/>
-              <a:buChar char="-"/>
-            </a:pPr>
-            <a:r>
-              <a:rPr lang="en-US" dirty="0"/>
-              <a:t>Standard glob patterns work (look at documentation for more information)</a:t>
-            </a:r>
+              <a:t>Talk about the lifecycle of the status of files</a:t>
+            </a:r>
+            <a:r>
+              <a:rPr lang="en-US" dirty="0" smtClean="0"/>
+              <a:t>.</a:t>
+            </a:r>
+            <a:endParaRPr lang="en-US" dirty="0"/>
           </a:p>
         </p:txBody>
       </p:sp>
@@ -3591,7 +2852,7 @@
           <a:p>
             <a:fld id="{1EB1DABF-4E95-4EDF-8DA3-AD2A8632C0A3}" type="slidenum">
               <a:rPr lang="en-US" smtClean="0"/>
-              <a:t>11</a:t>
+              <a:t>10</a:t>
             </a:fld>
             <a:endParaRPr lang="en-US"/>
           </a:p>
@@ -3654,260 +2915,23 @@
           <a:bodyPr/>
           <a:lstStyle/>
           <a:p>
-            <a:pPr marL="171450" indent="-171450">
-              <a:buFontTx/>
-              <a:buChar char="-"/>
-            </a:pPr>
-            <a:r>
-              <a:rPr lang="en-US" dirty="0"/>
-              <a:t>Make a new directory.</a:t>
-            </a:r>
-          </a:p>
-          <a:p>
-            <a:pPr marL="171450" indent="-171450">
-              <a:buFontTx/>
-              <a:buChar char="-"/>
-            </a:pPr>
-            <a:r>
-              <a:rPr lang="en-US" dirty="0"/>
-              <a:t>Write a short </a:t>
-            </a:r>
-            <a:r>
-              <a:rPr lang="en-US" dirty="0" err="1"/>
-              <a:t>matlab</a:t>
-            </a:r>
-            <a:r>
-              <a:rPr lang="en-US" dirty="0"/>
-              <a:t> script.  Save it.</a:t>
-            </a:r>
-          </a:p>
-          <a:p>
-            <a:pPr marL="171450" indent="-171450">
-              <a:buFontTx/>
-              <a:buChar char="-"/>
-            </a:pPr>
-            <a:r>
-              <a:rPr lang="en-US" dirty="0"/>
-              <a:t>Initialize a git repository.</a:t>
-            </a:r>
-          </a:p>
-          <a:p>
-            <a:pPr marL="628650" lvl="1" indent="-171450">
-              <a:buFontTx/>
-              <a:buChar char="-"/>
-            </a:pPr>
-            <a:r>
-              <a:rPr lang="en-US" dirty="0"/>
-              <a:t>Mention not good practice to nest repos. </a:t>
-            </a:r>
-          </a:p>
-          <a:p>
-            <a:pPr marL="628650" lvl="1" indent="-171450">
-              <a:buFontTx/>
-              <a:buChar char="-"/>
-            </a:pPr>
-            <a:r>
-              <a:rPr lang="en-US" dirty="0"/>
-              <a:t>Mention configuring username and email.</a:t>
-            </a:r>
-          </a:p>
-          <a:p>
             <a:pPr marL="171450" lvl="0" indent="-171450">
               <a:buFontTx/>
               <a:buChar char="-"/>
             </a:pPr>
             <a:r>
-              <a:rPr lang="en-US" dirty="0"/>
-              <a:t>Add the script to the repository. </a:t>
-            </a:r>
-          </a:p>
-          <a:p>
-            <a:pPr marL="628650" lvl="1" indent="-171450">
-              <a:buFontTx/>
-              <a:buChar char="-"/>
-            </a:pPr>
-            <a:r>
-              <a:rPr lang="en-US" dirty="0"/>
-              <a:t>Talk about tracked and untracked files.</a:t>
-            </a:r>
-          </a:p>
-          <a:p>
-            <a:pPr marL="628650" lvl="1" indent="-171450">
-              <a:buFontTx/>
-              <a:buChar char="-"/>
-            </a:pPr>
-            <a:r>
-              <a:rPr lang="en-US" dirty="0"/>
-              <a:t>Add a fake data file to the directory, but don’t track it.</a:t>
-            </a:r>
-          </a:p>
-          <a:p>
-            <a:pPr marL="171450" lvl="0" indent="-171450">
-              <a:buFontTx/>
-              <a:buChar char="-"/>
-            </a:pPr>
-            <a:r>
-              <a:rPr lang="en-US" dirty="0"/>
-              <a:t>Commit the addition/initial commit.</a:t>
-            </a:r>
-          </a:p>
-          <a:p>
-            <a:pPr marL="628650" lvl="1" indent="-171450">
-              <a:buFontTx/>
-              <a:buChar char="-"/>
-            </a:pPr>
-            <a:r>
-              <a:rPr lang="en-US" dirty="0"/>
-              <a:t>Talk about the –m option</a:t>
-            </a:r>
-          </a:p>
-          <a:p>
-            <a:pPr marL="171450" lvl="0" indent="-171450">
-              <a:buFontTx/>
-              <a:buChar char="-"/>
-            </a:pPr>
-            <a:r>
-              <a:rPr lang="en-US" dirty="0"/>
-              <a:t>Introduce git status</a:t>
-            </a:r>
-          </a:p>
-          <a:p>
-            <a:pPr marL="628650" lvl="1" indent="-171450">
-              <a:buFontTx/>
-              <a:buChar char="-"/>
-            </a:pPr>
-            <a:r>
-              <a:rPr lang="en-US" dirty="0"/>
-              <a:t>Run git status right after commit.</a:t>
-            </a:r>
-          </a:p>
-          <a:p>
-            <a:pPr marL="628650" lvl="1" indent="-171450">
-              <a:buFontTx/>
-              <a:buChar char="-"/>
-            </a:pPr>
-            <a:r>
-              <a:rPr lang="en-US" dirty="0"/>
-              <a:t>Make changes to the script.</a:t>
-            </a:r>
-          </a:p>
-          <a:p>
-            <a:pPr marL="628650" lvl="1" indent="-171450">
-              <a:buFontTx/>
-              <a:buChar char="-"/>
-            </a:pPr>
-            <a:r>
-              <a:rPr lang="en-US" dirty="0"/>
-              <a:t>Run git status again.</a:t>
-            </a:r>
-          </a:p>
-          <a:p>
-            <a:pPr marL="628650" lvl="1" indent="-171450">
-              <a:buFontTx/>
-              <a:buChar char="-"/>
-            </a:pPr>
-            <a:r>
-              <a:rPr lang="en-US" dirty="0"/>
-              <a:t>Add the script to staged area.</a:t>
-            </a:r>
-          </a:p>
-          <a:p>
-            <a:pPr marL="628650" lvl="1" indent="-171450">
-              <a:buFontTx/>
-              <a:buChar char="-"/>
-            </a:pPr>
-            <a:r>
-              <a:rPr lang="en-US" dirty="0"/>
-              <a:t>Run git status again.</a:t>
-            </a:r>
-          </a:p>
-          <a:p>
-            <a:pPr marL="628650" lvl="1" indent="-171450">
-              <a:buFontTx/>
-              <a:buChar char="-"/>
-            </a:pPr>
-            <a:r>
-              <a:rPr lang="en-US" dirty="0"/>
-              <a:t>Commit changes.</a:t>
-            </a:r>
-          </a:p>
-          <a:p>
-            <a:pPr marL="171450" lvl="0" indent="-171450">
-              <a:buFontTx/>
-              <a:buChar char="-"/>
-            </a:pPr>
-            <a:r>
-              <a:rPr lang="en-US" dirty="0"/>
-              <a:t>Talk about the lifecycle of the status of files.</a:t>
-            </a:r>
-          </a:p>
-          <a:p>
-            <a:pPr marL="171450" lvl="0" indent="-171450">
-              <a:buFontTx/>
-              <a:buChar char="-"/>
-            </a:pPr>
-            <a:r>
-              <a:rPr lang="en-US" dirty="0"/>
-              <a:t>Talk about good committing practices.</a:t>
-            </a:r>
-          </a:p>
-          <a:p>
-            <a:pPr marL="628650" lvl="1" indent="-171450">
-              <a:buFontTx/>
-              <a:buChar char="-"/>
-            </a:pPr>
-            <a:r>
-              <a:rPr lang="en-US" dirty="0"/>
-              <a:t>Committing completed code (break code into small chunks and commit each separately)</a:t>
-            </a:r>
-          </a:p>
-          <a:p>
-            <a:pPr marL="628650" lvl="1" indent="-171450">
-              <a:buFontTx/>
-              <a:buChar char="-"/>
-            </a:pPr>
-            <a:r>
-              <a:rPr lang="en-US" dirty="0"/>
-              <a:t>Commit in the imperative, telling what the code will do after the commit not what you’ve done.</a:t>
-            </a:r>
-          </a:p>
-          <a:p>
-            <a:pPr marL="628650" lvl="1" indent="-171450">
-              <a:buFontTx/>
-              <a:buChar char="-"/>
-            </a:pPr>
-            <a:r>
-              <a:rPr lang="en-US" dirty="0"/>
-              <a:t>Introduce a .</a:t>
-            </a:r>
-            <a:r>
-              <a:rPr lang="en-US" dirty="0" err="1"/>
-              <a:t>gitignore</a:t>
-            </a:r>
-            <a:r>
-              <a:rPr lang="en-US" dirty="0"/>
-              <a:t> file</a:t>
-            </a:r>
-          </a:p>
-          <a:p>
-            <a:pPr marL="1085850" lvl="2" indent="-171450">
-              <a:buFontTx/>
-              <a:buChar char="-"/>
-            </a:pPr>
-            <a:r>
-              <a:rPr lang="en-US" dirty="0"/>
-              <a:t>Blank lines and lines starting with # are ignored</a:t>
-            </a:r>
-          </a:p>
-          <a:p>
-            <a:pPr marL="1085850" lvl="2" indent="-171450">
-              <a:buFontTx/>
-              <a:buChar char="-"/>
-            </a:pPr>
-            <a:r>
-              <a:rPr lang="en-US" dirty="0"/>
-              <a:t>Standard glob patterns work (look at documentation for more information)</a:t>
-            </a:r>
+              <a:rPr lang="en-US" dirty="0" smtClean="0"/>
+              <a:t>Talk </a:t>
+            </a:r>
+            <a:r>
+              <a:rPr lang="en-US" dirty="0"/>
+              <a:t>about the lifecycle of the status of files</a:t>
+            </a:r>
+            <a:r>
+              <a:rPr lang="en-US" dirty="0" smtClean="0"/>
+              <a:t>.</a:t>
+            </a:r>
+            <a:endParaRPr lang="en-US" dirty="0"/>
           </a:p>
         </p:txBody>
       </p:sp>
@@ -3928,7 +2952,7 @@
           <a:p>
             <a:fld id="{1EB1DABF-4E95-4EDF-8DA3-AD2A8632C0A3}" type="slidenum">
               <a:rPr lang="en-US" smtClean="0"/>
-              <a:t>12</a:t>
+              <a:t>11</a:t>
             </a:fld>
             <a:endParaRPr lang="en-US"/>
           </a:p>
@@ -3991,51 +3015,17 @@
           <a:bodyPr/>
           <a:lstStyle/>
           <a:p>
-            <a:pPr marL="171450" indent="-171450">
-              <a:buFontTx/>
-              <a:buChar char="-"/>
-            </a:pPr>
-            <a:r>
-              <a:rPr lang="en-US" dirty="0"/>
-              <a:t>Make a new directory.</a:t>
-            </a:r>
-          </a:p>
-          <a:p>
-            <a:pPr marL="171450" indent="-171450">
-              <a:buFontTx/>
-              <a:buChar char="-"/>
-            </a:pPr>
-            <a:r>
-              <a:rPr lang="en-US" dirty="0"/>
-              <a:t>Write a short </a:t>
-            </a:r>
-            <a:r>
-              <a:rPr lang="en-US" dirty="0" err="1"/>
-              <a:t>matlab</a:t>
-            </a:r>
-            <a:r>
-              <a:rPr lang="en-US" dirty="0"/>
-              <a:t> script.  Save it.</a:t>
-            </a:r>
-          </a:p>
-          <a:p>
-            <a:pPr marL="171450" indent="-171450">
-              <a:buFontTx/>
-              <a:buChar char="-"/>
-            </a:pPr>
-            <a:r>
-              <a:rPr lang="en-US" dirty="0"/>
-              <a:t>Initialize a git repository.</a:t>
-            </a:r>
-          </a:p>
-          <a:p>
             <a:pPr marL="628650" lvl="1" indent="-171450">
               <a:buFontTx/>
               <a:buChar char="-"/>
             </a:pPr>
             <a:r>
-              <a:rPr lang="en-US" dirty="0"/>
-              <a:t>Mention not good practice to nest repos. </a:t>
+              <a:rPr lang="en-US" dirty="0" smtClean="0"/>
+              <a:t>Run </a:t>
+            </a:r>
+            <a:r>
+              <a:rPr lang="en-US" dirty="0"/>
+              <a:t>git status right after commit.</a:t>
             </a:r>
           </a:p>
           <a:p>
@@ -4045,17 +3035,7 @@
             </a:pPr>
             <a:r>
               <a:rPr lang="en-US" dirty="0"/>
-              <a:t>Mention configuring username and email.</a:t>
-            </a:r>
-          </a:p>
-          <a:p>
-            <a:pPr marL="171450" lvl="0" indent="-171450">
-              <a:buFontTx/>
-              <a:buChar char="-"/>
-            </a:pPr>
-            <a:r>
-              <a:rPr lang="en-US" dirty="0"/>
-              <a:t>Add the script to the repository. </a:t>
+              <a:t>Make changes to the script.</a:t>
             </a:r>
           </a:p>
           <a:p>
@@ -4065,7 +3045,7 @@
             </a:pPr>
             <a:r>
               <a:rPr lang="en-US" dirty="0"/>
-              <a:t>Talk about tracked and untracked files.</a:t>
+              <a:t>Run git status again.</a:t>
             </a:r>
           </a:p>
           <a:p>
@@ -4075,17 +3055,7 @@
             </a:pPr>
             <a:r>
               <a:rPr lang="en-US" dirty="0"/>
-              <a:t>Add a fake data file to the directory, but don’t track it.</a:t>
-            </a:r>
-          </a:p>
-          <a:p>
-            <a:pPr marL="171450" lvl="0" indent="-171450">
-              <a:buFontTx/>
-              <a:buChar char="-"/>
-            </a:pPr>
-            <a:r>
-              <a:rPr lang="en-US" dirty="0"/>
-              <a:t>Commit the addition/initial commit.</a:t>
+              <a:t>Add the script to staged area.</a:t>
             </a:r>
           </a:p>
           <a:p>
@@ -4095,17 +3065,7 @@
             </a:pPr>
             <a:r>
               <a:rPr lang="en-US" dirty="0"/>
-              <a:t>Talk about the –m option</a:t>
-            </a:r>
-          </a:p>
-          <a:p>
-            <a:pPr marL="171450" lvl="0" indent="-171450">
-              <a:buFontTx/>
-              <a:buChar char="-"/>
-            </a:pPr>
-            <a:r>
-              <a:rPr lang="en-US" dirty="0"/>
-              <a:t>Introduce git status</a:t>
+              <a:t>Run git status again.</a:t>
             </a:r>
           </a:p>
           <a:p>
@@ -4115,136 +3075,13 @@
             </a:pPr>
             <a:r>
               <a:rPr lang="en-US" dirty="0"/>
-              <a:t>Run git status right after commit.</a:t>
-            </a:r>
-          </a:p>
-          <a:p>
-            <a:pPr marL="628650" lvl="1" indent="-171450">
-              <a:buFontTx/>
-              <a:buChar char="-"/>
-            </a:pPr>
-            <a:r>
-              <a:rPr lang="en-US" dirty="0"/>
-              <a:t>Make changes to the script.</a:t>
-            </a:r>
-          </a:p>
-          <a:p>
-            <a:pPr marL="628650" lvl="1" indent="-171450">
-              <a:buFontTx/>
-              <a:buChar char="-"/>
-            </a:pPr>
-            <a:r>
-              <a:rPr lang="en-US" dirty="0"/>
-              <a:t>Run git status again.</a:t>
-            </a:r>
-          </a:p>
-          <a:p>
-            <a:pPr marL="628650" lvl="1" indent="-171450">
-              <a:buFontTx/>
-              <a:buChar char="-"/>
-            </a:pPr>
-            <a:r>
-              <a:rPr lang="en-US" dirty="0"/>
-              <a:t>Add the script to staged area.</a:t>
-            </a:r>
-          </a:p>
-          <a:p>
-            <a:pPr marL="628650" lvl="1" indent="-171450">
-              <a:buFontTx/>
-              <a:buChar char="-"/>
-            </a:pPr>
-            <a:r>
-              <a:rPr lang="en-US" dirty="0"/>
-              <a:t>Run git status again.</a:t>
-            </a:r>
-          </a:p>
-          <a:p>
-            <a:pPr marL="628650" lvl="1" indent="-171450">
-              <a:buFontTx/>
-              <a:buChar char="-"/>
-            </a:pPr>
-            <a:r>
-              <a:rPr lang="en-US" dirty="0"/>
-              <a:t>Commit changes.</a:t>
-            </a:r>
-          </a:p>
-          <a:p>
-            <a:pPr marL="171450" lvl="0" indent="-171450">
-              <a:buFontTx/>
-              <a:buChar char="-"/>
-            </a:pPr>
-            <a:r>
-              <a:rPr lang="en-US" dirty="0"/>
-              <a:t>Talk about the lifecycle of the status of files.</a:t>
-            </a:r>
-          </a:p>
-          <a:p>
-            <a:pPr marL="171450" lvl="0" indent="-171450">
-              <a:buFontTx/>
-              <a:buChar char="-"/>
-            </a:pPr>
-            <a:r>
-              <a:rPr lang="en-US" dirty="0"/>
-              <a:t>Talk about good committing practices.</a:t>
-            </a:r>
-          </a:p>
-          <a:p>
-            <a:pPr marL="628650" lvl="1" indent="-171450">
-              <a:buFontTx/>
-              <a:buChar char="-"/>
-            </a:pPr>
-            <a:r>
-              <a:rPr lang="en-US" dirty="0"/>
-              <a:t>Committing completed code (break code into small chunks and commit each separately)</a:t>
-            </a:r>
-          </a:p>
-          <a:p>
-            <a:pPr marL="628650" lvl="1" indent="-171450">
-              <a:buFontTx/>
-              <a:buChar char="-"/>
-            </a:pPr>
-            <a:r>
-              <a:rPr lang="en-US" dirty="0"/>
-              <a:t>Commit in the imperative, telling what the code will do after the commit not what you’ve done.</a:t>
-            </a:r>
-          </a:p>
-          <a:p>
-            <a:pPr marL="628650" lvl="1" indent="-171450">
-              <a:buFontTx/>
-              <a:buChar char="-"/>
-            </a:pPr>
-            <a:r>
-              <a:rPr lang="en-US" dirty="0"/>
-              <a:t>Introduce a .</a:t>
-            </a:r>
-            <a:r>
-              <a:rPr lang="en-US" dirty="0" err="1"/>
-              <a:t>gitignore</a:t>
-            </a:r>
-            <a:r>
-              <a:rPr lang="en-US" dirty="0"/>
-              <a:t> file</a:t>
-            </a:r>
-          </a:p>
-          <a:p>
-            <a:pPr marL="1085850" lvl="2" indent="-171450">
-              <a:buFontTx/>
-              <a:buChar char="-"/>
-            </a:pPr>
-            <a:r>
-              <a:rPr lang="en-US" dirty="0"/>
-              <a:t>Blank lines and lines starting with # are ignored</a:t>
-            </a:r>
-          </a:p>
-          <a:p>
-            <a:pPr marL="1085850" lvl="2" indent="-171450">
-              <a:buFontTx/>
-              <a:buChar char="-"/>
-            </a:pPr>
-            <a:r>
-              <a:rPr lang="en-US" dirty="0"/>
-              <a:t>Standard glob patterns work (look at documentation for more information)</a:t>
-            </a:r>
+              <a:t>Commit changes</a:t>
+            </a:r>
+            <a:r>
+              <a:rPr lang="en-US" dirty="0" smtClean="0"/>
+              <a:t>.</a:t>
+            </a:r>
+            <a:endParaRPr lang="en-US" dirty="0"/>
           </a:p>
         </p:txBody>
       </p:sp>
@@ -4265,7 +3102,7 @@
           <a:p>
             <a:fld id="{1EB1DABF-4E95-4EDF-8DA3-AD2A8632C0A3}" type="slidenum">
               <a:rPr lang="en-US" smtClean="0"/>
-              <a:t>13</a:t>
+              <a:t>12</a:t>
             </a:fld>
             <a:endParaRPr lang="en-US"/>
           </a:p>
@@ -4328,41 +3165,17 @@
           <a:bodyPr/>
           <a:lstStyle/>
           <a:p>
-            <a:pPr marL="171450" indent="-171450">
+            <a:pPr marL="171450" lvl="0" indent="-171450">
               <a:buFontTx/>
               <a:buChar char="-"/>
             </a:pPr>
             <a:r>
-              <a:rPr lang="en-US" dirty="0"/>
-              <a:t>Make a new directory.</a:t>
-            </a:r>
-          </a:p>
-          <a:p>
-            <a:pPr marL="171450" indent="-171450">
-              <a:buFontTx/>
-              <a:buChar char="-"/>
-            </a:pPr>
-            <a:r>
-              <a:rPr lang="en-US" dirty="0"/>
-              <a:t>Write a short </a:t>
-            </a:r>
-            <a:r>
-              <a:rPr lang="en-US" dirty="0" err="1"/>
-              <a:t>matlab</a:t>
-            </a:r>
-            <a:r>
-              <a:rPr lang="en-US" dirty="0"/>
-              <a:t> script.  Save it.</a:t>
-            </a:r>
-          </a:p>
-          <a:p>
-            <a:pPr marL="171450" indent="-171450">
-              <a:buFontTx/>
-              <a:buChar char="-"/>
-            </a:pPr>
-            <a:r>
-              <a:rPr lang="en-US" dirty="0"/>
-              <a:t>Initialize a git repository.</a:t>
+              <a:rPr lang="en-US" dirty="0" smtClean="0"/>
+              <a:t>Talk </a:t>
+            </a:r>
+            <a:r>
+              <a:rPr lang="en-US" dirty="0"/>
+              <a:t>about good committing practices.</a:t>
             </a:r>
           </a:p>
           <a:p>
@@ -4372,7 +3185,7 @@
             </a:pPr>
             <a:r>
               <a:rPr lang="en-US" dirty="0"/>
-              <a:t>Mention not good practice to nest repos. </a:t>
+              <a:t>Committing completed code (break code into small chunks and commit each separately)</a:t>
             </a:r>
           </a:p>
           <a:p>
@@ -4382,206 +3195,13 @@
             </a:pPr>
             <a:r>
               <a:rPr lang="en-US" dirty="0"/>
-              <a:t>Mention configuring username and email.</a:t>
-            </a:r>
-          </a:p>
-          <a:p>
-            <a:pPr marL="171450" lvl="0" indent="-171450">
-              <a:buFontTx/>
-              <a:buChar char="-"/>
-            </a:pPr>
-            <a:r>
-              <a:rPr lang="en-US" dirty="0"/>
-              <a:t>Add the script to the repository. </a:t>
-            </a:r>
-          </a:p>
-          <a:p>
-            <a:pPr marL="628650" lvl="1" indent="-171450">
-              <a:buFontTx/>
-              <a:buChar char="-"/>
-            </a:pPr>
-            <a:r>
-              <a:rPr lang="en-US" dirty="0"/>
-              <a:t>Talk about tracked and untracked files.</a:t>
-            </a:r>
-          </a:p>
-          <a:p>
-            <a:pPr marL="628650" lvl="1" indent="-171450">
-              <a:buFontTx/>
-              <a:buChar char="-"/>
-            </a:pPr>
-            <a:r>
-              <a:rPr lang="en-US" dirty="0"/>
-              <a:t>Add a fake data file to the directory, but don’t track it.</a:t>
-            </a:r>
-          </a:p>
-          <a:p>
-            <a:pPr marL="171450" lvl="0" indent="-171450">
-              <a:buFontTx/>
-              <a:buChar char="-"/>
-            </a:pPr>
-            <a:r>
-              <a:rPr lang="en-US" dirty="0"/>
-              <a:t>Commit the addition/initial commit.</a:t>
-            </a:r>
-          </a:p>
-          <a:p>
-            <a:pPr marL="628650" lvl="1" indent="-171450">
-              <a:buFontTx/>
-              <a:buChar char="-"/>
-            </a:pPr>
-            <a:r>
-              <a:rPr lang="en-US" dirty="0"/>
-              <a:t>Talk about the –m option</a:t>
-            </a:r>
-          </a:p>
-          <a:p>
-            <a:pPr marL="171450" lvl="0" indent="-171450">
-              <a:buFontTx/>
-              <a:buChar char="-"/>
-            </a:pPr>
-            <a:r>
-              <a:rPr lang="en-US" dirty="0"/>
-              <a:t>Introduce git status</a:t>
-            </a:r>
-          </a:p>
-          <a:p>
-            <a:pPr marL="628650" lvl="1" indent="-171450">
-              <a:buFontTx/>
-              <a:buChar char="-"/>
-            </a:pPr>
-            <a:r>
-              <a:rPr lang="en-US" dirty="0"/>
-              <a:t>Run git status right after commit.</a:t>
-            </a:r>
-          </a:p>
-          <a:p>
-            <a:pPr marL="628650" lvl="1" indent="-171450">
-              <a:buFontTx/>
-              <a:buChar char="-"/>
-            </a:pPr>
-            <a:r>
-              <a:rPr lang="en-US" dirty="0"/>
-              <a:t>Make changes to the script.</a:t>
-            </a:r>
-          </a:p>
-          <a:p>
-            <a:pPr marL="628650" lvl="1" indent="-171450">
-              <a:buFontTx/>
-              <a:buChar char="-"/>
-            </a:pPr>
-            <a:r>
-              <a:rPr lang="en-US" dirty="0"/>
-              <a:t>Run git status again.</a:t>
-            </a:r>
-          </a:p>
-          <a:p>
-            <a:pPr marL="628650" lvl="1" indent="-171450">
-              <a:buFontTx/>
-              <a:buChar char="-"/>
-            </a:pPr>
-            <a:r>
-              <a:rPr lang="en-US" dirty="0"/>
-              <a:t>Add the script to staged area.</a:t>
-            </a:r>
-          </a:p>
-          <a:p>
-            <a:pPr marL="628650" lvl="1" indent="-171450">
-              <a:buFontTx/>
-              <a:buChar char="-"/>
-            </a:pPr>
-            <a:r>
-              <a:rPr lang="en-US" dirty="0"/>
-              <a:t>Run git status again.</a:t>
-            </a:r>
-          </a:p>
-          <a:p>
-            <a:pPr marL="628650" lvl="1" indent="-171450">
-              <a:buFontTx/>
-              <a:buChar char="-"/>
-            </a:pPr>
-            <a:r>
-              <a:rPr lang="en-US" dirty="0"/>
-              <a:t>Commit changes.</a:t>
-            </a:r>
-          </a:p>
-          <a:p>
-            <a:pPr marL="171450" lvl="0" indent="-171450">
-              <a:buFontTx/>
-              <a:buChar char="-"/>
-            </a:pPr>
-            <a:r>
-              <a:rPr lang="en-US" dirty="0"/>
-              <a:t>Talk about the lifecycle of the status of files.</a:t>
-            </a:r>
-          </a:p>
-          <a:p>
-            <a:pPr marL="171450" lvl="0" indent="-171450">
-              <a:buFontTx/>
-              <a:buChar char="-"/>
-            </a:pPr>
-            <a:r>
-              <a:rPr lang="en-US" dirty="0"/>
-              <a:t>Talk about good committing practices.</a:t>
-            </a:r>
-          </a:p>
-          <a:p>
-            <a:pPr marL="628650" lvl="1" indent="-171450">
-              <a:buFontTx/>
-              <a:buChar char="-"/>
-            </a:pPr>
-            <a:r>
-              <a:rPr lang="en-US" dirty="0"/>
-              <a:t>Committing completed code (break code into small chunks and commit each separately)</a:t>
-            </a:r>
-          </a:p>
-          <a:p>
-            <a:pPr marL="628650" lvl="1" indent="-171450">
-              <a:buFontTx/>
-              <a:buChar char="-"/>
-            </a:pPr>
-            <a:r>
-              <a:rPr lang="en-US" dirty="0"/>
-              <a:t>Commit in the imperative, telling what the code will do after the commit not what you’ve done.</a:t>
-            </a:r>
-          </a:p>
-          <a:p>
-            <a:pPr marL="628650" lvl="1" indent="-171450">
-              <a:buFontTx/>
-              <a:buChar char="-"/>
-            </a:pPr>
-            <a:r>
-              <a:rPr lang="en-US" dirty="0"/>
-              <a:t>Introduce a .</a:t>
-            </a:r>
-            <a:r>
-              <a:rPr lang="en-US" dirty="0" err="1"/>
-              <a:t>gitignore</a:t>
-            </a:r>
-            <a:r>
-              <a:rPr lang="en-US" dirty="0"/>
-              <a:t> file</a:t>
-            </a:r>
-          </a:p>
-          <a:p>
-            <a:pPr marL="1085850" lvl="2" indent="-171450">
-              <a:buFontTx/>
-              <a:buChar char="-"/>
-            </a:pPr>
-            <a:r>
-              <a:rPr lang="en-US" dirty="0"/>
-              <a:t>Blank lines and lines starting with # are ignored</a:t>
-            </a:r>
-          </a:p>
-          <a:p>
-            <a:pPr marL="1085850" lvl="2" indent="-171450">
-              <a:buFontTx/>
-              <a:buChar char="-"/>
-            </a:pPr>
-            <a:r>
-              <a:rPr lang="en-US" dirty="0"/>
-              <a:t>Standard glob patterns work (look at documentation for more information)</a:t>
-            </a:r>
+              <a:t>Commit in the imperative, telling what the code will do after the commit not what you’ve done</a:t>
+            </a:r>
+            <a:r>
+              <a:rPr lang="en-US" dirty="0" smtClean="0"/>
+              <a:t>.</a:t>
+            </a:r>
+            <a:endParaRPr lang="en-US" dirty="0"/>
           </a:p>
         </p:txBody>
       </p:sp>
@@ -4602,7 +3222,7 @@
           <a:p>
             <a:fld id="{1EB1DABF-4E95-4EDF-8DA3-AD2A8632C0A3}" type="slidenum">
               <a:rPr lang="en-US" smtClean="0"/>
-              <a:t>14</a:t>
+              <a:t>13</a:t>
             </a:fld>
             <a:endParaRPr lang="en-US"/>
           </a:p>
@@ -4665,251 +3285,6 @@
           <a:bodyPr/>
           <a:lstStyle/>
           <a:p>
-            <a:pPr marL="171450" indent="-171450">
-              <a:buFontTx/>
-              <a:buChar char="-"/>
-            </a:pPr>
-            <a:r>
-              <a:rPr lang="en-US" dirty="0"/>
-              <a:t>Make a new directory.</a:t>
-            </a:r>
-          </a:p>
-          <a:p>
-            <a:pPr marL="171450" indent="-171450">
-              <a:buFontTx/>
-              <a:buChar char="-"/>
-            </a:pPr>
-            <a:r>
-              <a:rPr lang="en-US" dirty="0"/>
-              <a:t>Write a short </a:t>
-            </a:r>
-            <a:r>
-              <a:rPr lang="en-US" dirty="0" err="1"/>
-              <a:t>matlab</a:t>
-            </a:r>
-            <a:r>
-              <a:rPr lang="en-US" dirty="0"/>
-              <a:t> script.  Save it.</a:t>
-            </a:r>
-          </a:p>
-          <a:p>
-            <a:pPr marL="171450" indent="-171450">
-              <a:buFontTx/>
-              <a:buChar char="-"/>
-            </a:pPr>
-            <a:r>
-              <a:rPr lang="en-US" dirty="0"/>
-              <a:t>Initialize a git repository.</a:t>
-            </a:r>
-          </a:p>
-          <a:p>
-            <a:pPr marL="628650" lvl="1" indent="-171450">
-              <a:buFontTx/>
-              <a:buChar char="-"/>
-            </a:pPr>
-            <a:r>
-              <a:rPr lang="en-US" dirty="0"/>
-              <a:t>Mention not good practice to nest repos. </a:t>
-            </a:r>
-          </a:p>
-          <a:p>
-            <a:pPr marL="628650" lvl="1" indent="-171450">
-              <a:buFontTx/>
-              <a:buChar char="-"/>
-            </a:pPr>
-            <a:r>
-              <a:rPr lang="en-US" dirty="0"/>
-              <a:t>Mention configuring username and email.</a:t>
-            </a:r>
-          </a:p>
-          <a:p>
-            <a:pPr marL="171450" lvl="0" indent="-171450">
-              <a:buFontTx/>
-              <a:buChar char="-"/>
-            </a:pPr>
-            <a:r>
-              <a:rPr lang="en-US" dirty="0"/>
-              <a:t>Add the script to the repository. </a:t>
-            </a:r>
-          </a:p>
-          <a:p>
-            <a:pPr marL="628650" lvl="1" indent="-171450">
-              <a:buFontTx/>
-              <a:buChar char="-"/>
-            </a:pPr>
-            <a:r>
-              <a:rPr lang="en-US" dirty="0"/>
-              <a:t>Talk about tracked and untracked files.</a:t>
-            </a:r>
-          </a:p>
-          <a:p>
-            <a:pPr marL="628650" lvl="1" indent="-171450">
-              <a:buFontTx/>
-              <a:buChar char="-"/>
-            </a:pPr>
-            <a:r>
-              <a:rPr lang="en-US" dirty="0"/>
-              <a:t>Add a fake data file to the directory, but don’t track it.</a:t>
-            </a:r>
-          </a:p>
-          <a:p>
-            <a:pPr marL="171450" lvl="0" indent="-171450">
-              <a:buFontTx/>
-              <a:buChar char="-"/>
-            </a:pPr>
-            <a:r>
-              <a:rPr lang="en-US" dirty="0"/>
-              <a:t>Commit the addition/initial commit.</a:t>
-            </a:r>
-          </a:p>
-          <a:p>
-            <a:pPr marL="628650" lvl="1" indent="-171450">
-              <a:buFontTx/>
-              <a:buChar char="-"/>
-            </a:pPr>
-            <a:r>
-              <a:rPr lang="en-US" dirty="0"/>
-              <a:t>Talk about the –m option</a:t>
-            </a:r>
-          </a:p>
-          <a:p>
-            <a:pPr marL="171450" lvl="0" indent="-171450">
-              <a:buFontTx/>
-              <a:buChar char="-"/>
-            </a:pPr>
-            <a:r>
-              <a:rPr lang="en-US" dirty="0"/>
-              <a:t>Introduce git status</a:t>
-            </a:r>
-          </a:p>
-          <a:p>
-            <a:pPr marL="628650" lvl="1" indent="-171450">
-              <a:buFontTx/>
-              <a:buChar char="-"/>
-            </a:pPr>
-            <a:r>
-              <a:rPr lang="en-US" dirty="0"/>
-              <a:t>Run git status right after commit.</a:t>
-            </a:r>
-          </a:p>
-          <a:p>
-            <a:pPr marL="628650" lvl="1" indent="-171450">
-              <a:buFontTx/>
-              <a:buChar char="-"/>
-            </a:pPr>
-            <a:r>
-              <a:rPr lang="en-US" dirty="0"/>
-              <a:t>Make changes to the script.</a:t>
-            </a:r>
-          </a:p>
-          <a:p>
-            <a:pPr marL="628650" lvl="1" indent="-171450">
-              <a:buFontTx/>
-              <a:buChar char="-"/>
-            </a:pPr>
-            <a:r>
-              <a:rPr lang="en-US" dirty="0"/>
-              <a:t>Run git status again.</a:t>
-            </a:r>
-          </a:p>
-          <a:p>
-            <a:pPr marL="628650" lvl="1" indent="-171450">
-              <a:buFontTx/>
-              <a:buChar char="-"/>
-            </a:pPr>
-            <a:r>
-              <a:rPr lang="en-US" dirty="0"/>
-              <a:t>Add the script to staged area.</a:t>
-            </a:r>
-          </a:p>
-          <a:p>
-            <a:pPr marL="628650" lvl="1" indent="-171450">
-              <a:buFontTx/>
-              <a:buChar char="-"/>
-            </a:pPr>
-            <a:r>
-              <a:rPr lang="en-US" dirty="0"/>
-              <a:t>Run git status again.</a:t>
-            </a:r>
-          </a:p>
-          <a:p>
-            <a:pPr marL="628650" lvl="1" indent="-171450">
-              <a:buFontTx/>
-              <a:buChar char="-"/>
-            </a:pPr>
-            <a:r>
-              <a:rPr lang="en-US" dirty="0"/>
-              <a:t>Commit changes.</a:t>
-            </a:r>
-          </a:p>
-          <a:p>
-            <a:pPr marL="171450" lvl="0" indent="-171450">
-              <a:buFontTx/>
-              <a:buChar char="-"/>
-            </a:pPr>
-            <a:r>
-              <a:rPr lang="en-US" dirty="0"/>
-              <a:t>Talk about the lifecycle of the status of files.</a:t>
-            </a:r>
-          </a:p>
-          <a:p>
-            <a:pPr marL="171450" lvl="0" indent="-171450">
-              <a:buFontTx/>
-              <a:buChar char="-"/>
-            </a:pPr>
-            <a:r>
-              <a:rPr lang="en-US" dirty="0"/>
-              <a:t>Talk about good committing practices.</a:t>
-            </a:r>
-          </a:p>
-          <a:p>
-            <a:pPr marL="628650" lvl="1" indent="-171450">
-              <a:buFontTx/>
-              <a:buChar char="-"/>
-            </a:pPr>
-            <a:r>
-              <a:rPr lang="en-US" dirty="0"/>
-              <a:t>Committing completed code (break code into small chunks and commit each separately)</a:t>
-            </a:r>
-          </a:p>
-          <a:p>
-            <a:pPr marL="628650" lvl="1" indent="-171450">
-              <a:buFontTx/>
-              <a:buChar char="-"/>
-            </a:pPr>
-            <a:r>
-              <a:rPr lang="en-US" dirty="0"/>
-              <a:t>Commit in the imperative, telling what the code will do after the commit not what you’ve done.</a:t>
-            </a:r>
-          </a:p>
-          <a:p>
-            <a:pPr marL="628650" lvl="1" indent="-171450">
-              <a:buFontTx/>
-              <a:buChar char="-"/>
-            </a:pPr>
-            <a:r>
-              <a:rPr lang="en-US" dirty="0"/>
-              <a:t>Commit in small digestible chunks.  Commit often.</a:t>
-            </a:r>
-          </a:p>
-          <a:p>
-            <a:pPr marL="628650" lvl="1" indent="-171450">
-              <a:buFontTx/>
-              <a:buChar char="-"/>
-            </a:pPr>
-            <a:r>
-              <a:rPr lang="en-US" dirty="0"/>
-              <a:t>Start with a single line with a simple description, no more than 50 characters (I normally do 80). Then </a:t>
-            </a:r>
-            <a:br>
-              <a:rPr lang="en-US" dirty="0"/>
-            </a:br>
-            <a:r>
-              <a:rPr lang="en-US" dirty="0"/>
-              <a:t>include a more detailed description below a separating line.</a:t>
-            </a:r>
-          </a:p>
-          <a:p>
             <a:pPr marL="171450" marR="0" lvl="0" indent="-171450" algn="l" defTabSz="914400" rtl="0" eaLnBrk="1" fontAlgn="auto" latinLnBrk="0" hangingPunct="1">
               <a:lnSpc>
                 <a:spcPct val="100000"/>
@@ -4928,8 +3303,12 @@
               <a:defRPr/>
             </a:pPr>
             <a:r>
-              <a:rPr lang="en-US" dirty="0"/>
-              <a:t>Introduce a .</a:t>
+              <a:rPr lang="en-US" dirty="0" smtClean="0"/>
+              <a:t>Introduce </a:t>
+            </a:r>
+            <a:r>
+              <a:rPr lang="en-US" dirty="0"/>
+              <a:t>a .</a:t>
             </a:r>
             <a:r>
               <a:rPr lang="en-US" dirty="0" err="1"/>
@@ -4986,7 +3365,7 @@
           <a:p>
             <a:fld id="{1EB1DABF-4E95-4EDF-8DA3-AD2A8632C0A3}" type="slidenum">
               <a:rPr lang="en-US" smtClean="0"/>
-              <a:t>15</a:t>
+              <a:t>14</a:t>
             </a:fld>
             <a:endParaRPr lang="en-US"/>
           </a:p>
@@ -5134,7 +3513,7 @@
           <a:p>
             <a:fld id="{1EB1DABF-4E95-4EDF-8DA3-AD2A8632C0A3}" type="slidenum">
               <a:rPr lang="en-US" smtClean="0"/>
-              <a:t>16</a:t>
+              <a:t>15</a:t>
             </a:fld>
             <a:endParaRPr lang="en-US"/>
           </a:p>
@@ -8514,230 +6893,6 @@
         <p:spPr>
           <a:xfrm>
             <a:off x="539262" y="2540000"/>
-            <a:ext cx="5028300" cy="2862322"/>
-          </a:xfrm>
-          <a:prstGeom prst="rect">
-            <a:avLst/>
-          </a:prstGeom>
-          <a:noFill/>
-        </p:spPr>
-        <p:txBody>
-          <a:bodyPr wrap="none" rtlCol="0">
-            <a:spAutoFit/>
-          </a:bodyPr>
-          <a:lstStyle/>
-          <a:p>
-            <a:pPr marL="285750" indent="-285750">
-              <a:buFont typeface="Arial" panose="020B0604020202020204" pitchFamily="34" charset="0"/>
-              <a:buChar char="•"/>
-            </a:pPr>
-            <a:r>
-              <a:rPr lang="en-US" dirty="0"/>
-              <a:t>git </a:t>
-            </a:r>
-            <a:r>
-              <a:rPr lang="en-US" dirty="0" err="1"/>
-              <a:t>init</a:t>
-            </a:r>
-            <a:r>
-              <a:rPr lang="en-US" dirty="0"/>
-              <a:t> </a:t>
-            </a:r>
-          </a:p>
-          <a:p>
-            <a:pPr marL="285750" indent="-285750">
-              <a:buFont typeface="Arial" panose="020B0604020202020204" pitchFamily="34" charset="0"/>
-              <a:buChar char="•"/>
-            </a:pPr>
-            <a:r>
-              <a:rPr lang="en-US" dirty="0"/>
-              <a:t>git add &lt;file&gt;</a:t>
-            </a:r>
-          </a:p>
-          <a:p>
-            <a:pPr marL="285750" indent="-285750">
-              <a:buFont typeface="Arial" panose="020B0604020202020204" pitchFamily="34" charset="0"/>
-              <a:buChar char="•"/>
-            </a:pPr>
-            <a:r>
-              <a:rPr lang="en-US" sz="3600" dirty="0">
-                <a:solidFill>
-                  <a:srgbClr val="FF0000"/>
-                </a:solidFill>
-              </a:rPr>
-              <a:t>git commit </a:t>
-            </a:r>
-            <a:br>
-              <a:rPr lang="en-US" sz="3600" dirty="0">
-                <a:solidFill>
-                  <a:srgbClr val="FF0000"/>
-                </a:solidFill>
-              </a:rPr>
-            </a:br>
-            <a:r>
-              <a:rPr lang="en-US" sz="3600" dirty="0">
-                <a:solidFill>
-                  <a:srgbClr val="FF0000"/>
-                </a:solidFill>
-              </a:rPr>
-              <a:t>     (-m “message” -v  -a )</a:t>
-            </a:r>
-          </a:p>
-          <a:p>
-            <a:pPr marL="285750" indent="-285750">
-              <a:buFont typeface="Arial" panose="020B0604020202020204" pitchFamily="34" charset="0"/>
-              <a:buChar char="•"/>
-            </a:pPr>
-            <a:r>
-              <a:rPr lang="en-US" dirty="0"/>
-              <a:t>git status</a:t>
-            </a:r>
-          </a:p>
-          <a:p>
-            <a:pPr marL="285750" indent="-285750">
-              <a:buFont typeface="Arial" panose="020B0604020202020204" pitchFamily="34" charset="0"/>
-              <a:buChar char="•"/>
-            </a:pPr>
-            <a:r>
-              <a:rPr lang="en-US" dirty="0"/>
-              <a:t>git rm (-f) </a:t>
-            </a:r>
-          </a:p>
-          <a:p>
-            <a:pPr marL="285750" indent="-285750">
-              <a:buFont typeface="Arial" panose="020B0604020202020204" pitchFamily="34" charset="0"/>
-              <a:buChar char="•"/>
-            </a:pPr>
-            <a:r>
-              <a:rPr lang="en-US" dirty="0"/>
-              <a:t>git mv &lt;file from&gt; &lt;file to&gt;</a:t>
-            </a:r>
-          </a:p>
-          <a:p>
-            <a:pPr marL="285750" indent="-285750">
-              <a:buFont typeface="Arial" panose="020B0604020202020204" pitchFamily="34" charset="0"/>
-              <a:buChar char="•"/>
-            </a:pPr>
-            <a:endParaRPr lang="en-US" dirty="0"/>
-          </a:p>
-        </p:txBody>
-      </p:sp>
-      <p:pic>
-        <p:nvPicPr>
-          <p:cNvPr id="5" name="Picture 4">
-            <a:extLst>
-              <a:ext uri="{FF2B5EF4-FFF2-40B4-BE49-F238E27FC236}">
-                <a16:creationId xmlns:a16="http://schemas.microsoft.com/office/drawing/2014/main" id="{9C246DE7-CB84-40C4-AD16-B8FA7268B4A1}"/>
-              </a:ext>
-            </a:extLst>
-          </p:cNvPr>
-          <p:cNvPicPr>
-            <a:picLocks noChangeAspect="1"/>
-          </p:cNvPicPr>
-          <p:nvPr/>
-        </p:nvPicPr>
-        <p:blipFill>
-          <a:blip r:embed="rId3">
-            <a:extLst>
-              <a:ext uri="{28A0092B-C50C-407E-A947-70E740481C1C}">
-                <a14:useLocalDpi xmlns:a14="http://schemas.microsoft.com/office/drawing/2010/main" val="0"/>
-              </a:ext>
-            </a:extLst>
-          </a:blip>
-          <a:stretch>
-            <a:fillRect/>
-          </a:stretch>
-        </p:blipFill>
-        <p:spPr>
-          <a:xfrm>
-            <a:off x="5511568" y="1077925"/>
-            <a:ext cx="5615029" cy="4467258"/>
-          </a:xfrm>
-          <a:prstGeom prst="rect">
-            <a:avLst/>
-          </a:prstGeom>
-        </p:spPr>
-      </p:pic>
-    </p:spTree>
-    <p:extLst>
-      <p:ext uri="{BB962C8B-B14F-4D97-AF65-F5344CB8AC3E}">
-        <p14:creationId xmlns:p14="http://schemas.microsoft.com/office/powerpoint/2010/main" val="3318592949"/>
-      </p:ext>
-    </p:extLst>
-  </p:cSld>
-  <p:clrMapOvr>
-    <a:masterClrMapping/>
-  </p:clrMapOvr>
-</p:sld>
-</file>
-
-<file path=ppt/slides/slide11.xml><?xml version="1.0" encoding="utf-8"?>
-<p:sld xmlns:a="http://schemas.openxmlformats.org/drawingml/2006/main" xmlns:r="http://schemas.openxmlformats.org/officeDocument/2006/relationships" xmlns:p="http://schemas.openxmlformats.org/presentationml/2006/main">
-  <p:cSld>
-    <p:spTree>
-      <p:nvGrpSpPr>
-        <p:cNvPr id="1" name=""/>
-        <p:cNvGrpSpPr/>
-        <p:nvPr/>
-      </p:nvGrpSpPr>
-      <p:grpSpPr>
-        <a:xfrm>
-          <a:off x="0" y="0"/>
-          <a:ext cx="0" cy="0"/>
-          <a:chOff x="0" y="0"/>
-          <a:chExt cx="0" cy="0"/>
-        </a:xfrm>
-      </p:grpSpPr>
-      <p:sp>
-        <p:nvSpPr>
-          <p:cNvPr id="2" name="TextBox 1">
-            <a:extLst>
-              <a:ext uri="{FF2B5EF4-FFF2-40B4-BE49-F238E27FC236}">
-                <a16:creationId xmlns:a16="http://schemas.microsoft.com/office/drawing/2014/main" id="{55B00B43-FAAB-4D22-9E01-665E407310BC}"/>
-              </a:ext>
-            </a:extLst>
-          </p:cNvPr>
-          <p:cNvSpPr txBox="1"/>
-          <p:nvPr/>
-        </p:nvSpPr>
-        <p:spPr>
-          <a:xfrm>
-            <a:off x="693173" y="929148"/>
-            <a:ext cx="3525196" cy="707886"/>
-          </a:xfrm>
-          <a:prstGeom prst="rect">
-            <a:avLst/>
-          </a:prstGeom>
-          <a:noFill/>
-        </p:spPr>
-        <p:txBody>
-          <a:bodyPr wrap="none" rtlCol="0">
-            <a:spAutoFit/>
-          </a:bodyPr>
-          <a:lstStyle/>
-          <a:p>
-            <a:r>
-              <a:rPr lang="en-US" sz="4000" dirty="0"/>
-              <a:t>Start a project…</a:t>
-            </a:r>
-          </a:p>
-        </p:txBody>
-      </p:sp>
-      <p:sp>
-        <p:nvSpPr>
-          <p:cNvPr id="3" name="TextBox 2">
-            <a:extLst>
-              <a:ext uri="{FF2B5EF4-FFF2-40B4-BE49-F238E27FC236}">
-                <a16:creationId xmlns:a16="http://schemas.microsoft.com/office/drawing/2014/main" id="{44BD550A-B530-4921-8428-01A27B6ED9C1}"/>
-              </a:ext>
-            </a:extLst>
-          </p:cNvPr>
-          <p:cNvSpPr txBox="1"/>
-          <p:nvPr/>
-        </p:nvSpPr>
-        <p:spPr>
-          <a:xfrm>
-            <a:off x="539262" y="2540000"/>
             <a:ext cx="3555140" cy="2031325"/>
           </a:xfrm>
           <a:prstGeom prst="rect">
@@ -8915,7 +7070,7 @@
 </p:sld>
 </file>
 
-<file path=ppt/slides/slide12.xml><?xml version="1.0" encoding="utf-8"?>
+<file path=ppt/slides/slide11.xml><?xml version="1.0" encoding="utf-8"?>
 <p:sld xmlns:a="http://schemas.openxmlformats.org/drawingml/2006/main" xmlns:r="http://schemas.openxmlformats.org/officeDocument/2006/relationships" xmlns:p="http://schemas.openxmlformats.org/presentationml/2006/main">
   <p:cSld>
     <p:spTree>
@@ -9124,7 +7279,7 @@
 </p:sld>
 </file>
 
-<file path=ppt/slides/slide13.xml><?xml version="1.0" encoding="utf-8"?>
+<file path=ppt/slides/slide12.xml><?xml version="1.0" encoding="utf-8"?>
 <p:sld xmlns:a="http://schemas.openxmlformats.org/drawingml/2006/main" xmlns:r="http://schemas.openxmlformats.org/officeDocument/2006/relationships" xmlns:p="http://schemas.openxmlformats.org/presentationml/2006/main">
   <p:cSld>
     <p:spTree>
@@ -9348,7 +7503,7 @@
 </p:sld>
 </file>
 
-<file path=ppt/slides/slide14.xml><?xml version="1.0" encoding="utf-8"?>
+<file path=ppt/slides/slide13.xml><?xml version="1.0" encoding="utf-8"?>
 <p:sld xmlns:a="http://schemas.openxmlformats.org/drawingml/2006/main" xmlns:r="http://schemas.openxmlformats.org/officeDocument/2006/relationships" xmlns:p="http://schemas.openxmlformats.org/presentationml/2006/main">
   <p:cSld>
     <p:spTree>
@@ -9553,7 +7708,7 @@
 </p:sld>
 </file>
 
-<file path=ppt/slides/slide15.xml><?xml version="1.0" encoding="utf-8"?>
+<file path=ppt/slides/slide14.xml><?xml version="1.0" encoding="utf-8"?>
 <p:sld xmlns:a="http://schemas.openxmlformats.org/drawingml/2006/main" xmlns:r="http://schemas.openxmlformats.org/officeDocument/2006/relationships" xmlns:p="http://schemas.openxmlformats.org/presentationml/2006/main">
   <p:cSld>
     <p:spTree>
@@ -9711,34 +7866,22 @@
       </p:sp>
       <p:pic>
         <p:nvPicPr>
-          <p:cNvPr id="9" name="Picture 8">
-            <a:extLst>
-              <a:ext uri="{FF2B5EF4-FFF2-40B4-BE49-F238E27FC236}">
-                <a16:creationId xmlns:a16="http://schemas.microsoft.com/office/drawing/2014/main" id="{446D10BE-0B40-4016-84CA-885D6BF83C91}"/>
-              </a:ext>
-            </a:extLst>
-          </p:cNvPr>
+          <p:cNvPr id="5" name="Picture 4"/>
           <p:cNvPicPr>
             <a:picLocks noChangeAspect="1"/>
           </p:cNvPicPr>
           <p:nvPr/>
         </p:nvPicPr>
         <p:blipFill>
-          <a:blip r:embed="rId3">
-            <a:extLst>
-              <a:ext uri="{28A0092B-C50C-407E-A947-70E740481C1C}">
-                <a14:useLocalDpi xmlns:a14="http://schemas.microsoft.com/office/drawing/2010/main" val="0"/>
-              </a:ext>
-            </a:extLst>
-          </a:blip>
+          <a:blip r:embed="rId3"/>
           <a:stretch>
             <a:fillRect/>
           </a:stretch>
         </p:blipFill>
         <p:spPr>
           <a:xfrm>
-            <a:off x="4218369" y="1866204"/>
-            <a:ext cx="7652416" cy="3471703"/>
+            <a:off x="5306591" y="2037079"/>
+            <a:ext cx="6188721" cy="3565241"/>
           </a:xfrm>
           <a:prstGeom prst="rect">
             <a:avLst/>
@@ -9758,7 +7901,7 @@
 </p:sld>
 </file>
 
-<file path=ppt/slides/slide16.xml><?xml version="1.0" encoding="utf-8"?>
+<file path=ppt/slides/slide15.xml><?xml version="1.0" encoding="utf-8"?>
 <p:sld xmlns:a="http://schemas.openxmlformats.org/drawingml/2006/main" xmlns:r="http://schemas.openxmlformats.org/officeDocument/2006/relationships" xmlns:p="http://schemas.openxmlformats.org/presentationml/2006/main">
   <p:cSld>
     <p:spTree>
@@ -9790,7 +7933,7 @@
         <p:spPr>
           <a:xfrm>
             <a:off x="539261" y="476738"/>
-            <a:ext cx="6315383" cy="707886"/>
+            <a:ext cx="4502899" cy="707886"/>
           </a:xfrm>
           <a:prstGeom prst="rect">
             <a:avLst/>
@@ -9804,9 +7947,10 @@
           <a:lstStyle/>
           <a:p>
             <a:r>
-              <a:rPr lang="en-US" sz="4000" dirty="0"/>
-              <a:t>View and undo your project…</a:t>
-            </a:r>
+              <a:rPr lang="en-US" sz="4000" dirty="0" smtClean="0"/>
+              <a:t>View earlier versions</a:t>
+            </a:r>
+            <a:endParaRPr lang="en-US" sz="4000" dirty="0"/>
           </a:p>
         </p:txBody>
       </p:sp>
@@ -9825,7 +7969,7 @@
         <p:spPr>
           <a:xfrm>
             <a:off x="3102708" y="2274277"/>
-            <a:ext cx="5080045" cy="2031325"/>
+            <a:ext cx="5080045" cy="1477328"/>
           </a:xfrm>
           <a:prstGeom prst="rect">
             <a:avLst/>
@@ -9875,28 +8019,16 @@
               <a:buChar char="•"/>
             </a:pPr>
             <a:r>
-              <a:rPr lang="en-US" dirty="0"/>
-              <a:t>git commit --amend </a:t>
-            </a:r>
-          </a:p>
-          <a:p>
-            <a:pPr marL="285750" indent="-285750">
-              <a:buFont typeface="Arial" panose="020B0604020202020204" pitchFamily="34" charset="0"/>
-              <a:buChar char="•"/>
-            </a:pPr>
-            <a:r>
-              <a:rPr lang="en-US" dirty="0"/>
-              <a:t>git reset HEAD &lt;file&gt;</a:t>
-            </a:r>
-          </a:p>
-          <a:p>
-            <a:pPr marL="285750" indent="-285750">
-              <a:buFont typeface="Arial" panose="020B0604020202020204" pitchFamily="34" charset="0"/>
-              <a:buChar char="•"/>
-            </a:pPr>
-            <a:r>
-              <a:rPr lang="en-US" dirty="0"/>
-              <a:t>git checkout -- &lt;file&gt;</a:t>
+              <a:rPr lang="en-US" dirty="0" err="1" smtClean="0"/>
+              <a:t>git</a:t>
+            </a:r>
+            <a:r>
+              <a:rPr lang="en-US" dirty="0" smtClean="0"/>
+              <a:t> </a:t>
+            </a:r>
+            <a:r>
+              <a:rPr lang="en-US" dirty="0"/>
+              <a:t>checkout -- &lt;file&gt;</a:t>
             </a:r>
           </a:p>
           <a:p>
@@ -9921,7 +8053,7 @@
 </p:sld>
 </file>
 
-<file path=ppt/slides/slide17.xml><?xml version="1.0" encoding="utf-8"?>
+<file path=ppt/slides/slide16.xml><?xml version="1.0" encoding="utf-8"?>
 <p:sld xmlns:a="http://schemas.openxmlformats.org/drawingml/2006/main" xmlns:r="http://schemas.openxmlformats.org/officeDocument/2006/relationships" xmlns:p="http://schemas.openxmlformats.org/presentationml/2006/main">
   <p:cSld>
     <p:spTree>
@@ -10120,7 +8252,7 @@
 </p:sld>
 </file>
 
-<file path=ppt/slides/slide18.xml><?xml version="1.0" encoding="utf-8"?>
+<file path=ppt/slides/slide17.xml><?xml version="1.0" encoding="utf-8"?>
 <p:sld xmlns:a="http://schemas.openxmlformats.org/drawingml/2006/main" xmlns:r="http://schemas.openxmlformats.org/officeDocument/2006/relationships" xmlns:p="http://schemas.openxmlformats.org/presentationml/2006/main">
   <p:cSld>
     <p:spTree>
@@ -10319,7 +8451,7 @@
 </p:sld>
 </file>
 
-<file path=ppt/slides/slide19.xml><?xml version="1.0" encoding="utf-8"?>
+<file path=ppt/slides/slide18.xml><?xml version="1.0" encoding="utf-8"?>
 <p:sld xmlns:a="http://schemas.openxmlformats.org/drawingml/2006/main" xmlns:r="http://schemas.openxmlformats.org/officeDocument/2006/relationships" xmlns:p="http://schemas.openxmlformats.org/presentationml/2006/main">
   <p:cSld>
     <p:spTree>
@@ -10490,6 +8622,205 @@
     <p:extLst>
       <p:ext uri="{BB962C8B-B14F-4D97-AF65-F5344CB8AC3E}">
         <p14:creationId xmlns:p14="http://schemas.microsoft.com/office/powerpoint/2010/main" val="1971593979"/>
+      </p:ext>
+    </p:extLst>
+  </p:cSld>
+  <p:clrMapOvr>
+    <a:masterClrMapping/>
+  </p:clrMapOvr>
+</p:sld>
+</file>
+
+<file path=ppt/slides/slide19.xml><?xml version="1.0" encoding="utf-8"?>
+<p:sld xmlns:a="http://schemas.openxmlformats.org/drawingml/2006/main" xmlns:r="http://schemas.openxmlformats.org/officeDocument/2006/relationships" xmlns:p="http://schemas.openxmlformats.org/presentationml/2006/main">
+  <p:cSld>
+    <p:spTree>
+      <p:nvGrpSpPr>
+        <p:cNvPr id="1" name=""/>
+        <p:cNvGrpSpPr/>
+        <p:nvPr/>
+      </p:nvGrpSpPr>
+      <p:grpSpPr>
+        <a:xfrm>
+          <a:off x="0" y="0"/>
+          <a:ext cx="0" cy="0"/>
+          <a:chOff x="0" y="0"/>
+          <a:chExt cx="0" cy="0"/>
+        </a:xfrm>
+      </p:grpSpPr>
+      <p:sp>
+        <p:nvSpPr>
+          <p:cNvPr id="2" name="TextBox 1">
+            <a:extLst>
+              <a:ext uri="{FF2B5EF4-FFF2-40B4-BE49-F238E27FC236}">
+                <a16:creationId xmlns:a16="http://schemas.microsoft.com/office/drawing/2014/main" id="{211E321F-9F54-498F-BD6F-D26DA9D4DE07}"/>
+              </a:ext>
+            </a:extLst>
+          </p:cNvPr>
+          <p:cNvSpPr txBox="1"/>
+          <p:nvPr/>
+        </p:nvSpPr>
+        <p:spPr>
+          <a:xfrm>
+            <a:off x="586153" y="406400"/>
+            <a:ext cx="2650790" cy="707886"/>
+          </a:xfrm>
+          <a:prstGeom prst="rect">
+            <a:avLst/>
+          </a:prstGeom>
+          <a:noFill/>
+        </p:spPr>
+        <p:txBody>
+          <a:bodyPr wrap="none" rtlCol="0">
+            <a:spAutoFit/>
+          </a:bodyPr>
+          <a:lstStyle/>
+          <a:p>
+            <a:r>
+              <a:rPr lang="en-US" sz="4000" dirty="0"/>
+              <a:t>Branching…</a:t>
+            </a:r>
+          </a:p>
+        </p:txBody>
+      </p:sp>
+      <p:sp>
+        <p:nvSpPr>
+          <p:cNvPr id="3" name="TextBox 2">
+            <a:extLst>
+              <a:ext uri="{FF2B5EF4-FFF2-40B4-BE49-F238E27FC236}">
+                <a16:creationId xmlns:a16="http://schemas.microsoft.com/office/drawing/2014/main" id="{CAF814E6-FC94-4AA4-8BDA-EB411A456B88}"/>
+              </a:ext>
+            </a:extLst>
+          </p:cNvPr>
+          <p:cNvSpPr txBox="1"/>
+          <p:nvPr/>
+        </p:nvSpPr>
+        <p:spPr>
+          <a:xfrm>
+            <a:off x="667149" y="2287244"/>
+            <a:ext cx="4573816" cy="2308324"/>
+          </a:xfrm>
+          <a:prstGeom prst="rect">
+            <a:avLst/>
+          </a:prstGeom>
+          <a:noFill/>
+        </p:spPr>
+        <p:txBody>
+          <a:bodyPr wrap="none" rtlCol="0">
+            <a:spAutoFit/>
+          </a:bodyPr>
+          <a:lstStyle/>
+          <a:p>
+            <a:pPr marL="285750" indent="-285750">
+              <a:buFont typeface="Arial" panose="020B0604020202020204" pitchFamily="34" charset="0"/>
+              <a:buChar char="•"/>
+            </a:pPr>
+            <a:r>
+              <a:rPr lang="en-US" dirty="0"/>
+              <a:t>git branch (-d -v) &lt;name&gt;</a:t>
+            </a:r>
+          </a:p>
+          <a:p>
+            <a:pPr marL="285750" indent="-285750">
+              <a:buFont typeface="Arial" panose="020B0604020202020204" pitchFamily="34" charset="0"/>
+              <a:buChar char="•"/>
+            </a:pPr>
+            <a:r>
+              <a:rPr lang="en-US" sz="3600" dirty="0">
+                <a:solidFill>
+                  <a:srgbClr val="FF0000"/>
+                </a:solidFill>
+              </a:rPr>
+              <a:t>git checkout </a:t>
+            </a:r>
+            <a:br>
+              <a:rPr lang="en-US" sz="3600" dirty="0">
+                <a:solidFill>
+                  <a:srgbClr val="FF0000"/>
+                </a:solidFill>
+              </a:rPr>
+            </a:br>
+            <a:r>
+              <a:rPr lang="en-US" sz="3600" dirty="0">
+                <a:solidFill>
+                  <a:srgbClr val="FF0000"/>
+                </a:solidFill>
+              </a:rPr>
+              <a:t>    (-b) &lt;branch name&gt;</a:t>
+            </a:r>
+          </a:p>
+          <a:p>
+            <a:pPr marL="285750" indent="-285750">
+              <a:buFont typeface="Arial" panose="020B0604020202020204" pitchFamily="34" charset="0"/>
+              <a:buChar char="•"/>
+            </a:pPr>
+            <a:r>
+              <a:rPr lang="en-US" dirty="0"/>
+              <a:t>git stash </a:t>
+            </a:r>
+          </a:p>
+          <a:p>
+            <a:pPr marL="285750" indent="-285750">
+              <a:buFont typeface="Arial" panose="020B0604020202020204" pitchFamily="34" charset="0"/>
+              <a:buChar char="•"/>
+            </a:pPr>
+            <a:r>
+              <a:rPr lang="en-US" dirty="0"/>
+              <a:t>git merge &lt;branch name&gt;</a:t>
+            </a:r>
+          </a:p>
+          <a:p>
+            <a:pPr marL="285750" indent="-285750">
+              <a:buFont typeface="Arial" panose="020B0604020202020204" pitchFamily="34" charset="0"/>
+              <a:buChar char="•"/>
+            </a:pPr>
+            <a:r>
+              <a:rPr lang="en-US" dirty="0"/>
+              <a:t>git rebase &lt;new base&gt;</a:t>
+            </a:r>
+          </a:p>
+        </p:txBody>
+      </p:sp>
+      <p:pic>
+        <p:nvPicPr>
+          <p:cNvPr id="5" name="Picture 4">
+            <a:extLst>
+              <a:ext uri="{FF2B5EF4-FFF2-40B4-BE49-F238E27FC236}">
+                <a16:creationId xmlns:a16="http://schemas.microsoft.com/office/drawing/2014/main" id="{7A3D1547-5F24-412A-965F-930331308C3E}"/>
+              </a:ext>
+            </a:extLst>
+          </p:cNvPr>
+          <p:cNvPicPr>
+            <a:picLocks noChangeAspect="1"/>
+          </p:cNvPicPr>
+          <p:nvPr/>
+        </p:nvPicPr>
+        <p:blipFill>
+          <a:blip r:embed="rId3">
+            <a:extLst>
+              <a:ext uri="{28A0092B-C50C-407E-A947-70E740481C1C}">
+                <a14:useLocalDpi xmlns:a14="http://schemas.microsoft.com/office/drawing/2010/main" val="0"/>
+              </a:ext>
+            </a:extLst>
+          </a:blip>
+          <a:stretch>
+            <a:fillRect/>
+          </a:stretch>
+        </p:blipFill>
+        <p:spPr>
+          <a:xfrm>
+            <a:off x="5576445" y="1619000"/>
+            <a:ext cx="5948406" cy="2814658"/>
+          </a:xfrm>
+          <a:prstGeom prst="rect">
+            <a:avLst/>
+          </a:prstGeom>
+        </p:spPr>
+      </p:pic>
+    </p:spTree>
+    <p:extLst>
+      <p:ext uri="{BB962C8B-B14F-4D97-AF65-F5344CB8AC3E}">
+        <p14:creationId xmlns:p14="http://schemas.microsoft.com/office/powerpoint/2010/main" val="1402074850"/>
       </p:ext>
     </p:extLst>
   </p:cSld>
@@ -10802,205 +9133,6 @@
         <p:spPr>
           <a:xfrm>
             <a:off x="667149" y="2287244"/>
-            <a:ext cx="4573816" cy="2308324"/>
-          </a:xfrm>
-          <a:prstGeom prst="rect">
-            <a:avLst/>
-          </a:prstGeom>
-          <a:noFill/>
-        </p:spPr>
-        <p:txBody>
-          <a:bodyPr wrap="none" rtlCol="0">
-            <a:spAutoFit/>
-          </a:bodyPr>
-          <a:lstStyle/>
-          <a:p>
-            <a:pPr marL="285750" indent="-285750">
-              <a:buFont typeface="Arial" panose="020B0604020202020204" pitchFamily="34" charset="0"/>
-              <a:buChar char="•"/>
-            </a:pPr>
-            <a:r>
-              <a:rPr lang="en-US" dirty="0"/>
-              <a:t>git branch (-d -v) &lt;name&gt;</a:t>
-            </a:r>
-          </a:p>
-          <a:p>
-            <a:pPr marL="285750" indent="-285750">
-              <a:buFont typeface="Arial" panose="020B0604020202020204" pitchFamily="34" charset="0"/>
-              <a:buChar char="•"/>
-            </a:pPr>
-            <a:r>
-              <a:rPr lang="en-US" sz="3600" dirty="0">
-                <a:solidFill>
-                  <a:srgbClr val="FF0000"/>
-                </a:solidFill>
-              </a:rPr>
-              <a:t>git checkout </a:t>
-            </a:r>
-            <a:br>
-              <a:rPr lang="en-US" sz="3600" dirty="0">
-                <a:solidFill>
-                  <a:srgbClr val="FF0000"/>
-                </a:solidFill>
-              </a:rPr>
-            </a:br>
-            <a:r>
-              <a:rPr lang="en-US" sz="3600" dirty="0">
-                <a:solidFill>
-                  <a:srgbClr val="FF0000"/>
-                </a:solidFill>
-              </a:rPr>
-              <a:t>    (-b) &lt;branch name&gt;</a:t>
-            </a:r>
-          </a:p>
-          <a:p>
-            <a:pPr marL="285750" indent="-285750">
-              <a:buFont typeface="Arial" panose="020B0604020202020204" pitchFamily="34" charset="0"/>
-              <a:buChar char="•"/>
-            </a:pPr>
-            <a:r>
-              <a:rPr lang="en-US" dirty="0"/>
-              <a:t>git stash </a:t>
-            </a:r>
-          </a:p>
-          <a:p>
-            <a:pPr marL="285750" indent="-285750">
-              <a:buFont typeface="Arial" panose="020B0604020202020204" pitchFamily="34" charset="0"/>
-              <a:buChar char="•"/>
-            </a:pPr>
-            <a:r>
-              <a:rPr lang="en-US" dirty="0"/>
-              <a:t>git merge &lt;branch name&gt;</a:t>
-            </a:r>
-          </a:p>
-          <a:p>
-            <a:pPr marL="285750" indent="-285750">
-              <a:buFont typeface="Arial" panose="020B0604020202020204" pitchFamily="34" charset="0"/>
-              <a:buChar char="•"/>
-            </a:pPr>
-            <a:r>
-              <a:rPr lang="en-US" dirty="0"/>
-              <a:t>git rebase &lt;new base&gt;</a:t>
-            </a:r>
-          </a:p>
-        </p:txBody>
-      </p:sp>
-      <p:pic>
-        <p:nvPicPr>
-          <p:cNvPr id="5" name="Picture 4">
-            <a:extLst>
-              <a:ext uri="{FF2B5EF4-FFF2-40B4-BE49-F238E27FC236}">
-                <a16:creationId xmlns:a16="http://schemas.microsoft.com/office/drawing/2014/main" id="{7A3D1547-5F24-412A-965F-930331308C3E}"/>
-              </a:ext>
-            </a:extLst>
-          </p:cNvPr>
-          <p:cNvPicPr>
-            <a:picLocks noChangeAspect="1"/>
-          </p:cNvPicPr>
-          <p:nvPr/>
-        </p:nvPicPr>
-        <p:blipFill>
-          <a:blip r:embed="rId3">
-            <a:extLst>
-              <a:ext uri="{28A0092B-C50C-407E-A947-70E740481C1C}">
-                <a14:useLocalDpi xmlns:a14="http://schemas.microsoft.com/office/drawing/2010/main" val="0"/>
-              </a:ext>
-            </a:extLst>
-          </a:blip>
-          <a:stretch>
-            <a:fillRect/>
-          </a:stretch>
-        </p:blipFill>
-        <p:spPr>
-          <a:xfrm>
-            <a:off x="5576445" y="1619000"/>
-            <a:ext cx="5948406" cy="2814658"/>
-          </a:xfrm>
-          <a:prstGeom prst="rect">
-            <a:avLst/>
-          </a:prstGeom>
-        </p:spPr>
-      </p:pic>
-    </p:spTree>
-    <p:extLst>
-      <p:ext uri="{BB962C8B-B14F-4D97-AF65-F5344CB8AC3E}">
-        <p14:creationId xmlns:p14="http://schemas.microsoft.com/office/powerpoint/2010/main" val="1402074850"/>
-      </p:ext>
-    </p:extLst>
-  </p:cSld>
-  <p:clrMapOvr>
-    <a:masterClrMapping/>
-  </p:clrMapOvr>
-</p:sld>
-</file>
-
-<file path=ppt/slides/slide21.xml><?xml version="1.0" encoding="utf-8"?>
-<p:sld xmlns:a="http://schemas.openxmlformats.org/drawingml/2006/main" xmlns:r="http://schemas.openxmlformats.org/officeDocument/2006/relationships" xmlns:p="http://schemas.openxmlformats.org/presentationml/2006/main">
-  <p:cSld>
-    <p:spTree>
-      <p:nvGrpSpPr>
-        <p:cNvPr id="1" name=""/>
-        <p:cNvGrpSpPr/>
-        <p:nvPr/>
-      </p:nvGrpSpPr>
-      <p:grpSpPr>
-        <a:xfrm>
-          <a:off x="0" y="0"/>
-          <a:ext cx="0" cy="0"/>
-          <a:chOff x="0" y="0"/>
-          <a:chExt cx="0" cy="0"/>
-        </a:xfrm>
-      </p:grpSpPr>
-      <p:sp>
-        <p:nvSpPr>
-          <p:cNvPr id="2" name="TextBox 1">
-            <a:extLst>
-              <a:ext uri="{FF2B5EF4-FFF2-40B4-BE49-F238E27FC236}">
-                <a16:creationId xmlns:a16="http://schemas.microsoft.com/office/drawing/2014/main" id="{211E321F-9F54-498F-BD6F-D26DA9D4DE07}"/>
-              </a:ext>
-            </a:extLst>
-          </p:cNvPr>
-          <p:cNvSpPr txBox="1"/>
-          <p:nvPr/>
-        </p:nvSpPr>
-        <p:spPr>
-          <a:xfrm>
-            <a:off x="586153" y="406400"/>
-            <a:ext cx="2650790" cy="707886"/>
-          </a:xfrm>
-          <a:prstGeom prst="rect">
-            <a:avLst/>
-          </a:prstGeom>
-          <a:noFill/>
-        </p:spPr>
-        <p:txBody>
-          <a:bodyPr wrap="none" rtlCol="0">
-            <a:spAutoFit/>
-          </a:bodyPr>
-          <a:lstStyle/>
-          <a:p>
-            <a:r>
-              <a:rPr lang="en-US" sz="4000" dirty="0"/>
-              <a:t>Branching…</a:t>
-            </a:r>
-          </a:p>
-        </p:txBody>
-      </p:sp>
-      <p:sp>
-        <p:nvSpPr>
-          <p:cNvPr id="3" name="TextBox 2">
-            <a:extLst>
-              <a:ext uri="{FF2B5EF4-FFF2-40B4-BE49-F238E27FC236}">
-                <a16:creationId xmlns:a16="http://schemas.microsoft.com/office/drawing/2014/main" id="{CAF814E6-FC94-4AA4-8BDA-EB411A456B88}"/>
-              </a:ext>
-            </a:extLst>
-          </p:cNvPr>
-          <p:cNvSpPr txBox="1"/>
-          <p:nvPr/>
-        </p:nvSpPr>
-        <p:spPr>
-          <a:xfrm>
-            <a:off x="667149" y="2287244"/>
             <a:ext cx="3519233" cy="1754326"/>
           </a:xfrm>
           <a:prstGeom prst="rect">
@@ -11118,7 +9250,7 @@
 </p:sld>
 </file>
 
-<file path=ppt/slides/slide22.xml><?xml version="1.0" encoding="utf-8"?>
+<file path=ppt/slides/slide21.xml><?xml version="1.0" encoding="utf-8"?>
 <p:sld xmlns:a="http://schemas.openxmlformats.org/drawingml/2006/main" xmlns:r="http://schemas.openxmlformats.org/officeDocument/2006/relationships" xmlns:p="http://schemas.openxmlformats.org/presentationml/2006/main">
   <p:cSld>
     <p:spTree>
@@ -11302,7 +9434,7 @@
 </p:sld>
 </file>
 
-<file path=ppt/slides/slide23.xml><?xml version="1.0" encoding="utf-8"?>
+<file path=ppt/slides/slide22.xml><?xml version="1.0" encoding="utf-8"?>
 <p:sld xmlns:a="http://schemas.openxmlformats.org/drawingml/2006/main" xmlns:r="http://schemas.openxmlformats.org/officeDocument/2006/relationships" xmlns:p="http://schemas.openxmlformats.org/presentationml/2006/main">
   <p:cSld>
     <p:spTree>
@@ -11477,6 +9609,190 @@
     <p:extLst>
       <p:ext uri="{BB962C8B-B14F-4D97-AF65-F5344CB8AC3E}">
         <p14:creationId xmlns:p14="http://schemas.microsoft.com/office/powerpoint/2010/main" val="2320644596"/>
+      </p:ext>
+    </p:extLst>
+  </p:cSld>
+  <p:clrMapOvr>
+    <a:masterClrMapping/>
+  </p:clrMapOvr>
+</p:sld>
+</file>
+
+<file path=ppt/slides/slide23.xml><?xml version="1.0" encoding="utf-8"?>
+<p:sld xmlns:a="http://schemas.openxmlformats.org/drawingml/2006/main" xmlns:r="http://schemas.openxmlformats.org/officeDocument/2006/relationships" xmlns:p="http://schemas.openxmlformats.org/presentationml/2006/main">
+  <p:cSld>
+    <p:spTree>
+      <p:nvGrpSpPr>
+        <p:cNvPr id="1" name=""/>
+        <p:cNvGrpSpPr/>
+        <p:nvPr/>
+      </p:nvGrpSpPr>
+      <p:grpSpPr>
+        <a:xfrm>
+          <a:off x="0" y="0"/>
+          <a:ext cx="0" cy="0"/>
+          <a:chOff x="0" y="0"/>
+          <a:chExt cx="0" cy="0"/>
+        </a:xfrm>
+      </p:grpSpPr>
+      <p:pic>
+        <p:nvPicPr>
+          <p:cNvPr id="6" name="Picture 5">
+            <a:extLst>
+              <a:ext uri="{FF2B5EF4-FFF2-40B4-BE49-F238E27FC236}">
+                <a16:creationId xmlns:a16="http://schemas.microsoft.com/office/drawing/2014/main" id="{E9453D0D-EA72-4614-A260-3AB2D8BE9A69}"/>
+              </a:ext>
+            </a:extLst>
+          </p:cNvPr>
+          <p:cNvPicPr>
+            <a:picLocks noChangeAspect="1"/>
+          </p:cNvPicPr>
+          <p:nvPr/>
+        </p:nvPicPr>
+        <p:blipFill>
+          <a:blip r:embed="rId3">
+            <a:extLst>
+              <a:ext uri="{28A0092B-C50C-407E-A947-70E740481C1C}">
+                <a14:useLocalDpi xmlns:a14="http://schemas.microsoft.com/office/drawing/2010/main" val="0"/>
+              </a:ext>
+            </a:extLst>
+          </a:blip>
+          <a:stretch>
+            <a:fillRect/>
+          </a:stretch>
+        </p:blipFill>
+        <p:spPr>
+          <a:xfrm>
+            <a:off x="5836422" y="2223270"/>
+            <a:ext cx="6005556" cy="2528906"/>
+          </a:xfrm>
+          <a:prstGeom prst="rect">
+            <a:avLst/>
+          </a:prstGeom>
+        </p:spPr>
+      </p:pic>
+      <p:sp>
+        <p:nvSpPr>
+          <p:cNvPr id="2" name="TextBox 1">
+            <a:extLst>
+              <a:ext uri="{FF2B5EF4-FFF2-40B4-BE49-F238E27FC236}">
+                <a16:creationId xmlns:a16="http://schemas.microsoft.com/office/drawing/2014/main" id="{211E321F-9F54-498F-BD6F-D26DA9D4DE07}"/>
+              </a:ext>
+            </a:extLst>
+          </p:cNvPr>
+          <p:cNvSpPr txBox="1"/>
+          <p:nvPr/>
+        </p:nvSpPr>
+        <p:spPr>
+          <a:xfrm>
+            <a:off x="586153" y="406400"/>
+            <a:ext cx="2650790" cy="707886"/>
+          </a:xfrm>
+          <a:prstGeom prst="rect">
+            <a:avLst/>
+          </a:prstGeom>
+          <a:noFill/>
+        </p:spPr>
+        <p:txBody>
+          <a:bodyPr wrap="none" rtlCol="0">
+            <a:spAutoFit/>
+          </a:bodyPr>
+          <a:lstStyle/>
+          <a:p>
+            <a:r>
+              <a:rPr lang="en-US" sz="4000" dirty="0"/>
+              <a:t>Branching…</a:t>
+            </a:r>
+          </a:p>
+        </p:txBody>
+      </p:sp>
+      <p:sp>
+        <p:nvSpPr>
+          <p:cNvPr id="3" name="TextBox 2">
+            <a:extLst>
+              <a:ext uri="{FF2B5EF4-FFF2-40B4-BE49-F238E27FC236}">
+                <a16:creationId xmlns:a16="http://schemas.microsoft.com/office/drawing/2014/main" id="{CAF814E6-FC94-4AA4-8BDA-EB411A456B88}"/>
+              </a:ext>
+            </a:extLst>
+          </p:cNvPr>
+          <p:cNvSpPr txBox="1"/>
+          <p:nvPr/>
+        </p:nvSpPr>
+        <p:spPr>
+          <a:xfrm>
+            <a:off x="667149" y="2287244"/>
+            <a:ext cx="5272213" cy="1754326"/>
+          </a:xfrm>
+          <a:prstGeom prst="rect">
+            <a:avLst/>
+          </a:prstGeom>
+          <a:noFill/>
+        </p:spPr>
+        <p:txBody>
+          <a:bodyPr wrap="none" rtlCol="0">
+            <a:spAutoFit/>
+          </a:bodyPr>
+          <a:lstStyle/>
+          <a:p>
+            <a:pPr marL="285750" indent="-285750">
+              <a:buFont typeface="Arial" panose="020B0604020202020204" pitchFamily="34" charset="0"/>
+              <a:buChar char="•"/>
+            </a:pPr>
+            <a:r>
+              <a:rPr lang="en-US" dirty="0"/>
+              <a:t>git branch (-d -v) &lt;name&gt;</a:t>
+            </a:r>
+          </a:p>
+          <a:p>
+            <a:pPr marL="285750" indent="-285750">
+              <a:buFont typeface="Arial" panose="020B0604020202020204" pitchFamily="34" charset="0"/>
+              <a:buChar char="•"/>
+            </a:pPr>
+            <a:r>
+              <a:rPr lang="en-US" dirty="0"/>
+              <a:t>git checkout (-b) &lt;branch name&gt;</a:t>
+            </a:r>
+          </a:p>
+          <a:p>
+            <a:pPr marL="285750" indent="-285750">
+              <a:buFont typeface="Arial" panose="020B0604020202020204" pitchFamily="34" charset="0"/>
+              <a:buChar char="•"/>
+            </a:pPr>
+            <a:r>
+              <a:rPr lang="en-US" dirty="0"/>
+              <a:t>git stash </a:t>
+            </a:r>
+          </a:p>
+          <a:p>
+            <a:pPr marL="285750" indent="-285750">
+              <a:buFont typeface="Arial" panose="020B0604020202020204" pitchFamily="34" charset="0"/>
+              <a:buChar char="•"/>
+            </a:pPr>
+            <a:r>
+              <a:rPr lang="en-US" sz="3600" dirty="0">
+                <a:solidFill>
+                  <a:srgbClr val="FF0000"/>
+                </a:solidFill>
+              </a:rPr>
+              <a:t>git merge &lt;branch name&gt;</a:t>
+            </a:r>
+          </a:p>
+          <a:p>
+            <a:pPr marL="285750" indent="-285750">
+              <a:buFont typeface="Arial" panose="020B0604020202020204" pitchFamily="34" charset="0"/>
+              <a:buChar char="•"/>
+            </a:pPr>
+            <a:r>
+              <a:rPr lang="en-US" dirty="0"/>
+              <a:t>git rebase &lt;new base&gt;</a:t>
+            </a:r>
+          </a:p>
+        </p:txBody>
+      </p:sp>
+    </p:spTree>
+    <p:extLst>
+      <p:ext uri="{BB962C8B-B14F-4D97-AF65-F5344CB8AC3E}">
+        <p14:creationId xmlns:p14="http://schemas.microsoft.com/office/powerpoint/2010/main" val="1798754958"/>
       </p:ext>
     </p:extLst>
   </p:cSld>
@@ -11508,7 +9824,7 @@
           <p:cNvPr id="6" name="Picture 5">
             <a:extLst>
               <a:ext uri="{FF2B5EF4-FFF2-40B4-BE49-F238E27FC236}">
-                <a16:creationId xmlns:a16="http://schemas.microsoft.com/office/drawing/2014/main" id="{E9453D0D-EA72-4614-A260-3AB2D8BE9A69}"/>
+                <a16:creationId xmlns:a16="http://schemas.microsoft.com/office/drawing/2014/main" id="{11354057-BADD-48FE-8F38-509E14140C66}"/>
               </a:ext>
             </a:extLst>
           </p:cNvPr>
@@ -11531,8 +9847,8 @@
         </p:blipFill>
         <p:spPr>
           <a:xfrm>
-            <a:off x="5836422" y="2223270"/>
-            <a:ext cx="6005556" cy="2528906"/>
+            <a:off x="5723520" y="1904716"/>
+            <a:ext cx="5929356" cy="2519381"/>
           </a:xfrm>
           <a:prstGeom prst="rect">
             <a:avLst/>
@@ -11660,7 +9976,7 @@
     </p:spTree>
     <p:extLst>
       <p:ext uri="{BB962C8B-B14F-4D97-AF65-F5344CB8AC3E}">
-        <p14:creationId xmlns:p14="http://schemas.microsoft.com/office/powerpoint/2010/main" val="1798754958"/>
+        <p14:creationId xmlns:p14="http://schemas.microsoft.com/office/powerpoint/2010/main" val="1971368743"/>
       </p:ext>
     </p:extLst>
   </p:cSld>
@@ -11689,10 +10005,10 @@
       </p:grpSpPr>
       <p:pic>
         <p:nvPicPr>
-          <p:cNvPr id="6" name="Picture 5">
-            <a:extLst>
-              <a:ext uri="{FF2B5EF4-FFF2-40B4-BE49-F238E27FC236}">
-                <a16:creationId xmlns:a16="http://schemas.microsoft.com/office/drawing/2014/main" id="{11354057-BADD-48FE-8F38-509E14140C66}"/>
+          <p:cNvPr id="5" name="Picture 4">
+            <a:extLst>
+              <a:ext uri="{FF2B5EF4-FFF2-40B4-BE49-F238E27FC236}">
+                <a16:creationId xmlns:a16="http://schemas.microsoft.com/office/drawing/2014/main" id="{44C00943-EF97-482B-95F4-97E8D6B72156}"/>
               </a:ext>
             </a:extLst>
           </p:cNvPr>
@@ -11715,8 +10031,8 @@
         </p:blipFill>
         <p:spPr>
           <a:xfrm>
-            <a:off x="5723520" y="1904716"/>
-            <a:ext cx="5929356" cy="2519381"/>
+            <a:off x="5856389" y="2287244"/>
+            <a:ext cx="5881731" cy="2062178"/>
           </a:xfrm>
           <a:prstGeom prst="rect">
             <a:avLst/>
@@ -11844,7 +10160,7 @@
     </p:spTree>
     <p:extLst>
       <p:ext uri="{BB962C8B-B14F-4D97-AF65-F5344CB8AC3E}">
-        <p14:creationId xmlns:p14="http://schemas.microsoft.com/office/powerpoint/2010/main" val="1971368743"/>
+        <p14:creationId xmlns:p14="http://schemas.microsoft.com/office/powerpoint/2010/main" val="847351172"/>
       </p:ext>
     </p:extLst>
   </p:cSld>
@@ -11871,58 +10187,22 @@
           <a:chExt cx="0" cy="0"/>
         </a:xfrm>
       </p:grpSpPr>
-      <p:pic>
-        <p:nvPicPr>
-          <p:cNvPr id="5" name="Picture 4">
-            <a:extLst>
-              <a:ext uri="{FF2B5EF4-FFF2-40B4-BE49-F238E27FC236}">
-                <a16:creationId xmlns:a16="http://schemas.microsoft.com/office/drawing/2014/main" id="{44C00943-EF97-482B-95F4-97E8D6B72156}"/>
-              </a:ext>
-            </a:extLst>
-          </p:cNvPr>
-          <p:cNvPicPr>
-            <a:picLocks noChangeAspect="1"/>
-          </p:cNvPicPr>
+      <p:sp>
+        <p:nvSpPr>
+          <p:cNvPr id="2" name="TextBox 1">
+            <a:extLst>
+              <a:ext uri="{FF2B5EF4-FFF2-40B4-BE49-F238E27FC236}">
+                <a16:creationId xmlns:a16="http://schemas.microsoft.com/office/drawing/2014/main" id="{A7DDDB86-B195-4824-AC6A-B3B842079334}"/>
+              </a:ext>
+            </a:extLst>
+          </p:cNvPr>
+          <p:cNvSpPr txBox="1"/>
           <p:nvPr/>
-        </p:nvPicPr>
-        <p:blipFill>
-          <a:blip r:embed="rId3">
-            <a:extLst>
-              <a:ext uri="{28A0092B-C50C-407E-A947-70E740481C1C}">
-                <a14:useLocalDpi xmlns:a14="http://schemas.microsoft.com/office/drawing/2010/main" val="0"/>
-              </a:ext>
-            </a:extLst>
-          </a:blip>
-          <a:stretch>
-            <a:fillRect/>
-          </a:stretch>
-        </p:blipFill>
+        </p:nvSpPr>
         <p:spPr>
           <a:xfrm>
-            <a:off x="5856389" y="2287244"/>
-            <a:ext cx="5881731" cy="2062178"/>
-          </a:xfrm>
-          <a:prstGeom prst="rect">
-            <a:avLst/>
-          </a:prstGeom>
-        </p:spPr>
-      </p:pic>
-      <p:sp>
-        <p:nvSpPr>
-          <p:cNvPr id="2" name="TextBox 1">
-            <a:extLst>
-              <a:ext uri="{FF2B5EF4-FFF2-40B4-BE49-F238E27FC236}">
-                <a16:creationId xmlns:a16="http://schemas.microsoft.com/office/drawing/2014/main" id="{211E321F-9F54-498F-BD6F-D26DA9D4DE07}"/>
-              </a:ext>
-            </a:extLst>
-          </p:cNvPr>
-          <p:cNvSpPr txBox="1"/>
-          <p:nvPr/>
-        </p:nvSpPr>
-        <p:spPr>
-          <a:xfrm>
-            <a:off x="586153" y="406400"/>
-            <a:ext cx="2650790" cy="707886"/>
+            <a:off x="604007" y="553673"/>
+            <a:ext cx="4717445" cy="707886"/>
           </a:xfrm>
           <a:prstGeom prst="rect">
             <a:avLst/>
@@ -11937,90 +10217,15 @@
           <a:p>
             <a:r>
               <a:rPr lang="en-US" sz="4000" dirty="0"/>
-              <a:t>Branching…</a:t>
-            </a:r>
-          </a:p>
-        </p:txBody>
-      </p:sp>
-      <p:sp>
-        <p:nvSpPr>
-          <p:cNvPr id="3" name="TextBox 2">
-            <a:extLst>
-              <a:ext uri="{FF2B5EF4-FFF2-40B4-BE49-F238E27FC236}">
-                <a16:creationId xmlns:a16="http://schemas.microsoft.com/office/drawing/2014/main" id="{CAF814E6-FC94-4AA4-8BDA-EB411A456B88}"/>
-              </a:ext>
-            </a:extLst>
-          </p:cNvPr>
-          <p:cNvSpPr txBox="1"/>
-          <p:nvPr/>
-        </p:nvSpPr>
-        <p:spPr>
-          <a:xfrm>
-            <a:off x="667149" y="2287244"/>
-            <a:ext cx="5272213" cy="1754326"/>
-          </a:xfrm>
-          <a:prstGeom prst="rect">
-            <a:avLst/>
-          </a:prstGeom>
-          <a:noFill/>
-        </p:spPr>
-        <p:txBody>
-          <a:bodyPr wrap="none" rtlCol="0">
-            <a:spAutoFit/>
-          </a:bodyPr>
-          <a:lstStyle/>
-          <a:p>
-            <a:pPr marL="285750" indent="-285750">
-              <a:buFont typeface="Arial" panose="020B0604020202020204" pitchFamily="34" charset="0"/>
-              <a:buChar char="•"/>
-            </a:pPr>
-            <a:r>
-              <a:rPr lang="en-US" dirty="0"/>
-              <a:t>git branch (-d -v) &lt;name&gt;</a:t>
-            </a:r>
-          </a:p>
-          <a:p>
-            <a:pPr marL="285750" indent="-285750">
-              <a:buFont typeface="Arial" panose="020B0604020202020204" pitchFamily="34" charset="0"/>
-              <a:buChar char="•"/>
-            </a:pPr>
-            <a:r>
-              <a:rPr lang="en-US" dirty="0"/>
-              <a:t>git checkout (-b) &lt;branch name&gt;</a:t>
-            </a:r>
-          </a:p>
-          <a:p>
-            <a:pPr marL="285750" indent="-285750">
-              <a:buFont typeface="Arial" panose="020B0604020202020204" pitchFamily="34" charset="0"/>
-              <a:buChar char="•"/>
-            </a:pPr>
-            <a:r>
-              <a:rPr lang="en-US" dirty="0"/>
-              <a:t>git stash </a:t>
-            </a:r>
-          </a:p>
-          <a:p>
-            <a:pPr marL="285750" indent="-285750">
-              <a:buFont typeface="Arial" panose="020B0604020202020204" pitchFamily="34" charset="0"/>
-              <a:buChar char="•"/>
-            </a:pPr>
-            <a:r>
-              <a:rPr lang="en-US" sz="3600" dirty="0">
-                <a:solidFill>
-                  <a:srgbClr val="FF0000"/>
-                </a:solidFill>
-              </a:rPr>
-              <a:t>git merge &lt;branch name&gt;</a:t>
-            </a:r>
-          </a:p>
-          <a:p>
-            <a:pPr marL="285750" indent="-285750">
-              <a:buFont typeface="Arial" panose="020B0604020202020204" pitchFamily="34" charset="0"/>
-              <a:buChar char="•"/>
-            </a:pPr>
-            <a:r>
-              <a:rPr lang="en-US" dirty="0"/>
-              <a:t>git rebase &lt;new base&gt;</a:t>
+              <a:t>Set up </a:t>
+            </a:r>
+            <a:r>
+              <a:rPr lang="en-US" sz="4000" dirty="0" err="1"/>
+              <a:t>github</a:t>
+            </a:r>
+            <a:r>
+              <a:rPr lang="en-US" sz="4000" dirty="0"/>
+              <a:t> account</a:t>
             </a:r>
           </a:p>
         </p:txBody>
@@ -12028,7 +10233,7 @@
     </p:spTree>
     <p:extLst>
       <p:ext uri="{BB962C8B-B14F-4D97-AF65-F5344CB8AC3E}">
-        <p14:creationId xmlns:p14="http://schemas.microsoft.com/office/powerpoint/2010/main" val="847351172"/>
+        <p14:creationId xmlns:p14="http://schemas.microsoft.com/office/powerpoint/2010/main" val="4149905578"/>
       </p:ext>
     </p:extLst>
   </p:cSld>
@@ -12060,7 +10265,7 @@
           <p:cNvPr id="2" name="TextBox 1">
             <a:extLst>
               <a:ext uri="{FF2B5EF4-FFF2-40B4-BE49-F238E27FC236}">
-                <a16:creationId xmlns:a16="http://schemas.microsoft.com/office/drawing/2014/main" id="{A7DDDB86-B195-4824-AC6A-B3B842079334}"/>
+                <a16:creationId xmlns:a16="http://schemas.microsoft.com/office/drawing/2014/main" id="{7016066B-1B69-47E2-AA6C-7A8783C812E4}"/>
               </a:ext>
             </a:extLst>
           </p:cNvPr>
@@ -12069,8 +10274,8 @@
         </p:nvSpPr>
         <p:spPr>
           <a:xfrm>
-            <a:off x="604007" y="553673"/>
-            <a:ext cx="4717445" cy="707886"/>
+            <a:off x="419449" y="427839"/>
+            <a:ext cx="6481774" cy="707886"/>
           </a:xfrm>
           <a:prstGeom prst="rect">
             <a:avLst/>
@@ -12085,23 +10290,20 @@
           <a:p>
             <a:r>
               <a:rPr lang="en-US" sz="4000" dirty="0"/>
-              <a:t>Set up </a:t>
+              <a:t>Create/add a project to </a:t>
             </a:r>
             <a:r>
               <a:rPr lang="en-US" sz="4000" dirty="0" err="1"/>
               <a:t>github</a:t>
             </a:r>
-            <a:r>
-              <a:rPr lang="en-US" sz="4000" dirty="0"/>
-              <a:t> account</a:t>
-            </a:r>
+            <a:endParaRPr lang="en-US" sz="4000" dirty="0"/>
           </a:p>
         </p:txBody>
       </p:sp>
     </p:spTree>
     <p:extLst>
       <p:ext uri="{BB962C8B-B14F-4D97-AF65-F5344CB8AC3E}">
-        <p14:creationId xmlns:p14="http://schemas.microsoft.com/office/powerpoint/2010/main" val="4149905578"/>
+        <p14:creationId xmlns:p14="http://schemas.microsoft.com/office/powerpoint/2010/main" val="956517483"/>
       </p:ext>
     </p:extLst>
   </p:cSld>
@@ -12133,7 +10335,7 @@
           <p:cNvPr id="2" name="TextBox 1">
             <a:extLst>
               <a:ext uri="{FF2B5EF4-FFF2-40B4-BE49-F238E27FC236}">
-                <a16:creationId xmlns:a16="http://schemas.microsoft.com/office/drawing/2014/main" id="{7016066B-1B69-47E2-AA6C-7A8783C812E4}"/>
+                <a16:creationId xmlns:a16="http://schemas.microsoft.com/office/drawing/2014/main" id="{300CE20C-A6AB-4F8D-9ED6-7059F3406342}"/>
               </a:ext>
             </a:extLst>
           </p:cNvPr>
@@ -12142,8 +10344,8 @@
         </p:nvSpPr>
         <p:spPr>
           <a:xfrm>
-            <a:off x="419449" y="427839"/>
-            <a:ext cx="6481774" cy="707886"/>
+            <a:off x="285226" y="419450"/>
+            <a:ext cx="6047040" cy="707886"/>
           </a:xfrm>
           <a:prstGeom prst="rect">
             <a:avLst/>
@@ -12158,20 +10360,74 @@
           <a:p>
             <a:r>
               <a:rPr lang="en-US" sz="4000" dirty="0"/>
-              <a:t>Create/add a project to </a:t>
-            </a:r>
-            <a:r>
-              <a:rPr lang="en-US" sz="4000" dirty="0" err="1"/>
-              <a:t>github</a:t>
-            </a:r>
-            <a:endParaRPr lang="en-US" sz="4000" dirty="0"/>
+              <a:t>Workflow with contributors </a:t>
+            </a:r>
+          </a:p>
+        </p:txBody>
+      </p:sp>
+      <p:sp>
+        <p:nvSpPr>
+          <p:cNvPr id="3" name="TextBox 2">
+            <a:extLst>
+              <a:ext uri="{FF2B5EF4-FFF2-40B4-BE49-F238E27FC236}">
+                <a16:creationId xmlns:a16="http://schemas.microsoft.com/office/drawing/2014/main" id="{162A7009-58D9-4C21-AEBF-EBC1D882B395}"/>
+              </a:ext>
+            </a:extLst>
+          </p:cNvPr>
+          <p:cNvSpPr txBox="1"/>
+          <p:nvPr/>
+        </p:nvSpPr>
+        <p:spPr>
+          <a:xfrm>
+            <a:off x="1518407" y="2290194"/>
+            <a:ext cx="1659429" cy="923330"/>
+          </a:xfrm>
+          <a:prstGeom prst="rect">
+            <a:avLst/>
+          </a:prstGeom>
+          <a:noFill/>
+        </p:spPr>
+        <p:txBody>
+          <a:bodyPr wrap="none" rtlCol="0">
+            <a:spAutoFit/>
+          </a:bodyPr>
+          <a:lstStyle/>
+          <a:p>
+            <a:pPr marL="285750" indent="-285750">
+              <a:buFont typeface="Arial" panose="020B0604020202020204" pitchFamily="34" charset="0"/>
+              <a:buChar char="•"/>
+            </a:pPr>
+            <a:r>
+              <a:rPr lang="en-US" dirty="0"/>
+              <a:t>git push/pull</a:t>
+            </a:r>
+          </a:p>
+          <a:p>
+            <a:pPr marL="285750" indent="-285750">
+              <a:buFont typeface="Arial" panose="020B0604020202020204" pitchFamily="34" charset="0"/>
+              <a:buChar char="•"/>
+            </a:pPr>
+            <a:r>
+              <a:rPr lang="en-US" dirty="0"/>
+              <a:t>git branch</a:t>
+            </a:r>
+          </a:p>
+          <a:p>
+            <a:pPr marL="285750" indent="-285750">
+              <a:buFont typeface="Arial" panose="020B0604020202020204" pitchFamily="34" charset="0"/>
+              <a:buChar char="•"/>
+            </a:pPr>
+            <a:r>
+              <a:rPr lang="en-US" dirty="0"/>
+              <a:t>git remote</a:t>
+            </a:r>
           </a:p>
         </p:txBody>
       </p:sp>
     </p:spTree>
     <p:extLst>
       <p:ext uri="{BB962C8B-B14F-4D97-AF65-F5344CB8AC3E}">
-        <p14:creationId xmlns:p14="http://schemas.microsoft.com/office/powerpoint/2010/main" val="956517483"/>
+        <p14:creationId xmlns:p14="http://schemas.microsoft.com/office/powerpoint/2010/main" val="958838245"/>
       </p:ext>
     </p:extLst>
   </p:cSld>
@@ -12198,22 +10454,40 @@
           <a:chExt cx="0" cy="0"/>
         </a:xfrm>
       </p:grpSpPr>
-      <p:sp>
-        <p:nvSpPr>
-          <p:cNvPr id="2" name="TextBox 1">
-            <a:extLst>
-              <a:ext uri="{FF2B5EF4-FFF2-40B4-BE49-F238E27FC236}">
-                <a16:creationId xmlns:a16="http://schemas.microsoft.com/office/drawing/2014/main" id="{300CE20C-A6AB-4F8D-9ED6-7059F3406342}"/>
-              </a:ext>
-            </a:extLst>
-          </p:cNvPr>
+      <p:pic>
+        <p:nvPicPr>
+          <p:cNvPr id="2" name="Picture 1"/>
+          <p:cNvPicPr>
+            <a:picLocks noChangeAspect="1"/>
+          </p:cNvPicPr>
+          <p:nvPr/>
+        </p:nvPicPr>
+        <p:blipFill>
+          <a:blip r:embed="rId2"/>
+          <a:stretch>
+            <a:fillRect/>
+          </a:stretch>
+        </p:blipFill>
+        <p:spPr>
+          <a:xfrm>
+            <a:off x="1608474" y="886084"/>
+            <a:ext cx="8851369" cy="5099158"/>
+          </a:xfrm>
+          <a:prstGeom prst="rect">
+            <a:avLst/>
+          </a:prstGeom>
+        </p:spPr>
+      </p:pic>
+      <p:sp>
+        <p:nvSpPr>
+          <p:cNvPr id="3" name="TextBox 2"/>
           <p:cNvSpPr txBox="1"/>
           <p:nvPr/>
         </p:nvSpPr>
         <p:spPr>
           <a:xfrm>
-            <a:off x="285226" y="419450"/>
-            <a:ext cx="6047040" cy="707886"/>
+            <a:off x="4773107" y="6356195"/>
+            <a:ext cx="1261051" cy="369332"/>
           </a:xfrm>
           <a:prstGeom prst="rect">
             <a:avLst/>
@@ -12227,75 +10501,65 @@
           <a:lstStyle/>
           <a:p>
             <a:r>
-              <a:rPr lang="en-US" sz="4000" dirty="0"/>
-              <a:t>Workflow with contributors </a:t>
-            </a:r>
-          </a:p>
-        </p:txBody>
-      </p:sp>
-      <p:sp>
-        <p:nvSpPr>
-          <p:cNvPr id="3" name="TextBox 2">
-            <a:extLst>
-              <a:ext uri="{FF2B5EF4-FFF2-40B4-BE49-F238E27FC236}">
-                <a16:creationId xmlns:a16="http://schemas.microsoft.com/office/drawing/2014/main" id="{162A7009-58D9-4C21-AEBF-EBC1D882B395}"/>
-              </a:ext>
-            </a:extLst>
-          </p:cNvPr>
-          <p:cNvSpPr txBox="1"/>
+              <a:rPr lang="en-US" dirty="0" smtClean="0"/>
+              <a:t>Local work!</a:t>
+            </a:r>
+            <a:endParaRPr lang="en-US" dirty="0"/>
+          </a:p>
+        </p:txBody>
+      </p:sp>
+      <p:pic>
+        <p:nvPicPr>
+          <p:cNvPr id="4" name="Picture 3"/>
+          <p:cNvPicPr>
+            <a:picLocks noChangeAspect="1"/>
+          </p:cNvPicPr>
           <p:nvPr/>
-        </p:nvSpPr>
+        </p:nvPicPr>
+        <p:blipFill>
+          <a:blip r:embed="rId3"/>
+          <a:stretch>
+            <a:fillRect/>
+          </a:stretch>
+        </p:blipFill>
         <p:spPr>
           <a:xfrm>
-            <a:off x="1518407" y="2290194"/>
-            <a:ext cx="1659429" cy="923330"/>
+            <a:off x="7191375" y="143134"/>
+            <a:ext cx="5000625" cy="742950"/>
           </a:xfrm>
           <a:prstGeom prst="rect">
             <a:avLst/>
           </a:prstGeom>
-          <a:noFill/>
         </p:spPr>
-        <p:txBody>
-          <a:bodyPr wrap="none" rtlCol="0">
-            <a:spAutoFit/>
-          </a:bodyPr>
-          <a:lstStyle/>
-          <a:p>
-            <a:pPr marL="285750" indent="-285750">
-              <a:buFont typeface="Arial" panose="020B0604020202020204" pitchFamily="34" charset="0"/>
-              <a:buChar char="•"/>
-            </a:pPr>
-            <a:r>
-              <a:rPr lang="en-US" dirty="0"/>
-              <a:t>git push/pull</a:t>
-            </a:r>
-          </a:p>
-          <a:p>
-            <a:pPr marL="285750" indent="-285750">
-              <a:buFont typeface="Arial" panose="020B0604020202020204" pitchFamily="34" charset="0"/>
-              <a:buChar char="•"/>
-            </a:pPr>
-            <a:r>
-              <a:rPr lang="en-US" dirty="0"/>
-              <a:t>git branch</a:t>
-            </a:r>
-          </a:p>
-          <a:p>
-            <a:pPr marL="285750" indent="-285750">
-              <a:buFont typeface="Arial" panose="020B0604020202020204" pitchFamily="34" charset="0"/>
-              <a:buChar char="•"/>
-            </a:pPr>
-            <a:r>
-              <a:rPr lang="en-US" dirty="0"/>
-              <a:t>git remote</a:t>
-            </a:r>
-          </a:p>
-        </p:txBody>
-      </p:sp>
+      </p:pic>
+      <p:pic>
+        <p:nvPicPr>
+          <p:cNvPr id="5" name="Picture 4"/>
+          <p:cNvPicPr>
+            <a:picLocks noChangeAspect="1"/>
+          </p:cNvPicPr>
+          <p:nvPr/>
+        </p:nvPicPr>
+        <p:blipFill>
+          <a:blip r:embed="rId4"/>
+          <a:stretch>
+            <a:fillRect/>
+          </a:stretch>
+        </p:blipFill>
+        <p:spPr>
+          <a:xfrm>
+            <a:off x="6707574" y="5667375"/>
+            <a:ext cx="5448300" cy="1190625"/>
+          </a:xfrm>
+          <a:prstGeom prst="rect">
+            <a:avLst/>
+          </a:prstGeom>
+        </p:spPr>
+      </p:pic>
     </p:spTree>
     <p:extLst>
       <p:ext uri="{BB962C8B-B14F-4D97-AF65-F5344CB8AC3E}">
-        <p14:creationId xmlns:p14="http://schemas.microsoft.com/office/powerpoint/2010/main" val="958838245"/>
+        <p14:creationId xmlns:p14="http://schemas.microsoft.com/office/powerpoint/2010/main" val="3964120653"/>
       </p:ext>
     </p:extLst>
   </p:cSld>
@@ -12372,7 +10636,7 @@
         <p:spPr>
           <a:xfrm>
             <a:off x="700548" y="1836174"/>
-            <a:ext cx="10914206" cy="4801314"/>
+            <a:ext cx="10914206" cy="5078313"/>
           </a:xfrm>
           <a:prstGeom prst="rect">
             <a:avLst/>
@@ -12517,6 +10781,18 @@
               <a:rPr lang="en-US" dirty="0"/>
               <a:t>your computer and you lose your data.  </a:t>
             </a:r>
+            <a:endParaRPr lang="en-US" dirty="0" smtClean="0"/>
+          </a:p>
+          <a:p>
+            <a:pPr marL="742950" lvl="1" indent="-285750">
+              <a:buFont typeface="Arial" panose="020B0604020202020204" pitchFamily="34" charset="0"/>
+              <a:buChar char="•"/>
+            </a:pPr>
+            <a:r>
+              <a:rPr lang="en-US" dirty="0" smtClean="0"/>
+              <a:t>Easy to share your work publicly (mention GITHUB)</a:t>
+            </a:r>
+            <a:endParaRPr lang="en-US" dirty="0"/>
           </a:p>
           <a:p>
             <a:pPr lvl="1"/>
@@ -13278,138 +11554,6 @@
           <a:chExt cx="0" cy="0"/>
         </a:xfrm>
       </p:grpSpPr>
-      <p:pic>
-        <p:nvPicPr>
-          <p:cNvPr id="2" name="Picture 1"/>
-          <p:cNvPicPr>
-            <a:picLocks noChangeAspect="1"/>
-          </p:cNvPicPr>
-          <p:nvPr/>
-        </p:nvPicPr>
-        <p:blipFill>
-          <a:blip r:embed="rId2"/>
-          <a:stretch>
-            <a:fillRect/>
-          </a:stretch>
-        </p:blipFill>
-        <p:spPr>
-          <a:xfrm>
-            <a:off x="1608474" y="886084"/>
-            <a:ext cx="8851369" cy="5099158"/>
-          </a:xfrm>
-          <a:prstGeom prst="rect">
-            <a:avLst/>
-          </a:prstGeom>
-        </p:spPr>
-      </p:pic>
-      <p:sp>
-        <p:nvSpPr>
-          <p:cNvPr id="3" name="TextBox 2"/>
-          <p:cNvSpPr txBox="1"/>
-          <p:nvPr/>
-        </p:nvSpPr>
-        <p:spPr>
-          <a:xfrm>
-            <a:off x="4773107" y="6356195"/>
-            <a:ext cx="1261051" cy="369332"/>
-          </a:xfrm>
-          <a:prstGeom prst="rect">
-            <a:avLst/>
-          </a:prstGeom>
-          <a:noFill/>
-        </p:spPr>
-        <p:txBody>
-          <a:bodyPr wrap="none" rtlCol="0">
-            <a:spAutoFit/>
-          </a:bodyPr>
-          <a:lstStyle/>
-          <a:p>
-            <a:r>
-              <a:rPr lang="en-US" dirty="0" smtClean="0"/>
-              <a:t>Local work!</a:t>
-            </a:r>
-            <a:endParaRPr lang="en-US" dirty="0"/>
-          </a:p>
-        </p:txBody>
-      </p:sp>
-      <p:pic>
-        <p:nvPicPr>
-          <p:cNvPr id="4" name="Picture 3"/>
-          <p:cNvPicPr>
-            <a:picLocks noChangeAspect="1"/>
-          </p:cNvPicPr>
-          <p:nvPr/>
-        </p:nvPicPr>
-        <p:blipFill>
-          <a:blip r:embed="rId3"/>
-          <a:stretch>
-            <a:fillRect/>
-          </a:stretch>
-        </p:blipFill>
-        <p:spPr>
-          <a:xfrm>
-            <a:off x="7191375" y="143134"/>
-            <a:ext cx="5000625" cy="742950"/>
-          </a:xfrm>
-          <a:prstGeom prst="rect">
-            <a:avLst/>
-          </a:prstGeom>
-        </p:spPr>
-      </p:pic>
-      <p:pic>
-        <p:nvPicPr>
-          <p:cNvPr id="5" name="Picture 4"/>
-          <p:cNvPicPr>
-            <a:picLocks noChangeAspect="1"/>
-          </p:cNvPicPr>
-          <p:nvPr/>
-        </p:nvPicPr>
-        <p:blipFill>
-          <a:blip r:embed="rId4"/>
-          <a:stretch>
-            <a:fillRect/>
-          </a:stretch>
-        </p:blipFill>
-        <p:spPr>
-          <a:xfrm>
-            <a:off x="6707574" y="5667375"/>
-            <a:ext cx="5448300" cy="1190625"/>
-          </a:xfrm>
-          <a:prstGeom prst="rect">
-            <a:avLst/>
-          </a:prstGeom>
-        </p:spPr>
-      </p:pic>
-    </p:spTree>
-    <p:extLst>
-      <p:ext uri="{BB962C8B-B14F-4D97-AF65-F5344CB8AC3E}">
-        <p14:creationId xmlns:p14="http://schemas.microsoft.com/office/powerpoint/2010/main" val="3964120653"/>
-      </p:ext>
-    </p:extLst>
-  </p:cSld>
-  <p:clrMapOvr>
-    <a:masterClrMapping/>
-  </p:clrMapOvr>
-</p:sld>
-</file>
-
-<file path=ppt/slides/slide8.xml><?xml version="1.0" encoding="utf-8"?>
-<p:sld xmlns:a="http://schemas.openxmlformats.org/drawingml/2006/main" xmlns:r="http://schemas.openxmlformats.org/officeDocument/2006/relationships" xmlns:p="http://schemas.openxmlformats.org/presentationml/2006/main">
-  <p:cSld>
-    <p:spTree>
-      <p:nvGrpSpPr>
-        <p:cNvPr id="1" name=""/>
-        <p:cNvGrpSpPr/>
-        <p:nvPr/>
-      </p:nvGrpSpPr>
-      <p:grpSpPr>
-        <a:xfrm>
-          <a:off x="0" y="0"/>
-          <a:ext cx="0" cy="0"/>
-          <a:chOff x="0" y="0"/>
-          <a:chExt cx="0" cy="0"/>
-        </a:xfrm>
-      </p:grpSpPr>
       <p:sp>
         <p:nvSpPr>
           <p:cNvPr id="2" name="TextBox 1">
@@ -13610,7 +11754,7 @@
 </p:sld>
 </file>
 
-<file path=ppt/slides/slide9.xml><?xml version="1.0" encoding="utf-8"?>
+<file path=ppt/slides/slide8.xml><?xml version="1.0" encoding="utf-8"?>
 <p:sld xmlns:a="http://schemas.openxmlformats.org/drawingml/2006/main" xmlns:r="http://schemas.openxmlformats.org/officeDocument/2006/relationships" xmlns:p="http://schemas.openxmlformats.org/presentationml/2006/main">
   <p:cSld>
     <p:spTree>
@@ -13810,6 +11954,230 @@
     <p:extLst>
       <p:ext uri="{BB962C8B-B14F-4D97-AF65-F5344CB8AC3E}">
         <p14:creationId xmlns:p14="http://schemas.microsoft.com/office/powerpoint/2010/main" val="3045418433"/>
+      </p:ext>
+    </p:extLst>
+  </p:cSld>
+  <p:clrMapOvr>
+    <a:masterClrMapping/>
+  </p:clrMapOvr>
+</p:sld>
+</file>
+
+<file path=ppt/slides/slide9.xml><?xml version="1.0" encoding="utf-8"?>
+<p:sld xmlns:a="http://schemas.openxmlformats.org/drawingml/2006/main" xmlns:r="http://schemas.openxmlformats.org/officeDocument/2006/relationships" xmlns:p="http://schemas.openxmlformats.org/presentationml/2006/main">
+  <p:cSld>
+    <p:spTree>
+      <p:nvGrpSpPr>
+        <p:cNvPr id="1" name=""/>
+        <p:cNvGrpSpPr/>
+        <p:nvPr/>
+      </p:nvGrpSpPr>
+      <p:grpSpPr>
+        <a:xfrm>
+          <a:off x="0" y="0"/>
+          <a:ext cx="0" cy="0"/>
+          <a:chOff x="0" y="0"/>
+          <a:chExt cx="0" cy="0"/>
+        </a:xfrm>
+      </p:grpSpPr>
+      <p:sp>
+        <p:nvSpPr>
+          <p:cNvPr id="2" name="TextBox 1">
+            <a:extLst>
+              <a:ext uri="{FF2B5EF4-FFF2-40B4-BE49-F238E27FC236}">
+                <a16:creationId xmlns:a16="http://schemas.microsoft.com/office/drawing/2014/main" id="{55B00B43-FAAB-4D22-9E01-665E407310BC}"/>
+              </a:ext>
+            </a:extLst>
+          </p:cNvPr>
+          <p:cNvSpPr txBox="1"/>
+          <p:nvPr/>
+        </p:nvSpPr>
+        <p:spPr>
+          <a:xfrm>
+            <a:off x="693173" y="929148"/>
+            <a:ext cx="3525196" cy="707886"/>
+          </a:xfrm>
+          <a:prstGeom prst="rect">
+            <a:avLst/>
+          </a:prstGeom>
+          <a:noFill/>
+        </p:spPr>
+        <p:txBody>
+          <a:bodyPr wrap="none" rtlCol="0">
+            <a:spAutoFit/>
+          </a:bodyPr>
+          <a:lstStyle/>
+          <a:p>
+            <a:r>
+              <a:rPr lang="en-US" sz="4000" dirty="0"/>
+              <a:t>Start a project…</a:t>
+            </a:r>
+          </a:p>
+        </p:txBody>
+      </p:sp>
+      <p:sp>
+        <p:nvSpPr>
+          <p:cNvPr id="3" name="TextBox 2">
+            <a:extLst>
+              <a:ext uri="{FF2B5EF4-FFF2-40B4-BE49-F238E27FC236}">
+                <a16:creationId xmlns:a16="http://schemas.microsoft.com/office/drawing/2014/main" id="{44BD550A-B530-4921-8428-01A27B6ED9C1}"/>
+              </a:ext>
+            </a:extLst>
+          </p:cNvPr>
+          <p:cNvSpPr txBox="1"/>
+          <p:nvPr/>
+        </p:nvSpPr>
+        <p:spPr>
+          <a:xfrm>
+            <a:off x="539262" y="2540000"/>
+            <a:ext cx="5028300" cy="2862322"/>
+          </a:xfrm>
+          <a:prstGeom prst="rect">
+            <a:avLst/>
+          </a:prstGeom>
+          <a:noFill/>
+        </p:spPr>
+        <p:txBody>
+          <a:bodyPr wrap="none" rtlCol="0">
+            <a:spAutoFit/>
+          </a:bodyPr>
+          <a:lstStyle/>
+          <a:p>
+            <a:pPr marL="285750" indent="-285750">
+              <a:buFont typeface="Arial" panose="020B0604020202020204" pitchFamily="34" charset="0"/>
+              <a:buChar char="•"/>
+            </a:pPr>
+            <a:r>
+              <a:rPr lang="en-US" dirty="0"/>
+              <a:t>git </a:t>
+            </a:r>
+            <a:r>
+              <a:rPr lang="en-US" dirty="0" err="1"/>
+              <a:t>init</a:t>
+            </a:r>
+            <a:r>
+              <a:rPr lang="en-US" dirty="0"/>
+              <a:t> </a:t>
+            </a:r>
+          </a:p>
+          <a:p>
+            <a:pPr marL="285750" indent="-285750">
+              <a:buFont typeface="Arial" panose="020B0604020202020204" pitchFamily="34" charset="0"/>
+              <a:buChar char="•"/>
+            </a:pPr>
+            <a:r>
+              <a:rPr lang="en-US" dirty="0"/>
+              <a:t>git add &lt;file&gt;</a:t>
+            </a:r>
+          </a:p>
+          <a:p>
+            <a:pPr marL="285750" indent="-285750">
+              <a:buFont typeface="Arial" panose="020B0604020202020204" pitchFamily="34" charset="0"/>
+              <a:buChar char="•"/>
+            </a:pPr>
+            <a:r>
+              <a:rPr lang="en-US" sz="3600" dirty="0">
+                <a:solidFill>
+                  <a:srgbClr val="FF0000"/>
+                </a:solidFill>
+              </a:rPr>
+              <a:t>git commit </a:t>
+            </a:r>
+            <a:br>
+              <a:rPr lang="en-US" sz="3600" dirty="0">
+                <a:solidFill>
+                  <a:srgbClr val="FF0000"/>
+                </a:solidFill>
+              </a:rPr>
+            </a:br>
+            <a:r>
+              <a:rPr lang="en-US" sz="3600" dirty="0">
+                <a:solidFill>
+                  <a:srgbClr val="FF0000"/>
+                </a:solidFill>
+              </a:rPr>
+              <a:t>     (-m “message” -v  -a )</a:t>
+            </a:r>
+          </a:p>
+          <a:p>
+            <a:pPr marL="285750" indent="-285750">
+              <a:buFont typeface="Arial" panose="020B0604020202020204" pitchFamily="34" charset="0"/>
+              <a:buChar char="•"/>
+            </a:pPr>
+            <a:r>
+              <a:rPr lang="en-US" dirty="0"/>
+              <a:t>git status</a:t>
+            </a:r>
+          </a:p>
+          <a:p>
+            <a:pPr marL="285750" indent="-285750">
+              <a:buFont typeface="Arial" panose="020B0604020202020204" pitchFamily="34" charset="0"/>
+              <a:buChar char="•"/>
+            </a:pPr>
+            <a:r>
+              <a:rPr lang="en-US" dirty="0"/>
+              <a:t>git rm (-f) </a:t>
+            </a:r>
+          </a:p>
+          <a:p>
+            <a:pPr marL="285750" indent="-285750">
+              <a:buFont typeface="Arial" panose="020B0604020202020204" pitchFamily="34" charset="0"/>
+              <a:buChar char="•"/>
+            </a:pPr>
+            <a:r>
+              <a:rPr lang="en-US" dirty="0"/>
+              <a:t>git mv &lt;file from&gt; &lt;file to&gt;</a:t>
+            </a:r>
+          </a:p>
+          <a:p>
+            <a:pPr marL="285750" indent="-285750">
+              <a:buFont typeface="Arial" panose="020B0604020202020204" pitchFamily="34" charset="0"/>
+              <a:buChar char="•"/>
+            </a:pPr>
+            <a:endParaRPr lang="en-US" dirty="0"/>
+          </a:p>
+        </p:txBody>
+      </p:sp>
+      <p:pic>
+        <p:nvPicPr>
+          <p:cNvPr id="5" name="Picture 4">
+            <a:extLst>
+              <a:ext uri="{FF2B5EF4-FFF2-40B4-BE49-F238E27FC236}">
+                <a16:creationId xmlns:a16="http://schemas.microsoft.com/office/drawing/2014/main" id="{9C246DE7-CB84-40C4-AD16-B8FA7268B4A1}"/>
+              </a:ext>
+            </a:extLst>
+          </p:cNvPr>
+          <p:cNvPicPr>
+            <a:picLocks noChangeAspect="1"/>
+          </p:cNvPicPr>
+          <p:nvPr/>
+        </p:nvPicPr>
+        <p:blipFill>
+          <a:blip r:embed="rId3">
+            <a:extLst>
+              <a:ext uri="{28A0092B-C50C-407E-A947-70E740481C1C}">
+                <a14:useLocalDpi xmlns:a14="http://schemas.microsoft.com/office/drawing/2010/main" val="0"/>
+              </a:ext>
+            </a:extLst>
+          </a:blip>
+          <a:stretch>
+            <a:fillRect/>
+          </a:stretch>
+        </p:blipFill>
+        <p:spPr>
+          <a:xfrm>
+            <a:off x="5511568" y="1077925"/>
+            <a:ext cx="5615029" cy="4467258"/>
+          </a:xfrm>
+          <a:prstGeom prst="rect">
+            <a:avLst/>
+          </a:prstGeom>
+        </p:spPr>
+      </p:pic>
+    </p:spTree>
+    <p:extLst>
+      <p:ext uri="{BB962C8B-B14F-4D97-AF65-F5344CB8AC3E}">
+        <p14:creationId xmlns:p14="http://schemas.microsoft.com/office/powerpoint/2010/main" val="3318592949"/>
       </p:ext>
     </p:extLst>
   </p:cSld>

</xml_diff>

<commit_message>
added a slide for github
</commit_message>
<xml_diff>
--- a/learn-to-git.pptx
+++ b/learn-to-git.pptx
@@ -10202,7 +10202,7 @@
         <p:spPr>
           <a:xfrm>
             <a:off x="604007" y="553673"/>
-            <a:ext cx="4717445" cy="707886"/>
+            <a:ext cx="1814920" cy="707886"/>
           </a:xfrm>
           <a:prstGeom prst="rect">
             <a:avLst/>
@@ -10216,20 +10216,280 @@
           <a:lstStyle/>
           <a:p>
             <a:r>
-              <a:rPr lang="en-US" sz="4000" dirty="0"/>
-              <a:t>Set up </a:t>
-            </a:r>
-            <a:r>
-              <a:rPr lang="en-US" sz="4000" dirty="0" err="1"/>
+              <a:rPr lang="en-US" sz="4000" dirty="0" smtClean="0"/>
+              <a:t>GITHUB</a:t>
+            </a:r>
+            <a:endParaRPr lang="en-US" sz="4000" dirty="0"/>
+          </a:p>
+        </p:txBody>
+      </p:sp>
+      <p:sp>
+        <p:nvSpPr>
+          <p:cNvPr id="4" name="Rectangle 3"/>
+          <p:cNvSpPr/>
+          <p:nvPr/>
+        </p:nvSpPr>
+        <p:spPr>
+          <a:xfrm>
+            <a:off x="713685" y="1552012"/>
+            <a:ext cx="4548040" cy="5355312"/>
+          </a:xfrm>
+          <a:prstGeom prst="rect">
+            <a:avLst/>
+          </a:prstGeom>
+        </p:spPr>
+        <p:txBody>
+          <a:bodyPr wrap="none">
+            <a:spAutoFit/>
+          </a:bodyPr>
+          <a:lstStyle/>
+          <a:p>
+            <a:r>
+              <a:rPr lang="en-US" dirty="0" smtClean="0"/>
+              <a:t>Set up an account at </a:t>
+            </a:r>
+            <a:r>
+              <a:rPr lang="en-US" dirty="0" smtClean="0">
+                <a:hlinkClick r:id="rId2"/>
+              </a:rPr>
+              <a:t>https</a:t>
+            </a:r>
+            <a:r>
+              <a:rPr lang="en-US" dirty="0">
+                <a:hlinkClick r:id="rId2"/>
+              </a:rPr>
+              <a:t>://github.com</a:t>
+            </a:r>
+            <a:r>
+              <a:rPr lang="en-US" dirty="0" smtClean="0">
+                <a:hlinkClick r:id="rId2"/>
+              </a:rPr>
+              <a:t>/</a:t>
+            </a:r>
+            <a:r>
+              <a:rPr lang="en-US" dirty="0" smtClean="0"/>
+              <a:t>  </a:t>
+            </a:r>
+          </a:p>
+          <a:p>
+            <a:endParaRPr lang="en-US" dirty="0" smtClean="0"/>
+          </a:p>
+          <a:p>
+            <a:pPr marL="285750" indent="-285750">
+              <a:buFontTx/>
+              <a:buChar char="-"/>
+            </a:pPr>
+            <a:endParaRPr lang="en-US" dirty="0" smtClean="0"/>
+          </a:p>
+          <a:p>
+            <a:r>
+              <a:rPr lang="en-US" dirty="0"/>
+              <a:t>Method </a:t>
+            </a:r>
+            <a:r>
+              <a:rPr lang="en-US" dirty="0" smtClean="0"/>
+              <a:t>1: (If you have a local repo)</a:t>
+            </a:r>
+            <a:endParaRPr lang="en-US" dirty="0"/>
+          </a:p>
+          <a:p>
+            <a:r>
+              <a:rPr lang="en-US" dirty="0" smtClean="0"/>
+              <a:t>- </a:t>
+            </a:r>
+            <a:r>
+              <a:rPr lang="en-US" dirty="0" err="1" smtClean="0"/>
+              <a:t>Git</a:t>
+            </a:r>
+            <a:r>
+              <a:rPr lang="en-US" dirty="0" smtClean="0"/>
+              <a:t> remote add origin &lt;</a:t>
+            </a:r>
+            <a:r>
+              <a:rPr lang="en-US" dirty="0" err="1" smtClean="0"/>
+              <a:t>url</a:t>
+            </a:r>
+            <a:r>
+              <a:rPr lang="en-US" dirty="0" smtClean="0"/>
+              <a:t>&gt;</a:t>
+            </a:r>
+            <a:endParaRPr lang="en-US" dirty="0"/>
+          </a:p>
+          <a:p>
+            <a:r>
+              <a:rPr lang="en-US" dirty="0" smtClean="0"/>
+              <a:t>- Add, commit and Push to origin </a:t>
+            </a:r>
+          </a:p>
+          <a:p>
+            <a:pPr marL="285750" indent="-285750">
+              <a:buFontTx/>
+              <a:buChar char="-"/>
+            </a:pPr>
+            <a:endParaRPr lang="en-US" dirty="0"/>
+          </a:p>
+          <a:p>
+            <a:pPr marL="285750" indent="-285750">
+              <a:buFontTx/>
+              <a:buChar char="-"/>
+            </a:pPr>
+            <a:endParaRPr lang="en-US" dirty="0" smtClean="0"/>
+          </a:p>
+          <a:p>
+            <a:r>
+              <a:rPr lang="en-US" dirty="0"/>
+              <a:t>Method </a:t>
+            </a:r>
+            <a:r>
+              <a:rPr lang="en-US" dirty="0" smtClean="0"/>
+              <a:t>2: (if you are starting a project)</a:t>
+            </a:r>
+            <a:endParaRPr lang="en-US" dirty="0"/>
+          </a:p>
+          <a:p>
+            <a:r>
+              <a:rPr lang="en-US" dirty="0"/>
+              <a:t>- Start a project or a repository</a:t>
+            </a:r>
+          </a:p>
+          <a:p>
+            <a:r>
+              <a:rPr lang="en-US" dirty="0"/>
+              <a:t>- Upload a code</a:t>
+            </a:r>
+          </a:p>
+          <a:p>
+            <a:r>
+              <a:rPr lang="en-US" b="1" dirty="0" smtClean="0"/>
+              <a:t>- Clone</a:t>
+            </a:r>
+            <a:r>
+              <a:rPr lang="en-US" dirty="0" smtClean="0"/>
+              <a:t> </a:t>
+            </a:r>
+            <a:r>
+              <a:rPr lang="en-US" dirty="0"/>
+              <a:t>it in your local </a:t>
+            </a:r>
+            <a:r>
+              <a:rPr lang="en-US" dirty="0" smtClean="0"/>
+              <a:t>repository </a:t>
+            </a:r>
+          </a:p>
+          <a:p>
+            <a:r>
+              <a:rPr lang="en-US" smtClean="0"/>
+              <a:t>- (</a:t>
+            </a:r>
+            <a:r>
+              <a:rPr lang="en-US" dirty="0" smtClean="0"/>
+              <a:t>automatically sets up </a:t>
+            </a:r>
+            <a:r>
+              <a:rPr lang="en-US" dirty="0" err="1" smtClean="0"/>
               <a:t>github</a:t>
             </a:r>
             <a:r>
-              <a:rPr lang="en-US" sz="4000" dirty="0"/>
-              <a:t> account</a:t>
-            </a:r>
-          </a:p>
-        </p:txBody>
-      </p:sp>
+              <a:rPr lang="en-US" dirty="0" smtClean="0"/>
+              <a:t> as the origin)</a:t>
+            </a:r>
+            <a:endParaRPr lang="en-US" dirty="0"/>
+          </a:p>
+          <a:p>
+            <a:r>
+              <a:rPr lang="en-US" dirty="0"/>
+              <a:t>- Communicate with it </a:t>
+            </a:r>
+            <a:r>
+              <a:rPr lang="en-US" dirty="0" smtClean="0"/>
+              <a:t>by commands </a:t>
+            </a:r>
+            <a:r>
+              <a:rPr lang="en-US" dirty="0"/>
+              <a:t>Push-Pull</a:t>
+            </a:r>
+          </a:p>
+          <a:p>
+            <a:pPr marL="285750" indent="-285750">
+              <a:buFontTx/>
+              <a:buChar char="-"/>
+            </a:pPr>
+            <a:endParaRPr lang="en-US" dirty="0"/>
+          </a:p>
+          <a:p>
+            <a:pPr marL="285750" indent="-285750">
+              <a:buFontTx/>
+              <a:buChar char="-"/>
+            </a:pPr>
+            <a:endParaRPr lang="en-US" dirty="0" smtClean="0"/>
+          </a:p>
+          <a:p>
+            <a:pPr marL="285750" indent="-285750">
+              <a:buFontTx/>
+              <a:buChar char="-"/>
+            </a:pPr>
+            <a:endParaRPr lang="en-US" dirty="0"/>
+          </a:p>
+          <a:p>
+            <a:pPr marL="285750" indent="-285750">
+              <a:buFontTx/>
+              <a:buChar char="-"/>
+            </a:pPr>
+            <a:endParaRPr lang="en-US" dirty="0" smtClean="0"/>
+          </a:p>
+          <a:p>
+            <a:endParaRPr lang="en-US" dirty="0" smtClean="0"/>
+          </a:p>
+        </p:txBody>
+      </p:sp>
+      <p:pic>
+        <p:nvPicPr>
+          <p:cNvPr id="6" name="Picture 5"/>
+          <p:cNvPicPr>
+            <a:picLocks noChangeAspect="1"/>
+          </p:cNvPicPr>
+          <p:nvPr/>
+        </p:nvPicPr>
+        <p:blipFill>
+          <a:blip r:embed="rId3"/>
+          <a:stretch>
+            <a:fillRect/>
+          </a:stretch>
+        </p:blipFill>
+        <p:spPr>
+          <a:xfrm>
+            <a:off x="4719637" y="2394116"/>
+            <a:ext cx="4581525" cy="1114425"/>
+          </a:xfrm>
+          <a:prstGeom prst="rect">
+            <a:avLst/>
+          </a:prstGeom>
+        </p:spPr>
+      </p:pic>
+      <p:pic>
+        <p:nvPicPr>
+          <p:cNvPr id="7" name="Picture 6"/>
+          <p:cNvPicPr>
+            <a:picLocks noChangeAspect="1"/>
+          </p:cNvPicPr>
+          <p:nvPr/>
+        </p:nvPicPr>
+        <p:blipFill>
+          <a:blip r:embed="rId4"/>
+          <a:stretch>
+            <a:fillRect/>
+          </a:stretch>
+        </p:blipFill>
+        <p:spPr>
+          <a:xfrm>
+            <a:off x="5261725" y="3888682"/>
+            <a:ext cx="3800475" cy="923925"/>
+          </a:xfrm>
+          <a:prstGeom prst="rect">
+            <a:avLst/>
+          </a:prstGeom>
+        </p:spPr>
+      </p:pic>
     </p:spTree>
     <p:extLst>
       <p:ext uri="{BB962C8B-B14F-4D97-AF65-F5344CB8AC3E}">
@@ -10297,6 +10557,60 @@
               <a:t>github</a:t>
             </a:r>
             <a:endParaRPr lang="en-US" sz="4000" dirty="0"/>
+          </a:p>
+        </p:txBody>
+      </p:sp>
+      <p:sp>
+        <p:nvSpPr>
+          <p:cNvPr id="3" name="TextBox 2"/>
+          <p:cNvSpPr txBox="1"/>
+          <p:nvPr/>
+        </p:nvSpPr>
+        <p:spPr>
+          <a:xfrm>
+            <a:off x="577830" y="1392071"/>
+            <a:ext cx="5717527" cy="369332"/>
+          </a:xfrm>
+          <a:prstGeom prst="rect">
+            <a:avLst/>
+          </a:prstGeom>
+          <a:noFill/>
+        </p:spPr>
+        <p:txBody>
+          <a:bodyPr wrap="none" rtlCol="0">
+            <a:spAutoFit/>
+          </a:bodyPr>
+          <a:lstStyle/>
+          <a:p>
+            <a:r>
+              <a:rPr lang="en-US" dirty="0" smtClean="0"/>
+              <a:t>Add remote repository : </a:t>
+            </a:r>
+            <a:r>
+              <a:rPr lang="en-US" dirty="0" err="1"/>
+              <a:t>git</a:t>
+            </a:r>
+            <a:r>
+              <a:rPr lang="en-US" dirty="0"/>
+              <a:t> remote add &lt;</a:t>
+            </a:r>
+            <a:r>
+              <a:rPr lang="en-US" dirty="0" err="1"/>
+              <a:t>shortname</a:t>
+            </a:r>
+            <a:r>
+              <a:rPr lang="en-US" dirty="0"/>
+              <a:t>&gt; &lt;</a:t>
+            </a:r>
+            <a:r>
+              <a:rPr lang="en-US" dirty="0" err="1"/>
+              <a:t>url</a:t>
+            </a:r>
+            <a:r>
+              <a:rPr lang="en-US" dirty="0"/>
+              <a:t>&gt;</a:t>
+            </a:r>
+            <a:endParaRPr lang="en-US" dirty="0"/>
           </a:p>
         </p:txBody>
       </p:sp>

</xml_diff>

<commit_message>
made changes to github slide
</commit_message>
<xml_diff>
--- a/learn-to-git.pptx
+++ b/learn-to-git.pptx
@@ -5,7 +5,7 @@
     <p:sldMasterId id="2147483648" r:id="rId1"/>
   </p:sldMasterIdLst>
   <p:notesMasterIdLst>
-    <p:notesMasterId r:id="rId31"/>
+    <p:notesMasterId r:id="rId30"/>
   </p:notesMasterIdLst>
   <p:sldIdLst>
     <p:sldId id="256" r:id="rId2"/>
@@ -34,9 +34,8 @@
     <p:sldId id="279" r:id="rId25"/>
     <p:sldId id="282" r:id="rId26"/>
     <p:sldId id="283" r:id="rId27"/>
-    <p:sldId id="284" r:id="rId28"/>
-    <p:sldId id="285" r:id="rId29"/>
-    <p:sldId id="290" r:id="rId30"/>
+    <p:sldId id="285" r:id="rId28"/>
+    <p:sldId id="290" r:id="rId29"/>
   </p:sldIdLst>
   <p:sldSz cx="12192000" cy="6858000"/>
   <p:notesSz cx="6858000" cy="9144000"/>
@@ -10231,8 +10230,8 @@
         </p:nvSpPr>
         <p:spPr>
           <a:xfrm>
-            <a:off x="713685" y="1552012"/>
-            <a:ext cx="4548040" cy="5355312"/>
+            <a:off x="604007" y="1261559"/>
+            <a:ext cx="4548040" cy="6740307"/>
           </a:xfrm>
           <a:prstGeom prst="rect">
             <a:avLst/>
@@ -10288,8 +10287,16 @@
             </a:r>
             <a:r>
               <a:rPr lang="en-US" dirty="0" smtClean="0"/>
-              <a:t>1: (If you have a local repo)</a:t>
-            </a:r>
+              <a:t>1: </a:t>
+            </a:r>
+          </a:p>
+          <a:p>
+            <a:r>
+              <a:rPr lang="en-US" dirty="0" smtClean="0"/>
+              <a:t>(If you have a working local repo)</a:t>
+            </a:r>
+          </a:p>
+          <a:p>
             <a:endParaRPr lang="en-US" dirty="0"/>
           </a:p>
           <a:p>
@@ -10342,14 +10349,37 @@
             </a:r>
             <a:r>
               <a:rPr lang="en-US" dirty="0" smtClean="0"/>
-              <a:t>2: (if you are starting a project)</a:t>
+              <a:t>2: </a:t>
+            </a:r>
+          </a:p>
+          <a:p>
+            <a:r>
+              <a:rPr lang="en-US" dirty="0"/>
+              <a:t>(if you are starting a </a:t>
+            </a:r>
+            <a:r>
+              <a:rPr lang="en-US" dirty="0" smtClean="0"/>
+              <a:t>project or have an </a:t>
+            </a:r>
+          </a:p>
+          <a:p>
+            <a:r>
+              <a:rPr lang="en-US" dirty="0" smtClean="0"/>
+              <a:t>existing repo)</a:t>
             </a:r>
             <a:endParaRPr lang="en-US" dirty="0"/>
           </a:p>
           <a:p>
-            <a:r>
-              <a:rPr lang="en-US" dirty="0"/>
-              <a:t>- Start a project or a repository</a:t>
+            <a:endParaRPr lang="en-US" dirty="0"/>
+          </a:p>
+          <a:p>
+            <a:r>
+              <a:rPr lang="en-US" dirty="0" smtClean="0"/>
+              <a:t>- </a:t>
+            </a:r>
+            <a:r>
+              <a:rPr lang="en-US" dirty="0"/>
+              <a:t>Start a project or a repository</a:t>
             </a:r>
           </a:p>
           <a:p>
@@ -10378,12 +10408,8 @@
           </a:p>
           <a:p>
             <a:r>
-              <a:rPr lang="en-US" smtClean="0"/>
-              <a:t>- (</a:t>
-            </a:r>
-            <a:r>
               <a:rPr lang="en-US" dirty="0" smtClean="0"/>
-              <a:t>automatically sets up </a:t>
+              <a:t>- (automatically sets up </a:t>
             </a:r>
             <a:r>
               <a:rPr lang="en-US" dirty="0" err="1" smtClean="0"/>
@@ -10458,7 +10484,7 @@
         </p:blipFill>
         <p:spPr>
           <a:xfrm>
-            <a:off x="4719637" y="2394116"/>
+            <a:off x="5261725" y="2366820"/>
             <a:ext cx="4581525" cy="1114425"/>
           </a:xfrm>
           <a:prstGeom prst="rect">
@@ -10525,130 +10551,6 @@
           <p:cNvPr id="2" name="TextBox 1">
             <a:extLst>
               <a:ext uri="{FF2B5EF4-FFF2-40B4-BE49-F238E27FC236}">
-                <a16:creationId xmlns:a16="http://schemas.microsoft.com/office/drawing/2014/main" id="{7016066B-1B69-47E2-AA6C-7A8783C812E4}"/>
-              </a:ext>
-            </a:extLst>
-          </p:cNvPr>
-          <p:cNvSpPr txBox="1"/>
-          <p:nvPr/>
-        </p:nvSpPr>
-        <p:spPr>
-          <a:xfrm>
-            <a:off x="419449" y="427839"/>
-            <a:ext cx="6481774" cy="707886"/>
-          </a:xfrm>
-          <a:prstGeom prst="rect">
-            <a:avLst/>
-          </a:prstGeom>
-          <a:noFill/>
-        </p:spPr>
-        <p:txBody>
-          <a:bodyPr wrap="none" rtlCol="0">
-            <a:spAutoFit/>
-          </a:bodyPr>
-          <a:lstStyle/>
-          <a:p>
-            <a:r>
-              <a:rPr lang="en-US" sz="4000" dirty="0"/>
-              <a:t>Create/add a project to </a:t>
-            </a:r>
-            <a:r>
-              <a:rPr lang="en-US" sz="4000" dirty="0" err="1"/>
-              <a:t>github</a:t>
-            </a:r>
-            <a:endParaRPr lang="en-US" sz="4000" dirty="0"/>
-          </a:p>
-        </p:txBody>
-      </p:sp>
-      <p:sp>
-        <p:nvSpPr>
-          <p:cNvPr id="3" name="TextBox 2"/>
-          <p:cNvSpPr txBox="1"/>
-          <p:nvPr/>
-        </p:nvSpPr>
-        <p:spPr>
-          <a:xfrm>
-            <a:off x="577830" y="1392071"/>
-            <a:ext cx="5717527" cy="369332"/>
-          </a:xfrm>
-          <a:prstGeom prst="rect">
-            <a:avLst/>
-          </a:prstGeom>
-          <a:noFill/>
-        </p:spPr>
-        <p:txBody>
-          <a:bodyPr wrap="none" rtlCol="0">
-            <a:spAutoFit/>
-          </a:bodyPr>
-          <a:lstStyle/>
-          <a:p>
-            <a:r>
-              <a:rPr lang="en-US" dirty="0" smtClean="0"/>
-              <a:t>Add remote repository : </a:t>
-            </a:r>
-            <a:r>
-              <a:rPr lang="en-US" dirty="0" err="1"/>
-              <a:t>git</a:t>
-            </a:r>
-            <a:r>
-              <a:rPr lang="en-US" dirty="0"/>
-              <a:t> remote add &lt;</a:t>
-            </a:r>
-            <a:r>
-              <a:rPr lang="en-US" dirty="0" err="1"/>
-              <a:t>shortname</a:t>
-            </a:r>
-            <a:r>
-              <a:rPr lang="en-US" dirty="0"/>
-              <a:t>&gt; &lt;</a:t>
-            </a:r>
-            <a:r>
-              <a:rPr lang="en-US" dirty="0" err="1"/>
-              <a:t>url</a:t>
-            </a:r>
-            <a:r>
-              <a:rPr lang="en-US" dirty="0"/>
-              <a:t>&gt;</a:t>
-            </a:r>
-            <a:endParaRPr lang="en-US" dirty="0"/>
-          </a:p>
-        </p:txBody>
-      </p:sp>
-    </p:spTree>
-    <p:extLst>
-      <p:ext uri="{BB962C8B-B14F-4D97-AF65-F5344CB8AC3E}">
-        <p14:creationId xmlns:p14="http://schemas.microsoft.com/office/powerpoint/2010/main" val="956517483"/>
-      </p:ext>
-    </p:extLst>
-  </p:cSld>
-  <p:clrMapOvr>
-    <a:masterClrMapping/>
-  </p:clrMapOvr>
-</p:sld>
-</file>
-
-<file path=ppt/slides/slide28.xml><?xml version="1.0" encoding="utf-8"?>
-<p:sld xmlns:a="http://schemas.openxmlformats.org/drawingml/2006/main" xmlns:r="http://schemas.openxmlformats.org/officeDocument/2006/relationships" xmlns:p="http://schemas.openxmlformats.org/presentationml/2006/main">
-  <p:cSld>
-    <p:spTree>
-      <p:nvGrpSpPr>
-        <p:cNvPr id="1" name=""/>
-        <p:cNvGrpSpPr/>
-        <p:nvPr/>
-      </p:nvGrpSpPr>
-      <p:grpSpPr>
-        <a:xfrm>
-          <a:off x="0" y="0"/>
-          <a:ext cx="0" cy="0"/>
-          <a:chOff x="0" y="0"/>
-          <a:chExt cx="0" cy="0"/>
-        </a:xfrm>
-      </p:grpSpPr>
-      <p:sp>
-        <p:nvSpPr>
-          <p:cNvPr id="2" name="TextBox 1">
-            <a:extLst>
-              <a:ext uri="{FF2B5EF4-FFF2-40B4-BE49-F238E27FC236}">
                 <a16:creationId xmlns:a16="http://schemas.microsoft.com/office/drawing/2014/main" id="{300CE20C-A6AB-4F8D-9ED6-7059F3406342}"/>
               </a:ext>
             </a:extLst>
@@ -10693,7 +10595,7 @@
         </p:nvSpPr>
         <p:spPr>
           <a:xfrm>
-            <a:off x="1518407" y="2290194"/>
+            <a:off x="1354634" y="1403090"/>
             <a:ext cx="1659429" cy="923330"/>
           </a:xfrm>
           <a:prstGeom prst="rect">
@@ -10751,7 +10653,7 @@
 </p:sld>
 </file>
 
-<file path=ppt/slides/slide29.xml><?xml version="1.0" encoding="utf-8"?>
+<file path=ppt/slides/slide28.xml><?xml version="1.0" encoding="utf-8"?>
 <p:sld xmlns:a="http://schemas.openxmlformats.org/drawingml/2006/main" xmlns:r="http://schemas.openxmlformats.org/officeDocument/2006/relationships" xmlns:p="http://schemas.openxmlformats.org/presentationml/2006/main">
   <p:cSld>
     <p:spTree>

</xml_diff>

<commit_message>
added a figure for workflow
</commit_message>
<xml_diff>
--- a/learn-to-git.pptx
+++ b/learn-to-git.pptx
@@ -10640,6 +10640,47 @@
           </a:p>
         </p:txBody>
       </p:sp>
+      <p:pic>
+        <p:nvPicPr>
+          <p:cNvPr id="2050" name="Picture 2" descr="Image result for git push pull diagram"/>
+          <p:cNvPicPr>
+            <a:picLocks noChangeAspect="1" noChangeArrowheads="1"/>
+          </p:cNvPicPr>
+          <p:nvPr/>
+        </p:nvPicPr>
+        <p:blipFill>
+          <a:blip r:embed="rId2">
+            <a:extLst>
+              <a:ext uri="{28A0092B-C50C-407E-A947-70E740481C1C}">
+                <a14:useLocalDpi xmlns:a14="http://schemas.microsoft.com/office/drawing/2010/main" val="0"/>
+              </a:ext>
+            </a:extLst>
+          </a:blip>
+          <a:srcRect/>
+          <a:stretch>
+            <a:fillRect/>
+          </a:stretch>
+        </p:blipFill>
+        <p:spPr bwMode="auto">
+          <a:xfrm>
+            <a:off x="3795628" y="1864755"/>
+            <a:ext cx="7788809" cy="3935544"/>
+          </a:xfrm>
+          <a:prstGeom prst="rect">
+            <a:avLst/>
+          </a:prstGeom>
+          <a:noFill/>
+          <a:extLst>
+            <a:ext uri="{909E8E84-426E-40DD-AFC4-6F175D3DCCD1}">
+              <a14:hiddenFill xmlns:a14="http://schemas.microsoft.com/office/drawing/2010/main">
+                <a:solidFill>
+                  <a:srgbClr val="FFFFFF"/>
+                </a:solidFill>
+              </a14:hiddenFill>
+            </a:ext>
+          </a:extLst>
+        </p:spPr>
+      </p:pic>
     </p:spTree>
     <p:extLst>
       <p:ext uri="{BB962C8B-B14F-4D97-AF65-F5344CB8AC3E}">

</xml_diff>

<commit_message>
Update presentation after run through.
</commit_message>
<xml_diff>
--- a/learn-to-git.pptx
+++ b/learn-to-git.pptx
@@ -33,8 +33,8 @@
     <p:sldId id="281" r:id="rId24"/>
     <p:sldId id="279" r:id="rId25"/>
     <p:sldId id="282" r:id="rId26"/>
-    <p:sldId id="283" r:id="rId27"/>
-    <p:sldId id="285" r:id="rId28"/>
+    <p:sldId id="285" r:id="rId27"/>
+    <p:sldId id="283" r:id="rId28"/>
     <p:sldId id="290" r:id="rId29"/>
   </p:sldIdLst>
   <p:sldSz cx="12192000" cy="6858000"/>
@@ -7774,7 +7774,7 @@
         <p:spPr>
           <a:xfrm>
             <a:off x="539262" y="2540000"/>
-            <a:ext cx="3555140" cy="2031325"/>
+            <a:ext cx="2987677" cy="1754326"/>
           </a:xfrm>
           <a:prstGeom prst="rect">
             <a:avLst/>
@@ -7821,45 +7821,63 @@
             </a:pPr>
             <a:r>
               <a:rPr lang="en-US" dirty="0"/>
-              <a:t>git commit (-m “message” -v  -a )</a:t>
-            </a:r>
-          </a:p>
-          <a:p>
-            <a:pPr marL="285750" indent="-285750">
-              <a:buFont typeface="Arial" panose="020B0604020202020204" pitchFamily="34" charset="0"/>
-              <a:buChar char="•"/>
-            </a:pPr>
-            <a:r>
-              <a:rPr lang="en-US" dirty="0"/>
-              <a:t>git status</a:t>
-            </a:r>
-          </a:p>
-          <a:p>
-            <a:pPr marL="285750" indent="-285750">
-              <a:buFont typeface="Arial" panose="020B0604020202020204" pitchFamily="34" charset="0"/>
-              <a:buChar char="•"/>
-            </a:pPr>
-            <a:r>
-              <a:rPr lang="en-US" dirty="0"/>
-              <a:t>git rm (-f) </a:t>
-            </a:r>
-          </a:p>
-          <a:p>
-            <a:pPr marL="285750" indent="-285750">
-              <a:buFont typeface="Arial" panose="020B0604020202020204" pitchFamily="34" charset="0"/>
-              <a:buChar char="•"/>
-            </a:pPr>
-            <a:r>
-              <a:rPr lang="en-US" dirty="0"/>
-              <a:t>git mv &lt;file from&gt; &lt;file to&gt;</a:t>
-            </a:r>
-          </a:p>
-          <a:p>
-            <a:pPr marL="285750" indent="-285750">
-              <a:buFont typeface="Arial" panose="020B0604020202020204" pitchFamily="34" charset="0"/>
-              <a:buChar char="•"/>
-            </a:pPr>
+              <a:t>git commit (-m “message</a:t>
+            </a:r>
+            <a:r>
+              <a:rPr lang="en-US" dirty="0" smtClean="0"/>
+              <a:t>”)</a:t>
+            </a:r>
             <a:endParaRPr lang="en-US" dirty="0"/>
+          </a:p>
+          <a:p>
+            <a:pPr marL="285750" indent="-285750">
+              <a:buFont typeface="Arial" panose="020B0604020202020204" pitchFamily="34" charset="0"/>
+              <a:buChar char="•"/>
+            </a:pPr>
+            <a:r>
+              <a:rPr lang="en-US" dirty="0" err="1"/>
+              <a:t>git</a:t>
+            </a:r>
+            <a:r>
+              <a:rPr lang="en-US" dirty="0"/>
+              <a:t> </a:t>
+            </a:r>
+            <a:r>
+              <a:rPr lang="en-US" dirty="0" smtClean="0"/>
+              <a:t>status</a:t>
+            </a:r>
+          </a:p>
+          <a:p>
+            <a:pPr marL="285750" indent="-285750">
+              <a:buFont typeface="Arial" panose="020B0604020202020204" pitchFamily="34" charset="0"/>
+              <a:buChar char="•"/>
+            </a:pPr>
+            <a:r>
+              <a:rPr lang="en-US" dirty="0" err="1"/>
+              <a:t>git</a:t>
+            </a:r>
+            <a:r>
+              <a:rPr lang="en-US" dirty="0"/>
+              <a:t> mv &lt;file from&gt; &lt;file to&gt;</a:t>
+            </a:r>
+          </a:p>
+          <a:p>
+            <a:pPr marL="285750" indent="-285750">
+              <a:buFont typeface="Arial" panose="020B0604020202020204" pitchFamily="34" charset="0"/>
+              <a:buChar char="•"/>
+            </a:pPr>
+            <a:r>
+              <a:rPr lang="en-US" dirty="0" err="1" smtClean="0"/>
+              <a:t>git</a:t>
+            </a:r>
+            <a:r>
+              <a:rPr lang="en-US" dirty="0" smtClean="0"/>
+              <a:t> </a:t>
+            </a:r>
+            <a:r>
+              <a:rPr lang="en-US" dirty="0"/>
+              <a:t>rm (-f) </a:t>
+            </a:r>
           </a:p>
         </p:txBody>
       </p:sp>
@@ -8119,7 +8137,7 @@
         <p:spPr>
           <a:xfrm>
             <a:off x="667149" y="2287244"/>
-            <a:ext cx="3629520" cy="2308324"/>
+            <a:ext cx="3972691" cy="3139321"/>
           </a:xfrm>
           <a:prstGeom prst="rect">
             <a:avLst/>
@@ -8144,20 +8162,21 @@
               </a:rPr>
               <a:t>git branch </a:t>
             </a:r>
-            <a:br>
+            <a:r>
+              <a:rPr lang="en-US" sz="3600" dirty="0" smtClean="0">
+                <a:solidFill>
+                  <a:srgbClr val="FF0000"/>
+                </a:solidFill>
+              </a:rPr>
+              <a:t>&lt;</a:t>
+            </a:r>
+            <a:r>
               <a:rPr lang="en-US" sz="3600" dirty="0">
                 <a:solidFill>
                   <a:srgbClr val="FF0000"/>
                 </a:solidFill>
               </a:rPr>
-            </a:br>
-            <a:r>
-              <a:rPr lang="en-US" sz="3600" dirty="0">
-                <a:solidFill>
-                  <a:srgbClr val="FF0000"/>
-                </a:solidFill>
-              </a:rPr>
-              <a:t>    (-d -v) &lt;name&gt;</a:t>
+              <a:t>name&gt;</a:t>
             </a:r>
           </a:p>
           <a:p>
@@ -8197,8 +8216,61 @@
             </a:pPr>
             <a:r>
               <a:rPr lang="en-US" dirty="0"/>
-              <a:t>git rebase &lt;new base&gt;</a:t>
-            </a:r>
+              <a:t>git rebase &lt;new base</a:t>
+            </a:r>
+            <a:r>
+              <a:rPr lang="en-US" dirty="0" smtClean="0"/>
+              <a:t>&gt;</a:t>
+            </a:r>
+          </a:p>
+          <a:p>
+            <a:pPr marL="285750" indent="-285750">
+              <a:buFont typeface="Arial" panose="020B0604020202020204" pitchFamily="34" charset="0"/>
+              <a:buChar char="•"/>
+            </a:pPr>
+            <a:endParaRPr lang="en-US" dirty="0"/>
+          </a:p>
+          <a:p>
+            <a:pPr marL="285750" indent="-285750">
+              <a:buFont typeface="Arial" panose="020B0604020202020204" pitchFamily="34" charset="0"/>
+              <a:buChar char="•"/>
+            </a:pPr>
+            <a:endParaRPr lang="en-US" dirty="0" smtClean="0"/>
+          </a:p>
+          <a:p>
+            <a:r>
+              <a:rPr lang="en-US" dirty="0" smtClean="0"/>
+              <a:t>To delete a branch: </a:t>
+            </a:r>
+          </a:p>
+          <a:p>
+            <a:pPr marL="285750" indent="-285750">
+              <a:buFont typeface="Arial" panose="020B0604020202020204" pitchFamily="34" charset="0"/>
+              <a:buChar char="•"/>
+            </a:pPr>
+            <a:r>
+              <a:rPr lang="en-US" dirty="0" err="1"/>
+              <a:t>git</a:t>
+            </a:r>
+            <a:r>
+              <a:rPr lang="en-US" dirty="0"/>
+              <a:t> branch </a:t>
+            </a:r>
+            <a:r>
+              <a:rPr lang="en-US" dirty="0" smtClean="0"/>
+              <a:t>(-</a:t>
+            </a:r>
+            <a:r>
+              <a:rPr lang="en-US" dirty="0"/>
+              <a:t>d) &lt;name&gt;</a:t>
+            </a:r>
+          </a:p>
+          <a:p>
+            <a:pPr marL="285750" indent="-285750">
+              <a:buFont typeface="Arial" panose="020B0604020202020204" pitchFamily="34" charset="0"/>
+              <a:buChar char="•"/>
+            </a:pPr>
+            <a:endParaRPr lang="en-US" dirty="0"/>
           </a:p>
         </p:txBody>
       </p:sp>
@@ -10191,366 +10263,6 @@
           <p:cNvPr id="2" name="TextBox 1">
             <a:extLst>
               <a:ext uri="{FF2B5EF4-FFF2-40B4-BE49-F238E27FC236}">
-                <a16:creationId xmlns:a16="http://schemas.microsoft.com/office/drawing/2014/main" id="{A7DDDB86-B195-4824-AC6A-B3B842079334}"/>
-              </a:ext>
-            </a:extLst>
-          </p:cNvPr>
-          <p:cNvSpPr txBox="1"/>
-          <p:nvPr/>
-        </p:nvSpPr>
-        <p:spPr>
-          <a:xfrm>
-            <a:off x="604007" y="553673"/>
-            <a:ext cx="1814920" cy="707886"/>
-          </a:xfrm>
-          <a:prstGeom prst="rect">
-            <a:avLst/>
-          </a:prstGeom>
-          <a:noFill/>
-        </p:spPr>
-        <p:txBody>
-          <a:bodyPr wrap="none" rtlCol="0">
-            <a:spAutoFit/>
-          </a:bodyPr>
-          <a:lstStyle/>
-          <a:p>
-            <a:r>
-              <a:rPr lang="en-US" sz="4000" dirty="0" smtClean="0"/>
-              <a:t>GITHUB</a:t>
-            </a:r>
-            <a:endParaRPr lang="en-US" sz="4000" dirty="0"/>
-          </a:p>
-        </p:txBody>
-      </p:sp>
-      <p:sp>
-        <p:nvSpPr>
-          <p:cNvPr id="4" name="Rectangle 3"/>
-          <p:cNvSpPr/>
-          <p:nvPr/>
-        </p:nvSpPr>
-        <p:spPr>
-          <a:xfrm>
-            <a:off x="604007" y="1261559"/>
-            <a:ext cx="4548040" cy="6740307"/>
-          </a:xfrm>
-          <a:prstGeom prst="rect">
-            <a:avLst/>
-          </a:prstGeom>
-        </p:spPr>
-        <p:txBody>
-          <a:bodyPr wrap="none">
-            <a:spAutoFit/>
-          </a:bodyPr>
-          <a:lstStyle/>
-          <a:p>
-            <a:r>
-              <a:rPr lang="en-US" dirty="0" smtClean="0"/>
-              <a:t>Set up an account at </a:t>
-            </a:r>
-            <a:r>
-              <a:rPr lang="en-US" dirty="0" smtClean="0">
-                <a:hlinkClick r:id="rId2"/>
-              </a:rPr>
-              <a:t>https</a:t>
-            </a:r>
-            <a:r>
-              <a:rPr lang="en-US" dirty="0">
-                <a:hlinkClick r:id="rId2"/>
-              </a:rPr>
-              <a:t>://github.com</a:t>
-            </a:r>
-            <a:r>
-              <a:rPr lang="en-US" dirty="0" smtClean="0">
-                <a:hlinkClick r:id="rId2"/>
-              </a:rPr>
-              <a:t>/</a:t>
-            </a:r>
-            <a:r>
-              <a:rPr lang="en-US" dirty="0" smtClean="0"/>
-              <a:t>  </a:t>
-            </a:r>
-          </a:p>
-          <a:p>
-            <a:endParaRPr lang="en-US" dirty="0" smtClean="0"/>
-          </a:p>
-          <a:p>
-            <a:pPr marL="285750" indent="-285750">
-              <a:buFontTx/>
-              <a:buChar char="-"/>
-            </a:pPr>
-            <a:endParaRPr lang="en-US" dirty="0" smtClean="0"/>
-          </a:p>
-          <a:p>
-            <a:r>
-              <a:rPr lang="en-US" dirty="0"/>
-              <a:t>Method </a:t>
-            </a:r>
-            <a:r>
-              <a:rPr lang="en-US" dirty="0" smtClean="0"/>
-              <a:t>1: </a:t>
-            </a:r>
-          </a:p>
-          <a:p>
-            <a:r>
-              <a:rPr lang="en-US" dirty="0" smtClean="0"/>
-              <a:t>(If you have a working local repo)</a:t>
-            </a:r>
-          </a:p>
-          <a:p>
-            <a:endParaRPr lang="en-US" dirty="0"/>
-          </a:p>
-          <a:p>
-            <a:r>
-              <a:rPr lang="en-US" dirty="0" smtClean="0"/>
-              <a:t>- </a:t>
-            </a:r>
-            <a:r>
-              <a:rPr lang="en-US" dirty="0" err="1" smtClean="0"/>
-              <a:t>Git</a:t>
-            </a:r>
-            <a:r>
-              <a:rPr lang="en-US" dirty="0" smtClean="0"/>
-              <a:t> remote add origin &lt;</a:t>
-            </a:r>
-            <a:r>
-              <a:rPr lang="en-US" dirty="0" err="1" smtClean="0"/>
-              <a:t>url</a:t>
-            </a:r>
-            <a:r>
-              <a:rPr lang="en-US" dirty="0" smtClean="0"/>
-              <a:t>&gt;</a:t>
-            </a:r>
-            <a:endParaRPr lang="en-US" dirty="0"/>
-          </a:p>
-          <a:p>
-            <a:r>
-              <a:rPr lang="en-US" dirty="0" smtClean="0"/>
-              <a:t>- Add, commit and Push to origin </a:t>
-            </a:r>
-          </a:p>
-          <a:p>
-            <a:pPr marL="285750" indent="-285750">
-              <a:buFontTx/>
-              <a:buChar char="-"/>
-            </a:pPr>
-            <a:endParaRPr lang="en-US" dirty="0"/>
-          </a:p>
-          <a:p>
-            <a:pPr marL="285750" indent="-285750">
-              <a:buFontTx/>
-              <a:buChar char="-"/>
-            </a:pPr>
-            <a:endParaRPr lang="en-US" dirty="0" smtClean="0"/>
-          </a:p>
-          <a:p>
-            <a:r>
-              <a:rPr lang="en-US" dirty="0"/>
-              <a:t>Method </a:t>
-            </a:r>
-            <a:r>
-              <a:rPr lang="en-US" dirty="0" smtClean="0"/>
-              <a:t>2: </a:t>
-            </a:r>
-          </a:p>
-          <a:p>
-            <a:r>
-              <a:rPr lang="en-US" dirty="0"/>
-              <a:t>(if you are starting a </a:t>
-            </a:r>
-            <a:r>
-              <a:rPr lang="en-US" dirty="0" smtClean="0"/>
-              <a:t>project or have an </a:t>
-            </a:r>
-          </a:p>
-          <a:p>
-            <a:r>
-              <a:rPr lang="en-US" dirty="0" smtClean="0"/>
-              <a:t>existing repo)</a:t>
-            </a:r>
-            <a:endParaRPr lang="en-US" dirty="0"/>
-          </a:p>
-          <a:p>
-            <a:endParaRPr lang="en-US" dirty="0"/>
-          </a:p>
-          <a:p>
-            <a:r>
-              <a:rPr lang="en-US" dirty="0" smtClean="0"/>
-              <a:t>- </a:t>
-            </a:r>
-            <a:r>
-              <a:rPr lang="en-US" dirty="0"/>
-              <a:t>Start a project or a repository</a:t>
-            </a:r>
-          </a:p>
-          <a:p>
-            <a:r>
-              <a:rPr lang="en-US" dirty="0"/>
-              <a:t>- Upload a code</a:t>
-            </a:r>
-          </a:p>
-          <a:p>
-            <a:r>
-              <a:rPr lang="en-US" b="1" dirty="0" smtClean="0"/>
-              <a:t>- Clone</a:t>
-            </a:r>
-            <a:r>
-              <a:rPr lang="en-US" dirty="0" smtClean="0"/>
-              <a:t> </a:t>
-            </a:r>
-            <a:r>
-              <a:rPr lang="en-US" dirty="0"/>
-              <a:t>it in your local </a:t>
-            </a:r>
-            <a:r>
-              <a:rPr lang="en-US" dirty="0" smtClean="0"/>
-              <a:t>repository </a:t>
-            </a:r>
-          </a:p>
-          <a:p>
-            <a:r>
-              <a:rPr lang="en-US" dirty="0" smtClean="0"/>
-              <a:t>- (automatically sets up </a:t>
-            </a:r>
-            <a:r>
-              <a:rPr lang="en-US" dirty="0" err="1" smtClean="0"/>
-              <a:t>github</a:t>
-            </a:r>
-            <a:r>
-              <a:rPr lang="en-US" dirty="0" smtClean="0"/>
-              <a:t> as the origin)</a:t>
-            </a:r>
-            <a:endParaRPr lang="en-US" dirty="0"/>
-          </a:p>
-          <a:p>
-            <a:r>
-              <a:rPr lang="en-US" dirty="0"/>
-              <a:t>- Communicate with it </a:t>
-            </a:r>
-            <a:r>
-              <a:rPr lang="en-US" dirty="0" smtClean="0"/>
-              <a:t>by commands </a:t>
-            </a:r>
-            <a:r>
-              <a:rPr lang="en-US" dirty="0"/>
-              <a:t>Push-Pull</a:t>
-            </a:r>
-          </a:p>
-          <a:p>
-            <a:pPr marL="285750" indent="-285750">
-              <a:buFontTx/>
-              <a:buChar char="-"/>
-            </a:pPr>
-            <a:endParaRPr lang="en-US" dirty="0"/>
-          </a:p>
-          <a:p>
-            <a:pPr marL="285750" indent="-285750">
-              <a:buFontTx/>
-              <a:buChar char="-"/>
-            </a:pPr>
-            <a:endParaRPr lang="en-US" dirty="0" smtClean="0"/>
-          </a:p>
-          <a:p>
-            <a:pPr marL="285750" indent="-285750">
-              <a:buFontTx/>
-              <a:buChar char="-"/>
-            </a:pPr>
-            <a:endParaRPr lang="en-US" dirty="0"/>
-          </a:p>
-          <a:p>
-            <a:pPr marL="285750" indent="-285750">
-              <a:buFontTx/>
-              <a:buChar char="-"/>
-            </a:pPr>
-            <a:endParaRPr lang="en-US" dirty="0" smtClean="0"/>
-          </a:p>
-          <a:p>
-            <a:endParaRPr lang="en-US" dirty="0" smtClean="0"/>
-          </a:p>
-        </p:txBody>
-      </p:sp>
-      <p:pic>
-        <p:nvPicPr>
-          <p:cNvPr id="6" name="Picture 5"/>
-          <p:cNvPicPr>
-            <a:picLocks noChangeAspect="1"/>
-          </p:cNvPicPr>
-          <p:nvPr/>
-        </p:nvPicPr>
-        <p:blipFill>
-          <a:blip r:embed="rId3"/>
-          <a:stretch>
-            <a:fillRect/>
-          </a:stretch>
-        </p:blipFill>
-        <p:spPr>
-          <a:xfrm>
-            <a:off x="5261725" y="2366820"/>
-            <a:ext cx="4581525" cy="1114425"/>
-          </a:xfrm>
-          <a:prstGeom prst="rect">
-            <a:avLst/>
-          </a:prstGeom>
-        </p:spPr>
-      </p:pic>
-      <p:pic>
-        <p:nvPicPr>
-          <p:cNvPr id="7" name="Picture 6"/>
-          <p:cNvPicPr>
-            <a:picLocks noChangeAspect="1"/>
-          </p:cNvPicPr>
-          <p:nvPr/>
-        </p:nvPicPr>
-        <p:blipFill>
-          <a:blip r:embed="rId4"/>
-          <a:stretch>
-            <a:fillRect/>
-          </a:stretch>
-        </p:blipFill>
-        <p:spPr>
-          <a:xfrm>
-            <a:off x="5261725" y="3888682"/>
-            <a:ext cx="3800475" cy="923925"/>
-          </a:xfrm>
-          <a:prstGeom prst="rect">
-            <a:avLst/>
-          </a:prstGeom>
-        </p:spPr>
-      </p:pic>
-    </p:spTree>
-    <p:extLst>
-      <p:ext uri="{BB962C8B-B14F-4D97-AF65-F5344CB8AC3E}">
-        <p14:creationId xmlns:p14="http://schemas.microsoft.com/office/powerpoint/2010/main" val="4149905578"/>
-      </p:ext>
-    </p:extLst>
-  </p:cSld>
-  <p:clrMapOvr>
-    <a:masterClrMapping/>
-  </p:clrMapOvr>
-</p:sld>
-</file>
-
-<file path=ppt/slides/slide27.xml><?xml version="1.0" encoding="utf-8"?>
-<p:sld xmlns:a="http://schemas.openxmlformats.org/drawingml/2006/main" xmlns:r="http://schemas.openxmlformats.org/officeDocument/2006/relationships" xmlns:p="http://schemas.openxmlformats.org/presentationml/2006/main">
-  <p:cSld>
-    <p:spTree>
-      <p:nvGrpSpPr>
-        <p:cNvPr id="1" name=""/>
-        <p:cNvGrpSpPr/>
-        <p:nvPr/>
-      </p:nvGrpSpPr>
-      <p:grpSpPr>
-        <a:xfrm>
-          <a:off x="0" y="0"/>
-          <a:ext cx="0" cy="0"/>
-          <a:chOff x="0" y="0"/>
-          <a:chExt cx="0" cy="0"/>
-        </a:xfrm>
-      </p:grpSpPr>
-      <p:sp>
-        <p:nvSpPr>
-          <p:cNvPr id="2" name="TextBox 1">
-            <a:extLst>
-              <a:ext uri="{FF2B5EF4-FFF2-40B4-BE49-F238E27FC236}">
                 <a16:creationId xmlns:a16="http://schemas.microsoft.com/office/drawing/2014/main" id="{300CE20C-A6AB-4F8D-9ED6-7059F3406342}"/>
               </a:ext>
             </a:extLst>
@@ -10685,6 +10397,365 @@
     <p:extLst>
       <p:ext uri="{BB962C8B-B14F-4D97-AF65-F5344CB8AC3E}">
         <p14:creationId xmlns:p14="http://schemas.microsoft.com/office/powerpoint/2010/main" val="958838245"/>
+      </p:ext>
+    </p:extLst>
+  </p:cSld>
+  <p:clrMapOvr>
+    <a:masterClrMapping/>
+  </p:clrMapOvr>
+</p:sld>
+</file>
+
+<file path=ppt/slides/slide27.xml><?xml version="1.0" encoding="utf-8"?>
+<p:sld xmlns:a="http://schemas.openxmlformats.org/drawingml/2006/main" xmlns:r="http://schemas.openxmlformats.org/officeDocument/2006/relationships" xmlns:p="http://schemas.openxmlformats.org/presentationml/2006/main">
+  <p:cSld>
+    <p:spTree>
+      <p:nvGrpSpPr>
+        <p:cNvPr id="1" name=""/>
+        <p:cNvGrpSpPr/>
+        <p:nvPr/>
+      </p:nvGrpSpPr>
+      <p:grpSpPr>
+        <a:xfrm>
+          <a:off x="0" y="0"/>
+          <a:ext cx="0" cy="0"/>
+          <a:chOff x="0" y="0"/>
+          <a:chExt cx="0" cy="0"/>
+        </a:xfrm>
+      </p:grpSpPr>
+      <p:sp>
+        <p:nvSpPr>
+          <p:cNvPr id="2" name="TextBox 1">
+            <a:extLst>
+              <a:ext uri="{FF2B5EF4-FFF2-40B4-BE49-F238E27FC236}">
+                <a16:creationId xmlns:a16="http://schemas.microsoft.com/office/drawing/2014/main" id="{A7DDDB86-B195-4824-AC6A-B3B842079334}"/>
+              </a:ext>
+            </a:extLst>
+          </p:cNvPr>
+          <p:cNvSpPr txBox="1"/>
+          <p:nvPr/>
+        </p:nvSpPr>
+        <p:spPr>
+          <a:xfrm>
+            <a:off x="604007" y="553673"/>
+            <a:ext cx="1814920" cy="707886"/>
+          </a:xfrm>
+          <a:prstGeom prst="rect">
+            <a:avLst/>
+          </a:prstGeom>
+          <a:noFill/>
+        </p:spPr>
+        <p:txBody>
+          <a:bodyPr wrap="none" rtlCol="0">
+            <a:spAutoFit/>
+          </a:bodyPr>
+          <a:lstStyle/>
+          <a:p>
+            <a:r>
+              <a:rPr lang="en-US" sz="4000" dirty="0" smtClean="0"/>
+              <a:t>GITHUB</a:t>
+            </a:r>
+            <a:endParaRPr lang="en-US" sz="4000" dirty="0"/>
+          </a:p>
+        </p:txBody>
+      </p:sp>
+      <p:sp>
+        <p:nvSpPr>
+          <p:cNvPr id="4" name="Rectangle 3"/>
+          <p:cNvSpPr/>
+          <p:nvPr/>
+        </p:nvSpPr>
+        <p:spPr>
+          <a:xfrm>
+            <a:off x="604007" y="1261559"/>
+            <a:ext cx="4803110" cy="6463308"/>
+          </a:xfrm>
+          <a:prstGeom prst="rect">
+            <a:avLst/>
+          </a:prstGeom>
+        </p:spPr>
+        <p:txBody>
+          <a:bodyPr wrap="none">
+            <a:spAutoFit/>
+          </a:bodyPr>
+          <a:lstStyle/>
+          <a:p>
+            <a:r>
+              <a:rPr lang="en-US" dirty="0" smtClean="0"/>
+              <a:t>Set up an account at </a:t>
+            </a:r>
+            <a:r>
+              <a:rPr lang="en-US" dirty="0" smtClean="0">
+                <a:hlinkClick r:id="rId2"/>
+              </a:rPr>
+              <a:t>https</a:t>
+            </a:r>
+            <a:r>
+              <a:rPr lang="en-US" dirty="0">
+                <a:hlinkClick r:id="rId2"/>
+              </a:rPr>
+              <a:t>://github.com</a:t>
+            </a:r>
+            <a:r>
+              <a:rPr lang="en-US" dirty="0" smtClean="0">
+                <a:hlinkClick r:id="rId2"/>
+              </a:rPr>
+              <a:t>/</a:t>
+            </a:r>
+            <a:r>
+              <a:rPr lang="en-US" dirty="0" smtClean="0"/>
+              <a:t>  </a:t>
+            </a:r>
+          </a:p>
+          <a:p>
+            <a:endParaRPr lang="en-US" dirty="0" smtClean="0"/>
+          </a:p>
+          <a:p>
+            <a:pPr marL="285750" indent="-285750">
+              <a:buFontTx/>
+              <a:buChar char="-"/>
+            </a:pPr>
+            <a:endParaRPr lang="en-US" dirty="0" smtClean="0"/>
+          </a:p>
+          <a:p>
+            <a:r>
+              <a:rPr lang="en-US" dirty="0"/>
+              <a:t>Method </a:t>
+            </a:r>
+            <a:r>
+              <a:rPr lang="en-US" dirty="0" smtClean="0"/>
+              <a:t>1: </a:t>
+            </a:r>
+          </a:p>
+          <a:p>
+            <a:r>
+              <a:rPr lang="en-US" dirty="0" smtClean="0"/>
+              <a:t>(If you have a working local repo and you want to</a:t>
+            </a:r>
+          </a:p>
+          <a:p>
+            <a:r>
+              <a:rPr lang="en-US" dirty="0" smtClean="0"/>
+              <a:t> create a remote repo)</a:t>
+            </a:r>
+          </a:p>
+          <a:p>
+            <a:endParaRPr lang="en-US" dirty="0" smtClean="0"/>
+          </a:p>
+          <a:p>
+            <a:r>
+              <a:rPr lang="en-US" dirty="0" smtClean="0"/>
+              <a:t>- Add a repository on </a:t>
+            </a:r>
+            <a:r>
+              <a:rPr lang="en-US" dirty="0" err="1" smtClean="0"/>
+              <a:t>github</a:t>
+            </a:r>
+            <a:r>
+              <a:rPr lang="en-US" dirty="0" smtClean="0"/>
+              <a:t> (the + sign)</a:t>
+            </a:r>
+            <a:endParaRPr lang="en-US" dirty="0"/>
+          </a:p>
+          <a:p>
+            <a:r>
+              <a:rPr lang="en-US" dirty="0" smtClean="0"/>
+              <a:t> - </a:t>
+            </a:r>
+            <a:r>
+              <a:rPr lang="en-US" dirty="0" err="1" smtClean="0"/>
+              <a:t>Git</a:t>
+            </a:r>
+            <a:r>
+              <a:rPr lang="en-US" dirty="0" smtClean="0"/>
+              <a:t> remote add origin &lt;</a:t>
+            </a:r>
+            <a:r>
+              <a:rPr lang="en-US" dirty="0" err="1" smtClean="0"/>
+              <a:t>url</a:t>
+            </a:r>
+            <a:r>
+              <a:rPr lang="en-US" dirty="0" smtClean="0"/>
+              <a:t>&gt;</a:t>
+            </a:r>
+            <a:endParaRPr lang="en-US" dirty="0"/>
+          </a:p>
+          <a:p>
+            <a:r>
+              <a:rPr lang="en-US" dirty="0" smtClean="0"/>
+              <a:t>- Add, commit and push to origin </a:t>
+            </a:r>
+          </a:p>
+          <a:p>
+            <a:pPr marL="285750" indent="-285750">
+              <a:buFontTx/>
+              <a:buChar char="-"/>
+            </a:pPr>
+            <a:endParaRPr lang="en-US" dirty="0"/>
+          </a:p>
+          <a:p>
+            <a:pPr marL="285750" indent="-285750">
+              <a:buFontTx/>
+              <a:buChar char="-"/>
+            </a:pPr>
+            <a:endParaRPr lang="en-US" dirty="0" smtClean="0"/>
+          </a:p>
+          <a:p>
+            <a:r>
+              <a:rPr lang="en-US" dirty="0"/>
+              <a:t>Method </a:t>
+            </a:r>
+            <a:r>
+              <a:rPr lang="en-US" dirty="0" smtClean="0"/>
+              <a:t>2: </a:t>
+            </a:r>
+          </a:p>
+          <a:p>
+            <a:r>
+              <a:rPr lang="en-US" dirty="0" smtClean="0"/>
+              <a:t>(from an existing repo)</a:t>
+            </a:r>
+            <a:endParaRPr lang="en-US" dirty="0"/>
+          </a:p>
+          <a:p>
+            <a:endParaRPr lang="en-US" dirty="0"/>
+          </a:p>
+          <a:p>
+            <a:r>
+              <a:rPr lang="en-US" b="1" dirty="0" smtClean="0"/>
+              <a:t>- Clone</a:t>
+            </a:r>
+            <a:r>
+              <a:rPr lang="en-US" dirty="0" smtClean="0"/>
+              <a:t> </a:t>
+            </a:r>
+            <a:r>
+              <a:rPr lang="en-US" dirty="0"/>
+              <a:t>it in your local </a:t>
+            </a:r>
+            <a:r>
+              <a:rPr lang="en-US" dirty="0" smtClean="0"/>
+              <a:t>repository </a:t>
+            </a:r>
+          </a:p>
+          <a:p>
+            <a:r>
+              <a:rPr lang="en-US" dirty="0"/>
+              <a:t> </a:t>
+            </a:r>
+            <a:r>
+              <a:rPr lang="en-US" dirty="0" smtClean="0"/>
+              <a:t>(automatically sets up </a:t>
+            </a:r>
+            <a:r>
+              <a:rPr lang="en-US" dirty="0" err="1" smtClean="0"/>
+              <a:t>github</a:t>
+            </a:r>
+            <a:r>
+              <a:rPr lang="en-US" dirty="0" smtClean="0"/>
+              <a:t> as the origin)</a:t>
+            </a:r>
+            <a:endParaRPr lang="en-US" dirty="0"/>
+          </a:p>
+          <a:p>
+            <a:r>
+              <a:rPr lang="en-US" dirty="0"/>
+              <a:t>- Communicate with it </a:t>
+            </a:r>
+            <a:r>
+              <a:rPr lang="en-US" dirty="0" smtClean="0"/>
+              <a:t>by commands </a:t>
+            </a:r>
+            <a:r>
+              <a:rPr lang="en-US" dirty="0"/>
+              <a:t>Push-Pull</a:t>
+            </a:r>
+          </a:p>
+          <a:p>
+            <a:pPr marL="285750" indent="-285750">
+              <a:buFontTx/>
+              <a:buChar char="-"/>
+            </a:pPr>
+            <a:endParaRPr lang="en-US" dirty="0"/>
+          </a:p>
+          <a:p>
+            <a:pPr marL="285750" indent="-285750">
+              <a:buFontTx/>
+              <a:buChar char="-"/>
+            </a:pPr>
+            <a:endParaRPr lang="en-US" dirty="0" smtClean="0"/>
+          </a:p>
+          <a:p>
+            <a:pPr marL="285750" indent="-285750">
+              <a:buFontTx/>
+              <a:buChar char="-"/>
+            </a:pPr>
+            <a:endParaRPr lang="en-US" dirty="0"/>
+          </a:p>
+          <a:p>
+            <a:pPr marL="285750" indent="-285750">
+              <a:buFontTx/>
+              <a:buChar char="-"/>
+            </a:pPr>
+            <a:endParaRPr lang="en-US" dirty="0" smtClean="0"/>
+          </a:p>
+          <a:p>
+            <a:endParaRPr lang="en-US" dirty="0" smtClean="0"/>
+          </a:p>
+        </p:txBody>
+      </p:sp>
+      <p:pic>
+        <p:nvPicPr>
+          <p:cNvPr id="6" name="Picture 5"/>
+          <p:cNvPicPr>
+            <a:picLocks noChangeAspect="1"/>
+          </p:cNvPicPr>
+          <p:nvPr/>
+        </p:nvPicPr>
+        <p:blipFill>
+          <a:blip r:embed="rId3"/>
+          <a:stretch>
+            <a:fillRect/>
+          </a:stretch>
+        </p:blipFill>
+        <p:spPr>
+          <a:xfrm>
+            <a:off x="5407117" y="2109166"/>
+            <a:ext cx="6316476" cy="1536440"/>
+          </a:xfrm>
+          <a:prstGeom prst="rect">
+            <a:avLst/>
+          </a:prstGeom>
+        </p:spPr>
+      </p:pic>
+      <p:pic>
+        <p:nvPicPr>
+          <p:cNvPr id="7" name="Picture 6"/>
+          <p:cNvPicPr>
+            <a:picLocks noChangeAspect="1"/>
+          </p:cNvPicPr>
+          <p:nvPr/>
+        </p:nvPicPr>
+        <p:blipFill>
+          <a:blip r:embed="rId4"/>
+          <a:stretch>
+            <a:fillRect/>
+          </a:stretch>
+        </p:blipFill>
+        <p:spPr>
+          <a:xfrm>
+            <a:off x="5407117" y="4493213"/>
+            <a:ext cx="6106371" cy="1484506"/>
+          </a:xfrm>
+          <a:prstGeom prst="rect">
+            <a:avLst/>
+          </a:prstGeom>
+        </p:spPr>
+      </p:pic>
+    </p:spTree>
+    <p:extLst>
+      <p:ext uri="{BB962C8B-B14F-4D97-AF65-F5344CB8AC3E}">
+        <p14:creationId xmlns:p14="http://schemas.microsoft.com/office/powerpoint/2010/main" val="4149905578"/>
       </p:ext>
     </p:extLst>
   </p:cSld>

</xml_diff>

<commit_message>
Adds an explanatory slide for branching
</commit_message>
<xml_diff>
--- a/learn-to-git.pptx
+++ b/learn-to-git.pptx
@@ -5,7 +5,7 @@
     <p:sldMasterId id="2147483648" r:id="rId1"/>
   </p:sldMasterIdLst>
   <p:notesMasterIdLst>
-    <p:notesMasterId r:id="rId30"/>
+    <p:notesMasterId r:id="rId31"/>
   </p:notesMasterIdLst>
   <p:sldIdLst>
     <p:sldId id="256" r:id="rId2"/>
@@ -23,19 +23,20 @@
     <p:sldId id="270" r:id="rId14"/>
     <p:sldId id="273" r:id="rId15"/>
     <p:sldId id="263" r:id="rId16"/>
-    <p:sldId id="264" r:id="rId17"/>
-    <p:sldId id="274" r:id="rId18"/>
-    <p:sldId id="276" r:id="rId19"/>
-    <p:sldId id="275" r:id="rId20"/>
-    <p:sldId id="277" r:id="rId21"/>
-    <p:sldId id="280" r:id="rId22"/>
-    <p:sldId id="278" r:id="rId23"/>
-    <p:sldId id="281" r:id="rId24"/>
-    <p:sldId id="279" r:id="rId25"/>
-    <p:sldId id="282" r:id="rId26"/>
-    <p:sldId id="285" r:id="rId27"/>
-    <p:sldId id="283" r:id="rId28"/>
-    <p:sldId id="290" r:id="rId29"/>
+    <p:sldId id="291" r:id="rId17"/>
+    <p:sldId id="292" r:id="rId18"/>
+    <p:sldId id="274" r:id="rId19"/>
+    <p:sldId id="276" r:id="rId20"/>
+    <p:sldId id="275" r:id="rId21"/>
+    <p:sldId id="277" r:id="rId22"/>
+    <p:sldId id="280" r:id="rId23"/>
+    <p:sldId id="278" r:id="rId24"/>
+    <p:sldId id="281" r:id="rId25"/>
+    <p:sldId id="279" r:id="rId26"/>
+    <p:sldId id="282" r:id="rId27"/>
+    <p:sldId id="285" r:id="rId28"/>
+    <p:sldId id="283" r:id="rId29"/>
+    <p:sldId id="290" r:id="rId30"/>
   </p:sldIdLst>
   <p:sldSz cx="12192000" cy="6858000"/>
   <p:notesSz cx="6858000" cy="9144000"/>
@@ -834,7 +835,7 @@
           <a:p>
             <a:fld id="{1EB1DABF-4E95-4EDF-8DA3-AD2A8632C0A3}" type="slidenum">
               <a:rPr lang="en-US" smtClean="0"/>
-              <a:t>16</a:t>
+              <a:t>17</a:t>
             </a:fld>
             <a:endParaRPr lang="en-US"/>
           </a:p>
@@ -843,7 +844,7 @@
     </p:spTree>
     <p:extLst>
       <p:ext uri="{BB962C8B-B14F-4D97-AF65-F5344CB8AC3E}">
-        <p14:creationId xmlns:p14="http://schemas.microsoft.com/office/powerpoint/2010/main" val="1524038481"/>
+        <p14:creationId xmlns:p14="http://schemas.microsoft.com/office/powerpoint/2010/main" val="1870592075"/>
       </p:ext>
     </p:extLst>
   </p:cSld>
@@ -1011,7 +1012,7 @@
           <a:p>
             <a:fld id="{1EB1DABF-4E95-4EDF-8DA3-AD2A8632C0A3}" type="slidenum">
               <a:rPr lang="en-US" smtClean="0"/>
-              <a:t>17</a:t>
+              <a:t>18</a:t>
             </a:fld>
             <a:endParaRPr lang="en-US"/>
           </a:p>
@@ -1180,7 +1181,7 @@
           <a:p>
             <a:fld id="{1EB1DABF-4E95-4EDF-8DA3-AD2A8632C0A3}" type="slidenum">
               <a:rPr lang="en-US" smtClean="0"/>
-              <a:t>18</a:t>
+              <a:t>19</a:t>
             </a:fld>
             <a:endParaRPr lang="en-US"/>
           </a:p>
@@ -1357,7 +1358,7 @@
           <a:p>
             <a:fld id="{1EB1DABF-4E95-4EDF-8DA3-AD2A8632C0A3}" type="slidenum">
               <a:rPr lang="en-US" smtClean="0"/>
-              <a:t>19</a:t>
+              <a:t>20</a:t>
             </a:fld>
             <a:endParaRPr lang="en-US"/>
           </a:p>
@@ -1534,7 +1535,7 @@
           <a:p>
             <a:fld id="{1EB1DABF-4E95-4EDF-8DA3-AD2A8632C0A3}" type="slidenum">
               <a:rPr lang="en-US" smtClean="0"/>
-              <a:t>20</a:t>
+              <a:t>21</a:t>
             </a:fld>
             <a:endParaRPr lang="en-US"/>
           </a:p>
@@ -1711,7 +1712,7 @@
           <a:p>
             <a:fld id="{1EB1DABF-4E95-4EDF-8DA3-AD2A8632C0A3}" type="slidenum">
               <a:rPr lang="en-US" smtClean="0"/>
-              <a:t>21</a:t>
+              <a:t>22</a:t>
             </a:fld>
             <a:endParaRPr lang="en-US"/>
           </a:p>
@@ -1888,7 +1889,7 @@
           <a:p>
             <a:fld id="{1EB1DABF-4E95-4EDF-8DA3-AD2A8632C0A3}" type="slidenum">
               <a:rPr lang="en-US" smtClean="0"/>
-              <a:t>22</a:t>
+              <a:t>23</a:t>
             </a:fld>
             <a:endParaRPr lang="en-US"/>
           </a:p>
@@ -2065,7 +2066,7 @@
           <a:p>
             <a:fld id="{1EB1DABF-4E95-4EDF-8DA3-AD2A8632C0A3}" type="slidenum">
               <a:rPr lang="en-US" smtClean="0"/>
-              <a:t>23</a:t>
+              <a:t>24</a:t>
             </a:fld>
             <a:endParaRPr lang="en-US"/>
           </a:p>
@@ -2242,7 +2243,7 @@
           <a:p>
             <a:fld id="{1EB1DABF-4E95-4EDF-8DA3-AD2A8632C0A3}" type="slidenum">
               <a:rPr lang="en-US" smtClean="0"/>
-              <a:t>24</a:t>
+              <a:t>25</a:t>
             </a:fld>
             <a:endParaRPr lang="en-US"/>
           </a:p>
@@ -2419,7 +2420,7 @@
           <a:p>
             <a:fld id="{1EB1DABF-4E95-4EDF-8DA3-AD2A8632C0A3}" type="slidenum">
               <a:rPr lang="en-US" smtClean="0"/>
-              <a:t>25</a:t>
+              <a:t>26</a:t>
             </a:fld>
             <a:endParaRPr lang="en-US"/>
           </a:p>
@@ -6761,7 +6762,12 @@
             <p:ph type="ctrTitle"/>
           </p:nvPr>
         </p:nvSpPr>
-        <p:spPr/>
+        <p:spPr>
+          <a:xfrm>
+            <a:off x="1354665" y="1226344"/>
+            <a:ext cx="9144000" cy="2387600"/>
+          </a:xfrm>
+        </p:spPr>
         <p:txBody>
           <a:bodyPr/>
           <a:lstStyle/>
@@ -6789,7 +6795,12 @@
             <p:ph type="subTitle" idx="1"/>
           </p:nvPr>
         </p:nvSpPr>
-        <p:spPr/>
+        <p:spPr>
+          <a:xfrm>
+            <a:off x="1354665" y="5202238"/>
+            <a:ext cx="9144000" cy="1655762"/>
+          </a:xfrm>
+        </p:spPr>
         <p:txBody>
           <a:bodyPr/>
           <a:lstStyle/>
@@ -6812,6 +6823,47 @@
           </a:p>
         </p:txBody>
       </p:sp>
+      <p:pic>
+        <p:nvPicPr>
+          <p:cNvPr id="1026" name="Picture 2" descr="Image result for git"/>
+          <p:cNvPicPr>
+            <a:picLocks noChangeAspect="1" noChangeArrowheads="1"/>
+          </p:cNvPicPr>
+          <p:nvPr/>
+        </p:nvPicPr>
+        <p:blipFill>
+          <a:blip r:embed="rId2">
+            <a:extLst>
+              <a:ext uri="{28A0092B-C50C-407E-A947-70E740481C1C}">
+                <a14:useLocalDpi xmlns:a14="http://schemas.microsoft.com/office/drawing/2010/main" val="0"/>
+              </a:ext>
+            </a:extLst>
+          </a:blip>
+          <a:srcRect/>
+          <a:stretch>
+            <a:fillRect/>
+          </a:stretch>
+        </p:blipFill>
+        <p:spPr bwMode="auto">
+          <a:xfrm>
+            <a:off x="4131202" y="3717925"/>
+            <a:ext cx="3590925" cy="1276350"/>
+          </a:xfrm>
+          <a:prstGeom prst="rect">
+            <a:avLst/>
+          </a:prstGeom>
+          <a:noFill/>
+          <a:extLst>
+            <a:ext uri="{909E8E84-426E-40DD-AFC4-6F175D3DCCD1}">
+              <a14:hiddenFill xmlns:a14="http://schemas.microsoft.com/office/drawing/2010/main">
+                <a:solidFill>
+                  <a:srgbClr val="FFFFFF"/>
+                </a:solidFill>
+              </a14:hiddenFill>
+            </a:ext>
+          </a:extLst>
+        </p:spPr>
+      </p:pic>
     </p:spTree>
     <p:extLst>
       <p:ext uri="{BB962C8B-B14F-4D97-AF65-F5344CB8AC3E}">
@@ -8087,6 +8139,175 @@
           <a:chExt cx="0" cy="0"/>
         </a:xfrm>
       </p:grpSpPr>
+      <p:grpSp>
+        <p:nvGrpSpPr>
+          <p:cNvPr id="4" name="Group 3"/>
+          <p:cNvGrpSpPr/>
+          <p:nvPr/>
+        </p:nvGrpSpPr>
+        <p:grpSpPr>
+          <a:xfrm>
+            <a:off x="2458507" y="1128889"/>
+            <a:ext cx="8028870" cy="4518907"/>
+            <a:chOff x="3113263" y="496711"/>
+            <a:chExt cx="8028870" cy="4518907"/>
+          </a:xfrm>
+        </p:grpSpPr>
+        <p:pic>
+          <p:nvPicPr>
+            <p:cNvPr id="2" name="Picture 2" descr="https://gerardnico.com/_media/git/branches_git.png?w=600&amp;tok=338c07"/>
+            <p:cNvPicPr>
+              <a:picLocks noChangeAspect="1" noChangeArrowheads="1"/>
+            </p:cNvPicPr>
+            <p:nvPr/>
+          </p:nvPicPr>
+          <p:blipFill>
+            <a:blip r:embed="rId2">
+              <a:extLst>
+                <a:ext uri="{28A0092B-C50C-407E-A947-70E740481C1C}">
+                  <a14:useLocalDpi xmlns:a14="http://schemas.microsoft.com/office/drawing/2010/main" val="0"/>
+                </a:ext>
+              </a:extLst>
+            </a:blip>
+            <a:srcRect/>
+            <a:stretch>
+              <a:fillRect/>
+            </a:stretch>
+          </p:blipFill>
+          <p:spPr bwMode="auto">
+            <a:xfrm>
+              <a:off x="3113263" y="496711"/>
+              <a:ext cx="7836253" cy="4518907"/>
+            </a:xfrm>
+            <a:prstGeom prst="rect">
+              <a:avLst/>
+            </a:prstGeom>
+            <a:noFill/>
+            <a:extLst>
+              <a:ext uri="{909E8E84-426E-40DD-AFC4-6F175D3DCCD1}">
+                <a14:hiddenFill xmlns:a14="http://schemas.microsoft.com/office/drawing/2010/main">
+                  <a:solidFill>
+                    <a:srgbClr val="FFFFFF"/>
+                  </a:solidFill>
+                </a14:hiddenFill>
+              </a:ext>
+            </a:extLst>
+          </p:spPr>
+        </p:pic>
+        <p:sp>
+          <p:nvSpPr>
+            <p:cNvPr id="3" name="Rectangle 2"/>
+            <p:cNvSpPr/>
+            <p:nvPr/>
+          </p:nvSpPr>
+          <p:spPr>
+            <a:xfrm>
+              <a:off x="8116711" y="496711"/>
+              <a:ext cx="3025422" cy="1016000"/>
+            </a:xfrm>
+            <a:prstGeom prst="rect">
+              <a:avLst/>
+            </a:prstGeom>
+            <a:solidFill>
+              <a:schemeClr val="bg1"/>
+            </a:solidFill>
+            <a:ln>
+              <a:solidFill>
+                <a:schemeClr val="bg1"/>
+              </a:solidFill>
+            </a:ln>
+          </p:spPr>
+          <p:style>
+            <a:lnRef idx="2">
+              <a:schemeClr val="accent1">
+                <a:shade val="50000"/>
+              </a:schemeClr>
+            </a:lnRef>
+            <a:fillRef idx="1">
+              <a:schemeClr val="accent1"/>
+            </a:fillRef>
+            <a:effectRef idx="0">
+              <a:schemeClr val="accent1"/>
+            </a:effectRef>
+            <a:fontRef idx="minor">
+              <a:schemeClr val="lt1"/>
+            </a:fontRef>
+          </p:style>
+          <p:txBody>
+            <a:bodyPr rtlCol="0" anchor="ctr"/>
+            <a:lstStyle/>
+            <a:p>
+              <a:pPr algn="ctr"/>
+              <a:endParaRPr lang="en-US"/>
+            </a:p>
+          </p:txBody>
+        </p:sp>
+      </p:grpSp>
+      <p:sp>
+        <p:nvSpPr>
+          <p:cNvPr id="5" name="TextBox 4">
+            <a:extLst>
+              <a:ext uri="{FF2B5EF4-FFF2-40B4-BE49-F238E27FC236}">
+                <a16:creationId xmlns:a16="http://schemas.microsoft.com/office/drawing/2014/main" id="{211E321F-9F54-498F-BD6F-D26DA9D4DE07}"/>
+              </a:ext>
+            </a:extLst>
+          </p:cNvPr>
+          <p:cNvSpPr txBox="1"/>
+          <p:nvPr/>
+        </p:nvSpPr>
+        <p:spPr>
+          <a:xfrm>
+            <a:off x="586153" y="406400"/>
+            <a:ext cx="2650790" cy="707886"/>
+          </a:xfrm>
+          <a:prstGeom prst="rect">
+            <a:avLst/>
+          </a:prstGeom>
+          <a:noFill/>
+        </p:spPr>
+        <p:txBody>
+          <a:bodyPr wrap="none" rtlCol="0">
+            <a:spAutoFit/>
+          </a:bodyPr>
+          <a:lstStyle/>
+          <a:p>
+            <a:r>
+              <a:rPr lang="en-US" sz="4000" dirty="0"/>
+              <a:t>Branching…</a:t>
+            </a:r>
+          </a:p>
+        </p:txBody>
+      </p:sp>
+    </p:spTree>
+    <p:extLst>
+      <p:ext uri="{BB962C8B-B14F-4D97-AF65-F5344CB8AC3E}">
+        <p14:creationId xmlns:p14="http://schemas.microsoft.com/office/powerpoint/2010/main" val="1659608440"/>
+      </p:ext>
+    </p:extLst>
+  </p:cSld>
+  <p:clrMapOvr>
+    <a:masterClrMapping/>
+  </p:clrMapOvr>
+</p:sld>
+</file>
+
+<file path=ppt/slides/slide17.xml><?xml version="1.0" encoding="utf-8"?>
+<p:sld xmlns:a="http://schemas.openxmlformats.org/drawingml/2006/main" xmlns:r="http://schemas.openxmlformats.org/officeDocument/2006/relationships" xmlns:p="http://schemas.openxmlformats.org/presentationml/2006/main">
+  <p:cSld>
+    <p:spTree>
+      <p:nvGrpSpPr>
+        <p:cNvPr id="1" name=""/>
+        <p:cNvGrpSpPr/>
+        <p:nvPr/>
+      </p:nvGrpSpPr>
+      <p:grpSpPr>
+        <a:xfrm>
+          <a:off x="0" y="0"/>
+          <a:ext cx="0" cy="0"/>
+          <a:chOff x="0" y="0"/>
+          <a:chExt cx="0" cy="0"/>
+        </a:xfrm>
+      </p:grpSpPr>
       <p:sp>
         <p:nvSpPr>
           <p:cNvPr id="2" name="TextBox 1">
@@ -8313,7 +8534,7 @@
     </p:spTree>
     <p:extLst>
       <p:ext uri="{BB962C8B-B14F-4D97-AF65-F5344CB8AC3E}">
-        <p14:creationId xmlns:p14="http://schemas.microsoft.com/office/powerpoint/2010/main" val="2830206149"/>
+        <p14:creationId xmlns:p14="http://schemas.microsoft.com/office/powerpoint/2010/main" val="1103106578"/>
       </p:ext>
     </p:extLst>
   </p:cSld>
@@ -8323,7 +8544,7 @@
 </p:sld>
 </file>
 
-<file path=ppt/slides/slide17.xml><?xml version="1.0" encoding="utf-8"?>
+<file path=ppt/slides/slide18.xml><?xml version="1.0" encoding="utf-8"?>
 <p:sld xmlns:a="http://schemas.openxmlformats.org/drawingml/2006/main" xmlns:r="http://schemas.openxmlformats.org/officeDocument/2006/relationships" xmlns:p="http://schemas.openxmlformats.org/presentationml/2006/main">
   <p:cSld>
     <p:spTree>
@@ -8522,7 +8743,7 @@
 </p:sld>
 </file>
 
-<file path=ppt/slides/slide18.xml><?xml version="1.0" encoding="utf-8"?>
+<file path=ppt/slides/slide19.xml><?xml version="1.0" encoding="utf-8"?>
 <p:sld xmlns:a="http://schemas.openxmlformats.org/drawingml/2006/main" xmlns:r="http://schemas.openxmlformats.org/officeDocument/2006/relationships" xmlns:p="http://schemas.openxmlformats.org/presentationml/2006/main">
   <p:cSld>
     <p:spTree>
@@ -8693,205 +8914,6 @@
     <p:extLst>
       <p:ext uri="{BB962C8B-B14F-4D97-AF65-F5344CB8AC3E}">
         <p14:creationId xmlns:p14="http://schemas.microsoft.com/office/powerpoint/2010/main" val="1971593979"/>
-      </p:ext>
-    </p:extLst>
-  </p:cSld>
-  <p:clrMapOvr>
-    <a:masterClrMapping/>
-  </p:clrMapOvr>
-</p:sld>
-</file>
-
-<file path=ppt/slides/slide19.xml><?xml version="1.0" encoding="utf-8"?>
-<p:sld xmlns:a="http://schemas.openxmlformats.org/drawingml/2006/main" xmlns:r="http://schemas.openxmlformats.org/officeDocument/2006/relationships" xmlns:p="http://schemas.openxmlformats.org/presentationml/2006/main">
-  <p:cSld>
-    <p:spTree>
-      <p:nvGrpSpPr>
-        <p:cNvPr id="1" name=""/>
-        <p:cNvGrpSpPr/>
-        <p:nvPr/>
-      </p:nvGrpSpPr>
-      <p:grpSpPr>
-        <a:xfrm>
-          <a:off x="0" y="0"/>
-          <a:ext cx="0" cy="0"/>
-          <a:chOff x="0" y="0"/>
-          <a:chExt cx="0" cy="0"/>
-        </a:xfrm>
-      </p:grpSpPr>
-      <p:sp>
-        <p:nvSpPr>
-          <p:cNvPr id="2" name="TextBox 1">
-            <a:extLst>
-              <a:ext uri="{FF2B5EF4-FFF2-40B4-BE49-F238E27FC236}">
-                <a16:creationId xmlns:a16="http://schemas.microsoft.com/office/drawing/2014/main" id="{211E321F-9F54-498F-BD6F-D26DA9D4DE07}"/>
-              </a:ext>
-            </a:extLst>
-          </p:cNvPr>
-          <p:cNvSpPr txBox="1"/>
-          <p:nvPr/>
-        </p:nvSpPr>
-        <p:spPr>
-          <a:xfrm>
-            <a:off x="586153" y="406400"/>
-            <a:ext cx="2650790" cy="707886"/>
-          </a:xfrm>
-          <a:prstGeom prst="rect">
-            <a:avLst/>
-          </a:prstGeom>
-          <a:noFill/>
-        </p:spPr>
-        <p:txBody>
-          <a:bodyPr wrap="none" rtlCol="0">
-            <a:spAutoFit/>
-          </a:bodyPr>
-          <a:lstStyle/>
-          <a:p>
-            <a:r>
-              <a:rPr lang="en-US" sz="4000" dirty="0"/>
-              <a:t>Branching…</a:t>
-            </a:r>
-          </a:p>
-        </p:txBody>
-      </p:sp>
-      <p:sp>
-        <p:nvSpPr>
-          <p:cNvPr id="3" name="TextBox 2">
-            <a:extLst>
-              <a:ext uri="{FF2B5EF4-FFF2-40B4-BE49-F238E27FC236}">
-                <a16:creationId xmlns:a16="http://schemas.microsoft.com/office/drawing/2014/main" id="{CAF814E6-FC94-4AA4-8BDA-EB411A456B88}"/>
-              </a:ext>
-            </a:extLst>
-          </p:cNvPr>
-          <p:cNvSpPr txBox="1"/>
-          <p:nvPr/>
-        </p:nvSpPr>
-        <p:spPr>
-          <a:xfrm>
-            <a:off x="667149" y="2287244"/>
-            <a:ext cx="4573816" cy="2308324"/>
-          </a:xfrm>
-          <a:prstGeom prst="rect">
-            <a:avLst/>
-          </a:prstGeom>
-          <a:noFill/>
-        </p:spPr>
-        <p:txBody>
-          <a:bodyPr wrap="none" rtlCol="0">
-            <a:spAutoFit/>
-          </a:bodyPr>
-          <a:lstStyle/>
-          <a:p>
-            <a:pPr marL="285750" indent="-285750">
-              <a:buFont typeface="Arial" panose="020B0604020202020204" pitchFamily="34" charset="0"/>
-              <a:buChar char="•"/>
-            </a:pPr>
-            <a:r>
-              <a:rPr lang="en-US" dirty="0"/>
-              <a:t>git branch (-d -v) &lt;name&gt;</a:t>
-            </a:r>
-          </a:p>
-          <a:p>
-            <a:pPr marL="285750" indent="-285750">
-              <a:buFont typeface="Arial" panose="020B0604020202020204" pitchFamily="34" charset="0"/>
-              <a:buChar char="•"/>
-            </a:pPr>
-            <a:r>
-              <a:rPr lang="en-US" sz="3600" dirty="0">
-                <a:solidFill>
-                  <a:srgbClr val="FF0000"/>
-                </a:solidFill>
-              </a:rPr>
-              <a:t>git checkout </a:t>
-            </a:r>
-            <a:br>
-              <a:rPr lang="en-US" sz="3600" dirty="0">
-                <a:solidFill>
-                  <a:srgbClr val="FF0000"/>
-                </a:solidFill>
-              </a:rPr>
-            </a:br>
-            <a:r>
-              <a:rPr lang="en-US" sz="3600" dirty="0">
-                <a:solidFill>
-                  <a:srgbClr val="FF0000"/>
-                </a:solidFill>
-              </a:rPr>
-              <a:t>    (-b) &lt;branch name&gt;</a:t>
-            </a:r>
-          </a:p>
-          <a:p>
-            <a:pPr marL="285750" indent="-285750">
-              <a:buFont typeface="Arial" panose="020B0604020202020204" pitchFamily="34" charset="0"/>
-              <a:buChar char="•"/>
-            </a:pPr>
-            <a:r>
-              <a:rPr lang="en-US" dirty="0"/>
-              <a:t>git stash </a:t>
-            </a:r>
-          </a:p>
-          <a:p>
-            <a:pPr marL="285750" indent="-285750">
-              <a:buFont typeface="Arial" panose="020B0604020202020204" pitchFamily="34" charset="0"/>
-              <a:buChar char="•"/>
-            </a:pPr>
-            <a:r>
-              <a:rPr lang="en-US" dirty="0"/>
-              <a:t>git merge &lt;branch name&gt;</a:t>
-            </a:r>
-          </a:p>
-          <a:p>
-            <a:pPr marL="285750" indent="-285750">
-              <a:buFont typeface="Arial" panose="020B0604020202020204" pitchFamily="34" charset="0"/>
-              <a:buChar char="•"/>
-            </a:pPr>
-            <a:r>
-              <a:rPr lang="en-US" dirty="0"/>
-              <a:t>git rebase &lt;new base&gt;</a:t>
-            </a:r>
-          </a:p>
-        </p:txBody>
-      </p:sp>
-      <p:pic>
-        <p:nvPicPr>
-          <p:cNvPr id="5" name="Picture 4">
-            <a:extLst>
-              <a:ext uri="{FF2B5EF4-FFF2-40B4-BE49-F238E27FC236}">
-                <a16:creationId xmlns:a16="http://schemas.microsoft.com/office/drawing/2014/main" id="{7A3D1547-5F24-412A-965F-930331308C3E}"/>
-              </a:ext>
-            </a:extLst>
-          </p:cNvPr>
-          <p:cNvPicPr>
-            <a:picLocks noChangeAspect="1"/>
-          </p:cNvPicPr>
-          <p:nvPr/>
-        </p:nvPicPr>
-        <p:blipFill>
-          <a:blip r:embed="rId3">
-            <a:extLst>
-              <a:ext uri="{28A0092B-C50C-407E-A947-70E740481C1C}">
-                <a14:useLocalDpi xmlns:a14="http://schemas.microsoft.com/office/drawing/2010/main" val="0"/>
-              </a:ext>
-            </a:extLst>
-          </a:blip>
-          <a:stretch>
-            <a:fillRect/>
-          </a:stretch>
-        </p:blipFill>
-        <p:spPr>
-          <a:xfrm>
-            <a:off x="5576445" y="1619000"/>
-            <a:ext cx="5948406" cy="2814658"/>
-          </a:xfrm>
-          <a:prstGeom prst="rect">
-            <a:avLst/>
-          </a:prstGeom>
-        </p:spPr>
-      </p:pic>
-    </p:spTree>
-    <p:extLst>
-      <p:ext uri="{BB962C8B-B14F-4D97-AF65-F5344CB8AC3E}">
-        <p14:creationId xmlns:p14="http://schemas.microsoft.com/office/powerpoint/2010/main" val="1402074850"/>
       </p:ext>
     </p:extLst>
   </p:cSld>
@@ -9204,6 +9226,205 @@
         <p:spPr>
           <a:xfrm>
             <a:off x="667149" y="2287244"/>
+            <a:ext cx="4573816" cy="2308324"/>
+          </a:xfrm>
+          <a:prstGeom prst="rect">
+            <a:avLst/>
+          </a:prstGeom>
+          <a:noFill/>
+        </p:spPr>
+        <p:txBody>
+          <a:bodyPr wrap="none" rtlCol="0">
+            <a:spAutoFit/>
+          </a:bodyPr>
+          <a:lstStyle/>
+          <a:p>
+            <a:pPr marL="285750" indent="-285750">
+              <a:buFont typeface="Arial" panose="020B0604020202020204" pitchFamily="34" charset="0"/>
+              <a:buChar char="•"/>
+            </a:pPr>
+            <a:r>
+              <a:rPr lang="en-US" dirty="0"/>
+              <a:t>git branch (-d -v) &lt;name&gt;</a:t>
+            </a:r>
+          </a:p>
+          <a:p>
+            <a:pPr marL="285750" indent="-285750">
+              <a:buFont typeface="Arial" panose="020B0604020202020204" pitchFamily="34" charset="0"/>
+              <a:buChar char="•"/>
+            </a:pPr>
+            <a:r>
+              <a:rPr lang="en-US" sz="3600" dirty="0">
+                <a:solidFill>
+                  <a:srgbClr val="FF0000"/>
+                </a:solidFill>
+              </a:rPr>
+              <a:t>git checkout </a:t>
+            </a:r>
+            <a:br>
+              <a:rPr lang="en-US" sz="3600" dirty="0">
+                <a:solidFill>
+                  <a:srgbClr val="FF0000"/>
+                </a:solidFill>
+              </a:rPr>
+            </a:br>
+            <a:r>
+              <a:rPr lang="en-US" sz="3600" dirty="0">
+                <a:solidFill>
+                  <a:srgbClr val="FF0000"/>
+                </a:solidFill>
+              </a:rPr>
+              <a:t>    (-b) &lt;branch name&gt;</a:t>
+            </a:r>
+          </a:p>
+          <a:p>
+            <a:pPr marL="285750" indent="-285750">
+              <a:buFont typeface="Arial" panose="020B0604020202020204" pitchFamily="34" charset="0"/>
+              <a:buChar char="•"/>
+            </a:pPr>
+            <a:r>
+              <a:rPr lang="en-US" dirty="0"/>
+              <a:t>git stash </a:t>
+            </a:r>
+          </a:p>
+          <a:p>
+            <a:pPr marL="285750" indent="-285750">
+              <a:buFont typeface="Arial" panose="020B0604020202020204" pitchFamily="34" charset="0"/>
+              <a:buChar char="•"/>
+            </a:pPr>
+            <a:r>
+              <a:rPr lang="en-US" dirty="0"/>
+              <a:t>git merge &lt;branch name&gt;</a:t>
+            </a:r>
+          </a:p>
+          <a:p>
+            <a:pPr marL="285750" indent="-285750">
+              <a:buFont typeface="Arial" panose="020B0604020202020204" pitchFamily="34" charset="0"/>
+              <a:buChar char="•"/>
+            </a:pPr>
+            <a:r>
+              <a:rPr lang="en-US" dirty="0"/>
+              <a:t>git rebase &lt;new base&gt;</a:t>
+            </a:r>
+          </a:p>
+        </p:txBody>
+      </p:sp>
+      <p:pic>
+        <p:nvPicPr>
+          <p:cNvPr id="5" name="Picture 4">
+            <a:extLst>
+              <a:ext uri="{FF2B5EF4-FFF2-40B4-BE49-F238E27FC236}">
+                <a16:creationId xmlns:a16="http://schemas.microsoft.com/office/drawing/2014/main" id="{7A3D1547-5F24-412A-965F-930331308C3E}"/>
+              </a:ext>
+            </a:extLst>
+          </p:cNvPr>
+          <p:cNvPicPr>
+            <a:picLocks noChangeAspect="1"/>
+          </p:cNvPicPr>
+          <p:nvPr/>
+        </p:nvPicPr>
+        <p:blipFill>
+          <a:blip r:embed="rId3">
+            <a:extLst>
+              <a:ext uri="{28A0092B-C50C-407E-A947-70E740481C1C}">
+                <a14:useLocalDpi xmlns:a14="http://schemas.microsoft.com/office/drawing/2010/main" val="0"/>
+              </a:ext>
+            </a:extLst>
+          </a:blip>
+          <a:stretch>
+            <a:fillRect/>
+          </a:stretch>
+        </p:blipFill>
+        <p:spPr>
+          <a:xfrm>
+            <a:off x="5576445" y="1619000"/>
+            <a:ext cx="5948406" cy="2814658"/>
+          </a:xfrm>
+          <a:prstGeom prst="rect">
+            <a:avLst/>
+          </a:prstGeom>
+        </p:spPr>
+      </p:pic>
+    </p:spTree>
+    <p:extLst>
+      <p:ext uri="{BB962C8B-B14F-4D97-AF65-F5344CB8AC3E}">
+        <p14:creationId xmlns:p14="http://schemas.microsoft.com/office/powerpoint/2010/main" val="1402074850"/>
+      </p:ext>
+    </p:extLst>
+  </p:cSld>
+  <p:clrMapOvr>
+    <a:masterClrMapping/>
+  </p:clrMapOvr>
+</p:sld>
+</file>
+
+<file path=ppt/slides/slide21.xml><?xml version="1.0" encoding="utf-8"?>
+<p:sld xmlns:a="http://schemas.openxmlformats.org/drawingml/2006/main" xmlns:r="http://schemas.openxmlformats.org/officeDocument/2006/relationships" xmlns:p="http://schemas.openxmlformats.org/presentationml/2006/main">
+  <p:cSld>
+    <p:spTree>
+      <p:nvGrpSpPr>
+        <p:cNvPr id="1" name=""/>
+        <p:cNvGrpSpPr/>
+        <p:nvPr/>
+      </p:nvGrpSpPr>
+      <p:grpSpPr>
+        <a:xfrm>
+          <a:off x="0" y="0"/>
+          <a:ext cx="0" cy="0"/>
+          <a:chOff x="0" y="0"/>
+          <a:chExt cx="0" cy="0"/>
+        </a:xfrm>
+      </p:grpSpPr>
+      <p:sp>
+        <p:nvSpPr>
+          <p:cNvPr id="2" name="TextBox 1">
+            <a:extLst>
+              <a:ext uri="{FF2B5EF4-FFF2-40B4-BE49-F238E27FC236}">
+                <a16:creationId xmlns:a16="http://schemas.microsoft.com/office/drawing/2014/main" id="{211E321F-9F54-498F-BD6F-D26DA9D4DE07}"/>
+              </a:ext>
+            </a:extLst>
+          </p:cNvPr>
+          <p:cNvSpPr txBox="1"/>
+          <p:nvPr/>
+        </p:nvSpPr>
+        <p:spPr>
+          <a:xfrm>
+            <a:off x="586153" y="406400"/>
+            <a:ext cx="2650790" cy="707886"/>
+          </a:xfrm>
+          <a:prstGeom prst="rect">
+            <a:avLst/>
+          </a:prstGeom>
+          <a:noFill/>
+        </p:spPr>
+        <p:txBody>
+          <a:bodyPr wrap="none" rtlCol="0">
+            <a:spAutoFit/>
+          </a:bodyPr>
+          <a:lstStyle/>
+          <a:p>
+            <a:r>
+              <a:rPr lang="en-US" sz="4000" dirty="0"/>
+              <a:t>Branching…</a:t>
+            </a:r>
+          </a:p>
+        </p:txBody>
+      </p:sp>
+      <p:sp>
+        <p:nvSpPr>
+          <p:cNvPr id="3" name="TextBox 2">
+            <a:extLst>
+              <a:ext uri="{FF2B5EF4-FFF2-40B4-BE49-F238E27FC236}">
+                <a16:creationId xmlns:a16="http://schemas.microsoft.com/office/drawing/2014/main" id="{CAF814E6-FC94-4AA4-8BDA-EB411A456B88}"/>
+              </a:ext>
+            </a:extLst>
+          </p:cNvPr>
+          <p:cNvSpPr txBox="1"/>
+          <p:nvPr/>
+        </p:nvSpPr>
+        <p:spPr>
+          <a:xfrm>
+            <a:off x="667149" y="2287244"/>
             <a:ext cx="3519233" cy="1754326"/>
           </a:xfrm>
           <a:prstGeom prst="rect">
@@ -9321,7 +9542,7 @@
 </p:sld>
 </file>
 
-<file path=ppt/slides/slide21.xml><?xml version="1.0" encoding="utf-8"?>
+<file path=ppt/slides/slide22.xml><?xml version="1.0" encoding="utf-8"?>
 <p:sld xmlns:a="http://schemas.openxmlformats.org/drawingml/2006/main" xmlns:r="http://schemas.openxmlformats.org/officeDocument/2006/relationships" xmlns:p="http://schemas.openxmlformats.org/presentationml/2006/main">
   <p:cSld>
     <p:spTree>
@@ -9505,7 +9726,7 @@
 </p:sld>
 </file>
 
-<file path=ppt/slides/slide22.xml><?xml version="1.0" encoding="utf-8"?>
+<file path=ppt/slides/slide23.xml><?xml version="1.0" encoding="utf-8"?>
 <p:sld xmlns:a="http://schemas.openxmlformats.org/drawingml/2006/main" xmlns:r="http://schemas.openxmlformats.org/officeDocument/2006/relationships" xmlns:p="http://schemas.openxmlformats.org/presentationml/2006/main">
   <p:cSld>
     <p:spTree>
@@ -9680,190 +9901,6 @@
     <p:extLst>
       <p:ext uri="{BB962C8B-B14F-4D97-AF65-F5344CB8AC3E}">
         <p14:creationId xmlns:p14="http://schemas.microsoft.com/office/powerpoint/2010/main" val="2320644596"/>
-      </p:ext>
-    </p:extLst>
-  </p:cSld>
-  <p:clrMapOvr>
-    <a:masterClrMapping/>
-  </p:clrMapOvr>
-</p:sld>
-</file>
-
-<file path=ppt/slides/slide23.xml><?xml version="1.0" encoding="utf-8"?>
-<p:sld xmlns:a="http://schemas.openxmlformats.org/drawingml/2006/main" xmlns:r="http://schemas.openxmlformats.org/officeDocument/2006/relationships" xmlns:p="http://schemas.openxmlformats.org/presentationml/2006/main">
-  <p:cSld>
-    <p:spTree>
-      <p:nvGrpSpPr>
-        <p:cNvPr id="1" name=""/>
-        <p:cNvGrpSpPr/>
-        <p:nvPr/>
-      </p:nvGrpSpPr>
-      <p:grpSpPr>
-        <a:xfrm>
-          <a:off x="0" y="0"/>
-          <a:ext cx="0" cy="0"/>
-          <a:chOff x="0" y="0"/>
-          <a:chExt cx="0" cy="0"/>
-        </a:xfrm>
-      </p:grpSpPr>
-      <p:pic>
-        <p:nvPicPr>
-          <p:cNvPr id="6" name="Picture 5">
-            <a:extLst>
-              <a:ext uri="{FF2B5EF4-FFF2-40B4-BE49-F238E27FC236}">
-                <a16:creationId xmlns:a16="http://schemas.microsoft.com/office/drawing/2014/main" id="{E9453D0D-EA72-4614-A260-3AB2D8BE9A69}"/>
-              </a:ext>
-            </a:extLst>
-          </p:cNvPr>
-          <p:cNvPicPr>
-            <a:picLocks noChangeAspect="1"/>
-          </p:cNvPicPr>
-          <p:nvPr/>
-        </p:nvPicPr>
-        <p:blipFill>
-          <a:blip r:embed="rId3">
-            <a:extLst>
-              <a:ext uri="{28A0092B-C50C-407E-A947-70E740481C1C}">
-                <a14:useLocalDpi xmlns:a14="http://schemas.microsoft.com/office/drawing/2010/main" val="0"/>
-              </a:ext>
-            </a:extLst>
-          </a:blip>
-          <a:stretch>
-            <a:fillRect/>
-          </a:stretch>
-        </p:blipFill>
-        <p:spPr>
-          <a:xfrm>
-            <a:off x="5836422" y="2223270"/>
-            <a:ext cx="6005556" cy="2528906"/>
-          </a:xfrm>
-          <a:prstGeom prst="rect">
-            <a:avLst/>
-          </a:prstGeom>
-        </p:spPr>
-      </p:pic>
-      <p:sp>
-        <p:nvSpPr>
-          <p:cNvPr id="2" name="TextBox 1">
-            <a:extLst>
-              <a:ext uri="{FF2B5EF4-FFF2-40B4-BE49-F238E27FC236}">
-                <a16:creationId xmlns:a16="http://schemas.microsoft.com/office/drawing/2014/main" id="{211E321F-9F54-498F-BD6F-D26DA9D4DE07}"/>
-              </a:ext>
-            </a:extLst>
-          </p:cNvPr>
-          <p:cNvSpPr txBox="1"/>
-          <p:nvPr/>
-        </p:nvSpPr>
-        <p:spPr>
-          <a:xfrm>
-            <a:off x="586153" y="406400"/>
-            <a:ext cx="2650790" cy="707886"/>
-          </a:xfrm>
-          <a:prstGeom prst="rect">
-            <a:avLst/>
-          </a:prstGeom>
-          <a:noFill/>
-        </p:spPr>
-        <p:txBody>
-          <a:bodyPr wrap="none" rtlCol="0">
-            <a:spAutoFit/>
-          </a:bodyPr>
-          <a:lstStyle/>
-          <a:p>
-            <a:r>
-              <a:rPr lang="en-US" sz="4000" dirty="0"/>
-              <a:t>Branching…</a:t>
-            </a:r>
-          </a:p>
-        </p:txBody>
-      </p:sp>
-      <p:sp>
-        <p:nvSpPr>
-          <p:cNvPr id="3" name="TextBox 2">
-            <a:extLst>
-              <a:ext uri="{FF2B5EF4-FFF2-40B4-BE49-F238E27FC236}">
-                <a16:creationId xmlns:a16="http://schemas.microsoft.com/office/drawing/2014/main" id="{CAF814E6-FC94-4AA4-8BDA-EB411A456B88}"/>
-              </a:ext>
-            </a:extLst>
-          </p:cNvPr>
-          <p:cNvSpPr txBox="1"/>
-          <p:nvPr/>
-        </p:nvSpPr>
-        <p:spPr>
-          <a:xfrm>
-            <a:off x="667149" y="2287244"/>
-            <a:ext cx="5272213" cy="1754326"/>
-          </a:xfrm>
-          <a:prstGeom prst="rect">
-            <a:avLst/>
-          </a:prstGeom>
-          <a:noFill/>
-        </p:spPr>
-        <p:txBody>
-          <a:bodyPr wrap="none" rtlCol="0">
-            <a:spAutoFit/>
-          </a:bodyPr>
-          <a:lstStyle/>
-          <a:p>
-            <a:pPr marL="285750" indent="-285750">
-              <a:buFont typeface="Arial" panose="020B0604020202020204" pitchFamily="34" charset="0"/>
-              <a:buChar char="•"/>
-            </a:pPr>
-            <a:r>
-              <a:rPr lang="en-US" dirty="0"/>
-              <a:t>git branch (-d -v) &lt;name&gt;</a:t>
-            </a:r>
-          </a:p>
-          <a:p>
-            <a:pPr marL="285750" indent="-285750">
-              <a:buFont typeface="Arial" panose="020B0604020202020204" pitchFamily="34" charset="0"/>
-              <a:buChar char="•"/>
-            </a:pPr>
-            <a:r>
-              <a:rPr lang="en-US" dirty="0"/>
-              <a:t>git checkout (-b) &lt;branch name&gt;</a:t>
-            </a:r>
-          </a:p>
-          <a:p>
-            <a:pPr marL="285750" indent="-285750">
-              <a:buFont typeface="Arial" panose="020B0604020202020204" pitchFamily="34" charset="0"/>
-              <a:buChar char="•"/>
-            </a:pPr>
-            <a:r>
-              <a:rPr lang="en-US" dirty="0"/>
-              <a:t>git stash </a:t>
-            </a:r>
-          </a:p>
-          <a:p>
-            <a:pPr marL="285750" indent="-285750">
-              <a:buFont typeface="Arial" panose="020B0604020202020204" pitchFamily="34" charset="0"/>
-              <a:buChar char="•"/>
-            </a:pPr>
-            <a:r>
-              <a:rPr lang="en-US" sz="3600" dirty="0">
-                <a:solidFill>
-                  <a:srgbClr val="FF0000"/>
-                </a:solidFill>
-              </a:rPr>
-              <a:t>git merge &lt;branch name&gt;</a:t>
-            </a:r>
-          </a:p>
-          <a:p>
-            <a:pPr marL="285750" indent="-285750">
-              <a:buFont typeface="Arial" panose="020B0604020202020204" pitchFamily="34" charset="0"/>
-              <a:buChar char="•"/>
-            </a:pPr>
-            <a:r>
-              <a:rPr lang="en-US" dirty="0"/>
-              <a:t>git rebase &lt;new base&gt;</a:t>
-            </a:r>
-          </a:p>
-        </p:txBody>
-      </p:sp>
-    </p:spTree>
-    <p:extLst>
-      <p:ext uri="{BB962C8B-B14F-4D97-AF65-F5344CB8AC3E}">
-        <p14:creationId xmlns:p14="http://schemas.microsoft.com/office/powerpoint/2010/main" val="1798754958"/>
       </p:ext>
     </p:extLst>
   </p:cSld>
@@ -9895,7 +9932,7 @@
           <p:cNvPr id="6" name="Picture 5">
             <a:extLst>
               <a:ext uri="{FF2B5EF4-FFF2-40B4-BE49-F238E27FC236}">
-                <a16:creationId xmlns:a16="http://schemas.microsoft.com/office/drawing/2014/main" id="{11354057-BADD-48FE-8F38-509E14140C66}"/>
+                <a16:creationId xmlns:a16="http://schemas.microsoft.com/office/drawing/2014/main" id="{E9453D0D-EA72-4614-A260-3AB2D8BE9A69}"/>
               </a:ext>
             </a:extLst>
           </p:cNvPr>
@@ -9918,8 +9955,8 @@
         </p:blipFill>
         <p:spPr>
           <a:xfrm>
-            <a:off x="5723520" y="1904716"/>
-            <a:ext cx="5929356" cy="2519381"/>
+            <a:off x="5836422" y="2223270"/>
+            <a:ext cx="6005556" cy="2528906"/>
           </a:xfrm>
           <a:prstGeom prst="rect">
             <a:avLst/>
@@ -10047,7 +10084,7 @@
     </p:spTree>
     <p:extLst>
       <p:ext uri="{BB962C8B-B14F-4D97-AF65-F5344CB8AC3E}">
-        <p14:creationId xmlns:p14="http://schemas.microsoft.com/office/powerpoint/2010/main" val="1971368743"/>
+        <p14:creationId xmlns:p14="http://schemas.microsoft.com/office/powerpoint/2010/main" val="1798754958"/>
       </p:ext>
     </p:extLst>
   </p:cSld>
@@ -10076,10 +10113,10 @@
       </p:grpSpPr>
       <p:pic>
         <p:nvPicPr>
-          <p:cNvPr id="5" name="Picture 4">
-            <a:extLst>
-              <a:ext uri="{FF2B5EF4-FFF2-40B4-BE49-F238E27FC236}">
-                <a16:creationId xmlns:a16="http://schemas.microsoft.com/office/drawing/2014/main" id="{44C00943-EF97-482B-95F4-97E8D6B72156}"/>
+          <p:cNvPr id="6" name="Picture 5">
+            <a:extLst>
+              <a:ext uri="{FF2B5EF4-FFF2-40B4-BE49-F238E27FC236}">
+                <a16:creationId xmlns:a16="http://schemas.microsoft.com/office/drawing/2014/main" id="{11354057-BADD-48FE-8F38-509E14140C66}"/>
               </a:ext>
             </a:extLst>
           </p:cNvPr>
@@ -10102,8 +10139,8 @@
         </p:blipFill>
         <p:spPr>
           <a:xfrm>
-            <a:off x="5856389" y="2287244"/>
-            <a:ext cx="5881731" cy="2062178"/>
+            <a:off x="5723520" y="1904716"/>
+            <a:ext cx="5929356" cy="2519381"/>
           </a:xfrm>
           <a:prstGeom prst="rect">
             <a:avLst/>
@@ -10231,7 +10268,7 @@
     </p:spTree>
     <p:extLst>
       <p:ext uri="{BB962C8B-B14F-4D97-AF65-F5344CB8AC3E}">
-        <p14:creationId xmlns:p14="http://schemas.microsoft.com/office/powerpoint/2010/main" val="847351172"/>
+        <p14:creationId xmlns:p14="http://schemas.microsoft.com/office/powerpoint/2010/main" val="1971368743"/>
       </p:ext>
     </p:extLst>
   </p:cSld>
@@ -10258,6 +10295,190 @@
           <a:chExt cx="0" cy="0"/>
         </a:xfrm>
       </p:grpSpPr>
+      <p:pic>
+        <p:nvPicPr>
+          <p:cNvPr id="5" name="Picture 4">
+            <a:extLst>
+              <a:ext uri="{FF2B5EF4-FFF2-40B4-BE49-F238E27FC236}">
+                <a16:creationId xmlns:a16="http://schemas.microsoft.com/office/drawing/2014/main" id="{44C00943-EF97-482B-95F4-97E8D6B72156}"/>
+              </a:ext>
+            </a:extLst>
+          </p:cNvPr>
+          <p:cNvPicPr>
+            <a:picLocks noChangeAspect="1"/>
+          </p:cNvPicPr>
+          <p:nvPr/>
+        </p:nvPicPr>
+        <p:blipFill>
+          <a:blip r:embed="rId3">
+            <a:extLst>
+              <a:ext uri="{28A0092B-C50C-407E-A947-70E740481C1C}">
+                <a14:useLocalDpi xmlns:a14="http://schemas.microsoft.com/office/drawing/2010/main" val="0"/>
+              </a:ext>
+            </a:extLst>
+          </a:blip>
+          <a:stretch>
+            <a:fillRect/>
+          </a:stretch>
+        </p:blipFill>
+        <p:spPr>
+          <a:xfrm>
+            <a:off x="5856389" y="2287244"/>
+            <a:ext cx="5881731" cy="2062178"/>
+          </a:xfrm>
+          <a:prstGeom prst="rect">
+            <a:avLst/>
+          </a:prstGeom>
+        </p:spPr>
+      </p:pic>
+      <p:sp>
+        <p:nvSpPr>
+          <p:cNvPr id="2" name="TextBox 1">
+            <a:extLst>
+              <a:ext uri="{FF2B5EF4-FFF2-40B4-BE49-F238E27FC236}">
+                <a16:creationId xmlns:a16="http://schemas.microsoft.com/office/drawing/2014/main" id="{211E321F-9F54-498F-BD6F-D26DA9D4DE07}"/>
+              </a:ext>
+            </a:extLst>
+          </p:cNvPr>
+          <p:cNvSpPr txBox="1"/>
+          <p:nvPr/>
+        </p:nvSpPr>
+        <p:spPr>
+          <a:xfrm>
+            <a:off x="586153" y="406400"/>
+            <a:ext cx="2650790" cy="707886"/>
+          </a:xfrm>
+          <a:prstGeom prst="rect">
+            <a:avLst/>
+          </a:prstGeom>
+          <a:noFill/>
+        </p:spPr>
+        <p:txBody>
+          <a:bodyPr wrap="none" rtlCol="0">
+            <a:spAutoFit/>
+          </a:bodyPr>
+          <a:lstStyle/>
+          <a:p>
+            <a:r>
+              <a:rPr lang="en-US" sz="4000" dirty="0"/>
+              <a:t>Branching…</a:t>
+            </a:r>
+          </a:p>
+        </p:txBody>
+      </p:sp>
+      <p:sp>
+        <p:nvSpPr>
+          <p:cNvPr id="3" name="TextBox 2">
+            <a:extLst>
+              <a:ext uri="{FF2B5EF4-FFF2-40B4-BE49-F238E27FC236}">
+                <a16:creationId xmlns:a16="http://schemas.microsoft.com/office/drawing/2014/main" id="{CAF814E6-FC94-4AA4-8BDA-EB411A456B88}"/>
+              </a:ext>
+            </a:extLst>
+          </p:cNvPr>
+          <p:cNvSpPr txBox="1"/>
+          <p:nvPr/>
+        </p:nvSpPr>
+        <p:spPr>
+          <a:xfrm>
+            <a:off x="667149" y="2287244"/>
+            <a:ext cx="5272213" cy="1754326"/>
+          </a:xfrm>
+          <a:prstGeom prst="rect">
+            <a:avLst/>
+          </a:prstGeom>
+          <a:noFill/>
+        </p:spPr>
+        <p:txBody>
+          <a:bodyPr wrap="none" rtlCol="0">
+            <a:spAutoFit/>
+          </a:bodyPr>
+          <a:lstStyle/>
+          <a:p>
+            <a:pPr marL="285750" indent="-285750">
+              <a:buFont typeface="Arial" panose="020B0604020202020204" pitchFamily="34" charset="0"/>
+              <a:buChar char="•"/>
+            </a:pPr>
+            <a:r>
+              <a:rPr lang="en-US" dirty="0"/>
+              <a:t>git branch (-d -v) &lt;name&gt;</a:t>
+            </a:r>
+          </a:p>
+          <a:p>
+            <a:pPr marL="285750" indent="-285750">
+              <a:buFont typeface="Arial" panose="020B0604020202020204" pitchFamily="34" charset="0"/>
+              <a:buChar char="•"/>
+            </a:pPr>
+            <a:r>
+              <a:rPr lang="en-US" dirty="0"/>
+              <a:t>git checkout (-b) &lt;branch name&gt;</a:t>
+            </a:r>
+          </a:p>
+          <a:p>
+            <a:pPr marL="285750" indent="-285750">
+              <a:buFont typeface="Arial" panose="020B0604020202020204" pitchFamily="34" charset="0"/>
+              <a:buChar char="•"/>
+            </a:pPr>
+            <a:r>
+              <a:rPr lang="en-US" dirty="0"/>
+              <a:t>git stash </a:t>
+            </a:r>
+          </a:p>
+          <a:p>
+            <a:pPr marL="285750" indent="-285750">
+              <a:buFont typeface="Arial" panose="020B0604020202020204" pitchFamily="34" charset="0"/>
+              <a:buChar char="•"/>
+            </a:pPr>
+            <a:r>
+              <a:rPr lang="en-US" sz="3600" dirty="0">
+                <a:solidFill>
+                  <a:srgbClr val="FF0000"/>
+                </a:solidFill>
+              </a:rPr>
+              <a:t>git merge &lt;branch name&gt;</a:t>
+            </a:r>
+          </a:p>
+          <a:p>
+            <a:pPr marL="285750" indent="-285750">
+              <a:buFont typeface="Arial" panose="020B0604020202020204" pitchFamily="34" charset="0"/>
+              <a:buChar char="•"/>
+            </a:pPr>
+            <a:r>
+              <a:rPr lang="en-US" dirty="0"/>
+              <a:t>git rebase &lt;new base&gt;</a:t>
+            </a:r>
+          </a:p>
+        </p:txBody>
+      </p:sp>
+    </p:spTree>
+    <p:extLst>
+      <p:ext uri="{BB962C8B-B14F-4D97-AF65-F5344CB8AC3E}">
+        <p14:creationId xmlns:p14="http://schemas.microsoft.com/office/powerpoint/2010/main" val="847351172"/>
+      </p:ext>
+    </p:extLst>
+  </p:cSld>
+  <p:clrMapOvr>
+    <a:masterClrMapping/>
+  </p:clrMapOvr>
+</p:sld>
+</file>
+
+<file path=ppt/slides/slide27.xml><?xml version="1.0" encoding="utf-8"?>
+<p:sld xmlns:a="http://schemas.openxmlformats.org/drawingml/2006/main" xmlns:r="http://schemas.openxmlformats.org/officeDocument/2006/relationships" xmlns:p="http://schemas.openxmlformats.org/presentationml/2006/main">
+  <p:cSld>
+    <p:spTree>
+      <p:nvGrpSpPr>
+        <p:cNvPr id="1" name=""/>
+        <p:cNvGrpSpPr/>
+        <p:nvPr/>
+      </p:nvGrpSpPr>
+      <p:grpSpPr>
+        <a:xfrm>
+          <a:off x="0" y="0"/>
+          <a:ext cx="0" cy="0"/>
+          <a:chOff x="0" y="0"/>
+          <a:chExt cx="0" cy="0"/>
+        </a:xfrm>
+      </p:grpSpPr>
       <p:sp>
         <p:nvSpPr>
           <p:cNvPr id="2" name="TextBox 1">
@@ -10393,6 +10614,44 @@
           </a:extLst>
         </p:spPr>
       </p:pic>
+      <p:sp>
+        <p:nvSpPr>
+          <p:cNvPr id="4" name="TextBox 3"/>
+          <p:cNvSpPr txBox="1"/>
+          <p:nvPr/>
+        </p:nvSpPr>
+        <p:spPr>
+          <a:xfrm>
+            <a:off x="8297334" y="1864755"/>
+            <a:ext cx="1593450" cy="369332"/>
+          </a:xfrm>
+          <a:prstGeom prst="rect">
+            <a:avLst/>
+          </a:prstGeom>
+          <a:noFill/>
+        </p:spPr>
+        <p:txBody>
+          <a:bodyPr wrap="none" rtlCol="0">
+            <a:spAutoFit/>
+          </a:bodyPr>
+          <a:lstStyle/>
+          <a:p>
+            <a:r>
+              <a:rPr lang="en-US" dirty="0" smtClean="0">
+                <a:solidFill>
+                  <a:srgbClr val="FF0000"/>
+                </a:solidFill>
+              </a:rPr>
+              <a:t>GitHub/Cluster</a:t>
+            </a:r>
+            <a:endParaRPr lang="en-US" dirty="0">
+              <a:solidFill>
+                <a:srgbClr val="FF0000"/>
+              </a:solidFill>
+            </a:endParaRPr>
+          </a:p>
+        </p:txBody>
+      </p:sp>
     </p:spTree>
     <p:extLst>
       <p:ext uri="{BB962C8B-B14F-4D97-AF65-F5344CB8AC3E}">
@@ -10406,7 +10665,7 @@
 </p:sld>
 </file>
 
-<file path=ppt/slides/slide27.xml><?xml version="1.0" encoding="utf-8"?>
+<file path=ppt/slides/slide28.xml><?xml version="1.0" encoding="utf-8"?>
 <p:sld xmlns:a="http://schemas.openxmlformats.org/drawingml/2006/main" xmlns:r="http://schemas.openxmlformats.org/officeDocument/2006/relationships" xmlns:p="http://schemas.openxmlformats.org/presentationml/2006/main">
   <p:cSld>
     <p:spTree>
@@ -10765,7 +11024,7 @@
 </p:sld>
 </file>
 
-<file path=ppt/slides/slide28.xml><?xml version="1.0" encoding="utf-8"?>
+<file path=ppt/slides/slide29.xml><?xml version="1.0" encoding="utf-8"?>
 <p:sld xmlns:a="http://schemas.openxmlformats.org/drawingml/2006/main" xmlns:r="http://schemas.openxmlformats.org/officeDocument/2006/relationships" xmlns:p="http://schemas.openxmlformats.org/presentationml/2006/main">
   <p:cSld>
     <p:spTree>

</xml_diff>

<commit_message>
corrects a typo on slide 17 for branching
</commit_message>
<xml_diff>
--- a/learn-to-git.pptx
+++ b/learn-to-git.pptx
@@ -8479,11 +8479,11 @@
             </a:r>
             <a:r>
               <a:rPr lang="en-US" dirty="0" smtClean="0"/>
-              <a:t>(-</a:t>
-            </a:r>
-            <a:r>
-              <a:rPr lang="en-US" dirty="0"/>
-              <a:t>d) &lt;name&gt;</a:t>
+              <a:t>-d </a:t>
+            </a:r>
+            <a:r>
+              <a:rPr lang="en-US" dirty="0"/>
+              <a:t>&lt;name&gt;</a:t>
             </a:r>
           </a:p>
           <a:p>

</xml_diff>

<commit_message>
adds an option for notepad++ as the editor
</commit_message>
<xml_diff>
--- a/learn-to-git.pptx
+++ b/learn-to-git.pptx
@@ -11801,7 +11801,7 @@
         <p:spPr>
           <a:xfrm>
             <a:off x="1771624" y="4389307"/>
-            <a:ext cx="7751224" cy="1200329"/>
+            <a:ext cx="9622506" cy="1477328"/>
           </a:xfrm>
           <a:prstGeom prst="rect">
             <a:avLst/>
@@ -11863,8 +11863,63 @@
             </a:r>
             <a:r>
               <a:rPr lang="en-US" dirty="0"/>
-              <a:t> vim ‘C:/Program Files (x86)/Vim/vim74/vim.exe’</a:t>
-            </a:r>
+              <a:t> vim ‘C:/Program Files (x86)/Vim/vim74/vim.exe</a:t>
+            </a:r>
+            <a:r>
+              <a:rPr lang="en-US" dirty="0" smtClean="0"/>
+              <a:t>’ or </a:t>
+            </a:r>
+          </a:p>
+          <a:p>
+            <a:r>
+              <a:rPr lang="en-US" dirty="0"/>
+              <a:t> </a:t>
+            </a:r>
+            <a:r>
+              <a:rPr lang="en-US" dirty="0" smtClean="0"/>
+              <a:t>    </a:t>
+            </a:r>
+            <a:r>
+              <a:rPr lang="en-US" dirty="0" err="1" smtClean="0"/>
+              <a:t>git</a:t>
+            </a:r>
+            <a:r>
+              <a:rPr lang="en-US" dirty="0" smtClean="0"/>
+              <a:t> </a:t>
+            </a:r>
+            <a:r>
+              <a:rPr lang="en-US" dirty="0" err="1"/>
+              <a:t>config</a:t>
+            </a:r>
+            <a:r>
+              <a:rPr lang="en-US" dirty="0"/>
+              <a:t> --global </a:t>
+            </a:r>
+            <a:r>
+              <a:rPr lang="en-US" dirty="0" err="1"/>
+              <a:t>core.editor</a:t>
+            </a:r>
+            <a:r>
+              <a:rPr lang="en-US" dirty="0"/>
+              <a:t> "'C:/Program Files/Notepad++/notepad++.exe' -</a:t>
+            </a:r>
+            <a:r>
+              <a:rPr lang="en-US" dirty="0" err="1"/>
+              <a:t>multiInst</a:t>
+            </a:r>
+            <a:r>
+              <a:rPr lang="en-US" dirty="0"/>
+              <a:t> -</a:t>
+            </a:r>
+            <a:r>
+              <a:rPr lang="en-US" dirty="0" err="1"/>
+              <a:t>nosession</a:t>
+            </a:r>
+            <a:r>
+              <a:rPr lang="en-US" dirty="0"/>
+              <a:t>"</a:t>
+            </a:r>
+            <a:endParaRPr lang="en-US" dirty="0"/>
           </a:p>
           <a:p>
             <a:pPr marL="285750" indent="-285750">

</xml_diff>

<commit_message>
makes a slight change in the github slide
</commit_message>
<xml_diff>
--- a/learn-to-git.pptx
+++ b/learn-to-git.pptx
@@ -10727,7 +10727,7 @@
         <p:spPr>
           <a:xfrm>
             <a:off x="604007" y="1261559"/>
-            <a:ext cx="4803110" cy="6463308"/>
+            <a:ext cx="4803110" cy="6740307"/>
           </a:xfrm>
           <a:prstGeom prst="rect">
             <a:avLst/>
@@ -10819,7 +10819,7 @@
           <a:p>
             <a:r>
               <a:rPr lang="en-US" dirty="0" smtClean="0"/>
-              <a:t> - </a:t>
+              <a:t>- </a:t>
             </a:r>
             <a:r>
               <a:rPr lang="en-US" dirty="0" err="1" smtClean="0"/>
@@ -10842,8 +10842,32 @@
           <a:p>
             <a:r>
               <a:rPr lang="en-US" dirty="0" smtClean="0"/>
-              <a:t>- Add, commit and push to origin </a:t>
-            </a:r>
+              <a:t>- Add</a:t>
+            </a:r>
+            <a:r>
+              <a:rPr lang="en-US" dirty="0" smtClean="0"/>
+              <a:t>, commit </a:t>
+            </a:r>
+            <a:endParaRPr lang="en-US" dirty="0" smtClean="0"/>
+          </a:p>
+          <a:p>
+            <a:r>
+              <a:rPr lang="en-US" dirty="0" smtClean="0"/>
+              <a:t>- </a:t>
+            </a:r>
+            <a:r>
+              <a:rPr lang="en-US" dirty="0" err="1" smtClean="0"/>
+              <a:t>Git</a:t>
+            </a:r>
+            <a:r>
+              <a:rPr lang="en-US" dirty="0" smtClean="0"/>
+              <a:t> push –u origin master</a:t>
+            </a:r>
+            <a:r>
+              <a:rPr lang="en-US" dirty="0" smtClean="0"/>
+              <a:t> </a:t>
+            </a:r>
+            <a:endParaRPr lang="en-US" dirty="0" smtClean="0"/>
           </a:p>
           <a:p>
             <a:pPr marL="285750" indent="-285750">

</xml_diff>

<commit_message>
fixed a type on slide 2
</commit_message>
<xml_diff>
--- a/learn-to-git.pptx
+++ b/learn-to-git.pptx
@@ -225,7 +225,7 @@
           <a:p>
             <a:fld id="{5DE3B9EE-8657-4270-9540-C548D39E80E2}" type="datetimeFigureOut">
               <a:rPr lang="en-US" smtClean="0"/>
-              <a:t>11/7/2018</a:t>
+              <a:t>11/8/2018</a:t>
             </a:fld>
             <a:endParaRPr lang="en-US"/>
           </a:p>
@@ -3679,7 +3679,7 @@
           <a:p>
             <a:fld id="{13F6F24F-D2EE-420E-885E-A1D66B2D733C}" type="datetimeFigureOut">
               <a:rPr lang="en-US" smtClean="0"/>
-              <a:t>11/7/2018</a:t>
+              <a:t>11/8/2018</a:t>
             </a:fld>
             <a:endParaRPr lang="en-US"/>
           </a:p>
@@ -3877,7 +3877,7 @@
           <a:p>
             <a:fld id="{13F6F24F-D2EE-420E-885E-A1D66B2D733C}" type="datetimeFigureOut">
               <a:rPr lang="en-US" smtClean="0"/>
-              <a:t>11/7/2018</a:t>
+              <a:t>11/8/2018</a:t>
             </a:fld>
             <a:endParaRPr lang="en-US"/>
           </a:p>
@@ -4085,7 +4085,7 @@
           <a:p>
             <a:fld id="{13F6F24F-D2EE-420E-885E-A1D66B2D733C}" type="datetimeFigureOut">
               <a:rPr lang="en-US" smtClean="0"/>
-              <a:t>11/7/2018</a:t>
+              <a:t>11/8/2018</a:t>
             </a:fld>
             <a:endParaRPr lang="en-US"/>
           </a:p>
@@ -4283,7 +4283,7 @@
           <a:p>
             <a:fld id="{13F6F24F-D2EE-420E-885E-A1D66B2D733C}" type="datetimeFigureOut">
               <a:rPr lang="en-US" smtClean="0"/>
-              <a:t>11/7/2018</a:t>
+              <a:t>11/8/2018</a:t>
             </a:fld>
             <a:endParaRPr lang="en-US"/>
           </a:p>
@@ -4558,7 +4558,7 @@
           <a:p>
             <a:fld id="{13F6F24F-D2EE-420E-885E-A1D66B2D733C}" type="datetimeFigureOut">
               <a:rPr lang="en-US" smtClean="0"/>
-              <a:t>11/7/2018</a:t>
+              <a:t>11/8/2018</a:t>
             </a:fld>
             <a:endParaRPr lang="en-US"/>
           </a:p>
@@ -4823,7 +4823,7 @@
           <a:p>
             <a:fld id="{13F6F24F-D2EE-420E-885E-A1D66B2D733C}" type="datetimeFigureOut">
               <a:rPr lang="en-US" smtClean="0"/>
-              <a:t>11/7/2018</a:t>
+              <a:t>11/8/2018</a:t>
             </a:fld>
             <a:endParaRPr lang="en-US"/>
           </a:p>
@@ -5235,7 +5235,7 @@
           <a:p>
             <a:fld id="{13F6F24F-D2EE-420E-885E-A1D66B2D733C}" type="datetimeFigureOut">
               <a:rPr lang="en-US" smtClean="0"/>
-              <a:t>11/7/2018</a:t>
+              <a:t>11/8/2018</a:t>
             </a:fld>
             <a:endParaRPr lang="en-US"/>
           </a:p>
@@ -5376,7 +5376,7 @@
           <a:p>
             <a:fld id="{13F6F24F-D2EE-420E-885E-A1D66B2D733C}" type="datetimeFigureOut">
               <a:rPr lang="en-US" smtClean="0"/>
-              <a:t>11/7/2018</a:t>
+              <a:t>11/8/2018</a:t>
             </a:fld>
             <a:endParaRPr lang="en-US"/>
           </a:p>
@@ -5489,7 +5489,7 @@
           <a:p>
             <a:fld id="{13F6F24F-D2EE-420E-885E-A1D66B2D733C}" type="datetimeFigureOut">
               <a:rPr lang="en-US" smtClean="0"/>
-              <a:t>11/7/2018</a:t>
+              <a:t>11/8/2018</a:t>
             </a:fld>
             <a:endParaRPr lang="en-US"/>
           </a:p>
@@ -5800,7 +5800,7 @@
           <a:p>
             <a:fld id="{13F6F24F-D2EE-420E-885E-A1D66B2D733C}" type="datetimeFigureOut">
               <a:rPr lang="en-US" smtClean="0"/>
-              <a:t>11/7/2018</a:t>
+              <a:t>11/8/2018</a:t>
             </a:fld>
             <a:endParaRPr lang="en-US"/>
           </a:p>
@@ -6088,7 +6088,7 @@
           <a:p>
             <a:fld id="{13F6F24F-D2EE-420E-885E-A1D66B2D733C}" type="datetimeFigureOut">
               <a:rPr lang="en-US" smtClean="0"/>
-              <a:t>11/7/2018</a:t>
+              <a:t>11/8/2018</a:t>
             </a:fld>
             <a:endParaRPr lang="en-US"/>
           </a:p>
@@ -6329,7 +6329,7 @@
           <a:p>
             <a:fld id="{13F6F24F-D2EE-420E-885E-A1D66B2D733C}" type="datetimeFigureOut">
               <a:rPr lang="en-US" smtClean="0"/>
-              <a:t>11/7/2018</a:t>
+              <a:t>11/8/2018</a:t>
             </a:fld>
             <a:endParaRPr lang="en-US"/>
           </a:p>
@@ -10842,13 +10842,8 @@
           <a:p>
             <a:r>
               <a:rPr lang="en-US" dirty="0" smtClean="0"/>
-              <a:t>- Add</a:t>
-            </a:r>
-            <a:r>
-              <a:rPr lang="en-US" dirty="0" smtClean="0"/>
-              <a:t>, commit </a:t>
-            </a:r>
-            <a:endParaRPr lang="en-US" dirty="0" smtClean="0"/>
+              <a:t>- Add, commit </a:t>
+            </a:r>
           </a:p>
           <a:p>
             <a:r>
@@ -10861,13 +10856,8 @@
             </a:r>
             <a:r>
               <a:rPr lang="en-US" dirty="0" smtClean="0"/>
-              <a:t> push –u origin master</a:t>
-            </a:r>
-            <a:r>
-              <a:rPr lang="en-US" dirty="0" smtClean="0"/>
-              <a:t> </a:t>
-            </a:r>
-            <a:endParaRPr lang="en-US" dirty="0" smtClean="0"/>
+              <a:t> push –u origin master </a:t>
+            </a:r>
           </a:p>
           <a:p>
             <a:pPr marL="285750" indent="-285750">
@@ -11401,7 +11391,19 @@
             </a:pPr>
             <a:r>
               <a:rPr lang="en-US" dirty="0" smtClean="0"/>
-              <a:t>Easy to share your work publicly (mention GITHUB)</a:t>
+              <a:t>Easy to share your work </a:t>
+            </a:r>
+            <a:r>
+              <a:rPr lang="en-US" smtClean="0"/>
+              <a:t>publicly </a:t>
+            </a:r>
+            <a:r>
+              <a:rPr lang="en-US" smtClean="0"/>
+              <a:t>(GITHUB</a:t>
+            </a:r>
+            <a:r>
+              <a:rPr lang="en-US" dirty="0" smtClean="0"/>
+              <a:t>)</a:t>
             </a:r>
             <a:endParaRPr lang="en-US" dirty="0"/>
           </a:p>
@@ -11943,7 +11945,6 @@
               <a:rPr lang="en-US" dirty="0"/>
               <a:t>"</a:t>
             </a:r>
-            <a:endParaRPr lang="en-US" dirty="0"/>
           </a:p>
           <a:p>
             <a:pPr marL="285750" indent="-285750">

</xml_diff>

<commit_message>
Reagranges some of the branching slides.
</commit_message>
<xml_diff>
--- a/learn-to-git.pptx
+++ b/learn-to-git.pptx
@@ -5,7 +5,7 @@
     <p:sldMasterId id="2147483648" r:id="rId1"/>
   </p:sldMasterIdLst>
   <p:notesMasterIdLst>
-    <p:notesMasterId r:id="rId31"/>
+    <p:notesMasterId r:id="rId30"/>
   </p:notesMasterIdLst>
   <p:sldIdLst>
     <p:sldId id="256" r:id="rId2"/>
@@ -29,14 +29,13 @@
     <p:sldId id="276" r:id="rId20"/>
     <p:sldId id="275" r:id="rId21"/>
     <p:sldId id="277" r:id="rId22"/>
-    <p:sldId id="280" r:id="rId23"/>
-    <p:sldId id="278" r:id="rId24"/>
-    <p:sldId id="281" r:id="rId25"/>
-    <p:sldId id="279" r:id="rId26"/>
+    <p:sldId id="278" r:id="rId23"/>
+    <p:sldId id="279" r:id="rId24"/>
+    <p:sldId id="280" r:id="rId25"/>
+    <p:sldId id="281" r:id="rId26"/>
     <p:sldId id="282" r:id="rId27"/>
     <p:sldId id="285" r:id="rId28"/>
     <p:sldId id="283" r:id="rId29"/>
-    <p:sldId id="290" r:id="rId30"/>
   </p:sldIdLst>
   <p:sldSz cx="12192000" cy="6858000"/>
   <p:notesSz cx="6858000" cy="9144000"/>
@@ -542,18 +541,14 @@
             </a:pPr>
             <a:r>
               <a:rPr lang="en-US" dirty="0"/>
-              <a:t>Make a new directory</a:t>
-            </a:r>
-            <a:r>
-              <a:rPr lang="en-US" dirty="0" smtClean="0"/>
-              <a:t>.  </a:t>
-            </a:r>
-            <a:r>
-              <a:rPr lang="en-US" dirty="0" err="1" smtClean="0"/>
+              <a:t>Make a new directory.  </a:t>
+            </a:r>
+            <a:r>
+              <a:rPr lang="en-US" dirty="0" err="1"/>
               <a:t>Mkdir</a:t>
             </a:r>
             <a:r>
-              <a:rPr lang="en-US" baseline="0" dirty="0" smtClean="0"/>
+              <a:rPr lang="en-US" baseline="0" dirty="0"/>
               <a:t> </a:t>
             </a:r>
             <a:endParaRPr lang="en-US" dirty="0"/>
@@ -569,19 +564,11 @@
             </a:r>
             <a:r>
               <a:rPr lang="en-US" dirty="0" err="1"/>
-              <a:t>m</a:t>
-            </a:r>
-            <a:r>
-              <a:rPr lang="en-US" dirty="0" err="1" smtClean="0"/>
-              <a:t>atlab</a:t>
-            </a:r>
-            <a:r>
-              <a:rPr lang="en-US" dirty="0" smtClean="0"/>
-              <a:t> </a:t>
-            </a:r>
-            <a:r>
-              <a:rPr lang="en-US" dirty="0"/>
-              <a:t>script.  Save it.</a:t>
+              <a:t>matlab</a:t>
+            </a:r>
+            <a:r>
+              <a:rPr lang="en-US" dirty="0"/>
+              <a:t> script.  Save it.</a:t>
             </a:r>
           </a:p>
           <a:p>
@@ -611,11 +598,7 @@
             </a:pPr>
             <a:r>
               <a:rPr lang="en-US" dirty="0"/>
-              <a:t>Mention configuring username and email</a:t>
-            </a:r>
-            <a:r>
-              <a:rPr lang="en-US" dirty="0" smtClean="0"/>
-              <a:t>.</a:t>
+              <a:t>Mention configuring username and email.</a:t>
             </a:r>
           </a:p>
           <a:p>
@@ -623,7 +606,7 @@
               <a:buFontTx/>
               <a:buNone/>
             </a:pPr>
-            <a:endParaRPr lang="en-US" dirty="0" smtClean="0"/>
+            <a:endParaRPr lang="en-US" dirty="0"/>
           </a:p>
           <a:p>
             <a:pPr marL="457200" lvl="1" indent="0">
@@ -1151,15 +1134,7 @@
             </a:pPr>
             <a:r>
               <a:rPr lang="en-US" dirty="0"/>
-              <a:t>Show how Lishi and I handled merge </a:t>
-            </a:r>
-            <a:r>
-              <a:rPr lang="en-US" dirty="0" smtClean="0"/>
-              <a:t>conflicts </a:t>
-            </a:r>
-            <a:r>
-              <a:rPr lang="en-US" dirty="0"/>
-              <a:t>with the presentation.</a:t>
+              <a:t>Show how Lishi and I handled merge conflicts with the presentation.</a:t>
             </a:r>
           </a:p>
         </p:txBody>
@@ -1721,7 +1696,7 @@
     </p:spTree>
     <p:extLst>
       <p:ext uri="{BB962C8B-B14F-4D97-AF65-F5344CB8AC3E}">
-        <p14:creationId xmlns:p14="http://schemas.microsoft.com/office/powerpoint/2010/main" val="4061407928"/>
+        <p14:creationId xmlns:p14="http://schemas.microsoft.com/office/powerpoint/2010/main" val="1026353405"/>
       </p:ext>
     </p:extLst>
   </p:cSld>
@@ -1898,7 +1873,7 @@
     </p:spTree>
     <p:extLst>
       <p:ext uri="{BB962C8B-B14F-4D97-AF65-F5344CB8AC3E}">
-        <p14:creationId xmlns:p14="http://schemas.microsoft.com/office/powerpoint/2010/main" val="1026353405"/>
+        <p14:creationId xmlns:p14="http://schemas.microsoft.com/office/powerpoint/2010/main" val="3086177368"/>
       </p:ext>
     </p:extLst>
   </p:cSld>
@@ -2075,7 +2050,7 @@
     </p:spTree>
     <p:extLst>
       <p:ext uri="{BB962C8B-B14F-4D97-AF65-F5344CB8AC3E}">
-        <p14:creationId xmlns:p14="http://schemas.microsoft.com/office/powerpoint/2010/main" val="2889247344"/>
+        <p14:creationId xmlns:p14="http://schemas.microsoft.com/office/powerpoint/2010/main" val="4061407928"/>
       </p:ext>
     </p:extLst>
   </p:cSld>
@@ -2252,7 +2227,7 @@
     </p:spTree>
     <p:extLst>
       <p:ext uri="{BB962C8B-B14F-4D97-AF65-F5344CB8AC3E}">
-        <p14:creationId xmlns:p14="http://schemas.microsoft.com/office/powerpoint/2010/main" val="3086177368"/>
+        <p14:creationId xmlns:p14="http://schemas.microsoft.com/office/powerpoint/2010/main" val="2889247344"/>
       </p:ext>
     </p:extLst>
   </p:cSld>
@@ -2488,12 +2463,8 @@
               <a:buChar char="-"/>
             </a:pPr>
             <a:r>
-              <a:rPr lang="en-US" dirty="0" smtClean="0"/>
-              <a:t>Add </a:t>
-            </a:r>
-            <a:r>
-              <a:rPr lang="en-US" dirty="0"/>
-              <a:t>the script to the repository. </a:t>
+              <a:rPr lang="en-US" dirty="0"/>
+              <a:t>Add the script to the repository. </a:t>
             </a:r>
           </a:p>
           <a:p>
@@ -2513,13 +2484,8 @@
             </a:pPr>
             <a:r>
               <a:rPr lang="en-US" dirty="0"/>
-              <a:t>Add a fake data file to the directory, but don’t track it</a:t>
-            </a:r>
-            <a:r>
-              <a:rPr lang="en-US" dirty="0" smtClean="0"/>
-              <a:t>.</a:t>
-            </a:r>
-            <a:endParaRPr lang="en-US" dirty="0"/>
+              <a:t>Add a fake data file to the directory, but don’t track it.</a:t>
+            </a:r>
           </a:p>
         </p:txBody>
       </p:sp>
@@ -2626,11 +2592,7 @@
             </a:pPr>
             <a:r>
               <a:rPr lang="en-US" dirty="0"/>
-              <a:t>Talk about the –m </a:t>
-            </a:r>
-            <a:r>
-              <a:rPr lang="en-US" dirty="0" smtClean="0"/>
-              <a:t>option</a:t>
+              <a:t>Talk about the –m option</a:t>
             </a:r>
           </a:p>
           <a:p>
@@ -2639,7 +2601,7 @@
               <a:buChar char="-"/>
             </a:pPr>
             <a:r>
-              <a:rPr lang="en-US" dirty="0" smtClean="0"/>
+              <a:rPr lang="en-US" dirty="0"/>
               <a:t>Talk about good committing practices.</a:t>
             </a:r>
           </a:p>
@@ -2649,7 +2611,7 @@
               <a:buChar char="-"/>
             </a:pPr>
             <a:r>
-              <a:rPr lang="en-US" dirty="0" smtClean="0"/>
+              <a:rPr lang="en-US" dirty="0"/>
               <a:t>Committing completed code (break code into small chunks and commit each separately)</a:t>
             </a:r>
           </a:p>
@@ -2659,7 +2621,7 @@
               <a:buChar char="-"/>
             </a:pPr>
             <a:r>
-              <a:rPr lang="en-US" dirty="0" smtClean="0"/>
+              <a:rPr lang="en-US" dirty="0"/>
               <a:t>Commit in the imperative, telling what the code will do after the commit not what you’ve done.</a:t>
             </a:r>
           </a:p>
@@ -2750,12 +2712,8 @@
               <a:buChar char="-"/>
             </a:pPr>
             <a:r>
-              <a:rPr lang="en-US" dirty="0" smtClean="0"/>
-              <a:t>Introduce </a:t>
-            </a:r>
-            <a:r>
-              <a:rPr lang="en-US" dirty="0"/>
-              <a:t>git status</a:t>
+              <a:rPr lang="en-US" dirty="0"/>
+              <a:t>Introduce git status</a:t>
             </a:r>
           </a:p>
           <a:p>
@@ -2825,13 +2783,8 @@
             </a:pPr>
             <a:r>
               <a:rPr lang="en-US" dirty="0"/>
-              <a:t>Talk about the lifecycle of the status of files</a:t>
-            </a:r>
-            <a:r>
-              <a:rPr lang="en-US" dirty="0" smtClean="0"/>
-              <a:t>.</a:t>
-            </a:r>
-            <a:endParaRPr lang="en-US" dirty="0"/>
+              <a:t>Talk about the lifecycle of the status of files.</a:t>
+            </a:r>
           </a:p>
         </p:txBody>
       </p:sp>
@@ -2920,18 +2873,9 @@
               <a:buChar char="-"/>
             </a:pPr>
             <a:r>
-              <a:rPr lang="en-US" dirty="0" smtClean="0"/>
-              <a:t>Talk </a:t>
-            </a:r>
-            <a:r>
-              <a:rPr lang="en-US" dirty="0"/>
-              <a:t>about the lifecycle of the status of files</a:t>
-            </a:r>
-            <a:r>
-              <a:rPr lang="en-US" dirty="0" smtClean="0"/>
-              <a:t>.</a:t>
-            </a:r>
-            <a:endParaRPr lang="en-US" dirty="0"/>
+              <a:rPr lang="en-US" dirty="0"/>
+              <a:t>Talk about the lifecycle of the status of files.</a:t>
+            </a:r>
           </a:p>
         </p:txBody>
       </p:sp>
@@ -3020,12 +2964,8 @@
               <a:buChar char="-"/>
             </a:pPr>
             <a:r>
-              <a:rPr lang="en-US" dirty="0" smtClean="0"/>
-              <a:t>Run </a:t>
-            </a:r>
-            <a:r>
-              <a:rPr lang="en-US" dirty="0"/>
-              <a:t>git status right after commit.</a:t>
+              <a:rPr lang="en-US" dirty="0"/>
+              <a:t>Run git status right after commit.</a:t>
             </a:r>
           </a:p>
           <a:p>
@@ -3075,13 +3015,8 @@
             </a:pPr>
             <a:r>
               <a:rPr lang="en-US" dirty="0"/>
-              <a:t>Commit changes</a:t>
-            </a:r>
-            <a:r>
-              <a:rPr lang="en-US" dirty="0" smtClean="0"/>
-              <a:t>.</a:t>
-            </a:r>
-            <a:endParaRPr lang="en-US" dirty="0"/>
+              <a:t>Commit changes.</a:t>
+            </a:r>
           </a:p>
         </p:txBody>
       </p:sp>
@@ -3170,12 +3105,8 @@
               <a:buChar char="-"/>
             </a:pPr>
             <a:r>
-              <a:rPr lang="en-US" dirty="0" smtClean="0"/>
-              <a:t>Talk </a:t>
-            </a:r>
-            <a:r>
-              <a:rPr lang="en-US" dirty="0"/>
-              <a:t>about good committing practices.</a:t>
+              <a:rPr lang="en-US" dirty="0"/>
+              <a:t>Talk about good committing practices.</a:t>
             </a:r>
           </a:p>
           <a:p>
@@ -3195,13 +3126,8 @@
             </a:pPr>
             <a:r>
               <a:rPr lang="en-US" dirty="0"/>
-              <a:t>Commit in the imperative, telling what the code will do after the commit not what you’ve done</a:t>
-            </a:r>
-            <a:r>
-              <a:rPr lang="en-US" dirty="0" smtClean="0"/>
-              <a:t>.</a:t>
-            </a:r>
-            <a:endParaRPr lang="en-US" dirty="0"/>
+              <a:t>Commit in the imperative, telling what the code will do after the commit not what you’ve done.</a:t>
+            </a:r>
           </a:p>
         </p:txBody>
       </p:sp>
@@ -3303,12 +3229,8 @@
               <a:defRPr/>
             </a:pPr>
             <a:r>
-              <a:rPr lang="en-US" dirty="0" smtClean="0"/>
-              <a:t>Introduce </a:t>
-            </a:r>
-            <a:r>
-              <a:rPr lang="en-US" dirty="0"/>
-              <a:t>a .</a:t>
+              <a:rPr lang="en-US" dirty="0"/>
+              <a:t>Introduce a .</a:t>
             </a:r>
             <a:r>
               <a:rPr lang="en-US" dirty="0" err="1"/>
@@ -7873,13 +7795,8 @@
             </a:pPr>
             <a:r>
               <a:rPr lang="en-US" dirty="0"/>
-              <a:t>git commit (-m “message</a:t>
-            </a:r>
-            <a:r>
-              <a:rPr lang="en-US" dirty="0" smtClean="0"/>
-              <a:t>”)</a:t>
-            </a:r>
-            <a:endParaRPr lang="en-US" dirty="0"/>
+              <a:t>git commit (-m “message”)</a:t>
+            </a:r>
           </a:p>
           <a:p>
             <a:pPr marL="285750" indent="-285750">
@@ -7892,11 +7809,7 @@
             </a:r>
             <a:r>
               <a:rPr lang="en-US" dirty="0"/>
-              <a:t> </a:t>
-            </a:r>
-            <a:r>
-              <a:rPr lang="en-US" dirty="0" smtClean="0"/>
-              <a:t>status</a:t>
+              <a:t> status</a:t>
             </a:r>
           </a:p>
           <a:p>
@@ -7919,16 +7832,12 @@
               <a:buChar char="•"/>
             </a:pPr>
             <a:r>
-              <a:rPr lang="en-US" dirty="0" err="1" smtClean="0"/>
+              <a:rPr lang="en-US" dirty="0" err="1"/>
               <a:t>git</a:t>
             </a:r>
             <a:r>
-              <a:rPr lang="en-US" dirty="0" smtClean="0"/>
-              <a:t> </a:t>
-            </a:r>
-            <a:r>
-              <a:rPr lang="en-US" dirty="0"/>
-              <a:t>rm (-f) </a:t>
+              <a:rPr lang="en-US" dirty="0"/>
+              <a:t> rm (-f) </a:t>
             </a:r>
           </a:p>
         </p:txBody>
@@ -8016,10 +7925,9 @@
           <a:lstStyle/>
           <a:p>
             <a:r>
-              <a:rPr lang="en-US" sz="4000" dirty="0" smtClean="0"/>
+              <a:rPr lang="en-US" sz="4000" dirty="0"/>
               <a:t>View earlier versions</a:t>
             </a:r>
-            <a:endParaRPr lang="en-US" sz="4000" dirty="0"/>
           </a:p>
         </p:txBody>
       </p:sp>
@@ -8088,16 +7996,8 @@
               <a:buChar char="•"/>
             </a:pPr>
             <a:r>
-              <a:rPr lang="en-US" dirty="0" err="1" smtClean="0"/>
-              <a:t>git</a:t>
-            </a:r>
-            <a:r>
-              <a:rPr lang="en-US" dirty="0" smtClean="0"/>
-              <a:t> </a:t>
-            </a:r>
-            <a:r>
-              <a:rPr lang="en-US" dirty="0"/>
-              <a:t>checkout -- &lt;file&gt;</a:t>
+              <a:rPr lang="en-US" dirty="0"/>
+              <a:t>git checkout </a:t>
             </a:r>
           </a:p>
           <a:p>
@@ -8381,23 +8281,7 @@
                   <a:srgbClr val="FF0000"/>
                 </a:solidFill>
               </a:rPr>
-              <a:t>git branch </a:t>
-            </a:r>
-            <a:r>
-              <a:rPr lang="en-US" sz="3600" dirty="0" smtClean="0">
-                <a:solidFill>
-                  <a:srgbClr val="FF0000"/>
-                </a:solidFill>
-              </a:rPr>
-              <a:t>&lt;</a:t>
-            </a:r>
-            <a:r>
-              <a:rPr lang="en-US" sz="3600" dirty="0">
-                <a:solidFill>
-                  <a:srgbClr val="FF0000"/>
-                </a:solidFill>
-              </a:rPr>
-              <a:t>name&gt;</a:t>
+              <a:t>git branch &lt;name&gt;</a:t>
             </a:r>
           </a:p>
           <a:p>
@@ -8437,11 +8321,7 @@
             </a:pPr>
             <a:r>
               <a:rPr lang="en-US" dirty="0"/>
-              <a:t>git rebase &lt;new base</a:t>
-            </a:r>
-            <a:r>
-              <a:rPr lang="en-US" dirty="0" smtClean="0"/>
-              <a:t>&gt;</a:t>
+              <a:t>git rebase &lt;new base&gt;</a:t>
             </a:r>
           </a:p>
           <a:p>
@@ -8456,11 +8336,11 @@
               <a:buFont typeface="Arial" panose="020B0604020202020204" pitchFamily="34" charset="0"/>
               <a:buChar char="•"/>
             </a:pPr>
-            <a:endParaRPr lang="en-US" dirty="0" smtClean="0"/>
-          </a:p>
-          <a:p>
-            <a:r>
-              <a:rPr lang="en-US" dirty="0" smtClean="0"/>
+            <a:endParaRPr lang="en-US" dirty="0"/>
+          </a:p>
+          <a:p>
+            <a:r>
+              <a:rPr lang="en-US" dirty="0"/>
               <a:t>To delete a branch: </a:t>
             </a:r>
           </a:p>
@@ -8475,15 +8355,7 @@
             </a:r>
             <a:r>
               <a:rPr lang="en-US" dirty="0"/>
-              <a:t> branch </a:t>
-            </a:r>
-            <a:r>
-              <a:rPr lang="en-US" dirty="0" smtClean="0"/>
-              <a:t>-d </a:t>
-            </a:r>
-            <a:r>
-              <a:rPr lang="en-US" dirty="0"/>
-              <a:t>&lt;name&gt;</a:t>
+              <a:t> branch -d &lt;name&gt;</a:t>
             </a:r>
           </a:p>
           <a:p>
@@ -9067,7 +8939,6 @@
               <a:rPr lang="en-US" dirty="0"/>
               <a:t>of working code. </a:t>
             </a:r>
-            <a:endParaRPr lang="en-US" dirty="0" smtClean="0"/>
           </a:p>
           <a:p>
             <a:pPr marL="742950" lvl="1" indent="-285750">
@@ -9081,7 +8952,7 @@
               <a:buFont typeface="Arial" panose="020B0604020202020204" pitchFamily="34" charset="0"/>
               <a:buChar char="•"/>
             </a:pPr>
-            <a:endParaRPr lang="en-US" dirty="0" smtClean="0"/>
+            <a:endParaRPr lang="en-US" dirty="0"/>
           </a:p>
           <a:p>
             <a:pPr marL="742950" lvl="1" indent="-285750">
@@ -9099,22 +8970,21 @@
               <a:buFont typeface="Arial" panose="020B0604020202020204" pitchFamily="34" charset="0"/>
               <a:buChar char="•"/>
             </a:pPr>
-            <a:endParaRPr lang="en-US" dirty="0" smtClean="0"/>
-          </a:p>
-          <a:p>
-            <a:pPr marL="285750" indent="-285750">
-              <a:buFont typeface="Arial" panose="020B0604020202020204" pitchFamily="34" charset="0"/>
-              <a:buChar char="•"/>
-            </a:pPr>
             <a:endParaRPr lang="en-US" dirty="0"/>
           </a:p>
           <a:p>
+            <a:pPr marL="285750" indent="-285750">
+              <a:buFont typeface="Arial" panose="020B0604020202020204" pitchFamily="34" charset="0"/>
+              <a:buChar char="•"/>
+            </a:pPr>
+            <a:endParaRPr lang="en-US" dirty="0"/>
+          </a:p>
+          <a:p>
             <a:pPr lvl="1"/>
             <a:r>
-              <a:rPr lang="en-US" dirty="0" smtClean="0"/>
+              <a:rPr lang="en-US" dirty="0"/>
               <a:t> </a:t>
             </a:r>
-            <a:endParaRPr lang="en-US" dirty="0"/>
           </a:p>
           <a:p>
             <a:pPr lvl="2"/>
@@ -9609,190 +9479,6 @@
         <p:spPr>
           <a:xfrm>
             <a:off x="667149" y="2287244"/>
-            <a:ext cx="3519233" cy="1754326"/>
-          </a:xfrm>
-          <a:prstGeom prst="rect">
-            <a:avLst/>
-          </a:prstGeom>
-          <a:noFill/>
-        </p:spPr>
-        <p:txBody>
-          <a:bodyPr wrap="none" rtlCol="0">
-            <a:spAutoFit/>
-          </a:bodyPr>
-          <a:lstStyle/>
-          <a:p>
-            <a:pPr marL="285750" indent="-285750">
-              <a:buFont typeface="Arial" panose="020B0604020202020204" pitchFamily="34" charset="0"/>
-              <a:buChar char="•"/>
-            </a:pPr>
-            <a:r>
-              <a:rPr lang="en-US" dirty="0"/>
-              <a:t>git branch (-d -v) &lt;name&gt;</a:t>
-            </a:r>
-          </a:p>
-          <a:p>
-            <a:pPr marL="285750" indent="-285750">
-              <a:buFont typeface="Arial" panose="020B0604020202020204" pitchFamily="34" charset="0"/>
-              <a:buChar char="•"/>
-            </a:pPr>
-            <a:r>
-              <a:rPr lang="en-US" dirty="0"/>
-              <a:t>git checkout (-b) &lt;branch name&gt;</a:t>
-            </a:r>
-          </a:p>
-          <a:p>
-            <a:pPr marL="285750" indent="-285750">
-              <a:buFont typeface="Arial" panose="020B0604020202020204" pitchFamily="34" charset="0"/>
-              <a:buChar char="•"/>
-            </a:pPr>
-            <a:r>
-              <a:rPr lang="en-US" sz="3600" dirty="0">
-                <a:solidFill>
-                  <a:srgbClr val="FF0000"/>
-                </a:solidFill>
-              </a:rPr>
-              <a:t>git stash </a:t>
-            </a:r>
-          </a:p>
-          <a:p>
-            <a:pPr marL="285750" indent="-285750">
-              <a:buFont typeface="Arial" panose="020B0604020202020204" pitchFamily="34" charset="0"/>
-              <a:buChar char="•"/>
-            </a:pPr>
-            <a:r>
-              <a:rPr lang="en-US" dirty="0"/>
-              <a:t>git merge &lt;branch name&gt;</a:t>
-            </a:r>
-          </a:p>
-          <a:p>
-            <a:pPr marL="285750" indent="-285750">
-              <a:buFont typeface="Arial" panose="020B0604020202020204" pitchFamily="34" charset="0"/>
-              <a:buChar char="•"/>
-            </a:pPr>
-            <a:r>
-              <a:rPr lang="en-US" dirty="0"/>
-              <a:t>git rebase &lt;new base&gt;</a:t>
-            </a:r>
-          </a:p>
-        </p:txBody>
-      </p:sp>
-      <p:pic>
-        <p:nvPicPr>
-          <p:cNvPr id="5" name="Picture 4">
-            <a:extLst>
-              <a:ext uri="{FF2B5EF4-FFF2-40B4-BE49-F238E27FC236}">
-                <a16:creationId xmlns:a16="http://schemas.microsoft.com/office/drawing/2014/main" id="{C5FE871C-1934-4752-8D9C-7372F29B66DE}"/>
-              </a:ext>
-            </a:extLst>
-          </p:cNvPr>
-          <p:cNvPicPr>
-            <a:picLocks noChangeAspect="1"/>
-          </p:cNvPicPr>
-          <p:nvPr/>
-        </p:nvPicPr>
-        <p:blipFill>
-          <a:blip r:embed="rId3">
-            <a:extLst>
-              <a:ext uri="{28A0092B-C50C-407E-A947-70E740481C1C}">
-                <a14:useLocalDpi xmlns:a14="http://schemas.microsoft.com/office/drawing/2010/main" val="0"/>
-              </a:ext>
-            </a:extLst>
-          </a:blip>
-          <a:stretch>
-            <a:fillRect/>
-          </a:stretch>
-        </p:blipFill>
-        <p:spPr>
-          <a:xfrm>
-            <a:off x="5173146" y="2055663"/>
-            <a:ext cx="5838868" cy="2948009"/>
-          </a:xfrm>
-          <a:prstGeom prst="rect">
-            <a:avLst/>
-          </a:prstGeom>
-        </p:spPr>
-      </p:pic>
-    </p:spTree>
-    <p:extLst>
-      <p:ext uri="{BB962C8B-B14F-4D97-AF65-F5344CB8AC3E}">
-        <p14:creationId xmlns:p14="http://schemas.microsoft.com/office/powerpoint/2010/main" val="2409735082"/>
-      </p:ext>
-    </p:extLst>
-  </p:cSld>
-  <p:clrMapOvr>
-    <a:masterClrMapping/>
-  </p:clrMapOvr>
-</p:sld>
-</file>
-
-<file path=ppt/slides/slide23.xml><?xml version="1.0" encoding="utf-8"?>
-<p:sld xmlns:a="http://schemas.openxmlformats.org/drawingml/2006/main" xmlns:r="http://schemas.openxmlformats.org/officeDocument/2006/relationships" xmlns:p="http://schemas.openxmlformats.org/presentationml/2006/main">
-  <p:cSld>
-    <p:spTree>
-      <p:nvGrpSpPr>
-        <p:cNvPr id="1" name=""/>
-        <p:cNvGrpSpPr/>
-        <p:nvPr/>
-      </p:nvGrpSpPr>
-      <p:grpSpPr>
-        <a:xfrm>
-          <a:off x="0" y="0"/>
-          <a:ext cx="0" cy="0"/>
-          <a:chOff x="0" y="0"/>
-          <a:chExt cx="0" cy="0"/>
-        </a:xfrm>
-      </p:grpSpPr>
-      <p:sp>
-        <p:nvSpPr>
-          <p:cNvPr id="2" name="TextBox 1">
-            <a:extLst>
-              <a:ext uri="{FF2B5EF4-FFF2-40B4-BE49-F238E27FC236}">
-                <a16:creationId xmlns:a16="http://schemas.microsoft.com/office/drawing/2014/main" id="{211E321F-9F54-498F-BD6F-D26DA9D4DE07}"/>
-              </a:ext>
-            </a:extLst>
-          </p:cNvPr>
-          <p:cNvSpPr txBox="1"/>
-          <p:nvPr/>
-        </p:nvSpPr>
-        <p:spPr>
-          <a:xfrm>
-            <a:off x="586153" y="406400"/>
-            <a:ext cx="2650790" cy="707886"/>
-          </a:xfrm>
-          <a:prstGeom prst="rect">
-            <a:avLst/>
-          </a:prstGeom>
-          <a:noFill/>
-        </p:spPr>
-        <p:txBody>
-          <a:bodyPr wrap="none" rtlCol="0">
-            <a:spAutoFit/>
-          </a:bodyPr>
-          <a:lstStyle/>
-          <a:p>
-            <a:r>
-              <a:rPr lang="en-US" sz="4000" dirty="0"/>
-              <a:t>Branching…</a:t>
-            </a:r>
-          </a:p>
-        </p:txBody>
-      </p:sp>
-      <p:sp>
-        <p:nvSpPr>
-          <p:cNvPr id="3" name="TextBox 2">
-            <a:extLst>
-              <a:ext uri="{FF2B5EF4-FFF2-40B4-BE49-F238E27FC236}">
-                <a16:creationId xmlns:a16="http://schemas.microsoft.com/office/drawing/2014/main" id="{CAF814E6-FC94-4AA4-8BDA-EB411A456B88}"/>
-              </a:ext>
-            </a:extLst>
-          </p:cNvPr>
-          <p:cNvSpPr txBox="1"/>
-          <p:nvPr/>
-        </p:nvSpPr>
-        <p:spPr>
-          <a:xfrm>
-            <a:off x="667149" y="2287244"/>
             <a:ext cx="5272213" cy="1754326"/>
           </a:xfrm>
           <a:prstGeom prst="rect">
@@ -9910,7 +9596,7 @@
 </p:sld>
 </file>
 
-<file path=ppt/slides/slide24.xml><?xml version="1.0" encoding="utf-8"?>
+<file path=ppt/slides/slide23.xml><?xml version="1.0" encoding="utf-8"?>
 <p:sld xmlns:a="http://schemas.openxmlformats.org/drawingml/2006/main" xmlns:r="http://schemas.openxmlformats.org/officeDocument/2006/relationships" xmlns:p="http://schemas.openxmlformats.org/presentationml/2006/main">
   <p:cSld>
     <p:spTree>
@@ -9932,7 +9618,7 @@
           <p:cNvPr id="6" name="Picture 5">
             <a:extLst>
               <a:ext uri="{FF2B5EF4-FFF2-40B4-BE49-F238E27FC236}">
-                <a16:creationId xmlns:a16="http://schemas.microsoft.com/office/drawing/2014/main" id="{E9453D0D-EA72-4614-A260-3AB2D8BE9A69}"/>
+                <a16:creationId xmlns:a16="http://schemas.microsoft.com/office/drawing/2014/main" id="{11354057-BADD-48FE-8F38-509E14140C66}"/>
               </a:ext>
             </a:extLst>
           </p:cNvPr>
@@ -9955,8 +9641,8 @@
         </p:blipFill>
         <p:spPr>
           <a:xfrm>
-            <a:off x="5836422" y="2223270"/>
-            <a:ext cx="6005556" cy="2528906"/>
+            <a:off x="5723520" y="1904716"/>
+            <a:ext cx="5929356" cy="2519381"/>
           </a:xfrm>
           <a:prstGeom prst="rect">
             <a:avLst/>
@@ -10084,7 +9770,191 @@
     </p:spTree>
     <p:extLst>
       <p:ext uri="{BB962C8B-B14F-4D97-AF65-F5344CB8AC3E}">
-        <p14:creationId xmlns:p14="http://schemas.microsoft.com/office/powerpoint/2010/main" val="1798754958"/>
+        <p14:creationId xmlns:p14="http://schemas.microsoft.com/office/powerpoint/2010/main" val="1971368743"/>
+      </p:ext>
+    </p:extLst>
+  </p:cSld>
+  <p:clrMapOvr>
+    <a:masterClrMapping/>
+  </p:clrMapOvr>
+</p:sld>
+</file>
+
+<file path=ppt/slides/slide24.xml><?xml version="1.0" encoding="utf-8"?>
+<p:sld xmlns:a="http://schemas.openxmlformats.org/drawingml/2006/main" xmlns:r="http://schemas.openxmlformats.org/officeDocument/2006/relationships" xmlns:p="http://schemas.openxmlformats.org/presentationml/2006/main">
+  <p:cSld>
+    <p:spTree>
+      <p:nvGrpSpPr>
+        <p:cNvPr id="1" name=""/>
+        <p:cNvGrpSpPr/>
+        <p:nvPr/>
+      </p:nvGrpSpPr>
+      <p:grpSpPr>
+        <a:xfrm>
+          <a:off x="0" y="0"/>
+          <a:ext cx="0" cy="0"/>
+          <a:chOff x="0" y="0"/>
+          <a:chExt cx="0" cy="0"/>
+        </a:xfrm>
+      </p:grpSpPr>
+      <p:sp>
+        <p:nvSpPr>
+          <p:cNvPr id="2" name="TextBox 1">
+            <a:extLst>
+              <a:ext uri="{FF2B5EF4-FFF2-40B4-BE49-F238E27FC236}">
+                <a16:creationId xmlns:a16="http://schemas.microsoft.com/office/drawing/2014/main" id="{211E321F-9F54-498F-BD6F-D26DA9D4DE07}"/>
+              </a:ext>
+            </a:extLst>
+          </p:cNvPr>
+          <p:cNvSpPr txBox="1"/>
+          <p:nvPr/>
+        </p:nvSpPr>
+        <p:spPr>
+          <a:xfrm>
+            <a:off x="586153" y="406400"/>
+            <a:ext cx="2650790" cy="707886"/>
+          </a:xfrm>
+          <a:prstGeom prst="rect">
+            <a:avLst/>
+          </a:prstGeom>
+          <a:noFill/>
+        </p:spPr>
+        <p:txBody>
+          <a:bodyPr wrap="none" rtlCol="0">
+            <a:spAutoFit/>
+          </a:bodyPr>
+          <a:lstStyle/>
+          <a:p>
+            <a:r>
+              <a:rPr lang="en-US" sz="4000" dirty="0"/>
+              <a:t>Branching…</a:t>
+            </a:r>
+          </a:p>
+        </p:txBody>
+      </p:sp>
+      <p:sp>
+        <p:nvSpPr>
+          <p:cNvPr id="3" name="TextBox 2">
+            <a:extLst>
+              <a:ext uri="{FF2B5EF4-FFF2-40B4-BE49-F238E27FC236}">
+                <a16:creationId xmlns:a16="http://schemas.microsoft.com/office/drawing/2014/main" id="{CAF814E6-FC94-4AA4-8BDA-EB411A456B88}"/>
+              </a:ext>
+            </a:extLst>
+          </p:cNvPr>
+          <p:cNvSpPr txBox="1"/>
+          <p:nvPr/>
+        </p:nvSpPr>
+        <p:spPr>
+          <a:xfrm>
+            <a:off x="667149" y="2287244"/>
+            <a:ext cx="3519233" cy="1754326"/>
+          </a:xfrm>
+          <a:prstGeom prst="rect">
+            <a:avLst/>
+          </a:prstGeom>
+          <a:noFill/>
+        </p:spPr>
+        <p:txBody>
+          <a:bodyPr wrap="none" rtlCol="0">
+            <a:spAutoFit/>
+          </a:bodyPr>
+          <a:lstStyle/>
+          <a:p>
+            <a:pPr marL="285750" indent="-285750">
+              <a:buFont typeface="Arial" panose="020B0604020202020204" pitchFamily="34" charset="0"/>
+              <a:buChar char="•"/>
+            </a:pPr>
+            <a:r>
+              <a:rPr lang="en-US" dirty="0"/>
+              <a:t>git branch (-d -v) &lt;name&gt;</a:t>
+            </a:r>
+          </a:p>
+          <a:p>
+            <a:pPr marL="285750" indent="-285750">
+              <a:buFont typeface="Arial" panose="020B0604020202020204" pitchFamily="34" charset="0"/>
+              <a:buChar char="•"/>
+            </a:pPr>
+            <a:r>
+              <a:rPr lang="en-US" dirty="0"/>
+              <a:t>git checkout (-b) &lt;branch name&gt;</a:t>
+            </a:r>
+          </a:p>
+          <a:p>
+            <a:pPr marL="285750" indent="-285750">
+              <a:buFont typeface="Arial" panose="020B0604020202020204" pitchFamily="34" charset="0"/>
+              <a:buChar char="•"/>
+            </a:pPr>
+            <a:r>
+              <a:rPr lang="en-US" sz="3600" dirty="0">
+                <a:solidFill>
+                  <a:srgbClr val="FF0000"/>
+                </a:solidFill>
+              </a:rPr>
+              <a:t>git stash </a:t>
+            </a:r>
+          </a:p>
+          <a:p>
+            <a:pPr marL="285750" indent="-285750">
+              <a:buFont typeface="Arial" panose="020B0604020202020204" pitchFamily="34" charset="0"/>
+              <a:buChar char="•"/>
+            </a:pPr>
+            <a:r>
+              <a:rPr lang="en-US" dirty="0"/>
+              <a:t>git merge &lt;branch name&gt;</a:t>
+            </a:r>
+          </a:p>
+          <a:p>
+            <a:pPr marL="285750" indent="-285750">
+              <a:buFont typeface="Arial" panose="020B0604020202020204" pitchFamily="34" charset="0"/>
+              <a:buChar char="•"/>
+            </a:pPr>
+            <a:r>
+              <a:rPr lang="en-US" dirty="0"/>
+              <a:t>git rebase &lt;new base&gt;</a:t>
+            </a:r>
+          </a:p>
+        </p:txBody>
+      </p:sp>
+      <p:pic>
+        <p:nvPicPr>
+          <p:cNvPr id="5" name="Picture 4">
+            <a:extLst>
+              <a:ext uri="{FF2B5EF4-FFF2-40B4-BE49-F238E27FC236}">
+                <a16:creationId xmlns:a16="http://schemas.microsoft.com/office/drawing/2014/main" id="{C5FE871C-1934-4752-8D9C-7372F29B66DE}"/>
+              </a:ext>
+            </a:extLst>
+          </p:cNvPr>
+          <p:cNvPicPr>
+            <a:picLocks noChangeAspect="1"/>
+          </p:cNvPicPr>
+          <p:nvPr/>
+        </p:nvPicPr>
+        <p:blipFill>
+          <a:blip r:embed="rId3">
+            <a:extLst>
+              <a:ext uri="{28A0092B-C50C-407E-A947-70E740481C1C}">
+                <a14:useLocalDpi xmlns:a14="http://schemas.microsoft.com/office/drawing/2010/main" val="0"/>
+              </a:ext>
+            </a:extLst>
+          </a:blip>
+          <a:stretch>
+            <a:fillRect/>
+          </a:stretch>
+        </p:blipFill>
+        <p:spPr>
+          <a:xfrm>
+            <a:off x="5173146" y="2055663"/>
+            <a:ext cx="5838868" cy="2948009"/>
+          </a:xfrm>
+          <a:prstGeom prst="rect">
+            <a:avLst/>
+          </a:prstGeom>
+        </p:spPr>
+      </p:pic>
+    </p:spTree>
+    <p:extLst>
+      <p:ext uri="{BB962C8B-B14F-4D97-AF65-F5344CB8AC3E}">
+        <p14:creationId xmlns:p14="http://schemas.microsoft.com/office/powerpoint/2010/main" val="2409735082"/>
       </p:ext>
     </p:extLst>
   </p:cSld>
@@ -10116,7 +9986,7 @@
           <p:cNvPr id="6" name="Picture 5">
             <a:extLst>
               <a:ext uri="{FF2B5EF4-FFF2-40B4-BE49-F238E27FC236}">
-                <a16:creationId xmlns:a16="http://schemas.microsoft.com/office/drawing/2014/main" id="{11354057-BADD-48FE-8F38-509E14140C66}"/>
+                <a16:creationId xmlns:a16="http://schemas.microsoft.com/office/drawing/2014/main" id="{E9453D0D-EA72-4614-A260-3AB2D8BE9A69}"/>
               </a:ext>
             </a:extLst>
           </p:cNvPr>
@@ -10139,8 +10009,8 @@
         </p:blipFill>
         <p:spPr>
           <a:xfrm>
-            <a:off x="5723520" y="1904716"/>
-            <a:ext cx="5929356" cy="2519381"/>
+            <a:off x="5836422" y="2223270"/>
+            <a:ext cx="6005556" cy="2528906"/>
           </a:xfrm>
           <a:prstGeom prst="rect">
             <a:avLst/>
@@ -10268,7 +10138,7 @@
     </p:spTree>
     <p:extLst>
       <p:ext uri="{BB962C8B-B14F-4D97-AF65-F5344CB8AC3E}">
-        <p14:creationId xmlns:p14="http://schemas.microsoft.com/office/powerpoint/2010/main" val="1971368743"/>
+        <p14:creationId xmlns:p14="http://schemas.microsoft.com/office/powerpoint/2010/main" val="1798754958"/>
       </p:ext>
     </p:extLst>
   </p:cSld>
@@ -10381,7 +10251,7 @@
         <p:spPr>
           <a:xfrm>
             <a:off x="667149" y="2287244"/>
-            <a:ext cx="5272213" cy="1754326"/>
+            <a:ext cx="5272213" cy="2031325"/>
           </a:xfrm>
           <a:prstGeom prst="rect">
             <a:avLst/>
@@ -10443,7 +10313,11 @@
               <a:buChar char="•"/>
             </a:pPr>
             <a:r>
-              <a:rPr lang="en-US" dirty="0"/>
+              <a:rPr lang="en-US" sz="3600" dirty="0">
+                <a:solidFill>
+                  <a:srgbClr val="FF0000"/>
+                </a:solidFill>
+              </a:rPr>
               <a:t>git rebase &lt;new base&gt;</a:t>
             </a:r>
           </a:p>
@@ -10637,18 +10511,13 @@
           <a:lstStyle/>
           <a:p>
             <a:r>
-              <a:rPr lang="en-US" dirty="0" smtClean="0">
+              <a:rPr lang="en-US" dirty="0">
                 <a:solidFill>
                   <a:srgbClr val="FF0000"/>
                 </a:solidFill>
               </a:rPr>
               <a:t>GitHub/Cluster</a:t>
             </a:r>
-            <a:endParaRPr lang="en-US" dirty="0">
-              <a:solidFill>
-                <a:srgbClr val="FF0000"/>
-              </a:solidFill>
-            </a:endParaRPr>
           </a:p>
         </p:txBody>
       </p:sp>
@@ -10711,10 +10580,9 @@
           <a:lstStyle/>
           <a:p>
             <a:r>
-              <a:rPr lang="en-US" sz="4000" dirty="0" smtClean="0"/>
+              <a:rPr lang="en-US" sz="4000" dirty="0"/>
               <a:t>GITHUB</a:t>
             </a:r>
-            <a:endParaRPr lang="en-US" sz="4000" dirty="0"/>
           </a:p>
         </p:txBody>
       </p:sp>
@@ -10740,122 +10608,104 @@
           <a:lstStyle/>
           <a:p>
             <a:r>
-              <a:rPr lang="en-US" dirty="0" smtClean="0"/>
+              <a:rPr lang="en-US" dirty="0"/>
               <a:t>Set up an account at </a:t>
-            </a:r>
-            <a:r>
-              <a:rPr lang="en-US" dirty="0" smtClean="0">
-                <a:hlinkClick r:id="rId2"/>
-              </a:rPr>
-              <a:t>https</a:t>
             </a:r>
             <a:r>
               <a:rPr lang="en-US" dirty="0">
                 <a:hlinkClick r:id="rId2"/>
               </a:rPr>
-              <a:t>://github.com</a:t>
-            </a:r>
-            <a:r>
-              <a:rPr lang="en-US" dirty="0" smtClean="0">
-                <a:hlinkClick r:id="rId2"/>
-              </a:rPr>
-              <a:t>/</a:t>
-            </a:r>
-            <a:r>
-              <a:rPr lang="en-US" dirty="0" smtClean="0"/>
+              <a:t>https://github.com/</a:t>
+            </a:r>
+            <a:r>
+              <a:rPr lang="en-US" dirty="0"/>
               <a:t>  </a:t>
             </a:r>
           </a:p>
           <a:p>
-            <a:endParaRPr lang="en-US" dirty="0" smtClean="0"/>
+            <a:endParaRPr lang="en-US" dirty="0"/>
           </a:p>
           <a:p>
             <a:pPr marL="285750" indent="-285750">
               <a:buFontTx/>
               <a:buChar char="-"/>
             </a:pPr>
-            <a:endParaRPr lang="en-US" dirty="0" smtClean="0"/>
-          </a:p>
-          <a:p>
-            <a:r>
-              <a:rPr lang="en-US" dirty="0"/>
-              <a:t>Method </a:t>
-            </a:r>
-            <a:r>
-              <a:rPr lang="en-US" dirty="0" smtClean="0"/>
-              <a:t>1: </a:t>
-            </a:r>
-          </a:p>
-          <a:p>
-            <a:r>
-              <a:rPr lang="en-US" dirty="0" smtClean="0"/>
+            <a:endParaRPr lang="en-US" dirty="0"/>
+          </a:p>
+          <a:p>
+            <a:r>
+              <a:rPr lang="en-US" dirty="0"/>
+              <a:t>Method 1: </a:t>
+            </a:r>
+          </a:p>
+          <a:p>
+            <a:r>
+              <a:rPr lang="en-US" dirty="0"/>
               <a:t>(If you have a working local repo and you want to</a:t>
             </a:r>
           </a:p>
           <a:p>
             <a:r>
-              <a:rPr lang="en-US" dirty="0" smtClean="0"/>
+              <a:rPr lang="en-US" dirty="0"/>
               <a:t> create a remote repo)</a:t>
             </a:r>
           </a:p>
           <a:p>
-            <a:endParaRPr lang="en-US" dirty="0" smtClean="0"/>
-          </a:p>
-          <a:p>
-            <a:r>
-              <a:rPr lang="en-US" dirty="0" smtClean="0"/>
+            <a:endParaRPr lang="en-US" dirty="0"/>
+          </a:p>
+          <a:p>
+            <a:r>
+              <a:rPr lang="en-US" dirty="0"/>
               <a:t>- Add a repository on </a:t>
             </a:r>
             <a:r>
-              <a:rPr lang="en-US" dirty="0" err="1" smtClean="0"/>
+              <a:rPr lang="en-US" dirty="0" err="1"/>
               <a:t>github</a:t>
             </a:r>
             <a:r>
-              <a:rPr lang="en-US" dirty="0" smtClean="0"/>
+              <a:rPr lang="en-US" dirty="0"/>
               <a:t> (the + sign)</a:t>
             </a:r>
-            <a:endParaRPr lang="en-US" dirty="0"/>
-          </a:p>
-          <a:p>
-            <a:r>
-              <a:rPr lang="en-US" dirty="0" smtClean="0"/>
+          </a:p>
+          <a:p>
+            <a:r>
+              <a:rPr lang="en-US" dirty="0"/>
               <a:t>- </a:t>
             </a:r>
             <a:r>
-              <a:rPr lang="en-US" dirty="0" err="1" smtClean="0"/>
+              <a:rPr lang="en-US" dirty="0" err="1"/>
               <a:t>Git</a:t>
             </a:r>
             <a:r>
-              <a:rPr lang="en-US" dirty="0" smtClean="0"/>
+              <a:rPr lang="en-US" dirty="0"/>
               <a:t> remote add origin &lt;</a:t>
             </a:r>
             <a:r>
-              <a:rPr lang="en-US" dirty="0" err="1" smtClean="0"/>
+              <a:rPr lang="en-US" dirty="0" err="1"/>
               <a:t>url</a:t>
             </a:r>
             <a:r>
-              <a:rPr lang="en-US" dirty="0" smtClean="0"/>
+              <a:rPr lang="en-US" dirty="0"/>
               <a:t>&gt;</a:t>
             </a:r>
-            <a:endParaRPr lang="en-US" dirty="0"/>
-          </a:p>
-          <a:p>
-            <a:r>
-              <a:rPr lang="en-US" dirty="0" smtClean="0"/>
+          </a:p>
+          <a:p>
+            <a:r>
+              <a:rPr lang="en-US" dirty="0"/>
               <a:t>- Add, commit </a:t>
             </a:r>
           </a:p>
           <a:p>
             <a:r>
-              <a:rPr lang="en-US" dirty="0" smtClean="0"/>
+              <a:rPr lang="en-US" dirty="0"/>
               <a:t>- </a:t>
             </a:r>
             <a:r>
-              <a:rPr lang="en-US" dirty="0" err="1" smtClean="0"/>
+              <a:rPr lang="en-US" dirty="0" err="1"/>
               <a:t>Git</a:t>
             </a:r>
             <a:r>
-              <a:rPr lang="en-US" dirty="0" smtClean="0"/>
+              <a:rPr lang="en-US" dirty="0"/>
               <a:t> push –u origin master </a:t>
             </a:r>
           </a:p>
@@ -10871,77 +10721,51 @@
               <a:buFontTx/>
               <a:buChar char="-"/>
             </a:pPr>
-            <a:endParaRPr lang="en-US" dirty="0" smtClean="0"/>
-          </a:p>
-          <a:p>
-            <a:r>
-              <a:rPr lang="en-US" dirty="0"/>
-              <a:t>Method </a:t>
-            </a:r>
-            <a:r>
-              <a:rPr lang="en-US" dirty="0" smtClean="0"/>
-              <a:t>2: </a:t>
-            </a:r>
-          </a:p>
-          <a:p>
-            <a:r>
-              <a:rPr lang="en-US" dirty="0" smtClean="0"/>
+            <a:endParaRPr lang="en-US" dirty="0"/>
+          </a:p>
+          <a:p>
+            <a:r>
+              <a:rPr lang="en-US" dirty="0"/>
+              <a:t>Method 2: </a:t>
+            </a:r>
+          </a:p>
+          <a:p>
+            <a:r>
+              <a:rPr lang="en-US" dirty="0"/>
               <a:t>(from an existing repo)</a:t>
             </a:r>
+          </a:p>
+          <a:p>
             <a:endParaRPr lang="en-US" dirty="0"/>
           </a:p>
           <a:p>
-            <a:endParaRPr lang="en-US" dirty="0"/>
-          </a:p>
-          <a:p>
-            <a:r>
-              <a:rPr lang="en-US" b="1" dirty="0" smtClean="0"/>
+            <a:r>
+              <a:rPr lang="en-US" b="1" dirty="0"/>
               <a:t>- Clone</a:t>
             </a:r>
             <a:r>
-              <a:rPr lang="en-US" dirty="0" smtClean="0"/>
-              <a:t> </a:t>
-            </a:r>
-            <a:r>
-              <a:rPr lang="en-US" dirty="0"/>
-              <a:t>it in your local </a:t>
-            </a:r>
-            <a:r>
-              <a:rPr lang="en-US" dirty="0" smtClean="0"/>
-              <a:t>repository </a:t>
-            </a:r>
-          </a:p>
-          <a:p>
-            <a:r>
-              <a:rPr lang="en-US" dirty="0"/>
-              <a:t> </a:t>
-            </a:r>
-            <a:r>
-              <a:rPr lang="en-US" dirty="0" smtClean="0"/>
-              <a:t>(automatically sets up </a:t>
-            </a:r>
-            <a:r>
-              <a:rPr lang="en-US" dirty="0" err="1" smtClean="0"/>
+              <a:rPr lang="en-US" dirty="0"/>
+              <a:t> it in your local repository </a:t>
+            </a:r>
+          </a:p>
+          <a:p>
+            <a:r>
+              <a:rPr lang="en-US" dirty="0"/>
+              <a:t> (automatically sets up </a:t>
+            </a:r>
+            <a:r>
+              <a:rPr lang="en-US" dirty="0" err="1"/>
               <a:t>github</a:t>
             </a:r>
             <a:r>
-              <a:rPr lang="en-US" dirty="0" smtClean="0"/>
+              <a:rPr lang="en-US" dirty="0"/>
               <a:t> as the origin)</a:t>
             </a:r>
-            <a:endParaRPr lang="en-US" dirty="0"/>
-          </a:p>
-          <a:p>
-            <a:r>
-              <a:rPr lang="en-US" dirty="0"/>
-              <a:t>- Communicate with it </a:t>
-            </a:r>
-            <a:r>
-              <a:rPr lang="en-US" dirty="0" smtClean="0"/>
-              <a:t>by commands </a:t>
-            </a:r>
-            <a:r>
-              <a:rPr lang="en-US" dirty="0"/>
-              <a:t>Push-Pull</a:t>
+          </a:p>
+          <a:p>
+            <a:r>
+              <a:rPr lang="en-US" dirty="0"/>
+              <a:t>- Communicate with it by commands Push-Pull</a:t>
             </a:r>
           </a:p>
           <a:p>
@@ -10956,7 +10780,7 @@
               <a:buFontTx/>
               <a:buChar char="-"/>
             </a:pPr>
-            <a:endParaRPr lang="en-US" dirty="0" smtClean="0"/>
+            <a:endParaRPr lang="en-US" dirty="0"/>
           </a:p>
           <a:p>
             <a:pPr marL="285750" indent="-285750">
@@ -10970,10 +10794,10 @@
               <a:buFontTx/>
               <a:buChar char="-"/>
             </a:pPr>
-            <a:endParaRPr lang="en-US" dirty="0" smtClean="0"/>
-          </a:p>
-          <a:p>
-            <a:endParaRPr lang="en-US" dirty="0" smtClean="0"/>
+            <a:endParaRPr lang="en-US" dirty="0"/>
+          </a:p>
+          <a:p>
+            <a:endParaRPr lang="en-US" dirty="0"/>
           </a:p>
         </p:txBody>
       </p:sp>
@@ -11038,138 +10862,6 @@
 </p:sld>
 </file>
 
-<file path=ppt/slides/slide29.xml><?xml version="1.0" encoding="utf-8"?>
-<p:sld xmlns:a="http://schemas.openxmlformats.org/drawingml/2006/main" xmlns:r="http://schemas.openxmlformats.org/officeDocument/2006/relationships" xmlns:p="http://schemas.openxmlformats.org/presentationml/2006/main">
-  <p:cSld>
-    <p:spTree>
-      <p:nvGrpSpPr>
-        <p:cNvPr id="1" name=""/>
-        <p:cNvGrpSpPr/>
-        <p:nvPr/>
-      </p:nvGrpSpPr>
-      <p:grpSpPr>
-        <a:xfrm>
-          <a:off x="0" y="0"/>
-          <a:ext cx="0" cy="0"/>
-          <a:chOff x="0" y="0"/>
-          <a:chExt cx="0" cy="0"/>
-        </a:xfrm>
-      </p:grpSpPr>
-      <p:pic>
-        <p:nvPicPr>
-          <p:cNvPr id="2" name="Picture 1"/>
-          <p:cNvPicPr>
-            <a:picLocks noChangeAspect="1"/>
-          </p:cNvPicPr>
-          <p:nvPr/>
-        </p:nvPicPr>
-        <p:blipFill>
-          <a:blip r:embed="rId2"/>
-          <a:stretch>
-            <a:fillRect/>
-          </a:stretch>
-        </p:blipFill>
-        <p:spPr>
-          <a:xfrm>
-            <a:off x="1608474" y="886084"/>
-            <a:ext cx="8851369" cy="5099158"/>
-          </a:xfrm>
-          <a:prstGeom prst="rect">
-            <a:avLst/>
-          </a:prstGeom>
-        </p:spPr>
-      </p:pic>
-      <p:sp>
-        <p:nvSpPr>
-          <p:cNvPr id="3" name="TextBox 2"/>
-          <p:cNvSpPr txBox="1"/>
-          <p:nvPr/>
-        </p:nvSpPr>
-        <p:spPr>
-          <a:xfrm>
-            <a:off x="4773107" y="6356195"/>
-            <a:ext cx="1261051" cy="369332"/>
-          </a:xfrm>
-          <a:prstGeom prst="rect">
-            <a:avLst/>
-          </a:prstGeom>
-          <a:noFill/>
-        </p:spPr>
-        <p:txBody>
-          <a:bodyPr wrap="none" rtlCol="0">
-            <a:spAutoFit/>
-          </a:bodyPr>
-          <a:lstStyle/>
-          <a:p>
-            <a:r>
-              <a:rPr lang="en-US" dirty="0" smtClean="0"/>
-              <a:t>Local work!</a:t>
-            </a:r>
-            <a:endParaRPr lang="en-US" dirty="0"/>
-          </a:p>
-        </p:txBody>
-      </p:sp>
-      <p:pic>
-        <p:nvPicPr>
-          <p:cNvPr id="4" name="Picture 3"/>
-          <p:cNvPicPr>
-            <a:picLocks noChangeAspect="1"/>
-          </p:cNvPicPr>
-          <p:nvPr/>
-        </p:nvPicPr>
-        <p:blipFill>
-          <a:blip r:embed="rId3"/>
-          <a:stretch>
-            <a:fillRect/>
-          </a:stretch>
-        </p:blipFill>
-        <p:spPr>
-          <a:xfrm>
-            <a:off x="7191375" y="143134"/>
-            <a:ext cx="5000625" cy="742950"/>
-          </a:xfrm>
-          <a:prstGeom prst="rect">
-            <a:avLst/>
-          </a:prstGeom>
-        </p:spPr>
-      </p:pic>
-      <p:pic>
-        <p:nvPicPr>
-          <p:cNvPr id="5" name="Picture 4"/>
-          <p:cNvPicPr>
-            <a:picLocks noChangeAspect="1"/>
-          </p:cNvPicPr>
-          <p:nvPr/>
-        </p:nvPicPr>
-        <p:blipFill>
-          <a:blip r:embed="rId4"/>
-          <a:stretch>
-            <a:fillRect/>
-          </a:stretch>
-        </p:blipFill>
-        <p:spPr>
-          <a:xfrm>
-            <a:off x="6707574" y="5667375"/>
-            <a:ext cx="5448300" cy="1190625"/>
-          </a:xfrm>
-          <a:prstGeom prst="rect">
-            <a:avLst/>
-          </a:prstGeom>
-        </p:spPr>
-      </p:pic>
-    </p:spTree>
-    <p:extLst>
-      <p:ext uri="{BB962C8B-B14F-4D97-AF65-F5344CB8AC3E}">
-        <p14:creationId xmlns:p14="http://schemas.microsoft.com/office/powerpoint/2010/main" val="3964120653"/>
-      </p:ext>
-    </p:extLst>
-  </p:cSld>
-  <p:clrMapOvr>
-    <a:masterClrMapping/>
-  </p:clrMapOvr>
-</p:sld>
-</file>
-
 <file path=ppt/slides/slide3.xml><?xml version="1.0" encoding="utf-8"?>
 <p:sld xmlns:a="http://schemas.openxmlformats.org/drawingml/2006/main" xmlns:r="http://schemas.openxmlformats.org/officeDocument/2006/relationships" xmlns:p="http://schemas.openxmlformats.org/presentationml/2006/main">
   <p:cSld>
@@ -11314,7 +11006,6 @@
               <a:rPr lang="en-US" dirty="0"/>
               <a:t>of working code. </a:t>
             </a:r>
-            <a:endParaRPr lang="en-US" dirty="0" smtClean="0"/>
           </a:p>
           <a:p>
             <a:pPr marL="742950" lvl="1" indent="-285750">
@@ -11328,7 +11019,7 @@
               <a:buFont typeface="Arial" panose="020B0604020202020204" pitchFamily="34" charset="0"/>
               <a:buChar char="•"/>
             </a:pPr>
-            <a:endParaRPr lang="en-US" dirty="0" smtClean="0"/>
+            <a:endParaRPr lang="en-US" dirty="0"/>
           </a:p>
           <a:p>
             <a:pPr marL="742950" lvl="1" indent="-285750">
@@ -11354,7 +11045,7 @@
               <a:buChar char="•"/>
             </a:pPr>
             <a:r>
-              <a:rPr lang="en-US" dirty="0" smtClean="0"/>
+              <a:rPr lang="en-US" dirty="0"/>
               <a:t>A </a:t>
             </a:r>
             <a:r>
@@ -11382,7 +11073,6 @@
               <a:rPr lang="en-US" dirty="0"/>
               <a:t>your computer and you lose your data.  </a:t>
             </a:r>
-            <a:endParaRPr lang="en-US" dirty="0" smtClean="0"/>
           </a:p>
           <a:p>
             <a:pPr marL="742950" lvl="1" indent="-285750">
@@ -11390,22 +11080,17 @@
               <a:buChar char="•"/>
             </a:pPr>
             <a:r>
-              <a:rPr lang="en-US" dirty="0" smtClean="0"/>
+              <a:rPr lang="en-US" dirty="0"/>
               <a:t>Easy to share your work </a:t>
             </a:r>
             <a:r>
-              <a:rPr lang="en-US" smtClean="0"/>
-              <a:t>publicly </a:t>
-            </a:r>
-            <a:r>
-              <a:rPr lang="en-US" smtClean="0"/>
-              <a:t>(GITHUB</a:t>
-            </a:r>
-            <a:r>
-              <a:rPr lang="en-US" dirty="0" smtClean="0"/>
+              <a:rPr lang="en-US"/>
+              <a:t>publicly (GITHUB</a:t>
+            </a:r>
+            <a:r>
+              <a:rPr lang="en-US" dirty="0"/>
               <a:t>)</a:t>
             </a:r>
-            <a:endParaRPr lang="en-US" dirty="0"/>
           </a:p>
           <a:p>
             <a:pPr lvl="1"/>
@@ -11545,7 +11230,7 @@
           <a:lstStyle/>
           <a:p>
             <a:r>
-              <a:rPr lang="en-US" dirty="0" smtClean="0"/>
+              <a:rPr lang="en-US" dirty="0"/>
               <a:t>Local version control </a:t>
             </a:r>
           </a:p>
@@ -11577,10 +11262,9 @@
           <a:lstStyle/>
           <a:p>
             <a:r>
-              <a:rPr lang="en-US" dirty="0" smtClean="0"/>
+              <a:rPr lang="en-US" dirty="0"/>
               <a:t>Distributed version control</a:t>
             </a:r>
-            <a:endParaRPr lang="en-US" dirty="0"/>
           </a:p>
         </p:txBody>
       </p:sp>
@@ -11613,10 +11297,9 @@
           <a:lstStyle/>
           <a:p>
             <a:r>
-              <a:rPr lang="en-US" sz="4000" dirty="0" smtClean="0"/>
+              <a:rPr lang="en-US" sz="4000" dirty="0"/>
               <a:t>Solo work vs collaborations</a:t>
             </a:r>
-            <a:endParaRPr lang="en-US" sz="4000" dirty="0"/>
           </a:p>
         </p:txBody>
       </p:sp>
@@ -11889,28 +11572,20 @@
             </a:r>
             <a:r>
               <a:rPr lang="en-US" dirty="0"/>
-              <a:t> vim ‘C:/Program Files (x86)/Vim/vim74/vim.exe</a:t>
-            </a:r>
-            <a:r>
-              <a:rPr lang="en-US" dirty="0" smtClean="0"/>
-              <a:t>’ or </a:t>
-            </a:r>
-          </a:p>
-          <a:p>
-            <a:r>
-              <a:rPr lang="en-US" dirty="0"/>
-              <a:t> </a:t>
-            </a:r>
-            <a:r>
-              <a:rPr lang="en-US" dirty="0" smtClean="0"/>
-              <a:t>    </a:t>
-            </a:r>
-            <a:r>
-              <a:rPr lang="en-US" dirty="0" err="1" smtClean="0"/>
+              <a:t> vim ‘C:/Program Files (x86)/Vim/vim74/vim.exe’ or </a:t>
+            </a:r>
+          </a:p>
+          <a:p>
+            <a:r>
+              <a:rPr lang="en-US" dirty="0"/>
+              <a:t>     </a:t>
+            </a:r>
+            <a:r>
+              <a:rPr lang="en-US" dirty="0" err="1"/>
               <a:t>git</a:t>
             </a:r>
             <a:r>
-              <a:rPr lang="en-US" dirty="0" smtClean="0"/>
+              <a:rPr lang="en-US" dirty="0"/>
               <a:t> </a:t>
             </a:r>
             <a:r>

</xml_diff>